<commit_message>
Add some Notes and Pictures to the Presentation
</commit_message>
<xml_diff>
--- a/Documents/Presentation/Presentation.pptx
+++ b/Documents/Presentation/Presentation.pptx
@@ -4,18 +4,20 @@
   <p:sldMasterIdLst>
     <p:sldMasterId id="2147483660" r:id="rId1"/>
   </p:sldMasterIdLst>
+  <p:notesMasterIdLst>
+    <p:notesMasterId r:id="rId12"/>
+  </p:notesMasterIdLst>
   <p:sldIdLst>
     <p:sldId id="256" r:id="rId2"/>
     <p:sldId id="257" r:id="rId3"/>
     <p:sldId id="258" r:id="rId4"/>
-    <p:sldId id="259" r:id="rId5"/>
-    <p:sldId id="260" r:id="rId6"/>
-    <p:sldId id="261" r:id="rId7"/>
-    <p:sldId id="262" r:id="rId8"/>
-    <p:sldId id="263" r:id="rId9"/>
-    <p:sldId id="264" r:id="rId10"/>
-    <p:sldId id="265" r:id="rId11"/>
-    <p:sldId id="266" r:id="rId12"/>
+    <p:sldId id="260" r:id="rId5"/>
+    <p:sldId id="261" r:id="rId6"/>
+    <p:sldId id="262" r:id="rId7"/>
+    <p:sldId id="263" r:id="rId8"/>
+    <p:sldId id="264" r:id="rId9"/>
+    <p:sldId id="265" r:id="rId10"/>
+    <p:sldId id="266" r:id="rId11"/>
   </p:sldIdLst>
   <p:sldSz cx="9144000" cy="6858000" type="screen4x3"/>
   <p:notesSz cx="6858000" cy="9144000"/>
@@ -114,7 +116,2004 @@
       </a:defRPr>
     </a:lvl9pPr>
   </p:defaultTextStyle>
+  <p:extLst>
+    <p:ext uri="{EFAFB233-063F-42B5-8137-9DF3F51BA10A}">
+      <p15:sldGuideLst xmlns:p15="http://schemas.microsoft.com/office/powerpoint/2012/main"/>
+    </p:ext>
+  </p:extLst>
 </p:presentation>
+</file>
+
+<file path=ppt/revisionInfo.xml><?xml version="1.0" encoding="utf-8"?>
+<p1510:revInfo xmlns:a="http://schemas.openxmlformats.org/drawingml/2006/main" xmlns:r="http://schemas.openxmlformats.org/officeDocument/2006/relationships" xmlns:p1510="http://schemas.microsoft.com/office/powerpoint/2015/10/main"/>
+</file>
+
+<file path=ppt/notesMasters/notesMaster1.xml><?xml version="1.0" encoding="utf-8"?>
+<p:notesMaster xmlns:a="http://schemas.openxmlformats.org/drawingml/2006/main" xmlns:r="http://schemas.openxmlformats.org/officeDocument/2006/relationships" xmlns:p="http://schemas.openxmlformats.org/presentationml/2006/main">
+  <p:cSld>
+    <p:bg>
+      <p:bgRef idx="1001">
+        <a:schemeClr val="bg1"/>
+      </p:bgRef>
+    </p:bg>
+    <p:spTree>
+      <p:nvGrpSpPr>
+        <p:cNvPr id="1" name=""/>
+        <p:cNvGrpSpPr/>
+        <p:nvPr/>
+      </p:nvGrpSpPr>
+      <p:grpSpPr>
+        <a:xfrm>
+          <a:off x="0" y="0"/>
+          <a:ext cx="0" cy="0"/>
+          <a:chOff x="0" y="0"/>
+          <a:chExt cx="0" cy="0"/>
+        </a:xfrm>
+      </p:grpSpPr>
+      <p:sp>
+        <p:nvSpPr>
+          <p:cNvPr id="2" name="Kopfzeilenplatzhalter 1"/>
+          <p:cNvSpPr>
+            <a:spLocks noGrp="1"/>
+          </p:cNvSpPr>
+          <p:nvPr>
+            <p:ph type="hdr" sz="quarter"/>
+          </p:nvPr>
+        </p:nvSpPr>
+        <p:spPr>
+          <a:xfrm>
+            <a:off x="0" y="0"/>
+            <a:ext cx="2971800" cy="458788"/>
+          </a:xfrm>
+          <a:prstGeom prst="rect">
+            <a:avLst/>
+          </a:prstGeom>
+        </p:spPr>
+        <p:txBody>
+          <a:bodyPr vert="horz" lIns="91440" tIns="45720" rIns="91440" bIns="45720" rtlCol="0"/>
+          <a:lstStyle>
+            <a:lvl1pPr algn="l">
+              <a:defRPr sz="1200"/>
+            </a:lvl1pPr>
+          </a:lstStyle>
+          <a:p>
+            <a:endParaRPr lang="en-GB"/>
+          </a:p>
+        </p:txBody>
+      </p:sp>
+      <p:sp>
+        <p:nvSpPr>
+          <p:cNvPr id="3" name="Datumsplatzhalter 2"/>
+          <p:cNvSpPr>
+            <a:spLocks noGrp="1"/>
+          </p:cNvSpPr>
+          <p:nvPr>
+            <p:ph type="dt" idx="1"/>
+          </p:nvPr>
+        </p:nvSpPr>
+        <p:spPr>
+          <a:xfrm>
+            <a:off x="3884613" y="0"/>
+            <a:ext cx="2971800" cy="458788"/>
+          </a:xfrm>
+          <a:prstGeom prst="rect">
+            <a:avLst/>
+          </a:prstGeom>
+        </p:spPr>
+        <p:txBody>
+          <a:bodyPr vert="horz" lIns="91440" tIns="45720" rIns="91440" bIns="45720" rtlCol="0"/>
+          <a:lstStyle>
+            <a:lvl1pPr algn="r">
+              <a:defRPr sz="1200"/>
+            </a:lvl1pPr>
+          </a:lstStyle>
+          <a:p>
+            <a:fld id="{8CA86DDC-4AF9-4FB1-87A1-4AD13A0DDDE5}" type="datetimeFigureOut">
+              <a:rPr lang="en-GB" smtClean="0"/>
+              <a:t>12/11/2017</a:t>
+            </a:fld>
+            <a:endParaRPr lang="en-GB"/>
+          </a:p>
+        </p:txBody>
+      </p:sp>
+      <p:sp>
+        <p:nvSpPr>
+          <p:cNvPr id="4" name="Folienbildplatzhalter 3"/>
+          <p:cNvSpPr>
+            <a:spLocks noGrp="1" noRot="1" noChangeAspect="1"/>
+          </p:cNvSpPr>
+          <p:nvPr>
+            <p:ph type="sldImg" idx="2"/>
+          </p:nvPr>
+        </p:nvSpPr>
+        <p:spPr>
+          <a:xfrm>
+            <a:off x="1371600" y="1143000"/>
+            <a:ext cx="4114800" cy="3086100"/>
+          </a:xfrm>
+          <a:prstGeom prst="rect">
+            <a:avLst/>
+          </a:prstGeom>
+          <a:noFill/>
+          <a:ln w="12700">
+            <a:solidFill>
+              <a:prstClr val="black"/>
+            </a:solidFill>
+          </a:ln>
+        </p:spPr>
+        <p:txBody>
+          <a:bodyPr vert="horz" lIns="91440" tIns="45720" rIns="91440" bIns="45720" rtlCol="0" anchor="ctr"/>
+          <a:lstStyle/>
+          <a:p>
+            <a:endParaRPr lang="en-GB"/>
+          </a:p>
+        </p:txBody>
+      </p:sp>
+      <p:sp>
+        <p:nvSpPr>
+          <p:cNvPr id="5" name="Notizenplatzhalter 4"/>
+          <p:cNvSpPr>
+            <a:spLocks noGrp="1"/>
+          </p:cNvSpPr>
+          <p:nvPr>
+            <p:ph type="body" sz="quarter" idx="3"/>
+          </p:nvPr>
+        </p:nvSpPr>
+        <p:spPr>
+          <a:xfrm>
+            <a:off x="685800" y="4400550"/>
+            <a:ext cx="5486400" cy="3600450"/>
+          </a:xfrm>
+          <a:prstGeom prst="rect">
+            <a:avLst/>
+          </a:prstGeom>
+        </p:spPr>
+        <p:txBody>
+          <a:bodyPr vert="horz" lIns="91440" tIns="45720" rIns="91440" bIns="45720" rtlCol="0"/>
+          <a:lstStyle/>
+          <a:p>
+            <a:pPr lvl="0"/>
+            <a:r>
+              <a:rPr lang="de-DE"/>
+              <a:t>Mastertextformat bearbeiten</a:t>
+            </a:r>
+          </a:p>
+          <a:p>
+            <a:pPr lvl="1"/>
+            <a:r>
+              <a:rPr lang="de-DE"/>
+              <a:t>Zweite Ebene</a:t>
+            </a:r>
+          </a:p>
+          <a:p>
+            <a:pPr lvl="2"/>
+            <a:r>
+              <a:rPr lang="de-DE"/>
+              <a:t>Dritte Ebene</a:t>
+            </a:r>
+          </a:p>
+          <a:p>
+            <a:pPr lvl="3"/>
+            <a:r>
+              <a:rPr lang="de-DE"/>
+              <a:t>Vierte Ebene</a:t>
+            </a:r>
+          </a:p>
+          <a:p>
+            <a:pPr lvl="4"/>
+            <a:r>
+              <a:rPr lang="de-DE"/>
+              <a:t>Fünfte Ebene</a:t>
+            </a:r>
+            <a:endParaRPr lang="en-GB"/>
+          </a:p>
+        </p:txBody>
+      </p:sp>
+      <p:sp>
+        <p:nvSpPr>
+          <p:cNvPr id="6" name="Fußzeilenplatzhalter 5"/>
+          <p:cNvSpPr>
+            <a:spLocks noGrp="1"/>
+          </p:cNvSpPr>
+          <p:nvPr>
+            <p:ph type="ftr" sz="quarter" idx="4"/>
+          </p:nvPr>
+        </p:nvSpPr>
+        <p:spPr>
+          <a:xfrm>
+            <a:off x="0" y="8685213"/>
+            <a:ext cx="2971800" cy="458787"/>
+          </a:xfrm>
+          <a:prstGeom prst="rect">
+            <a:avLst/>
+          </a:prstGeom>
+        </p:spPr>
+        <p:txBody>
+          <a:bodyPr vert="horz" lIns="91440" tIns="45720" rIns="91440" bIns="45720" rtlCol="0" anchor="b"/>
+          <a:lstStyle>
+            <a:lvl1pPr algn="l">
+              <a:defRPr sz="1200"/>
+            </a:lvl1pPr>
+          </a:lstStyle>
+          <a:p>
+            <a:endParaRPr lang="en-GB"/>
+          </a:p>
+        </p:txBody>
+      </p:sp>
+      <p:sp>
+        <p:nvSpPr>
+          <p:cNvPr id="7" name="Foliennummernplatzhalter 6"/>
+          <p:cNvSpPr>
+            <a:spLocks noGrp="1"/>
+          </p:cNvSpPr>
+          <p:nvPr>
+            <p:ph type="sldNum" sz="quarter" idx="5"/>
+          </p:nvPr>
+        </p:nvSpPr>
+        <p:spPr>
+          <a:xfrm>
+            <a:off x="3884613" y="8685213"/>
+            <a:ext cx="2971800" cy="458787"/>
+          </a:xfrm>
+          <a:prstGeom prst="rect">
+            <a:avLst/>
+          </a:prstGeom>
+        </p:spPr>
+        <p:txBody>
+          <a:bodyPr vert="horz" lIns="91440" tIns="45720" rIns="91440" bIns="45720" rtlCol="0" anchor="b"/>
+          <a:lstStyle>
+            <a:lvl1pPr algn="r">
+              <a:defRPr sz="1200"/>
+            </a:lvl1pPr>
+          </a:lstStyle>
+          <a:p>
+            <a:fld id="{748723F8-CD6B-45E3-B09A-75062809A4AE}" type="slidenum">
+              <a:rPr lang="en-GB" smtClean="0"/>
+              <a:t>‹Nr.›</a:t>
+            </a:fld>
+            <a:endParaRPr lang="en-GB"/>
+          </a:p>
+        </p:txBody>
+      </p:sp>
+    </p:spTree>
+    <p:extLst>
+      <p:ext uri="{BB962C8B-B14F-4D97-AF65-F5344CB8AC3E}">
+        <p14:creationId xmlns:p14="http://schemas.microsoft.com/office/powerpoint/2010/main" val="2183512438"/>
+      </p:ext>
+    </p:extLst>
+  </p:cSld>
+  <p:clrMap bg1="lt1" tx1="dk1" bg2="lt2" tx2="dk2" accent1="accent1" accent2="accent2" accent3="accent3" accent4="accent4" accent5="accent5" accent6="accent6" hlink="hlink" folHlink="folHlink"/>
+  <p:notesStyle>
+    <a:lvl1pPr marL="0" algn="l" defTabSz="914400" rtl="0" eaLnBrk="1" latinLnBrk="0" hangingPunct="1">
+      <a:defRPr sz="1200" kern="1200">
+        <a:solidFill>
+          <a:schemeClr val="tx1"/>
+        </a:solidFill>
+        <a:latin typeface="+mn-lt"/>
+        <a:ea typeface="+mn-ea"/>
+        <a:cs typeface="+mn-cs"/>
+      </a:defRPr>
+    </a:lvl1pPr>
+    <a:lvl2pPr marL="457200" algn="l" defTabSz="914400" rtl="0" eaLnBrk="1" latinLnBrk="0" hangingPunct="1">
+      <a:defRPr sz="1200" kern="1200">
+        <a:solidFill>
+          <a:schemeClr val="tx1"/>
+        </a:solidFill>
+        <a:latin typeface="+mn-lt"/>
+        <a:ea typeface="+mn-ea"/>
+        <a:cs typeface="+mn-cs"/>
+      </a:defRPr>
+    </a:lvl2pPr>
+    <a:lvl3pPr marL="914400" algn="l" defTabSz="914400" rtl="0" eaLnBrk="1" latinLnBrk="0" hangingPunct="1">
+      <a:defRPr sz="1200" kern="1200">
+        <a:solidFill>
+          <a:schemeClr val="tx1"/>
+        </a:solidFill>
+        <a:latin typeface="+mn-lt"/>
+        <a:ea typeface="+mn-ea"/>
+        <a:cs typeface="+mn-cs"/>
+      </a:defRPr>
+    </a:lvl3pPr>
+    <a:lvl4pPr marL="1371600" algn="l" defTabSz="914400" rtl="0" eaLnBrk="1" latinLnBrk="0" hangingPunct="1">
+      <a:defRPr sz="1200" kern="1200">
+        <a:solidFill>
+          <a:schemeClr val="tx1"/>
+        </a:solidFill>
+        <a:latin typeface="+mn-lt"/>
+        <a:ea typeface="+mn-ea"/>
+        <a:cs typeface="+mn-cs"/>
+      </a:defRPr>
+    </a:lvl4pPr>
+    <a:lvl5pPr marL="1828800" algn="l" defTabSz="914400" rtl="0" eaLnBrk="1" latinLnBrk="0" hangingPunct="1">
+      <a:defRPr sz="1200" kern="1200">
+        <a:solidFill>
+          <a:schemeClr val="tx1"/>
+        </a:solidFill>
+        <a:latin typeface="+mn-lt"/>
+        <a:ea typeface="+mn-ea"/>
+        <a:cs typeface="+mn-cs"/>
+      </a:defRPr>
+    </a:lvl5pPr>
+    <a:lvl6pPr marL="2286000" algn="l" defTabSz="914400" rtl="0" eaLnBrk="1" latinLnBrk="0" hangingPunct="1">
+      <a:defRPr sz="1200" kern="1200">
+        <a:solidFill>
+          <a:schemeClr val="tx1"/>
+        </a:solidFill>
+        <a:latin typeface="+mn-lt"/>
+        <a:ea typeface="+mn-ea"/>
+        <a:cs typeface="+mn-cs"/>
+      </a:defRPr>
+    </a:lvl6pPr>
+    <a:lvl7pPr marL="2743200" algn="l" defTabSz="914400" rtl="0" eaLnBrk="1" latinLnBrk="0" hangingPunct="1">
+      <a:defRPr sz="1200" kern="1200">
+        <a:solidFill>
+          <a:schemeClr val="tx1"/>
+        </a:solidFill>
+        <a:latin typeface="+mn-lt"/>
+        <a:ea typeface="+mn-ea"/>
+        <a:cs typeface="+mn-cs"/>
+      </a:defRPr>
+    </a:lvl7pPr>
+    <a:lvl8pPr marL="3200400" algn="l" defTabSz="914400" rtl="0" eaLnBrk="1" latinLnBrk="0" hangingPunct="1">
+      <a:defRPr sz="1200" kern="1200">
+        <a:solidFill>
+          <a:schemeClr val="tx1"/>
+        </a:solidFill>
+        <a:latin typeface="+mn-lt"/>
+        <a:ea typeface="+mn-ea"/>
+        <a:cs typeface="+mn-cs"/>
+      </a:defRPr>
+    </a:lvl8pPr>
+    <a:lvl9pPr marL="3657600" algn="l" defTabSz="914400" rtl="0" eaLnBrk="1" latinLnBrk="0" hangingPunct="1">
+      <a:defRPr sz="1200" kern="1200">
+        <a:solidFill>
+          <a:schemeClr val="tx1"/>
+        </a:solidFill>
+        <a:latin typeface="+mn-lt"/>
+        <a:ea typeface="+mn-ea"/>
+        <a:cs typeface="+mn-cs"/>
+      </a:defRPr>
+    </a:lvl9pPr>
+  </p:notesStyle>
+</p:notesMaster>
+</file>
+
+<file path=ppt/notesSlides/notesSlide1.xml><?xml version="1.0" encoding="utf-8"?>
+<p:notes xmlns:a="http://schemas.openxmlformats.org/drawingml/2006/main" xmlns:r="http://schemas.openxmlformats.org/officeDocument/2006/relationships" xmlns:p="http://schemas.openxmlformats.org/presentationml/2006/main">
+  <p:cSld>
+    <p:spTree>
+      <p:nvGrpSpPr>
+        <p:cNvPr id="1" name=""/>
+        <p:cNvGrpSpPr/>
+        <p:nvPr/>
+      </p:nvGrpSpPr>
+      <p:grpSpPr>
+        <a:xfrm>
+          <a:off x="0" y="0"/>
+          <a:ext cx="0" cy="0"/>
+          <a:chOff x="0" y="0"/>
+          <a:chExt cx="0" cy="0"/>
+        </a:xfrm>
+      </p:grpSpPr>
+      <p:sp>
+        <p:nvSpPr>
+          <p:cNvPr id="2" name="Folienbildplatzhalter 1"/>
+          <p:cNvSpPr>
+            <a:spLocks noGrp="1" noRot="1" noChangeAspect="1"/>
+          </p:cNvSpPr>
+          <p:nvPr>
+            <p:ph type="sldImg"/>
+          </p:nvPr>
+        </p:nvSpPr>
+        <p:spPr/>
+      </p:sp>
+      <p:sp>
+        <p:nvSpPr>
+          <p:cNvPr id="3" name="Notizenplatzhalter 2"/>
+          <p:cNvSpPr>
+            <a:spLocks noGrp="1"/>
+          </p:cNvSpPr>
+          <p:nvPr>
+            <p:ph type="body" idx="1"/>
+          </p:nvPr>
+        </p:nvSpPr>
+        <p:spPr/>
+        <p:txBody>
+          <a:bodyPr/>
+          <a:lstStyle/>
+          <a:p>
+            <a:r>
+              <a:rPr lang="en-GB" dirty="0"/>
+              <a:t>Grosse Ski </a:t>
+            </a:r>
+            <a:r>
+              <a:rPr lang="en-GB" dirty="0" err="1"/>
+              <a:t>Gebiete</a:t>
+            </a:r>
+            <a:r>
+              <a:rPr lang="en-GB" dirty="0"/>
+              <a:t> </a:t>
+            </a:r>
+            <a:r>
+              <a:rPr lang="en-GB" dirty="0" err="1"/>
+              <a:t>haben</a:t>
+            </a:r>
+            <a:r>
+              <a:rPr lang="en-GB" dirty="0"/>
+              <a:t> </a:t>
+            </a:r>
+            <a:r>
+              <a:rPr lang="en-GB" dirty="0" err="1"/>
+              <a:t>eigene</a:t>
+            </a:r>
+            <a:r>
+              <a:rPr lang="en-GB" dirty="0"/>
+              <a:t> Apps.</a:t>
+            </a:r>
+          </a:p>
+          <a:p>
+            <a:pPr marL="171450" indent="-171450">
+              <a:buFontTx/>
+              <a:buChar char="-"/>
+            </a:pPr>
+            <a:r>
+              <a:rPr lang="en-GB" dirty="0" err="1"/>
+              <a:t>Laax</a:t>
+            </a:r>
+            <a:r>
+              <a:rPr lang="en-GB" dirty="0"/>
+              <a:t>, Davos, </a:t>
+            </a:r>
+            <a:r>
+              <a:rPr lang="en-GB" dirty="0" err="1"/>
+              <a:t>Adelboden</a:t>
+            </a:r>
+            <a:endParaRPr lang="en-GB" dirty="0"/>
+          </a:p>
+          <a:p>
+            <a:pPr marL="171450" indent="-171450">
+              <a:buFontTx/>
+              <a:buChar char="-"/>
+            </a:pPr>
+            <a:r>
+              <a:rPr lang="en-GB" dirty="0" err="1"/>
+              <a:t>Lokal</a:t>
+            </a:r>
+            <a:r>
+              <a:rPr lang="en-GB" dirty="0"/>
+              <a:t>, </a:t>
+            </a:r>
+            <a:r>
+              <a:rPr lang="en-GB" dirty="0" err="1"/>
+              <a:t>Abgestimmt</a:t>
+            </a:r>
+            <a:r>
+              <a:rPr lang="en-GB" dirty="0"/>
+              <a:t> auf </a:t>
+            </a:r>
+            <a:r>
+              <a:rPr lang="en-GB" dirty="0" err="1"/>
+              <a:t>jeweilige</a:t>
+            </a:r>
+            <a:r>
+              <a:rPr lang="en-GB" dirty="0"/>
+              <a:t> Destination.</a:t>
+            </a:r>
+          </a:p>
+          <a:p>
+            <a:pPr marL="171450" indent="-171450">
+              <a:buFontTx/>
+              <a:buChar char="-"/>
+            </a:pPr>
+            <a:endParaRPr lang="en-GB" dirty="0"/>
+          </a:p>
+          <a:p>
+            <a:pPr marL="0" indent="0">
+              <a:buFontTx/>
+              <a:buNone/>
+            </a:pPr>
+            <a:r>
+              <a:rPr lang="en-GB" dirty="0" err="1"/>
+              <a:t>iSKI</a:t>
+            </a:r>
+            <a:endParaRPr lang="en-GB" dirty="0"/>
+          </a:p>
+          <a:p>
+            <a:pPr marL="171450" indent="-171450">
+              <a:buFontTx/>
+              <a:buChar char="-"/>
+            </a:pPr>
+            <a:r>
+              <a:rPr lang="en-GB" dirty="0" err="1"/>
+              <a:t>Je</a:t>
+            </a:r>
+            <a:r>
+              <a:rPr lang="en-GB" dirty="0"/>
+              <a:t> Land </a:t>
+            </a:r>
+            <a:r>
+              <a:rPr lang="en-GB" dirty="0" err="1"/>
+              <a:t>ein</a:t>
+            </a:r>
+            <a:r>
+              <a:rPr lang="en-GB" dirty="0"/>
+              <a:t> App.</a:t>
+            </a:r>
+          </a:p>
+          <a:p>
+            <a:pPr marL="171450" indent="-171450">
+              <a:buFontTx/>
+              <a:buChar char="-"/>
+            </a:pPr>
+            <a:r>
+              <a:rPr lang="en-GB" dirty="0"/>
+              <a:t>Community, Ski-Tracker, </a:t>
+            </a:r>
+            <a:r>
+              <a:rPr lang="en-GB" dirty="0" err="1"/>
+              <a:t>vergleichen</a:t>
+            </a:r>
+            <a:r>
+              <a:rPr lang="en-GB" dirty="0"/>
+              <a:t>, </a:t>
+            </a:r>
+          </a:p>
+          <a:p>
+            <a:pPr marL="171450" indent="-171450">
+              <a:buFontTx/>
+              <a:buChar char="-"/>
+            </a:pPr>
+            <a:r>
+              <a:rPr lang="en-GB" dirty="0" err="1"/>
+              <a:t>Aktuelle</a:t>
+            </a:r>
+            <a:r>
+              <a:rPr lang="en-GB" dirty="0"/>
+              <a:t> Status, </a:t>
+            </a:r>
+            <a:r>
+              <a:rPr lang="en-GB" dirty="0" err="1"/>
+              <a:t>Informationen</a:t>
+            </a:r>
+            <a:r>
+              <a:rPr lang="en-GB" dirty="0"/>
+              <a:t> und Wetter</a:t>
+            </a:r>
+          </a:p>
+          <a:p>
+            <a:pPr marL="171450" indent="-171450">
+              <a:buFontTx/>
+              <a:buChar char="-"/>
+            </a:pPr>
+            <a:r>
+              <a:rPr lang="en-GB" dirty="0" err="1"/>
+              <a:t>Schlägt</a:t>
+            </a:r>
+            <a:r>
+              <a:rPr lang="en-GB" dirty="0"/>
+              <a:t> </a:t>
+            </a:r>
+            <a:r>
+              <a:rPr lang="en-GB" dirty="0" err="1"/>
+              <a:t>Skigebiete</a:t>
+            </a:r>
+            <a:r>
+              <a:rPr lang="en-GB" dirty="0"/>
+              <a:t> </a:t>
+            </a:r>
+            <a:r>
+              <a:rPr lang="en-GB" dirty="0" err="1"/>
+              <a:t>vor</a:t>
+            </a:r>
+            <a:r>
+              <a:rPr lang="en-GB" dirty="0"/>
+              <a:t> </a:t>
+            </a:r>
+            <a:r>
+              <a:rPr lang="en-GB" dirty="0" err="1"/>
+              <a:t>jedoch</a:t>
+            </a:r>
+            <a:r>
+              <a:rPr lang="en-GB" dirty="0"/>
+              <a:t> </a:t>
+            </a:r>
+            <a:r>
+              <a:rPr lang="en-GB" dirty="0" err="1"/>
+              <a:t>Standort</a:t>
+            </a:r>
+            <a:r>
+              <a:rPr lang="en-GB" dirty="0"/>
+              <a:t> </a:t>
+            </a:r>
+            <a:r>
+              <a:rPr lang="en-GB" dirty="0" err="1"/>
+              <a:t>unabhängig</a:t>
+            </a:r>
+            <a:endParaRPr lang="en-GB" dirty="0"/>
+          </a:p>
+          <a:p>
+            <a:pPr marL="171450" indent="-171450">
+              <a:buFontTx/>
+              <a:buChar char="-"/>
+            </a:pPr>
+            <a:endParaRPr lang="en-GB" dirty="0"/>
+          </a:p>
+          <a:p>
+            <a:pPr marL="0" indent="0">
+              <a:buFontTx/>
+              <a:buNone/>
+            </a:pPr>
+            <a:r>
+              <a:rPr lang="en-GB" dirty="0" err="1"/>
+              <a:t>Bergfex</a:t>
+            </a:r>
+            <a:endParaRPr lang="en-GB" dirty="0"/>
+          </a:p>
+          <a:p>
+            <a:pPr marL="171450" indent="-171450">
+              <a:buFontTx/>
+              <a:buChar char="-"/>
+            </a:pPr>
+            <a:r>
+              <a:rPr lang="en-GB" dirty="0" err="1"/>
+              <a:t>Wetterberichte</a:t>
+            </a:r>
+            <a:r>
+              <a:rPr lang="en-GB" dirty="0"/>
+              <a:t>, Status, Webcams,  </a:t>
+            </a:r>
+            <a:r>
+              <a:rPr lang="en-GB" dirty="0" err="1"/>
+              <a:t>Pistenpläne</a:t>
+            </a:r>
+            <a:endParaRPr lang="en-GB" dirty="0"/>
+          </a:p>
+          <a:p>
+            <a:pPr marL="171450" indent="-171450">
+              <a:buFontTx/>
+              <a:buChar char="-"/>
+            </a:pPr>
+            <a:r>
+              <a:rPr lang="en-GB" dirty="0" err="1"/>
+              <a:t>Alle</a:t>
+            </a:r>
+            <a:r>
+              <a:rPr lang="en-GB" dirty="0"/>
+              <a:t> </a:t>
+            </a:r>
+            <a:r>
+              <a:rPr lang="en-GB" dirty="0" err="1"/>
+              <a:t>Gebiete</a:t>
+            </a:r>
+            <a:r>
+              <a:rPr lang="en-GB" dirty="0"/>
+              <a:t> </a:t>
+            </a:r>
+            <a:r>
+              <a:rPr lang="en-GB" dirty="0" err="1"/>
+              <a:t>durchsuchen</a:t>
+            </a:r>
+            <a:endParaRPr lang="en-GB" dirty="0"/>
+          </a:p>
+          <a:p>
+            <a:pPr marL="171450" indent="-171450">
+              <a:buFontTx/>
+              <a:buChar char="-"/>
+            </a:pPr>
+            <a:r>
+              <a:rPr lang="en-GB" dirty="0" err="1"/>
+              <a:t>Eigene</a:t>
+            </a:r>
+            <a:r>
+              <a:rPr lang="en-GB" dirty="0"/>
+              <a:t> </a:t>
+            </a:r>
+            <a:r>
+              <a:rPr lang="en-GB" dirty="0" err="1"/>
+              <a:t>Favoriten</a:t>
+            </a:r>
+            <a:endParaRPr lang="en-GB" dirty="0"/>
+          </a:p>
+          <a:p>
+            <a:pPr marL="171450" indent="-171450">
+              <a:buFontTx/>
+              <a:buChar char="-"/>
+            </a:pPr>
+            <a:endParaRPr lang="en-GB" dirty="0"/>
+          </a:p>
+          <a:p>
+            <a:pPr marL="0" indent="0">
+              <a:buFontTx/>
+              <a:buNone/>
+            </a:pPr>
+            <a:r>
+              <a:rPr lang="en-GB" dirty="0" err="1"/>
+              <a:t>Skiinfo</a:t>
+            </a:r>
+            <a:endParaRPr lang="en-GB" dirty="0"/>
+          </a:p>
+          <a:p>
+            <a:pPr marL="171450" indent="-171450">
+              <a:buFontTx/>
+              <a:buChar char="-"/>
+            </a:pPr>
+            <a:r>
+              <a:rPr lang="en-GB" dirty="0" err="1"/>
+              <a:t>Ähnlich</a:t>
+            </a:r>
+            <a:r>
+              <a:rPr lang="en-GB" dirty="0"/>
+              <a:t> </a:t>
+            </a:r>
+            <a:r>
+              <a:rPr lang="en-GB" dirty="0" err="1"/>
+              <a:t>wie</a:t>
+            </a:r>
+            <a:r>
+              <a:rPr lang="en-GB" dirty="0"/>
+              <a:t> </a:t>
+            </a:r>
+            <a:r>
+              <a:rPr lang="en-GB" dirty="0" err="1"/>
+              <a:t>Bergfex</a:t>
+            </a:r>
+            <a:endParaRPr lang="en-GB" dirty="0"/>
+          </a:p>
+          <a:p>
+            <a:pPr marL="0" indent="0">
+              <a:buFontTx/>
+              <a:buNone/>
+            </a:pPr>
+            <a:endParaRPr lang="en-GB" dirty="0"/>
+          </a:p>
+          <a:p>
+            <a:pPr marL="0" indent="0">
+              <a:buFontTx/>
+              <a:buNone/>
+            </a:pPr>
+            <a:r>
+              <a:rPr lang="en-GB" dirty="0"/>
+              <a:t>Skiresort.de</a:t>
+            </a:r>
+          </a:p>
+          <a:p>
+            <a:pPr marL="171450" indent="-171450">
+              <a:buFontTx/>
+              <a:buChar char="-"/>
+            </a:pPr>
+            <a:r>
+              <a:rPr lang="en-GB" dirty="0" err="1"/>
+              <a:t>Ähnlich</a:t>
+            </a:r>
+            <a:r>
+              <a:rPr lang="en-GB" dirty="0"/>
+              <a:t> </a:t>
+            </a:r>
+            <a:r>
+              <a:rPr lang="en-GB" dirty="0" err="1"/>
+              <a:t>wie</a:t>
+            </a:r>
+            <a:r>
+              <a:rPr lang="en-GB" dirty="0"/>
+              <a:t> </a:t>
+            </a:r>
+            <a:r>
+              <a:rPr lang="en-GB" dirty="0" err="1"/>
+              <a:t>Bergfext</a:t>
+            </a:r>
+            <a:endParaRPr lang="en-GB" dirty="0"/>
+          </a:p>
+          <a:p>
+            <a:pPr marL="171450" indent="-171450">
+              <a:buFontTx/>
+              <a:buChar char="-"/>
+            </a:pPr>
+            <a:r>
+              <a:rPr lang="en-GB" dirty="0" err="1"/>
+              <a:t>Suchen</a:t>
+            </a:r>
+            <a:r>
+              <a:rPr lang="en-GB" dirty="0"/>
+              <a:t> in </a:t>
+            </a:r>
+            <a:r>
+              <a:rPr lang="en-GB" dirty="0" err="1"/>
+              <a:t>Umgebung</a:t>
+            </a:r>
+            <a:endParaRPr lang="en-GB" dirty="0"/>
+          </a:p>
+        </p:txBody>
+      </p:sp>
+      <p:sp>
+        <p:nvSpPr>
+          <p:cNvPr id="4" name="Foliennummernplatzhalter 3"/>
+          <p:cNvSpPr>
+            <a:spLocks noGrp="1"/>
+          </p:cNvSpPr>
+          <p:nvPr>
+            <p:ph type="sldNum" sz="quarter" idx="10"/>
+          </p:nvPr>
+        </p:nvSpPr>
+        <p:spPr/>
+        <p:txBody>
+          <a:bodyPr/>
+          <a:lstStyle/>
+          <a:p>
+            <a:fld id="{748723F8-CD6B-45E3-B09A-75062809A4AE}" type="slidenum">
+              <a:rPr lang="en-GB" smtClean="0"/>
+              <a:t>5</a:t>
+            </a:fld>
+            <a:endParaRPr lang="en-GB"/>
+          </a:p>
+        </p:txBody>
+      </p:sp>
+    </p:spTree>
+    <p:extLst>
+      <p:ext uri="{BB962C8B-B14F-4D97-AF65-F5344CB8AC3E}">
+        <p14:creationId xmlns:p14="http://schemas.microsoft.com/office/powerpoint/2010/main" val="242691541"/>
+      </p:ext>
+    </p:extLst>
+  </p:cSld>
+  <p:clrMapOvr>
+    <a:masterClrMapping/>
+  </p:clrMapOvr>
+</p:notes>
+</file>
+
+<file path=ppt/notesSlides/notesSlide2.xml><?xml version="1.0" encoding="utf-8"?>
+<p:notes xmlns:a="http://schemas.openxmlformats.org/drawingml/2006/main" xmlns:r="http://schemas.openxmlformats.org/officeDocument/2006/relationships" xmlns:p="http://schemas.openxmlformats.org/presentationml/2006/main">
+  <p:cSld>
+    <p:spTree>
+      <p:nvGrpSpPr>
+        <p:cNvPr id="1" name=""/>
+        <p:cNvGrpSpPr/>
+        <p:nvPr/>
+      </p:nvGrpSpPr>
+      <p:grpSpPr>
+        <a:xfrm>
+          <a:off x="0" y="0"/>
+          <a:ext cx="0" cy="0"/>
+          <a:chOff x="0" y="0"/>
+          <a:chExt cx="0" cy="0"/>
+        </a:xfrm>
+      </p:grpSpPr>
+      <p:sp>
+        <p:nvSpPr>
+          <p:cNvPr id="2" name="Folienbildplatzhalter 1"/>
+          <p:cNvSpPr>
+            <a:spLocks noGrp="1" noRot="1" noChangeAspect="1"/>
+          </p:cNvSpPr>
+          <p:nvPr>
+            <p:ph type="sldImg"/>
+          </p:nvPr>
+        </p:nvSpPr>
+        <p:spPr/>
+      </p:sp>
+      <p:sp>
+        <p:nvSpPr>
+          <p:cNvPr id="3" name="Notizenplatzhalter 2"/>
+          <p:cNvSpPr>
+            <a:spLocks noGrp="1"/>
+          </p:cNvSpPr>
+          <p:nvPr>
+            <p:ph type="body" idx="1"/>
+          </p:nvPr>
+        </p:nvSpPr>
+        <p:spPr/>
+        <p:txBody>
+          <a:bodyPr/>
+          <a:lstStyle/>
+          <a:p>
+            <a:endParaRPr lang="en-GB" dirty="0"/>
+          </a:p>
+        </p:txBody>
+      </p:sp>
+      <p:sp>
+        <p:nvSpPr>
+          <p:cNvPr id="4" name="Foliennummernplatzhalter 3"/>
+          <p:cNvSpPr>
+            <a:spLocks noGrp="1"/>
+          </p:cNvSpPr>
+          <p:nvPr>
+            <p:ph type="sldNum" sz="quarter" idx="10"/>
+          </p:nvPr>
+        </p:nvSpPr>
+        <p:spPr/>
+        <p:txBody>
+          <a:bodyPr/>
+          <a:lstStyle/>
+          <a:p>
+            <a:fld id="{748723F8-CD6B-45E3-B09A-75062809A4AE}" type="slidenum">
+              <a:rPr lang="en-GB" smtClean="0"/>
+              <a:t>6</a:t>
+            </a:fld>
+            <a:endParaRPr lang="en-GB"/>
+          </a:p>
+        </p:txBody>
+      </p:sp>
+    </p:spTree>
+    <p:extLst>
+      <p:ext uri="{BB962C8B-B14F-4D97-AF65-F5344CB8AC3E}">
+        <p14:creationId xmlns:p14="http://schemas.microsoft.com/office/powerpoint/2010/main" val="1800144089"/>
+      </p:ext>
+    </p:extLst>
+  </p:cSld>
+  <p:clrMapOvr>
+    <a:masterClrMapping/>
+  </p:clrMapOvr>
+</p:notes>
+</file>
+
+<file path=ppt/notesSlides/notesSlide3.xml><?xml version="1.0" encoding="utf-8"?>
+<p:notes xmlns:a="http://schemas.openxmlformats.org/drawingml/2006/main" xmlns:r="http://schemas.openxmlformats.org/officeDocument/2006/relationships" xmlns:p="http://schemas.openxmlformats.org/presentationml/2006/main">
+  <p:cSld>
+    <p:spTree>
+      <p:nvGrpSpPr>
+        <p:cNvPr id="1" name=""/>
+        <p:cNvGrpSpPr/>
+        <p:nvPr/>
+      </p:nvGrpSpPr>
+      <p:grpSpPr>
+        <a:xfrm>
+          <a:off x="0" y="0"/>
+          <a:ext cx="0" cy="0"/>
+          <a:chOff x="0" y="0"/>
+          <a:chExt cx="0" cy="0"/>
+        </a:xfrm>
+      </p:grpSpPr>
+      <p:sp>
+        <p:nvSpPr>
+          <p:cNvPr id="2" name="Folienbildplatzhalter 1"/>
+          <p:cNvSpPr>
+            <a:spLocks noGrp="1" noRot="1" noChangeAspect="1"/>
+          </p:cNvSpPr>
+          <p:nvPr>
+            <p:ph type="sldImg"/>
+          </p:nvPr>
+        </p:nvSpPr>
+        <p:spPr/>
+      </p:sp>
+      <p:sp>
+        <p:nvSpPr>
+          <p:cNvPr id="3" name="Notizenplatzhalter 2"/>
+          <p:cNvSpPr>
+            <a:spLocks noGrp="1"/>
+          </p:cNvSpPr>
+          <p:nvPr>
+            <p:ph type="body" idx="1"/>
+          </p:nvPr>
+        </p:nvSpPr>
+        <p:spPr/>
+        <p:txBody>
+          <a:bodyPr/>
+          <a:lstStyle/>
+          <a:p>
+            <a:r>
+              <a:rPr lang="en-GB" dirty="0"/>
+              <a:t>JUnit Test</a:t>
+            </a:r>
+          </a:p>
+          <a:p>
+            <a:pPr marL="171450" indent="-171450">
+              <a:buFontTx/>
+              <a:buChar char="-"/>
+            </a:pPr>
+            <a:r>
+              <a:rPr lang="en-GB" dirty="0"/>
+              <a:t>Test der </a:t>
+            </a:r>
+            <a:r>
+              <a:rPr lang="en-GB" dirty="0" err="1"/>
+              <a:t>Sortierungen</a:t>
+            </a:r>
+            <a:r>
+              <a:rPr lang="en-GB" dirty="0"/>
+              <a:t> -&gt; </a:t>
+            </a:r>
+            <a:r>
+              <a:rPr lang="en-GB" dirty="0" err="1"/>
+              <a:t>Distanz</a:t>
+            </a:r>
+            <a:r>
+              <a:rPr lang="en-GB" dirty="0"/>
+              <a:t>, Wetter, Status, </a:t>
+            </a:r>
+            <a:r>
+              <a:rPr lang="en-GB" dirty="0" err="1"/>
+              <a:t>Geöffneten</a:t>
+            </a:r>
+            <a:r>
+              <a:rPr lang="en-GB" dirty="0"/>
+              <a:t> </a:t>
+            </a:r>
+            <a:r>
+              <a:rPr lang="en-GB" dirty="0" err="1"/>
+              <a:t>Pisten</a:t>
+            </a:r>
+            <a:r>
+              <a:rPr lang="en-GB" dirty="0"/>
+              <a:t> und </a:t>
+            </a:r>
+            <a:r>
+              <a:rPr lang="en-GB" dirty="0" err="1"/>
+              <a:t>Lifte</a:t>
+            </a:r>
+            <a:endParaRPr lang="en-GB" dirty="0"/>
+          </a:p>
+          <a:p>
+            <a:pPr marL="171450" indent="-171450">
+              <a:buFontTx/>
+              <a:buChar char="-"/>
+            </a:pPr>
+            <a:r>
+              <a:rPr lang="en-GB" dirty="0" err="1"/>
+              <a:t>Serializierung</a:t>
+            </a:r>
+            <a:r>
+              <a:rPr lang="en-GB" dirty="0"/>
+              <a:t> und </a:t>
+            </a:r>
+            <a:r>
+              <a:rPr lang="en-GB" dirty="0" err="1"/>
+              <a:t>Deserializierung</a:t>
+            </a:r>
+            <a:r>
+              <a:rPr lang="en-GB" dirty="0"/>
+              <a:t> </a:t>
+            </a:r>
+            <a:r>
+              <a:rPr lang="en-GB" dirty="0" err="1"/>
+              <a:t>mittels</a:t>
+            </a:r>
+            <a:r>
+              <a:rPr lang="en-GB" dirty="0"/>
+              <a:t> </a:t>
+            </a:r>
+            <a:r>
+              <a:rPr lang="en-GB" dirty="0" err="1"/>
+              <a:t>GSon</a:t>
+            </a:r>
+            <a:r>
+              <a:rPr lang="en-GB" dirty="0"/>
+              <a:t>. </a:t>
+            </a:r>
+            <a:r>
+              <a:rPr lang="en-GB" dirty="0" err="1"/>
+              <a:t>Benötigt</a:t>
+            </a:r>
+            <a:r>
+              <a:rPr lang="en-GB" dirty="0"/>
+              <a:t> </a:t>
+            </a:r>
+            <a:r>
+              <a:rPr lang="en-GB" dirty="0" err="1"/>
+              <a:t>beim</a:t>
+            </a:r>
+            <a:r>
+              <a:rPr lang="en-GB" dirty="0"/>
+              <a:t> </a:t>
+            </a:r>
+            <a:r>
+              <a:rPr lang="en-GB" dirty="0" err="1"/>
+              <a:t>Empfangen</a:t>
+            </a:r>
+            <a:r>
+              <a:rPr lang="en-GB" dirty="0"/>
+              <a:t> von </a:t>
+            </a:r>
+            <a:r>
+              <a:rPr lang="en-GB" dirty="0" err="1"/>
+              <a:t>Daten</a:t>
+            </a:r>
+            <a:r>
+              <a:rPr lang="en-GB" dirty="0"/>
+              <a:t> der </a:t>
+            </a:r>
+            <a:r>
+              <a:rPr lang="en-GB" dirty="0" err="1"/>
+              <a:t>beiden</a:t>
+            </a:r>
+            <a:r>
+              <a:rPr lang="en-GB" dirty="0"/>
+              <a:t> API’s</a:t>
+            </a:r>
+          </a:p>
+          <a:p>
+            <a:pPr marL="0" indent="0">
+              <a:buFontTx/>
+              <a:buNone/>
+            </a:pPr>
+            <a:endParaRPr lang="en-GB" dirty="0"/>
+          </a:p>
+          <a:p>
+            <a:pPr marL="0" indent="0">
+              <a:buFontTx/>
+              <a:buNone/>
+            </a:pPr>
+            <a:r>
+              <a:rPr lang="en-GB" dirty="0"/>
+              <a:t>Code Coverage</a:t>
+            </a:r>
+          </a:p>
+          <a:p>
+            <a:pPr marL="171450" indent="-171450">
+              <a:buFontTx/>
+              <a:buChar char="-"/>
+            </a:pPr>
+            <a:r>
+              <a:rPr lang="en-GB" dirty="0" err="1"/>
+              <a:t>Aktuell</a:t>
+            </a:r>
+            <a:r>
+              <a:rPr lang="en-GB" dirty="0"/>
+              <a:t> </a:t>
+            </a:r>
+            <a:r>
+              <a:rPr lang="en-GB" dirty="0" err="1"/>
+              <a:t>bei</a:t>
+            </a:r>
+            <a:r>
+              <a:rPr lang="en-GB" dirty="0"/>
+              <a:t> ca 30%</a:t>
+            </a:r>
+          </a:p>
+          <a:p>
+            <a:pPr marL="171450" indent="-171450">
+              <a:buFontTx/>
+              <a:buChar char="-"/>
+            </a:pPr>
+            <a:endParaRPr lang="en-GB" dirty="0"/>
+          </a:p>
+          <a:p>
+            <a:pPr marL="0" indent="0">
+              <a:buFontTx/>
+              <a:buNone/>
+            </a:pPr>
+            <a:r>
+              <a:rPr lang="en-GB" dirty="0" err="1"/>
+              <a:t>SonarQube</a:t>
+            </a:r>
+            <a:endParaRPr lang="en-GB" dirty="0"/>
+          </a:p>
+          <a:p>
+            <a:pPr marL="171450" indent="-171450">
+              <a:buFontTx/>
+              <a:buChar char="-"/>
+            </a:pPr>
+            <a:r>
+              <a:rPr lang="en-GB" dirty="0" err="1"/>
+              <a:t>Einige</a:t>
+            </a:r>
+            <a:r>
+              <a:rPr lang="en-GB" dirty="0"/>
+              <a:t> </a:t>
+            </a:r>
+            <a:r>
+              <a:rPr lang="en-GB" dirty="0" err="1"/>
+              <a:t>Punkte</a:t>
+            </a:r>
+            <a:r>
+              <a:rPr lang="en-GB" dirty="0"/>
+              <a:t> </a:t>
+            </a:r>
+            <a:r>
+              <a:rPr lang="en-GB" dirty="0" err="1"/>
+              <a:t>können</a:t>
+            </a:r>
+            <a:r>
+              <a:rPr lang="en-GB" dirty="0"/>
+              <a:t> </a:t>
+            </a:r>
+            <a:r>
+              <a:rPr lang="en-GB" dirty="0" err="1"/>
+              <a:t>nicht</a:t>
+            </a:r>
+            <a:r>
+              <a:rPr lang="en-GB" dirty="0"/>
+              <a:t> </a:t>
+            </a:r>
+            <a:r>
+              <a:rPr lang="en-GB" dirty="0" err="1"/>
+              <a:t>gefixt</a:t>
+            </a:r>
+            <a:r>
+              <a:rPr lang="en-GB" dirty="0"/>
+              <a:t> warden</a:t>
+            </a:r>
+          </a:p>
+          <a:p>
+            <a:pPr marL="171450" indent="-171450">
+              <a:buFontTx/>
+              <a:buChar char="-"/>
+            </a:pPr>
+            <a:r>
+              <a:rPr lang="en-GB" dirty="0" err="1"/>
+              <a:t>Bsp</a:t>
+            </a:r>
+            <a:r>
+              <a:rPr lang="en-GB" dirty="0"/>
+              <a:t>: </a:t>
+            </a:r>
+            <a:r>
+              <a:rPr lang="en-GB" dirty="0" err="1"/>
+              <a:t>Enum</a:t>
+            </a:r>
+            <a:r>
+              <a:rPr lang="en-GB" dirty="0"/>
+              <a:t> </a:t>
+            </a:r>
+            <a:r>
+              <a:rPr lang="en-GB" dirty="0" err="1"/>
+              <a:t>müssen</a:t>
+            </a:r>
+            <a:r>
+              <a:rPr lang="en-GB" dirty="0"/>
+              <a:t> Gross </a:t>
+            </a:r>
+            <a:r>
+              <a:rPr lang="en-GB" dirty="0" err="1"/>
+              <a:t>geschriben</a:t>
+            </a:r>
+            <a:r>
+              <a:rPr lang="en-GB" dirty="0"/>
+              <a:t> warden, </a:t>
+            </a:r>
+            <a:r>
+              <a:rPr lang="en-GB" dirty="0" err="1"/>
+              <a:t>jedoch</a:t>
+            </a:r>
+            <a:r>
+              <a:rPr lang="en-GB" dirty="0"/>
+              <a:t> die API </a:t>
+            </a:r>
+            <a:r>
+              <a:rPr lang="en-GB" dirty="0" err="1"/>
+              <a:t>benutzt</a:t>
+            </a:r>
+            <a:r>
+              <a:rPr lang="en-GB" dirty="0"/>
+              <a:t> </a:t>
+            </a:r>
+            <a:r>
+              <a:rPr lang="en-GB" dirty="0" err="1"/>
+              <a:t>andere</a:t>
+            </a:r>
+            <a:r>
+              <a:rPr lang="en-GB" dirty="0"/>
+              <a:t> </a:t>
+            </a:r>
+            <a:r>
+              <a:rPr lang="en-GB" dirty="0" err="1"/>
+              <a:t>Schreibweise</a:t>
+            </a:r>
+            <a:r>
+              <a:rPr lang="en-GB" dirty="0"/>
+              <a:t> und </a:t>
+            </a:r>
+            <a:r>
+              <a:rPr lang="en-GB" dirty="0" err="1"/>
+              <a:t>währe</a:t>
+            </a:r>
+            <a:r>
+              <a:rPr lang="en-GB" dirty="0"/>
+              <a:t> </a:t>
+            </a:r>
+            <a:r>
+              <a:rPr lang="en-GB" dirty="0" err="1"/>
+              <a:t>somit</a:t>
+            </a:r>
+            <a:r>
+              <a:rPr lang="en-GB" dirty="0"/>
+              <a:t> </a:t>
+            </a:r>
+            <a:r>
+              <a:rPr lang="en-GB" dirty="0" err="1"/>
+              <a:t>nicht</a:t>
+            </a:r>
+            <a:r>
+              <a:rPr lang="en-GB" dirty="0"/>
+              <a:t> </a:t>
+            </a:r>
+            <a:r>
+              <a:rPr lang="en-GB" dirty="0" err="1"/>
+              <a:t>kompatibel</a:t>
+            </a:r>
+            <a:endParaRPr lang="en-GB" dirty="0"/>
+          </a:p>
+          <a:p>
+            <a:pPr marL="171450" indent="-171450">
+              <a:buFontTx/>
+              <a:buChar char="-"/>
+            </a:pPr>
+            <a:r>
+              <a:rPr lang="en-GB" dirty="0" err="1"/>
+              <a:t>Einige</a:t>
+            </a:r>
+            <a:r>
+              <a:rPr lang="en-GB" dirty="0"/>
+              <a:t> Android Klassen </a:t>
+            </a:r>
+            <a:r>
+              <a:rPr lang="en-GB" dirty="0" err="1"/>
+              <a:t>haben</a:t>
+            </a:r>
+            <a:r>
+              <a:rPr lang="en-GB" dirty="0"/>
+              <a:t> </a:t>
+            </a:r>
+            <a:r>
+              <a:rPr lang="en-GB" dirty="0" err="1"/>
+              <a:t>scho</a:t>
+            </a:r>
+            <a:r>
+              <a:rPr lang="en-GB" dirty="0"/>
+              <a:t> </a:t>
+            </a:r>
+            <a:r>
+              <a:rPr lang="en-GB" dirty="0" err="1"/>
+              <a:t>mehr</a:t>
+            </a:r>
+            <a:r>
+              <a:rPr lang="en-GB" dirty="0"/>
+              <a:t> </a:t>
+            </a:r>
+            <a:r>
+              <a:rPr lang="en-GB" dirty="0" err="1"/>
+              <a:t>als</a:t>
+            </a:r>
+            <a:r>
+              <a:rPr lang="en-GB" dirty="0"/>
+              <a:t> 5 </a:t>
+            </a:r>
+            <a:r>
+              <a:rPr lang="en-GB" dirty="0" err="1"/>
+              <a:t>Vererbungen</a:t>
+            </a:r>
+            <a:r>
+              <a:rPr lang="en-GB" dirty="0"/>
+              <a:t>.</a:t>
+            </a:r>
+          </a:p>
+          <a:p>
+            <a:pPr marL="0" indent="0">
+              <a:buFontTx/>
+              <a:buNone/>
+            </a:pPr>
+            <a:endParaRPr lang="en-GB" dirty="0"/>
+          </a:p>
+          <a:p>
+            <a:pPr marL="0" indent="0">
+              <a:buFontTx/>
+              <a:buNone/>
+            </a:pPr>
+            <a:r>
+              <a:rPr lang="en-GB" dirty="0"/>
+              <a:t>Monkey-Test</a:t>
+            </a:r>
+          </a:p>
+          <a:p>
+            <a:pPr marL="171450" indent="-171450">
+              <a:buFontTx/>
+              <a:buChar char="-"/>
+            </a:pPr>
+            <a:r>
+              <a:rPr lang="en-GB" dirty="0" err="1"/>
+              <a:t>Zum</a:t>
+            </a:r>
+            <a:r>
+              <a:rPr lang="en-GB" dirty="0"/>
+              <a:t> </a:t>
+            </a:r>
+            <a:r>
+              <a:rPr lang="en-GB" dirty="0" err="1"/>
+              <a:t>testen</a:t>
+            </a:r>
+            <a:r>
+              <a:rPr lang="en-GB" dirty="0"/>
+              <a:t> der </a:t>
+            </a:r>
+            <a:r>
+              <a:rPr lang="en-GB" dirty="0" err="1"/>
+              <a:t>Stabilität</a:t>
+            </a:r>
+            <a:r>
+              <a:rPr lang="en-GB" dirty="0"/>
+              <a:t>. In ADB (Android </a:t>
+            </a:r>
+            <a:r>
+              <a:rPr lang="en-GB" dirty="0" err="1"/>
+              <a:t>Debuging</a:t>
+            </a:r>
+            <a:r>
+              <a:rPr lang="en-GB" dirty="0"/>
+              <a:t> Bridge) </a:t>
+            </a:r>
+            <a:r>
+              <a:rPr lang="en-GB" dirty="0" err="1"/>
+              <a:t>integriert</a:t>
+            </a:r>
+            <a:r>
+              <a:rPr lang="en-GB" dirty="0"/>
+              <a:t>.</a:t>
+            </a:r>
+          </a:p>
+          <a:p>
+            <a:pPr marL="171450" indent="-171450">
+              <a:buFontTx/>
+              <a:buChar char="-"/>
+            </a:pPr>
+            <a:r>
+              <a:rPr lang="en-GB" dirty="0" err="1"/>
+              <a:t>Macht</a:t>
+            </a:r>
+            <a:r>
+              <a:rPr lang="en-GB" dirty="0"/>
+              <a:t> pseudo Random </a:t>
+            </a:r>
+            <a:r>
+              <a:rPr lang="en-GB" dirty="0" err="1"/>
+              <a:t>interaktionen</a:t>
+            </a:r>
+            <a:r>
+              <a:rPr lang="en-GB" dirty="0"/>
+              <a:t> </a:t>
+            </a:r>
+            <a:r>
+              <a:rPr lang="en-GB" dirty="0" err="1"/>
+              <a:t>mit</a:t>
+            </a:r>
+            <a:r>
+              <a:rPr lang="en-GB" dirty="0"/>
+              <a:t> </a:t>
+            </a:r>
+            <a:r>
+              <a:rPr lang="en-GB" dirty="0" err="1"/>
+              <a:t>dem</a:t>
+            </a:r>
+            <a:r>
+              <a:rPr lang="en-GB" dirty="0"/>
+              <a:t> Device. </a:t>
+            </a:r>
+            <a:r>
+              <a:rPr lang="en-GB" dirty="0" err="1"/>
+              <a:t>Würde</a:t>
+            </a:r>
+            <a:r>
+              <a:rPr lang="en-GB" dirty="0"/>
+              <a:t> </a:t>
+            </a:r>
+            <a:r>
+              <a:rPr lang="en-GB" dirty="0" err="1"/>
+              <a:t>vergessene</a:t>
+            </a:r>
+            <a:r>
+              <a:rPr lang="en-GB" dirty="0"/>
+              <a:t> </a:t>
+            </a:r>
+            <a:r>
+              <a:rPr lang="en-GB" dirty="0" err="1"/>
+              <a:t>Fälle</a:t>
+            </a:r>
+            <a:r>
+              <a:rPr lang="en-GB" dirty="0"/>
+              <a:t> </a:t>
+            </a:r>
+            <a:r>
+              <a:rPr lang="en-GB" dirty="0" err="1"/>
+              <a:t>mit</a:t>
+            </a:r>
+            <a:r>
+              <a:rPr lang="en-GB" dirty="0"/>
+              <a:t> grosser </a:t>
+            </a:r>
+            <a:r>
+              <a:rPr lang="en-GB" dirty="0" err="1"/>
+              <a:t>wahrscheindlichkeit</a:t>
+            </a:r>
+            <a:r>
+              <a:rPr lang="en-GB" dirty="0"/>
+              <a:t> </a:t>
+            </a:r>
+            <a:r>
+              <a:rPr lang="en-GB" dirty="0" err="1"/>
+              <a:t>entdecken</a:t>
+            </a:r>
+            <a:r>
+              <a:rPr lang="en-GB" dirty="0"/>
+              <a:t>.</a:t>
+            </a:r>
+          </a:p>
+        </p:txBody>
+      </p:sp>
+      <p:sp>
+        <p:nvSpPr>
+          <p:cNvPr id="4" name="Foliennummernplatzhalter 3"/>
+          <p:cNvSpPr>
+            <a:spLocks noGrp="1"/>
+          </p:cNvSpPr>
+          <p:nvPr>
+            <p:ph type="sldNum" sz="quarter" idx="10"/>
+          </p:nvPr>
+        </p:nvSpPr>
+        <p:spPr/>
+        <p:txBody>
+          <a:bodyPr/>
+          <a:lstStyle/>
+          <a:p>
+            <a:fld id="{748723F8-CD6B-45E3-B09A-75062809A4AE}" type="slidenum">
+              <a:rPr lang="en-GB" smtClean="0"/>
+              <a:t>9</a:t>
+            </a:fld>
+            <a:endParaRPr lang="en-GB"/>
+          </a:p>
+        </p:txBody>
+      </p:sp>
+    </p:spTree>
+    <p:extLst>
+      <p:ext uri="{BB962C8B-B14F-4D97-AF65-F5344CB8AC3E}">
+        <p14:creationId xmlns:p14="http://schemas.microsoft.com/office/powerpoint/2010/main" val="996191540"/>
+      </p:ext>
+    </p:extLst>
+  </p:cSld>
+  <p:clrMapOvr>
+    <a:masterClrMapping/>
+  </p:clrMapOvr>
+</p:notes>
+</file>
+
+<file path=ppt/notesSlides/notesSlide4.xml><?xml version="1.0" encoding="utf-8"?>
+<p:notes xmlns:a="http://schemas.openxmlformats.org/drawingml/2006/main" xmlns:r="http://schemas.openxmlformats.org/officeDocument/2006/relationships" xmlns:p="http://schemas.openxmlformats.org/presentationml/2006/main">
+  <p:cSld>
+    <p:spTree>
+      <p:nvGrpSpPr>
+        <p:cNvPr id="1" name=""/>
+        <p:cNvGrpSpPr/>
+        <p:nvPr/>
+      </p:nvGrpSpPr>
+      <p:grpSpPr>
+        <a:xfrm>
+          <a:off x="0" y="0"/>
+          <a:ext cx="0" cy="0"/>
+          <a:chOff x="0" y="0"/>
+          <a:chExt cx="0" cy="0"/>
+        </a:xfrm>
+      </p:grpSpPr>
+      <p:sp>
+        <p:nvSpPr>
+          <p:cNvPr id="2" name="Folienbildplatzhalter 1"/>
+          <p:cNvSpPr>
+            <a:spLocks noGrp="1" noRot="1" noChangeAspect="1"/>
+          </p:cNvSpPr>
+          <p:nvPr>
+            <p:ph type="sldImg"/>
+          </p:nvPr>
+        </p:nvSpPr>
+        <p:spPr/>
+      </p:sp>
+      <p:sp>
+        <p:nvSpPr>
+          <p:cNvPr id="3" name="Notizenplatzhalter 2"/>
+          <p:cNvSpPr>
+            <a:spLocks noGrp="1"/>
+          </p:cNvSpPr>
+          <p:nvPr>
+            <p:ph type="body" idx="1"/>
+          </p:nvPr>
+        </p:nvSpPr>
+        <p:spPr/>
+        <p:txBody>
+          <a:bodyPr/>
+          <a:lstStyle/>
+          <a:p>
+            <a:r>
+              <a:rPr lang="en-GB" dirty="0" err="1"/>
+              <a:t>Zusammenfassung</a:t>
+            </a:r>
+            <a:endParaRPr lang="en-GB" dirty="0"/>
+          </a:p>
+          <a:p>
+            <a:pPr marL="171450" indent="-171450">
+              <a:buFontTx/>
+              <a:buChar char="-"/>
+            </a:pPr>
+            <a:r>
+              <a:rPr lang="en-GB" dirty="0"/>
+              <a:t>Zu </a:t>
+            </a:r>
+            <a:r>
+              <a:rPr lang="en-GB" dirty="0" err="1"/>
+              <a:t>wenig</a:t>
+            </a:r>
+            <a:r>
+              <a:rPr lang="en-GB" dirty="0"/>
+              <a:t> </a:t>
+            </a:r>
+            <a:r>
+              <a:rPr lang="en-GB" dirty="0" err="1"/>
+              <a:t>zeit</a:t>
+            </a:r>
+            <a:r>
+              <a:rPr lang="en-GB" dirty="0"/>
+              <a:t> in in </a:t>
+            </a:r>
+            <a:r>
+              <a:rPr lang="en-GB" dirty="0" err="1"/>
+              <a:t>Projekten</a:t>
+            </a:r>
+            <a:r>
+              <a:rPr lang="en-GB" dirty="0"/>
+              <a:t> so </a:t>
+            </a:r>
+            <a:r>
+              <a:rPr lang="en-GB" dirty="0" err="1"/>
+              <a:t>üblich</a:t>
+            </a:r>
+            <a:r>
+              <a:rPr lang="en-GB" dirty="0"/>
+              <a:t> ;-)</a:t>
+            </a:r>
+          </a:p>
+          <a:p>
+            <a:pPr marL="171450" indent="-171450">
+              <a:buFontTx/>
+              <a:buChar char="-"/>
+            </a:pPr>
+            <a:r>
+              <a:rPr lang="en-GB" dirty="0"/>
+              <a:t>Android </a:t>
+            </a:r>
+            <a:r>
+              <a:rPr lang="en-GB" dirty="0" err="1"/>
+              <a:t>Umgebung</a:t>
+            </a:r>
+            <a:r>
+              <a:rPr lang="en-GB" dirty="0"/>
+              <a:t> </a:t>
+            </a:r>
+            <a:r>
+              <a:rPr lang="en-GB" dirty="0" err="1"/>
+              <a:t>besser</a:t>
+            </a:r>
+            <a:r>
+              <a:rPr lang="en-GB" dirty="0"/>
+              <a:t> </a:t>
+            </a:r>
+            <a:r>
+              <a:rPr lang="en-GB" dirty="0" err="1"/>
+              <a:t>kennengelern</a:t>
+            </a:r>
+            <a:r>
+              <a:rPr lang="en-GB" dirty="0"/>
+              <a:t>.</a:t>
+            </a:r>
+          </a:p>
+          <a:p>
+            <a:pPr marL="171450" indent="-171450">
+              <a:buFontTx/>
+              <a:buChar char="-"/>
+            </a:pPr>
+            <a:r>
+              <a:rPr lang="en-GB" dirty="0" err="1"/>
+              <a:t>Unzählige</a:t>
+            </a:r>
+            <a:r>
+              <a:rPr lang="en-GB" dirty="0"/>
+              <a:t> Tools und </a:t>
+            </a:r>
+            <a:r>
+              <a:rPr lang="en-GB" dirty="0" err="1"/>
+              <a:t>Bibliotheken</a:t>
+            </a:r>
+            <a:r>
+              <a:rPr lang="en-GB" dirty="0"/>
+              <a:t>. </a:t>
+            </a:r>
+            <a:r>
+              <a:rPr lang="en-GB" dirty="0" err="1"/>
+              <a:t>Für</a:t>
+            </a:r>
+            <a:r>
+              <a:rPr lang="en-GB" dirty="0"/>
+              <a:t> </a:t>
+            </a:r>
+            <a:r>
+              <a:rPr lang="en-GB" dirty="0" err="1"/>
+              <a:t>jede</a:t>
+            </a:r>
+            <a:r>
+              <a:rPr lang="en-GB" dirty="0"/>
+              <a:t> </a:t>
+            </a:r>
+            <a:r>
+              <a:rPr lang="en-GB" dirty="0" err="1"/>
+              <a:t>Frage</a:t>
+            </a:r>
+            <a:r>
+              <a:rPr lang="en-GB" dirty="0"/>
+              <a:t> </a:t>
+            </a:r>
+            <a:r>
+              <a:rPr lang="en-GB" dirty="0" err="1"/>
+              <a:t>gibt</a:t>
+            </a:r>
+            <a:r>
+              <a:rPr lang="en-GB" dirty="0"/>
+              <a:t> </a:t>
+            </a:r>
+            <a:r>
+              <a:rPr lang="en-GB" dirty="0" err="1"/>
+              <a:t>es</a:t>
+            </a:r>
+            <a:r>
+              <a:rPr lang="en-GB" dirty="0"/>
+              <a:t> </a:t>
+            </a:r>
+            <a:r>
+              <a:rPr lang="en-GB" dirty="0" err="1"/>
+              <a:t>meist</a:t>
+            </a:r>
+            <a:r>
+              <a:rPr lang="en-GB" dirty="0"/>
+              <a:t> </a:t>
+            </a:r>
+            <a:r>
+              <a:rPr lang="en-GB" dirty="0" err="1"/>
+              <a:t>schon</a:t>
+            </a:r>
+            <a:r>
+              <a:rPr lang="en-GB" dirty="0"/>
+              <a:t> </a:t>
+            </a:r>
+            <a:r>
+              <a:rPr lang="en-GB" dirty="0" err="1"/>
+              <a:t>eine</a:t>
+            </a:r>
+            <a:r>
+              <a:rPr lang="en-GB" dirty="0"/>
+              <a:t> API</a:t>
+            </a:r>
+          </a:p>
+          <a:p>
+            <a:pPr marL="171450" indent="-171450">
+              <a:buFontTx/>
+              <a:buChar char="-"/>
+            </a:pPr>
+            <a:r>
+              <a:rPr lang="en-GB" dirty="0" err="1"/>
+              <a:t>Mächtige</a:t>
+            </a:r>
+            <a:r>
+              <a:rPr lang="en-GB" dirty="0"/>
+              <a:t> </a:t>
+            </a:r>
+            <a:r>
+              <a:rPr lang="en-GB" dirty="0" err="1"/>
+              <a:t>Umgebung</a:t>
+            </a:r>
+            <a:r>
+              <a:rPr lang="en-GB" dirty="0"/>
+              <a:t> Firebase.</a:t>
+            </a:r>
+          </a:p>
+          <a:p>
+            <a:pPr marL="171450" indent="-171450">
+              <a:buFontTx/>
+              <a:buChar char="-"/>
+            </a:pPr>
+            <a:endParaRPr lang="en-GB" dirty="0"/>
+          </a:p>
+          <a:p>
+            <a:pPr marL="0" indent="0">
+              <a:buFontTx/>
+              <a:buNone/>
+            </a:pPr>
+            <a:r>
+              <a:rPr lang="en-GB" dirty="0" err="1"/>
+              <a:t>Zukünftig</a:t>
+            </a:r>
+            <a:r>
+              <a:rPr lang="en-GB" dirty="0"/>
+              <a:t> Work</a:t>
+            </a:r>
+          </a:p>
+          <a:p>
+            <a:pPr marL="171450" indent="-171450">
+              <a:buFontTx/>
+              <a:buChar char="-"/>
+            </a:pPr>
+            <a:r>
+              <a:rPr lang="en-GB" dirty="0"/>
+              <a:t>App </a:t>
+            </a:r>
+            <a:r>
+              <a:rPr lang="en-GB" dirty="0" err="1"/>
+              <a:t>mit</a:t>
+            </a:r>
+            <a:r>
+              <a:rPr lang="en-GB" dirty="0"/>
+              <a:t> </a:t>
+            </a:r>
+            <a:r>
+              <a:rPr lang="en-GB" dirty="0" err="1"/>
+              <a:t>Werbung</a:t>
+            </a:r>
+            <a:r>
+              <a:rPr lang="en-GB" dirty="0"/>
+              <a:t> </a:t>
+            </a:r>
+            <a:r>
+              <a:rPr lang="en-GB" dirty="0" err="1"/>
+              <a:t>versehen</a:t>
+            </a:r>
+            <a:r>
+              <a:rPr lang="en-GB" dirty="0"/>
+              <a:t>.</a:t>
+            </a:r>
+          </a:p>
+          <a:p>
+            <a:pPr marL="171450" indent="-171450">
+              <a:buFontTx/>
+              <a:buChar char="-"/>
+            </a:pPr>
+            <a:r>
+              <a:rPr lang="en-GB" dirty="0" err="1"/>
+              <a:t>Bezahlende</a:t>
+            </a:r>
+            <a:r>
+              <a:rPr lang="en-GB" dirty="0"/>
+              <a:t> </a:t>
+            </a:r>
+            <a:r>
+              <a:rPr lang="en-GB" dirty="0" err="1"/>
+              <a:t>Kunden</a:t>
+            </a:r>
+            <a:r>
+              <a:rPr lang="en-GB" dirty="0"/>
+              <a:t> (</a:t>
+            </a:r>
+            <a:r>
+              <a:rPr lang="en-GB" dirty="0" err="1"/>
+              <a:t>Skigebiete</a:t>
+            </a:r>
+            <a:r>
+              <a:rPr lang="en-GB" dirty="0"/>
+              <a:t>) warden </a:t>
+            </a:r>
+            <a:r>
+              <a:rPr lang="en-GB" dirty="0" err="1"/>
+              <a:t>Priorisiert</a:t>
+            </a:r>
+            <a:r>
+              <a:rPr lang="en-GB" dirty="0"/>
+              <a:t> </a:t>
+            </a:r>
+            <a:r>
+              <a:rPr lang="en-GB" dirty="0" err="1"/>
+              <a:t>angezeigt</a:t>
+            </a:r>
+            <a:endParaRPr lang="en-GB" dirty="0"/>
+          </a:p>
+          <a:p>
+            <a:pPr marL="171450" indent="-171450">
+              <a:buFontTx/>
+              <a:buChar char="-"/>
+            </a:pPr>
+            <a:r>
+              <a:rPr lang="en-GB" dirty="0" err="1"/>
+              <a:t>Filterfunktionen</a:t>
+            </a:r>
+            <a:r>
+              <a:rPr lang="en-GB" dirty="0"/>
+              <a:t> </a:t>
+            </a:r>
+            <a:r>
+              <a:rPr lang="en-GB" dirty="0" err="1"/>
+              <a:t>für</a:t>
+            </a:r>
+            <a:r>
+              <a:rPr lang="en-GB" dirty="0"/>
+              <a:t> </a:t>
+            </a:r>
+            <a:r>
+              <a:rPr lang="en-GB" dirty="0" err="1"/>
+              <a:t>benutzer</a:t>
+            </a:r>
+            <a:r>
+              <a:rPr lang="en-GB" dirty="0"/>
+              <a:t> </a:t>
+            </a:r>
+            <a:r>
+              <a:rPr lang="en-GB" dirty="0" err="1"/>
+              <a:t>einfügen</a:t>
+            </a:r>
+            <a:endParaRPr lang="en-GB" dirty="0"/>
+          </a:p>
+          <a:p>
+            <a:pPr marL="171450" indent="-171450">
+              <a:buFontTx/>
+              <a:buChar char="-"/>
+            </a:pPr>
+            <a:r>
+              <a:rPr lang="en-GB" dirty="0" err="1"/>
+              <a:t>Kostenpflichtige</a:t>
+            </a:r>
+            <a:r>
+              <a:rPr lang="en-GB" dirty="0"/>
+              <a:t> API </a:t>
+            </a:r>
+            <a:r>
+              <a:rPr lang="en-GB" dirty="0" err="1"/>
+              <a:t>einbinden</a:t>
+            </a:r>
+            <a:r>
+              <a:rPr lang="en-GB" dirty="0"/>
+              <a:t> -&gt; </a:t>
+            </a:r>
+            <a:r>
+              <a:rPr lang="en-GB" dirty="0" err="1"/>
+              <a:t>mehr</a:t>
+            </a:r>
+            <a:r>
+              <a:rPr lang="en-GB" dirty="0"/>
+              <a:t> </a:t>
+            </a:r>
+            <a:r>
+              <a:rPr lang="en-GB" dirty="0" err="1"/>
+              <a:t>Informationen</a:t>
+            </a:r>
+            <a:r>
+              <a:rPr lang="en-GB" dirty="0"/>
+              <a:t> und </a:t>
+            </a:r>
+            <a:r>
+              <a:rPr lang="en-GB" dirty="0" err="1"/>
+              <a:t>aktueller</a:t>
+            </a:r>
+            <a:endParaRPr lang="en-GB" dirty="0"/>
+          </a:p>
+          <a:p>
+            <a:pPr marL="171450" indent="-171450">
+              <a:buFontTx/>
+              <a:buChar char="-"/>
+            </a:pPr>
+            <a:endParaRPr lang="en-GB" dirty="0"/>
+          </a:p>
+        </p:txBody>
+      </p:sp>
+      <p:sp>
+        <p:nvSpPr>
+          <p:cNvPr id="4" name="Foliennummernplatzhalter 3"/>
+          <p:cNvSpPr>
+            <a:spLocks noGrp="1"/>
+          </p:cNvSpPr>
+          <p:nvPr>
+            <p:ph type="sldNum" sz="quarter" idx="10"/>
+          </p:nvPr>
+        </p:nvSpPr>
+        <p:spPr/>
+        <p:txBody>
+          <a:bodyPr/>
+          <a:lstStyle/>
+          <a:p>
+            <a:fld id="{748723F8-CD6B-45E3-B09A-75062809A4AE}" type="slidenum">
+              <a:rPr lang="en-GB" smtClean="0"/>
+              <a:t>10</a:t>
+            </a:fld>
+            <a:endParaRPr lang="en-GB"/>
+          </a:p>
+        </p:txBody>
+      </p:sp>
+    </p:spTree>
+    <p:extLst>
+      <p:ext uri="{BB962C8B-B14F-4D97-AF65-F5344CB8AC3E}">
+        <p14:creationId xmlns:p14="http://schemas.microsoft.com/office/powerpoint/2010/main" val="559276566"/>
+      </p:ext>
+    </p:extLst>
+  </p:cSld>
+  <p:clrMapOvr>
+    <a:masterClrMapping/>
+  </p:clrMapOvr>
+</p:notes>
 </file>
 
 <file path=ppt/slideLayouts/slideLayout1.xml><?xml version="1.0" encoding="utf-8"?>
@@ -248,7 +2247,7 @@
           <a:p>
             <a:fld id="{3A1252E9-4524-49D3-BD4A-3946534EE29A}" type="datetimeFigureOut">
               <a:rPr lang="de-CH" smtClean="0"/>
-              <a:t>11.11.2017</a:t>
+              <a:t>12.11.2017</a:t>
             </a:fld>
             <a:endParaRPr lang="de-CH"/>
           </a:p>
@@ -418,7 +2417,7 @@
           <a:p>
             <a:fld id="{3A1252E9-4524-49D3-BD4A-3946534EE29A}" type="datetimeFigureOut">
               <a:rPr lang="de-CH" smtClean="0"/>
-              <a:t>11.11.2017</a:t>
+              <a:t>12.11.2017</a:t>
             </a:fld>
             <a:endParaRPr lang="de-CH"/>
           </a:p>
@@ -598,7 +2597,7 @@
           <a:p>
             <a:fld id="{3A1252E9-4524-49D3-BD4A-3946534EE29A}" type="datetimeFigureOut">
               <a:rPr lang="de-CH" smtClean="0"/>
-              <a:t>11.11.2017</a:t>
+              <a:t>12.11.2017</a:t>
             </a:fld>
             <a:endParaRPr lang="de-CH"/>
           </a:p>
@@ -768,7 +2767,7 @@
           <a:p>
             <a:fld id="{3A1252E9-4524-49D3-BD4A-3946534EE29A}" type="datetimeFigureOut">
               <a:rPr lang="de-CH" smtClean="0"/>
-              <a:t>11.11.2017</a:t>
+              <a:t>12.11.2017</a:t>
             </a:fld>
             <a:endParaRPr lang="de-CH"/>
           </a:p>
@@ -1012,7 +3011,7 @@
           <a:p>
             <a:fld id="{3A1252E9-4524-49D3-BD4A-3946534EE29A}" type="datetimeFigureOut">
               <a:rPr lang="de-CH" smtClean="0"/>
-              <a:t>11.11.2017</a:t>
+              <a:t>12.11.2017</a:t>
             </a:fld>
             <a:endParaRPr lang="de-CH"/>
           </a:p>
@@ -1244,7 +3243,7 @@
           <a:p>
             <a:fld id="{3A1252E9-4524-49D3-BD4A-3946534EE29A}" type="datetimeFigureOut">
               <a:rPr lang="de-CH" smtClean="0"/>
-              <a:t>11.11.2017</a:t>
+              <a:t>12.11.2017</a:t>
             </a:fld>
             <a:endParaRPr lang="de-CH"/>
           </a:p>
@@ -1611,7 +3610,7 @@
           <a:p>
             <a:fld id="{3A1252E9-4524-49D3-BD4A-3946534EE29A}" type="datetimeFigureOut">
               <a:rPr lang="de-CH" smtClean="0"/>
-              <a:t>11.11.2017</a:t>
+              <a:t>12.11.2017</a:t>
             </a:fld>
             <a:endParaRPr lang="de-CH"/>
           </a:p>
@@ -1729,7 +3728,7 @@
           <a:p>
             <a:fld id="{3A1252E9-4524-49D3-BD4A-3946534EE29A}" type="datetimeFigureOut">
               <a:rPr lang="de-CH" smtClean="0"/>
-              <a:t>11.11.2017</a:t>
+              <a:t>12.11.2017</a:t>
             </a:fld>
             <a:endParaRPr lang="de-CH"/>
           </a:p>
@@ -1824,7 +3823,7 @@
           <a:p>
             <a:fld id="{3A1252E9-4524-49D3-BD4A-3946534EE29A}" type="datetimeFigureOut">
               <a:rPr lang="de-CH" smtClean="0"/>
-              <a:t>11.11.2017</a:t>
+              <a:t>12.11.2017</a:t>
             </a:fld>
             <a:endParaRPr lang="de-CH"/>
           </a:p>
@@ -2101,7 +4100,7 @@
           <a:p>
             <a:fld id="{3A1252E9-4524-49D3-BD4A-3946534EE29A}" type="datetimeFigureOut">
               <a:rPr lang="de-CH" smtClean="0"/>
-              <a:t>11.11.2017</a:t>
+              <a:t>12.11.2017</a:t>
             </a:fld>
             <a:endParaRPr lang="de-CH"/>
           </a:p>
@@ -2358,7 +4357,7 @@
           <a:p>
             <a:fld id="{3A1252E9-4524-49D3-BD4A-3946534EE29A}" type="datetimeFigureOut">
               <a:rPr lang="de-CH" smtClean="0"/>
-              <a:t>11.11.2017</a:t>
+              <a:t>12.11.2017</a:t>
             </a:fld>
             <a:endParaRPr lang="de-CH"/>
           </a:p>
@@ -2571,7 +4570,7 @@
           <a:p>
             <a:fld id="{3A1252E9-4524-49D3-BD4A-3946534EE29A}" type="datetimeFigureOut">
               <a:rPr lang="de-CH" smtClean="0"/>
-              <a:t>11.11.2017</a:t>
+              <a:t>12.11.2017</a:t>
             </a:fld>
             <a:endParaRPr lang="de-CH"/>
           </a:p>
@@ -2962,6 +4961,17 @@
 <file path=ppt/slides/slide1.xml><?xml version="1.0" encoding="utf-8"?>
 <p:sld xmlns:a="http://schemas.openxmlformats.org/drawingml/2006/main" xmlns:r="http://schemas.openxmlformats.org/officeDocument/2006/relationships" xmlns:p="http://schemas.openxmlformats.org/presentationml/2006/main">
   <p:cSld>
+    <p:bg>
+      <p:bgPr>
+        <a:solidFill>
+          <a:schemeClr val="bg1">
+            <a:lumMod val="95000"/>
+            <a:lumOff val="5000"/>
+          </a:schemeClr>
+        </a:solidFill>
+        <a:effectLst/>
+      </p:bgPr>
+    </p:bg>
     <p:spTree>
       <p:nvGrpSpPr>
         <p:cNvPr id="1" name=""/>
@@ -2976,6 +4986,92 @@
           <a:chExt cx="0" cy="0"/>
         </a:xfrm>
       </p:grpSpPr>
+      <p:pic>
+        <p:nvPicPr>
+          <p:cNvPr id="5" name="Grafik 4" descr="Ein Bild, das Schnee, draußen, Himmel, Berg enthält.&#10;&#10;Mit sehr hoher Zuverlässigkeit generierte Beschreibung">
+            <a:extLst>
+              <a:ext uri="{FF2B5EF4-FFF2-40B4-BE49-F238E27FC236}">
+                <a16:creationId xmlns:a16="http://schemas.microsoft.com/office/drawing/2014/main" id="{B66E483C-A877-4743-A335-C72152840786}"/>
+              </a:ext>
+            </a:extLst>
+          </p:cNvPr>
+          <p:cNvPicPr>
+            <a:picLocks noChangeAspect="1"/>
+          </p:cNvPicPr>
+          <p:nvPr/>
+        </p:nvPicPr>
+        <p:blipFill rotWithShape="1">
+          <a:blip r:embed="rId2">
+            <a:extLst>
+              <a:ext uri="{28A0092B-C50C-407E-A947-70E740481C1C}">
+                <a14:useLocalDpi xmlns:a14="http://schemas.microsoft.com/office/drawing/2010/main" val="0"/>
+              </a:ext>
+            </a:extLst>
+          </a:blip>
+          <a:srcRect t="21311" b="4340"/>
+          <a:stretch/>
+        </p:blipFill>
+        <p:spPr>
+          <a:xfrm>
+            <a:off x="20" y="10"/>
+            <a:ext cx="9143980" cy="4571990"/>
+          </a:xfrm>
+          <a:prstGeom prst="rect">
+            <a:avLst/>
+          </a:prstGeom>
+        </p:spPr>
+      </p:pic>
+      <p:cxnSp>
+        <p:nvCxnSpPr>
+          <p:cNvPr id="10" name="Straight Connector 9">
+            <a:extLst>
+              <a:ext uri="{FF2B5EF4-FFF2-40B4-BE49-F238E27FC236}">
+                <a16:creationId xmlns:a16="http://schemas.microsoft.com/office/drawing/2014/main" id="{E126E481-B945-4179-BD79-05E96E9B29E1}"/>
+              </a:ext>
+            </a:extLst>
+          </p:cNvPr>
+          <p:cNvCxnSpPr>
+            <a:cxnSpLocks noGrp="1" noRot="1" noChangeAspect="1" noMove="1" noResize="1" noEditPoints="1" noAdjustHandles="1" noChangeArrowheads="1" noChangeShapeType="1"/>
+          </p:cNvCxnSpPr>
+          <p:nvPr>
+            <p:extLst>
+              <p:ext uri="{386F3935-93C4-4BCD-93E2-E3B085C9AB24}">
+                <p16:designElem xmlns:p16="http://schemas.microsoft.com/office/powerpoint/2015/main" val="1"/>
+              </p:ext>
+            </p:extLst>
+          </p:nvPr>
+        </p:nvCxnSpPr>
+        <p:spPr>
+          <a:xfrm flipV="1">
+            <a:off x="6290132" y="5264106"/>
+            <a:ext cx="0" cy="914400"/>
+          </a:xfrm>
+          <a:prstGeom prst="line">
+            <a:avLst/>
+          </a:prstGeom>
+          <a:ln w="19050">
+            <a:solidFill>
+              <a:srgbClr val="FFFFFF">
+                <a:alpha val="80000"/>
+              </a:srgbClr>
+            </a:solidFill>
+          </a:ln>
+        </p:spPr>
+        <p:style>
+          <a:lnRef idx="1">
+            <a:schemeClr val="accent1"/>
+          </a:lnRef>
+          <a:fillRef idx="0">
+            <a:schemeClr val="accent1"/>
+          </a:fillRef>
+          <a:effectRef idx="0">
+            <a:schemeClr val="accent1"/>
+          </a:effectRef>
+          <a:fontRef idx="minor">
+            <a:schemeClr val="tx1"/>
+          </a:fontRef>
+        </p:style>
+      </p:cxnSp>
       <p:sp>
         <p:nvSpPr>
           <p:cNvPr id="2" name="Titel 1">
@@ -2994,16 +5090,19 @@
         </p:nvSpPr>
         <p:spPr>
           <a:xfrm>
-            <a:off x="685800" y="1122363"/>
-            <a:ext cx="7772400" cy="1655762"/>
+            <a:off x="324852" y="5091762"/>
+            <a:ext cx="5875644" cy="1264588"/>
           </a:xfrm>
         </p:spPr>
         <p:txBody>
-          <a:bodyPr/>
-          <a:lstStyle/>
-          <a:p>
-            <a:r>
-              <a:rPr lang="de-CH" dirty="0"/>
+          <a:bodyPr anchor="ctr">
+            <a:normAutofit/>
+          </a:bodyPr>
+          <a:lstStyle/>
+          <a:p>
+            <a:pPr algn="r"/>
+            <a:r>
+              <a:rPr lang="de-CH"/>
               <a:t>Ski-Compass</a:t>
             </a:r>
           </a:p>
@@ -3025,35 +5124,42 @@
             <p:ph type="subTitle" idx="1"/>
           </p:nvPr>
         </p:nvSpPr>
-        <p:spPr/>
-        <p:txBody>
-          <a:bodyPr/>
-          <a:lstStyle/>
-          <a:p>
-            <a:r>
-              <a:rPr lang="de-CH" dirty="0"/>
+        <p:spPr>
+          <a:xfrm>
+            <a:off x="6374330" y="5091763"/>
+            <a:ext cx="2230655" cy="1264587"/>
+          </a:xfrm>
+        </p:spPr>
+        <p:txBody>
+          <a:bodyPr anchor="ctr">
+            <a:normAutofit/>
+          </a:bodyPr>
+          <a:lstStyle/>
+          <a:p>
+            <a:pPr algn="l"/>
+            <a:r>
+              <a:rPr lang="de-CH" sz="1700" dirty="0"/>
               <a:t>Martin Messmer</a:t>
             </a:r>
           </a:p>
           <a:p>
-            <a:r>
-              <a:rPr lang="de-CH" dirty="0"/>
+            <a:pPr algn="l"/>
+            <a:r>
+              <a:rPr lang="de-CH" sz="1700" dirty="0"/>
               <a:t>Christian Schmid</a:t>
             </a:r>
           </a:p>
           <a:p>
-            <a:r>
-              <a:rPr lang="de-CH" dirty="0"/>
+            <a:pPr algn="l"/>
+            <a:r>
+              <a:rPr lang="de-CH" sz="1700" dirty="0"/>
               <a:t>Artan </a:t>
             </a:r>
             <a:r>
-              <a:rPr lang="de-CH" dirty="0" err="1"/>
+              <a:rPr lang="de-CH" sz="1700" dirty="0" err="1"/>
               <a:t>Papaja</a:t>
             </a:r>
-            <a:endParaRPr lang="de-CH" dirty="0"/>
-          </a:p>
-          <a:p>
-            <a:endParaRPr lang="de-CH" dirty="0"/>
+            <a:endParaRPr lang="de-CH" sz="1700" dirty="0"/>
           </a:p>
         </p:txBody>
       </p:sp>
@@ -3065,132 +5171,12 @@
     </p:extLst>
   </p:cSld>
   <p:clrMapOvr>
-    <a:masterClrMapping/>
+    <a:overrideClrMapping bg1="dk1" tx1="lt1" bg2="dk2" tx2="lt2" accent1="accent1" accent2="accent2" accent3="accent3" accent4="accent4" accent5="accent5" accent6="accent6" hlink="hlink" folHlink="folHlink"/>
   </p:clrMapOvr>
 </p:sld>
 </file>
 
 <file path=ppt/slides/slide10.xml><?xml version="1.0" encoding="utf-8"?>
-<p:sld xmlns:a="http://schemas.openxmlformats.org/drawingml/2006/main" xmlns:r="http://schemas.openxmlformats.org/officeDocument/2006/relationships" xmlns:p="http://schemas.openxmlformats.org/presentationml/2006/main">
-  <p:cSld>
-    <p:spTree>
-      <p:nvGrpSpPr>
-        <p:cNvPr id="1" name=""/>
-        <p:cNvGrpSpPr/>
-        <p:nvPr/>
-      </p:nvGrpSpPr>
-      <p:grpSpPr>
-        <a:xfrm>
-          <a:off x="0" y="0"/>
-          <a:ext cx="0" cy="0"/>
-          <a:chOff x="0" y="0"/>
-          <a:chExt cx="0" cy="0"/>
-        </a:xfrm>
-      </p:grpSpPr>
-      <p:sp>
-        <p:nvSpPr>
-          <p:cNvPr id="2" name="Titel 1">
-            <a:extLst>
-              <a:ext uri="{FF2B5EF4-FFF2-40B4-BE49-F238E27FC236}">
-                <a16:creationId xmlns:a16="http://schemas.microsoft.com/office/drawing/2014/main" id="{F5CDFFE4-D353-4E85-BC81-E89F9305F6A4}"/>
-              </a:ext>
-            </a:extLst>
-          </p:cNvPr>
-          <p:cNvSpPr>
-            <a:spLocks noGrp="1"/>
-          </p:cNvSpPr>
-          <p:nvPr>
-            <p:ph type="title"/>
-          </p:nvPr>
-        </p:nvSpPr>
-        <p:spPr/>
-        <p:txBody>
-          <a:bodyPr/>
-          <a:lstStyle/>
-          <a:p>
-            <a:r>
-              <a:rPr lang="en-GB" dirty="0"/>
-              <a:t>Evaluation / Testing</a:t>
-            </a:r>
-          </a:p>
-        </p:txBody>
-      </p:sp>
-      <p:sp>
-        <p:nvSpPr>
-          <p:cNvPr id="3" name="Inhaltsplatzhalter 2">
-            <a:extLst>
-              <a:ext uri="{FF2B5EF4-FFF2-40B4-BE49-F238E27FC236}">
-                <a16:creationId xmlns:a16="http://schemas.microsoft.com/office/drawing/2014/main" id="{86043A25-7E8D-4E6F-B9D9-CE9DBDAF2DC8}"/>
-              </a:ext>
-            </a:extLst>
-          </p:cNvPr>
-          <p:cNvSpPr>
-            <a:spLocks noGrp="1"/>
-          </p:cNvSpPr>
-          <p:nvPr>
-            <p:ph idx="1"/>
-          </p:nvPr>
-        </p:nvSpPr>
-        <p:spPr/>
-        <p:txBody>
-          <a:bodyPr/>
-          <a:lstStyle/>
-          <a:p>
-            <a:r>
-              <a:rPr lang="en-GB" dirty="0"/>
-              <a:t>JUnit Test</a:t>
-            </a:r>
-          </a:p>
-          <a:p>
-            <a:r>
-              <a:rPr lang="en-GB" dirty="0"/>
-              <a:t>Code Coverage </a:t>
-            </a:r>
-            <a:r>
-              <a:rPr lang="en-GB" dirty="0">
-                <a:solidFill>
-                  <a:srgbClr val="FF0000"/>
-                </a:solidFill>
-              </a:rPr>
-              <a:t>about 30 %</a:t>
-            </a:r>
-          </a:p>
-          <a:p>
-            <a:r>
-              <a:rPr lang="en-GB" dirty="0" err="1"/>
-              <a:t>SonarQube</a:t>
-            </a:r>
-            <a:endParaRPr lang="en-GB" dirty="0"/>
-          </a:p>
-          <a:p>
-            <a:pPr lvl="1"/>
-            <a:r>
-              <a:rPr lang="en-GB" dirty="0"/>
-              <a:t>Some points can not be fixed</a:t>
-            </a:r>
-          </a:p>
-          <a:p>
-            <a:r>
-              <a:rPr lang="en-GB" dirty="0"/>
-              <a:t>Monkey-Test with ADB</a:t>
-            </a:r>
-          </a:p>
-        </p:txBody>
-      </p:sp>
-    </p:spTree>
-    <p:extLst>
-      <p:ext uri="{BB962C8B-B14F-4D97-AF65-F5344CB8AC3E}">
-        <p14:creationId xmlns:p14="http://schemas.microsoft.com/office/powerpoint/2010/main" val="1742385124"/>
-      </p:ext>
-    </p:extLst>
-  </p:cSld>
-  <p:clrMapOvr>
-    <a:masterClrMapping/>
-  </p:clrMapOvr>
-</p:sld>
-</file>
-
-<file path=ppt/slides/slide11.xml><?xml version="1.0" encoding="utf-8"?>
 <p:sld xmlns:a="http://schemas.openxmlformats.org/drawingml/2006/main" xmlns:r="http://schemas.openxmlformats.org/officeDocument/2006/relationships" xmlns:p="http://schemas.openxmlformats.org/presentationml/2006/main">
   <p:cSld>
     <p:spTree>
@@ -3327,10 +5313,9 @@
           <a:lstStyle/>
           <a:p>
             <a:r>
-              <a:rPr lang="de-CH" dirty="0" err="1"/>
+              <a:rPr lang="en-GB" dirty="0"/>
               <a:t>Overview</a:t>
             </a:r>
-            <a:endParaRPr lang="de-CH" dirty="0"/>
           </a:p>
         </p:txBody>
       </p:sp>
@@ -3361,7 +5346,7 @@
             </a:pPr>
             <a:r>
               <a:rPr lang="en-GB" dirty="0"/>
-              <a:t>Motivation</a:t>
+              <a:t>Introduction</a:t>
             </a:r>
           </a:p>
           <a:p>
@@ -3371,7 +5356,7 @@
             </a:pPr>
             <a:r>
               <a:rPr lang="en-GB" dirty="0"/>
-              <a:t>Goal statement</a:t>
+              <a:t>Background</a:t>
             </a:r>
           </a:p>
           <a:p>
@@ -3381,7 +5366,7 @@
             </a:pPr>
             <a:r>
               <a:rPr lang="en-GB" dirty="0"/>
-              <a:t>Background</a:t>
+              <a:t>Design / Architecture</a:t>
             </a:r>
           </a:p>
           <a:p>
@@ -3391,7 +5376,7 @@
             </a:pPr>
             <a:r>
               <a:rPr lang="en-GB" dirty="0"/>
-              <a:t>Design / Architecture</a:t>
+              <a:t>Implementation</a:t>
             </a:r>
           </a:p>
           <a:p>
@@ -3401,7 +5386,7 @@
             </a:pPr>
             <a:r>
               <a:rPr lang="en-GB" dirty="0"/>
-              <a:t>Implementation</a:t>
+              <a:t>Evaluation / Testing</a:t>
             </a:r>
           </a:p>
           <a:p>
@@ -3411,21 +5396,40 @@
             </a:pPr>
             <a:r>
               <a:rPr lang="en-GB" dirty="0"/>
-              <a:t>Evaluation / Testing</a:t>
-            </a:r>
-          </a:p>
-          <a:p>
-            <a:pPr>
-              <a:buFontTx/>
-              <a:buChar char="-"/>
-            </a:pPr>
-            <a:r>
-              <a:rPr lang="en-GB" dirty="0"/>
               <a:t>Discussion</a:t>
             </a:r>
           </a:p>
         </p:txBody>
       </p:sp>
+      <p:pic>
+        <p:nvPicPr>
+          <p:cNvPr id="4" name="Grafik 3">
+            <a:extLst>
+              <a:ext uri="{FF2B5EF4-FFF2-40B4-BE49-F238E27FC236}">
+                <a16:creationId xmlns:a16="http://schemas.microsoft.com/office/drawing/2014/main" id="{A3D4565E-5FBC-491D-901F-24ECAB9104B6}"/>
+              </a:ext>
+            </a:extLst>
+          </p:cNvPr>
+          <p:cNvPicPr>
+            <a:picLocks noChangeAspect="1"/>
+          </p:cNvPicPr>
+          <p:nvPr/>
+        </p:nvPicPr>
+        <p:blipFill rotWithShape="1">
+          <a:blip r:embed="rId2"/>
+          <a:srcRect l="7592" t="3888" r="6417" b="1945"/>
+          <a:stretch/>
+        </p:blipFill>
+        <p:spPr>
+          <a:xfrm>
+            <a:off x="5172075" y="200025"/>
+            <a:ext cx="3190875" cy="6457950"/>
+          </a:xfrm>
+          <a:prstGeom prst="rect">
+            <a:avLst/>
+          </a:prstGeom>
+        </p:spPr>
+      </p:pic>
     </p:spTree>
     <p:extLst>
       <p:ext uri="{BB962C8B-B14F-4D97-AF65-F5344CB8AC3E}">
@@ -3478,8 +5482,8 @@
           <a:lstStyle/>
           <a:p>
             <a:r>
-              <a:rPr lang="de-CH" dirty="0"/>
-              <a:t>Motivation</a:t>
+              <a:rPr lang="en-GB" dirty="0"/>
+              <a:t>Introduction</a:t>
             </a:r>
           </a:p>
         </p:txBody>
@@ -3505,7 +5509,64 @@
           <a:bodyPr/>
           <a:lstStyle/>
           <a:p>
-            <a:endParaRPr lang="de-CH"/>
+            <a:r>
+              <a:rPr lang="de-CH" dirty="0"/>
+              <a:t>Motivation</a:t>
+            </a:r>
+          </a:p>
+          <a:p>
+            <a:pPr lvl="1"/>
+            <a:r>
+              <a:rPr lang="de-CH" dirty="0">
+                <a:solidFill>
+                  <a:srgbClr val="FF0000"/>
+                </a:solidFill>
+              </a:rPr>
+              <a:t>Grösste Motivation: -&gt; Gute Note ;-)</a:t>
+            </a:r>
+          </a:p>
+          <a:p>
+            <a:pPr lvl="1"/>
+            <a:r>
+              <a:rPr lang="de-CH" dirty="0" err="1">
+                <a:solidFill>
+                  <a:srgbClr val="FF0000"/>
+                </a:solidFill>
+              </a:rPr>
+              <a:t>asdfasdf</a:t>
+            </a:r>
+            <a:endParaRPr lang="de-CH" dirty="0">
+              <a:solidFill>
+                <a:srgbClr val="FF0000"/>
+              </a:solidFill>
+            </a:endParaRPr>
+          </a:p>
+          <a:p>
+            <a:r>
+              <a:rPr lang="de-CH" dirty="0"/>
+              <a:t>Goal </a:t>
+            </a:r>
+            <a:r>
+              <a:rPr lang="de-CH" dirty="0" err="1"/>
+              <a:t>statement</a:t>
+            </a:r>
+            <a:endParaRPr lang="de-CH" dirty="0"/>
+          </a:p>
+          <a:p>
+            <a:pPr lvl="1"/>
+            <a:r>
+              <a:rPr lang="de-CH" dirty="0" err="1">
+                <a:solidFill>
+                  <a:srgbClr val="FF0000"/>
+                </a:solidFill>
+              </a:rPr>
+              <a:t>asdfasdf</a:t>
+            </a:r>
+            <a:endParaRPr lang="de-CH" dirty="0">
+              <a:solidFill>
+                <a:srgbClr val="FF0000"/>
+              </a:solidFill>
+            </a:endParaRPr>
           </a:p>
         </p:txBody>
       </p:sp>
@@ -3544,7 +5605,7 @@
           <p:cNvPr id="2" name="Titel 1">
             <a:extLst>
               <a:ext uri="{FF2B5EF4-FFF2-40B4-BE49-F238E27FC236}">
-                <a16:creationId xmlns:a16="http://schemas.microsoft.com/office/drawing/2014/main" id="{8B9B91AF-9593-4D16-885B-06933DE0829A}"/>
+                <a16:creationId xmlns:a16="http://schemas.microsoft.com/office/drawing/2014/main" id="{C904DA1B-0C42-4228-9F13-CDA815BD8764}"/>
               </a:ext>
             </a:extLst>
           </p:cNvPr>
@@ -3562,7 +5623,7 @@
           <a:p>
             <a:r>
               <a:rPr lang="de-CH" dirty="0"/>
-              <a:t>Goal Statement</a:t>
+              <a:t>Background</a:t>
             </a:r>
           </a:p>
         </p:txBody>
@@ -3572,7 +5633,7 @@
           <p:cNvPr id="3" name="Inhaltsplatzhalter 2">
             <a:extLst>
               <a:ext uri="{FF2B5EF4-FFF2-40B4-BE49-F238E27FC236}">
-                <a16:creationId xmlns:a16="http://schemas.microsoft.com/office/drawing/2014/main" id="{AC2E7E71-09C0-48BA-B617-E8A1ED9966DE}"/>
+                <a16:creationId xmlns:a16="http://schemas.microsoft.com/office/drawing/2014/main" id="{4B7A4F98-D95B-4E5A-9326-E99269241A12}"/>
               </a:ext>
             </a:extLst>
           </p:cNvPr>
@@ -3588,14 +5649,14 @@
           <a:bodyPr/>
           <a:lstStyle/>
           <a:p>
-            <a:endParaRPr lang="de-CH"/>
+            <a:endParaRPr lang="de-CH" dirty="0"/>
           </a:p>
         </p:txBody>
       </p:sp>
     </p:spTree>
     <p:extLst>
       <p:ext uri="{BB962C8B-B14F-4D97-AF65-F5344CB8AC3E}">
-        <p14:creationId xmlns:p14="http://schemas.microsoft.com/office/powerpoint/2010/main" val="688758223"/>
+        <p14:creationId xmlns:p14="http://schemas.microsoft.com/office/powerpoint/2010/main" val="2854133854"/>
       </p:ext>
     </p:extLst>
   </p:cSld>
@@ -3627,7 +5688,7 @@
           <p:cNvPr id="2" name="Titel 1">
             <a:extLst>
               <a:ext uri="{FF2B5EF4-FFF2-40B4-BE49-F238E27FC236}">
-                <a16:creationId xmlns:a16="http://schemas.microsoft.com/office/drawing/2014/main" id="{C904DA1B-0C42-4228-9F13-CDA815BD8764}"/>
+                <a16:creationId xmlns:a16="http://schemas.microsoft.com/office/drawing/2014/main" id="{3D4823C5-B211-4AAE-BBCC-F96361A2ADA1}"/>
               </a:ext>
             </a:extLst>
           </p:cNvPr>
@@ -3644,8 +5705,12 @@
           <a:lstStyle/>
           <a:p>
             <a:r>
+              <a:rPr lang="de-CH" dirty="0" err="1"/>
+              <a:t>Existing</a:t>
+            </a:r>
+            <a:r>
               <a:rPr lang="de-CH" dirty="0"/>
-              <a:t>Background</a:t>
+              <a:t> Apps</a:t>
             </a:r>
           </a:p>
         </p:txBody>
@@ -3655,7 +5720,7 @@
           <p:cNvPr id="3" name="Inhaltsplatzhalter 2">
             <a:extLst>
               <a:ext uri="{FF2B5EF4-FFF2-40B4-BE49-F238E27FC236}">
-                <a16:creationId xmlns:a16="http://schemas.microsoft.com/office/drawing/2014/main" id="{4B7A4F98-D95B-4E5A-9326-E99269241A12}"/>
+                <a16:creationId xmlns:a16="http://schemas.microsoft.com/office/drawing/2014/main" id="{47E3DF17-BC6E-4A05-B688-7FCD31C19901}"/>
               </a:ext>
             </a:extLst>
           </p:cNvPr>
@@ -3666,87 +5731,636 @@
             <p:ph idx="1"/>
           </p:nvPr>
         </p:nvSpPr>
-        <p:spPr/>
+        <p:spPr>
+          <a:xfrm>
+            <a:off x="628650" y="1825625"/>
+            <a:ext cx="4738239" cy="4351338"/>
+          </a:xfrm>
+        </p:spPr>
         <p:txBody>
           <a:bodyPr/>
           <a:lstStyle/>
           <a:p>
             <a:r>
+              <a:rPr lang="de-CH" dirty="0"/>
+              <a:t>Official App </a:t>
+            </a:r>
+            <a:r>
               <a:rPr lang="de-CH" dirty="0" err="1"/>
-              <a:t>Firebase</a:t>
+              <a:t>from</a:t>
+            </a:r>
+            <a:r>
+              <a:rPr lang="de-CH" dirty="0"/>
+              <a:t> Ski-Resorts</a:t>
+            </a:r>
+          </a:p>
+          <a:p>
+            <a:r>
+              <a:rPr lang="de-CH" dirty="0" err="1"/>
+              <a:t>iSKI</a:t>
+            </a:r>
+            <a:r>
+              <a:rPr lang="de-CH" dirty="0"/>
+              <a:t> (Swiss, France, Italia, …)</a:t>
+            </a:r>
+          </a:p>
+          <a:p>
+            <a:r>
+              <a:rPr lang="de-CH" dirty="0"/>
+              <a:t>Bergfex</a:t>
+            </a:r>
+          </a:p>
+          <a:p>
+            <a:r>
+              <a:rPr lang="de-CH" dirty="0" err="1"/>
+              <a:t>Skiinfo</a:t>
             </a:r>
             <a:endParaRPr lang="de-CH" dirty="0"/>
           </a:p>
           <a:p>
-            <a:pPr lvl="1"/>
-            <a:r>
-              <a:rPr lang="de-CH" dirty="0" err="1"/>
-              <a:t>Geofire</a:t>
-            </a:r>
+            <a:r>
+              <a:rPr lang="de-CH" dirty="0"/>
+              <a:t>Skiresort.de</a:t>
+            </a:r>
+          </a:p>
+          <a:p>
             <a:endParaRPr lang="de-CH" dirty="0"/>
           </a:p>
-          <a:p>
-            <a:r>
-              <a:rPr lang="de-CH" dirty="0"/>
-              <a:t>External API</a:t>
-            </a:r>
-          </a:p>
-          <a:p>
-            <a:pPr lvl="1"/>
-            <a:r>
-              <a:rPr lang="de-CH" dirty="0"/>
-              <a:t>Skimap.org</a:t>
-            </a:r>
-          </a:p>
-          <a:p>
-            <a:pPr lvl="1"/>
-            <a:r>
-              <a:rPr lang="de-CH" dirty="0"/>
-              <a:t>OpenWeatherMap.org</a:t>
-            </a:r>
-          </a:p>
-          <a:p>
-            <a:r>
-              <a:rPr lang="en-GB" dirty="0"/>
-              <a:t>Server</a:t>
-            </a:r>
-            <a:r>
-              <a:rPr lang="de-CH" dirty="0"/>
-              <a:t> Programm</a:t>
-            </a:r>
-          </a:p>
-          <a:p>
-            <a:pPr lvl="1"/>
-            <a:r>
-              <a:rPr lang="de-CH" dirty="0"/>
-              <a:t>Java </a:t>
-            </a:r>
-            <a:r>
-              <a:rPr lang="de-CH" dirty="0" err="1"/>
-              <a:t>Application</a:t>
-            </a:r>
-            <a:endParaRPr lang="de-CH" dirty="0"/>
-          </a:p>
-          <a:p>
-            <a:pPr lvl="1"/>
-            <a:r>
-              <a:rPr lang="de-CH" dirty="0" err="1"/>
-              <a:t>Gson</a:t>
-            </a:r>
-            <a:endParaRPr lang="de-CH" dirty="0"/>
-          </a:p>
-        </p:txBody>
-      </p:sp>
+        </p:txBody>
+      </p:sp>
+      <p:pic>
+        <p:nvPicPr>
+          <p:cNvPr id="4" name="Grafik 3">
+            <a:extLst>
+              <a:ext uri="{FF2B5EF4-FFF2-40B4-BE49-F238E27FC236}">
+                <a16:creationId xmlns:a16="http://schemas.microsoft.com/office/drawing/2014/main" id="{FB18EC73-34C7-4153-92A4-C2C2F6471039}"/>
+              </a:ext>
+            </a:extLst>
+          </p:cNvPr>
+          <p:cNvPicPr>
+            <a:picLocks noChangeAspect="1"/>
+          </p:cNvPicPr>
+          <p:nvPr/>
+        </p:nvPicPr>
+        <p:blipFill>
+          <a:blip r:embed="rId3"/>
+          <a:stretch>
+            <a:fillRect/>
+          </a:stretch>
+        </p:blipFill>
+        <p:spPr>
+          <a:xfrm>
+            <a:off x="5921830" y="1710079"/>
+            <a:ext cx="1986273" cy="3670383"/>
+          </a:xfrm>
+          <a:prstGeom prst="rect">
+            <a:avLst/>
+          </a:prstGeom>
+        </p:spPr>
+      </p:pic>
+      <p:pic>
+        <p:nvPicPr>
+          <p:cNvPr id="5" name="Grafik 4">
+            <a:extLst>
+              <a:ext uri="{FF2B5EF4-FFF2-40B4-BE49-F238E27FC236}">
+                <a16:creationId xmlns:a16="http://schemas.microsoft.com/office/drawing/2014/main" id="{06C549AB-23C2-43ED-9BBD-2D8FDCEBE436}"/>
+              </a:ext>
+            </a:extLst>
+          </p:cNvPr>
+          <p:cNvPicPr>
+            <a:picLocks noChangeAspect="1"/>
+          </p:cNvPicPr>
+          <p:nvPr/>
+        </p:nvPicPr>
+        <p:blipFill>
+          <a:blip r:embed="rId4"/>
+          <a:stretch>
+            <a:fillRect/>
+          </a:stretch>
+        </p:blipFill>
+        <p:spPr>
+          <a:xfrm>
+            <a:off x="5921830" y="1777787"/>
+            <a:ext cx="1986273" cy="3534965"/>
+          </a:xfrm>
+          <a:prstGeom prst="rect">
+            <a:avLst/>
+          </a:prstGeom>
+        </p:spPr>
+      </p:pic>
+      <p:pic>
+        <p:nvPicPr>
+          <p:cNvPr id="6" name="Grafik 5">
+            <a:extLst>
+              <a:ext uri="{FF2B5EF4-FFF2-40B4-BE49-F238E27FC236}">
+                <a16:creationId xmlns:a16="http://schemas.microsoft.com/office/drawing/2014/main" id="{5EED2D18-C634-494E-BC34-E9732B87755D}"/>
+              </a:ext>
+            </a:extLst>
+          </p:cNvPr>
+          <p:cNvPicPr>
+            <a:picLocks noChangeAspect="1"/>
+          </p:cNvPicPr>
+          <p:nvPr/>
+        </p:nvPicPr>
+        <p:blipFill>
+          <a:blip r:embed="rId5"/>
+          <a:stretch>
+            <a:fillRect/>
+          </a:stretch>
+        </p:blipFill>
+        <p:spPr>
+          <a:xfrm>
+            <a:off x="5776687" y="1333441"/>
+            <a:ext cx="2351314" cy="4047021"/>
+          </a:xfrm>
+          <a:prstGeom prst="rect">
+            <a:avLst/>
+          </a:prstGeom>
+        </p:spPr>
+      </p:pic>
+      <p:pic>
+        <p:nvPicPr>
+          <p:cNvPr id="7" name="Grafik 6">
+            <a:extLst>
+              <a:ext uri="{FF2B5EF4-FFF2-40B4-BE49-F238E27FC236}">
+                <a16:creationId xmlns:a16="http://schemas.microsoft.com/office/drawing/2014/main" id="{8CCEC301-ED56-41F9-AC31-9C995F023BBF}"/>
+              </a:ext>
+            </a:extLst>
+          </p:cNvPr>
+          <p:cNvPicPr>
+            <a:picLocks noChangeAspect="1"/>
+          </p:cNvPicPr>
+          <p:nvPr/>
+        </p:nvPicPr>
+        <p:blipFill>
+          <a:blip r:embed="rId6"/>
+          <a:stretch>
+            <a:fillRect/>
+          </a:stretch>
+        </p:blipFill>
+        <p:spPr>
+          <a:xfrm>
+            <a:off x="5776688" y="1333441"/>
+            <a:ext cx="2351314" cy="4176742"/>
+          </a:xfrm>
+          <a:prstGeom prst="rect">
+            <a:avLst/>
+          </a:prstGeom>
+        </p:spPr>
+      </p:pic>
+      <p:pic>
+        <p:nvPicPr>
+          <p:cNvPr id="8" name="Grafik 7">
+            <a:extLst>
+              <a:ext uri="{FF2B5EF4-FFF2-40B4-BE49-F238E27FC236}">
+                <a16:creationId xmlns:a16="http://schemas.microsoft.com/office/drawing/2014/main" id="{741DDE8B-5B6C-4339-9913-19534188912F}"/>
+              </a:ext>
+            </a:extLst>
+          </p:cNvPr>
+          <p:cNvPicPr>
+            <a:picLocks noChangeAspect="1"/>
+          </p:cNvPicPr>
+          <p:nvPr/>
+        </p:nvPicPr>
+        <p:blipFill>
+          <a:blip r:embed="rId7"/>
+          <a:stretch>
+            <a:fillRect/>
+          </a:stretch>
+        </p:blipFill>
+        <p:spPr>
+          <a:xfrm>
+            <a:off x="5671691" y="1333441"/>
+            <a:ext cx="2456310" cy="4176742"/>
+          </a:xfrm>
+          <a:prstGeom prst="rect">
+            <a:avLst/>
+          </a:prstGeom>
+        </p:spPr>
+      </p:pic>
     </p:spTree>
     <p:extLst>
       <p:ext uri="{BB962C8B-B14F-4D97-AF65-F5344CB8AC3E}">
-        <p14:creationId xmlns:p14="http://schemas.microsoft.com/office/powerpoint/2010/main" val="2854133854"/>
+        <p14:creationId xmlns:p14="http://schemas.microsoft.com/office/powerpoint/2010/main" val="3365552931"/>
       </p:ext>
     </p:extLst>
   </p:cSld>
   <p:clrMapOvr>
     <a:masterClrMapping/>
   </p:clrMapOvr>
+  <p:timing>
+    <p:tnLst>
+      <p:par>
+        <p:cTn id="1" dur="indefinite" restart="never" nodeType="tmRoot">
+          <p:childTnLst>
+            <p:seq concurrent="1" nextAc="seek">
+              <p:cTn id="2" dur="indefinite" nodeType="mainSeq">
+                <p:childTnLst>
+                  <p:par>
+                    <p:cTn id="3" fill="hold">
+                      <p:stCondLst>
+                        <p:cond delay="indefinite"/>
+                      </p:stCondLst>
+                      <p:childTnLst>
+                        <p:par>
+                          <p:cTn id="4" fill="hold">
+                            <p:stCondLst>
+                              <p:cond delay="0"/>
+                            </p:stCondLst>
+                            <p:childTnLst>
+                              <p:par>
+                                <p:cTn id="5" presetID="1" presetClass="entr" presetSubtype="0" fill="hold" grpId="0" nodeType="clickEffect">
+                                  <p:stCondLst>
+                                    <p:cond delay="0"/>
+                                  </p:stCondLst>
+                                  <p:childTnLst>
+                                    <p:set>
+                                      <p:cBhvr>
+                                        <p:cTn id="6" dur="1" fill="hold">
+                                          <p:stCondLst>
+                                            <p:cond delay="0"/>
+                                          </p:stCondLst>
+                                        </p:cTn>
+                                        <p:tgtEl>
+                                          <p:spTgt spid="3">
+                                            <p:txEl>
+                                              <p:pRg st="0" end="0"/>
+                                            </p:txEl>
+                                          </p:spTgt>
+                                        </p:tgtEl>
+                                        <p:attrNameLst>
+                                          <p:attrName>style.visibility</p:attrName>
+                                        </p:attrNameLst>
+                                      </p:cBhvr>
+                                      <p:to>
+                                        <p:strVal val="visible"/>
+                                      </p:to>
+                                    </p:set>
+                                  </p:childTnLst>
+                                </p:cTn>
+                              </p:par>
+                              <p:par>
+                                <p:cTn id="7" presetID="1" presetClass="entr" presetSubtype="0" fill="hold" nodeType="withEffect">
+                                  <p:stCondLst>
+                                    <p:cond delay="0"/>
+                                  </p:stCondLst>
+                                  <p:childTnLst>
+                                    <p:set>
+                                      <p:cBhvr>
+                                        <p:cTn id="8" dur="1" fill="hold">
+                                          <p:stCondLst>
+                                            <p:cond delay="0"/>
+                                          </p:stCondLst>
+                                        </p:cTn>
+                                        <p:tgtEl>
+                                          <p:spTgt spid="4"/>
+                                        </p:tgtEl>
+                                        <p:attrNameLst>
+                                          <p:attrName>style.visibility</p:attrName>
+                                        </p:attrNameLst>
+                                      </p:cBhvr>
+                                      <p:to>
+                                        <p:strVal val="visible"/>
+                                      </p:to>
+                                    </p:set>
+                                  </p:childTnLst>
+                                </p:cTn>
+                              </p:par>
+                            </p:childTnLst>
+                          </p:cTn>
+                        </p:par>
+                      </p:childTnLst>
+                    </p:cTn>
+                  </p:par>
+                  <p:par>
+                    <p:cTn id="9" fill="hold">
+                      <p:stCondLst>
+                        <p:cond delay="indefinite"/>
+                      </p:stCondLst>
+                      <p:childTnLst>
+                        <p:par>
+                          <p:cTn id="10" fill="hold">
+                            <p:stCondLst>
+                              <p:cond delay="0"/>
+                            </p:stCondLst>
+                            <p:childTnLst>
+                              <p:par>
+                                <p:cTn id="11" presetID="1" presetClass="entr" presetSubtype="0" fill="hold" grpId="0" nodeType="clickEffect">
+                                  <p:stCondLst>
+                                    <p:cond delay="0"/>
+                                  </p:stCondLst>
+                                  <p:childTnLst>
+                                    <p:set>
+                                      <p:cBhvr>
+                                        <p:cTn id="12" dur="1" fill="hold">
+                                          <p:stCondLst>
+                                            <p:cond delay="0"/>
+                                          </p:stCondLst>
+                                        </p:cTn>
+                                        <p:tgtEl>
+                                          <p:spTgt spid="3">
+                                            <p:txEl>
+                                              <p:pRg st="1" end="1"/>
+                                            </p:txEl>
+                                          </p:spTgt>
+                                        </p:tgtEl>
+                                        <p:attrNameLst>
+                                          <p:attrName>style.visibility</p:attrName>
+                                        </p:attrNameLst>
+                                      </p:cBhvr>
+                                      <p:to>
+                                        <p:strVal val="visible"/>
+                                      </p:to>
+                                    </p:set>
+                                  </p:childTnLst>
+                                </p:cTn>
+                              </p:par>
+                              <p:par>
+                                <p:cTn id="13" presetID="1" presetClass="entr" presetSubtype="0" fill="hold" nodeType="withEffect">
+                                  <p:stCondLst>
+                                    <p:cond delay="0"/>
+                                  </p:stCondLst>
+                                  <p:childTnLst>
+                                    <p:set>
+                                      <p:cBhvr>
+                                        <p:cTn id="14" dur="1" fill="hold">
+                                          <p:stCondLst>
+                                            <p:cond delay="0"/>
+                                          </p:stCondLst>
+                                        </p:cTn>
+                                        <p:tgtEl>
+                                          <p:spTgt spid="5"/>
+                                        </p:tgtEl>
+                                        <p:attrNameLst>
+                                          <p:attrName>style.visibility</p:attrName>
+                                        </p:attrNameLst>
+                                      </p:cBhvr>
+                                      <p:to>
+                                        <p:strVal val="visible"/>
+                                      </p:to>
+                                    </p:set>
+                                  </p:childTnLst>
+                                </p:cTn>
+                              </p:par>
+                            </p:childTnLst>
+                          </p:cTn>
+                        </p:par>
+                      </p:childTnLst>
+                    </p:cTn>
+                  </p:par>
+                  <p:par>
+                    <p:cTn id="15" fill="hold">
+                      <p:stCondLst>
+                        <p:cond delay="indefinite"/>
+                      </p:stCondLst>
+                      <p:childTnLst>
+                        <p:par>
+                          <p:cTn id="16" fill="hold">
+                            <p:stCondLst>
+                              <p:cond delay="0"/>
+                            </p:stCondLst>
+                            <p:childTnLst>
+                              <p:par>
+                                <p:cTn id="17" presetID="1" presetClass="entr" presetSubtype="0" fill="hold" grpId="0" nodeType="clickEffect">
+                                  <p:stCondLst>
+                                    <p:cond delay="0"/>
+                                  </p:stCondLst>
+                                  <p:childTnLst>
+                                    <p:set>
+                                      <p:cBhvr>
+                                        <p:cTn id="18" dur="1" fill="hold">
+                                          <p:stCondLst>
+                                            <p:cond delay="0"/>
+                                          </p:stCondLst>
+                                        </p:cTn>
+                                        <p:tgtEl>
+                                          <p:spTgt spid="3">
+                                            <p:txEl>
+                                              <p:pRg st="2" end="2"/>
+                                            </p:txEl>
+                                          </p:spTgt>
+                                        </p:tgtEl>
+                                        <p:attrNameLst>
+                                          <p:attrName>style.visibility</p:attrName>
+                                        </p:attrNameLst>
+                                      </p:cBhvr>
+                                      <p:to>
+                                        <p:strVal val="visible"/>
+                                      </p:to>
+                                    </p:set>
+                                  </p:childTnLst>
+                                </p:cTn>
+                              </p:par>
+                              <p:par>
+                                <p:cTn id="19" presetID="1" presetClass="entr" presetSubtype="0" fill="hold" nodeType="withEffect">
+                                  <p:stCondLst>
+                                    <p:cond delay="0"/>
+                                  </p:stCondLst>
+                                  <p:childTnLst>
+                                    <p:set>
+                                      <p:cBhvr>
+                                        <p:cTn id="20" dur="1" fill="hold">
+                                          <p:stCondLst>
+                                            <p:cond delay="0"/>
+                                          </p:stCondLst>
+                                        </p:cTn>
+                                        <p:tgtEl>
+                                          <p:spTgt spid="6"/>
+                                        </p:tgtEl>
+                                        <p:attrNameLst>
+                                          <p:attrName>style.visibility</p:attrName>
+                                        </p:attrNameLst>
+                                      </p:cBhvr>
+                                      <p:to>
+                                        <p:strVal val="visible"/>
+                                      </p:to>
+                                    </p:set>
+                                  </p:childTnLst>
+                                </p:cTn>
+                              </p:par>
+                            </p:childTnLst>
+                          </p:cTn>
+                        </p:par>
+                      </p:childTnLst>
+                    </p:cTn>
+                  </p:par>
+                  <p:par>
+                    <p:cTn id="21" fill="hold">
+                      <p:stCondLst>
+                        <p:cond delay="indefinite"/>
+                      </p:stCondLst>
+                      <p:childTnLst>
+                        <p:par>
+                          <p:cTn id="22" fill="hold">
+                            <p:stCondLst>
+                              <p:cond delay="0"/>
+                            </p:stCondLst>
+                            <p:childTnLst>
+                              <p:par>
+                                <p:cTn id="23" presetID="1" presetClass="entr" presetSubtype="0" fill="hold" grpId="0" nodeType="clickEffect">
+                                  <p:stCondLst>
+                                    <p:cond delay="0"/>
+                                  </p:stCondLst>
+                                  <p:childTnLst>
+                                    <p:set>
+                                      <p:cBhvr>
+                                        <p:cTn id="24" dur="1" fill="hold">
+                                          <p:stCondLst>
+                                            <p:cond delay="0"/>
+                                          </p:stCondLst>
+                                        </p:cTn>
+                                        <p:tgtEl>
+                                          <p:spTgt spid="3">
+                                            <p:txEl>
+                                              <p:pRg st="3" end="3"/>
+                                            </p:txEl>
+                                          </p:spTgt>
+                                        </p:tgtEl>
+                                        <p:attrNameLst>
+                                          <p:attrName>style.visibility</p:attrName>
+                                        </p:attrNameLst>
+                                      </p:cBhvr>
+                                      <p:to>
+                                        <p:strVal val="visible"/>
+                                      </p:to>
+                                    </p:set>
+                                  </p:childTnLst>
+                                </p:cTn>
+                              </p:par>
+                              <p:par>
+                                <p:cTn id="25" presetID="1" presetClass="entr" presetSubtype="0" fill="hold" nodeType="withEffect">
+                                  <p:stCondLst>
+                                    <p:cond delay="0"/>
+                                  </p:stCondLst>
+                                  <p:childTnLst>
+                                    <p:set>
+                                      <p:cBhvr>
+                                        <p:cTn id="26" dur="1" fill="hold">
+                                          <p:stCondLst>
+                                            <p:cond delay="0"/>
+                                          </p:stCondLst>
+                                        </p:cTn>
+                                        <p:tgtEl>
+                                          <p:spTgt spid="7"/>
+                                        </p:tgtEl>
+                                        <p:attrNameLst>
+                                          <p:attrName>style.visibility</p:attrName>
+                                        </p:attrNameLst>
+                                      </p:cBhvr>
+                                      <p:to>
+                                        <p:strVal val="visible"/>
+                                      </p:to>
+                                    </p:set>
+                                  </p:childTnLst>
+                                </p:cTn>
+                              </p:par>
+                            </p:childTnLst>
+                          </p:cTn>
+                        </p:par>
+                      </p:childTnLst>
+                    </p:cTn>
+                  </p:par>
+                  <p:par>
+                    <p:cTn id="27" fill="hold">
+                      <p:stCondLst>
+                        <p:cond delay="indefinite"/>
+                      </p:stCondLst>
+                      <p:childTnLst>
+                        <p:par>
+                          <p:cTn id="28" fill="hold">
+                            <p:stCondLst>
+                              <p:cond delay="0"/>
+                            </p:stCondLst>
+                            <p:childTnLst>
+                              <p:par>
+                                <p:cTn id="29" presetID="1" presetClass="entr" presetSubtype="0" fill="hold" grpId="0" nodeType="clickEffect">
+                                  <p:stCondLst>
+                                    <p:cond delay="0"/>
+                                  </p:stCondLst>
+                                  <p:childTnLst>
+                                    <p:set>
+                                      <p:cBhvr>
+                                        <p:cTn id="30" dur="1" fill="hold">
+                                          <p:stCondLst>
+                                            <p:cond delay="0"/>
+                                          </p:stCondLst>
+                                        </p:cTn>
+                                        <p:tgtEl>
+                                          <p:spTgt spid="3">
+                                            <p:txEl>
+                                              <p:pRg st="4" end="4"/>
+                                            </p:txEl>
+                                          </p:spTgt>
+                                        </p:tgtEl>
+                                        <p:attrNameLst>
+                                          <p:attrName>style.visibility</p:attrName>
+                                        </p:attrNameLst>
+                                      </p:cBhvr>
+                                      <p:to>
+                                        <p:strVal val="visible"/>
+                                      </p:to>
+                                    </p:set>
+                                  </p:childTnLst>
+                                </p:cTn>
+                              </p:par>
+                              <p:par>
+                                <p:cTn id="31" presetID="1" presetClass="entr" presetSubtype="0" fill="hold" nodeType="withEffect">
+                                  <p:stCondLst>
+                                    <p:cond delay="0"/>
+                                  </p:stCondLst>
+                                  <p:childTnLst>
+                                    <p:set>
+                                      <p:cBhvr>
+                                        <p:cTn id="32" dur="1" fill="hold">
+                                          <p:stCondLst>
+                                            <p:cond delay="0"/>
+                                          </p:stCondLst>
+                                        </p:cTn>
+                                        <p:tgtEl>
+                                          <p:spTgt spid="8"/>
+                                        </p:tgtEl>
+                                        <p:attrNameLst>
+                                          <p:attrName>style.visibility</p:attrName>
+                                        </p:attrNameLst>
+                                      </p:cBhvr>
+                                      <p:to>
+                                        <p:strVal val="visible"/>
+                                      </p:to>
+                                    </p:set>
+                                  </p:childTnLst>
+                                </p:cTn>
+                              </p:par>
+                            </p:childTnLst>
+                          </p:cTn>
+                        </p:par>
+                      </p:childTnLst>
+                    </p:cTn>
+                  </p:par>
+                </p:childTnLst>
+              </p:cTn>
+              <p:prevCondLst>
+                <p:cond evt="onPrev" delay="0">
+                  <p:tgtEl>
+                    <p:sldTgt/>
+                  </p:tgtEl>
+                </p:cond>
+              </p:prevCondLst>
+              <p:nextCondLst>
+                <p:cond evt="onNext" delay="0">
+                  <p:tgtEl>
+                    <p:sldTgt/>
+                  </p:tgtEl>
+                </p:cond>
+              </p:nextCondLst>
+            </p:seq>
+          </p:childTnLst>
+        </p:cTn>
+      </p:par>
+    </p:tnLst>
+    <p:bldLst>
+      <p:bldP spid="3" grpId="0" uiExpand="1" build="p"/>
+    </p:bldLst>
+  </p:timing>
 </p:sld>
 </file>
 
@@ -3772,7 +6386,7 @@
           <p:cNvPr id="2" name="Titel 1">
             <a:extLst>
               <a:ext uri="{FF2B5EF4-FFF2-40B4-BE49-F238E27FC236}">
-                <a16:creationId xmlns:a16="http://schemas.microsoft.com/office/drawing/2014/main" id="{3D4823C5-B211-4AAE-BBCC-F96361A2ADA1}"/>
+                <a16:creationId xmlns:a16="http://schemas.microsoft.com/office/drawing/2014/main" id="{9326BDAB-F4D7-4E8B-8691-9C70EED4811D}"/>
               </a:ext>
             </a:extLst>
           </p:cNvPr>
@@ -3789,80 +6403,194 @@
           <a:lstStyle/>
           <a:p>
             <a:r>
-              <a:rPr lang="de-CH" dirty="0"/>
-              <a:t>Background</a:t>
-            </a:r>
-          </a:p>
-        </p:txBody>
-      </p:sp>
-      <p:sp>
-        <p:nvSpPr>
-          <p:cNvPr id="3" name="Inhaltsplatzhalter 2">
+              <a:rPr lang="en-GB" dirty="0"/>
+              <a:t>Design</a:t>
+            </a:r>
+          </a:p>
+        </p:txBody>
+      </p:sp>
+      <p:pic>
+        <p:nvPicPr>
+          <p:cNvPr id="6" name="Grafik 5">
             <a:extLst>
               <a:ext uri="{FF2B5EF4-FFF2-40B4-BE49-F238E27FC236}">
-                <a16:creationId xmlns:a16="http://schemas.microsoft.com/office/drawing/2014/main" id="{47E3DF17-BC6E-4A05-B688-7FCD31C19901}"/>
+                <a16:creationId xmlns:a16="http://schemas.microsoft.com/office/drawing/2014/main" id="{5EBA28A6-6E19-41AE-9ACC-E517F6FFB5F2}"/>
               </a:ext>
             </a:extLst>
           </p:cNvPr>
-          <p:cNvSpPr>
-            <a:spLocks noGrp="1"/>
-          </p:cNvSpPr>
-          <p:nvPr>
-            <p:ph idx="1"/>
-          </p:nvPr>
-        </p:nvSpPr>
-        <p:spPr/>
-        <p:txBody>
-          <a:bodyPr/>
-          <a:lstStyle/>
-          <a:p>
-            <a:r>
-              <a:rPr lang="de-CH" dirty="0">
-                <a:solidFill>
-                  <a:srgbClr val="FF0000"/>
-                </a:solidFill>
-              </a:rPr>
-              <a:t>UML </a:t>
-            </a:r>
-            <a:r>
-              <a:rPr lang="de-CH" dirty="0" err="1">
-                <a:solidFill>
-                  <a:srgbClr val="FF0000"/>
-                </a:solidFill>
-              </a:rPr>
-              <a:t>Datastructure</a:t>
-            </a:r>
-            <a:r>
-              <a:rPr lang="de-CH" dirty="0">
-                <a:solidFill>
-                  <a:srgbClr val="FF0000"/>
-                </a:solidFill>
-              </a:rPr>
-              <a:t> </a:t>
-            </a:r>
-            <a:r>
-              <a:rPr lang="en-GB" noProof="1">
-                <a:solidFill>
-                  <a:srgbClr val="FF0000"/>
-                </a:solidFill>
-              </a:rPr>
-              <a:t>einfügen</a:t>
-            </a:r>
-            <a:r>
-              <a:rPr lang="de-CH" dirty="0">
-                <a:solidFill>
-                  <a:srgbClr val="FF0000"/>
-                </a:solidFill>
-              </a:rPr>
-              <a:t> !!!</a:t>
-            </a:r>
-          </a:p>
-        </p:txBody>
-      </p:sp>
+          <p:cNvPicPr>
+            <a:picLocks noChangeAspect="1"/>
+          </p:cNvPicPr>
+          <p:nvPr/>
+        </p:nvPicPr>
+        <p:blipFill>
+          <a:blip r:embed="rId3"/>
+          <a:stretch>
+            <a:fillRect/>
+          </a:stretch>
+        </p:blipFill>
+        <p:spPr>
+          <a:xfrm>
+            <a:off x="288245" y="1690688"/>
+            <a:ext cx="2691517" cy="4724626"/>
+          </a:xfrm>
+          <a:prstGeom prst="rect">
+            <a:avLst/>
+          </a:prstGeom>
+        </p:spPr>
+      </p:pic>
+      <p:pic>
+        <p:nvPicPr>
+          <p:cNvPr id="7" name="Grafik 6">
+            <a:extLst>
+              <a:ext uri="{FF2B5EF4-FFF2-40B4-BE49-F238E27FC236}">
+                <a16:creationId xmlns:a16="http://schemas.microsoft.com/office/drawing/2014/main" id="{297ECA95-8182-49F3-A49E-E8879B4EBECD}"/>
+              </a:ext>
+            </a:extLst>
+          </p:cNvPr>
+          <p:cNvPicPr>
+            <a:picLocks noChangeAspect="1"/>
+          </p:cNvPicPr>
+          <p:nvPr/>
+        </p:nvPicPr>
+        <p:blipFill>
+          <a:blip r:embed="rId4"/>
+          <a:stretch>
+            <a:fillRect/>
+          </a:stretch>
+        </p:blipFill>
+        <p:spPr>
+          <a:xfrm>
+            <a:off x="3235997" y="1690687"/>
+            <a:ext cx="2672006" cy="4724627"/>
+          </a:xfrm>
+          <a:prstGeom prst="rect">
+            <a:avLst/>
+          </a:prstGeom>
+        </p:spPr>
+      </p:pic>
+      <p:pic>
+        <p:nvPicPr>
+          <p:cNvPr id="11" name="Grafik 10">
+            <a:extLst>
+              <a:ext uri="{FF2B5EF4-FFF2-40B4-BE49-F238E27FC236}">
+                <a16:creationId xmlns:a16="http://schemas.microsoft.com/office/drawing/2014/main" id="{84752E13-B9C3-4316-A6A1-D0A2C9FFC5CE}"/>
+              </a:ext>
+            </a:extLst>
+          </p:cNvPr>
+          <p:cNvPicPr>
+            <a:picLocks noChangeAspect="1"/>
+          </p:cNvPicPr>
+          <p:nvPr/>
+        </p:nvPicPr>
+        <p:blipFill>
+          <a:blip r:embed="rId5"/>
+          <a:stretch>
+            <a:fillRect/>
+          </a:stretch>
+        </p:blipFill>
+        <p:spPr>
+          <a:xfrm>
+            <a:off x="6164238" y="1690687"/>
+            <a:ext cx="2711087" cy="4724626"/>
+          </a:xfrm>
+          <a:prstGeom prst="rect">
+            <a:avLst/>
+          </a:prstGeom>
+        </p:spPr>
+      </p:pic>
+      <p:cxnSp>
+        <p:nvCxnSpPr>
+          <p:cNvPr id="13" name="Gerade Verbindung mit Pfeil 12">
+            <a:extLst>
+              <a:ext uri="{FF2B5EF4-FFF2-40B4-BE49-F238E27FC236}">
+                <a16:creationId xmlns:a16="http://schemas.microsoft.com/office/drawing/2014/main" id="{95FCC564-29F4-4F7D-A21B-079BB25FAFA2}"/>
+              </a:ext>
+            </a:extLst>
+          </p:cNvPr>
+          <p:cNvCxnSpPr>
+            <a:cxnSpLocks/>
+          </p:cNvCxnSpPr>
+          <p:nvPr/>
+        </p:nvCxnSpPr>
+        <p:spPr>
+          <a:xfrm>
+            <a:off x="2400300" y="4411756"/>
+            <a:ext cx="1393451" cy="0"/>
+          </a:xfrm>
+          <a:prstGeom prst="straightConnector1">
+            <a:avLst/>
+          </a:prstGeom>
+          <a:ln w="76200">
+            <a:solidFill>
+              <a:srgbClr val="FF0000"/>
+            </a:solidFill>
+            <a:tailEnd type="triangle"/>
+          </a:ln>
+        </p:spPr>
+        <p:style>
+          <a:lnRef idx="1">
+            <a:schemeClr val="accent1"/>
+          </a:lnRef>
+          <a:fillRef idx="0">
+            <a:schemeClr val="accent1"/>
+          </a:fillRef>
+          <a:effectRef idx="0">
+            <a:schemeClr val="accent1"/>
+          </a:effectRef>
+          <a:fontRef idx="minor">
+            <a:schemeClr val="tx1"/>
+          </a:fontRef>
+        </p:style>
+      </p:cxnSp>
+      <p:cxnSp>
+        <p:nvCxnSpPr>
+          <p:cNvPr id="15" name="Gerade Verbindung mit Pfeil 14">
+            <a:extLst>
+              <a:ext uri="{FF2B5EF4-FFF2-40B4-BE49-F238E27FC236}">
+                <a16:creationId xmlns:a16="http://schemas.microsoft.com/office/drawing/2014/main" id="{3071C97B-3BAE-420C-93AB-9847947D8D63}"/>
+              </a:ext>
+            </a:extLst>
+          </p:cNvPr>
+          <p:cNvCxnSpPr>
+            <a:cxnSpLocks/>
+          </p:cNvCxnSpPr>
+          <p:nvPr/>
+        </p:nvCxnSpPr>
+        <p:spPr>
+          <a:xfrm>
+            <a:off x="5467512" y="4722652"/>
+            <a:ext cx="1393451" cy="0"/>
+          </a:xfrm>
+          <a:prstGeom prst="straightConnector1">
+            <a:avLst/>
+          </a:prstGeom>
+          <a:ln w="76200">
+            <a:solidFill>
+              <a:srgbClr val="FF0000"/>
+            </a:solidFill>
+            <a:tailEnd type="triangle"/>
+          </a:ln>
+        </p:spPr>
+        <p:style>
+          <a:lnRef idx="1">
+            <a:schemeClr val="accent1"/>
+          </a:lnRef>
+          <a:fillRef idx="0">
+            <a:schemeClr val="accent1"/>
+          </a:fillRef>
+          <a:effectRef idx="0">
+            <a:schemeClr val="accent1"/>
+          </a:effectRef>
+          <a:fontRef idx="minor">
+            <a:schemeClr val="tx1"/>
+          </a:fontRef>
+        </p:style>
+      </p:cxnSp>
     </p:spTree>
     <p:extLst>
       <p:ext uri="{BB962C8B-B14F-4D97-AF65-F5344CB8AC3E}">
-        <p14:creationId xmlns:p14="http://schemas.microsoft.com/office/powerpoint/2010/main" val="3365552931"/>
+        <p14:creationId xmlns:p14="http://schemas.microsoft.com/office/powerpoint/2010/main" val="1584912592"/>
       </p:ext>
     </p:extLst>
   </p:cSld>
@@ -3894,7 +6622,7 @@
           <p:cNvPr id="2" name="Titel 1">
             <a:extLst>
               <a:ext uri="{FF2B5EF4-FFF2-40B4-BE49-F238E27FC236}">
-                <a16:creationId xmlns:a16="http://schemas.microsoft.com/office/drawing/2014/main" id="{9326BDAB-F4D7-4E8B-8691-9C70EED4811D}"/>
+                <a16:creationId xmlns:a16="http://schemas.microsoft.com/office/drawing/2014/main" id="{5505A034-4A33-4CCB-B412-7532EF575183}"/>
               </a:ext>
             </a:extLst>
           </p:cNvPr>
@@ -3912,7 +6640,7 @@
           <a:p>
             <a:r>
               <a:rPr lang="en-GB" dirty="0"/>
-              <a:t>Design</a:t>
+              <a:t>Architecture</a:t>
             </a:r>
           </a:p>
         </p:txBody>
@@ -3922,7 +6650,7 @@
           <p:cNvPr id="3" name="Inhaltsplatzhalter 2">
             <a:extLst>
               <a:ext uri="{FF2B5EF4-FFF2-40B4-BE49-F238E27FC236}">
-                <a16:creationId xmlns:a16="http://schemas.microsoft.com/office/drawing/2014/main" id="{ACF2AFDA-D59D-413B-B025-5384B9C8F31E}"/>
+                <a16:creationId xmlns:a16="http://schemas.microsoft.com/office/drawing/2014/main" id="{7E710EEE-8A66-4614-B580-9E7A7EE47D1D}"/>
               </a:ext>
             </a:extLst>
           </p:cNvPr>
@@ -3939,68 +6667,75 @@
           <a:lstStyle/>
           <a:p>
             <a:r>
-              <a:rPr lang="en-GB" dirty="0">
-                <a:solidFill>
-                  <a:srgbClr val="FF0000"/>
-                </a:solidFill>
-              </a:rPr>
-              <a:t>Screenshots </a:t>
-            </a:r>
-            <a:r>
-              <a:rPr lang="en-GB" dirty="0" err="1">
-                <a:solidFill>
-                  <a:srgbClr val="FF0000"/>
-                </a:solidFill>
-              </a:rPr>
-              <a:t>einfügen</a:t>
-            </a:r>
-            <a:r>
-              <a:rPr lang="en-GB" dirty="0">
-                <a:solidFill>
-                  <a:srgbClr val="FF0000"/>
-                </a:solidFill>
-              </a:rPr>
-              <a:t> </a:t>
-            </a:r>
-            <a:r>
-              <a:rPr lang="en-GB" dirty="0" err="1">
-                <a:solidFill>
-                  <a:srgbClr val="FF0000"/>
-                </a:solidFill>
-              </a:rPr>
-              <a:t>mit</a:t>
-            </a:r>
-            <a:r>
-              <a:rPr lang="en-GB" dirty="0">
-                <a:solidFill>
-                  <a:srgbClr val="FF0000"/>
-                </a:solidFill>
-              </a:rPr>
-              <a:t> </a:t>
-            </a:r>
-            <a:r>
-              <a:rPr lang="en-GB" dirty="0" err="1">
-                <a:solidFill>
-                  <a:srgbClr val="FF0000"/>
-                </a:solidFill>
-              </a:rPr>
-              <a:t>verbindungen</a:t>
-            </a:r>
-            <a:r>
-              <a:rPr lang="en-GB" dirty="0">
-                <a:solidFill>
-                  <a:srgbClr val="FF0000"/>
-                </a:solidFill>
-              </a:rPr>
-              <a:t> -&gt; Navigation map</a:t>
-            </a:r>
+              <a:rPr lang="de-CH" dirty="0" err="1"/>
+              <a:t>Firebase</a:t>
+            </a:r>
+            <a:endParaRPr lang="de-CH" dirty="0"/>
+          </a:p>
+          <a:p>
+            <a:pPr lvl="1"/>
+            <a:r>
+              <a:rPr lang="de-CH" dirty="0" err="1"/>
+              <a:t>Geofire</a:t>
+            </a:r>
+            <a:endParaRPr lang="de-CH" dirty="0"/>
+          </a:p>
+          <a:p>
+            <a:r>
+              <a:rPr lang="de-CH" dirty="0"/>
+              <a:t>External API</a:t>
+            </a:r>
+          </a:p>
+          <a:p>
+            <a:pPr lvl="1"/>
+            <a:r>
+              <a:rPr lang="de-CH" dirty="0"/>
+              <a:t>Skimap.org</a:t>
+            </a:r>
+          </a:p>
+          <a:p>
+            <a:pPr lvl="1"/>
+            <a:r>
+              <a:rPr lang="de-CH" dirty="0"/>
+              <a:t>OpenWeatherMap.org</a:t>
+            </a:r>
+          </a:p>
+          <a:p>
+            <a:r>
+              <a:rPr lang="en-GB" dirty="0"/>
+              <a:t>Server</a:t>
+            </a:r>
+            <a:r>
+              <a:rPr lang="de-CH" dirty="0"/>
+              <a:t> Programm</a:t>
+            </a:r>
+          </a:p>
+          <a:p>
+            <a:pPr lvl="1"/>
+            <a:r>
+              <a:rPr lang="de-CH" dirty="0"/>
+              <a:t>Java </a:t>
+            </a:r>
+            <a:r>
+              <a:rPr lang="de-CH" dirty="0" err="1"/>
+              <a:t>Application</a:t>
+            </a:r>
+            <a:endParaRPr lang="de-CH" dirty="0"/>
+          </a:p>
+          <a:p>
+            <a:pPr lvl="1"/>
+            <a:r>
+              <a:rPr lang="de-CH" dirty="0" err="1"/>
+              <a:t>Gson</a:t>
+            </a:r>
+            <a:endParaRPr lang="de-CH" dirty="0"/>
           </a:p>
         </p:txBody>
       </p:sp>
     </p:spTree>
     <p:extLst>
       <p:ext uri="{BB962C8B-B14F-4D97-AF65-F5344CB8AC3E}">
-        <p14:creationId xmlns:p14="http://schemas.microsoft.com/office/powerpoint/2010/main" val="1584912592"/>
+        <p14:creationId xmlns:p14="http://schemas.microsoft.com/office/powerpoint/2010/main" val="636818264"/>
       </p:ext>
     </p:extLst>
   </p:cSld>
@@ -4032,7 +6767,7 @@
           <p:cNvPr id="2" name="Titel 1">
             <a:extLst>
               <a:ext uri="{FF2B5EF4-FFF2-40B4-BE49-F238E27FC236}">
-                <a16:creationId xmlns:a16="http://schemas.microsoft.com/office/drawing/2014/main" id="{5505A034-4A33-4CCB-B412-7532EF575183}"/>
+                <a16:creationId xmlns:a16="http://schemas.microsoft.com/office/drawing/2014/main" id="{A1320CD9-07C0-41F5-9031-90292C9BA40C}"/>
               </a:ext>
             </a:extLst>
           </p:cNvPr>
@@ -4050,7 +6785,7 @@
           <a:p>
             <a:r>
               <a:rPr lang="en-GB" dirty="0"/>
-              <a:t>Architecture</a:t>
+              <a:t>Implementation</a:t>
             </a:r>
           </a:p>
         </p:txBody>
@@ -4060,7 +6795,7 @@
           <p:cNvPr id="3" name="Inhaltsplatzhalter 2">
             <a:extLst>
               <a:ext uri="{FF2B5EF4-FFF2-40B4-BE49-F238E27FC236}">
-                <a16:creationId xmlns:a16="http://schemas.microsoft.com/office/drawing/2014/main" id="{7E710EEE-8A66-4614-B580-9E7A7EE47D1D}"/>
+                <a16:creationId xmlns:a16="http://schemas.microsoft.com/office/drawing/2014/main" id="{DEEE9B27-06A7-469E-B9E8-72D4FDF1E1F1}"/>
               </a:ext>
             </a:extLst>
           </p:cNvPr>
@@ -4076,13 +6811,21 @@
           <a:bodyPr/>
           <a:lstStyle/>
           <a:p>
+            <a:r>
+              <a:rPr lang="en-GB" dirty="0">
+                <a:solidFill>
+                  <a:srgbClr val="FF0000"/>
+                </a:solidFill>
+              </a:rPr>
+              <a:t>Was </a:t>
+            </a:r>
             <a:r>
               <a:rPr lang="en-GB" dirty="0" err="1">
                 <a:solidFill>
                   <a:srgbClr val="FF0000"/>
                 </a:solidFill>
               </a:rPr>
-              <a:t>Wie</a:t>
+              <a:t>soll</a:t>
             </a:r>
             <a:r>
               <a:rPr lang="en-GB" dirty="0">
@@ -4098,7 +6841,7 @@
                   <a:srgbClr val="FF0000"/>
                 </a:solidFill>
               </a:rPr>
-              <a:t>ist</a:t>
+              <a:t>hier</a:t>
             </a:r>
             <a:r>
               <a:rPr lang="en-GB" dirty="0">
@@ -4106,89 +6849,7 @@
                   <a:srgbClr val="FF0000"/>
                 </a:solidFill>
               </a:rPr>
-              <a:t> </a:t>
-            </a:r>
-            <a:r>
-              <a:rPr lang="en-GB" dirty="0" err="1">
-                <a:solidFill>
-                  <a:srgbClr val="FF0000"/>
-                </a:solidFill>
-              </a:rPr>
-              <a:t>es</a:t>
-            </a:r>
-            <a:r>
-              <a:rPr lang="en-GB" dirty="0">
-                <a:solidFill>
-                  <a:srgbClr val="FF0000"/>
-                </a:solidFill>
-              </a:rPr>
-              <a:t> </a:t>
-            </a:r>
-            <a:r>
-              <a:rPr lang="en-GB" dirty="0" err="1">
-                <a:solidFill>
-                  <a:srgbClr val="FF0000"/>
-                </a:solidFill>
-              </a:rPr>
-              <a:t>gemacht</a:t>
-            </a:r>
-            <a:r>
-              <a:rPr lang="en-GB" dirty="0">
-                <a:solidFill>
-                  <a:srgbClr val="FF0000"/>
-                </a:solidFill>
-              </a:rPr>
-              <a:t>. Server </a:t>
-            </a:r>
-            <a:r>
-              <a:rPr lang="en-GB" dirty="0" err="1">
-                <a:solidFill>
-                  <a:srgbClr val="FF0000"/>
-                </a:solidFill>
-              </a:rPr>
-              <a:t>Applikation</a:t>
-            </a:r>
-            <a:r>
-              <a:rPr lang="en-GB" dirty="0">
-                <a:solidFill>
-                  <a:srgbClr val="FF0000"/>
-                </a:solidFill>
-              </a:rPr>
-              <a:t>. </a:t>
-            </a:r>
-          </a:p>
-          <a:p>
-            <a:r>
-              <a:rPr lang="en-GB" dirty="0" err="1">
-                <a:solidFill>
-                  <a:srgbClr val="FF0000"/>
-                </a:solidFill>
-              </a:rPr>
-              <a:t>Ablauf</a:t>
-            </a:r>
-            <a:r>
-              <a:rPr lang="en-GB" dirty="0">
-                <a:solidFill>
-                  <a:srgbClr val="FF0000"/>
-                </a:solidFill>
-              </a:rPr>
-              <a:t>, </a:t>
-            </a:r>
-            <a:r>
-              <a:rPr lang="en-GB" dirty="0" err="1">
-                <a:solidFill>
-                  <a:srgbClr val="FF0000"/>
-                </a:solidFill>
-              </a:rPr>
-              <a:t>Sortieren</a:t>
-            </a:r>
-            <a:r>
-              <a:rPr lang="en-GB" dirty="0">
-                <a:solidFill>
-                  <a:srgbClr val="FF0000"/>
-                </a:solidFill>
-              </a:rPr>
-              <a:t>, etc.</a:t>
+              <a:t> rein?</a:t>
             </a:r>
           </a:p>
         </p:txBody>
@@ -4196,7 +6857,7 @@
     </p:spTree>
     <p:extLst>
       <p:ext uri="{BB962C8B-B14F-4D97-AF65-F5344CB8AC3E}">
-        <p14:creationId xmlns:p14="http://schemas.microsoft.com/office/powerpoint/2010/main" val="636818264"/>
+        <p14:creationId xmlns:p14="http://schemas.microsoft.com/office/powerpoint/2010/main" val="1313387902"/>
       </p:ext>
     </p:extLst>
   </p:cSld>
@@ -4228,7 +6889,7 @@
           <p:cNvPr id="2" name="Titel 1">
             <a:extLst>
               <a:ext uri="{FF2B5EF4-FFF2-40B4-BE49-F238E27FC236}">
-                <a16:creationId xmlns:a16="http://schemas.microsoft.com/office/drawing/2014/main" id="{A1320CD9-07C0-41F5-9031-90292C9BA40C}"/>
+                <a16:creationId xmlns:a16="http://schemas.microsoft.com/office/drawing/2014/main" id="{F5CDFFE4-D353-4E85-BC81-E89F9305F6A4}"/>
               </a:ext>
             </a:extLst>
           </p:cNvPr>
@@ -4246,7 +6907,7 @@
           <a:p>
             <a:r>
               <a:rPr lang="en-GB" dirty="0"/>
-              <a:t>Implementation</a:t>
+              <a:t>Evaluation / Testing</a:t>
             </a:r>
           </a:p>
         </p:txBody>
@@ -4256,7 +6917,7 @@
           <p:cNvPr id="3" name="Inhaltsplatzhalter 2">
             <a:extLst>
               <a:ext uri="{FF2B5EF4-FFF2-40B4-BE49-F238E27FC236}">
-                <a16:creationId xmlns:a16="http://schemas.microsoft.com/office/drawing/2014/main" id="{DEEE9B27-06A7-469E-B9E8-72D4FDF1E1F1}"/>
+                <a16:creationId xmlns:a16="http://schemas.microsoft.com/office/drawing/2014/main" id="{86043A25-7E8D-4E6F-B9D9-CE9DBDAF2DC8}"/>
               </a:ext>
             </a:extLst>
           </p:cNvPr>
@@ -4272,45 +6933,43 @@
           <a:bodyPr/>
           <a:lstStyle/>
           <a:p>
+            <a:r>
+              <a:rPr lang="en-GB" dirty="0"/>
+              <a:t>JUnit Test</a:t>
+            </a:r>
+          </a:p>
+          <a:p>
+            <a:r>
+              <a:rPr lang="en-GB" dirty="0"/>
+              <a:t>Code Coverage </a:t>
+            </a:r>
             <a:r>
               <a:rPr lang="en-GB" dirty="0">
                 <a:solidFill>
                   <a:srgbClr val="FF0000"/>
                 </a:solidFill>
               </a:rPr>
-              <a:t>Was </a:t>
-            </a:r>
-            <a:r>
-              <a:rPr lang="en-GB" dirty="0" err="1">
-                <a:solidFill>
-                  <a:srgbClr val="FF0000"/>
-                </a:solidFill>
-              </a:rPr>
-              <a:t>soll</a:t>
-            </a:r>
-            <a:r>
-              <a:rPr lang="en-GB" dirty="0">
-                <a:solidFill>
-                  <a:srgbClr val="FF0000"/>
-                </a:solidFill>
-              </a:rPr>
-              <a:t> </a:t>
-            </a:r>
-            <a:r>
-              <a:rPr lang="en-GB" dirty="0" err="1">
-                <a:solidFill>
-                  <a:srgbClr val="FF0000"/>
-                </a:solidFill>
-              </a:rPr>
-              <a:t>hier</a:t>
-            </a:r>
-            <a:r>
-              <a:rPr lang="en-GB" dirty="0">
-                <a:solidFill>
-                  <a:srgbClr val="FF0000"/>
-                </a:solidFill>
-              </a:rPr>
-              <a:t> rein?</a:t>
+              <a:t>about 30 %</a:t>
+            </a:r>
+          </a:p>
+          <a:p>
+            <a:r>
+              <a:rPr lang="en-GB" dirty="0" err="1"/>
+              <a:t>SonarQube</a:t>
+            </a:r>
+            <a:endParaRPr lang="en-GB" dirty="0"/>
+          </a:p>
+          <a:p>
+            <a:pPr lvl="1"/>
+            <a:r>
+              <a:rPr lang="en-GB" dirty="0"/>
+              <a:t>Some points can not be fixed</a:t>
+            </a:r>
+          </a:p>
+          <a:p>
+            <a:r>
+              <a:rPr lang="en-GB" dirty="0"/>
+              <a:t>Monkey-Test with ADB</a:t>
             </a:r>
           </a:p>
         </p:txBody>
@@ -4318,7 +6977,7 @@
     </p:spTree>
     <p:extLst>
       <p:ext uri="{BB962C8B-B14F-4D97-AF65-F5344CB8AC3E}">
-        <p14:creationId xmlns:p14="http://schemas.microsoft.com/office/powerpoint/2010/main" val="1313387902"/>
+        <p14:creationId xmlns:p14="http://schemas.microsoft.com/office/powerpoint/2010/main" val="1742385124"/>
       </p:ext>
     </p:extLst>
   </p:cSld>
@@ -4587,4 +7246,299 @@
     </a:ext>
   </a:extLst>
 </a:theme>
+</file>
+
+<file path=ppt/theme/theme2.xml><?xml version="1.0" encoding="utf-8"?>
+<a:theme xmlns:a="http://schemas.openxmlformats.org/drawingml/2006/main" name="Office">
+  <a:themeElements>
+    <a:clrScheme name="Office">
+      <a:dk1>
+        <a:sysClr val="windowText" lastClr="000000"/>
+      </a:dk1>
+      <a:lt1>
+        <a:sysClr val="window" lastClr="FFFFFF"/>
+      </a:lt1>
+      <a:dk2>
+        <a:srgbClr val="44546A"/>
+      </a:dk2>
+      <a:lt2>
+        <a:srgbClr val="E7E6E6"/>
+      </a:lt2>
+      <a:accent1>
+        <a:srgbClr val="4472C4"/>
+      </a:accent1>
+      <a:accent2>
+        <a:srgbClr val="ED7D31"/>
+      </a:accent2>
+      <a:accent3>
+        <a:srgbClr val="A5A5A5"/>
+      </a:accent3>
+      <a:accent4>
+        <a:srgbClr val="FFC000"/>
+      </a:accent4>
+      <a:accent5>
+        <a:srgbClr val="5B9BD5"/>
+      </a:accent5>
+      <a:accent6>
+        <a:srgbClr val="70AD47"/>
+      </a:accent6>
+      <a:hlink>
+        <a:srgbClr val="0563C1"/>
+      </a:hlink>
+      <a:folHlink>
+        <a:srgbClr val="954F72"/>
+      </a:folHlink>
+    </a:clrScheme>
+    <a:fontScheme name="Office">
+      <a:majorFont>
+        <a:latin typeface="Calibri Light" panose="020F0302020204030204"/>
+        <a:ea typeface=""/>
+        <a:cs typeface=""/>
+        <a:font script="Jpan" typeface="游ゴシック Light"/>
+        <a:font script="Hang" typeface="맑은 고딕"/>
+        <a:font script="Hans" typeface="等线 Light"/>
+        <a:font script="Hant" typeface="新細明體"/>
+        <a:font script="Arab" typeface="Times New Roman"/>
+        <a:font script="Hebr" typeface="Times New Roman"/>
+        <a:font script="Thai" typeface="Angsana New"/>
+        <a:font script="Ethi" typeface="Nyala"/>
+        <a:font script="Beng" typeface="Vrinda"/>
+        <a:font script="Gujr" typeface="Shruti"/>
+        <a:font script="Khmr" typeface="MoolBoran"/>
+        <a:font script="Knda" typeface="Tunga"/>
+        <a:font script="Guru" typeface="Raavi"/>
+        <a:font script="Cans" typeface="Euphemia"/>
+        <a:font script="Cher" typeface="Plantagenet Cherokee"/>
+        <a:font script="Yiii" typeface="Microsoft Yi Baiti"/>
+        <a:font script="Tibt" typeface="Microsoft Himalaya"/>
+        <a:font script="Thaa" typeface="MV Boli"/>
+        <a:font script="Deva" typeface="Mangal"/>
+        <a:font script="Telu" typeface="Gautami"/>
+        <a:font script="Taml" typeface="Latha"/>
+        <a:font script="Syrc" typeface="Estrangelo Edessa"/>
+        <a:font script="Orya" typeface="Kalinga"/>
+        <a:font script="Mlym" typeface="Kartika"/>
+        <a:font script="Laoo" typeface="DokChampa"/>
+        <a:font script="Sinh" typeface="Iskoola Pota"/>
+        <a:font script="Mong" typeface="Mongolian Baiti"/>
+        <a:font script="Viet" typeface="Times New Roman"/>
+        <a:font script="Uigh" typeface="Microsoft Uighur"/>
+        <a:font script="Geor" typeface="Sylfaen"/>
+        <a:font script="Armn" typeface="Arial"/>
+        <a:font script="Bugi" typeface="Leelawadee UI"/>
+        <a:font script="Bopo" typeface="Microsoft JhengHei"/>
+        <a:font script="Java" typeface="Javanese Text"/>
+        <a:font script="Lisu" typeface="Segoe UI"/>
+        <a:font script="Mymr" typeface="Myanmar Text"/>
+        <a:font script="Nkoo" typeface="Ebrima"/>
+        <a:font script="Olck" typeface="Nirmala UI"/>
+        <a:font script="Osma" typeface="Ebrima"/>
+        <a:font script="Phag" typeface="Phagspa"/>
+        <a:font script="Syrn" typeface="Estrangelo Edessa"/>
+        <a:font script="Syrj" typeface="Estrangelo Edessa"/>
+        <a:font script="Syre" typeface="Estrangelo Edessa"/>
+        <a:font script="Sora" typeface="Nirmala UI"/>
+        <a:font script="Tale" typeface="Microsoft Tai Le"/>
+        <a:font script="Talu" typeface="Microsoft New Tai Lue"/>
+        <a:font script="Tfng" typeface="Ebrima"/>
+      </a:majorFont>
+      <a:minorFont>
+        <a:latin typeface="Calibri" panose="020F0502020204030204"/>
+        <a:ea typeface=""/>
+        <a:cs typeface=""/>
+        <a:font script="Jpan" typeface="游ゴシック"/>
+        <a:font script="Hang" typeface="맑은 고딕"/>
+        <a:font script="Hans" typeface="等线"/>
+        <a:font script="Hant" typeface="新細明體"/>
+        <a:font script="Arab" typeface="Arial"/>
+        <a:font script="Hebr" typeface="Arial"/>
+        <a:font script="Thai" typeface="Cordia New"/>
+        <a:font script="Ethi" typeface="Nyala"/>
+        <a:font script="Beng" typeface="Vrinda"/>
+        <a:font script="Gujr" typeface="Shruti"/>
+        <a:font script="Khmr" typeface="DaunPenh"/>
+        <a:font script="Knda" typeface="Tunga"/>
+        <a:font script="Guru" typeface="Raavi"/>
+        <a:font script="Cans" typeface="Euphemia"/>
+        <a:font script="Cher" typeface="Plantagenet Cherokee"/>
+        <a:font script="Yiii" typeface="Microsoft Yi Baiti"/>
+        <a:font script="Tibt" typeface="Microsoft Himalaya"/>
+        <a:font script="Thaa" typeface="MV Boli"/>
+        <a:font script="Deva" typeface="Mangal"/>
+        <a:font script="Telu" typeface="Gautami"/>
+        <a:font script="Taml" typeface="Latha"/>
+        <a:font script="Syrc" typeface="Estrangelo Edessa"/>
+        <a:font script="Orya" typeface="Kalinga"/>
+        <a:font script="Mlym" typeface="Kartika"/>
+        <a:font script="Laoo" typeface="DokChampa"/>
+        <a:font script="Sinh" typeface="Iskoola Pota"/>
+        <a:font script="Mong" typeface="Mongolian Baiti"/>
+        <a:font script="Viet" typeface="Arial"/>
+        <a:font script="Uigh" typeface="Microsoft Uighur"/>
+        <a:font script="Geor" typeface="Sylfaen"/>
+        <a:font script="Armn" typeface="Arial"/>
+        <a:font script="Bugi" typeface="Leelawadee UI"/>
+        <a:font script="Bopo" typeface="Microsoft JhengHei"/>
+        <a:font script="Java" typeface="Javanese Text"/>
+        <a:font script="Lisu" typeface="Segoe UI"/>
+        <a:font script="Mymr" typeface="Myanmar Text"/>
+        <a:font script="Nkoo" typeface="Ebrima"/>
+        <a:font script="Olck" typeface="Nirmala UI"/>
+        <a:font script="Osma" typeface="Ebrima"/>
+        <a:font script="Phag" typeface="Phagspa"/>
+        <a:font script="Syrn" typeface="Estrangelo Edessa"/>
+        <a:font script="Syrj" typeface="Estrangelo Edessa"/>
+        <a:font script="Syre" typeface="Estrangelo Edessa"/>
+        <a:font script="Sora" typeface="Nirmala UI"/>
+        <a:font script="Tale" typeface="Microsoft Tai Le"/>
+        <a:font script="Talu" typeface="Microsoft New Tai Lue"/>
+        <a:font script="Tfng" typeface="Ebrima"/>
+      </a:minorFont>
+    </a:fontScheme>
+    <a:fmtScheme name="Office">
+      <a:fillStyleLst>
+        <a:solidFill>
+          <a:schemeClr val="phClr"/>
+        </a:solidFill>
+        <a:gradFill rotWithShape="1">
+          <a:gsLst>
+            <a:gs pos="0">
+              <a:schemeClr val="phClr">
+                <a:lumMod val="110000"/>
+                <a:satMod val="105000"/>
+                <a:tint val="67000"/>
+              </a:schemeClr>
+            </a:gs>
+            <a:gs pos="50000">
+              <a:schemeClr val="phClr">
+                <a:lumMod val="105000"/>
+                <a:satMod val="103000"/>
+                <a:tint val="73000"/>
+              </a:schemeClr>
+            </a:gs>
+            <a:gs pos="100000">
+              <a:schemeClr val="phClr">
+                <a:lumMod val="105000"/>
+                <a:satMod val="109000"/>
+                <a:tint val="81000"/>
+              </a:schemeClr>
+            </a:gs>
+          </a:gsLst>
+          <a:lin ang="5400000" scaled="0"/>
+        </a:gradFill>
+        <a:gradFill rotWithShape="1">
+          <a:gsLst>
+            <a:gs pos="0">
+              <a:schemeClr val="phClr">
+                <a:satMod val="103000"/>
+                <a:lumMod val="102000"/>
+                <a:tint val="94000"/>
+              </a:schemeClr>
+            </a:gs>
+            <a:gs pos="50000">
+              <a:schemeClr val="phClr">
+                <a:satMod val="110000"/>
+                <a:lumMod val="100000"/>
+                <a:shade val="100000"/>
+              </a:schemeClr>
+            </a:gs>
+            <a:gs pos="100000">
+              <a:schemeClr val="phClr">
+                <a:lumMod val="99000"/>
+                <a:satMod val="120000"/>
+                <a:shade val="78000"/>
+              </a:schemeClr>
+            </a:gs>
+          </a:gsLst>
+          <a:lin ang="5400000" scaled="0"/>
+        </a:gradFill>
+      </a:fillStyleLst>
+      <a:lnStyleLst>
+        <a:ln w="6350" cap="flat" cmpd="sng" algn="ctr">
+          <a:solidFill>
+            <a:schemeClr val="phClr"/>
+          </a:solidFill>
+          <a:prstDash val="solid"/>
+          <a:miter lim="800000"/>
+        </a:ln>
+        <a:ln w="12700" cap="flat" cmpd="sng" algn="ctr">
+          <a:solidFill>
+            <a:schemeClr val="phClr"/>
+          </a:solidFill>
+          <a:prstDash val="solid"/>
+          <a:miter lim="800000"/>
+        </a:ln>
+        <a:ln w="19050" cap="flat" cmpd="sng" algn="ctr">
+          <a:solidFill>
+            <a:schemeClr val="phClr"/>
+          </a:solidFill>
+          <a:prstDash val="solid"/>
+          <a:miter lim="800000"/>
+        </a:ln>
+      </a:lnStyleLst>
+      <a:effectStyleLst>
+        <a:effectStyle>
+          <a:effectLst/>
+        </a:effectStyle>
+        <a:effectStyle>
+          <a:effectLst/>
+        </a:effectStyle>
+        <a:effectStyle>
+          <a:effectLst>
+            <a:outerShdw blurRad="57150" dist="19050" dir="5400000" algn="ctr" rotWithShape="0">
+              <a:srgbClr val="000000">
+                <a:alpha val="63000"/>
+              </a:srgbClr>
+            </a:outerShdw>
+          </a:effectLst>
+        </a:effectStyle>
+      </a:effectStyleLst>
+      <a:bgFillStyleLst>
+        <a:solidFill>
+          <a:schemeClr val="phClr"/>
+        </a:solidFill>
+        <a:solidFill>
+          <a:schemeClr val="phClr">
+            <a:tint val="95000"/>
+            <a:satMod val="170000"/>
+          </a:schemeClr>
+        </a:solidFill>
+        <a:gradFill rotWithShape="1">
+          <a:gsLst>
+            <a:gs pos="0">
+              <a:schemeClr val="phClr">
+                <a:tint val="93000"/>
+                <a:satMod val="150000"/>
+                <a:shade val="98000"/>
+                <a:lumMod val="102000"/>
+              </a:schemeClr>
+            </a:gs>
+            <a:gs pos="50000">
+              <a:schemeClr val="phClr">
+                <a:tint val="98000"/>
+                <a:satMod val="130000"/>
+                <a:shade val="90000"/>
+                <a:lumMod val="103000"/>
+              </a:schemeClr>
+            </a:gs>
+            <a:gs pos="100000">
+              <a:schemeClr val="phClr">
+                <a:shade val="63000"/>
+                <a:satMod val="120000"/>
+              </a:schemeClr>
+            </a:gs>
+          </a:gsLst>
+          <a:lin ang="5400000" scaled="0"/>
+        </a:gradFill>
+      </a:bgFillStyleLst>
+    </a:fmtScheme>
+  </a:themeElements>
+  <a:objectDefaults/>
+  <a:extraClrSchemeLst/>
+  <a:extLst>
+    <a:ext uri="{05A4C25C-085E-4340-85A3-A5531E510DB2}">
+      <thm15:themeFamily xmlns:thm15="http://schemas.microsoft.com/office/thememl/2012/main" name="Office Theme" id="{62F939B6-93AF-4DB8-9C6B-D6C7DFDC589F}" vid="{4A3C46E8-61CC-4603-A589-7422A47A8E4A}"/>
+    </a:ext>
+  </a:extLst>
+</a:theme>
 </file>
</xml_diff>

<commit_message>
Re-Insert last Changes into Presentation
</commit_message>
<xml_diff>
--- a/Documents/Presentation/Presentation.pptx
+++ b/Documents/Presentation/Presentation.pptx
@@ -5,21 +5,20 @@
     <p:sldMasterId id="2147483660" r:id="rId1"/>
   </p:sldMasterIdLst>
   <p:notesMasterIdLst>
-    <p:notesMasterId r:id="rId14"/>
+    <p:notesMasterId r:id="rId13"/>
   </p:notesMasterIdLst>
   <p:sldIdLst>
     <p:sldId id="256" r:id="rId2"/>
     <p:sldId id="257" r:id="rId3"/>
     <p:sldId id="258" r:id="rId4"/>
-    <p:sldId id="259" r:id="rId5"/>
-    <p:sldId id="260" r:id="rId6"/>
-    <p:sldId id="261" r:id="rId7"/>
-    <p:sldId id="262" r:id="rId8"/>
-    <p:sldId id="263" r:id="rId9"/>
-    <p:sldId id="267" r:id="rId10"/>
-    <p:sldId id="264" r:id="rId11"/>
-    <p:sldId id="265" r:id="rId12"/>
-    <p:sldId id="266" r:id="rId13"/>
+    <p:sldId id="260" r:id="rId5"/>
+    <p:sldId id="261" r:id="rId6"/>
+    <p:sldId id="262" r:id="rId7"/>
+    <p:sldId id="263" r:id="rId8"/>
+    <p:sldId id="268" r:id="rId9"/>
+    <p:sldId id="264" r:id="rId10"/>
+    <p:sldId id="265" r:id="rId11"/>
+    <p:sldId id="266" r:id="rId12"/>
   </p:sldIdLst>
   <p:sldSz cx="9144000" cy="6858000" type="screen4x3"/>
   <p:notesSz cx="6858000" cy="9144000"/>
@@ -179,7 +178,7 @@
             </a:lvl1pPr>
           </a:lstStyle>
           <a:p>
-            <a:endParaRPr lang="de-CH"/>
+            <a:endParaRPr lang="en-GB"/>
           </a:p>
         </p:txBody>
       </p:sp>
@@ -210,11 +209,11 @@
             </a:lvl1pPr>
           </a:lstStyle>
           <a:p>
-            <a:fld id="{422E1433-2DF1-4437-AC7B-7DE8561F5EB4}" type="datetimeFigureOut">
-              <a:rPr lang="de-CH" smtClean="0"/>
-              <a:t>12.11.2017</a:t>
+            <a:fld id="{8CA86DDC-4AF9-4FB1-87A1-4AD13A0DDDE5}" type="datetimeFigureOut">
+              <a:rPr lang="en-GB" smtClean="0"/>
+              <a:t>12/11/2017</a:t>
             </a:fld>
-            <a:endParaRPr lang="de-CH"/>
+            <a:endParaRPr lang="en-GB"/>
           </a:p>
         </p:txBody>
       </p:sp>
@@ -247,7 +246,7 @@
           <a:bodyPr vert="horz" lIns="91440" tIns="45720" rIns="91440" bIns="45720" rtlCol="0" anchor="ctr"/>
           <a:lstStyle/>
           <a:p>
-            <a:endParaRPr lang="de-CH"/>
+            <a:endParaRPr lang="en-GB"/>
           </a:p>
         </p:txBody>
       </p:sp>
@@ -307,7 +306,7 @@
               <a:rPr lang="de-DE"/>
               <a:t>Fünfte Ebene</a:t>
             </a:r>
-            <a:endParaRPr lang="de-CH"/>
+            <a:endParaRPr lang="en-GB"/>
           </a:p>
         </p:txBody>
       </p:sp>
@@ -338,7 +337,7 @@
             </a:lvl1pPr>
           </a:lstStyle>
           <a:p>
-            <a:endParaRPr lang="de-CH"/>
+            <a:endParaRPr lang="en-GB"/>
           </a:p>
         </p:txBody>
       </p:sp>
@@ -369,18 +368,18 @@
             </a:lvl1pPr>
           </a:lstStyle>
           <a:p>
-            <a:fld id="{3FD2D971-471F-4C81-8F3A-3142BE01E242}" type="slidenum">
-              <a:rPr lang="de-CH" smtClean="0"/>
+            <a:fld id="{748723F8-CD6B-45E3-B09A-75062809A4AE}" type="slidenum">
+              <a:rPr lang="en-GB" smtClean="0"/>
               <a:t>‹Nr.›</a:t>
             </a:fld>
-            <a:endParaRPr lang="de-CH"/>
+            <a:endParaRPr lang="en-GB"/>
           </a:p>
         </p:txBody>
       </p:sp>
     </p:spTree>
     <p:extLst>
       <p:ext uri="{BB962C8B-B14F-4D97-AF65-F5344CB8AC3E}">
-        <p14:creationId xmlns:p14="http://schemas.microsoft.com/office/powerpoint/2010/main" val="1348365920"/>
+        <p14:creationId xmlns:p14="http://schemas.microsoft.com/office/powerpoint/2010/main" val="2183512438"/>
       </p:ext>
     </p:extLst>
   </p:cSld>
@@ -525,29 +524,404 @@
           <a:lstStyle/>
           <a:p>
             <a:r>
-              <a:rPr lang="de-CH" dirty="0" err="1"/>
-              <a:t>Scrum</a:t>
-            </a:r>
-            <a:r>
-              <a:rPr lang="de-CH" dirty="0"/>
-              <a:t>: Leicht abgeänderte Variante, wöchentliche Sprints, </a:t>
-            </a:r>
-            <a:r>
-              <a:rPr lang="de-CH" dirty="0" err="1"/>
-              <a:t>daily</a:t>
-            </a:r>
-            <a:r>
-              <a:rPr lang="de-CH" dirty="0"/>
+              <a:rPr lang="en-GB" dirty="0"/>
+              <a:t>Grosse Ski </a:t>
+            </a:r>
+            <a:r>
+              <a:rPr lang="en-GB" dirty="0" err="1"/>
+              <a:t>Gebiete</a:t>
+            </a:r>
+            <a:r>
+              <a:rPr lang="en-GB" dirty="0"/>
               <a:t> </a:t>
             </a:r>
             <a:r>
-              <a:rPr lang="de-CH" dirty="0" err="1"/>
-              <a:t>meeting</a:t>
-            </a:r>
-            <a:r>
-              <a:rPr lang="de-CH" dirty="0"/>
-              <a:t> etwa alle 2-3 Tage (WE und Mi/Do)</a:t>
-            </a:r>
+              <a:rPr lang="en-GB" dirty="0" err="1"/>
+              <a:t>haben</a:t>
+            </a:r>
+            <a:r>
+              <a:rPr lang="en-GB" dirty="0"/>
+              <a:t> </a:t>
+            </a:r>
+            <a:r>
+              <a:rPr lang="en-GB" dirty="0" err="1"/>
+              <a:t>eigene</a:t>
+            </a:r>
+            <a:r>
+              <a:rPr lang="en-GB" dirty="0"/>
+              <a:t> Apps.</a:t>
+            </a:r>
+          </a:p>
+          <a:p>
+            <a:pPr marL="171450" indent="-171450">
+              <a:buFontTx/>
+              <a:buChar char="-"/>
+            </a:pPr>
+            <a:r>
+              <a:rPr lang="en-GB" dirty="0" err="1"/>
+              <a:t>Laax</a:t>
+            </a:r>
+            <a:r>
+              <a:rPr lang="en-GB" dirty="0"/>
+              <a:t>, Davos, </a:t>
+            </a:r>
+            <a:r>
+              <a:rPr lang="en-GB" dirty="0" err="1"/>
+              <a:t>Adelboden</a:t>
+            </a:r>
+            <a:endParaRPr lang="en-GB" dirty="0"/>
+          </a:p>
+          <a:p>
+            <a:pPr marL="171450" indent="-171450">
+              <a:buFontTx/>
+              <a:buChar char="-"/>
+            </a:pPr>
+            <a:r>
+              <a:rPr lang="en-GB" dirty="0" err="1"/>
+              <a:t>Lokal</a:t>
+            </a:r>
+            <a:r>
+              <a:rPr lang="en-GB" dirty="0"/>
+              <a:t>, </a:t>
+            </a:r>
+            <a:r>
+              <a:rPr lang="en-GB" dirty="0" err="1"/>
+              <a:t>Abgestimmt</a:t>
+            </a:r>
+            <a:r>
+              <a:rPr lang="en-GB" dirty="0"/>
+              <a:t> auf </a:t>
+            </a:r>
+            <a:r>
+              <a:rPr lang="en-GB" dirty="0" err="1"/>
+              <a:t>jeweilige</a:t>
+            </a:r>
+            <a:r>
+              <a:rPr lang="en-GB" dirty="0"/>
+              <a:t> Destination.</a:t>
+            </a:r>
+          </a:p>
+          <a:p>
+            <a:pPr marL="171450" indent="-171450">
+              <a:buFontTx/>
+              <a:buChar char="-"/>
+            </a:pPr>
+            <a:endParaRPr lang="en-GB" dirty="0"/>
+          </a:p>
+          <a:p>
+            <a:pPr marL="0" indent="0">
+              <a:buFontTx/>
+              <a:buNone/>
+            </a:pPr>
+            <a:r>
+              <a:rPr lang="en-GB" dirty="0" err="1"/>
+              <a:t>iSKI</a:t>
+            </a:r>
+            <a:endParaRPr lang="en-GB" dirty="0"/>
+          </a:p>
+          <a:p>
+            <a:pPr marL="171450" indent="-171450">
+              <a:buFontTx/>
+              <a:buChar char="-"/>
+            </a:pPr>
+            <a:r>
+              <a:rPr lang="en-GB" dirty="0" err="1"/>
+              <a:t>Je</a:t>
+            </a:r>
+            <a:r>
+              <a:rPr lang="en-GB" dirty="0"/>
+              <a:t> Land </a:t>
+            </a:r>
+            <a:r>
+              <a:rPr lang="en-GB" dirty="0" err="1"/>
+              <a:t>ein</a:t>
+            </a:r>
+            <a:r>
+              <a:rPr lang="en-GB" dirty="0"/>
+              <a:t> App.</a:t>
+            </a:r>
+          </a:p>
+          <a:p>
+            <a:pPr marL="171450" indent="-171450">
+              <a:buFontTx/>
+              <a:buChar char="-"/>
+            </a:pPr>
+            <a:r>
+              <a:rPr lang="en-GB" dirty="0"/>
+              <a:t>Community, Ski-Tracker, </a:t>
+            </a:r>
+            <a:r>
+              <a:rPr lang="en-GB" dirty="0" err="1"/>
+              <a:t>vergleichen</a:t>
+            </a:r>
+            <a:r>
+              <a:rPr lang="en-GB" dirty="0"/>
+              <a:t>, </a:t>
+            </a:r>
+          </a:p>
+          <a:p>
+            <a:pPr marL="171450" indent="-171450">
+              <a:buFontTx/>
+              <a:buChar char="-"/>
+            </a:pPr>
+            <a:r>
+              <a:rPr lang="en-GB" dirty="0" err="1"/>
+              <a:t>Aktuelle</a:t>
+            </a:r>
+            <a:r>
+              <a:rPr lang="en-GB" dirty="0"/>
+              <a:t> Status, </a:t>
+            </a:r>
+            <a:r>
+              <a:rPr lang="en-GB" dirty="0" err="1"/>
+              <a:t>Informationen</a:t>
+            </a:r>
+            <a:r>
+              <a:rPr lang="en-GB" dirty="0"/>
+              <a:t> und Wetter</a:t>
+            </a:r>
+          </a:p>
+          <a:p>
+            <a:pPr marL="171450" indent="-171450">
+              <a:buFontTx/>
+              <a:buChar char="-"/>
+            </a:pPr>
+            <a:r>
+              <a:rPr lang="en-GB" dirty="0" err="1"/>
+              <a:t>Schlägt</a:t>
+            </a:r>
+            <a:r>
+              <a:rPr lang="en-GB" dirty="0"/>
+              <a:t> </a:t>
+            </a:r>
+            <a:r>
+              <a:rPr lang="en-GB" dirty="0" err="1"/>
+              <a:t>Skigebiete</a:t>
+            </a:r>
+            <a:r>
+              <a:rPr lang="en-GB" dirty="0"/>
+              <a:t> </a:t>
+            </a:r>
+            <a:r>
+              <a:rPr lang="en-GB" dirty="0" err="1"/>
+              <a:t>vor</a:t>
+            </a:r>
+            <a:r>
+              <a:rPr lang="en-GB" dirty="0"/>
+              <a:t> </a:t>
+            </a:r>
+            <a:r>
+              <a:rPr lang="en-GB" dirty="0" err="1"/>
+              <a:t>jedoch</a:t>
+            </a:r>
+            <a:r>
+              <a:rPr lang="en-GB" dirty="0"/>
+              <a:t> </a:t>
+            </a:r>
+            <a:r>
+              <a:rPr lang="en-GB" dirty="0" err="1"/>
+              <a:t>Standort</a:t>
+            </a:r>
+            <a:r>
+              <a:rPr lang="en-GB" dirty="0"/>
+              <a:t> </a:t>
+            </a:r>
+            <a:r>
+              <a:rPr lang="en-GB" dirty="0" err="1"/>
+              <a:t>unabhängig</a:t>
+            </a:r>
+            <a:endParaRPr lang="en-GB" dirty="0"/>
+          </a:p>
+          <a:p>
+            <a:pPr marL="171450" indent="-171450">
+              <a:buFontTx/>
+              <a:buChar char="-"/>
+            </a:pPr>
+            <a:endParaRPr lang="en-GB" dirty="0"/>
+          </a:p>
+          <a:p>
+            <a:pPr marL="0" indent="0">
+              <a:buFontTx/>
+              <a:buNone/>
+            </a:pPr>
+            <a:r>
+              <a:rPr lang="en-GB" dirty="0" err="1"/>
+              <a:t>Bergfex</a:t>
+            </a:r>
+            <a:endParaRPr lang="en-GB" dirty="0"/>
+          </a:p>
+          <a:p>
+            <a:pPr marL="171450" indent="-171450">
+              <a:buFontTx/>
+              <a:buChar char="-"/>
+            </a:pPr>
+            <a:r>
+              <a:rPr lang="en-GB" dirty="0" err="1"/>
+              <a:t>Wetterberichte</a:t>
+            </a:r>
+            <a:r>
+              <a:rPr lang="en-GB" dirty="0"/>
+              <a:t>, Status, Webcams,  </a:t>
+            </a:r>
+            <a:r>
+              <a:rPr lang="en-GB" dirty="0" err="1"/>
+              <a:t>Pistenpläne</a:t>
+            </a:r>
+            <a:endParaRPr lang="en-GB" dirty="0"/>
+          </a:p>
+          <a:p>
+            <a:pPr marL="171450" indent="-171450">
+              <a:buFontTx/>
+              <a:buChar char="-"/>
+            </a:pPr>
+            <a:r>
+              <a:rPr lang="en-GB" dirty="0" err="1"/>
+              <a:t>Alle</a:t>
+            </a:r>
+            <a:r>
+              <a:rPr lang="en-GB" dirty="0"/>
+              <a:t> </a:t>
+            </a:r>
+            <a:r>
+              <a:rPr lang="en-GB" dirty="0" err="1"/>
+              <a:t>Gebiete</a:t>
+            </a:r>
+            <a:r>
+              <a:rPr lang="en-GB" dirty="0"/>
+              <a:t> </a:t>
+            </a:r>
+            <a:r>
+              <a:rPr lang="en-GB" dirty="0" err="1"/>
+              <a:t>durchsuchen</a:t>
+            </a:r>
+            <a:endParaRPr lang="en-GB" dirty="0"/>
+          </a:p>
+          <a:p>
+            <a:pPr marL="171450" indent="-171450">
+              <a:buFontTx/>
+              <a:buChar char="-"/>
+            </a:pPr>
+            <a:r>
+              <a:rPr lang="en-GB" dirty="0" err="1"/>
+              <a:t>Eigene</a:t>
+            </a:r>
+            <a:r>
+              <a:rPr lang="en-GB" dirty="0"/>
+              <a:t> </a:t>
+            </a:r>
+            <a:r>
+              <a:rPr lang="en-GB" dirty="0" err="1"/>
+              <a:t>Favoriten</a:t>
+            </a:r>
+            <a:endParaRPr lang="en-GB" dirty="0"/>
+          </a:p>
+          <a:p>
+            <a:pPr marL="171450" indent="-171450">
+              <a:buFontTx/>
+              <a:buChar char="-"/>
+            </a:pPr>
+            <a:endParaRPr lang="en-GB" dirty="0"/>
+          </a:p>
+          <a:p>
+            <a:pPr marL="0" indent="0">
+              <a:buFontTx/>
+              <a:buNone/>
+            </a:pPr>
+            <a:r>
+              <a:rPr lang="en-GB" dirty="0" err="1"/>
+              <a:t>Skiinfo</a:t>
+            </a:r>
+            <a:endParaRPr lang="en-GB" dirty="0"/>
+          </a:p>
+          <a:p>
+            <a:pPr marL="171450" indent="-171450">
+              <a:buFontTx/>
+              <a:buChar char="-"/>
+            </a:pPr>
+            <a:r>
+              <a:rPr lang="en-GB" dirty="0" err="1"/>
+              <a:t>Ähnlich</a:t>
+            </a:r>
+            <a:r>
+              <a:rPr lang="en-GB" dirty="0"/>
+              <a:t> </a:t>
+            </a:r>
+            <a:r>
+              <a:rPr lang="en-GB" dirty="0" err="1"/>
+              <a:t>wie</a:t>
+            </a:r>
+            <a:r>
+              <a:rPr lang="en-GB" dirty="0"/>
+              <a:t> </a:t>
+            </a:r>
+            <a:r>
+              <a:rPr lang="en-GB" dirty="0" err="1"/>
+              <a:t>Bergfex</a:t>
+            </a:r>
+            <a:endParaRPr lang="en-GB" dirty="0"/>
+          </a:p>
+          <a:p>
+            <a:pPr marL="0" indent="0">
+              <a:buFontTx/>
+              <a:buNone/>
+            </a:pPr>
+            <a:endParaRPr lang="en-GB" dirty="0"/>
+          </a:p>
+          <a:p>
+            <a:pPr marL="0" indent="0">
+              <a:buFontTx/>
+              <a:buNone/>
+            </a:pPr>
+            <a:r>
+              <a:rPr lang="en-GB" dirty="0"/>
+              <a:t>Skiresort.de</a:t>
+            </a:r>
+          </a:p>
+          <a:p>
+            <a:pPr marL="171450" indent="-171450">
+              <a:buFontTx/>
+              <a:buChar char="-"/>
+            </a:pPr>
+            <a:r>
+              <a:rPr lang="en-GB" dirty="0" err="1"/>
+              <a:t>Ähnlich</a:t>
+            </a:r>
+            <a:r>
+              <a:rPr lang="en-GB" dirty="0"/>
+              <a:t> </a:t>
+            </a:r>
+            <a:r>
+              <a:rPr lang="en-GB" dirty="0" err="1"/>
+              <a:t>wie</a:t>
+            </a:r>
+            <a:r>
+              <a:rPr lang="en-GB" dirty="0"/>
+              <a:t> </a:t>
+            </a:r>
+            <a:r>
+              <a:rPr lang="en-GB" dirty="0" err="1"/>
+              <a:t>Bergfext</a:t>
+            </a:r>
+            <a:endParaRPr lang="en-GB" dirty="0"/>
+          </a:p>
+          <a:p>
+            <a:pPr marL="171450" indent="-171450">
+              <a:buFontTx/>
+              <a:buChar char="-"/>
+            </a:pPr>
+            <a:r>
+              <a:rPr lang="en-GB" dirty="0" err="1"/>
+              <a:t>Suchen</a:t>
+            </a:r>
+            <a:r>
+              <a:rPr lang="en-GB" dirty="0"/>
+              <a:t> in </a:t>
+            </a:r>
+            <a:r>
+              <a:rPr lang="en-GB" dirty="0" err="1"/>
+              <a:t>Umgebung</a:t>
+            </a:r>
+            <a:endParaRPr lang="en-GB" dirty="0"/>
           </a:p>
         </p:txBody>
       </p:sp>
@@ -566,18 +940,1301 @@
           <a:bodyPr/>
           <a:lstStyle/>
           <a:p>
-            <a:fld id="{3FD2D971-471F-4C81-8F3A-3142BE01E242}" type="slidenum">
-              <a:rPr lang="de-CH" smtClean="0"/>
-              <a:t>10</a:t>
+            <a:fld id="{748723F8-CD6B-45E3-B09A-75062809A4AE}" type="slidenum">
+              <a:rPr lang="en-GB" smtClean="0"/>
+              <a:t>5</a:t>
             </a:fld>
-            <a:endParaRPr lang="de-CH"/>
+            <a:endParaRPr lang="en-GB"/>
           </a:p>
         </p:txBody>
       </p:sp>
     </p:spTree>
     <p:extLst>
       <p:ext uri="{BB962C8B-B14F-4D97-AF65-F5344CB8AC3E}">
-        <p14:creationId xmlns:p14="http://schemas.microsoft.com/office/powerpoint/2010/main" val="3108355392"/>
+        <p14:creationId xmlns:p14="http://schemas.microsoft.com/office/powerpoint/2010/main" val="242691541"/>
+      </p:ext>
+    </p:extLst>
+  </p:cSld>
+  <p:clrMapOvr>
+    <a:masterClrMapping/>
+  </p:clrMapOvr>
+</p:notes>
+</file>
+
+<file path=ppt/notesSlides/notesSlide2.xml><?xml version="1.0" encoding="utf-8"?>
+<p:notes xmlns:a="http://schemas.openxmlformats.org/drawingml/2006/main" xmlns:r="http://schemas.openxmlformats.org/officeDocument/2006/relationships" xmlns:p="http://schemas.openxmlformats.org/presentationml/2006/main">
+  <p:cSld>
+    <p:spTree>
+      <p:nvGrpSpPr>
+        <p:cNvPr id="1" name=""/>
+        <p:cNvGrpSpPr/>
+        <p:nvPr/>
+      </p:nvGrpSpPr>
+      <p:grpSpPr>
+        <a:xfrm>
+          <a:off x="0" y="0"/>
+          <a:ext cx="0" cy="0"/>
+          <a:chOff x="0" y="0"/>
+          <a:chExt cx="0" cy="0"/>
+        </a:xfrm>
+      </p:grpSpPr>
+      <p:sp>
+        <p:nvSpPr>
+          <p:cNvPr id="2" name="Folienbildplatzhalter 1"/>
+          <p:cNvSpPr>
+            <a:spLocks noGrp="1" noRot="1" noChangeAspect="1"/>
+          </p:cNvSpPr>
+          <p:nvPr>
+            <p:ph type="sldImg"/>
+          </p:nvPr>
+        </p:nvSpPr>
+        <p:spPr/>
+      </p:sp>
+      <p:sp>
+        <p:nvSpPr>
+          <p:cNvPr id="3" name="Notizenplatzhalter 2"/>
+          <p:cNvSpPr>
+            <a:spLocks noGrp="1"/>
+          </p:cNvSpPr>
+          <p:nvPr>
+            <p:ph type="body" idx="1"/>
+          </p:nvPr>
+        </p:nvSpPr>
+        <p:spPr/>
+        <p:txBody>
+          <a:bodyPr/>
+          <a:lstStyle/>
+          <a:p>
+            <a:endParaRPr lang="en-GB" dirty="0"/>
+          </a:p>
+        </p:txBody>
+      </p:sp>
+      <p:sp>
+        <p:nvSpPr>
+          <p:cNvPr id="4" name="Foliennummernplatzhalter 3"/>
+          <p:cNvSpPr>
+            <a:spLocks noGrp="1"/>
+          </p:cNvSpPr>
+          <p:nvPr>
+            <p:ph type="sldNum" sz="quarter" idx="10"/>
+          </p:nvPr>
+        </p:nvSpPr>
+        <p:spPr/>
+        <p:txBody>
+          <a:bodyPr/>
+          <a:lstStyle/>
+          <a:p>
+            <a:fld id="{748723F8-CD6B-45E3-B09A-75062809A4AE}" type="slidenum">
+              <a:rPr lang="en-GB" smtClean="0"/>
+              <a:t>6</a:t>
+            </a:fld>
+            <a:endParaRPr lang="en-GB"/>
+          </a:p>
+        </p:txBody>
+      </p:sp>
+    </p:spTree>
+    <p:extLst>
+      <p:ext uri="{BB962C8B-B14F-4D97-AF65-F5344CB8AC3E}">
+        <p14:creationId xmlns:p14="http://schemas.microsoft.com/office/powerpoint/2010/main" val="1800144089"/>
+      </p:ext>
+    </p:extLst>
+  </p:cSld>
+  <p:clrMapOvr>
+    <a:masterClrMapping/>
+  </p:clrMapOvr>
+</p:notes>
+</file>
+
+<file path=ppt/notesSlides/notesSlide3.xml><?xml version="1.0" encoding="utf-8"?>
+<p:notes xmlns:a="http://schemas.openxmlformats.org/drawingml/2006/main" xmlns:r="http://schemas.openxmlformats.org/officeDocument/2006/relationships" xmlns:p="http://schemas.openxmlformats.org/presentationml/2006/main">
+  <p:cSld>
+    <p:spTree>
+      <p:nvGrpSpPr>
+        <p:cNvPr id="1" name=""/>
+        <p:cNvGrpSpPr/>
+        <p:nvPr/>
+      </p:nvGrpSpPr>
+      <p:grpSpPr>
+        <a:xfrm>
+          <a:off x="0" y="0"/>
+          <a:ext cx="0" cy="0"/>
+          <a:chOff x="0" y="0"/>
+          <a:chExt cx="0" cy="0"/>
+        </a:xfrm>
+      </p:grpSpPr>
+      <p:sp>
+        <p:nvSpPr>
+          <p:cNvPr id="2" name="Folienbildplatzhalter 1"/>
+          <p:cNvSpPr>
+            <a:spLocks noGrp="1" noRot="1" noChangeAspect="1"/>
+          </p:cNvSpPr>
+          <p:nvPr>
+            <p:ph type="sldImg"/>
+          </p:nvPr>
+        </p:nvSpPr>
+        <p:spPr/>
+      </p:sp>
+      <p:sp>
+        <p:nvSpPr>
+          <p:cNvPr id="3" name="Notizenplatzhalter 2"/>
+          <p:cNvSpPr>
+            <a:spLocks noGrp="1"/>
+          </p:cNvSpPr>
+          <p:nvPr>
+            <p:ph type="body" idx="1"/>
+          </p:nvPr>
+        </p:nvSpPr>
+        <p:spPr/>
+        <p:txBody>
+          <a:bodyPr/>
+          <a:lstStyle/>
+          <a:p>
+            <a:pPr marL="0" marR="0" lvl="0" indent="0" algn="l" defTabSz="914400" rtl="0" eaLnBrk="1" fontAlgn="auto" latinLnBrk="0" hangingPunct="1">
+              <a:lnSpc>
+                <a:spcPct val="100000"/>
+              </a:lnSpc>
+              <a:spcBef>
+                <a:spcPts val="0"/>
+              </a:spcBef>
+              <a:spcAft>
+                <a:spcPts val="0"/>
+              </a:spcAft>
+              <a:buClrTx/>
+              <a:buSzTx/>
+              <a:buFontTx/>
+              <a:buNone/>
+              <a:tabLst/>
+              <a:defRPr/>
+            </a:pPr>
+            <a:r>
+              <a:rPr lang="de-CH" dirty="0" err="1"/>
+              <a:t>Scrum</a:t>
+            </a:r>
+            <a:r>
+              <a:rPr lang="de-CH" dirty="0"/>
+              <a:t>: Leicht abgeänderte Variante, wöchentliche Sprints, </a:t>
+            </a:r>
+            <a:r>
+              <a:rPr lang="de-CH" dirty="0" err="1"/>
+              <a:t>daily</a:t>
+            </a:r>
+            <a:r>
+              <a:rPr lang="de-CH" dirty="0"/>
+              <a:t> </a:t>
+            </a:r>
+            <a:r>
+              <a:rPr lang="de-CH" dirty="0" err="1"/>
+              <a:t>meeting</a:t>
+            </a:r>
+            <a:r>
+              <a:rPr lang="de-CH" dirty="0"/>
+              <a:t> etwa alle 2-3 Tage (WE und Mi/Do)</a:t>
+            </a:r>
+          </a:p>
+          <a:p>
+            <a:endParaRPr lang="en-GB" dirty="0"/>
+          </a:p>
+        </p:txBody>
+      </p:sp>
+      <p:sp>
+        <p:nvSpPr>
+          <p:cNvPr id="4" name="Foliennummernplatzhalter 3"/>
+          <p:cNvSpPr>
+            <a:spLocks noGrp="1"/>
+          </p:cNvSpPr>
+          <p:nvPr>
+            <p:ph type="sldNum" sz="quarter" idx="10"/>
+          </p:nvPr>
+        </p:nvSpPr>
+        <p:spPr/>
+        <p:txBody>
+          <a:bodyPr/>
+          <a:lstStyle/>
+          <a:p>
+            <a:fld id="{748723F8-CD6B-45E3-B09A-75062809A4AE}" type="slidenum">
+              <a:rPr lang="en-GB" smtClean="0"/>
+              <a:t>9</a:t>
+            </a:fld>
+            <a:endParaRPr lang="en-GB"/>
+          </a:p>
+        </p:txBody>
+      </p:sp>
+    </p:spTree>
+    <p:extLst>
+      <p:ext uri="{BB962C8B-B14F-4D97-AF65-F5344CB8AC3E}">
+        <p14:creationId xmlns:p14="http://schemas.microsoft.com/office/powerpoint/2010/main" val="187494911"/>
+      </p:ext>
+    </p:extLst>
+  </p:cSld>
+  <p:clrMapOvr>
+    <a:masterClrMapping/>
+  </p:clrMapOvr>
+</p:notes>
+</file>
+
+<file path=ppt/notesSlides/notesSlide4.xml><?xml version="1.0" encoding="utf-8"?>
+<p:notes xmlns:a="http://schemas.openxmlformats.org/drawingml/2006/main" xmlns:r="http://schemas.openxmlformats.org/officeDocument/2006/relationships" xmlns:p="http://schemas.openxmlformats.org/presentationml/2006/main">
+  <p:cSld>
+    <p:spTree>
+      <p:nvGrpSpPr>
+        <p:cNvPr id="1" name=""/>
+        <p:cNvGrpSpPr/>
+        <p:nvPr/>
+      </p:nvGrpSpPr>
+      <p:grpSpPr>
+        <a:xfrm>
+          <a:off x="0" y="0"/>
+          <a:ext cx="0" cy="0"/>
+          <a:chOff x="0" y="0"/>
+          <a:chExt cx="0" cy="0"/>
+        </a:xfrm>
+      </p:grpSpPr>
+      <p:sp>
+        <p:nvSpPr>
+          <p:cNvPr id="2" name="Folienbildplatzhalter 1"/>
+          <p:cNvSpPr>
+            <a:spLocks noGrp="1" noRot="1" noChangeAspect="1"/>
+          </p:cNvSpPr>
+          <p:nvPr>
+            <p:ph type="sldImg"/>
+          </p:nvPr>
+        </p:nvSpPr>
+        <p:spPr/>
+      </p:sp>
+      <p:sp>
+        <p:nvSpPr>
+          <p:cNvPr id="3" name="Notizenplatzhalter 2"/>
+          <p:cNvSpPr>
+            <a:spLocks noGrp="1"/>
+          </p:cNvSpPr>
+          <p:nvPr>
+            <p:ph type="body" idx="1"/>
+          </p:nvPr>
+        </p:nvSpPr>
+        <p:spPr/>
+        <p:txBody>
+          <a:bodyPr/>
+          <a:lstStyle/>
+          <a:p>
+            <a:r>
+              <a:rPr lang="en-GB" dirty="0"/>
+              <a:t>JUnit Test</a:t>
+            </a:r>
+          </a:p>
+          <a:p>
+            <a:pPr marL="171450" indent="-171450">
+              <a:buFontTx/>
+              <a:buChar char="-"/>
+            </a:pPr>
+            <a:r>
+              <a:rPr lang="en-GB" dirty="0"/>
+              <a:t>Test der </a:t>
+            </a:r>
+            <a:r>
+              <a:rPr lang="en-GB" dirty="0" err="1"/>
+              <a:t>Sortierungen</a:t>
+            </a:r>
+            <a:r>
+              <a:rPr lang="en-GB" dirty="0"/>
+              <a:t> -&gt; </a:t>
+            </a:r>
+            <a:r>
+              <a:rPr lang="en-GB" dirty="0" err="1"/>
+              <a:t>Distanz</a:t>
+            </a:r>
+            <a:r>
+              <a:rPr lang="en-GB" dirty="0"/>
+              <a:t>, Wetter, Status, </a:t>
+            </a:r>
+            <a:r>
+              <a:rPr lang="en-GB" dirty="0" err="1"/>
+              <a:t>Geöffneten</a:t>
+            </a:r>
+            <a:r>
+              <a:rPr lang="en-GB" dirty="0"/>
+              <a:t> </a:t>
+            </a:r>
+            <a:r>
+              <a:rPr lang="en-GB" dirty="0" err="1"/>
+              <a:t>Pisten</a:t>
+            </a:r>
+            <a:r>
+              <a:rPr lang="en-GB" dirty="0"/>
+              <a:t> und </a:t>
+            </a:r>
+            <a:r>
+              <a:rPr lang="en-GB" dirty="0" err="1"/>
+              <a:t>Lifte</a:t>
+            </a:r>
+            <a:endParaRPr lang="en-GB" dirty="0"/>
+          </a:p>
+          <a:p>
+            <a:pPr marL="171450" indent="-171450">
+              <a:buFontTx/>
+              <a:buChar char="-"/>
+            </a:pPr>
+            <a:r>
+              <a:rPr lang="en-GB" dirty="0" err="1"/>
+              <a:t>Serializierung</a:t>
+            </a:r>
+            <a:r>
+              <a:rPr lang="en-GB" dirty="0"/>
+              <a:t> und </a:t>
+            </a:r>
+            <a:r>
+              <a:rPr lang="en-GB" dirty="0" err="1"/>
+              <a:t>Deserializierung</a:t>
+            </a:r>
+            <a:r>
+              <a:rPr lang="en-GB" dirty="0"/>
+              <a:t> </a:t>
+            </a:r>
+            <a:r>
+              <a:rPr lang="en-GB" dirty="0" err="1"/>
+              <a:t>mittels</a:t>
+            </a:r>
+            <a:r>
+              <a:rPr lang="en-GB" dirty="0"/>
+              <a:t> </a:t>
+            </a:r>
+            <a:r>
+              <a:rPr lang="en-GB" dirty="0" err="1"/>
+              <a:t>GSon</a:t>
+            </a:r>
+            <a:r>
+              <a:rPr lang="en-GB" dirty="0"/>
+              <a:t>. </a:t>
+            </a:r>
+            <a:r>
+              <a:rPr lang="en-GB" dirty="0" err="1"/>
+              <a:t>Benötigt</a:t>
+            </a:r>
+            <a:r>
+              <a:rPr lang="en-GB" dirty="0"/>
+              <a:t> </a:t>
+            </a:r>
+            <a:r>
+              <a:rPr lang="en-GB" dirty="0" err="1"/>
+              <a:t>beim</a:t>
+            </a:r>
+            <a:r>
+              <a:rPr lang="en-GB" dirty="0"/>
+              <a:t> </a:t>
+            </a:r>
+            <a:r>
+              <a:rPr lang="en-GB" dirty="0" err="1"/>
+              <a:t>Empfangen</a:t>
+            </a:r>
+            <a:r>
+              <a:rPr lang="en-GB" dirty="0"/>
+              <a:t> von </a:t>
+            </a:r>
+            <a:r>
+              <a:rPr lang="en-GB" dirty="0" err="1"/>
+              <a:t>Daten</a:t>
+            </a:r>
+            <a:r>
+              <a:rPr lang="en-GB" dirty="0"/>
+              <a:t> der </a:t>
+            </a:r>
+            <a:r>
+              <a:rPr lang="en-GB" dirty="0" err="1"/>
+              <a:t>beiden</a:t>
+            </a:r>
+            <a:r>
+              <a:rPr lang="en-GB" dirty="0"/>
+              <a:t> API’s</a:t>
+            </a:r>
+          </a:p>
+          <a:p>
+            <a:pPr marL="0" indent="0">
+              <a:buFontTx/>
+              <a:buNone/>
+            </a:pPr>
+            <a:endParaRPr lang="en-GB" dirty="0"/>
+          </a:p>
+          <a:p>
+            <a:pPr marL="0" indent="0">
+              <a:buFontTx/>
+              <a:buNone/>
+            </a:pPr>
+            <a:r>
+              <a:rPr lang="en-GB" dirty="0"/>
+              <a:t>Code Coverage</a:t>
+            </a:r>
+          </a:p>
+          <a:p>
+            <a:pPr marL="171450" indent="-171450">
+              <a:buFontTx/>
+              <a:buChar char="-"/>
+            </a:pPr>
+            <a:r>
+              <a:rPr lang="en-GB" dirty="0" err="1"/>
+              <a:t>Aktuell</a:t>
+            </a:r>
+            <a:r>
+              <a:rPr lang="en-GB" dirty="0"/>
+              <a:t> </a:t>
+            </a:r>
+            <a:r>
+              <a:rPr lang="en-GB" dirty="0" err="1"/>
+              <a:t>bei</a:t>
+            </a:r>
+            <a:r>
+              <a:rPr lang="en-GB" dirty="0"/>
+              <a:t> ca 30%</a:t>
+            </a:r>
+          </a:p>
+          <a:p>
+            <a:pPr marL="171450" indent="-171450">
+              <a:buFontTx/>
+              <a:buChar char="-"/>
+            </a:pPr>
+            <a:endParaRPr lang="en-GB" dirty="0"/>
+          </a:p>
+          <a:p>
+            <a:pPr marL="0" indent="0">
+              <a:buFontTx/>
+              <a:buNone/>
+            </a:pPr>
+            <a:r>
+              <a:rPr lang="en-GB" dirty="0" err="1"/>
+              <a:t>SonarQube</a:t>
+            </a:r>
+            <a:endParaRPr lang="en-GB" dirty="0"/>
+          </a:p>
+          <a:p>
+            <a:pPr marL="171450" indent="-171450">
+              <a:buFontTx/>
+              <a:buChar char="-"/>
+            </a:pPr>
+            <a:r>
+              <a:rPr lang="en-GB" dirty="0" err="1"/>
+              <a:t>Einige</a:t>
+            </a:r>
+            <a:r>
+              <a:rPr lang="en-GB" dirty="0"/>
+              <a:t> </a:t>
+            </a:r>
+            <a:r>
+              <a:rPr lang="en-GB" dirty="0" err="1"/>
+              <a:t>Punkte</a:t>
+            </a:r>
+            <a:r>
+              <a:rPr lang="en-GB" dirty="0"/>
+              <a:t> </a:t>
+            </a:r>
+            <a:r>
+              <a:rPr lang="en-GB" dirty="0" err="1"/>
+              <a:t>können</a:t>
+            </a:r>
+            <a:r>
+              <a:rPr lang="en-GB" dirty="0"/>
+              <a:t> </a:t>
+            </a:r>
+            <a:r>
+              <a:rPr lang="en-GB" dirty="0" err="1"/>
+              <a:t>nicht</a:t>
+            </a:r>
+            <a:r>
+              <a:rPr lang="en-GB" dirty="0"/>
+              <a:t> </a:t>
+            </a:r>
+            <a:r>
+              <a:rPr lang="en-GB" dirty="0" err="1"/>
+              <a:t>gefixt</a:t>
+            </a:r>
+            <a:r>
+              <a:rPr lang="en-GB" dirty="0"/>
+              <a:t> warden</a:t>
+            </a:r>
+          </a:p>
+          <a:p>
+            <a:pPr marL="171450" indent="-171450">
+              <a:buFontTx/>
+              <a:buChar char="-"/>
+            </a:pPr>
+            <a:r>
+              <a:rPr lang="en-GB" dirty="0" err="1"/>
+              <a:t>Bsp</a:t>
+            </a:r>
+            <a:r>
+              <a:rPr lang="en-GB" dirty="0"/>
+              <a:t>: </a:t>
+            </a:r>
+            <a:r>
+              <a:rPr lang="en-GB" dirty="0" err="1"/>
+              <a:t>Enum</a:t>
+            </a:r>
+            <a:r>
+              <a:rPr lang="en-GB" dirty="0"/>
+              <a:t> </a:t>
+            </a:r>
+            <a:r>
+              <a:rPr lang="en-GB" dirty="0" err="1"/>
+              <a:t>müssen</a:t>
+            </a:r>
+            <a:r>
+              <a:rPr lang="en-GB" dirty="0"/>
+              <a:t> Gross </a:t>
+            </a:r>
+            <a:r>
+              <a:rPr lang="en-GB" dirty="0" err="1"/>
+              <a:t>geschriben</a:t>
+            </a:r>
+            <a:r>
+              <a:rPr lang="en-GB" dirty="0"/>
+              <a:t> warden, </a:t>
+            </a:r>
+            <a:r>
+              <a:rPr lang="en-GB" dirty="0" err="1"/>
+              <a:t>jedoch</a:t>
+            </a:r>
+            <a:r>
+              <a:rPr lang="en-GB" dirty="0"/>
+              <a:t> die API </a:t>
+            </a:r>
+            <a:r>
+              <a:rPr lang="en-GB" dirty="0" err="1"/>
+              <a:t>benutzt</a:t>
+            </a:r>
+            <a:r>
+              <a:rPr lang="en-GB" dirty="0"/>
+              <a:t> </a:t>
+            </a:r>
+            <a:r>
+              <a:rPr lang="en-GB" dirty="0" err="1"/>
+              <a:t>andere</a:t>
+            </a:r>
+            <a:r>
+              <a:rPr lang="en-GB" dirty="0"/>
+              <a:t> </a:t>
+            </a:r>
+            <a:r>
+              <a:rPr lang="en-GB" dirty="0" err="1"/>
+              <a:t>Schreibweise</a:t>
+            </a:r>
+            <a:r>
+              <a:rPr lang="en-GB" dirty="0"/>
+              <a:t> und </a:t>
+            </a:r>
+            <a:r>
+              <a:rPr lang="en-GB" dirty="0" err="1"/>
+              <a:t>währe</a:t>
+            </a:r>
+            <a:r>
+              <a:rPr lang="en-GB" dirty="0"/>
+              <a:t> </a:t>
+            </a:r>
+            <a:r>
+              <a:rPr lang="en-GB" dirty="0" err="1"/>
+              <a:t>somit</a:t>
+            </a:r>
+            <a:r>
+              <a:rPr lang="en-GB" dirty="0"/>
+              <a:t> </a:t>
+            </a:r>
+            <a:r>
+              <a:rPr lang="en-GB" dirty="0" err="1"/>
+              <a:t>nicht</a:t>
+            </a:r>
+            <a:r>
+              <a:rPr lang="en-GB" dirty="0"/>
+              <a:t> </a:t>
+            </a:r>
+            <a:r>
+              <a:rPr lang="en-GB" dirty="0" err="1"/>
+              <a:t>kompatibel</a:t>
+            </a:r>
+            <a:endParaRPr lang="en-GB" dirty="0"/>
+          </a:p>
+          <a:p>
+            <a:pPr marL="171450" indent="-171450">
+              <a:buFontTx/>
+              <a:buChar char="-"/>
+            </a:pPr>
+            <a:r>
+              <a:rPr lang="en-GB" dirty="0" err="1"/>
+              <a:t>Einige</a:t>
+            </a:r>
+            <a:r>
+              <a:rPr lang="en-GB" dirty="0"/>
+              <a:t> Android Klassen </a:t>
+            </a:r>
+            <a:r>
+              <a:rPr lang="en-GB" dirty="0" err="1"/>
+              <a:t>haben</a:t>
+            </a:r>
+            <a:r>
+              <a:rPr lang="en-GB" dirty="0"/>
+              <a:t> </a:t>
+            </a:r>
+            <a:r>
+              <a:rPr lang="en-GB" dirty="0" err="1"/>
+              <a:t>scho</a:t>
+            </a:r>
+            <a:r>
+              <a:rPr lang="en-GB" dirty="0"/>
+              <a:t> </a:t>
+            </a:r>
+            <a:r>
+              <a:rPr lang="en-GB" dirty="0" err="1"/>
+              <a:t>mehr</a:t>
+            </a:r>
+            <a:r>
+              <a:rPr lang="en-GB" dirty="0"/>
+              <a:t> </a:t>
+            </a:r>
+            <a:r>
+              <a:rPr lang="en-GB" dirty="0" err="1"/>
+              <a:t>als</a:t>
+            </a:r>
+            <a:r>
+              <a:rPr lang="en-GB" dirty="0"/>
+              <a:t> 5 </a:t>
+            </a:r>
+            <a:r>
+              <a:rPr lang="en-GB" dirty="0" err="1"/>
+              <a:t>Vererbungen</a:t>
+            </a:r>
+            <a:r>
+              <a:rPr lang="en-GB" dirty="0"/>
+              <a:t>.</a:t>
+            </a:r>
+          </a:p>
+          <a:p>
+            <a:pPr marL="0" indent="0">
+              <a:buFontTx/>
+              <a:buNone/>
+            </a:pPr>
+            <a:endParaRPr lang="en-GB" dirty="0"/>
+          </a:p>
+          <a:p>
+            <a:pPr marL="0" indent="0">
+              <a:buFontTx/>
+              <a:buNone/>
+            </a:pPr>
+            <a:r>
+              <a:rPr lang="en-GB" dirty="0"/>
+              <a:t>Monkey-Test</a:t>
+            </a:r>
+          </a:p>
+          <a:p>
+            <a:pPr marL="171450" indent="-171450">
+              <a:buFontTx/>
+              <a:buChar char="-"/>
+            </a:pPr>
+            <a:r>
+              <a:rPr lang="en-GB" dirty="0" err="1"/>
+              <a:t>Zum</a:t>
+            </a:r>
+            <a:r>
+              <a:rPr lang="en-GB" dirty="0"/>
+              <a:t> </a:t>
+            </a:r>
+            <a:r>
+              <a:rPr lang="en-GB" dirty="0" err="1"/>
+              <a:t>testen</a:t>
+            </a:r>
+            <a:r>
+              <a:rPr lang="en-GB" dirty="0"/>
+              <a:t> der </a:t>
+            </a:r>
+            <a:r>
+              <a:rPr lang="en-GB" dirty="0" err="1"/>
+              <a:t>Stabilität</a:t>
+            </a:r>
+            <a:r>
+              <a:rPr lang="en-GB" dirty="0"/>
+              <a:t>. In ADB (Android </a:t>
+            </a:r>
+            <a:r>
+              <a:rPr lang="en-GB" dirty="0" err="1"/>
+              <a:t>Debuging</a:t>
+            </a:r>
+            <a:r>
+              <a:rPr lang="en-GB" dirty="0"/>
+              <a:t> Bridge) </a:t>
+            </a:r>
+            <a:r>
+              <a:rPr lang="en-GB" dirty="0" err="1"/>
+              <a:t>integriert</a:t>
+            </a:r>
+            <a:r>
+              <a:rPr lang="en-GB" dirty="0"/>
+              <a:t>.</a:t>
+            </a:r>
+          </a:p>
+          <a:p>
+            <a:pPr marL="171450" indent="-171450">
+              <a:buFontTx/>
+              <a:buChar char="-"/>
+            </a:pPr>
+            <a:r>
+              <a:rPr lang="en-GB" dirty="0" err="1"/>
+              <a:t>Macht</a:t>
+            </a:r>
+            <a:r>
+              <a:rPr lang="en-GB" dirty="0"/>
+              <a:t> pseudo Random </a:t>
+            </a:r>
+            <a:r>
+              <a:rPr lang="en-GB" dirty="0" err="1"/>
+              <a:t>interaktionen</a:t>
+            </a:r>
+            <a:r>
+              <a:rPr lang="en-GB" dirty="0"/>
+              <a:t> </a:t>
+            </a:r>
+            <a:r>
+              <a:rPr lang="en-GB" dirty="0" err="1"/>
+              <a:t>mit</a:t>
+            </a:r>
+            <a:r>
+              <a:rPr lang="en-GB" dirty="0"/>
+              <a:t> </a:t>
+            </a:r>
+            <a:r>
+              <a:rPr lang="en-GB" dirty="0" err="1"/>
+              <a:t>dem</a:t>
+            </a:r>
+            <a:r>
+              <a:rPr lang="en-GB" dirty="0"/>
+              <a:t> Device. </a:t>
+            </a:r>
+            <a:r>
+              <a:rPr lang="en-GB" dirty="0" err="1"/>
+              <a:t>Würde</a:t>
+            </a:r>
+            <a:r>
+              <a:rPr lang="en-GB" dirty="0"/>
+              <a:t> </a:t>
+            </a:r>
+            <a:r>
+              <a:rPr lang="en-GB" dirty="0" err="1"/>
+              <a:t>vergessene</a:t>
+            </a:r>
+            <a:r>
+              <a:rPr lang="en-GB" dirty="0"/>
+              <a:t> </a:t>
+            </a:r>
+            <a:r>
+              <a:rPr lang="en-GB" dirty="0" err="1"/>
+              <a:t>Fälle</a:t>
+            </a:r>
+            <a:r>
+              <a:rPr lang="en-GB" dirty="0"/>
+              <a:t> </a:t>
+            </a:r>
+            <a:r>
+              <a:rPr lang="en-GB" dirty="0" err="1"/>
+              <a:t>mit</a:t>
+            </a:r>
+            <a:r>
+              <a:rPr lang="en-GB" dirty="0"/>
+              <a:t> grosser </a:t>
+            </a:r>
+            <a:r>
+              <a:rPr lang="en-GB" dirty="0" err="1"/>
+              <a:t>wahrscheindlichkeit</a:t>
+            </a:r>
+            <a:r>
+              <a:rPr lang="en-GB" dirty="0"/>
+              <a:t> </a:t>
+            </a:r>
+            <a:r>
+              <a:rPr lang="en-GB" dirty="0" err="1"/>
+              <a:t>entdecken</a:t>
+            </a:r>
+            <a:r>
+              <a:rPr lang="en-GB" dirty="0"/>
+              <a:t>.</a:t>
+            </a:r>
+          </a:p>
+        </p:txBody>
+      </p:sp>
+      <p:sp>
+        <p:nvSpPr>
+          <p:cNvPr id="4" name="Foliennummernplatzhalter 3"/>
+          <p:cNvSpPr>
+            <a:spLocks noGrp="1"/>
+          </p:cNvSpPr>
+          <p:nvPr>
+            <p:ph type="sldNum" sz="quarter" idx="10"/>
+          </p:nvPr>
+        </p:nvSpPr>
+        <p:spPr/>
+        <p:txBody>
+          <a:bodyPr/>
+          <a:lstStyle/>
+          <a:p>
+            <a:fld id="{748723F8-CD6B-45E3-B09A-75062809A4AE}" type="slidenum">
+              <a:rPr lang="en-GB" smtClean="0"/>
+              <a:t>10</a:t>
+            </a:fld>
+            <a:endParaRPr lang="en-GB"/>
+          </a:p>
+        </p:txBody>
+      </p:sp>
+    </p:spTree>
+    <p:extLst>
+      <p:ext uri="{BB962C8B-B14F-4D97-AF65-F5344CB8AC3E}">
+        <p14:creationId xmlns:p14="http://schemas.microsoft.com/office/powerpoint/2010/main" val="996191540"/>
+      </p:ext>
+    </p:extLst>
+  </p:cSld>
+  <p:clrMapOvr>
+    <a:masterClrMapping/>
+  </p:clrMapOvr>
+</p:notes>
+</file>
+
+<file path=ppt/notesSlides/notesSlide5.xml><?xml version="1.0" encoding="utf-8"?>
+<p:notes xmlns:a="http://schemas.openxmlformats.org/drawingml/2006/main" xmlns:r="http://schemas.openxmlformats.org/officeDocument/2006/relationships" xmlns:p="http://schemas.openxmlformats.org/presentationml/2006/main">
+  <p:cSld>
+    <p:spTree>
+      <p:nvGrpSpPr>
+        <p:cNvPr id="1" name=""/>
+        <p:cNvGrpSpPr/>
+        <p:nvPr/>
+      </p:nvGrpSpPr>
+      <p:grpSpPr>
+        <a:xfrm>
+          <a:off x="0" y="0"/>
+          <a:ext cx="0" cy="0"/>
+          <a:chOff x="0" y="0"/>
+          <a:chExt cx="0" cy="0"/>
+        </a:xfrm>
+      </p:grpSpPr>
+      <p:sp>
+        <p:nvSpPr>
+          <p:cNvPr id="2" name="Folienbildplatzhalter 1"/>
+          <p:cNvSpPr>
+            <a:spLocks noGrp="1" noRot="1" noChangeAspect="1"/>
+          </p:cNvSpPr>
+          <p:nvPr>
+            <p:ph type="sldImg"/>
+          </p:nvPr>
+        </p:nvSpPr>
+        <p:spPr/>
+      </p:sp>
+      <p:sp>
+        <p:nvSpPr>
+          <p:cNvPr id="3" name="Notizenplatzhalter 2"/>
+          <p:cNvSpPr>
+            <a:spLocks noGrp="1"/>
+          </p:cNvSpPr>
+          <p:nvPr>
+            <p:ph type="body" idx="1"/>
+          </p:nvPr>
+        </p:nvSpPr>
+        <p:spPr/>
+        <p:txBody>
+          <a:bodyPr/>
+          <a:lstStyle/>
+          <a:p>
+            <a:r>
+              <a:rPr lang="en-GB" dirty="0" err="1"/>
+              <a:t>Zusammenfassung</a:t>
+            </a:r>
+            <a:endParaRPr lang="en-GB" dirty="0"/>
+          </a:p>
+          <a:p>
+            <a:pPr marL="171450" indent="-171450">
+              <a:buFontTx/>
+              <a:buChar char="-"/>
+            </a:pPr>
+            <a:r>
+              <a:rPr lang="en-GB" dirty="0"/>
+              <a:t>Zu </a:t>
+            </a:r>
+            <a:r>
+              <a:rPr lang="en-GB" dirty="0" err="1"/>
+              <a:t>wenig</a:t>
+            </a:r>
+            <a:r>
+              <a:rPr lang="en-GB" dirty="0"/>
+              <a:t> </a:t>
+            </a:r>
+            <a:r>
+              <a:rPr lang="en-GB" dirty="0" err="1"/>
+              <a:t>zeit</a:t>
+            </a:r>
+            <a:r>
+              <a:rPr lang="en-GB" dirty="0"/>
+              <a:t> in in </a:t>
+            </a:r>
+            <a:r>
+              <a:rPr lang="en-GB" dirty="0" err="1"/>
+              <a:t>Projekten</a:t>
+            </a:r>
+            <a:r>
+              <a:rPr lang="en-GB" dirty="0"/>
+              <a:t> so </a:t>
+            </a:r>
+            <a:r>
+              <a:rPr lang="en-GB" dirty="0" err="1"/>
+              <a:t>üblich</a:t>
+            </a:r>
+            <a:r>
+              <a:rPr lang="en-GB" dirty="0"/>
+              <a:t> ;-)</a:t>
+            </a:r>
+          </a:p>
+          <a:p>
+            <a:pPr marL="171450" indent="-171450">
+              <a:buFontTx/>
+              <a:buChar char="-"/>
+            </a:pPr>
+            <a:r>
+              <a:rPr lang="en-GB" dirty="0"/>
+              <a:t>Android </a:t>
+            </a:r>
+            <a:r>
+              <a:rPr lang="en-GB" dirty="0" err="1"/>
+              <a:t>Umgebung</a:t>
+            </a:r>
+            <a:r>
+              <a:rPr lang="en-GB" dirty="0"/>
+              <a:t> </a:t>
+            </a:r>
+            <a:r>
+              <a:rPr lang="en-GB" dirty="0" err="1"/>
+              <a:t>besser</a:t>
+            </a:r>
+            <a:r>
+              <a:rPr lang="en-GB" dirty="0"/>
+              <a:t> </a:t>
+            </a:r>
+            <a:r>
+              <a:rPr lang="en-GB" dirty="0" err="1"/>
+              <a:t>kennengelern</a:t>
+            </a:r>
+            <a:r>
+              <a:rPr lang="en-GB" dirty="0"/>
+              <a:t>.</a:t>
+            </a:r>
+          </a:p>
+          <a:p>
+            <a:pPr marL="171450" indent="-171450">
+              <a:buFontTx/>
+              <a:buChar char="-"/>
+            </a:pPr>
+            <a:r>
+              <a:rPr lang="en-GB" dirty="0" err="1"/>
+              <a:t>Unzählige</a:t>
+            </a:r>
+            <a:r>
+              <a:rPr lang="en-GB" dirty="0"/>
+              <a:t> Tools und </a:t>
+            </a:r>
+            <a:r>
+              <a:rPr lang="en-GB" dirty="0" err="1"/>
+              <a:t>Bibliotheken</a:t>
+            </a:r>
+            <a:r>
+              <a:rPr lang="en-GB" dirty="0"/>
+              <a:t>. </a:t>
+            </a:r>
+            <a:r>
+              <a:rPr lang="en-GB" dirty="0" err="1"/>
+              <a:t>Für</a:t>
+            </a:r>
+            <a:r>
+              <a:rPr lang="en-GB" dirty="0"/>
+              <a:t> </a:t>
+            </a:r>
+            <a:r>
+              <a:rPr lang="en-GB" dirty="0" err="1"/>
+              <a:t>jede</a:t>
+            </a:r>
+            <a:r>
+              <a:rPr lang="en-GB" dirty="0"/>
+              <a:t> </a:t>
+            </a:r>
+            <a:r>
+              <a:rPr lang="en-GB" dirty="0" err="1"/>
+              <a:t>Frage</a:t>
+            </a:r>
+            <a:r>
+              <a:rPr lang="en-GB" dirty="0"/>
+              <a:t> </a:t>
+            </a:r>
+            <a:r>
+              <a:rPr lang="en-GB" dirty="0" err="1"/>
+              <a:t>gibt</a:t>
+            </a:r>
+            <a:r>
+              <a:rPr lang="en-GB" dirty="0"/>
+              <a:t> </a:t>
+            </a:r>
+            <a:r>
+              <a:rPr lang="en-GB" dirty="0" err="1"/>
+              <a:t>es</a:t>
+            </a:r>
+            <a:r>
+              <a:rPr lang="en-GB" dirty="0"/>
+              <a:t> </a:t>
+            </a:r>
+            <a:r>
+              <a:rPr lang="en-GB" dirty="0" err="1"/>
+              <a:t>meist</a:t>
+            </a:r>
+            <a:r>
+              <a:rPr lang="en-GB" dirty="0"/>
+              <a:t> </a:t>
+            </a:r>
+            <a:r>
+              <a:rPr lang="en-GB" dirty="0" err="1"/>
+              <a:t>schon</a:t>
+            </a:r>
+            <a:r>
+              <a:rPr lang="en-GB" dirty="0"/>
+              <a:t> </a:t>
+            </a:r>
+            <a:r>
+              <a:rPr lang="en-GB" dirty="0" err="1"/>
+              <a:t>eine</a:t>
+            </a:r>
+            <a:r>
+              <a:rPr lang="en-GB" dirty="0"/>
+              <a:t> API</a:t>
+            </a:r>
+          </a:p>
+          <a:p>
+            <a:pPr marL="171450" indent="-171450">
+              <a:buFontTx/>
+              <a:buChar char="-"/>
+            </a:pPr>
+            <a:r>
+              <a:rPr lang="en-GB" dirty="0" err="1"/>
+              <a:t>Mächtige</a:t>
+            </a:r>
+            <a:r>
+              <a:rPr lang="en-GB" dirty="0"/>
+              <a:t> </a:t>
+            </a:r>
+            <a:r>
+              <a:rPr lang="en-GB" dirty="0" err="1"/>
+              <a:t>Umgebung</a:t>
+            </a:r>
+            <a:r>
+              <a:rPr lang="en-GB" dirty="0"/>
+              <a:t> Firebase.</a:t>
+            </a:r>
+          </a:p>
+          <a:p>
+            <a:pPr marL="171450" indent="-171450">
+              <a:buFontTx/>
+              <a:buChar char="-"/>
+            </a:pPr>
+            <a:endParaRPr lang="en-GB" dirty="0"/>
+          </a:p>
+          <a:p>
+            <a:pPr marL="0" indent="0">
+              <a:buFontTx/>
+              <a:buNone/>
+            </a:pPr>
+            <a:r>
+              <a:rPr lang="en-GB" dirty="0" err="1"/>
+              <a:t>Zukünftig</a:t>
+            </a:r>
+            <a:r>
+              <a:rPr lang="en-GB" dirty="0"/>
+              <a:t> Work</a:t>
+            </a:r>
+          </a:p>
+          <a:p>
+            <a:pPr marL="171450" indent="-171450">
+              <a:buFontTx/>
+              <a:buChar char="-"/>
+            </a:pPr>
+            <a:r>
+              <a:rPr lang="en-GB" dirty="0"/>
+              <a:t>App </a:t>
+            </a:r>
+            <a:r>
+              <a:rPr lang="en-GB" dirty="0" err="1"/>
+              <a:t>mit</a:t>
+            </a:r>
+            <a:r>
+              <a:rPr lang="en-GB" dirty="0"/>
+              <a:t> </a:t>
+            </a:r>
+            <a:r>
+              <a:rPr lang="en-GB" dirty="0" err="1"/>
+              <a:t>Werbung</a:t>
+            </a:r>
+            <a:r>
+              <a:rPr lang="en-GB" dirty="0"/>
+              <a:t> </a:t>
+            </a:r>
+            <a:r>
+              <a:rPr lang="en-GB" dirty="0" err="1"/>
+              <a:t>versehen</a:t>
+            </a:r>
+            <a:r>
+              <a:rPr lang="en-GB" dirty="0"/>
+              <a:t>.</a:t>
+            </a:r>
+          </a:p>
+          <a:p>
+            <a:pPr marL="171450" indent="-171450">
+              <a:buFontTx/>
+              <a:buChar char="-"/>
+            </a:pPr>
+            <a:r>
+              <a:rPr lang="en-GB" dirty="0" err="1"/>
+              <a:t>Bezahlende</a:t>
+            </a:r>
+            <a:r>
+              <a:rPr lang="en-GB" dirty="0"/>
+              <a:t> </a:t>
+            </a:r>
+            <a:r>
+              <a:rPr lang="en-GB" dirty="0" err="1"/>
+              <a:t>Kunden</a:t>
+            </a:r>
+            <a:r>
+              <a:rPr lang="en-GB" dirty="0"/>
+              <a:t> (</a:t>
+            </a:r>
+            <a:r>
+              <a:rPr lang="en-GB" dirty="0" err="1"/>
+              <a:t>Skigebiete</a:t>
+            </a:r>
+            <a:r>
+              <a:rPr lang="en-GB" dirty="0"/>
+              <a:t>) warden </a:t>
+            </a:r>
+            <a:r>
+              <a:rPr lang="en-GB" dirty="0" err="1"/>
+              <a:t>Priorisiert</a:t>
+            </a:r>
+            <a:r>
+              <a:rPr lang="en-GB" dirty="0"/>
+              <a:t> </a:t>
+            </a:r>
+            <a:r>
+              <a:rPr lang="en-GB" dirty="0" err="1"/>
+              <a:t>angezeigt</a:t>
+            </a:r>
+            <a:endParaRPr lang="en-GB" dirty="0"/>
+          </a:p>
+          <a:p>
+            <a:pPr marL="171450" indent="-171450">
+              <a:buFontTx/>
+              <a:buChar char="-"/>
+            </a:pPr>
+            <a:r>
+              <a:rPr lang="en-GB" dirty="0" err="1"/>
+              <a:t>Filterfunktionen</a:t>
+            </a:r>
+            <a:r>
+              <a:rPr lang="en-GB" dirty="0"/>
+              <a:t> </a:t>
+            </a:r>
+            <a:r>
+              <a:rPr lang="en-GB" dirty="0" err="1"/>
+              <a:t>für</a:t>
+            </a:r>
+            <a:r>
+              <a:rPr lang="en-GB" dirty="0"/>
+              <a:t> </a:t>
+            </a:r>
+            <a:r>
+              <a:rPr lang="en-GB" dirty="0" err="1"/>
+              <a:t>benutzer</a:t>
+            </a:r>
+            <a:r>
+              <a:rPr lang="en-GB" dirty="0"/>
+              <a:t> </a:t>
+            </a:r>
+            <a:r>
+              <a:rPr lang="en-GB" dirty="0" err="1"/>
+              <a:t>einfügen</a:t>
+            </a:r>
+            <a:endParaRPr lang="en-GB" dirty="0"/>
+          </a:p>
+          <a:p>
+            <a:pPr marL="171450" indent="-171450">
+              <a:buFontTx/>
+              <a:buChar char="-"/>
+            </a:pPr>
+            <a:r>
+              <a:rPr lang="en-GB" dirty="0" err="1"/>
+              <a:t>Kostenpflichtige</a:t>
+            </a:r>
+            <a:r>
+              <a:rPr lang="en-GB" dirty="0"/>
+              <a:t> API </a:t>
+            </a:r>
+            <a:r>
+              <a:rPr lang="en-GB" dirty="0" err="1"/>
+              <a:t>einbinden</a:t>
+            </a:r>
+            <a:r>
+              <a:rPr lang="en-GB" dirty="0"/>
+              <a:t> -&gt; </a:t>
+            </a:r>
+            <a:r>
+              <a:rPr lang="en-GB" dirty="0" err="1"/>
+              <a:t>mehr</a:t>
+            </a:r>
+            <a:r>
+              <a:rPr lang="en-GB" dirty="0"/>
+              <a:t> </a:t>
+            </a:r>
+            <a:r>
+              <a:rPr lang="en-GB" dirty="0" err="1"/>
+              <a:t>Informationen</a:t>
+            </a:r>
+            <a:r>
+              <a:rPr lang="en-GB" dirty="0"/>
+              <a:t> und </a:t>
+            </a:r>
+            <a:r>
+              <a:rPr lang="en-GB" dirty="0" err="1"/>
+              <a:t>aktueller</a:t>
+            </a:r>
+            <a:endParaRPr lang="en-GB" dirty="0"/>
+          </a:p>
+          <a:p>
+            <a:pPr marL="171450" indent="-171450">
+              <a:buFontTx/>
+              <a:buChar char="-"/>
+            </a:pPr>
+            <a:endParaRPr lang="en-GB" dirty="0"/>
+          </a:p>
+        </p:txBody>
+      </p:sp>
+      <p:sp>
+        <p:nvSpPr>
+          <p:cNvPr id="4" name="Foliennummernplatzhalter 3"/>
+          <p:cNvSpPr>
+            <a:spLocks noGrp="1"/>
+          </p:cNvSpPr>
+          <p:nvPr>
+            <p:ph type="sldNum" sz="quarter" idx="10"/>
+          </p:nvPr>
+        </p:nvSpPr>
+        <p:spPr/>
+        <p:txBody>
+          <a:bodyPr/>
+          <a:lstStyle/>
+          <a:p>
+            <a:fld id="{748723F8-CD6B-45E3-B09A-75062809A4AE}" type="slidenum">
+              <a:rPr lang="en-GB" smtClean="0"/>
+              <a:t>11</a:t>
+            </a:fld>
+            <a:endParaRPr lang="en-GB"/>
+          </a:p>
+        </p:txBody>
+      </p:sp>
+    </p:spTree>
+    <p:extLst>
+      <p:ext uri="{BB962C8B-B14F-4D97-AF65-F5344CB8AC3E}">
+        <p14:creationId xmlns:p14="http://schemas.microsoft.com/office/powerpoint/2010/main" val="559276566"/>
       </p:ext>
     </p:extLst>
   </p:cSld>
@@ -3432,6 +5089,17 @@
 <file path=ppt/slides/slide1.xml><?xml version="1.0" encoding="utf-8"?>
 <p:sld xmlns:a="http://schemas.openxmlformats.org/drawingml/2006/main" xmlns:r="http://schemas.openxmlformats.org/officeDocument/2006/relationships" xmlns:p="http://schemas.openxmlformats.org/presentationml/2006/main">
   <p:cSld>
+    <p:bg>
+      <p:bgPr>
+        <a:solidFill>
+          <a:schemeClr val="bg1">
+            <a:lumMod val="95000"/>
+            <a:lumOff val="5000"/>
+          </a:schemeClr>
+        </a:solidFill>
+        <a:effectLst/>
+      </p:bgPr>
+    </p:bg>
     <p:spTree>
       <p:nvGrpSpPr>
         <p:cNvPr id="1" name=""/>
@@ -3446,6 +5114,92 @@
           <a:chExt cx="0" cy="0"/>
         </a:xfrm>
       </p:grpSpPr>
+      <p:pic>
+        <p:nvPicPr>
+          <p:cNvPr id="5" name="Grafik 4" descr="Ein Bild, das Schnee, draußen, Himmel, Berg enthält.&#10;&#10;Mit sehr hoher Zuverlässigkeit generierte Beschreibung">
+            <a:extLst>
+              <a:ext uri="{FF2B5EF4-FFF2-40B4-BE49-F238E27FC236}">
+                <a16:creationId xmlns:a16="http://schemas.microsoft.com/office/drawing/2014/main" id="{B66E483C-A877-4743-A335-C72152840786}"/>
+              </a:ext>
+            </a:extLst>
+          </p:cNvPr>
+          <p:cNvPicPr>
+            <a:picLocks noChangeAspect="1"/>
+          </p:cNvPicPr>
+          <p:nvPr/>
+        </p:nvPicPr>
+        <p:blipFill rotWithShape="1">
+          <a:blip r:embed="rId2">
+            <a:extLst>
+              <a:ext uri="{28A0092B-C50C-407E-A947-70E740481C1C}">
+                <a14:useLocalDpi xmlns:a14="http://schemas.microsoft.com/office/drawing/2010/main" val="0"/>
+              </a:ext>
+            </a:extLst>
+          </a:blip>
+          <a:srcRect t="21311" b="4340"/>
+          <a:stretch/>
+        </p:blipFill>
+        <p:spPr>
+          <a:xfrm>
+            <a:off x="20" y="10"/>
+            <a:ext cx="9143980" cy="4571990"/>
+          </a:xfrm>
+          <a:prstGeom prst="rect">
+            <a:avLst/>
+          </a:prstGeom>
+        </p:spPr>
+      </p:pic>
+      <p:cxnSp>
+        <p:nvCxnSpPr>
+          <p:cNvPr id="10" name="Straight Connector 9">
+            <a:extLst>
+              <a:ext uri="{FF2B5EF4-FFF2-40B4-BE49-F238E27FC236}">
+                <a16:creationId xmlns:a16="http://schemas.microsoft.com/office/drawing/2014/main" id="{E126E481-B945-4179-BD79-05E96E9B29E1}"/>
+              </a:ext>
+            </a:extLst>
+          </p:cNvPr>
+          <p:cNvCxnSpPr>
+            <a:cxnSpLocks noGrp="1" noRot="1" noChangeAspect="1" noMove="1" noResize="1" noEditPoints="1" noAdjustHandles="1" noChangeArrowheads="1" noChangeShapeType="1"/>
+          </p:cNvCxnSpPr>
+          <p:nvPr>
+            <p:extLst>
+              <p:ext uri="{386F3935-93C4-4BCD-93E2-E3B085C9AB24}">
+                <p16:designElem xmlns:p16="http://schemas.microsoft.com/office/powerpoint/2015/main" val="1"/>
+              </p:ext>
+            </p:extLst>
+          </p:nvPr>
+        </p:nvCxnSpPr>
+        <p:spPr>
+          <a:xfrm flipV="1">
+            <a:off x="6290132" y="5264106"/>
+            <a:ext cx="0" cy="914400"/>
+          </a:xfrm>
+          <a:prstGeom prst="line">
+            <a:avLst/>
+          </a:prstGeom>
+          <a:ln w="19050">
+            <a:solidFill>
+              <a:srgbClr val="FFFFFF">
+                <a:alpha val="80000"/>
+              </a:srgbClr>
+            </a:solidFill>
+          </a:ln>
+        </p:spPr>
+        <p:style>
+          <a:lnRef idx="1">
+            <a:schemeClr val="accent1"/>
+          </a:lnRef>
+          <a:fillRef idx="0">
+            <a:schemeClr val="accent1"/>
+          </a:fillRef>
+          <a:effectRef idx="0">
+            <a:schemeClr val="accent1"/>
+          </a:effectRef>
+          <a:fontRef idx="minor">
+            <a:schemeClr val="tx1"/>
+          </a:fontRef>
+        </p:style>
+      </p:cxnSp>
       <p:sp>
         <p:nvSpPr>
           <p:cNvPr id="2" name="Titel 1">
@@ -3464,16 +5218,19 @@
         </p:nvSpPr>
         <p:spPr>
           <a:xfrm>
-            <a:off x="685800" y="1122363"/>
-            <a:ext cx="7772400" cy="1655762"/>
+            <a:off x="324852" y="5091762"/>
+            <a:ext cx="5875644" cy="1264588"/>
           </a:xfrm>
         </p:spPr>
         <p:txBody>
-          <a:bodyPr/>
+          <a:bodyPr anchor="ctr">
+            <a:normAutofit/>
+          </a:bodyPr>
           <a:lstStyle/>
           <a:p>
-            <a:r>
-              <a:rPr lang="de-CH" dirty="0"/>
+            <a:pPr algn="r"/>
+            <a:r>
+              <a:rPr lang="de-CH"/>
               <a:t>Ski-Compass</a:t>
             </a:r>
           </a:p>
@@ -3495,35 +5252,42 @@
             <p:ph type="subTitle" idx="1"/>
           </p:nvPr>
         </p:nvSpPr>
-        <p:spPr/>
-        <p:txBody>
-          <a:bodyPr/>
+        <p:spPr>
+          <a:xfrm>
+            <a:off x="6374330" y="5091763"/>
+            <a:ext cx="2230655" cy="1264587"/>
+          </a:xfrm>
+        </p:spPr>
+        <p:txBody>
+          <a:bodyPr anchor="ctr">
+            <a:normAutofit/>
+          </a:bodyPr>
           <a:lstStyle/>
           <a:p>
-            <a:r>
-              <a:rPr lang="de-CH" dirty="0"/>
+            <a:pPr algn="l"/>
+            <a:r>
+              <a:rPr lang="de-CH" sz="1700" dirty="0"/>
               <a:t>Martin Messmer</a:t>
             </a:r>
           </a:p>
           <a:p>
-            <a:r>
-              <a:rPr lang="de-CH" dirty="0"/>
+            <a:pPr algn="l"/>
+            <a:r>
+              <a:rPr lang="de-CH" sz="1700" dirty="0"/>
               <a:t>Christian Schmid</a:t>
             </a:r>
           </a:p>
           <a:p>
-            <a:r>
-              <a:rPr lang="de-CH" dirty="0"/>
+            <a:pPr algn="l"/>
+            <a:r>
+              <a:rPr lang="de-CH" sz="1700" dirty="0"/>
               <a:t>Artan </a:t>
             </a:r>
             <a:r>
-              <a:rPr lang="de-CH" dirty="0" err="1"/>
+              <a:rPr lang="de-CH" sz="1700" dirty="0" err="1"/>
               <a:t>Papaja</a:t>
             </a:r>
-            <a:endParaRPr lang="de-CH" dirty="0"/>
-          </a:p>
-          <a:p>
-            <a:endParaRPr lang="de-CH" dirty="0"/>
+            <a:endParaRPr lang="de-CH" sz="1700" dirty="0"/>
           </a:p>
         </p:txBody>
       </p:sp>
@@ -3535,7 +5299,7 @@
     </p:extLst>
   </p:cSld>
   <p:clrMapOvr>
-    <a:masterClrMapping/>
+    <a:overrideClrMapping bg1="dk1" tx1="lt1" bg2="dk2" tx2="lt2" accent1="accent1" accent2="accent2" accent3="accent3" accent4="accent4" accent5="accent5" accent6="accent6" hlink="hlink" folHlink="folHlink"/>
   </p:clrMapOvr>
 </p:sld>
 </file>
@@ -3562,92 +5326,6 @@
           <p:cNvPr id="2" name="Titel 1">
             <a:extLst>
               <a:ext uri="{FF2B5EF4-FFF2-40B4-BE49-F238E27FC236}">
-                <a16:creationId xmlns:a16="http://schemas.microsoft.com/office/drawing/2014/main" id="{A1320CD9-07C0-41F5-9031-90292C9BA40C}"/>
-              </a:ext>
-            </a:extLst>
-          </p:cNvPr>
-          <p:cNvSpPr>
-            <a:spLocks noGrp="1"/>
-          </p:cNvSpPr>
-          <p:nvPr>
-            <p:ph type="title"/>
-          </p:nvPr>
-        </p:nvSpPr>
-        <p:spPr/>
-        <p:txBody>
-          <a:bodyPr/>
-          <a:lstStyle/>
-          <a:p>
-            <a:r>
-              <a:rPr lang="en-GB" dirty="0"/>
-              <a:t>Implementation</a:t>
-            </a:r>
-          </a:p>
-        </p:txBody>
-      </p:sp>
-      <p:sp>
-        <p:nvSpPr>
-          <p:cNvPr id="3" name="Inhaltsplatzhalter 2">
-            <a:extLst>
-              <a:ext uri="{FF2B5EF4-FFF2-40B4-BE49-F238E27FC236}">
-                <a16:creationId xmlns:a16="http://schemas.microsoft.com/office/drawing/2014/main" id="{DEEE9B27-06A7-469E-B9E8-72D4FDF1E1F1}"/>
-              </a:ext>
-            </a:extLst>
-          </p:cNvPr>
-          <p:cNvSpPr>
-            <a:spLocks noGrp="1"/>
-          </p:cNvSpPr>
-          <p:nvPr>
-            <p:ph idx="1"/>
-          </p:nvPr>
-        </p:nvSpPr>
-        <p:spPr/>
-        <p:txBody>
-          <a:bodyPr/>
-          <a:lstStyle/>
-          <a:p>
-            <a:r>
-              <a:rPr lang="en-GB"/>
-              <a:t>Scrum</a:t>
-            </a:r>
-          </a:p>
-        </p:txBody>
-      </p:sp>
-    </p:spTree>
-    <p:extLst>
-      <p:ext uri="{BB962C8B-B14F-4D97-AF65-F5344CB8AC3E}">
-        <p14:creationId xmlns:p14="http://schemas.microsoft.com/office/powerpoint/2010/main" val="1313387902"/>
-      </p:ext>
-    </p:extLst>
-  </p:cSld>
-  <p:clrMapOvr>
-    <a:masterClrMapping/>
-  </p:clrMapOvr>
-</p:sld>
-</file>
-
-<file path=ppt/slides/slide11.xml><?xml version="1.0" encoding="utf-8"?>
-<p:sld xmlns:a="http://schemas.openxmlformats.org/drawingml/2006/main" xmlns:r="http://schemas.openxmlformats.org/officeDocument/2006/relationships" xmlns:p="http://schemas.openxmlformats.org/presentationml/2006/main">
-  <p:cSld>
-    <p:spTree>
-      <p:nvGrpSpPr>
-        <p:cNvPr id="1" name=""/>
-        <p:cNvGrpSpPr/>
-        <p:nvPr/>
-      </p:nvGrpSpPr>
-      <p:grpSpPr>
-        <a:xfrm>
-          <a:off x="0" y="0"/>
-          <a:ext cx="0" cy="0"/>
-          <a:chOff x="0" y="0"/>
-          <a:chExt cx="0" cy="0"/>
-        </a:xfrm>
-      </p:grpSpPr>
-      <p:sp>
-        <p:nvSpPr>
-          <p:cNvPr id="2" name="Titel 1">
-            <a:extLst>
-              <a:ext uri="{FF2B5EF4-FFF2-40B4-BE49-F238E27FC236}">
                 <a16:creationId xmlns:a16="http://schemas.microsoft.com/office/drawing/2014/main" id="{F5CDFFE4-D353-4E85-BC81-E89F9305F6A4}"/>
               </a:ext>
             </a:extLst>
@@ -3746,7 +5424,7 @@
 </p:sld>
 </file>
 
-<file path=ppt/slides/slide12.xml><?xml version="1.0" encoding="utf-8"?>
+<file path=ppt/slides/slide11.xml><?xml version="1.0" encoding="utf-8"?>
 <p:sld xmlns:a="http://schemas.openxmlformats.org/drawingml/2006/main" xmlns:r="http://schemas.openxmlformats.org/officeDocument/2006/relationships" xmlns:p="http://schemas.openxmlformats.org/presentationml/2006/main">
   <p:cSld>
     <p:spTree>
@@ -3883,10 +5561,9 @@
           <a:lstStyle/>
           <a:p>
             <a:r>
-              <a:rPr lang="de-CH" dirty="0" err="1"/>
+              <a:rPr lang="en-GB" dirty="0"/>
               <a:t>Overview</a:t>
             </a:r>
-            <a:endParaRPr lang="de-CH" dirty="0"/>
           </a:p>
         </p:txBody>
       </p:sp>
@@ -3917,7 +5594,7 @@
             </a:pPr>
             <a:r>
               <a:rPr lang="en-GB" dirty="0"/>
-              <a:t>Motivation</a:t>
+              <a:t>Introduction</a:t>
             </a:r>
           </a:p>
           <a:p>
@@ -3927,7 +5604,7 @@
             </a:pPr>
             <a:r>
               <a:rPr lang="en-GB" dirty="0"/>
-              <a:t>Goal statement</a:t>
+              <a:t>Background</a:t>
             </a:r>
           </a:p>
           <a:p>
@@ -3937,7 +5614,7 @@
             </a:pPr>
             <a:r>
               <a:rPr lang="en-GB" dirty="0"/>
-              <a:t>Background</a:t>
+              <a:t>Design / Architecture</a:t>
             </a:r>
           </a:p>
           <a:p>
@@ -3947,7 +5624,7 @@
             </a:pPr>
             <a:r>
               <a:rPr lang="en-GB" dirty="0"/>
-              <a:t>Design / Architecture</a:t>
+              <a:t>Implementation</a:t>
             </a:r>
           </a:p>
           <a:p>
@@ -3957,7 +5634,7 @@
             </a:pPr>
             <a:r>
               <a:rPr lang="en-GB" dirty="0"/>
-              <a:t>Implementation</a:t>
+              <a:t>Evaluation / Testing</a:t>
             </a:r>
           </a:p>
           <a:p>
@@ -3967,21 +5644,40 @@
             </a:pPr>
             <a:r>
               <a:rPr lang="en-GB" dirty="0"/>
-              <a:t>Evaluation / Testing</a:t>
-            </a:r>
-          </a:p>
-          <a:p>
-            <a:pPr>
-              <a:buFontTx/>
-              <a:buChar char="-"/>
-            </a:pPr>
-            <a:r>
-              <a:rPr lang="en-GB" dirty="0"/>
               <a:t>Discussion</a:t>
             </a:r>
           </a:p>
         </p:txBody>
       </p:sp>
+      <p:pic>
+        <p:nvPicPr>
+          <p:cNvPr id="4" name="Grafik 3">
+            <a:extLst>
+              <a:ext uri="{FF2B5EF4-FFF2-40B4-BE49-F238E27FC236}">
+                <a16:creationId xmlns:a16="http://schemas.microsoft.com/office/drawing/2014/main" id="{A3D4565E-5FBC-491D-901F-24ECAB9104B6}"/>
+              </a:ext>
+            </a:extLst>
+          </p:cNvPr>
+          <p:cNvPicPr>
+            <a:picLocks noChangeAspect="1"/>
+          </p:cNvPicPr>
+          <p:nvPr/>
+        </p:nvPicPr>
+        <p:blipFill rotWithShape="1">
+          <a:blip r:embed="rId2"/>
+          <a:srcRect l="7592" t="3888" r="6417" b="1945"/>
+          <a:stretch/>
+        </p:blipFill>
+        <p:spPr>
+          <a:xfrm>
+            <a:off x="5172075" y="200025"/>
+            <a:ext cx="3190875" cy="6457950"/>
+          </a:xfrm>
+          <a:prstGeom prst="rect">
+            <a:avLst/>
+          </a:prstGeom>
+        </p:spPr>
+      </p:pic>
     </p:spTree>
     <p:extLst>
       <p:ext uri="{BB962C8B-B14F-4D97-AF65-F5344CB8AC3E}">
@@ -4034,8 +5730,8 @@
           <a:lstStyle/>
           <a:p>
             <a:r>
-              <a:rPr lang="de-CH" dirty="0"/>
-              <a:t>Motivation</a:t>
+              <a:rPr lang="en-GB" dirty="0"/>
+              <a:t>Introduction</a:t>
             </a:r>
           </a:p>
         </p:txBody>
@@ -4061,7 +5757,64 @@
           <a:bodyPr/>
           <a:lstStyle/>
           <a:p>
-            <a:endParaRPr lang="de-CH"/>
+            <a:r>
+              <a:rPr lang="de-CH" dirty="0"/>
+              <a:t>Motivation</a:t>
+            </a:r>
+          </a:p>
+          <a:p>
+            <a:pPr lvl="1"/>
+            <a:r>
+              <a:rPr lang="de-CH" dirty="0">
+                <a:solidFill>
+                  <a:srgbClr val="FF0000"/>
+                </a:solidFill>
+              </a:rPr>
+              <a:t>Grösste Motivation: -&gt; Gute Note ;-)</a:t>
+            </a:r>
+          </a:p>
+          <a:p>
+            <a:pPr lvl="1"/>
+            <a:r>
+              <a:rPr lang="de-CH" dirty="0" err="1">
+                <a:solidFill>
+                  <a:srgbClr val="FF0000"/>
+                </a:solidFill>
+              </a:rPr>
+              <a:t>asdfasdf</a:t>
+            </a:r>
+            <a:endParaRPr lang="de-CH" dirty="0">
+              <a:solidFill>
+                <a:srgbClr val="FF0000"/>
+              </a:solidFill>
+            </a:endParaRPr>
+          </a:p>
+          <a:p>
+            <a:r>
+              <a:rPr lang="de-CH" dirty="0"/>
+              <a:t>Goal </a:t>
+            </a:r>
+            <a:r>
+              <a:rPr lang="de-CH" dirty="0" err="1"/>
+              <a:t>statement</a:t>
+            </a:r>
+            <a:endParaRPr lang="de-CH" dirty="0"/>
+          </a:p>
+          <a:p>
+            <a:pPr lvl="1"/>
+            <a:r>
+              <a:rPr lang="de-CH" dirty="0" err="1">
+                <a:solidFill>
+                  <a:srgbClr val="FF0000"/>
+                </a:solidFill>
+              </a:rPr>
+              <a:t>asdfasdf</a:t>
+            </a:r>
+            <a:endParaRPr lang="de-CH" dirty="0">
+              <a:solidFill>
+                <a:srgbClr val="FF0000"/>
+              </a:solidFill>
+            </a:endParaRPr>
           </a:p>
         </p:txBody>
       </p:sp>
@@ -4100,7 +5853,7 @@
           <p:cNvPr id="2" name="Titel 1">
             <a:extLst>
               <a:ext uri="{FF2B5EF4-FFF2-40B4-BE49-F238E27FC236}">
-                <a16:creationId xmlns:a16="http://schemas.microsoft.com/office/drawing/2014/main" id="{8B9B91AF-9593-4D16-885B-06933DE0829A}"/>
+                <a16:creationId xmlns:a16="http://schemas.microsoft.com/office/drawing/2014/main" id="{C904DA1B-0C42-4228-9F13-CDA815BD8764}"/>
               </a:ext>
             </a:extLst>
           </p:cNvPr>
@@ -4118,7 +5871,7 @@
           <a:p>
             <a:r>
               <a:rPr lang="de-CH" dirty="0"/>
-              <a:t>Goal Statement</a:t>
+              <a:t>Background</a:t>
             </a:r>
           </a:p>
         </p:txBody>
@@ -4128,7 +5881,7 @@
           <p:cNvPr id="3" name="Inhaltsplatzhalter 2">
             <a:extLst>
               <a:ext uri="{FF2B5EF4-FFF2-40B4-BE49-F238E27FC236}">
-                <a16:creationId xmlns:a16="http://schemas.microsoft.com/office/drawing/2014/main" id="{AC2E7E71-09C0-48BA-B617-E8A1ED9966DE}"/>
+                <a16:creationId xmlns:a16="http://schemas.microsoft.com/office/drawing/2014/main" id="{4B7A4F98-D95B-4E5A-9326-E99269241A12}"/>
               </a:ext>
             </a:extLst>
           </p:cNvPr>
@@ -4144,14 +5897,14 @@
           <a:bodyPr/>
           <a:lstStyle/>
           <a:p>
-            <a:endParaRPr lang="de-CH"/>
+            <a:endParaRPr lang="de-CH" dirty="0"/>
           </a:p>
         </p:txBody>
       </p:sp>
     </p:spTree>
     <p:extLst>
       <p:ext uri="{BB962C8B-B14F-4D97-AF65-F5344CB8AC3E}">
-        <p14:creationId xmlns:p14="http://schemas.microsoft.com/office/powerpoint/2010/main" val="688758223"/>
+        <p14:creationId xmlns:p14="http://schemas.microsoft.com/office/powerpoint/2010/main" val="2854133854"/>
       </p:ext>
     </p:extLst>
   </p:cSld>
@@ -4183,7 +5936,7 @@
           <p:cNvPr id="2" name="Titel 1">
             <a:extLst>
               <a:ext uri="{FF2B5EF4-FFF2-40B4-BE49-F238E27FC236}">
-                <a16:creationId xmlns:a16="http://schemas.microsoft.com/office/drawing/2014/main" id="{C904DA1B-0C42-4228-9F13-CDA815BD8764}"/>
+                <a16:creationId xmlns:a16="http://schemas.microsoft.com/office/drawing/2014/main" id="{3D4823C5-B211-4AAE-BBCC-F96361A2ADA1}"/>
               </a:ext>
             </a:extLst>
           </p:cNvPr>
@@ -4200,8 +5953,12 @@
           <a:lstStyle/>
           <a:p>
             <a:r>
+              <a:rPr lang="de-CH" dirty="0" err="1"/>
+              <a:t>Existing</a:t>
+            </a:r>
+            <a:r>
               <a:rPr lang="de-CH" dirty="0"/>
-              <a:t>Background</a:t>
+              <a:t> Apps</a:t>
             </a:r>
           </a:p>
         </p:txBody>
@@ -4211,7 +5968,7 @@
           <p:cNvPr id="3" name="Inhaltsplatzhalter 2">
             <a:extLst>
               <a:ext uri="{FF2B5EF4-FFF2-40B4-BE49-F238E27FC236}">
-                <a16:creationId xmlns:a16="http://schemas.microsoft.com/office/drawing/2014/main" id="{4B7A4F98-D95B-4E5A-9326-E99269241A12}"/>
+                <a16:creationId xmlns:a16="http://schemas.microsoft.com/office/drawing/2014/main" id="{47E3DF17-BC6E-4A05-B688-7FCD31C19901}"/>
               </a:ext>
             </a:extLst>
           </p:cNvPr>
@@ -4222,87 +5979,636 @@
             <p:ph idx="1"/>
           </p:nvPr>
         </p:nvSpPr>
-        <p:spPr/>
+        <p:spPr>
+          <a:xfrm>
+            <a:off x="628650" y="1825625"/>
+            <a:ext cx="4738239" cy="4351338"/>
+          </a:xfrm>
+        </p:spPr>
         <p:txBody>
           <a:bodyPr/>
           <a:lstStyle/>
           <a:p>
             <a:r>
+              <a:rPr lang="de-CH" dirty="0"/>
+              <a:t>Official App </a:t>
+            </a:r>
+            <a:r>
               <a:rPr lang="de-CH" dirty="0" err="1"/>
-              <a:t>Firebase</a:t>
+              <a:t>from</a:t>
+            </a:r>
+            <a:r>
+              <a:rPr lang="de-CH" dirty="0"/>
+              <a:t> Ski-Resorts</a:t>
+            </a:r>
+          </a:p>
+          <a:p>
+            <a:r>
+              <a:rPr lang="de-CH" dirty="0" err="1"/>
+              <a:t>iSKI</a:t>
+            </a:r>
+            <a:r>
+              <a:rPr lang="de-CH" dirty="0"/>
+              <a:t> (Swiss, France, Italia, …)</a:t>
+            </a:r>
+          </a:p>
+          <a:p>
+            <a:r>
+              <a:rPr lang="de-CH" dirty="0"/>
+              <a:t>Bergfex</a:t>
+            </a:r>
+          </a:p>
+          <a:p>
+            <a:r>
+              <a:rPr lang="de-CH" dirty="0" err="1"/>
+              <a:t>Skiinfo</a:t>
             </a:r>
             <a:endParaRPr lang="de-CH" dirty="0"/>
           </a:p>
           <a:p>
-            <a:pPr lvl="1"/>
-            <a:r>
-              <a:rPr lang="de-CH" dirty="0" err="1"/>
-              <a:t>Geofire</a:t>
-            </a:r>
+            <a:r>
+              <a:rPr lang="de-CH" dirty="0"/>
+              <a:t>Skiresort.de</a:t>
+            </a:r>
+          </a:p>
+          <a:p>
             <a:endParaRPr lang="de-CH" dirty="0"/>
           </a:p>
-          <a:p>
-            <a:r>
-              <a:rPr lang="de-CH" dirty="0"/>
-              <a:t>External API</a:t>
-            </a:r>
-          </a:p>
-          <a:p>
-            <a:pPr lvl="1"/>
-            <a:r>
-              <a:rPr lang="de-CH" dirty="0"/>
-              <a:t>Skimap.org</a:t>
-            </a:r>
-          </a:p>
-          <a:p>
-            <a:pPr lvl="1"/>
-            <a:r>
-              <a:rPr lang="de-CH" dirty="0"/>
-              <a:t>OpenWeatherMap.org</a:t>
-            </a:r>
-          </a:p>
-          <a:p>
-            <a:r>
-              <a:rPr lang="en-GB" dirty="0"/>
-              <a:t>Server</a:t>
-            </a:r>
-            <a:r>
-              <a:rPr lang="de-CH" dirty="0"/>
-              <a:t> Programm</a:t>
-            </a:r>
-          </a:p>
-          <a:p>
-            <a:pPr lvl="1"/>
-            <a:r>
-              <a:rPr lang="de-CH" dirty="0"/>
-              <a:t>Java </a:t>
-            </a:r>
-            <a:r>
-              <a:rPr lang="de-CH" dirty="0" err="1"/>
-              <a:t>Application</a:t>
-            </a:r>
-            <a:endParaRPr lang="de-CH" dirty="0"/>
-          </a:p>
-          <a:p>
-            <a:pPr lvl="1"/>
-            <a:r>
-              <a:rPr lang="de-CH" dirty="0" err="1"/>
-              <a:t>Gson</a:t>
-            </a:r>
-            <a:endParaRPr lang="de-CH" dirty="0"/>
-          </a:p>
-        </p:txBody>
-      </p:sp>
+        </p:txBody>
+      </p:sp>
+      <p:pic>
+        <p:nvPicPr>
+          <p:cNvPr id="4" name="Grafik 3">
+            <a:extLst>
+              <a:ext uri="{FF2B5EF4-FFF2-40B4-BE49-F238E27FC236}">
+                <a16:creationId xmlns:a16="http://schemas.microsoft.com/office/drawing/2014/main" id="{FB18EC73-34C7-4153-92A4-C2C2F6471039}"/>
+              </a:ext>
+            </a:extLst>
+          </p:cNvPr>
+          <p:cNvPicPr>
+            <a:picLocks noChangeAspect="1"/>
+          </p:cNvPicPr>
+          <p:nvPr/>
+        </p:nvPicPr>
+        <p:blipFill>
+          <a:blip r:embed="rId3"/>
+          <a:stretch>
+            <a:fillRect/>
+          </a:stretch>
+        </p:blipFill>
+        <p:spPr>
+          <a:xfrm>
+            <a:off x="5921830" y="1710079"/>
+            <a:ext cx="1986273" cy="3670383"/>
+          </a:xfrm>
+          <a:prstGeom prst="rect">
+            <a:avLst/>
+          </a:prstGeom>
+        </p:spPr>
+      </p:pic>
+      <p:pic>
+        <p:nvPicPr>
+          <p:cNvPr id="5" name="Grafik 4">
+            <a:extLst>
+              <a:ext uri="{FF2B5EF4-FFF2-40B4-BE49-F238E27FC236}">
+                <a16:creationId xmlns:a16="http://schemas.microsoft.com/office/drawing/2014/main" id="{06C549AB-23C2-43ED-9BBD-2D8FDCEBE436}"/>
+              </a:ext>
+            </a:extLst>
+          </p:cNvPr>
+          <p:cNvPicPr>
+            <a:picLocks noChangeAspect="1"/>
+          </p:cNvPicPr>
+          <p:nvPr/>
+        </p:nvPicPr>
+        <p:blipFill>
+          <a:blip r:embed="rId4"/>
+          <a:stretch>
+            <a:fillRect/>
+          </a:stretch>
+        </p:blipFill>
+        <p:spPr>
+          <a:xfrm>
+            <a:off x="5921830" y="1777787"/>
+            <a:ext cx="1986273" cy="3534965"/>
+          </a:xfrm>
+          <a:prstGeom prst="rect">
+            <a:avLst/>
+          </a:prstGeom>
+        </p:spPr>
+      </p:pic>
+      <p:pic>
+        <p:nvPicPr>
+          <p:cNvPr id="6" name="Grafik 5">
+            <a:extLst>
+              <a:ext uri="{FF2B5EF4-FFF2-40B4-BE49-F238E27FC236}">
+                <a16:creationId xmlns:a16="http://schemas.microsoft.com/office/drawing/2014/main" id="{5EED2D18-C634-494E-BC34-E9732B87755D}"/>
+              </a:ext>
+            </a:extLst>
+          </p:cNvPr>
+          <p:cNvPicPr>
+            <a:picLocks noChangeAspect="1"/>
+          </p:cNvPicPr>
+          <p:nvPr/>
+        </p:nvPicPr>
+        <p:blipFill>
+          <a:blip r:embed="rId5"/>
+          <a:stretch>
+            <a:fillRect/>
+          </a:stretch>
+        </p:blipFill>
+        <p:spPr>
+          <a:xfrm>
+            <a:off x="5776687" y="1333441"/>
+            <a:ext cx="2351314" cy="4047021"/>
+          </a:xfrm>
+          <a:prstGeom prst="rect">
+            <a:avLst/>
+          </a:prstGeom>
+        </p:spPr>
+      </p:pic>
+      <p:pic>
+        <p:nvPicPr>
+          <p:cNvPr id="7" name="Grafik 6">
+            <a:extLst>
+              <a:ext uri="{FF2B5EF4-FFF2-40B4-BE49-F238E27FC236}">
+                <a16:creationId xmlns:a16="http://schemas.microsoft.com/office/drawing/2014/main" id="{8CCEC301-ED56-41F9-AC31-9C995F023BBF}"/>
+              </a:ext>
+            </a:extLst>
+          </p:cNvPr>
+          <p:cNvPicPr>
+            <a:picLocks noChangeAspect="1"/>
+          </p:cNvPicPr>
+          <p:nvPr/>
+        </p:nvPicPr>
+        <p:blipFill>
+          <a:blip r:embed="rId6"/>
+          <a:stretch>
+            <a:fillRect/>
+          </a:stretch>
+        </p:blipFill>
+        <p:spPr>
+          <a:xfrm>
+            <a:off x="5776688" y="1333441"/>
+            <a:ext cx="2351314" cy="4176742"/>
+          </a:xfrm>
+          <a:prstGeom prst="rect">
+            <a:avLst/>
+          </a:prstGeom>
+        </p:spPr>
+      </p:pic>
+      <p:pic>
+        <p:nvPicPr>
+          <p:cNvPr id="8" name="Grafik 7">
+            <a:extLst>
+              <a:ext uri="{FF2B5EF4-FFF2-40B4-BE49-F238E27FC236}">
+                <a16:creationId xmlns:a16="http://schemas.microsoft.com/office/drawing/2014/main" id="{741DDE8B-5B6C-4339-9913-19534188912F}"/>
+              </a:ext>
+            </a:extLst>
+          </p:cNvPr>
+          <p:cNvPicPr>
+            <a:picLocks noChangeAspect="1"/>
+          </p:cNvPicPr>
+          <p:nvPr/>
+        </p:nvPicPr>
+        <p:blipFill>
+          <a:blip r:embed="rId7"/>
+          <a:stretch>
+            <a:fillRect/>
+          </a:stretch>
+        </p:blipFill>
+        <p:spPr>
+          <a:xfrm>
+            <a:off x="5671691" y="1333441"/>
+            <a:ext cx="2456310" cy="4176742"/>
+          </a:xfrm>
+          <a:prstGeom prst="rect">
+            <a:avLst/>
+          </a:prstGeom>
+        </p:spPr>
+      </p:pic>
     </p:spTree>
     <p:extLst>
       <p:ext uri="{BB962C8B-B14F-4D97-AF65-F5344CB8AC3E}">
-        <p14:creationId xmlns:p14="http://schemas.microsoft.com/office/powerpoint/2010/main" val="2854133854"/>
+        <p14:creationId xmlns:p14="http://schemas.microsoft.com/office/powerpoint/2010/main" val="3365552931"/>
       </p:ext>
     </p:extLst>
   </p:cSld>
   <p:clrMapOvr>
     <a:masterClrMapping/>
   </p:clrMapOvr>
+  <p:timing>
+    <p:tnLst>
+      <p:par>
+        <p:cTn id="1" dur="indefinite" restart="never" nodeType="tmRoot">
+          <p:childTnLst>
+            <p:seq concurrent="1" nextAc="seek">
+              <p:cTn id="2" dur="indefinite" nodeType="mainSeq">
+                <p:childTnLst>
+                  <p:par>
+                    <p:cTn id="3" fill="hold">
+                      <p:stCondLst>
+                        <p:cond delay="indefinite"/>
+                      </p:stCondLst>
+                      <p:childTnLst>
+                        <p:par>
+                          <p:cTn id="4" fill="hold">
+                            <p:stCondLst>
+                              <p:cond delay="0"/>
+                            </p:stCondLst>
+                            <p:childTnLst>
+                              <p:par>
+                                <p:cTn id="5" presetID="1" presetClass="entr" presetSubtype="0" fill="hold" grpId="0" nodeType="clickEffect">
+                                  <p:stCondLst>
+                                    <p:cond delay="0"/>
+                                  </p:stCondLst>
+                                  <p:childTnLst>
+                                    <p:set>
+                                      <p:cBhvr>
+                                        <p:cTn id="6" dur="1" fill="hold">
+                                          <p:stCondLst>
+                                            <p:cond delay="0"/>
+                                          </p:stCondLst>
+                                        </p:cTn>
+                                        <p:tgtEl>
+                                          <p:spTgt spid="3">
+                                            <p:txEl>
+                                              <p:pRg st="0" end="0"/>
+                                            </p:txEl>
+                                          </p:spTgt>
+                                        </p:tgtEl>
+                                        <p:attrNameLst>
+                                          <p:attrName>style.visibility</p:attrName>
+                                        </p:attrNameLst>
+                                      </p:cBhvr>
+                                      <p:to>
+                                        <p:strVal val="visible"/>
+                                      </p:to>
+                                    </p:set>
+                                  </p:childTnLst>
+                                </p:cTn>
+                              </p:par>
+                              <p:par>
+                                <p:cTn id="7" presetID="1" presetClass="entr" presetSubtype="0" fill="hold" nodeType="withEffect">
+                                  <p:stCondLst>
+                                    <p:cond delay="0"/>
+                                  </p:stCondLst>
+                                  <p:childTnLst>
+                                    <p:set>
+                                      <p:cBhvr>
+                                        <p:cTn id="8" dur="1" fill="hold">
+                                          <p:stCondLst>
+                                            <p:cond delay="0"/>
+                                          </p:stCondLst>
+                                        </p:cTn>
+                                        <p:tgtEl>
+                                          <p:spTgt spid="4"/>
+                                        </p:tgtEl>
+                                        <p:attrNameLst>
+                                          <p:attrName>style.visibility</p:attrName>
+                                        </p:attrNameLst>
+                                      </p:cBhvr>
+                                      <p:to>
+                                        <p:strVal val="visible"/>
+                                      </p:to>
+                                    </p:set>
+                                  </p:childTnLst>
+                                </p:cTn>
+                              </p:par>
+                            </p:childTnLst>
+                          </p:cTn>
+                        </p:par>
+                      </p:childTnLst>
+                    </p:cTn>
+                  </p:par>
+                  <p:par>
+                    <p:cTn id="9" fill="hold">
+                      <p:stCondLst>
+                        <p:cond delay="indefinite"/>
+                      </p:stCondLst>
+                      <p:childTnLst>
+                        <p:par>
+                          <p:cTn id="10" fill="hold">
+                            <p:stCondLst>
+                              <p:cond delay="0"/>
+                            </p:stCondLst>
+                            <p:childTnLst>
+                              <p:par>
+                                <p:cTn id="11" presetID="1" presetClass="entr" presetSubtype="0" fill="hold" grpId="0" nodeType="clickEffect">
+                                  <p:stCondLst>
+                                    <p:cond delay="0"/>
+                                  </p:stCondLst>
+                                  <p:childTnLst>
+                                    <p:set>
+                                      <p:cBhvr>
+                                        <p:cTn id="12" dur="1" fill="hold">
+                                          <p:stCondLst>
+                                            <p:cond delay="0"/>
+                                          </p:stCondLst>
+                                        </p:cTn>
+                                        <p:tgtEl>
+                                          <p:spTgt spid="3">
+                                            <p:txEl>
+                                              <p:pRg st="1" end="1"/>
+                                            </p:txEl>
+                                          </p:spTgt>
+                                        </p:tgtEl>
+                                        <p:attrNameLst>
+                                          <p:attrName>style.visibility</p:attrName>
+                                        </p:attrNameLst>
+                                      </p:cBhvr>
+                                      <p:to>
+                                        <p:strVal val="visible"/>
+                                      </p:to>
+                                    </p:set>
+                                  </p:childTnLst>
+                                </p:cTn>
+                              </p:par>
+                              <p:par>
+                                <p:cTn id="13" presetID="1" presetClass="entr" presetSubtype="0" fill="hold" nodeType="withEffect">
+                                  <p:stCondLst>
+                                    <p:cond delay="0"/>
+                                  </p:stCondLst>
+                                  <p:childTnLst>
+                                    <p:set>
+                                      <p:cBhvr>
+                                        <p:cTn id="14" dur="1" fill="hold">
+                                          <p:stCondLst>
+                                            <p:cond delay="0"/>
+                                          </p:stCondLst>
+                                        </p:cTn>
+                                        <p:tgtEl>
+                                          <p:spTgt spid="5"/>
+                                        </p:tgtEl>
+                                        <p:attrNameLst>
+                                          <p:attrName>style.visibility</p:attrName>
+                                        </p:attrNameLst>
+                                      </p:cBhvr>
+                                      <p:to>
+                                        <p:strVal val="visible"/>
+                                      </p:to>
+                                    </p:set>
+                                  </p:childTnLst>
+                                </p:cTn>
+                              </p:par>
+                            </p:childTnLst>
+                          </p:cTn>
+                        </p:par>
+                      </p:childTnLst>
+                    </p:cTn>
+                  </p:par>
+                  <p:par>
+                    <p:cTn id="15" fill="hold">
+                      <p:stCondLst>
+                        <p:cond delay="indefinite"/>
+                      </p:stCondLst>
+                      <p:childTnLst>
+                        <p:par>
+                          <p:cTn id="16" fill="hold">
+                            <p:stCondLst>
+                              <p:cond delay="0"/>
+                            </p:stCondLst>
+                            <p:childTnLst>
+                              <p:par>
+                                <p:cTn id="17" presetID="1" presetClass="entr" presetSubtype="0" fill="hold" grpId="0" nodeType="clickEffect">
+                                  <p:stCondLst>
+                                    <p:cond delay="0"/>
+                                  </p:stCondLst>
+                                  <p:childTnLst>
+                                    <p:set>
+                                      <p:cBhvr>
+                                        <p:cTn id="18" dur="1" fill="hold">
+                                          <p:stCondLst>
+                                            <p:cond delay="0"/>
+                                          </p:stCondLst>
+                                        </p:cTn>
+                                        <p:tgtEl>
+                                          <p:spTgt spid="3">
+                                            <p:txEl>
+                                              <p:pRg st="2" end="2"/>
+                                            </p:txEl>
+                                          </p:spTgt>
+                                        </p:tgtEl>
+                                        <p:attrNameLst>
+                                          <p:attrName>style.visibility</p:attrName>
+                                        </p:attrNameLst>
+                                      </p:cBhvr>
+                                      <p:to>
+                                        <p:strVal val="visible"/>
+                                      </p:to>
+                                    </p:set>
+                                  </p:childTnLst>
+                                </p:cTn>
+                              </p:par>
+                              <p:par>
+                                <p:cTn id="19" presetID="1" presetClass="entr" presetSubtype="0" fill="hold" nodeType="withEffect">
+                                  <p:stCondLst>
+                                    <p:cond delay="0"/>
+                                  </p:stCondLst>
+                                  <p:childTnLst>
+                                    <p:set>
+                                      <p:cBhvr>
+                                        <p:cTn id="20" dur="1" fill="hold">
+                                          <p:stCondLst>
+                                            <p:cond delay="0"/>
+                                          </p:stCondLst>
+                                        </p:cTn>
+                                        <p:tgtEl>
+                                          <p:spTgt spid="6"/>
+                                        </p:tgtEl>
+                                        <p:attrNameLst>
+                                          <p:attrName>style.visibility</p:attrName>
+                                        </p:attrNameLst>
+                                      </p:cBhvr>
+                                      <p:to>
+                                        <p:strVal val="visible"/>
+                                      </p:to>
+                                    </p:set>
+                                  </p:childTnLst>
+                                </p:cTn>
+                              </p:par>
+                            </p:childTnLst>
+                          </p:cTn>
+                        </p:par>
+                      </p:childTnLst>
+                    </p:cTn>
+                  </p:par>
+                  <p:par>
+                    <p:cTn id="21" fill="hold">
+                      <p:stCondLst>
+                        <p:cond delay="indefinite"/>
+                      </p:stCondLst>
+                      <p:childTnLst>
+                        <p:par>
+                          <p:cTn id="22" fill="hold">
+                            <p:stCondLst>
+                              <p:cond delay="0"/>
+                            </p:stCondLst>
+                            <p:childTnLst>
+                              <p:par>
+                                <p:cTn id="23" presetID="1" presetClass="entr" presetSubtype="0" fill="hold" grpId="0" nodeType="clickEffect">
+                                  <p:stCondLst>
+                                    <p:cond delay="0"/>
+                                  </p:stCondLst>
+                                  <p:childTnLst>
+                                    <p:set>
+                                      <p:cBhvr>
+                                        <p:cTn id="24" dur="1" fill="hold">
+                                          <p:stCondLst>
+                                            <p:cond delay="0"/>
+                                          </p:stCondLst>
+                                        </p:cTn>
+                                        <p:tgtEl>
+                                          <p:spTgt spid="3">
+                                            <p:txEl>
+                                              <p:pRg st="3" end="3"/>
+                                            </p:txEl>
+                                          </p:spTgt>
+                                        </p:tgtEl>
+                                        <p:attrNameLst>
+                                          <p:attrName>style.visibility</p:attrName>
+                                        </p:attrNameLst>
+                                      </p:cBhvr>
+                                      <p:to>
+                                        <p:strVal val="visible"/>
+                                      </p:to>
+                                    </p:set>
+                                  </p:childTnLst>
+                                </p:cTn>
+                              </p:par>
+                              <p:par>
+                                <p:cTn id="25" presetID="1" presetClass="entr" presetSubtype="0" fill="hold" nodeType="withEffect">
+                                  <p:stCondLst>
+                                    <p:cond delay="0"/>
+                                  </p:stCondLst>
+                                  <p:childTnLst>
+                                    <p:set>
+                                      <p:cBhvr>
+                                        <p:cTn id="26" dur="1" fill="hold">
+                                          <p:stCondLst>
+                                            <p:cond delay="0"/>
+                                          </p:stCondLst>
+                                        </p:cTn>
+                                        <p:tgtEl>
+                                          <p:spTgt spid="7"/>
+                                        </p:tgtEl>
+                                        <p:attrNameLst>
+                                          <p:attrName>style.visibility</p:attrName>
+                                        </p:attrNameLst>
+                                      </p:cBhvr>
+                                      <p:to>
+                                        <p:strVal val="visible"/>
+                                      </p:to>
+                                    </p:set>
+                                  </p:childTnLst>
+                                </p:cTn>
+                              </p:par>
+                            </p:childTnLst>
+                          </p:cTn>
+                        </p:par>
+                      </p:childTnLst>
+                    </p:cTn>
+                  </p:par>
+                  <p:par>
+                    <p:cTn id="27" fill="hold">
+                      <p:stCondLst>
+                        <p:cond delay="indefinite"/>
+                      </p:stCondLst>
+                      <p:childTnLst>
+                        <p:par>
+                          <p:cTn id="28" fill="hold">
+                            <p:stCondLst>
+                              <p:cond delay="0"/>
+                            </p:stCondLst>
+                            <p:childTnLst>
+                              <p:par>
+                                <p:cTn id="29" presetID="1" presetClass="entr" presetSubtype="0" fill="hold" grpId="0" nodeType="clickEffect">
+                                  <p:stCondLst>
+                                    <p:cond delay="0"/>
+                                  </p:stCondLst>
+                                  <p:childTnLst>
+                                    <p:set>
+                                      <p:cBhvr>
+                                        <p:cTn id="30" dur="1" fill="hold">
+                                          <p:stCondLst>
+                                            <p:cond delay="0"/>
+                                          </p:stCondLst>
+                                        </p:cTn>
+                                        <p:tgtEl>
+                                          <p:spTgt spid="3">
+                                            <p:txEl>
+                                              <p:pRg st="4" end="4"/>
+                                            </p:txEl>
+                                          </p:spTgt>
+                                        </p:tgtEl>
+                                        <p:attrNameLst>
+                                          <p:attrName>style.visibility</p:attrName>
+                                        </p:attrNameLst>
+                                      </p:cBhvr>
+                                      <p:to>
+                                        <p:strVal val="visible"/>
+                                      </p:to>
+                                    </p:set>
+                                  </p:childTnLst>
+                                </p:cTn>
+                              </p:par>
+                              <p:par>
+                                <p:cTn id="31" presetID="1" presetClass="entr" presetSubtype="0" fill="hold" nodeType="withEffect">
+                                  <p:stCondLst>
+                                    <p:cond delay="0"/>
+                                  </p:stCondLst>
+                                  <p:childTnLst>
+                                    <p:set>
+                                      <p:cBhvr>
+                                        <p:cTn id="32" dur="1" fill="hold">
+                                          <p:stCondLst>
+                                            <p:cond delay="0"/>
+                                          </p:stCondLst>
+                                        </p:cTn>
+                                        <p:tgtEl>
+                                          <p:spTgt spid="8"/>
+                                        </p:tgtEl>
+                                        <p:attrNameLst>
+                                          <p:attrName>style.visibility</p:attrName>
+                                        </p:attrNameLst>
+                                      </p:cBhvr>
+                                      <p:to>
+                                        <p:strVal val="visible"/>
+                                      </p:to>
+                                    </p:set>
+                                  </p:childTnLst>
+                                </p:cTn>
+                              </p:par>
+                            </p:childTnLst>
+                          </p:cTn>
+                        </p:par>
+                      </p:childTnLst>
+                    </p:cTn>
+                  </p:par>
+                </p:childTnLst>
+              </p:cTn>
+              <p:prevCondLst>
+                <p:cond evt="onPrev" delay="0">
+                  <p:tgtEl>
+                    <p:sldTgt/>
+                  </p:tgtEl>
+                </p:cond>
+              </p:prevCondLst>
+              <p:nextCondLst>
+                <p:cond evt="onNext" delay="0">
+                  <p:tgtEl>
+                    <p:sldTgt/>
+                  </p:tgtEl>
+                </p:cond>
+              </p:nextCondLst>
+            </p:seq>
+          </p:childTnLst>
+        </p:cTn>
+      </p:par>
+    </p:tnLst>
+    <p:bldLst>
+      <p:bldP spid="3" grpId="0" uiExpand="1" build="p"/>
+    </p:bldLst>
+  </p:timing>
 </p:sld>
 </file>
 
@@ -4328,7 +6634,7 @@
           <p:cNvPr id="2" name="Titel 1">
             <a:extLst>
               <a:ext uri="{FF2B5EF4-FFF2-40B4-BE49-F238E27FC236}">
-                <a16:creationId xmlns:a16="http://schemas.microsoft.com/office/drawing/2014/main" id="{3D4823C5-B211-4AAE-BBCC-F96361A2ADA1}"/>
+                <a16:creationId xmlns:a16="http://schemas.microsoft.com/office/drawing/2014/main" id="{9326BDAB-F4D7-4E8B-8691-9C70EED4811D}"/>
               </a:ext>
             </a:extLst>
           </p:cNvPr>
@@ -4345,80 +6651,194 @@
           <a:lstStyle/>
           <a:p>
             <a:r>
-              <a:rPr lang="de-CH" dirty="0"/>
-              <a:t>Background</a:t>
-            </a:r>
-          </a:p>
-        </p:txBody>
-      </p:sp>
-      <p:sp>
-        <p:nvSpPr>
-          <p:cNvPr id="3" name="Inhaltsplatzhalter 2">
+              <a:rPr lang="en-GB" dirty="0"/>
+              <a:t>Design</a:t>
+            </a:r>
+          </a:p>
+        </p:txBody>
+      </p:sp>
+      <p:pic>
+        <p:nvPicPr>
+          <p:cNvPr id="6" name="Grafik 5">
             <a:extLst>
               <a:ext uri="{FF2B5EF4-FFF2-40B4-BE49-F238E27FC236}">
-                <a16:creationId xmlns:a16="http://schemas.microsoft.com/office/drawing/2014/main" id="{47E3DF17-BC6E-4A05-B688-7FCD31C19901}"/>
+                <a16:creationId xmlns:a16="http://schemas.microsoft.com/office/drawing/2014/main" id="{5EBA28A6-6E19-41AE-9ACC-E517F6FFB5F2}"/>
               </a:ext>
             </a:extLst>
           </p:cNvPr>
-          <p:cNvSpPr>
-            <a:spLocks noGrp="1"/>
-          </p:cNvSpPr>
-          <p:nvPr>
-            <p:ph idx="1"/>
-          </p:nvPr>
-        </p:nvSpPr>
-        <p:spPr/>
-        <p:txBody>
-          <a:bodyPr/>
-          <a:lstStyle/>
-          <a:p>
-            <a:r>
-              <a:rPr lang="de-CH" dirty="0">
-                <a:solidFill>
-                  <a:srgbClr val="FF0000"/>
-                </a:solidFill>
-              </a:rPr>
-              <a:t>UML </a:t>
-            </a:r>
-            <a:r>
-              <a:rPr lang="de-CH" dirty="0" err="1">
-                <a:solidFill>
-                  <a:srgbClr val="FF0000"/>
-                </a:solidFill>
-              </a:rPr>
-              <a:t>Datastructure</a:t>
-            </a:r>
-            <a:r>
-              <a:rPr lang="de-CH" dirty="0">
-                <a:solidFill>
-                  <a:srgbClr val="FF0000"/>
-                </a:solidFill>
-              </a:rPr>
-              <a:t> </a:t>
-            </a:r>
-            <a:r>
-              <a:rPr lang="en-GB" noProof="1">
-                <a:solidFill>
-                  <a:srgbClr val="FF0000"/>
-                </a:solidFill>
-              </a:rPr>
-              <a:t>einfügen</a:t>
-            </a:r>
-            <a:r>
-              <a:rPr lang="de-CH" dirty="0">
-                <a:solidFill>
-                  <a:srgbClr val="FF0000"/>
-                </a:solidFill>
-              </a:rPr>
-              <a:t> !!!</a:t>
-            </a:r>
-          </a:p>
-        </p:txBody>
-      </p:sp>
+          <p:cNvPicPr>
+            <a:picLocks noChangeAspect="1"/>
+          </p:cNvPicPr>
+          <p:nvPr/>
+        </p:nvPicPr>
+        <p:blipFill>
+          <a:blip r:embed="rId3"/>
+          <a:stretch>
+            <a:fillRect/>
+          </a:stretch>
+        </p:blipFill>
+        <p:spPr>
+          <a:xfrm>
+            <a:off x="288245" y="1690688"/>
+            <a:ext cx="2691517" cy="4724626"/>
+          </a:xfrm>
+          <a:prstGeom prst="rect">
+            <a:avLst/>
+          </a:prstGeom>
+        </p:spPr>
+      </p:pic>
+      <p:pic>
+        <p:nvPicPr>
+          <p:cNvPr id="7" name="Grafik 6">
+            <a:extLst>
+              <a:ext uri="{FF2B5EF4-FFF2-40B4-BE49-F238E27FC236}">
+                <a16:creationId xmlns:a16="http://schemas.microsoft.com/office/drawing/2014/main" id="{297ECA95-8182-49F3-A49E-E8879B4EBECD}"/>
+              </a:ext>
+            </a:extLst>
+          </p:cNvPr>
+          <p:cNvPicPr>
+            <a:picLocks noChangeAspect="1"/>
+          </p:cNvPicPr>
+          <p:nvPr/>
+        </p:nvPicPr>
+        <p:blipFill>
+          <a:blip r:embed="rId4"/>
+          <a:stretch>
+            <a:fillRect/>
+          </a:stretch>
+        </p:blipFill>
+        <p:spPr>
+          <a:xfrm>
+            <a:off x="3235997" y="1690687"/>
+            <a:ext cx="2672006" cy="4724627"/>
+          </a:xfrm>
+          <a:prstGeom prst="rect">
+            <a:avLst/>
+          </a:prstGeom>
+        </p:spPr>
+      </p:pic>
+      <p:pic>
+        <p:nvPicPr>
+          <p:cNvPr id="11" name="Grafik 10">
+            <a:extLst>
+              <a:ext uri="{FF2B5EF4-FFF2-40B4-BE49-F238E27FC236}">
+                <a16:creationId xmlns:a16="http://schemas.microsoft.com/office/drawing/2014/main" id="{84752E13-B9C3-4316-A6A1-D0A2C9FFC5CE}"/>
+              </a:ext>
+            </a:extLst>
+          </p:cNvPr>
+          <p:cNvPicPr>
+            <a:picLocks noChangeAspect="1"/>
+          </p:cNvPicPr>
+          <p:nvPr/>
+        </p:nvPicPr>
+        <p:blipFill>
+          <a:blip r:embed="rId5"/>
+          <a:stretch>
+            <a:fillRect/>
+          </a:stretch>
+        </p:blipFill>
+        <p:spPr>
+          <a:xfrm>
+            <a:off x="6164238" y="1690687"/>
+            <a:ext cx="2711087" cy="4724626"/>
+          </a:xfrm>
+          <a:prstGeom prst="rect">
+            <a:avLst/>
+          </a:prstGeom>
+        </p:spPr>
+      </p:pic>
+      <p:cxnSp>
+        <p:nvCxnSpPr>
+          <p:cNvPr id="13" name="Gerade Verbindung mit Pfeil 12">
+            <a:extLst>
+              <a:ext uri="{FF2B5EF4-FFF2-40B4-BE49-F238E27FC236}">
+                <a16:creationId xmlns:a16="http://schemas.microsoft.com/office/drawing/2014/main" id="{95FCC564-29F4-4F7D-A21B-079BB25FAFA2}"/>
+              </a:ext>
+            </a:extLst>
+          </p:cNvPr>
+          <p:cNvCxnSpPr>
+            <a:cxnSpLocks/>
+          </p:cNvCxnSpPr>
+          <p:nvPr/>
+        </p:nvCxnSpPr>
+        <p:spPr>
+          <a:xfrm>
+            <a:off x="2400300" y="4411756"/>
+            <a:ext cx="1393451" cy="0"/>
+          </a:xfrm>
+          <a:prstGeom prst="straightConnector1">
+            <a:avLst/>
+          </a:prstGeom>
+          <a:ln w="76200">
+            <a:solidFill>
+              <a:srgbClr val="FF0000"/>
+            </a:solidFill>
+            <a:tailEnd type="triangle"/>
+          </a:ln>
+        </p:spPr>
+        <p:style>
+          <a:lnRef idx="1">
+            <a:schemeClr val="accent1"/>
+          </a:lnRef>
+          <a:fillRef idx="0">
+            <a:schemeClr val="accent1"/>
+          </a:fillRef>
+          <a:effectRef idx="0">
+            <a:schemeClr val="accent1"/>
+          </a:effectRef>
+          <a:fontRef idx="minor">
+            <a:schemeClr val="tx1"/>
+          </a:fontRef>
+        </p:style>
+      </p:cxnSp>
+      <p:cxnSp>
+        <p:nvCxnSpPr>
+          <p:cNvPr id="15" name="Gerade Verbindung mit Pfeil 14">
+            <a:extLst>
+              <a:ext uri="{FF2B5EF4-FFF2-40B4-BE49-F238E27FC236}">
+                <a16:creationId xmlns:a16="http://schemas.microsoft.com/office/drawing/2014/main" id="{3071C97B-3BAE-420C-93AB-9847947D8D63}"/>
+              </a:ext>
+            </a:extLst>
+          </p:cNvPr>
+          <p:cNvCxnSpPr>
+            <a:cxnSpLocks/>
+          </p:cNvCxnSpPr>
+          <p:nvPr/>
+        </p:nvCxnSpPr>
+        <p:spPr>
+          <a:xfrm>
+            <a:off x="5467512" y="4722652"/>
+            <a:ext cx="1393451" cy="0"/>
+          </a:xfrm>
+          <a:prstGeom prst="straightConnector1">
+            <a:avLst/>
+          </a:prstGeom>
+          <a:ln w="76200">
+            <a:solidFill>
+              <a:srgbClr val="FF0000"/>
+            </a:solidFill>
+            <a:tailEnd type="triangle"/>
+          </a:ln>
+        </p:spPr>
+        <p:style>
+          <a:lnRef idx="1">
+            <a:schemeClr val="accent1"/>
+          </a:lnRef>
+          <a:fillRef idx="0">
+            <a:schemeClr val="accent1"/>
+          </a:fillRef>
+          <a:effectRef idx="0">
+            <a:schemeClr val="accent1"/>
+          </a:effectRef>
+          <a:fontRef idx="minor">
+            <a:schemeClr val="tx1"/>
+          </a:fontRef>
+        </p:style>
+      </p:cxnSp>
     </p:spTree>
     <p:extLst>
       <p:ext uri="{BB962C8B-B14F-4D97-AF65-F5344CB8AC3E}">
-        <p14:creationId xmlns:p14="http://schemas.microsoft.com/office/powerpoint/2010/main" val="3365552931"/>
+        <p14:creationId xmlns:p14="http://schemas.microsoft.com/office/powerpoint/2010/main" val="1584912592"/>
       </p:ext>
     </p:extLst>
   </p:cSld>
@@ -4450,144 +6870,6 @@
           <p:cNvPr id="2" name="Titel 1">
             <a:extLst>
               <a:ext uri="{FF2B5EF4-FFF2-40B4-BE49-F238E27FC236}">
-                <a16:creationId xmlns:a16="http://schemas.microsoft.com/office/drawing/2014/main" id="{9326BDAB-F4D7-4E8B-8691-9C70EED4811D}"/>
-              </a:ext>
-            </a:extLst>
-          </p:cNvPr>
-          <p:cNvSpPr>
-            <a:spLocks noGrp="1"/>
-          </p:cNvSpPr>
-          <p:nvPr>
-            <p:ph type="title"/>
-          </p:nvPr>
-        </p:nvSpPr>
-        <p:spPr/>
-        <p:txBody>
-          <a:bodyPr/>
-          <a:lstStyle/>
-          <a:p>
-            <a:r>
-              <a:rPr lang="en-GB" dirty="0"/>
-              <a:t>Design</a:t>
-            </a:r>
-          </a:p>
-        </p:txBody>
-      </p:sp>
-      <p:sp>
-        <p:nvSpPr>
-          <p:cNvPr id="3" name="Inhaltsplatzhalter 2">
-            <a:extLst>
-              <a:ext uri="{FF2B5EF4-FFF2-40B4-BE49-F238E27FC236}">
-                <a16:creationId xmlns:a16="http://schemas.microsoft.com/office/drawing/2014/main" id="{ACF2AFDA-D59D-413B-B025-5384B9C8F31E}"/>
-              </a:ext>
-            </a:extLst>
-          </p:cNvPr>
-          <p:cNvSpPr>
-            <a:spLocks noGrp="1"/>
-          </p:cNvSpPr>
-          <p:nvPr>
-            <p:ph idx="1"/>
-          </p:nvPr>
-        </p:nvSpPr>
-        <p:spPr/>
-        <p:txBody>
-          <a:bodyPr/>
-          <a:lstStyle/>
-          <a:p>
-            <a:r>
-              <a:rPr lang="en-GB" dirty="0">
-                <a:solidFill>
-                  <a:srgbClr val="FF0000"/>
-                </a:solidFill>
-              </a:rPr>
-              <a:t>Screenshots </a:t>
-            </a:r>
-            <a:r>
-              <a:rPr lang="en-GB" dirty="0" err="1">
-                <a:solidFill>
-                  <a:srgbClr val="FF0000"/>
-                </a:solidFill>
-              </a:rPr>
-              <a:t>einfügen</a:t>
-            </a:r>
-            <a:r>
-              <a:rPr lang="en-GB" dirty="0">
-                <a:solidFill>
-                  <a:srgbClr val="FF0000"/>
-                </a:solidFill>
-              </a:rPr>
-              <a:t> </a:t>
-            </a:r>
-            <a:r>
-              <a:rPr lang="en-GB" dirty="0" err="1">
-                <a:solidFill>
-                  <a:srgbClr val="FF0000"/>
-                </a:solidFill>
-              </a:rPr>
-              <a:t>mit</a:t>
-            </a:r>
-            <a:r>
-              <a:rPr lang="en-GB" dirty="0">
-                <a:solidFill>
-                  <a:srgbClr val="FF0000"/>
-                </a:solidFill>
-              </a:rPr>
-              <a:t> </a:t>
-            </a:r>
-            <a:r>
-              <a:rPr lang="en-GB" dirty="0" err="1">
-                <a:solidFill>
-                  <a:srgbClr val="FF0000"/>
-                </a:solidFill>
-              </a:rPr>
-              <a:t>verbindungen</a:t>
-            </a:r>
-            <a:r>
-              <a:rPr lang="en-GB" dirty="0">
-                <a:solidFill>
-                  <a:srgbClr val="FF0000"/>
-                </a:solidFill>
-              </a:rPr>
-              <a:t> -&gt; Navigation map</a:t>
-            </a:r>
-          </a:p>
-        </p:txBody>
-      </p:sp>
-    </p:spTree>
-    <p:extLst>
-      <p:ext uri="{BB962C8B-B14F-4D97-AF65-F5344CB8AC3E}">
-        <p14:creationId xmlns:p14="http://schemas.microsoft.com/office/powerpoint/2010/main" val="1584912592"/>
-      </p:ext>
-    </p:extLst>
-  </p:cSld>
-  <p:clrMapOvr>
-    <a:masterClrMapping/>
-  </p:clrMapOvr>
-</p:sld>
-</file>
-
-<file path=ppt/slides/slide8.xml><?xml version="1.0" encoding="utf-8"?>
-<p:sld xmlns:a="http://schemas.openxmlformats.org/drawingml/2006/main" xmlns:r="http://schemas.openxmlformats.org/officeDocument/2006/relationships" xmlns:p="http://schemas.openxmlformats.org/presentationml/2006/main">
-  <p:cSld>
-    <p:spTree>
-      <p:nvGrpSpPr>
-        <p:cNvPr id="1" name=""/>
-        <p:cNvGrpSpPr/>
-        <p:nvPr/>
-      </p:nvGrpSpPr>
-      <p:grpSpPr>
-        <a:xfrm>
-          <a:off x="0" y="0"/>
-          <a:ext cx="0" cy="0"/>
-          <a:chOff x="0" y="0"/>
-          <a:chExt cx="0" cy="0"/>
-        </a:xfrm>
-      </p:grpSpPr>
-      <p:sp>
-        <p:nvSpPr>
-          <p:cNvPr id="2" name="Titel 1">
-            <a:extLst>
-              <a:ext uri="{FF2B5EF4-FFF2-40B4-BE49-F238E27FC236}">
                 <a16:creationId xmlns:a16="http://schemas.microsoft.com/office/drawing/2014/main" id="{5505A034-4A33-4CCB-B412-7532EF575183}"/>
               </a:ext>
             </a:extLst>
@@ -4633,119 +6915,68 @@
           <a:lstStyle/>
           <a:p>
             <a:r>
-              <a:rPr lang="en-GB" dirty="0" err="1">
-                <a:solidFill>
-                  <a:srgbClr val="FF0000"/>
-                </a:solidFill>
-              </a:rPr>
-              <a:t>Wie</a:t>
-            </a:r>
-            <a:r>
-              <a:rPr lang="en-GB" dirty="0">
-                <a:solidFill>
-                  <a:srgbClr val="FF0000"/>
-                </a:solidFill>
-              </a:rPr>
-              <a:t> </a:t>
-            </a:r>
-            <a:r>
-              <a:rPr lang="en-GB" dirty="0" err="1">
-                <a:solidFill>
-                  <a:srgbClr val="FF0000"/>
-                </a:solidFill>
-              </a:rPr>
-              <a:t>ist</a:t>
-            </a:r>
-            <a:r>
-              <a:rPr lang="en-GB" dirty="0">
-                <a:solidFill>
-                  <a:srgbClr val="FF0000"/>
-                </a:solidFill>
-              </a:rPr>
-              <a:t> </a:t>
-            </a:r>
-            <a:r>
-              <a:rPr lang="en-GB" dirty="0" err="1">
-                <a:solidFill>
-                  <a:srgbClr val="FF0000"/>
-                </a:solidFill>
-              </a:rPr>
-              <a:t>es</a:t>
-            </a:r>
-            <a:r>
-              <a:rPr lang="en-GB" dirty="0">
-                <a:solidFill>
-                  <a:srgbClr val="FF0000"/>
-                </a:solidFill>
-              </a:rPr>
-              <a:t> </a:t>
-            </a:r>
-            <a:r>
-              <a:rPr lang="en-GB" dirty="0" err="1">
-                <a:solidFill>
-                  <a:srgbClr val="FF0000"/>
-                </a:solidFill>
-              </a:rPr>
-              <a:t>gemacht</a:t>
-            </a:r>
-            <a:r>
-              <a:rPr lang="en-GB" dirty="0">
-                <a:solidFill>
-                  <a:srgbClr val="FF0000"/>
-                </a:solidFill>
-              </a:rPr>
-              <a:t>. Server </a:t>
-            </a:r>
-            <a:r>
-              <a:rPr lang="en-GB" dirty="0" err="1">
-                <a:solidFill>
-                  <a:srgbClr val="FF0000"/>
-                </a:solidFill>
-              </a:rPr>
-              <a:t>Applikation</a:t>
-            </a:r>
-            <a:r>
-              <a:rPr lang="en-GB" dirty="0">
-                <a:solidFill>
-                  <a:srgbClr val="FF0000"/>
-                </a:solidFill>
-              </a:rPr>
-              <a:t>. </a:t>
-            </a:r>
-          </a:p>
-          <a:p>
-            <a:r>
-              <a:rPr lang="en-GB" dirty="0" err="1">
-                <a:solidFill>
-                  <a:srgbClr val="FF0000"/>
-                </a:solidFill>
-              </a:rPr>
-              <a:t>Ablauf</a:t>
-            </a:r>
-            <a:r>
-              <a:rPr lang="en-GB" dirty="0">
-                <a:solidFill>
-                  <a:srgbClr val="FF0000"/>
-                </a:solidFill>
-              </a:rPr>
-              <a:t>, </a:t>
-            </a:r>
-            <a:r>
-              <a:rPr lang="en-GB" dirty="0" err="1">
-                <a:solidFill>
-                  <a:srgbClr val="FF0000"/>
-                </a:solidFill>
-              </a:rPr>
-              <a:t>Sortieren</a:t>
-            </a:r>
-            <a:r>
-              <a:rPr lang="en-GB" dirty="0">
-                <a:solidFill>
-                  <a:srgbClr val="FF0000"/>
-                </a:solidFill>
-              </a:rPr>
-              <a:t>, etc.</a:t>
-            </a:r>
+              <a:rPr lang="de-CH" dirty="0" err="1"/>
+              <a:t>Firebase</a:t>
+            </a:r>
+            <a:endParaRPr lang="de-CH" dirty="0"/>
+          </a:p>
+          <a:p>
+            <a:pPr lvl="1"/>
+            <a:r>
+              <a:rPr lang="de-CH" dirty="0" err="1"/>
+              <a:t>Geofire</a:t>
+            </a:r>
+            <a:endParaRPr lang="de-CH" dirty="0"/>
+          </a:p>
+          <a:p>
+            <a:r>
+              <a:rPr lang="de-CH" dirty="0"/>
+              <a:t>External API</a:t>
+            </a:r>
+          </a:p>
+          <a:p>
+            <a:pPr lvl="1"/>
+            <a:r>
+              <a:rPr lang="de-CH" dirty="0"/>
+              <a:t>Skimap.org</a:t>
+            </a:r>
+          </a:p>
+          <a:p>
+            <a:pPr lvl="1"/>
+            <a:r>
+              <a:rPr lang="de-CH" dirty="0"/>
+              <a:t>OpenWeatherMap.org</a:t>
+            </a:r>
+          </a:p>
+          <a:p>
+            <a:r>
+              <a:rPr lang="en-GB" dirty="0"/>
+              <a:t>Server</a:t>
+            </a:r>
+            <a:r>
+              <a:rPr lang="de-CH" dirty="0"/>
+              <a:t> Programm</a:t>
+            </a:r>
+          </a:p>
+          <a:p>
+            <a:pPr lvl="1"/>
+            <a:r>
+              <a:rPr lang="de-CH" dirty="0"/>
+              <a:t>Java </a:t>
+            </a:r>
+            <a:r>
+              <a:rPr lang="de-CH" dirty="0" err="1"/>
+              <a:t>Application</a:t>
+            </a:r>
+            <a:endParaRPr lang="de-CH" dirty="0"/>
+          </a:p>
+          <a:p>
+            <a:pPr lvl="1"/>
+            <a:r>
+              <a:rPr lang="de-CH" dirty="0" err="1"/>
+              <a:t>Gson</a:t>
+            </a:r>
+            <a:endParaRPr lang="de-CH" dirty="0"/>
           </a:p>
         </p:txBody>
       </p:sp>
@@ -4762,7 +6993,7 @@
 </p:sld>
 </file>
 
-<file path=ppt/slides/slide9.xml><?xml version="1.0" encoding="utf-8"?>
+<file path=ppt/slides/slide8.xml><?xml version="1.0" encoding="utf-8"?>
 <p:sld xmlns:a="http://schemas.openxmlformats.org/drawingml/2006/main" xmlns:r="http://schemas.openxmlformats.org/officeDocument/2006/relationships" xmlns:p="http://schemas.openxmlformats.org/presentationml/2006/main">
   <p:cSld>
     <p:spTree>
@@ -6946,6 +9177,92 @@
     <p:extLst>
       <p:ext uri="{BB962C8B-B14F-4D97-AF65-F5344CB8AC3E}">
         <p14:creationId xmlns:p14="http://schemas.microsoft.com/office/powerpoint/2010/main" val="1911205960"/>
+      </p:ext>
+    </p:extLst>
+  </p:cSld>
+  <p:clrMapOvr>
+    <a:masterClrMapping/>
+  </p:clrMapOvr>
+</p:sld>
+</file>
+
+<file path=ppt/slides/slide9.xml><?xml version="1.0" encoding="utf-8"?>
+<p:sld xmlns:a="http://schemas.openxmlformats.org/drawingml/2006/main" xmlns:r="http://schemas.openxmlformats.org/officeDocument/2006/relationships" xmlns:p="http://schemas.openxmlformats.org/presentationml/2006/main">
+  <p:cSld>
+    <p:spTree>
+      <p:nvGrpSpPr>
+        <p:cNvPr id="1" name=""/>
+        <p:cNvGrpSpPr/>
+        <p:nvPr/>
+      </p:nvGrpSpPr>
+      <p:grpSpPr>
+        <a:xfrm>
+          <a:off x="0" y="0"/>
+          <a:ext cx="0" cy="0"/>
+          <a:chOff x="0" y="0"/>
+          <a:chExt cx="0" cy="0"/>
+        </a:xfrm>
+      </p:grpSpPr>
+      <p:sp>
+        <p:nvSpPr>
+          <p:cNvPr id="2" name="Titel 1">
+            <a:extLst>
+              <a:ext uri="{FF2B5EF4-FFF2-40B4-BE49-F238E27FC236}">
+                <a16:creationId xmlns:a16="http://schemas.microsoft.com/office/drawing/2014/main" id="{A1320CD9-07C0-41F5-9031-90292C9BA40C}"/>
+              </a:ext>
+            </a:extLst>
+          </p:cNvPr>
+          <p:cNvSpPr>
+            <a:spLocks noGrp="1"/>
+          </p:cNvSpPr>
+          <p:nvPr>
+            <p:ph type="title"/>
+          </p:nvPr>
+        </p:nvSpPr>
+        <p:spPr/>
+        <p:txBody>
+          <a:bodyPr/>
+          <a:lstStyle/>
+          <a:p>
+            <a:r>
+              <a:rPr lang="en-GB" dirty="0"/>
+              <a:t>Implementation</a:t>
+            </a:r>
+          </a:p>
+        </p:txBody>
+      </p:sp>
+      <p:sp>
+        <p:nvSpPr>
+          <p:cNvPr id="3" name="Inhaltsplatzhalter 2">
+            <a:extLst>
+              <a:ext uri="{FF2B5EF4-FFF2-40B4-BE49-F238E27FC236}">
+                <a16:creationId xmlns:a16="http://schemas.microsoft.com/office/drawing/2014/main" id="{DEEE9B27-06A7-469E-B9E8-72D4FDF1E1F1}"/>
+              </a:ext>
+            </a:extLst>
+          </p:cNvPr>
+          <p:cNvSpPr>
+            <a:spLocks noGrp="1"/>
+          </p:cNvSpPr>
+          <p:nvPr>
+            <p:ph idx="1"/>
+          </p:nvPr>
+        </p:nvSpPr>
+        <p:spPr/>
+        <p:txBody>
+          <a:bodyPr/>
+          <a:lstStyle/>
+          <a:p>
+            <a:r>
+              <a:rPr lang="en-GB" dirty="0"/>
+              <a:t>Scrum</a:t>
+            </a:r>
+          </a:p>
+        </p:txBody>
+      </p:sp>
+    </p:spTree>
+    <p:extLst>
+      <p:ext uri="{BB962C8B-B14F-4D97-AF65-F5344CB8AC3E}">
+        <p14:creationId xmlns:p14="http://schemas.microsoft.com/office/powerpoint/2010/main" val="1313387902"/>
       </p:ext>
     </p:extLst>
   </p:cSld>

</xml_diff>

<commit_message>
Change color of selected spinner item. Added presentation details.
</commit_message>
<xml_diff>
--- a/Documents/Presentation/Presentation.pptx
+++ b/Documents/Presentation/Presentation.pptx
@@ -1089,50 +1089,34 @@
           <a:bodyPr/>
           <a:lstStyle/>
           <a:p>
-            <a:pPr marL="0" marR="0" lvl="0" indent="0" algn="l" defTabSz="914400" rtl="0" eaLnBrk="1" fontAlgn="auto" latinLnBrk="0" hangingPunct="1">
-              <a:lnSpc>
-                <a:spcPct val="100000"/>
-              </a:lnSpc>
-              <a:spcBef>
-                <a:spcPts val="0"/>
-              </a:spcBef>
-              <a:spcAft>
-                <a:spcPts val="0"/>
-              </a:spcAft>
-              <a:buClrTx/>
-              <a:buSzTx/>
-              <a:buFontTx/>
-              <a:buNone/>
-              <a:tabLst/>
-              <a:defRPr/>
-            </a:pPr>
+            <a:r>
+              <a:rPr lang="de-CH" dirty="0"/>
+              <a:t>Datenstruktur wird von API vorgegeben -&gt; </a:t>
+            </a:r>
             <a:r>
               <a:rPr lang="de-CH" dirty="0" err="1"/>
-              <a:t>Scrum</a:t>
+              <a:t>SkiResort</a:t>
             </a:r>
             <a:r>
               <a:rPr lang="de-CH" dirty="0"/>
-              <a:t>: Leicht abgeänderte Variante, wöchentliche Sprints, </a:t>
+              <a:t> von einer API, </a:t>
             </a:r>
             <a:r>
               <a:rPr lang="de-CH" dirty="0" err="1"/>
-              <a:t>daily</a:t>
+              <a:t>WeatherData</a:t>
             </a:r>
             <a:r>
               <a:rPr lang="de-CH" dirty="0"/>
-              <a:t> </a:t>
+              <a:t> von anderer API, wird dynamisch an </a:t>
             </a:r>
             <a:r>
               <a:rPr lang="de-CH" dirty="0" err="1"/>
-              <a:t>meeting</a:t>
+              <a:t>SkiResort</a:t>
             </a:r>
             <a:r>
               <a:rPr lang="de-CH" dirty="0"/>
-              <a:t> etwa alle 2-3 Tage (WE und Mi/Do)</a:t>
-            </a:r>
-          </a:p>
-          <a:p>
-            <a:endParaRPr lang="en-GB" dirty="0"/>
+              <a:t> angehängt.</a:t>
+            </a:r>
           </a:p>
         </p:txBody>
       </p:sp>
@@ -1153,7 +1137,7 @@
           <a:p>
             <a:fld id="{748723F8-CD6B-45E3-B09A-75062809A4AE}" type="slidenum">
               <a:rPr lang="en-GB" smtClean="0"/>
-              <a:t>9</a:t>
+              <a:t>8</a:t>
             </a:fld>
             <a:endParaRPr lang="en-GB"/>
           </a:p>
@@ -1162,7 +1146,7 @@
     </p:spTree>
     <p:extLst>
       <p:ext uri="{BB962C8B-B14F-4D97-AF65-F5344CB8AC3E}">
-        <p14:creationId xmlns:p14="http://schemas.microsoft.com/office/powerpoint/2010/main" val="187494911"/>
+        <p14:creationId xmlns:p14="http://schemas.microsoft.com/office/powerpoint/2010/main" val="3349451142"/>
       </p:ext>
     </p:extLst>
   </p:cSld>
@@ -1216,6 +1200,251 @@
           <a:bodyPr/>
           <a:lstStyle/>
           <a:p>
+            <a:pPr marL="0" marR="0" lvl="0" indent="0" algn="l" defTabSz="914400" rtl="0" eaLnBrk="1" fontAlgn="auto" latinLnBrk="0" hangingPunct="1">
+              <a:lnSpc>
+                <a:spcPct val="100000"/>
+              </a:lnSpc>
+              <a:spcBef>
+                <a:spcPts val="0"/>
+              </a:spcBef>
+              <a:spcAft>
+                <a:spcPts val="0"/>
+              </a:spcAft>
+              <a:buClrTx/>
+              <a:buSzTx/>
+              <a:buFontTx/>
+              <a:buNone/>
+              <a:tabLst/>
+              <a:defRPr/>
+            </a:pPr>
+            <a:r>
+              <a:rPr lang="de-CH" dirty="0" err="1"/>
+              <a:t>Scrum</a:t>
+            </a:r>
+            <a:r>
+              <a:rPr lang="de-CH" dirty="0"/>
+              <a:t>: Leicht abgeänderte Variante, wöchentliche Sprints, </a:t>
+            </a:r>
+            <a:r>
+              <a:rPr lang="de-CH" dirty="0" err="1"/>
+              <a:t>daily</a:t>
+            </a:r>
+            <a:r>
+              <a:rPr lang="de-CH" dirty="0"/>
+              <a:t> </a:t>
+            </a:r>
+            <a:r>
+              <a:rPr lang="de-CH" dirty="0" err="1"/>
+              <a:t>meeting</a:t>
+            </a:r>
+            <a:r>
+              <a:rPr lang="de-CH" dirty="0"/>
+              <a:t> etwa alle 2-3 Tage (WE und Mi/Do)</a:t>
+            </a:r>
+          </a:p>
+          <a:p>
+            <a:pPr marL="0" marR="0" lvl="0" indent="0" algn="l" defTabSz="914400" rtl="0" eaLnBrk="1" fontAlgn="auto" latinLnBrk="0" hangingPunct="1">
+              <a:lnSpc>
+                <a:spcPct val="100000"/>
+              </a:lnSpc>
+              <a:spcBef>
+                <a:spcPts val="0"/>
+              </a:spcBef>
+              <a:spcAft>
+                <a:spcPts val="0"/>
+              </a:spcAft>
+              <a:buClrTx/>
+              <a:buSzTx/>
+              <a:buFontTx/>
+              <a:buNone/>
+              <a:tabLst/>
+              <a:defRPr/>
+            </a:pPr>
+            <a:r>
+              <a:rPr lang="de-CH" dirty="0" err="1"/>
+              <a:t>GeoFire</a:t>
+            </a:r>
+            <a:r>
+              <a:rPr lang="de-CH" dirty="0"/>
+              <a:t>: Wie nach Distanzsortieren -&gt; Druckwellenmässig (Performance)</a:t>
+            </a:r>
+          </a:p>
+          <a:p>
+            <a:pPr marL="0" marR="0" lvl="0" indent="0" algn="l" defTabSz="914400" rtl="0" eaLnBrk="1" fontAlgn="auto" latinLnBrk="0" hangingPunct="1">
+              <a:lnSpc>
+                <a:spcPct val="100000"/>
+              </a:lnSpc>
+              <a:spcBef>
+                <a:spcPts val="0"/>
+              </a:spcBef>
+              <a:spcAft>
+                <a:spcPts val="0"/>
+              </a:spcAft>
+              <a:buClrTx/>
+              <a:buSzTx/>
+              <a:buFontTx/>
+              <a:buNone/>
+              <a:tabLst/>
+              <a:defRPr/>
+            </a:pPr>
+            <a:r>
+              <a:rPr lang="de-CH" dirty="0" err="1"/>
+              <a:t>Sorting</a:t>
+            </a:r>
+            <a:r>
+              <a:rPr lang="de-CH" dirty="0"/>
+              <a:t> </a:t>
+            </a:r>
+            <a:r>
+              <a:rPr lang="de-CH" dirty="0" err="1"/>
+              <a:t>of</a:t>
+            </a:r>
+            <a:r>
+              <a:rPr lang="de-CH" dirty="0"/>
+              <a:t> </a:t>
+            </a:r>
+            <a:r>
+              <a:rPr lang="de-CH" dirty="0" err="1"/>
+              <a:t>list</a:t>
+            </a:r>
+            <a:r>
+              <a:rPr lang="de-CH" dirty="0"/>
+              <a:t>: Mit </a:t>
+            </a:r>
+            <a:r>
+              <a:rPr lang="de-CH" dirty="0" err="1"/>
+              <a:t>Comperatoren</a:t>
+            </a:r>
+            <a:r>
+              <a:rPr lang="de-CH" dirty="0"/>
+              <a:t>, teilweise eigene Logik was wie gewichtet wird</a:t>
+            </a:r>
+          </a:p>
+          <a:p>
+            <a:pPr marL="0" marR="0" lvl="0" indent="0" algn="l" defTabSz="914400" rtl="0" eaLnBrk="1" fontAlgn="auto" latinLnBrk="0" hangingPunct="1">
+              <a:lnSpc>
+                <a:spcPct val="100000"/>
+              </a:lnSpc>
+              <a:spcBef>
+                <a:spcPts val="0"/>
+              </a:spcBef>
+              <a:spcAft>
+                <a:spcPts val="0"/>
+              </a:spcAft>
+              <a:buClrTx/>
+              <a:buSzTx/>
+              <a:buFontTx/>
+              <a:buNone/>
+              <a:tabLst/>
+              <a:defRPr/>
+            </a:pPr>
+            <a:endParaRPr lang="de-CH" dirty="0"/>
+          </a:p>
+          <a:p>
+            <a:pPr marL="0" marR="0" lvl="0" indent="0" algn="l" defTabSz="914400" rtl="0" eaLnBrk="1" fontAlgn="auto" latinLnBrk="0" hangingPunct="1">
+              <a:lnSpc>
+                <a:spcPct val="100000"/>
+              </a:lnSpc>
+              <a:spcBef>
+                <a:spcPts val="0"/>
+              </a:spcBef>
+              <a:spcAft>
+                <a:spcPts val="0"/>
+              </a:spcAft>
+              <a:buClrTx/>
+              <a:buSzTx/>
+              <a:buFontTx/>
+              <a:buNone/>
+              <a:tabLst/>
+              <a:defRPr/>
+            </a:pPr>
+            <a:endParaRPr lang="de-CH" dirty="0"/>
+          </a:p>
+          <a:p>
+            <a:endParaRPr lang="en-GB" dirty="0"/>
+          </a:p>
+        </p:txBody>
+      </p:sp>
+      <p:sp>
+        <p:nvSpPr>
+          <p:cNvPr id="4" name="Foliennummernplatzhalter 3"/>
+          <p:cNvSpPr>
+            <a:spLocks noGrp="1"/>
+          </p:cNvSpPr>
+          <p:nvPr>
+            <p:ph type="sldNum" sz="quarter" idx="10"/>
+          </p:nvPr>
+        </p:nvSpPr>
+        <p:spPr/>
+        <p:txBody>
+          <a:bodyPr/>
+          <a:lstStyle/>
+          <a:p>
+            <a:fld id="{748723F8-CD6B-45E3-B09A-75062809A4AE}" type="slidenum">
+              <a:rPr lang="en-GB" smtClean="0"/>
+              <a:t>9</a:t>
+            </a:fld>
+            <a:endParaRPr lang="en-GB"/>
+          </a:p>
+        </p:txBody>
+      </p:sp>
+    </p:spTree>
+    <p:extLst>
+      <p:ext uri="{BB962C8B-B14F-4D97-AF65-F5344CB8AC3E}">
+        <p14:creationId xmlns:p14="http://schemas.microsoft.com/office/powerpoint/2010/main" val="187494911"/>
+      </p:ext>
+    </p:extLst>
+  </p:cSld>
+  <p:clrMapOvr>
+    <a:masterClrMapping/>
+  </p:clrMapOvr>
+</p:notes>
+</file>
+
+<file path=ppt/notesSlides/notesSlide5.xml><?xml version="1.0" encoding="utf-8"?>
+<p:notes xmlns:a="http://schemas.openxmlformats.org/drawingml/2006/main" xmlns:r="http://schemas.openxmlformats.org/officeDocument/2006/relationships" xmlns:p="http://schemas.openxmlformats.org/presentationml/2006/main">
+  <p:cSld>
+    <p:spTree>
+      <p:nvGrpSpPr>
+        <p:cNvPr id="1" name=""/>
+        <p:cNvGrpSpPr/>
+        <p:nvPr/>
+      </p:nvGrpSpPr>
+      <p:grpSpPr>
+        <a:xfrm>
+          <a:off x="0" y="0"/>
+          <a:ext cx="0" cy="0"/>
+          <a:chOff x="0" y="0"/>
+          <a:chExt cx="0" cy="0"/>
+        </a:xfrm>
+      </p:grpSpPr>
+      <p:sp>
+        <p:nvSpPr>
+          <p:cNvPr id="2" name="Folienbildplatzhalter 1"/>
+          <p:cNvSpPr>
+            <a:spLocks noGrp="1" noRot="1" noChangeAspect="1"/>
+          </p:cNvSpPr>
+          <p:nvPr>
+            <p:ph type="sldImg"/>
+          </p:nvPr>
+        </p:nvSpPr>
+        <p:spPr/>
+      </p:sp>
+      <p:sp>
+        <p:nvSpPr>
+          <p:cNvPr id="3" name="Notizenplatzhalter 2"/>
+          <p:cNvSpPr>
+            <a:spLocks noGrp="1"/>
+          </p:cNvSpPr>
+          <p:nvPr>
+            <p:ph type="body" idx="1"/>
+          </p:nvPr>
+        </p:nvSpPr>
+        <p:spPr/>
+        <p:txBody>
+          <a:bodyPr/>
+          <a:lstStyle/>
+          <a:p>
             <a:r>
               <a:rPr lang="en-GB" dirty="0"/>
               <a:t>JUnit Test</a:t>
@@ -1480,11 +1709,19 @@
             </a:r>
             <a:r>
               <a:rPr lang="en-GB" dirty="0" err="1"/>
-              <a:t>geschriben</a:t>
-            </a:r>
-            <a:r>
-              <a:rPr lang="en-GB" dirty="0"/>
-              <a:t> warden, </a:t>
+              <a:t>geschreiben</a:t>
+            </a:r>
+            <a:r>
+              <a:rPr lang="en-GB" dirty="0"/>
+              <a:t> </a:t>
+            </a:r>
+            <a:r>
+              <a:rPr lang="en-GB" dirty="0" err="1"/>
+              <a:t>werden</a:t>
+            </a:r>
+            <a:r>
+              <a:rPr lang="en-GB" dirty="0"/>
+              <a:t>, </a:t>
             </a:r>
             <a:r>
               <a:rPr lang="en-GB" dirty="0" err="1"/>
@@ -1520,7 +1757,7 @@
             </a:r>
             <a:r>
               <a:rPr lang="en-GB" dirty="0" err="1"/>
-              <a:t>währe</a:t>
+              <a:t>wäre</a:t>
             </a:r>
             <a:r>
               <a:rPr lang="en-GB" dirty="0"/>
@@ -1571,7 +1808,7 @@
             </a:r>
             <a:r>
               <a:rPr lang="en-GB" dirty="0" err="1"/>
-              <a:t>scho</a:t>
+              <a:t>schon</a:t>
             </a:r>
             <a:r>
               <a:rPr lang="en-GB" dirty="0"/>
@@ -1634,7 +1871,7 @@
             </a:r>
             <a:r>
               <a:rPr lang="en-GB" dirty="0" err="1"/>
-              <a:t>testen</a:t>
+              <a:t>Testen</a:t>
             </a:r>
             <a:r>
               <a:rPr lang="en-GB" dirty="0"/>
@@ -1646,15 +1883,7 @@
             </a:r>
             <a:r>
               <a:rPr lang="en-GB" dirty="0"/>
-              <a:t>. In ADB (Android </a:t>
-            </a:r>
-            <a:r>
-              <a:rPr lang="en-GB" dirty="0" err="1"/>
-              <a:t>Debuging</a:t>
-            </a:r>
-            <a:r>
-              <a:rPr lang="en-GB" dirty="0"/>
-              <a:t> Bridge) </a:t>
+              <a:t>. In ADB (Android Debugging Bridge) </a:t>
             </a:r>
             <a:r>
               <a:rPr lang="en-GB" dirty="0" err="1"/>
@@ -1680,7 +1909,7 @@
             </a:r>
             <a:r>
               <a:rPr lang="en-GB" dirty="0" err="1"/>
-              <a:t>interaktionen</a:t>
+              <a:t>Interaktionen</a:t>
             </a:r>
             <a:r>
               <a:rPr lang="en-GB" dirty="0"/>
@@ -1736,7 +1965,7 @@
             </a:r>
             <a:r>
               <a:rPr lang="en-GB" dirty="0" err="1"/>
-              <a:t>wahrscheindlichkeit</a:t>
+              <a:t>Wahrscheindlichkeit</a:t>
             </a:r>
             <a:r>
               <a:rPr lang="en-GB" dirty="0"/>
@@ -1789,7 +2018,7 @@
 </p:notes>
 </file>
 
-<file path=ppt/notesSlides/notesSlide5.xml><?xml version="1.0" encoding="utf-8"?>
+<file path=ppt/notesSlides/notesSlide6.xml><?xml version="1.0" encoding="utf-8"?>
 <p:notes xmlns:a="http://schemas.openxmlformats.org/drawingml/2006/main" xmlns:r="http://schemas.openxmlformats.org/officeDocument/2006/relationships" xmlns:p="http://schemas.openxmlformats.org/presentationml/2006/main">
   <p:cSld>
     <p:spTree>
@@ -6807,7 +7036,7 @@
         </p:nvCxnSpPr>
         <p:spPr>
           <a:xfrm>
-            <a:off x="5467512" y="4722652"/>
+            <a:off x="5467512" y="4411756"/>
             <a:ext cx="1393451" cy="0"/>
           </a:xfrm>
           <a:prstGeom prst="straightConnector1">
@@ -9255,6 +9484,19 @@
             <a:r>
               <a:rPr lang="en-GB" dirty="0"/>
               <a:t>Scrum</a:t>
+            </a:r>
+          </a:p>
+          <a:p>
+            <a:r>
+              <a:rPr lang="en-GB" dirty="0" err="1"/>
+              <a:t>GeoFire</a:t>
+            </a:r>
+            <a:endParaRPr lang="en-GB" dirty="0"/>
+          </a:p>
+          <a:p>
+            <a:r>
+              <a:rPr lang="en-GB" dirty="0"/>
+              <a:t>Sorting of list</a:t>
             </a:r>
           </a:p>
         </p:txBody>

</xml_diff>

<commit_message>
Added details to presentation. Changed mainActivity button text (de).
</commit_message>
<xml_diff>
--- a/Documents/Presentation/Presentation.pptx
+++ b/Documents/Presentation/Presentation.pptx
@@ -524,404 +524,17 @@
           <a:lstStyle/>
           <a:p>
             <a:r>
-              <a:rPr lang="en-GB" dirty="0"/>
-              <a:t>Grosse Ski </a:t>
-            </a:r>
-            <a:r>
-              <a:rPr lang="en-GB" dirty="0" err="1"/>
-              <a:t>Gebiete</a:t>
-            </a:r>
-            <a:r>
-              <a:rPr lang="en-GB" dirty="0"/>
-              <a:t> </a:t>
-            </a:r>
-            <a:r>
-              <a:rPr lang="en-GB" dirty="0" err="1"/>
-              <a:t>haben</a:t>
-            </a:r>
-            <a:r>
-              <a:rPr lang="en-GB" dirty="0"/>
-              <a:t> </a:t>
-            </a:r>
-            <a:r>
-              <a:rPr lang="en-GB" dirty="0" err="1"/>
-              <a:t>eigene</a:t>
-            </a:r>
-            <a:r>
-              <a:rPr lang="en-GB" dirty="0"/>
-              <a:t> Apps.</a:t>
-            </a:r>
-          </a:p>
-          <a:p>
-            <a:pPr marL="171450" indent="-171450">
-              <a:buFontTx/>
-              <a:buChar char="-"/>
-            </a:pPr>
-            <a:r>
-              <a:rPr lang="en-GB" dirty="0" err="1"/>
-              <a:t>Laax</a:t>
-            </a:r>
-            <a:r>
-              <a:rPr lang="en-GB" dirty="0"/>
-              <a:t>, Davos, </a:t>
-            </a:r>
-            <a:r>
-              <a:rPr lang="en-GB" dirty="0" err="1"/>
-              <a:t>Adelboden</a:t>
-            </a:r>
-            <a:endParaRPr lang="en-GB" dirty="0"/>
-          </a:p>
-          <a:p>
-            <a:pPr marL="171450" indent="-171450">
-              <a:buFontTx/>
-              <a:buChar char="-"/>
-            </a:pPr>
-            <a:r>
-              <a:rPr lang="en-GB" dirty="0" err="1"/>
-              <a:t>Lokal</a:t>
-            </a:r>
-            <a:r>
-              <a:rPr lang="en-GB" dirty="0"/>
-              <a:t>, </a:t>
-            </a:r>
-            <a:r>
-              <a:rPr lang="en-GB" dirty="0" err="1"/>
-              <a:t>Abgestimmt</a:t>
-            </a:r>
-            <a:r>
-              <a:rPr lang="en-GB" dirty="0"/>
-              <a:t> auf </a:t>
-            </a:r>
-            <a:r>
-              <a:rPr lang="en-GB" dirty="0" err="1"/>
-              <a:t>jeweilige</a:t>
-            </a:r>
-            <a:r>
-              <a:rPr lang="en-GB" dirty="0"/>
-              <a:t> Destination.</a:t>
-            </a:r>
-          </a:p>
-          <a:p>
-            <a:pPr marL="171450" indent="-171450">
-              <a:buFontTx/>
-              <a:buChar char="-"/>
-            </a:pPr>
-            <a:endParaRPr lang="en-GB" dirty="0"/>
-          </a:p>
-          <a:p>
-            <a:pPr marL="0" indent="0">
-              <a:buFontTx/>
-              <a:buNone/>
-            </a:pPr>
-            <a:r>
-              <a:rPr lang="en-GB" dirty="0" err="1"/>
-              <a:t>iSKI</a:t>
-            </a:r>
-            <a:endParaRPr lang="en-GB" dirty="0"/>
-          </a:p>
-          <a:p>
-            <a:pPr marL="171450" indent="-171450">
-              <a:buFontTx/>
-              <a:buChar char="-"/>
-            </a:pPr>
-            <a:r>
-              <a:rPr lang="en-GB" dirty="0" err="1"/>
-              <a:t>Je</a:t>
-            </a:r>
-            <a:r>
-              <a:rPr lang="en-GB" dirty="0"/>
-              <a:t> Land </a:t>
-            </a:r>
-            <a:r>
-              <a:rPr lang="en-GB" dirty="0" err="1"/>
-              <a:t>ein</a:t>
-            </a:r>
-            <a:r>
-              <a:rPr lang="en-GB" dirty="0"/>
-              <a:t> App.</a:t>
-            </a:r>
-          </a:p>
-          <a:p>
-            <a:pPr marL="171450" indent="-171450">
-              <a:buFontTx/>
-              <a:buChar char="-"/>
-            </a:pPr>
-            <a:r>
-              <a:rPr lang="en-GB" dirty="0"/>
-              <a:t>Community, Ski-Tracker, </a:t>
-            </a:r>
-            <a:r>
-              <a:rPr lang="en-GB" dirty="0" err="1"/>
-              <a:t>vergleichen</a:t>
-            </a:r>
-            <a:r>
-              <a:rPr lang="en-GB" dirty="0"/>
-              <a:t>, </a:t>
-            </a:r>
-          </a:p>
-          <a:p>
-            <a:pPr marL="171450" indent="-171450">
-              <a:buFontTx/>
-              <a:buChar char="-"/>
-            </a:pPr>
-            <a:r>
-              <a:rPr lang="en-GB" dirty="0" err="1"/>
-              <a:t>Aktuelle</a:t>
-            </a:r>
-            <a:r>
-              <a:rPr lang="en-GB" dirty="0"/>
-              <a:t> Status, </a:t>
-            </a:r>
-            <a:r>
-              <a:rPr lang="en-GB" dirty="0" err="1"/>
-              <a:t>Informationen</a:t>
-            </a:r>
-            <a:r>
-              <a:rPr lang="en-GB" dirty="0"/>
-              <a:t> und Wetter</a:t>
-            </a:r>
-          </a:p>
-          <a:p>
-            <a:pPr marL="171450" indent="-171450">
-              <a:buFontTx/>
-              <a:buChar char="-"/>
-            </a:pPr>
-            <a:r>
-              <a:rPr lang="en-GB" dirty="0" err="1"/>
-              <a:t>Schlägt</a:t>
-            </a:r>
-            <a:r>
-              <a:rPr lang="en-GB" dirty="0"/>
-              <a:t> </a:t>
-            </a:r>
-            <a:r>
-              <a:rPr lang="en-GB" dirty="0" err="1"/>
-              <a:t>Skigebiete</a:t>
-            </a:r>
-            <a:r>
-              <a:rPr lang="en-GB" dirty="0"/>
-              <a:t> </a:t>
-            </a:r>
-            <a:r>
-              <a:rPr lang="en-GB" dirty="0" err="1"/>
-              <a:t>vor</a:t>
-            </a:r>
-            <a:r>
-              <a:rPr lang="en-GB" dirty="0"/>
-              <a:t> </a:t>
-            </a:r>
-            <a:r>
-              <a:rPr lang="en-GB" dirty="0" err="1"/>
-              <a:t>jedoch</a:t>
-            </a:r>
-            <a:r>
-              <a:rPr lang="en-GB" dirty="0"/>
-              <a:t> </a:t>
-            </a:r>
-            <a:r>
-              <a:rPr lang="en-GB" dirty="0" err="1"/>
-              <a:t>Standort</a:t>
-            </a:r>
-            <a:r>
-              <a:rPr lang="en-GB" dirty="0"/>
-              <a:t> </a:t>
-            </a:r>
-            <a:r>
-              <a:rPr lang="en-GB" dirty="0" err="1"/>
-              <a:t>unabhängig</a:t>
-            </a:r>
-            <a:endParaRPr lang="en-GB" dirty="0"/>
-          </a:p>
-          <a:p>
-            <a:pPr marL="171450" indent="-171450">
-              <a:buFontTx/>
-              <a:buChar char="-"/>
-            </a:pPr>
-            <a:endParaRPr lang="en-GB" dirty="0"/>
-          </a:p>
-          <a:p>
-            <a:pPr marL="0" indent="0">
-              <a:buFontTx/>
-              <a:buNone/>
-            </a:pPr>
-            <a:r>
-              <a:rPr lang="en-GB" dirty="0" err="1"/>
-              <a:t>Bergfex</a:t>
-            </a:r>
-            <a:endParaRPr lang="en-GB" dirty="0"/>
-          </a:p>
-          <a:p>
-            <a:pPr marL="171450" indent="-171450">
-              <a:buFontTx/>
-              <a:buChar char="-"/>
-            </a:pPr>
-            <a:r>
-              <a:rPr lang="en-GB" dirty="0" err="1"/>
-              <a:t>Wetterberichte</a:t>
-            </a:r>
-            <a:r>
-              <a:rPr lang="en-GB" dirty="0"/>
-              <a:t>, Status, Webcams,  </a:t>
-            </a:r>
-            <a:r>
-              <a:rPr lang="en-GB" dirty="0" err="1"/>
-              <a:t>Pistenpläne</a:t>
-            </a:r>
-            <a:endParaRPr lang="en-GB" dirty="0"/>
-          </a:p>
-          <a:p>
-            <a:pPr marL="171450" indent="-171450">
-              <a:buFontTx/>
-              <a:buChar char="-"/>
-            </a:pPr>
-            <a:r>
-              <a:rPr lang="en-GB" dirty="0" err="1"/>
-              <a:t>Alle</a:t>
-            </a:r>
-            <a:r>
-              <a:rPr lang="en-GB" dirty="0"/>
-              <a:t> </a:t>
-            </a:r>
-            <a:r>
-              <a:rPr lang="en-GB" dirty="0" err="1"/>
-              <a:t>Gebiete</a:t>
-            </a:r>
-            <a:r>
-              <a:rPr lang="en-GB" dirty="0"/>
-              <a:t> </a:t>
-            </a:r>
-            <a:r>
-              <a:rPr lang="en-GB" dirty="0" err="1"/>
-              <a:t>durchsuchen</a:t>
-            </a:r>
-            <a:endParaRPr lang="en-GB" dirty="0"/>
-          </a:p>
-          <a:p>
-            <a:pPr marL="171450" indent="-171450">
-              <a:buFontTx/>
-              <a:buChar char="-"/>
-            </a:pPr>
-            <a:r>
-              <a:rPr lang="en-GB" dirty="0" err="1"/>
-              <a:t>Eigene</a:t>
-            </a:r>
-            <a:r>
-              <a:rPr lang="en-GB" dirty="0"/>
-              <a:t> </a:t>
-            </a:r>
-            <a:r>
-              <a:rPr lang="en-GB" dirty="0" err="1"/>
-              <a:t>Favoriten</a:t>
-            </a:r>
-            <a:endParaRPr lang="en-GB" dirty="0"/>
-          </a:p>
-          <a:p>
-            <a:pPr marL="171450" indent="-171450">
-              <a:buFontTx/>
-              <a:buChar char="-"/>
-            </a:pPr>
-            <a:endParaRPr lang="en-GB" dirty="0"/>
-          </a:p>
-          <a:p>
-            <a:pPr marL="0" indent="0">
-              <a:buFontTx/>
-              <a:buNone/>
-            </a:pPr>
-            <a:r>
-              <a:rPr lang="en-GB" dirty="0" err="1"/>
-              <a:t>Skiinfo</a:t>
-            </a:r>
-            <a:endParaRPr lang="en-GB" dirty="0"/>
-          </a:p>
-          <a:p>
-            <a:pPr marL="171450" indent="-171450">
-              <a:buFontTx/>
-              <a:buChar char="-"/>
-            </a:pPr>
-            <a:r>
-              <a:rPr lang="en-GB" dirty="0" err="1"/>
-              <a:t>Ähnlich</a:t>
-            </a:r>
-            <a:r>
-              <a:rPr lang="en-GB" dirty="0"/>
-              <a:t> </a:t>
-            </a:r>
-            <a:r>
-              <a:rPr lang="en-GB" dirty="0" err="1"/>
-              <a:t>wie</a:t>
-            </a:r>
-            <a:r>
-              <a:rPr lang="en-GB" dirty="0"/>
-              <a:t> </a:t>
-            </a:r>
-            <a:r>
-              <a:rPr lang="en-GB" dirty="0" err="1"/>
-              <a:t>Bergfex</a:t>
-            </a:r>
-            <a:endParaRPr lang="en-GB" dirty="0"/>
-          </a:p>
-          <a:p>
-            <a:pPr marL="0" indent="0">
-              <a:buFontTx/>
-              <a:buNone/>
-            </a:pPr>
-            <a:endParaRPr lang="en-GB" dirty="0"/>
-          </a:p>
-          <a:p>
-            <a:pPr marL="0" indent="0">
-              <a:buFontTx/>
-              <a:buNone/>
-            </a:pPr>
-            <a:r>
-              <a:rPr lang="en-GB" dirty="0"/>
-              <a:t>Skiresort.de</a:t>
-            </a:r>
-          </a:p>
-          <a:p>
-            <a:pPr marL="171450" indent="-171450">
-              <a:buFontTx/>
-              <a:buChar char="-"/>
-            </a:pPr>
-            <a:r>
-              <a:rPr lang="en-GB" dirty="0" err="1"/>
-              <a:t>Ähnlich</a:t>
-            </a:r>
-            <a:r>
-              <a:rPr lang="en-GB" dirty="0"/>
-              <a:t> </a:t>
-            </a:r>
-            <a:r>
-              <a:rPr lang="en-GB" dirty="0" err="1"/>
-              <a:t>wie</a:t>
-            </a:r>
-            <a:r>
-              <a:rPr lang="en-GB" dirty="0"/>
-              <a:t> </a:t>
-            </a:r>
-            <a:r>
-              <a:rPr lang="en-GB" dirty="0" err="1"/>
-              <a:t>Bergfext</a:t>
-            </a:r>
-            <a:endParaRPr lang="en-GB" dirty="0"/>
-          </a:p>
-          <a:p>
-            <a:pPr marL="171450" indent="-171450">
-              <a:buFontTx/>
-              <a:buChar char="-"/>
-            </a:pPr>
-            <a:r>
-              <a:rPr lang="en-GB" dirty="0" err="1"/>
-              <a:t>Suchen</a:t>
-            </a:r>
-            <a:r>
-              <a:rPr lang="en-GB" dirty="0"/>
-              <a:t> in </a:t>
-            </a:r>
-            <a:r>
-              <a:rPr lang="en-GB" dirty="0" err="1"/>
-              <a:t>Umgebung</a:t>
-            </a:r>
-            <a:endParaRPr lang="en-GB" dirty="0"/>
+              <a:rPr lang="de-CH" dirty="0" err="1"/>
+              <a:t>Functions</a:t>
+            </a:r>
+            <a:r>
+              <a:rPr lang="de-CH" dirty="0"/>
+              <a:t>: Anzeigen der 10 nächstgelegenen Skigebieten, sortiert nach eigenen Wünschen, Anzeigen von Detailinfos zum Ort, Möglichkeit die Website zu besuchen und die Navigation </a:t>
+            </a:r>
+            <a:r>
+              <a:rPr lang="de-CH"/>
+              <a:t>zu starten</a:t>
+            </a:r>
           </a:p>
         </p:txBody>
       </p:sp>
@@ -942,7 +555,7 @@
           <a:p>
             <a:fld id="{748723F8-CD6B-45E3-B09A-75062809A4AE}" type="slidenum">
               <a:rPr lang="en-GB" smtClean="0"/>
-              <a:t>5</a:t>
+              <a:t>3</a:t>
             </a:fld>
             <a:endParaRPr lang="en-GB"/>
           </a:p>
@@ -951,7 +564,7 @@
     </p:spTree>
     <p:extLst>
       <p:ext uri="{BB962C8B-B14F-4D97-AF65-F5344CB8AC3E}">
-        <p14:creationId xmlns:p14="http://schemas.microsoft.com/office/powerpoint/2010/main" val="242691541"/>
+        <p14:creationId xmlns:p14="http://schemas.microsoft.com/office/powerpoint/2010/main" val="413757644"/>
       </p:ext>
     </p:extLst>
   </p:cSld>
@@ -1005,6 +618,404 @@
           <a:bodyPr/>
           <a:lstStyle/>
           <a:p>
+            <a:r>
+              <a:rPr lang="en-GB" dirty="0"/>
+              <a:t>Grosse Ski </a:t>
+            </a:r>
+            <a:r>
+              <a:rPr lang="en-GB" dirty="0" err="1"/>
+              <a:t>Gebiete</a:t>
+            </a:r>
+            <a:r>
+              <a:rPr lang="en-GB" dirty="0"/>
+              <a:t> </a:t>
+            </a:r>
+            <a:r>
+              <a:rPr lang="en-GB" dirty="0" err="1"/>
+              <a:t>haben</a:t>
+            </a:r>
+            <a:r>
+              <a:rPr lang="en-GB" dirty="0"/>
+              <a:t> </a:t>
+            </a:r>
+            <a:r>
+              <a:rPr lang="en-GB" dirty="0" err="1"/>
+              <a:t>eigene</a:t>
+            </a:r>
+            <a:r>
+              <a:rPr lang="en-GB" dirty="0"/>
+              <a:t> Apps.</a:t>
+            </a:r>
+          </a:p>
+          <a:p>
+            <a:pPr marL="171450" indent="-171450">
+              <a:buFontTx/>
+              <a:buChar char="-"/>
+            </a:pPr>
+            <a:r>
+              <a:rPr lang="en-GB" dirty="0" err="1"/>
+              <a:t>Laax</a:t>
+            </a:r>
+            <a:r>
+              <a:rPr lang="en-GB" dirty="0"/>
+              <a:t>, Davos, </a:t>
+            </a:r>
+            <a:r>
+              <a:rPr lang="en-GB" dirty="0" err="1"/>
+              <a:t>Adelboden</a:t>
+            </a:r>
+            <a:endParaRPr lang="en-GB" dirty="0"/>
+          </a:p>
+          <a:p>
+            <a:pPr marL="171450" indent="-171450">
+              <a:buFontTx/>
+              <a:buChar char="-"/>
+            </a:pPr>
+            <a:r>
+              <a:rPr lang="en-GB" dirty="0" err="1"/>
+              <a:t>Lokal</a:t>
+            </a:r>
+            <a:r>
+              <a:rPr lang="en-GB" dirty="0"/>
+              <a:t>, </a:t>
+            </a:r>
+            <a:r>
+              <a:rPr lang="en-GB" dirty="0" err="1"/>
+              <a:t>Abgestimmt</a:t>
+            </a:r>
+            <a:r>
+              <a:rPr lang="en-GB" dirty="0"/>
+              <a:t> auf </a:t>
+            </a:r>
+            <a:r>
+              <a:rPr lang="en-GB" dirty="0" err="1"/>
+              <a:t>jeweilige</a:t>
+            </a:r>
+            <a:r>
+              <a:rPr lang="en-GB" dirty="0"/>
+              <a:t> Destination.</a:t>
+            </a:r>
+          </a:p>
+          <a:p>
+            <a:pPr marL="171450" indent="-171450">
+              <a:buFontTx/>
+              <a:buChar char="-"/>
+            </a:pPr>
+            <a:endParaRPr lang="en-GB" dirty="0"/>
+          </a:p>
+          <a:p>
+            <a:pPr marL="0" indent="0">
+              <a:buFontTx/>
+              <a:buNone/>
+            </a:pPr>
+            <a:r>
+              <a:rPr lang="en-GB" dirty="0" err="1"/>
+              <a:t>iSKI</a:t>
+            </a:r>
+            <a:endParaRPr lang="en-GB" dirty="0"/>
+          </a:p>
+          <a:p>
+            <a:pPr marL="171450" indent="-171450">
+              <a:buFontTx/>
+              <a:buChar char="-"/>
+            </a:pPr>
+            <a:r>
+              <a:rPr lang="en-GB" dirty="0" err="1"/>
+              <a:t>Je</a:t>
+            </a:r>
+            <a:r>
+              <a:rPr lang="en-GB" dirty="0"/>
+              <a:t> Land </a:t>
+            </a:r>
+            <a:r>
+              <a:rPr lang="en-GB" dirty="0" err="1"/>
+              <a:t>ein</a:t>
+            </a:r>
+            <a:r>
+              <a:rPr lang="en-GB" dirty="0"/>
+              <a:t> App.</a:t>
+            </a:r>
+          </a:p>
+          <a:p>
+            <a:pPr marL="171450" indent="-171450">
+              <a:buFontTx/>
+              <a:buChar char="-"/>
+            </a:pPr>
+            <a:r>
+              <a:rPr lang="en-GB" dirty="0"/>
+              <a:t>Community, Ski-Tracker, </a:t>
+            </a:r>
+            <a:r>
+              <a:rPr lang="en-GB" dirty="0" err="1"/>
+              <a:t>vergleichen</a:t>
+            </a:r>
+            <a:r>
+              <a:rPr lang="en-GB" dirty="0"/>
+              <a:t>, </a:t>
+            </a:r>
+          </a:p>
+          <a:p>
+            <a:pPr marL="171450" indent="-171450">
+              <a:buFontTx/>
+              <a:buChar char="-"/>
+            </a:pPr>
+            <a:r>
+              <a:rPr lang="en-GB" dirty="0" err="1"/>
+              <a:t>Aktuelle</a:t>
+            </a:r>
+            <a:r>
+              <a:rPr lang="en-GB" dirty="0"/>
+              <a:t> Status, </a:t>
+            </a:r>
+            <a:r>
+              <a:rPr lang="en-GB" dirty="0" err="1"/>
+              <a:t>Informationen</a:t>
+            </a:r>
+            <a:r>
+              <a:rPr lang="en-GB" dirty="0"/>
+              <a:t> und Wetter</a:t>
+            </a:r>
+          </a:p>
+          <a:p>
+            <a:pPr marL="171450" indent="-171450">
+              <a:buFontTx/>
+              <a:buChar char="-"/>
+            </a:pPr>
+            <a:r>
+              <a:rPr lang="en-GB" dirty="0" err="1"/>
+              <a:t>Schlägt</a:t>
+            </a:r>
+            <a:r>
+              <a:rPr lang="en-GB" dirty="0"/>
+              <a:t> </a:t>
+            </a:r>
+            <a:r>
+              <a:rPr lang="en-GB" dirty="0" err="1"/>
+              <a:t>Skigebiete</a:t>
+            </a:r>
+            <a:r>
+              <a:rPr lang="en-GB" dirty="0"/>
+              <a:t> </a:t>
+            </a:r>
+            <a:r>
+              <a:rPr lang="en-GB" dirty="0" err="1"/>
+              <a:t>vor</a:t>
+            </a:r>
+            <a:r>
+              <a:rPr lang="en-GB" dirty="0"/>
+              <a:t> </a:t>
+            </a:r>
+            <a:r>
+              <a:rPr lang="en-GB" dirty="0" err="1"/>
+              <a:t>jedoch</a:t>
+            </a:r>
+            <a:r>
+              <a:rPr lang="en-GB" dirty="0"/>
+              <a:t> </a:t>
+            </a:r>
+            <a:r>
+              <a:rPr lang="en-GB" dirty="0" err="1"/>
+              <a:t>Standort</a:t>
+            </a:r>
+            <a:r>
+              <a:rPr lang="en-GB" dirty="0"/>
+              <a:t> </a:t>
+            </a:r>
+            <a:r>
+              <a:rPr lang="en-GB" dirty="0" err="1"/>
+              <a:t>unabhängig</a:t>
+            </a:r>
+            <a:endParaRPr lang="en-GB" dirty="0"/>
+          </a:p>
+          <a:p>
+            <a:pPr marL="171450" indent="-171450">
+              <a:buFontTx/>
+              <a:buChar char="-"/>
+            </a:pPr>
+            <a:endParaRPr lang="en-GB" dirty="0"/>
+          </a:p>
+          <a:p>
+            <a:pPr marL="0" indent="0">
+              <a:buFontTx/>
+              <a:buNone/>
+            </a:pPr>
+            <a:r>
+              <a:rPr lang="en-GB" dirty="0" err="1"/>
+              <a:t>Bergfex</a:t>
+            </a:r>
+            <a:endParaRPr lang="en-GB" dirty="0"/>
+          </a:p>
+          <a:p>
+            <a:pPr marL="171450" indent="-171450">
+              <a:buFontTx/>
+              <a:buChar char="-"/>
+            </a:pPr>
+            <a:r>
+              <a:rPr lang="en-GB" dirty="0" err="1"/>
+              <a:t>Wetterberichte</a:t>
+            </a:r>
+            <a:r>
+              <a:rPr lang="en-GB" dirty="0"/>
+              <a:t>, Status, Webcams,  </a:t>
+            </a:r>
+            <a:r>
+              <a:rPr lang="en-GB" dirty="0" err="1"/>
+              <a:t>Pistenpläne</a:t>
+            </a:r>
+            <a:endParaRPr lang="en-GB" dirty="0"/>
+          </a:p>
+          <a:p>
+            <a:pPr marL="171450" indent="-171450">
+              <a:buFontTx/>
+              <a:buChar char="-"/>
+            </a:pPr>
+            <a:r>
+              <a:rPr lang="en-GB" dirty="0" err="1"/>
+              <a:t>Alle</a:t>
+            </a:r>
+            <a:r>
+              <a:rPr lang="en-GB" dirty="0"/>
+              <a:t> </a:t>
+            </a:r>
+            <a:r>
+              <a:rPr lang="en-GB" dirty="0" err="1"/>
+              <a:t>Gebiete</a:t>
+            </a:r>
+            <a:r>
+              <a:rPr lang="en-GB" dirty="0"/>
+              <a:t> </a:t>
+            </a:r>
+            <a:r>
+              <a:rPr lang="en-GB" dirty="0" err="1"/>
+              <a:t>durchsuchen</a:t>
+            </a:r>
+            <a:endParaRPr lang="en-GB" dirty="0"/>
+          </a:p>
+          <a:p>
+            <a:pPr marL="171450" indent="-171450">
+              <a:buFontTx/>
+              <a:buChar char="-"/>
+            </a:pPr>
+            <a:r>
+              <a:rPr lang="en-GB" dirty="0" err="1"/>
+              <a:t>Eigene</a:t>
+            </a:r>
+            <a:r>
+              <a:rPr lang="en-GB" dirty="0"/>
+              <a:t> </a:t>
+            </a:r>
+            <a:r>
+              <a:rPr lang="en-GB" dirty="0" err="1"/>
+              <a:t>Favoriten</a:t>
+            </a:r>
+            <a:endParaRPr lang="en-GB" dirty="0"/>
+          </a:p>
+          <a:p>
+            <a:pPr marL="171450" indent="-171450">
+              <a:buFontTx/>
+              <a:buChar char="-"/>
+            </a:pPr>
+            <a:endParaRPr lang="en-GB" dirty="0"/>
+          </a:p>
+          <a:p>
+            <a:pPr marL="0" indent="0">
+              <a:buFontTx/>
+              <a:buNone/>
+            </a:pPr>
+            <a:r>
+              <a:rPr lang="en-GB" dirty="0" err="1"/>
+              <a:t>Skiinfo</a:t>
+            </a:r>
+            <a:endParaRPr lang="en-GB" dirty="0"/>
+          </a:p>
+          <a:p>
+            <a:pPr marL="171450" indent="-171450">
+              <a:buFontTx/>
+              <a:buChar char="-"/>
+            </a:pPr>
+            <a:r>
+              <a:rPr lang="en-GB" dirty="0" err="1"/>
+              <a:t>Ähnlich</a:t>
+            </a:r>
+            <a:r>
+              <a:rPr lang="en-GB" dirty="0"/>
+              <a:t> </a:t>
+            </a:r>
+            <a:r>
+              <a:rPr lang="en-GB" dirty="0" err="1"/>
+              <a:t>wie</a:t>
+            </a:r>
+            <a:r>
+              <a:rPr lang="en-GB" dirty="0"/>
+              <a:t> </a:t>
+            </a:r>
+            <a:r>
+              <a:rPr lang="en-GB" dirty="0" err="1"/>
+              <a:t>Bergfex</a:t>
+            </a:r>
+            <a:endParaRPr lang="en-GB" dirty="0"/>
+          </a:p>
+          <a:p>
+            <a:pPr marL="0" indent="0">
+              <a:buFontTx/>
+              <a:buNone/>
+            </a:pPr>
+            <a:endParaRPr lang="en-GB" dirty="0"/>
+          </a:p>
+          <a:p>
+            <a:pPr marL="0" indent="0">
+              <a:buFontTx/>
+              <a:buNone/>
+            </a:pPr>
+            <a:r>
+              <a:rPr lang="en-GB" dirty="0"/>
+              <a:t>Skiresort.de</a:t>
+            </a:r>
+          </a:p>
+          <a:p>
+            <a:pPr marL="171450" indent="-171450">
+              <a:buFontTx/>
+              <a:buChar char="-"/>
+            </a:pPr>
+            <a:r>
+              <a:rPr lang="en-GB" dirty="0" err="1"/>
+              <a:t>Ähnlich</a:t>
+            </a:r>
+            <a:r>
+              <a:rPr lang="en-GB" dirty="0"/>
+              <a:t> </a:t>
+            </a:r>
+            <a:r>
+              <a:rPr lang="en-GB" dirty="0" err="1"/>
+              <a:t>wie</a:t>
+            </a:r>
+            <a:r>
+              <a:rPr lang="en-GB" dirty="0"/>
+              <a:t> </a:t>
+            </a:r>
+            <a:r>
+              <a:rPr lang="en-GB" dirty="0" err="1"/>
+              <a:t>Bergfext</a:t>
+            </a:r>
+            <a:endParaRPr lang="en-GB" dirty="0"/>
+          </a:p>
+          <a:p>
+            <a:pPr marL="171450" indent="-171450">
+              <a:buFontTx/>
+              <a:buChar char="-"/>
+            </a:pPr>
+            <a:r>
+              <a:rPr lang="en-GB" dirty="0" err="1"/>
+              <a:t>Suchen</a:t>
+            </a:r>
+            <a:r>
+              <a:rPr lang="en-GB" dirty="0"/>
+              <a:t> in </a:t>
+            </a:r>
+            <a:r>
+              <a:rPr lang="en-GB" dirty="0" err="1"/>
+              <a:t>Umgebung</a:t>
+            </a:r>
             <a:endParaRPr lang="en-GB" dirty="0"/>
           </a:p>
         </p:txBody>
@@ -1026,7 +1037,7 @@
           <a:p>
             <a:fld id="{748723F8-CD6B-45E3-B09A-75062809A4AE}" type="slidenum">
               <a:rPr lang="en-GB" smtClean="0"/>
-              <a:t>6</a:t>
+              <a:t>5</a:t>
             </a:fld>
             <a:endParaRPr lang="en-GB"/>
           </a:p>
@@ -1035,7 +1046,7 @@
     </p:spTree>
     <p:extLst>
       <p:ext uri="{BB962C8B-B14F-4D97-AF65-F5344CB8AC3E}">
-        <p14:creationId xmlns:p14="http://schemas.microsoft.com/office/powerpoint/2010/main" val="1800144089"/>
+        <p14:creationId xmlns:p14="http://schemas.microsoft.com/office/powerpoint/2010/main" val="242691541"/>
       </p:ext>
     </p:extLst>
   </p:cSld>
@@ -1089,34 +1100,7 @@
           <a:bodyPr/>
           <a:lstStyle/>
           <a:p>
-            <a:r>
-              <a:rPr lang="de-CH" dirty="0"/>
-              <a:t>Datenstruktur wird von API vorgegeben -&gt; </a:t>
-            </a:r>
-            <a:r>
-              <a:rPr lang="de-CH" dirty="0" err="1"/>
-              <a:t>SkiResort</a:t>
-            </a:r>
-            <a:r>
-              <a:rPr lang="de-CH" dirty="0"/>
-              <a:t> von einer API, </a:t>
-            </a:r>
-            <a:r>
-              <a:rPr lang="de-CH" dirty="0" err="1"/>
-              <a:t>WeatherData</a:t>
-            </a:r>
-            <a:r>
-              <a:rPr lang="de-CH" dirty="0"/>
-              <a:t> von anderer API, wird dynamisch an </a:t>
-            </a:r>
-            <a:r>
-              <a:rPr lang="de-CH" dirty="0" err="1"/>
-              <a:t>SkiResort</a:t>
-            </a:r>
-            <a:r>
-              <a:rPr lang="de-CH" dirty="0"/>
-              <a:t> angehängt.</a:t>
-            </a:r>
+            <a:endParaRPr lang="en-GB" dirty="0"/>
           </a:p>
         </p:txBody>
       </p:sp>
@@ -1137,7 +1121,7 @@
           <a:p>
             <a:fld id="{748723F8-CD6B-45E3-B09A-75062809A4AE}" type="slidenum">
               <a:rPr lang="en-GB" smtClean="0"/>
-              <a:t>8</a:t>
+              <a:t>6</a:t>
             </a:fld>
             <a:endParaRPr lang="en-GB"/>
           </a:p>
@@ -1146,7 +1130,7 @@
     </p:spTree>
     <p:extLst>
       <p:ext uri="{BB962C8B-B14F-4D97-AF65-F5344CB8AC3E}">
-        <p14:creationId xmlns:p14="http://schemas.microsoft.com/office/powerpoint/2010/main" val="3349451142"/>
+        <p14:creationId xmlns:p14="http://schemas.microsoft.com/office/powerpoint/2010/main" val="1800144089"/>
       </p:ext>
     </p:extLst>
   </p:cSld>
@@ -1200,168 +1184,34 @@
           <a:bodyPr/>
           <a:lstStyle/>
           <a:p>
-            <a:pPr marL="0" marR="0" lvl="0" indent="0" algn="l" defTabSz="914400" rtl="0" eaLnBrk="1" fontAlgn="auto" latinLnBrk="0" hangingPunct="1">
-              <a:lnSpc>
-                <a:spcPct val="100000"/>
-              </a:lnSpc>
-              <a:spcBef>
-                <a:spcPts val="0"/>
-              </a:spcBef>
-              <a:spcAft>
-                <a:spcPts val="0"/>
-              </a:spcAft>
-              <a:buClrTx/>
-              <a:buSzTx/>
-              <a:buFontTx/>
-              <a:buNone/>
-              <a:tabLst/>
-              <a:defRPr/>
-            </a:pPr>
+            <a:r>
+              <a:rPr lang="de-CH" dirty="0"/>
+              <a:t>Datenstruktur wird von API vorgegeben -&gt; </a:t>
+            </a:r>
             <a:r>
               <a:rPr lang="de-CH" dirty="0" err="1"/>
-              <a:t>Scrum</a:t>
+              <a:t>SkiResort</a:t>
             </a:r>
             <a:r>
               <a:rPr lang="de-CH" dirty="0"/>
-              <a:t>: Leicht abgeänderte Variante, wöchentliche Sprints, </a:t>
+              <a:t> von einer API, </a:t>
             </a:r>
             <a:r>
               <a:rPr lang="de-CH" dirty="0" err="1"/>
-              <a:t>daily</a:t>
+              <a:t>WeatherData</a:t>
             </a:r>
             <a:r>
               <a:rPr lang="de-CH" dirty="0"/>
-              <a:t> </a:t>
+              <a:t> von anderer API, wird dynamisch an </a:t>
             </a:r>
             <a:r>
               <a:rPr lang="de-CH" dirty="0" err="1"/>
-              <a:t>meeting</a:t>
+              <a:t>SkiResort</a:t>
             </a:r>
             <a:r>
               <a:rPr lang="de-CH" dirty="0"/>
-              <a:t> etwa alle 2-3 Tage (WE und Mi/Do)</a:t>
-            </a:r>
-          </a:p>
-          <a:p>
-            <a:pPr marL="0" marR="0" lvl="0" indent="0" algn="l" defTabSz="914400" rtl="0" eaLnBrk="1" fontAlgn="auto" latinLnBrk="0" hangingPunct="1">
-              <a:lnSpc>
-                <a:spcPct val="100000"/>
-              </a:lnSpc>
-              <a:spcBef>
-                <a:spcPts val="0"/>
-              </a:spcBef>
-              <a:spcAft>
-                <a:spcPts val="0"/>
-              </a:spcAft>
-              <a:buClrTx/>
-              <a:buSzTx/>
-              <a:buFontTx/>
-              <a:buNone/>
-              <a:tabLst/>
-              <a:defRPr/>
-            </a:pPr>
-            <a:r>
-              <a:rPr lang="de-CH" dirty="0" err="1"/>
-              <a:t>GeoFire</a:t>
-            </a:r>
-            <a:r>
-              <a:rPr lang="de-CH" dirty="0"/>
-              <a:t>: Wie nach Distanzsortieren -&gt; Druckwellenmässig (Performance)</a:t>
-            </a:r>
-          </a:p>
-          <a:p>
-            <a:pPr marL="0" marR="0" lvl="0" indent="0" algn="l" defTabSz="914400" rtl="0" eaLnBrk="1" fontAlgn="auto" latinLnBrk="0" hangingPunct="1">
-              <a:lnSpc>
-                <a:spcPct val="100000"/>
-              </a:lnSpc>
-              <a:spcBef>
-                <a:spcPts val="0"/>
-              </a:spcBef>
-              <a:spcAft>
-                <a:spcPts val="0"/>
-              </a:spcAft>
-              <a:buClrTx/>
-              <a:buSzTx/>
-              <a:buFontTx/>
-              <a:buNone/>
-              <a:tabLst/>
-              <a:defRPr/>
-            </a:pPr>
-            <a:r>
-              <a:rPr lang="de-CH" dirty="0" err="1"/>
-              <a:t>Sorting</a:t>
-            </a:r>
-            <a:r>
-              <a:rPr lang="de-CH" dirty="0"/>
-              <a:t> </a:t>
-            </a:r>
-            <a:r>
-              <a:rPr lang="de-CH" dirty="0" err="1"/>
-              <a:t>of</a:t>
-            </a:r>
-            <a:r>
-              <a:rPr lang="de-CH" dirty="0"/>
-              <a:t> </a:t>
-            </a:r>
-            <a:r>
-              <a:rPr lang="de-CH" dirty="0" err="1"/>
-              <a:t>list</a:t>
-            </a:r>
-            <a:r>
-              <a:rPr lang="de-CH" dirty="0"/>
-              <a:t>: Mit </a:t>
-            </a:r>
-            <a:r>
-              <a:rPr lang="de-CH" dirty="0" err="1"/>
-              <a:t>Comperatoren</a:t>
-            </a:r>
-            <a:r>
-              <a:rPr lang="de-CH" dirty="0"/>
-              <a:t>, teilweise eigene Logik was wie gewichtet wird</a:t>
-            </a:r>
-          </a:p>
-          <a:p>
-            <a:pPr marL="0" marR="0" lvl="0" indent="0" algn="l" defTabSz="914400" rtl="0" eaLnBrk="1" fontAlgn="auto" latinLnBrk="0" hangingPunct="1">
-              <a:lnSpc>
-                <a:spcPct val="100000"/>
-              </a:lnSpc>
-              <a:spcBef>
-                <a:spcPts val="0"/>
-              </a:spcBef>
-              <a:spcAft>
-                <a:spcPts val="0"/>
-              </a:spcAft>
-              <a:buClrTx/>
-              <a:buSzTx/>
-              <a:buFontTx/>
-              <a:buNone/>
-              <a:tabLst/>
-              <a:defRPr/>
-            </a:pPr>
-            <a:endParaRPr lang="de-CH" dirty="0"/>
-          </a:p>
-          <a:p>
-            <a:pPr marL="0" marR="0" lvl="0" indent="0" algn="l" defTabSz="914400" rtl="0" eaLnBrk="1" fontAlgn="auto" latinLnBrk="0" hangingPunct="1">
-              <a:lnSpc>
-                <a:spcPct val="100000"/>
-              </a:lnSpc>
-              <a:spcBef>
-                <a:spcPts val="0"/>
-              </a:spcBef>
-              <a:spcAft>
-                <a:spcPts val="0"/>
-              </a:spcAft>
-              <a:buClrTx/>
-              <a:buSzTx/>
-              <a:buFontTx/>
-              <a:buNone/>
-              <a:tabLst/>
-              <a:defRPr/>
-            </a:pPr>
-            <a:endParaRPr lang="de-CH" dirty="0"/>
-          </a:p>
-          <a:p>
-            <a:endParaRPr lang="en-GB" dirty="0"/>
+              <a:t> angehängt.</a:t>
+            </a:r>
           </a:p>
         </p:txBody>
       </p:sp>
@@ -1382,7 +1232,7 @@
           <a:p>
             <a:fld id="{748723F8-CD6B-45E3-B09A-75062809A4AE}" type="slidenum">
               <a:rPr lang="en-GB" smtClean="0"/>
-              <a:t>9</a:t>
+              <a:t>8</a:t>
             </a:fld>
             <a:endParaRPr lang="en-GB"/>
           </a:p>
@@ -1391,7 +1241,7 @@
     </p:spTree>
     <p:extLst>
       <p:ext uri="{BB962C8B-B14F-4D97-AF65-F5344CB8AC3E}">
-        <p14:creationId xmlns:p14="http://schemas.microsoft.com/office/powerpoint/2010/main" val="187494911"/>
+        <p14:creationId xmlns:p14="http://schemas.microsoft.com/office/powerpoint/2010/main" val="3349451142"/>
       </p:ext>
     </p:extLst>
   </p:cSld>
@@ -1445,6 +1295,251 @@
           <a:bodyPr/>
           <a:lstStyle/>
           <a:p>
+            <a:pPr marL="0" marR="0" lvl="0" indent="0" algn="l" defTabSz="914400" rtl="0" eaLnBrk="1" fontAlgn="auto" latinLnBrk="0" hangingPunct="1">
+              <a:lnSpc>
+                <a:spcPct val="100000"/>
+              </a:lnSpc>
+              <a:spcBef>
+                <a:spcPts val="0"/>
+              </a:spcBef>
+              <a:spcAft>
+                <a:spcPts val="0"/>
+              </a:spcAft>
+              <a:buClrTx/>
+              <a:buSzTx/>
+              <a:buFontTx/>
+              <a:buNone/>
+              <a:tabLst/>
+              <a:defRPr/>
+            </a:pPr>
+            <a:r>
+              <a:rPr lang="de-CH" dirty="0" err="1"/>
+              <a:t>Scrum</a:t>
+            </a:r>
+            <a:r>
+              <a:rPr lang="de-CH" dirty="0"/>
+              <a:t>: Leicht abgeänderte Variante, wöchentliche Sprints, </a:t>
+            </a:r>
+            <a:r>
+              <a:rPr lang="de-CH" dirty="0" err="1"/>
+              <a:t>daily</a:t>
+            </a:r>
+            <a:r>
+              <a:rPr lang="de-CH" dirty="0"/>
+              <a:t> </a:t>
+            </a:r>
+            <a:r>
+              <a:rPr lang="de-CH" dirty="0" err="1"/>
+              <a:t>meeting</a:t>
+            </a:r>
+            <a:r>
+              <a:rPr lang="de-CH" dirty="0"/>
+              <a:t> etwa alle 2-3 Tage (WE und Mi/Do)</a:t>
+            </a:r>
+          </a:p>
+          <a:p>
+            <a:pPr marL="0" marR="0" lvl="0" indent="0" algn="l" defTabSz="914400" rtl="0" eaLnBrk="1" fontAlgn="auto" latinLnBrk="0" hangingPunct="1">
+              <a:lnSpc>
+                <a:spcPct val="100000"/>
+              </a:lnSpc>
+              <a:spcBef>
+                <a:spcPts val="0"/>
+              </a:spcBef>
+              <a:spcAft>
+                <a:spcPts val="0"/>
+              </a:spcAft>
+              <a:buClrTx/>
+              <a:buSzTx/>
+              <a:buFontTx/>
+              <a:buNone/>
+              <a:tabLst/>
+              <a:defRPr/>
+            </a:pPr>
+            <a:r>
+              <a:rPr lang="de-CH" dirty="0" err="1"/>
+              <a:t>GeoFire</a:t>
+            </a:r>
+            <a:r>
+              <a:rPr lang="de-CH" dirty="0"/>
+              <a:t>: Wie nach Distanzsortieren -&gt; Druckwellenmässig (Performance)</a:t>
+            </a:r>
+          </a:p>
+          <a:p>
+            <a:pPr marL="0" marR="0" lvl="0" indent="0" algn="l" defTabSz="914400" rtl="0" eaLnBrk="1" fontAlgn="auto" latinLnBrk="0" hangingPunct="1">
+              <a:lnSpc>
+                <a:spcPct val="100000"/>
+              </a:lnSpc>
+              <a:spcBef>
+                <a:spcPts val="0"/>
+              </a:spcBef>
+              <a:spcAft>
+                <a:spcPts val="0"/>
+              </a:spcAft>
+              <a:buClrTx/>
+              <a:buSzTx/>
+              <a:buFontTx/>
+              <a:buNone/>
+              <a:tabLst/>
+              <a:defRPr/>
+            </a:pPr>
+            <a:r>
+              <a:rPr lang="de-CH" dirty="0" err="1"/>
+              <a:t>Sorting</a:t>
+            </a:r>
+            <a:r>
+              <a:rPr lang="de-CH" dirty="0"/>
+              <a:t> </a:t>
+            </a:r>
+            <a:r>
+              <a:rPr lang="de-CH" dirty="0" err="1"/>
+              <a:t>of</a:t>
+            </a:r>
+            <a:r>
+              <a:rPr lang="de-CH" dirty="0"/>
+              <a:t> </a:t>
+            </a:r>
+            <a:r>
+              <a:rPr lang="de-CH" dirty="0" err="1"/>
+              <a:t>list</a:t>
+            </a:r>
+            <a:r>
+              <a:rPr lang="de-CH" dirty="0"/>
+              <a:t>: Mit </a:t>
+            </a:r>
+            <a:r>
+              <a:rPr lang="de-CH" dirty="0" err="1"/>
+              <a:t>Comperatoren</a:t>
+            </a:r>
+            <a:r>
+              <a:rPr lang="de-CH" dirty="0"/>
+              <a:t>, teilweise eigene Logik was wie gewichtet wird</a:t>
+            </a:r>
+          </a:p>
+          <a:p>
+            <a:pPr marL="0" marR="0" lvl="0" indent="0" algn="l" defTabSz="914400" rtl="0" eaLnBrk="1" fontAlgn="auto" latinLnBrk="0" hangingPunct="1">
+              <a:lnSpc>
+                <a:spcPct val="100000"/>
+              </a:lnSpc>
+              <a:spcBef>
+                <a:spcPts val="0"/>
+              </a:spcBef>
+              <a:spcAft>
+                <a:spcPts val="0"/>
+              </a:spcAft>
+              <a:buClrTx/>
+              <a:buSzTx/>
+              <a:buFontTx/>
+              <a:buNone/>
+              <a:tabLst/>
+              <a:defRPr/>
+            </a:pPr>
+            <a:endParaRPr lang="de-CH" dirty="0"/>
+          </a:p>
+          <a:p>
+            <a:pPr marL="0" marR="0" lvl="0" indent="0" algn="l" defTabSz="914400" rtl="0" eaLnBrk="1" fontAlgn="auto" latinLnBrk="0" hangingPunct="1">
+              <a:lnSpc>
+                <a:spcPct val="100000"/>
+              </a:lnSpc>
+              <a:spcBef>
+                <a:spcPts val="0"/>
+              </a:spcBef>
+              <a:spcAft>
+                <a:spcPts val="0"/>
+              </a:spcAft>
+              <a:buClrTx/>
+              <a:buSzTx/>
+              <a:buFontTx/>
+              <a:buNone/>
+              <a:tabLst/>
+              <a:defRPr/>
+            </a:pPr>
+            <a:endParaRPr lang="de-CH" dirty="0"/>
+          </a:p>
+          <a:p>
+            <a:endParaRPr lang="en-GB" dirty="0"/>
+          </a:p>
+        </p:txBody>
+      </p:sp>
+      <p:sp>
+        <p:nvSpPr>
+          <p:cNvPr id="4" name="Foliennummernplatzhalter 3"/>
+          <p:cNvSpPr>
+            <a:spLocks noGrp="1"/>
+          </p:cNvSpPr>
+          <p:nvPr>
+            <p:ph type="sldNum" sz="quarter" idx="10"/>
+          </p:nvPr>
+        </p:nvSpPr>
+        <p:spPr/>
+        <p:txBody>
+          <a:bodyPr/>
+          <a:lstStyle/>
+          <a:p>
+            <a:fld id="{748723F8-CD6B-45E3-B09A-75062809A4AE}" type="slidenum">
+              <a:rPr lang="en-GB" smtClean="0"/>
+              <a:t>9</a:t>
+            </a:fld>
+            <a:endParaRPr lang="en-GB"/>
+          </a:p>
+        </p:txBody>
+      </p:sp>
+    </p:spTree>
+    <p:extLst>
+      <p:ext uri="{BB962C8B-B14F-4D97-AF65-F5344CB8AC3E}">
+        <p14:creationId xmlns:p14="http://schemas.microsoft.com/office/powerpoint/2010/main" val="187494911"/>
+      </p:ext>
+    </p:extLst>
+  </p:cSld>
+  <p:clrMapOvr>
+    <a:masterClrMapping/>
+  </p:clrMapOvr>
+</p:notes>
+</file>
+
+<file path=ppt/notesSlides/notesSlide6.xml><?xml version="1.0" encoding="utf-8"?>
+<p:notes xmlns:a="http://schemas.openxmlformats.org/drawingml/2006/main" xmlns:r="http://schemas.openxmlformats.org/officeDocument/2006/relationships" xmlns:p="http://schemas.openxmlformats.org/presentationml/2006/main">
+  <p:cSld>
+    <p:spTree>
+      <p:nvGrpSpPr>
+        <p:cNvPr id="1" name=""/>
+        <p:cNvGrpSpPr/>
+        <p:nvPr/>
+      </p:nvGrpSpPr>
+      <p:grpSpPr>
+        <a:xfrm>
+          <a:off x="0" y="0"/>
+          <a:ext cx="0" cy="0"/>
+          <a:chOff x="0" y="0"/>
+          <a:chExt cx="0" cy="0"/>
+        </a:xfrm>
+      </p:grpSpPr>
+      <p:sp>
+        <p:nvSpPr>
+          <p:cNvPr id="2" name="Folienbildplatzhalter 1"/>
+          <p:cNvSpPr>
+            <a:spLocks noGrp="1" noRot="1" noChangeAspect="1"/>
+          </p:cNvSpPr>
+          <p:nvPr>
+            <p:ph type="sldImg"/>
+          </p:nvPr>
+        </p:nvSpPr>
+        <p:spPr/>
+      </p:sp>
+      <p:sp>
+        <p:nvSpPr>
+          <p:cNvPr id="3" name="Notizenplatzhalter 2"/>
+          <p:cNvSpPr>
+            <a:spLocks noGrp="1"/>
+          </p:cNvSpPr>
+          <p:nvPr>
+            <p:ph type="body" idx="1"/>
+          </p:nvPr>
+        </p:nvSpPr>
+        <p:spPr/>
+        <p:txBody>
+          <a:bodyPr/>
+          <a:lstStyle/>
+          <a:p>
             <a:r>
               <a:rPr lang="en-GB" dirty="0"/>
               <a:t>JUnit Test</a:t>
@@ -2018,7 +2113,7 @@
 </p:notes>
 </file>
 
-<file path=ppt/notesSlides/notesSlide6.xml><?xml version="1.0" encoding="utf-8"?>
+<file path=ppt/notesSlides/notesSlide7.xml><?xml version="1.0" encoding="utf-8"?>
 <p:notes xmlns:a="http://schemas.openxmlformats.org/drawingml/2006/main" xmlns:r="http://schemas.openxmlformats.org/officeDocument/2006/relationships" xmlns:p="http://schemas.openxmlformats.org/presentationml/2006/main">
   <p:cSld>
     <p:spTree>
@@ -5994,29 +6089,82 @@
           <a:p>
             <a:pPr lvl="1"/>
             <a:r>
-              <a:rPr lang="de-CH" dirty="0">
-                <a:solidFill>
-                  <a:srgbClr val="FF0000"/>
-                </a:solidFill>
-              </a:rPr>
-              <a:t>Grösste Motivation: -&gt; Gute Note ;-)</a:t>
-            </a:r>
+              <a:rPr lang="de-CH" dirty="0" err="1"/>
+              <a:t>Learn</a:t>
+            </a:r>
+            <a:r>
+              <a:rPr lang="de-CH" dirty="0"/>
+              <a:t> </a:t>
+            </a:r>
+            <a:r>
+              <a:rPr lang="de-CH" dirty="0" err="1"/>
+              <a:t>to</a:t>
+            </a:r>
+            <a:r>
+              <a:rPr lang="de-CH" dirty="0"/>
+              <a:t> </a:t>
+            </a:r>
+            <a:r>
+              <a:rPr lang="de-CH" dirty="0" err="1"/>
+              <a:t>program</a:t>
+            </a:r>
+            <a:r>
+              <a:rPr lang="de-CH" dirty="0"/>
+              <a:t> an </a:t>
+            </a:r>
+            <a:r>
+              <a:rPr lang="de-CH" dirty="0" err="1"/>
+              <a:t>android</a:t>
+            </a:r>
+            <a:r>
+              <a:rPr lang="de-CH" dirty="0"/>
+              <a:t> </a:t>
+            </a:r>
+            <a:r>
+              <a:rPr lang="de-CH" dirty="0" err="1"/>
+              <a:t>app</a:t>
+            </a:r>
+            <a:endParaRPr lang="de-CH" dirty="0"/>
           </a:p>
           <a:p>
             <a:pPr lvl="1"/>
             <a:r>
-              <a:rPr lang="de-CH" dirty="0" err="1">
-                <a:solidFill>
-                  <a:srgbClr val="FF0000"/>
-                </a:solidFill>
-              </a:rPr>
-              <a:t>asdfasdf</a:t>
-            </a:r>
-            <a:endParaRPr lang="de-CH" dirty="0">
-              <a:solidFill>
-                <a:srgbClr val="FF0000"/>
-              </a:solidFill>
-            </a:endParaRPr>
+              <a:rPr lang="de-CH" dirty="0"/>
+              <a:t>Value </a:t>
+            </a:r>
+            <a:r>
+              <a:rPr lang="de-CH" dirty="0" err="1"/>
+              <a:t>for</a:t>
+            </a:r>
+            <a:r>
+              <a:rPr lang="de-CH" dirty="0"/>
+              <a:t> </a:t>
+            </a:r>
+            <a:r>
+              <a:rPr lang="de-CH" dirty="0" err="1"/>
+              <a:t>stakeholder</a:t>
+            </a:r>
+            <a:endParaRPr lang="de-CH" dirty="0"/>
+          </a:p>
+          <a:p>
+            <a:pPr lvl="1"/>
+            <a:r>
+              <a:rPr lang="de-CH" dirty="0"/>
+              <a:t>Value </a:t>
+            </a:r>
+            <a:r>
+              <a:rPr lang="de-CH" dirty="0" err="1"/>
+              <a:t>for</a:t>
+            </a:r>
+            <a:r>
+              <a:rPr lang="de-CH" dirty="0"/>
+              <a:t> </a:t>
+            </a:r>
+            <a:r>
+              <a:rPr lang="de-CH" dirty="0" err="1"/>
+              <a:t>users</a:t>
+            </a:r>
+            <a:endParaRPr lang="de-CH" dirty="0"/>
           </a:p>
           <a:p>
             <a:r>
@@ -6032,18 +6180,30 @@
           <a:p>
             <a:pPr lvl="1"/>
             <a:r>
-              <a:rPr lang="de-CH" dirty="0" err="1">
-                <a:solidFill>
-                  <a:srgbClr val="FF0000"/>
-                </a:solidFill>
-              </a:rPr>
-              <a:t>asdfasdf</a:t>
-            </a:r>
-            <a:endParaRPr lang="de-CH" dirty="0">
-              <a:solidFill>
-                <a:srgbClr val="FF0000"/>
-              </a:solidFill>
-            </a:endParaRPr>
+              <a:rPr lang="de-CH" dirty="0"/>
+              <a:t>Ability </a:t>
+            </a:r>
+            <a:r>
+              <a:rPr lang="de-CH" dirty="0" err="1"/>
+              <a:t>to</a:t>
+            </a:r>
+            <a:r>
+              <a:rPr lang="de-CH" dirty="0"/>
+              <a:t> find </a:t>
+            </a:r>
+            <a:r>
+              <a:rPr lang="de-CH" dirty="0" err="1"/>
+              <a:t>skiresorts</a:t>
+            </a:r>
+            <a:endParaRPr lang="de-CH" dirty="0"/>
+          </a:p>
+          <a:p>
+            <a:pPr lvl="1"/>
+            <a:r>
+              <a:rPr lang="de-CH" dirty="0" err="1"/>
+              <a:t>Functions</a:t>
+            </a:r>
+            <a:endParaRPr lang="de-CH" dirty="0"/>
           </a:p>
         </p:txBody>
       </p:sp>

</xml_diff>

<commit_message>
Replaced Picture of Design and Add Flow Diagram with Animation
</commit_message>
<xml_diff>
--- a/Documents/Presentation/Presentation.pptx
+++ b/Documents/Presentation/Presentation.pptx
@@ -7018,40 +7018,12 @@
           <a:chExt cx="0" cy="0"/>
         </a:xfrm>
       </p:grpSpPr>
-      <p:sp>
-        <p:nvSpPr>
-          <p:cNvPr id="2" name="Titel 1">
+      <p:pic>
+        <p:nvPicPr>
+          <p:cNvPr id="8" name="Grafik 7">
             <a:extLst>
               <a:ext uri="{FF2B5EF4-FFF2-40B4-BE49-F238E27FC236}">
-                <a16:creationId xmlns:a16="http://schemas.microsoft.com/office/drawing/2014/main" id="{9326BDAB-F4D7-4E8B-8691-9C70EED4811D}"/>
-              </a:ext>
-            </a:extLst>
-          </p:cNvPr>
-          <p:cNvSpPr>
-            <a:spLocks noGrp="1"/>
-          </p:cNvSpPr>
-          <p:nvPr>
-            <p:ph type="title"/>
-          </p:nvPr>
-        </p:nvSpPr>
-        <p:spPr/>
-        <p:txBody>
-          <a:bodyPr/>
-          <a:lstStyle/>
-          <a:p>
-            <a:r>
-              <a:rPr lang="en-GB" dirty="0"/>
-              <a:t>Design</a:t>
-            </a:r>
-          </a:p>
-        </p:txBody>
-      </p:sp>
-      <p:pic>
-        <p:nvPicPr>
-          <p:cNvPr id="6" name="Grafik 5">
-            <a:extLst>
-              <a:ext uri="{FF2B5EF4-FFF2-40B4-BE49-F238E27FC236}">
-                <a16:creationId xmlns:a16="http://schemas.microsoft.com/office/drawing/2014/main" id="{5EBA28A6-6E19-41AE-9ACC-E517F6FFB5F2}"/>
+                <a16:creationId xmlns:a16="http://schemas.microsoft.com/office/drawing/2014/main" id="{7EBBEC70-56A0-4605-8ACF-DD7F099C28A1}"/>
               </a:ext>
             </a:extLst>
           </p:cNvPr>
@@ -7068,20 +7040,48 @@
         </p:blipFill>
         <p:spPr>
           <a:xfrm>
-            <a:off x="288245" y="1690688"/>
-            <a:ext cx="2691517" cy="4724626"/>
+            <a:off x="3590366" y="1349756"/>
+            <a:ext cx="2349894" cy="4158485"/>
           </a:xfrm>
           <a:prstGeom prst="rect">
             <a:avLst/>
           </a:prstGeom>
         </p:spPr>
       </p:pic>
+      <p:sp>
+        <p:nvSpPr>
+          <p:cNvPr id="2" name="Titel 1">
+            <a:extLst>
+              <a:ext uri="{FF2B5EF4-FFF2-40B4-BE49-F238E27FC236}">
+                <a16:creationId xmlns:a16="http://schemas.microsoft.com/office/drawing/2014/main" id="{9326BDAB-F4D7-4E8B-8691-9C70EED4811D}"/>
+              </a:ext>
+            </a:extLst>
+          </p:cNvPr>
+          <p:cNvSpPr>
+            <a:spLocks noGrp="1"/>
+          </p:cNvSpPr>
+          <p:nvPr>
+            <p:ph type="title"/>
+          </p:nvPr>
+        </p:nvSpPr>
+        <p:spPr/>
+        <p:txBody>
+          <a:bodyPr/>
+          <a:lstStyle/>
+          <a:p>
+            <a:r>
+              <a:rPr lang="en-GB" dirty="0"/>
+              <a:t>Design</a:t>
+            </a:r>
+          </a:p>
+        </p:txBody>
+      </p:sp>
       <p:pic>
         <p:nvPicPr>
-          <p:cNvPr id="7" name="Grafik 6">
+          <p:cNvPr id="6" name="Grafik 5">
             <a:extLst>
               <a:ext uri="{FF2B5EF4-FFF2-40B4-BE49-F238E27FC236}">
-                <a16:creationId xmlns:a16="http://schemas.microsoft.com/office/drawing/2014/main" id="{297ECA95-8182-49F3-A49E-E8879B4EBECD}"/>
+                <a16:creationId xmlns:a16="http://schemas.microsoft.com/office/drawing/2014/main" id="{5EBA28A6-6E19-41AE-9ACC-E517F6FFB5F2}"/>
               </a:ext>
             </a:extLst>
           </p:cNvPr>
@@ -7098,38 +7098,8 @@
         </p:blipFill>
         <p:spPr>
           <a:xfrm>
-            <a:off x="3235997" y="1690687"/>
-            <a:ext cx="2672006" cy="4724627"/>
-          </a:xfrm>
-          <a:prstGeom prst="rect">
-            <a:avLst/>
-          </a:prstGeom>
-        </p:spPr>
-      </p:pic>
-      <p:pic>
-        <p:nvPicPr>
-          <p:cNvPr id="11" name="Grafik 10">
-            <a:extLst>
-              <a:ext uri="{FF2B5EF4-FFF2-40B4-BE49-F238E27FC236}">
-                <a16:creationId xmlns:a16="http://schemas.microsoft.com/office/drawing/2014/main" id="{84752E13-B9C3-4316-A6A1-D0A2C9FFC5CE}"/>
-              </a:ext>
-            </a:extLst>
-          </p:cNvPr>
-          <p:cNvPicPr>
-            <a:picLocks noChangeAspect="1"/>
-          </p:cNvPicPr>
-          <p:nvPr/>
-        </p:nvPicPr>
-        <p:blipFill>
-          <a:blip r:embed="rId5"/>
-          <a:stretch>
-            <a:fillRect/>
-          </a:stretch>
-        </p:blipFill>
-        <p:spPr>
-          <a:xfrm>
-            <a:off x="6164238" y="1690687"/>
-            <a:ext cx="2711087" cy="4724626"/>
+            <a:off x="628650" y="1349757"/>
+            <a:ext cx="2368999" cy="4158485"/>
           </a:xfrm>
           <a:prstGeom prst="rect">
             <a:avLst/>
@@ -7152,8 +7122,82 @@
         </p:nvCxnSpPr>
         <p:spPr>
           <a:xfrm>
-            <a:off x="2400300" y="4411756"/>
-            <a:ext cx="1393451" cy="0"/>
+            <a:off x="2538503" y="3733941"/>
+            <a:ext cx="1051863" cy="0"/>
+          </a:xfrm>
+          <a:prstGeom prst="straightConnector1">
+            <a:avLst/>
+          </a:prstGeom>
+          <a:ln w="76200">
+            <a:solidFill>
+              <a:srgbClr val="FF0000"/>
+            </a:solidFill>
+            <a:tailEnd type="triangle"/>
+          </a:ln>
+        </p:spPr>
+        <p:style>
+          <a:lnRef idx="1">
+            <a:schemeClr val="accent1"/>
+          </a:lnRef>
+          <a:fillRef idx="0">
+            <a:schemeClr val="accent1"/>
+          </a:fillRef>
+          <a:effectRef idx="0">
+            <a:schemeClr val="accent1"/>
+          </a:effectRef>
+          <a:fontRef idx="minor">
+            <a:schemeClr val="tx1"/>
+          </a:fontRef>
+        </p:style>
+      </p:cxnSp>
+      <p:pic>
+        <p:nvPicPr>
+          <p:cNvPr id="4" name="Grafik 3">
+            <a:extLst>
+              <a:ext uri="{FF2B5EF4-FFF2-40B4-BE49-F238E27FC236}">
+                <a16:creationId xmlns:a16="http://schemas.microsoft.com/office/drawing/2014/main" id="{CD9AB44B-5EDF-472B-94D6-7511F98EFF08}"/>
+              </a:ext>
+            </a:extLst>
+          </p:cNvPr>
+          <p:cNvPicPr>
+            <a:picLocks noChangeAspect="1"/>
+          </p:cNvPicPr>
+          <p:nvPr/>
+        </p:nvPicPr>
+        <p:blipFill>
+          <a:blip r:embed="rId5"/>
+          <a:stretch>
+            <a:fillRect/>
+          </a:stretch>
+        </p:blipFill>
+        <p:spPr>
+          <a:xfrm>
+            <a:off x="6502908" y="1349756"/>
+            <a:ext cx="2356264" cy="4158487"/>
+          </a:xfrm>
+          <a:prstGeom prst="rect">
+            <a:avLst/>
+          </a:prstGeom>
+        </p:spPr>
+      </p:pic>
+      <p:cxnSp>
+        <p:nvCxnSpPr>
+          <p:cNvPr id="15" name="Gerade Verbindung mit Pfeil 14">
+            <a:extLst>
+              <a:ext uri="{FF2B5EF4-FFF2-40B4-BE49-F238E27FC236}">
+                <a16:creationId xmlns:a16="http://schemas.microsoft.com/office/drawing/2014/main" id="{3071C97B-3BAE-420C-93AB-9847947D8D63}"/>
+              </a:ext>
+            </a:extLst>
+          </p:cNvPr>
+          <p:cNvCxnSpPr>
+            <a:cxnSpLocks/>
+          </p:cNvCxnSpPr>
+          <p:nvPr/>
+        </p:nvCxnSpPr>
+        <p:spPr>
+          <a:xfrm>
+            <a:off x="5432098" y="3184322"/>
+            <a:ext cx="1070810" cy="0"/>
           </a:xfrm>
           <a:prstGeom prst="straightConnector1">
             <a:avLst/>
@@ -7182,10 +7226,10 @@
       </p:cxnSp>
       <p:cxnSp>
         <p:nvCxnSpPr>
-          <p:cNvPr id="15" name="Gerade Verbindung mit Pfeil 14">
+          <p:cNvPr id="12" name="Gerade Verbindung mit Pfeil 11">
             <a:extLst>
               <a:ext uri="{FF2B5EF4-FFF2-40B4-BE49-F238E27FC236}">
-                <a16:creationId xmlns:a16="http://schemas.microsoft.com/office/drawing/2014/main" id="{3071C97B-3BAE-420C-93AB-9847947D8D63}"/>
+                <a16:creationId xmlns:a16="http://schemas.microsoft.com/office/drawing/2014/main" id="{1E0302E2-4093-4D56-96EA-99D5F7DA7F48}"/>
               </a:ext>
             </a:extLst>
           </p:cNvPr>
@@ -7196,8 +7240,322 @@
         </p:nvCxnSpPr>
         <p:spPr>
           <a:xfrm>
-            <a:off x="5467512" y="4411756"/>
-            <a:ext cx="1393451" cy="0"/>
+            <a:off x="2538503" y="4042751"/>
+            <a:ext cx="1051863" cy="0"/>
+          </a:xfrm>
+          <a:prstGeom prst="straightConnector1">
+            <a:avLst/>
+          </a:prstGeom>
+          <a:ln w="76200">
+            <a:solidFill>
+              <a:srgbClr val="FF0000"/>
+            </a:solidFill>
+            <a:tailEnd type="triangle"/>
+          </a:ln>
+        </p:spPr>
+        <p:style>
+          <a:lnRef idx="1">
+            <a:schemeClr val="accent1"/>
+          </a:lnRef>
+          <a:fillRef idx="0">
+            <a:schemeClr val="accent1"/>
+          </a:fillRef>
+          <a:effectRef idx="0">
+            <a:schemeClr val="accent1"/>
+          </a:effectRef>
+          <a:fontRef idx="minor">
+            <a:schemeClr val="tx1"/>
+          </a:fontRef>
+        </p:style>
+      </p:cxnSp>
+      <p:cxnSp>
+        <p:nvCxnSpPr>
+          <p:cNvPr id="14" name="Gerade Verbindung mit Pfeil 13">
+            <a:extLst>
+              <a:ext uri="{FF2B5EF4-FFF2-40B4-BE49-F238E27FC236}">
+                <a16:creationId xmlns:a16="http://schemas.microsoft.com/office/drawing/2014/main" id="{15873170-1570-4B64-BDA8-0AB4C6F95AB7}"/>
+              </a:ext>
+            </a:extLst>
+          </p:cNvPr>
+          <p:cNvCxnSpPr>
+            <a:cxnSpLocks/>
+          </p:cNvCxnSpPr>
+          <p:nvPr/>
+        </p:nvCxnSpPr>
+        <p:spPr>
+          <a:xfrm>
+            <a:off x="2538503" y="4319478"/>
+            <a:ext cx="1051863" cy="0"/>
+          </a:xfrm>
+          <a:prstGeom prst="straightConnector1">
+            <a:avLst/>
+          </a:prstGeom>
+          <a:ln w="76200">
+            <a:solidFill>
+              <a:srgbClr val="FF0000"/>
+            </a:solidFill>
+            <a:tailEnd type="triangle"/>
+          </a:ln>
+        </p:spPr>
+        <p:style>
+          <a:lnRef idx="1">
+            <a:schemeClr val="accent1"/>
+          </a:lnRef>
+          <a:fillRef idx="0">
+            <a:schemeClr val="accent1"/>
+          </a:fillRef>
+          <a:effectRef idx="0">
+            <a:schemeClr val="accent1"/>
+          </a:effectRef>
+          <a:fontRef idx="minor">
+            <a:schemeClr val="tx1"/>
+          </a:fontRef>
+        </p:style>
+      </p:cxnSp>
+      <p:cxnSp>
+        <p:nvCxnSpPr>
+          <p:cNvPr id="16" name="Gerade Verbindung mit Pfeil 15">
+            <a:extLst>
+              <a:ext uri="{FF2B5EF4-FFF2-40B4-BE49-F238E27FC236}">
+                <a16:creationId xmlns:a16="http://schemas.microsoft.com/office/drawing/2014/main" id="{1DBC814A-F716-4D82-9986-456AD78EEC61}"/>
+              </a:ext>
+            </a:extLst>
+          </p:cNvPr>
+          <p:cNvCxnSpPr>
+            <a:cxnSpLocks/>
+          </p:cNvCxnSpPr>
+          <p:nvPr/>
+        </p:nvCxnSpPr>
+        <p:spPr>
+          <a:xfrm>
+            <a:off x="2538503" y="4560109"/>
+            <a:ext cx="1051863" cy="0"/>
+          </a:xfrm>
+          <a:prstGeom prst="straightConnector1">
+            <a:avLst/>
+          </a:prstGeom>
+          <a:ln w="76200">
+            <a:solidFill>
+              <a:srgbClr val="FF0000"/>
+            </a:solidFill>
+            <a:tailEnd type="triangle"/>
+          </a:ln>
+        </p:spPr>
+        <p:style>
+          <a:lnRef idx="1">
+            <a:schemeClr val="accent1"/>
+          </a:lnRef>
+          <a:fillRef idx="0">
+            <a:schemeClr val="accent1"/>
+          </a:fillRef>
+          <a:effectRef idx="0">
+            <a:schemeClr val="accent1"/>
+          </a:effectRef>
+          <a:fontRef idx="minor">
+            <a:schemeClr val="tx1"/>
+          </a:fontRef>
+        </p:style>
+      </p:cxnSp>
+      <p:cxnSp>
+        <p:nvCxnSpPr>
+          <p:cNvPr id="17" name="Gerade Verbindung mit Pfeil 16">
+            <a:extLst>
+              <a:ext uri="{FF2B5EF4-FFF2-40B4-BE49-F238E27FC236}">
+                <a16:creationId xmlns:a16="http://schemas.microsoft.com/office/drawing/2014/main" id="{6662B668-D7D5-4D87-A5D8-39D65EC70F8D}"/>
+              </a:ext>
+            </a:extLst>
+          </p:cNvPr>
+          <p:cNvCxnSpPr>
+            <a:cxnSpLocks/>
+          </p:cNvCxnSpPr>
+          <p:nvPr/>
+        </p:nvCxnSpPr>
+        <p:spPr>
+          <a:xfrm>
+            <a:off x="2538503" y="4848868"/>
+            <a:ext cx="1051863" cy="0"/>
+          </a:xfrm>
+          <a:prstGeom prst="straightConnector1">
+            <a:avLst/>
+          </a:prstGeom>
+          <a:ln w="76200">
+            <a:solidFill>
+              <a:srgbClr val="FF0000"/>
+            </a:solidFill>
+            <a:tailEnd type="triangle"/>
+          </a:ln>
+        </p:spPr>
+        <p:style>
+          <a:lnRef idx="1">
+            <a:schemeClr val="accent1"/>
+          </a:lnRef>
+          <a:fillRef idx="0">
+            <a:schemeClr val="accent1"/>
+          </a:fillRef>
+          <a:effectRef idx="0">
+            <a:schemeClr val="accent1"/>
+          </a:effectRef>
+          <a:fontRef idx="minor">
+            <a:schemeClr val="tx1"/>
+          </a:fontRef>
+        </p:style>
+      </p:cxnSp>
+      <p:pic>
+        <p:nvPicPr>
+          <p:cNvPr id="1026" name="Picture 2" descr="Bildergebnis für google maps icon">
+            <a:extLst>
+              <a:ext uri="{FF2B5EF4-FFF2-40B4-BE49-F238E27FC236}">
+                <a16:creationId xmlns:a16="http://schemas.microsoft.com/office/drawing/2014/main" id="{BA368856-6DF7-480F-BC29-3CA3BD3E647E}"/>
+              </a:ext>
+            </a:extLst>
+          </p:cNvPr>
+          <p:cNvPicPr>
+            <a:picLocks noChangeAspect="1" noChangeArrowheads="1"/>
+          </p:cNvPicPr>
+          <p:nvPr/>
+        </p:nvPicPr>
+        <p:blipFill>
+          <a:blip r:embed="rId6">
+            <a:extLst>
+              <a:ext uri="{28A0092B-C50C-407E-A947-70E740481C1C}">
+                <a14:useLocalDpi xmlns:a14="http://schemas.microsoft.com/office/drawing/2010/main" val="0"/>
+              </a:ext>
+            </a:extLst>
+          </a:blip>
+          <a:srcRect/>
+          <a:stretch>
+            <a:fillRect/>
+          </a:stretch>
+        </p:blipFill>
+        <p:spPr bwMode="auto">
+          <a:xfrm>
+            <a:off x="6405692" y="5582652"/>
+            <a:ext cx="1275348" cy="1275348"/>
+          </a:xfrm>
+          <a:prstGeom prst="rect">
+            <a:avLst/>
+          </a:prstGeom>
+          <a:noFill/>
+          <a:extLst>
+            <a:ext uri="{909E8E84-426E-40DD-AFC4-6F175D3DCCD1}">
+              <a14:hiddenFill xmlns:a14="http://schemas.microsoft.com/office/drawing/2010/main">
+                <a:solidFill>
+                  <a:srgbClr val="FFFFFF"/>
+                </a:solidFill>
+              </a14:hiddenFill>
+            </a:ext>
+          </a:extLst>
+        </p:spPr>
+      </p:pic>
+      <p:cxnSp>
+        <p:nvCxnSpPr>
+          <p:cNvPr id="26" name="Gerade Verbindung mit Pfeil 25">
+            <a:extLst>
+              <a:ext uri="{FF2B5EF4-FFF2-40B4-BE49-F238E27FC236}">
+                <a16:creationId xmlns:a16="http://schemas.microsoft.com/office/drawing/2014/main" id="{3E4848B5-1FE0-4933-88B8-3114D69EFDDD}"/>
+              </a:ext>
+            </a:extLst>
+          </p:cNvPr>
+          <p:cNvCxnSpPr>
+            <a:cxnSpLocks/>
+          </p:cNvCxnSpPr>
+          <p:nvPr/>
+        </p:nvCxnSpPr>
+        <p:spPr>
+          <a:xfrm>
+            <a:off x="6845968" y="4993106"/>
+            <a:ext cx="0" cy="718324"/>
+          </a:xfrm>
+          <a:prstGeom prst="straightConnector1">
+            <a:avLst/>
+          </a:prstGeom>
+          <a:ln w="76200">
+            <a:solidFill>
+              <a:srgbClr val="FF0000"/>
+            </a:solidFill>
+            <a:tailEnd type="triangle"/>
+          </a:ln>
+        </p:spPr>
+        <p:style>
+          <a:lnRef idx="1">
+            <a:schemeClr val="accent1"/>
+          </a:lnRef>
+          <a:fillRef idx="0">
+            <a:schemeClr val="accent1"/>
+          </a:fillRef>
+          <a:effectRef idx="0">
+            <a:schemeClr val="accent1"/>
+          </a:effectRef>
+          <a:fontRef idx="minor">
+            <a:schemeClr val="tx1"/>
+          </a:fontRef>
+        </p:style>
+      </p:cxnSp>
+      <p:pic>
+        <p:nvPicPr>
+          <p:cNvPr id="1036" name="Picture 12" descr="Bildergebnis für google chrome logo">
+            <a:extLst>
+              <a:ext uri="{FF2B5EF4-FFF2-40B4-BE49-F238E27FC236}">
+                <a16:creationId xmlns:a16="http://schemas.microsoft.com/office/drawing/2014/main" id="{66E3D8BE-690D-4DFE-85B7-8748197A8D1D}"/>
+              </a:ext>
+            </a:extLst>
+          </p:cNvPr>
+          <p:cNvPicPr>
+            <a:picLocks noChangeAspect="1" noChangeArrowheads="1"/>
+          </p:cNvPicPr>
+          <p:nvPr/>
+        </p:nvPicPr>
+        <p:blipFill>
+          <a:blip r:embed="rId7">
+            <a:extLst>
+              <a:ext uri="{28A0092B-C50C-407E-A947-70E740481C1C}">
+                <a14:useLocalDpi xmlns:a14="http://schemas.microsoft.com/office/drawing/2010/main" val="0"/>
+              </a:ext>
+            </a:extLst>
+          </a:blip>
+          <a:srcRect/>
+          <a:stretch>
+            <a:fillRect/>
+          </a:stretch>
+        </p:blipFill>
+        <p:spPr bwMode="auto">
+          <a:xfrm>
+            <a:off x="7841380" y="5711430"/>
+            <a:ext cx="1017792" cy="1017792"/>
+          </a:xfrm>
+          <a:prstGeom prst="rect">
+            <a:avLst/>
+          </a:prstGeom>
+          <a:noFill/>
+          <a:extLst>
+            <a:ext uri="{909E8E84-426E-40DD-AFC4-6F175D3DCCD1}">
+              <a14:hiddenFill xmlns:a14="http://schemas.microsoft.com/office/drawing/2010/main">
+                <a:solidFill>
+                  <a:srgbClr val="FFFFFF"/>
+                </a:solidFill>
+              </a14:hiddenFill>
+            </a:ext>
+          </a:extLst>
+        </p:spPr>
+      </p:pic>
+      <p:cxnSp>
+        <p:nvCxnSpPr>
+          <p:cNvPr id="35" name="Gerade Verbindung mit Pfeil 34">
+            <a:extLst>
+              <a:ext uri="{FF2B5EF4-FFF2-40B4-BE49-F238E27FC236}">
+                <a16:creationId xmlns:a16="http://schemas.microsoft.com/office/drawing/2014/main" id="{D7F88807-D928-4AD6-B863-D26452141416}"/>
+              </a:ext>
+            </a:extLst>
+          </p:cNvPr>
+          <p:cNvCxnSpPr>
+            <a:cxnSpLocks/>
+          </p:cNvCxnSpPr>
+          <p:nvPr/>
+        </p:nvCxnSpPr>
+        <p:spPr>
+          <a:xfrm>
+            <a:off x="8559465" y="4993106"/>
+            <a:ext cx="0" cy="718324"/>
           </a:xfrm>
           <a:prstGeom prst="straightConnector1">
             <a:avLst/>
@@ -7234,6 +7592,477 @@
   <p:clrMapOvr>
     <a:masterClrMapping/>
   </p:clrMapOvr>
+  <p:timing>
+    <p:tnLst>
+      <p:par>
+        <p:cTn id="1" dur="indefinite" restart="never" nodeType="tmRoot">
+          <p:childTnLst>
+            <p:seq concurrent="1" nextAc="seek">
+              <p:cTn id="2" dur="indefinite" nodeType="mainSeq">
+                <p:childTnLst>
+                  <p:par>
+                    <p:cTn id="3" fill="hold">
+                      <p:stCondLst>
+                        <p:cond delay="indefinite"/>
+                      </p:stCondLst>
+                      <p:childTnLst>
+                        <p:par>
+                          <p:cTn id="4" fill="hold">
+                            <p:stCondLst>
+                              <p:cond delay="0"/>
+                            </p:stCondLst>
+                            <p:childTnLst>
+                              <p:par>
+                                <p:cTn id="5" presetID="1" presetClass="entr" presetSubtype="0" fill="hold" nodeType="clickEffect">
+                                  <p:stCondLst>
+                                    <p:cond delay="0"/>
+                                  </p:stCondLst>
+                                  <p:childTnLst>
+                                    <p:set>
+                                      <p:cBhvr>
+                                        <p:cTn id="6" dur="1" fill="hold">
+                                          <p:stCondLst>
+                                            <p:cond delay="0"/>
+                                          </p:stCondLst>
+                                        </p:cTn>
+                                        <p:tgtEl>
+                                          <p:spTgt spid="6"/>
+                                        </p:tgtEl>
+                                        <p:attrNameLst>
+                                          <p:attrName>style.visibility</p:attrName>
+                                        </p:attrNameLst>
+                                      </p:cBhvr>
+                                      <p:to>
+                                        <p:strVal val="visible"/>
+                                      </p:to>
+                                    </p:set>
+                                  </p:childTnLst>
+                                </p:cTn>
+                              </p:par>
+                            </p:childTnLst>
+                          </p:cTn>
+                        </p:par>
+                      </p:childTnLst>
+                    </p:cTn>
+                  </p:par>
+                  <p:par>
+                    <p:cTn id="7" fill="hold">
+                      <p:stCondLst>
+                        <p:cond delay="indefinite"/>
+                      </p:stCondLst>
+                      <p:childTnLst>
+                        <p:par>
+                          <p:cTn id="8" fill="hold">
+                            <p:stCondLst>
+                              <p:cond delay="0"/>
+                            </p:stCondLst>
+                            <p:childTnLst>
+                              <p:par>
+                                <p:cTn id="9" presetID="1" presetClass="entr" presetSubtype="0" fill="hold" nodeType="clickEffect">
+                                  <p:stCondLst>
+                                    <p:cond delay="0"/>
+                                  </p:stCondLst>
+                                  <p:childTnLst>
+                                    <p:set>
+                                      <p:cBhvr>
+                                        <p:cTn id="10" dur="1" fill="hold">
+                                          <p:stCondLst>
+                                            <p:cond delay="0"/>
+                                          </p:stCondLst>
+                                        </p:cTn>
+                                        <p:tgtEl>
+                                          <p:spTgt spid="13"/>
+                                        </p:tgtEl>
+                                        <p:attrNameLst>
+                                          <p:attrName>style.visibility</p:attrName>
+                                        </p:attrNameLst>
+                                      </p:cBhvr>
+                                      <p:to>
+                                        <p:strVal val="visible"/>
+                                      </p:to>
+                                    </p:set>
+                                  </p:childTnLst>
+                                </p:cTn>
+                              </p:par>
+                              <p:par>
+                                <p:cTn id="11" presetID="1" presetClass="entr" presetSubtype="0" fill="hold" nodeType="withEffect">
+                                  <p:stCondLst>
+                                    <p:cond delay="0"/>
+                                  </p:stCondLst>
+                                  <p:childTnLst>
+                                    <p:set>
+                                      <p:cBhvr>
+                                        <p:cTn id="12" dur="1" fill="hold">
+                                          <p:stCondLst>
+                                            <p:cond delay="0"/>
+                                          </p:stCondLst>
+                                        </p:cTn>
+                                        <p:tgtEl>
+                                          <p:spTgt spid="12"/>
+                                        </p:tgtEl>
+                                        <p:attrNameLst>
+                                          <p:attrName>style.visibility</p:attrName>
+                                        </p:attrNameLst>
+                                      </p:cBhvr>
+                                      <p:to>
+                                        <p:strVal val="visible"/>
+                                      </p:to>
+                                    </p:set>
+                                  </p:childTnLst>
+                                </p:cTn>
+                              </p:par>
+                              <p:par>
+                                <p:cTn id="13" presetID="1" presetClass="entr" presetSubtype="0" fill="hold" nodeType="withEffect">
+                                  <p:stCondLst>
+                                    <p:cond delay="0"/>
+                                  </p:stCondLst>
+                                  <p:childTnLst>
+                                    <p:set>
+                                      <p:cBhvr>
+                                        <p:cTn id="14" dur="1" fill="hold">
+                                          <p:stCondLst>
+                                            <p:cond delay="0"/>
+                                          </p:stCondLst>
+                                        </p:cTn>
+                                        <p:tgtEl>
+                                          <p:spTgt spid="14"/>
+                                        </p:tgtEl>
+                                        <p:attrNameLst>
+                                          <p:attrName>style.visibility</p:attrName>
+                                        </p:attrNameLst>
+                                      </p:cBhvr>
+                                      <p:to>
+                                        <p:strVal val="visible"/>
+                                      </p:to>
+                                    </p:set>
+                                  </p:childTnLst>
+                                </p:cTn>
+                              </p:par>
+                              <p:par>
+                                <p:cTn id="15" presetID="1" presetClass="entr" presetSubtype="0" fill="hold" nodeType="withEffect">
+                                  <p:stCondLst>
+                                    <p:cond delay="0"/>
+                                  </p:stCondLst>
+                                  <p:childTnLst>
+                                    <p:set>
+                                      <p:cBhvr>
+                                        <p:cTn id="16" dur="1" fill="hold">
+                                          <p:stCondLst>
+                                            <p:cond delay="0"/>
+                                          </p:stCondLst>
+                                        </p:cTn>
+                                        <p:tgtEl>
+                                          <p:spTgt spid="16"/>
+                                        </p:tgtEl>
+                                        <p:attrNameLst>
+                                          <p:attrName>style.visibility</p:attrName>
+                                        </p:attrNameLst>
+                                      </p:cBhvr>
+                                      <p:to>
+                                        <p:strVal val="visible"/>
+                                      </p:to>
+                                    </p:set>
+                                  </p:childTnLst>
+                                </p:cTn>
+                              </p:par>
+                              <p:par>
+                                <p:cTn id="17" presetID="1" presetClass="entr" presetSubtype="0" fill="hold" nodeType="withEffect">
+                                  <p:stCondLst>
+                                    <p:cond delay="0"/>
+                                  </p:stCondLst>
+                                  <p:childTnLst>
+                                    <p:set>
+                                      <p:cBhvr>
+                                        <p:cTn id="18" dur="1" fill="hold">
+                                          <p:stCondLst>
+                                            <p:cond delay="0"/>
+                                          </p:stCondLst>
+                                        </p:cTn>
+                                        <p:tgtEl>
+                                          <p:spTgt spid="17"/>
+                                        </p:tgtEl>
+                                        <p:attrNameLst>
+                                          <p:attrName>style.visibility</p:attrName>
+                                        </p:attrNameLst>
+                                      </p:cBhvr>
+                                      <p:to>
+                                        <p:strVal val="visible"/>
+                                      </p:to>
+                                    </p:set>
+                                  </p:childTnLst>
+                                </p:cTn>
+                              </p:par>
+                              <p:par>
+                                <p:cTn id="19" presetID="1" presetClass="entr" presetSubtype="0" fill="hold" nodeType="withEffect">
+                                  <p:stCondLst>
+                                    <p:cond delay="0"/>
+                                  </p:stCondLst>
+                                  <p:childTnLst>
+                                    <p:set>
+                                      <p:cBhvr>
+                                        <p:cTn id="20" dur="1" fill="hold">
+                                          <p:stCondLst>
+                                            <p:cond delay="0"/>
+                                          </p:stCondLst>
+                                        </p:cTn>
+                                        <p:tgtEl>
+                                          <p:spTgt spid="8"/>
+                                        </p:tgtEl>
+                                        <p:attrNameLst>
+                                          <p:attrName>style.visibility</p:attrName>
+                                        </p:attrNameLst>
+                                      </p:cBhvr>
+                                      <p:to>
+                                        <p:strVal val="visible"/>
+                                      </p:to>
+                                    </p:set>
+                                  </p:childTnLst>
+                                </p:cTn>
+                              </p:par>
+                            </p:childTnLst>
+                          </p:cTn>
+                        </p:par>
+                      </p:childTnLst>
+                    </p:cTn>
+                  </p:par>
+                  <p:par>
+                    <p:cTn id="21" fill="hold">
+                      <p:stCondLst>
+                        <p:cond delay="indefinite"/>
+                      </p:stCondLst>
+                      <p:childTnLst>
+                        <p:par>
+                          <p:cTn id="22" fill="hold">
+                            <p:stCondLst>
+                              <p:cond delay="0"/>
+                            </p:stCondLst>
+                            <p:childTnLst>
+                              <p:par>
+                                <p:cTn id="23" presetID="1" presetClass="entr" presetSubtype="0" fill="hold" nodeType="clickEffect">
+                                  <p:stCondLst>
+                                    <p:cond delay="0"/>
+                                  </p:stCondLst>
+                                  <p:childTnLst>
+                                    <p:set>
+                                      <p:cBhvr>
+                                        <p:cTn id="24" dur="1" fill="hold">
+                                          <p:stCondLst>
+                                            <p:cond delay="0"/>
+                                          </p:stCondLst>
+                                        </p:cTn>
+                                        <p:tgtEl>
+                                          <p:spTgt spid="15"/>
+                                        </p:tgtEl>
+                                        <p:attrNameLst>
+                                          <p:attrName>style.visibility</p:attrName>
+                                        </p:attrNameLst>
+                                      </p:cBhvr>
+                                      <p:to>
+                                        <p:strVal val="visible"/>
+                                      </p:to>
+                                    </p:set>
+                                  </p:childTnLst>
+                                </p:cTn>
+                              </p:par>
+                              <p:par>
+                                <p:cTn id="25" presetID="1" presetClass="entr" presetSubtype="0" fill="hold" nodeType="withEffect">
+                                  <p:stCondLst>
+                                    <p:cond delay="0"/>
+                                  </p:stCondLst>
+                                  <p:childTnLst>
+                                    <p:set>
+                                      <p:cBhvr>
+                                        <p:cTn id="26" dur="1" fill="hold">
+                                          <p:stCondLst>
+                                            <p:cond delay="0"/>
+                                          </p:stCondLst>
+                                        </p:cTn>
+                                        <p:tgtEl>
+                                          <p:spTgt spid="4"/>
+                                        </p:tgtEl>
+                                        <p:attrNameLst>
+                                          <p:attrName>style.visibility</p:attrName>
+                                        </p:attrNameLst>
+                                      </p:cBhvr>
+                                      <p:to>
+                                        <p:strVal val="visible"/>
+                                      </p:to>
+                                    </p:set>
+                                  </p:childTnLst>
+                                </p:cTn>
+                              </p:par>
+                            </p:childTnLst>
+                          </p:cTn>
+                        </p:par>
+                      </p:childTnLst>
+                    </p:cTn>
+                  </p:par>
+                  <p:par>
+                    <p:cTn id="27" fill="hold">
+                      <p:stCondLst>
+                        <p:cond delay="indefinite"/>
+                      </p:stCondLst>
+                      <p:childTnLst>
+                        <p:par>
+                          <p:cTn id="28" fill="hold">
+                            <p:stCondLst>
+                              <p:cond delay="0"/>
+                            </p:stCondLst>
+                            <p:childTnLst>
+                              <p:par>
+                                <p:cTn id="29" presetID="1" presetClass="entr" presetSubtype="0" fill="hold" nodeType="clickEffect">
+                                  <p:stCondLst>
+                                    <p:cond delay="0"/>
+                                  </p:stCondLst>
+                                  <p:childTnLst>
+                                    <p:set>
+                                      <p:cBhvr>
+                                        <p:cTn id="30" dur="1" fill="hold">
+                                          <p:stCondLst>
+                                            <p:cond delay="0"/>
+                                          </p:stCondLst>
+                                        </p:cTn>
+                                        <p:tgtEl>
+                                          <p:spTgt spid="26"/>
+                                        </p:tgtEl>
+                                        <p:attrNameLst>
+                                          <p:attrName>style.visibility</p:attrName>
+                                        </p:attrNameLst>
+                                      </p:cBhvr>
+                                      <p:to>
+                                        <p:strVal val="visible"/>
+                                      </p:to>
+                                    </p:set>
+                                  </p:childTnLst>
+                                </p:cTn>
+                              </p:par>
+                              <p:par>
+                                <p:cTn id="31" presetID="1" presetClass="entr" presetSubtype="0" fill="hold" nodeType="withEffect">
+                                  <p:stCondLst>
+                                    <p:cond delay="0"/>
+                                  </p:stCondLst>
+                                  <p:childTnLst>
+                                    <p:set>
+                                      <p:cBhvr>
+                                        <p:cTn id="32" dur="1" fill="hold">
+                                          <p:stCondLst>
+                                            <p:cond delay="0"/>
+                                          </p:stCondLst>
+                                        </p:cTn>
+                                        <p:tgtEl>
+                                          <p:spTgt spid="1026"/>
+                                        </p:tgtEl>
+                                        <p:attrNameLst>
+                                          <p:attrName>style.visibility</p:attrName>
+                                        </p:attrNameLst>
+                                      </p:cBhvr>
+                                      <p:to>
+                                        <p:strVal val="visible"/>
+                                      </p:to>
+                                    </p:set>
+                                  </p:childTnLst>
+                                </p:cTn>
+                              </p:par>
+                            </p:childTnLst>
+                          </p:cTn>
+                        </p:par>
+                      </p:childTnLst>
+                    </p:cTn>
+                  </p:par>
+                  <p:par>
+                    <p:cTn id="33" fill="hold">
+                      <p:stCondLst>
+                        <p:cond delay="indefinite"/>
+                      </p:stCondLst>
+                      <p:childTnLst>
+                        <p:par>
+                          <p:cTn id="34" fill="hold">
+                            <p:stCondLst>
+                              <p:cond delay="0"/>
+                            </p:stCondLst>
+                            <p:childTnLst>
+                              <p:par>
+                                <p:cTn id="35" presetID="1" presetClass="entr" presetSubtype="0" fill="hold" nodeType="clickEffect">
+                                  <p:stCondLst>
+                                    <p:cond delay="0"/>
+                                  </p:stCondLst>
+                                  <p:childTnLst>
+                                    <p:set>
+                                      <p:cBhvr>
+                                        <p:cTn id="36" dur="1" fill="hold">
+                                          <p:stCondLst>
+                                            <p:cond delay="0"/>
+                                          </p:stCondLst>
+                                        </p:cTn>
+                                        <p:tgtEl>
+                                          <p:spTgt spid="35"/>
+                                        </p:tgtEl>
+                                        <p:attrNameLst>
+                                          <p:attrName>style.visibility</p:attrName>
+                                        </p:attrNameLst>
+                                      </p:cBhvr>
+                                      <p:to>
+                                        <p:strVal val="visible"/>
+                                      </p:to>
+                                    </p:set>
+                                  </p:childTnLst>
+                                </p:cTn>
+                              </p:par>
+                              <p:par>
+                                <p:cTn id="37" presetID="1" presetClass="entr" presetSubtype="0" fill="hold" nodeType="withEffect">
+                                  <p:stCondLst>
+                                    <p:cond delay="0"/>
+                                  </p:stCondLst>
+                                  <p:childTnLst>
+                                    <p:set>
+                                      <p:cBhvr>
+                                        <p:cTn id="38" dur="1" fill="hold">
+                                          <p:stCondLst>
+                                            <p:cond delay="0"/>
+                                          </p:stCondLst>
+                                        </p:cTn>
+                                        <p:tgtEl>
+                                          <p:spTgt spid="1036"/>
+                                        </p:tgtEl>
+                                        <p:attrNameLst>
+                                          <p:attrName>style.visibility</p:attrName>
+                                        </p:attrNameLst>
+                                      </p:cBhvr>
+                                      <p:to>
+                                        <p:strVal val="visible"/>
+                                      </p:to>
+                                    </p:set>
+                                  </p:childTnLst>
+                                </p:cTn>
+                              </p:par>
+                            </p:childTnLst>
+                          </p:cTn>
+                        </p:par>
+                      </p:childTnLst>
+                    </p:cTn>
+                  </p:par>
+                </p:childTnLst>
+              </p:cTn>
+              <p:prevCondLst>
+                <p:cond evt="onPrev" delay="0">
+                  <p:tgtEl>
+                    <p:sldTgt/>
+                  </p:tgtEl>
+                </p:cond>
+              </p:prevCondLst>
+              <p:nextCondLst>
+                <p:cond evt="onNext" delay="0">
+                  <p:tgtEl>
+                    <p:sldTgt/>
+                  </p:tgtEl>
+                </p:cond>
+              </p:nextCondLst>
+            </p:seq>
+          </p:childTnLst>
+        </p:cTn>
+      </p:par>
+    </p:tnLst>
+  </p:timing>
 </p:sld>
 </file>
 

</xml_diff>

<commit_message>
Design List Bild aktualisiert
</commit_message>
<xml_diff>
--- a/Documents/Presentation/Presentation.pptx
+++ b/Documents/Presentation/Presentation.pptx
@@ -2028,7 +2028,15 @@
             </a:r>
             <a:r>
               <a:rPr lang="en-GB" dirty="0" err="1"/>
-              <a:t>Würde</a:t>
+              <a:t>Guten</a:t>
+            </a:r>
+            <a:r>
+              <a:rPr lang="en-GB" dirty="0"/>
+              <a:t> Test </a:t>
+            </a:r>
+            <a:r>
+              <a:rPr lang="en-GB" dirty="0" err="1"/>
+              <a:t>für</a:t>
             </a:r>
             <a:r>
               <a:rPr lang="en-GB" dirty="0"/>
@@ -2036,43 +2044,11 @@
             </a:r>
             <a:r>
               <a:rPr lang="en-GB" dirty="0" err="1"/>
-              <a:t>vergessene</a:t>
-            </a:r>
-            <a:r>
-              <a:rPr lang="en-GB" dirty="0"/>
-              <a:t> </a:t>
-            </a:r>
-            <a:r>
-              <a:rPr lang="en-GB" dirty="0" err="1"/>
-              <a:t>Fälle</a:t>
-            </a:r>
-            <a:r>
-              <a:rPr lang="en-GB" dirty="0"/>
-              <a:t> </a:t>
-            </a:r>
-            <a:r>
-              <a:rPr lang="en-GB" dirty="0" err="1"/>
-              <a:t>mit</a:t>
-            </a:r>
-            <a:r>
-              <a:rPr lang="en-GB" dirty="0"/>
-              <a:t> grosser </a:t>
-            </a:r>
-            <a:r>
-              <a:rPr lang="en-GB" dirty="0" err="1"/>
-              <a:t>Wahrscheindlichkeit</a:t>
-            </a:r>
-            <a:r>
-              <a:rPr lang="en-GB" dirty="0"/>
-              <a:t> </a:t>
-            </a:r>
-            <a:r>
-              <a:rPr lang="en-GB" dirty="0" err="1"/>
-              <a:t>entdecken</a:t>
-            </a:r>
-            <a:r>
-              <a:rPr lang="en-GB" dirty="0"/>
-              <a:t>.</a:t>
+              <a:t>Stabilität</a:t>
+            </a:r>
+            <a:r>
+              <a:rPr lang="en-GB" dirty="0"/>
+              <a:t> der App</a:t>
             </a:r>
           </a:p>
         </p:txBody>
@@ -7020,10 +6996,10 @@
       </p:grpSpPr>
       <p:pic>
         <p:nvPicPr>
-          <p:cNvPr id="8" name="Grafik 7">
+          <p:cNvPr id="3" name="Grafik 2">
             <a:extLst>
               <a:ext uri="{FF2B5EF4-FFF2-40B4-BE49-F238E27FC236}">
-                <a16:creationId xmlns:a16="http://schemas.microsoft.com/office/drawing/2014/main" id="{7EBBEC70-56A0-4605-8ACF-DD7F099C28A1}"/>
+                <a16:creationId xmlns:a16="http://schemas.microsoft.com/office/drawing/2014/main" id="{466F48F9-32B6-46D4-BB13-2177D2C156C6}"/>
               </a:ext>
             </a:extLst>
           </p:cNvPr>
@@ -7040,8 +7016,8 @@
         </p:blipFill>
         <p:spPr>
           <a:xfrm>
-            <a:off x="3590366" y="1349756"/>
-            <a:ext cx="2349894" cy="4158485"/>
+            <a:off x="3588957" y="1332507"/>
+            <a:ext cx="2372431" cy="4175735"/>
           </a:xfrm>
           <a:prstGeom prst="rect">
             <a:avLst/>
@@ -7792,21 +7768,30 @@
                                   </p:childTnLst>
                                 </p:cTn>
                               </p:par>
+                            </p:childTnLst>
+                          </p:cTn>
+                        </p:par>
+                        <p:par>
+                          <p:cTn id="19" fill="hold">
+                            <p:stCondLst>
+                              <p:cond delay="0"/>
+                            </p:stCondLst>
+                            <p:childTnLst>
                               <p:par>
-                                <p:cTn id="19" presetID="1" presetClass="entr" presetSubtype="0" fill="hold" nodeType="withEffect">
+                                <p:cTn id="20" presetID="1" presetClass="entr" presetSubtype="0" fill="hold" nodeType="afterEffect">
                                   <p:stCondLst>
                                     <p:cond delay="0"/>
                                   </p:stCondLst>
                                   <p:childTnLst>
                                     <p:set>
                                       <p:cBhvr>
-                                        <p:cTn id="20" dur="1" fill="hold">
+                                        <p:cTn id="21" dur="1" fill="hold">
                                           <p:stCondLst>
                                             <p:cond delay="0"/>
                                           </p:stCondLst>
                                         </p:cTn>
                                         <p:tgtEl>
-                                          <p:spTgt spid="8"/>
+                                          <p:spTgt spid="3"/>
                                         </p:tgtEl>
                                         <p:attrNameLst>
                                           <p:attrName>style.visibility</p:attrName>
@@ -7826,26 +7811,26 @@
                     </p:cTn>
                   </p:par>
                   <p:par>
-                    <p:cTn id="21" fill="hold">
+                    <p:cTn id="22" fill="hold">
                       <p:stCondLst>
                         <p:cond delay="indefinite"/>
                       </p:stCondLst>
                       <p:childTnLst>
                         <p:par>
-                          <p:cTn id="22" fill="hold">
+                          <p:cTn id="23" fill="hold">
                             <p:stCondLst>
                               <p:cond delay="0"/>
                             </p:stCondLst>
                             <p:childTnLst>
                               <p:par>
-                                <p:cTn id="23" presetID="1" presetClass="entr" presetSubtype="0" fill="hold" nodeType="clickEffect">
+                                <p:cTn id="24" presetID="1" presetClass="entr" presetSubtype="0" fill="hold" nodeType="clickEffect">
                                   <p:stCondLst>
                                     <p:cond delay="0"/>
                                   </p:stCondLst>
                                   <p:childTnLst>
                                     <p:set>
                                       <p:cBhvr>
-                                        <p:cTn id="24" dur="1" fill="hold">
+                                        <p:cTn id="25" dur="1" fill="hold">
                                           <p:stCondLst>
                                             <p:cond delay="0"/>
                                           </p:stCondLst>
@@ -7864,15 +7849,24 @@
                                   </p:childTnLst>
                                 </p:cTn>
                               </p:par>
+                            </p:childTnLst>
+                          </p:cTn>
+                        </p:par>
+                        <p:par>
+                          <p:cTn id="26" fill="hold">
+                            <p:stCondLst>
+                              <p:cond delay="0"/>
+                            </p:stCondLst>
+                            <p:childTnLst>
                               <p:par>
-                                <p:cTn id="25" presetID="1" presetClass="entr" presetSubtype="0" fill="hold" nodeType="withEffect">
+                                <p:cTn id="27" presetID="1" presetClass="entr" presetSubtype="0" fill="hold" nodeType="afterEffect">
                                   <p:stCondLst>
                                     <p:cond delay="0"/>
                                   </p:stCondLst>
                                   <p:childTnLst>
                                     <p:set>
                                       <p:cBhvr>
-                                        <p:cTn id="26" dur="1" fill="hold">
+                                        <p:cTn id="28" dur="1" fill="hold">
                                           <p:stCondLst>
                                             <p:cond delay="0"/>
                                           </p:stCondLst>
@@ -7898,26 +7892,26 @@
                     </p:cTn>
                   </p:par>
                   <p:par>
-                    <p:cTn id="27" fill="hold">
+                    <p:cTn id="29" fill="hold">
                       <p:stCondLst>
                         <p:cond delay="indefinite"/>
                       </p:stCondLst>
                       <p:childTnLst>
                         <p:par>
-                          <p:cTn id="28" fill="hold">
+                          <p:cTn id="30" fill="hold">
                             <p:stCondLst>
                               <p:cond delay="0"/>
                             </p:stCondLst>
                             <p:childTnLst>
                               <p:par>
-                                <p:cTn id="29" presetID="1" presetClass="entr" presetSubtype="0" fill="hold" nodeType="clickEffect">
+                                <p:cTn id="31" presetID="1" presetClass="entr" presetSubtype="0" fill="hold" nodeType="clickEffect">
                                   <p:stCondLst>
                                     <p:cond delay="0"/>
                                   </p:stCondLst>
                                   <p:childTnLst>
                                     <p:set>
                                       <p:cBhvr>
-                                        <p:cTn id="30" dur="1" fill="hold">
+                                        <p:cTn id="32" dur="1" fill="hold">
                                           <p:stCondLst>
                                             <p:cond delay="0"/>
                                           </p:stCondLst>
@@ -7936,15 +7930,24 @@
                                   </p:childTnLst>
                                 </p:cTn>
                               </p:par>
+                            </p:childTnLst>
+                          </p:cTn>
+                        </p:par>
+                        <p:par>
+                          <p:cTn id="33" fill="hold">
+                            <p:stCondLst>
+                              <p:cond delay="0"/>
+                            </p:stCondLst>
+                            <p:childTnLst>
                               <p:par>
-                                <p:cTn id="31" presetID="1" presetClass="entr" presetSubtype="0" fill="hold" nodeType="withEffect">
+                                <p:cTn id="34" presetID="1" presetClass="entr" presetSubtype="0" fill="hold" nodeType="afterEffect">
                                   <p:stCondLst>
                                     <p:cond delay="0"/>
                                   </p:stCondLst>
                                   <p:childTnLst>
                                     <p:set>
                                       <p:cBhvr>
-                                        <p:cTn id="32" dur="1" fill="hold">
+                                        <p:cTn id="35" dur="1" fill="hold">
                                           <p:stCondLst>
                                             <p:cond delay="0"/>
                                           </p:stCondLst>
@@ -7970,26 +7973,26 @@
                     </p:cTn>
                   </p:par>
                   <p:par>
-                    <p:cTn id="33" fill="hold">
+                    <p:cTn id="36" fill="hold">
                       <p:stCondLst>
                         <p:cond delay="indefinite"/>
                       </p:stCondLst>
                       <p:childTnLst>
                         <p:par>
-                          <p:cTn id="34" fill="hold">
+                          <p:cTn id="37" fill="hold">
                             <p:stCondLst>
                               <p:cond delay="0"/>
                             </p:stCondLst>
                             <p:childTnLst>
                               <p:par>
-                                <p:cTn id="35" presetID="1" presetClass="entr" presetSubtype="0" fill="hold" nodeType="clickEffect">
+                                <p:cTn id="38" presetID="1" presetClass="entr" presetSubtype="0" fill="hold" nodeType="clickEffect">
                                   <p:stCondLst>
                                     <p:cond delay="0"/>
                                   </p:stCondLst>
                                   <p:childTnLst>
                                     <p:set>
                                       <p:cBhvr>
-                                        <p:cTn id="36" dur="1" fill="hold">
+                                        <p:cTn id="39" dur="1" fill="hold">
                                           <p:stCondLst>
                                             <p:cond delay="0"/>
                                           </p:stCondLst>
@@ -8008,15 +8011,24 @@
                                   </p:childTnLst>
                                 </p:cTn>
                               </p:par>
+                            </p:childTnLst>
+                          </p:cTn>
+                        </p:par>
+                        <p:par>
+                          <p:cTn id="40" fill="hold">
+                            <p:stCondLst>
+                              <p:cond delay="0"/>
+                            </p:stCondLst>
+                            <p:childTnLst>
                               <p:par>
-                                <p:cTn id="37" presetID="1" presetClass="entr" presetSubtype="0" fill="hold" nodeType="withEffect">
+                                <p:cTn id="41" presetID="1" presetClass="entr" presetSubtype="0" fill="hold" nodeType="afterEffect">
                                   <p:stCondLst>
                                     <p:cond delay="0"/>
                                   </p:stCondLst>
                                   <p:childTnLst>
                                     <p:set>
                                       <p:cBhvr>
-                                        <p:cTn id="38" dur="1" fill="hold">
+                                        <p:cTn id="42" dur="1" fill="hold">
                                           <p:stCondLst>
                                             <p:cond delay="0"/>
                                           </p:stCondLst>

</xml_diff>

<commit_message>
Add Page for Android Monkey Test Add Page for Demo of Application
</commit_message>
<xml_diff>
--- a/Documents/Presentation/Presentation.pptx
+++ b/Documents/Presentation/Presentation.pptx
@@ -5,7 +5,7 @@
     <p:sldMasterId id="2147483660" r:id="rId1"/>
   </p:sldMasterIdLst>
   <p:notesMasterIdLst>
-    <p:notesMasterId r:id="rId14"/>
+    <p:notesMasterId r:id="rId17"/>
   </p:notesMasterIdLst>
   <p:sldIdLst>
     <p:sldId id="256" r:id="rId2"/>
@@ -18,8 +18,11 @@
     <p:sldId id="268" r:id="rId9"/>
     <p:sldId id="264" r:id="rId10"/>
     <p:sldId id="265" r:id="rId11"/>
-    <p:sldId id="269" r:id="rId12"/>
-    <p:sldId id="266" r:id="rId13"/>
+    <p:sldId id="270" r:id="rId12"/>
+    <p:sldId id="269" r:id="rId13"/>
+    <p:sldId id="271" r:id="rId14"/>
+    <p:sldId id="272" r:id="rId15"/>
+    <p:sldId id="266" r:id="rId16"/>
   </p:sldIdLst>
   <p:sldSz cx="9144000" cy="6858000" type="screen4x3"/>
   <p:notesSz cx="6858000" cy="9144000"/>
@@ -575,6 +578,461 @@
 </p:notes>
 </file>
 
+<file path=ppt/notesSlides/notesSlide10.xml><?xml version="1.0" encoding="utf-8"?>
+<p:notes xmlns:a="http://schemas.openxmlformats.org/drawingml/2006/main" xmlns:r="http://schemas.openxmlformats.org/officeDocument/2006/relationships" xmlns:p="http://schemas.openxmlformats.org/presentationml/2006/main">
+  <p:cSld>
+    <p:spTree>
+      <p:nvGrpSpPr>
+        <p:cNvPr id="1" name=""/>
+        <p:cNvGrpSpPr/>
+        <p:nvPr/>
+      </p:nvGrpSpPr>
+      <p:grpSpPr>
+        <a:xfrm>
+          <a:off x="0" y="0"/>
+          <a:ext cx="0" cy="0"/>
+          <a:chOff x="0" y="0"/>
+          <a:chExt cx="0" cy="0"/>
+        </a:xfrm>
+      </p:grpSpPr>
+      <p:sp>
+        <p:nvSpPr>
+          <p:cNvPr id="2" name="Folienbildplatzhalter 1"/>
+          <p:cNvSpPr>
+            <a:spLocks noGrp="1" noRot="1" noChangeAspect="1"/>
+          </p:cNvSpPr>
+          <p:nvPr>
+            <p:ph type="sldImg"/>
+          </p:nvPr>
+        </p:nvSpPr>
+        <p:spPr/>
+      </p:sp>
+      <p:sp>
+        <p:nvSpPr>
+          <p:cNvPr id="3" name="Notizenplatzhalter 2"/>
+          <p:cNvSpPr>
+            <a:spLocks noGrp="1"/>
+          </p:cNvSpPr>
+          <p:nvPr>
+            <p:ph type="body" idx="1"/>
+          </p:nvPr>
+        </p:nvSpPr>
+        <p:spPr/>
+        <p:txBody>
+          <a:bodyPr/>
+          <a:lstStyle/>
+          <a:p>
+            <a:r>
+              <a:rPr lang="en-GB" dirty="0" err="1"/>
+              <a:t>Zusammenfassung</a:t>
+            </a:r>
+            <a:endParaRPr lang="en-GB" dirty="0"/>
+          </a:p>
+          <a:p>
+            <a:pPr marL="171450" indent="-171450">
+              <a:buFontTx/>
+              <a:buChar char="-"/>
+            </a:pPr>
+            <a:r>
+              <a:rPr lang="en-GB" dirty="0"/>
+              <a:t>Zu </a:t>
+            </a:r>
+            <a:r>
+              <a:rPr lang="en-GB" dirty="0" err="1"/>
+              <a:t>wenig</a:t>
+            </a:r>
+            <a:r>
+              <a:rPr lang="en-GB" dirty="0"/>
+              <a:t> </a:t>
+            </a:r>
+            <a:r>
+              <a:rPr lang="en-GB" dirty="0" err="1"/>
+              <a:t>zeit</a:t>
+            </a:r>
+            <a:r>
+              <a:rPr lang="en-GB" dirty="0"/>
+              <a:t> in in </a:t>
+            </a:r>
+            <a:r>
+              <a:rPr lang="en-GB" dirty="0" err="1"/>
+              <a:t>Projekten</a:t>
+            </a:r>
+            <a:r>
+              <a:rPr lang="en-GB" dirty="0"/>
+              <a:t> so </a:t>
+            </a:r>
+            <a:r>
+              <a:rPr lang="en-GB" dirty="0" err="1"/>
+              <a:t>üblich</a:t>
+            </a:r>
+            <a:r>
+              <a:rPr lang="en-GB" dirty="0"/>
+              <a:t> ;-)</a:t>
+            </a:r>
+          </a:p>
+          <a:p>
+            <a:pPr marL="171450" indent="-171450">
+              <a:buFontTx/>
+              <a:buChar char="-"/>
+            </a:pPr>
+            <a:r>
+              <a:rPr lang="en-GB" dirty="0"/>
+              <a:t>Android </a:t>
+            </a:r>
+            <a:r>
+              <a:rPr lang="en-GB" dirty="0" err="1"/>
+              <a:t>Umgebung</a:t>
+            </a:r>
+            <a:r>
+              <a:rPr lang="en-GB" dirty="0"/>
+              <a:t> </a:t>
+            </a:r>
+            <a:r>
+              <a:rPr lang="en-GB" dirty="0" err="1"/>
+              <a:t>besser</a:t>
+            </a:r>
+            <a:r>
+              <a:rPr lang="en-GB" dirty="0"/>
+              <a:t> </a:t>
+            </a:r>
+            <a:r>
+              <a:rPr lang="en-GB" dirty="0" err="1"/>
+              <a:t>kennengelern</a:t>
+            </a:r>
+            <a:r>
+              <a:rPr lang="en-GB" dirty="0"/>
+              <a:t>.</a:t>
+            </a:r>
+          </a:p>
+          <a:p>
+            <a:pPr marL="171450" indent="-171450">
+              <a:buFontTx/>
+              <a:buChar char="-"/>
+            </a:pPr>
+            <a:r>
+              <a:rPr lang="en-GB" dirty="0" err="1"/>
+              <a:t>Unzählige</a:t>
+            </a:r>
+            <a:r>
+              <a:rPr lang="en-GB" dirty="0"/>
+              <a:t> Tools und </a:t>
+            </a:r>
+            <a:r>
+              <a:rPr lang="en-GB" dirty="0" err="1"/>
+              <a:t>Bibliotheken</a:t>
+            </a:r>
+            <a:r>
+              <a:rPr lang="en-GB" dirty="0"/>
+              <a:t>. </a:t>
+            </a:r>
+            <a:r>
+              <a:rPr lang="en-GB" dirty="0" err="1"/>
+              <a:t>Für</a:t>
+            </a:r>
+            <a:r>
+              <a:rPr lang="en-GB" dirty="0"/>
+              <a:t> </a:t>
+            </a:r>
+            <a:r>
+              <a:rPr lang="en-GB" dirty="0" err="1"/>
+              <a:t>jede</a:t>
+            </a:r>
+            <a:r>
+              <a:rPr lang="en-GB" dirty="0"/>
+              <a:t> </a:t>
+            </a:r>
+            <a:r>
+              <a:rPr lang="en-GB" dirty="0" err="1"/>
+              <a:t>Frage</a:t>
+            </a:r>
+            <a:r>
+              <a:rPr lang="en-GB" dirty="0"/>
+              <a:t> </a:t>
+            </a:r>
+            <a:r>
+              <a:rPr lang="en-GB" dirty="0" err="1"/>
+              <a:t>gibt</a:t>
+            </a:r>
+            <a:r>
+              <a:rPr lang="en-GB" dirty="0"/>
+              <a:t> </a:t>
+            </a:r>
+            <a:r>
+              <a:rPr lang="en-GB" dirty="0" err="1"/>
+              <a:t>es</a:t>
+            </a:r>
+            <a:r>
+              <a:rPr lang="en-GB" dirty="0"/>
+              <a:t> </a:t>
+            </a:r>
+            <a:r>
+              <a:rPr lang="en-GB" dirty="0" err="1"/>
+              <a:t>meist</a:t>
+            </a:r>
+            <a:r>
+              <a:rPr lang="en-GB" dirty="0"/>
+              <a:t> </a:t>
+            </a:r>
+            <a:r>
+              <a:rPr lang="en-GB" dirty="0" err="1"/>
+              <a:t>schon</a:t>
+            </a:r>
+            <a:r>
+              <a:rPr lang="en-GB" dirty="0"/>
+              <a:t> </a:t>
+            </a:r>
+            <a:r>
+              <a:rPr lang="en-GB" dirty="0" err="1"/>
+              <a:t>eine</a:t>
+            </a:r>
+            <a:r>
+              <a:rPr lang="en-GB" dirty="0"/>
+              <a:t> API</a:t>
+            </a:r>
+          </a:p>
+          <a:p>
+            <a:pPr marL="171450" indent="-171450">
+              <a:buFontTx/>
+              <a:buChar char="-"/>
+            </a:pPr>
+            <a:r>
+              <a:rPr lang="en-GB" dirty="0" err="1"/>
+              <a:t>Mächtige</a:t>
+            </a:r>
+            <a:r>
+              <a:rPr lang="en-GB" dirty="0"/>
+              <a:t> </a:t>
+            </a:r>
+            <a:r>
+              <a:rPr lang="en-GB" dirty="0" err="1"/>
+              <a:t>Umgebung</a:t>
+            </a:r>
+            <a:r>
+              <a:rPr lang="en-GB" dirty="0"/>
+              <a:t> Firebase.</a:t>
+            </a:r>
+          </a:p>
+          <a:p>
+            <a:pPr marL="171450" indent="-171450">
+              <a:buFontTx/>
+              <a:buChar char="-"/>
+            </a:pPr>
+            <a:endParaRPr lang="en-GB" dirty="0"/>
+          </a:p>
+          <a:p>
+            <a:pPr marL="0" indent="0">
+              <a:buFontTx/>
+              <a:buNone/>
+            </a:pPr>
+            <a:r>
+              <a:rPr lang="en-GB" dirty="0" err="1"/>
+              <a:t>Zukünftig</a:t>
+            </a:r>
+            <a:r>
+              <a:rPr lang="en-GB" dirty="0"/>
+              <a:t> Work</a:t>
+            </a:r>
+          </a:p>
+          <a:p>
+            <a:pPr marL="171450" indent="-171450">
+              <a:buFontTx/>
+              <a:buChar char="-"/>
+            </a:pPr>
+            <a:r>
+              <a:rPr lang="en-GB" dirty="0"/>
+              <a:t>App </a:t>
+            </a:r>
+            <a:r>
+              <a:rPr lang="en-GB" dirty="0" err="1"/>
+              <a:t>mit</a:t>
+            </a:r>
+            <a:r>
+              <a:rPr lang="en-GB" dirty="0"/>
+              <a:t> </a:t>
+            </a:r>
+            <a:r>
+              <a:rPr lang="en-GB" dirty="0" err="1"/>
+              <a:t>Werbung</a:t>
+            </a:r>
+            <a:r>
+              <a:rPr lang="en-GB" dirty="0"/>
+              <a:t> </a:t>
+            </a:r>
+            <a:r>
+              <a:rPr lang="en-GB" dirty="0" err="1"/>
+              <a:t>versehen</a:t>
+            </a:r>
+            <a:r>
+              <a:rPr lang="en-GB" dirty="0"/>
+              <a:t>.</a:t>
+            </a:r>
+          </a:p>
+          <a:p>
+            <a:pPr marL="171450" indent="-171450">
+              <a:buFontTx/>
+              <a:buChar char="-"/>
+            </a:pPr>
+            <a:r>
+              <a:rPr lang="en-GB" dirty="0" err="1"/>
+              <a:t>Bezahlende</a:t>
+            </a:r>
+            <a:r>
+              <a:rPr lang="en-GB" dirty="0"/>
+              <a:t> </a:t>
+            </a:r>
+            <a:r>
+              <a:rPr lang="en-GB" dirty="0" err="1"/>
+              <a:t>Kunden</a:t>
+            </a:r>
+            <a:r>
+              <a:rPr lang="en-GB" dirty="0"/>
+              <a:t> (</a:t>
+            </a:r>
+            <a:r>
+              <a:rPr lang="en-GB" dirty="0" err="1"/>
+              <a:t>Skigebiete</a:t>
+            </a:r>
+            <a:r>
+              <a:rPr lang="en-GB" dirty="0"/>
+              <a:t>) warden </a:t>
+            </a:r>
+            <a:r>
+              <a:rPr lang="en-GB" dirty="0" err="1"/>
+              <a:t>Priorisiert</a:t>
+            </a:r>
+            <a:r>
+              <a:rPr lang="en-GB" dirty="0"/>
+              <a:t> </a:t>
+            </a:r>
+            <a:r>
+              <a:rPr lang="en-GB" dirty="0" err="1"/>
+              <a:t>angezeigt</a:t>
+            </a:r>
+            <a:endParaRPr lang="en-GB" dirty="0"/>
+          </a:p>
+          <a:p>
+            <a:pPr marL="171450" indent="-171450">
+              <a:buFontTx/>
+              <a:buChar char="-"/>
+            </a:pPr>
+            <a:r>
+              <a:rPr lang="en-GB" dirty="0" err="1"/>
+              <a:t>Filterfunktionen</a:t>
+            </a:r>
+            <a:r>
+              <a:rPr lang="en-GB" dirty="0"/>
+              <a:t> </a:t>
+            </a:r>
+            <a:r>
+              <a:rPr lang="en-GB" dirty="0" err="1"/>
+              <a:t>für</a:t>
+            </a:r>
+            <a:r>
+              <a:rPr lang="en-GB" dirty="0"/>
+              <a:t> </a:t>
+            </a:r>
+            <a:r>
+              <a:rPr lang="en-GB" dirty="0" err="1"/>
+              <a:t>benutzer</a:t>
+            </a:r>
+            <a:r>
+              <a:rPr lang="en-GB" dirty="0"/>
+              <a:t> </a:t>
+            </a:r>
+            <a:r>
+              <a:rPr lang="en-GB" dirty="0" err="1"/>
+              <a:t>einfügen</a:t>
+            </a:r>
+            <a:endParaRPr lang="en-GB" dirty="0"/>
+          </a:p>
+          <a:p>
+            <a:pPr marL="171450" indent="-171450">
+              <a:buFontTx/>
+              <a:buChar char="-"/>
+            </a:pPr>
+            <a:r>
+              <a:rPr lang="en-GB" dirty="0" err="1"/>
+              <a:t>Kostenpflichtige</a:t>
+            </a:r>
+            <a:r>
+              <a:rPr lang="en-GB" dirty="0"/>
+              <a:t> API </a:t>
+            </a:r>
+            <a:r>
+              <a:rPr lang="en-GB" dirty="0" err="1"/>
+              <a:t>einbinden</a:t>
+            </a:r>
+            <a:r>
+              <a:rPr lang="en-GB" dirty="0"/>
+              <a:t> -&gt; </a:t>
+            </a:r>
+            <a:r>
+              <a:rPr lang="en-GB" dirty="0" err="1"/>
+              <a:t>mehr</a:t>
+            </a:r>
+            <a:r>
+              <a:rPr lang="en-GB" dirty="0"/>
+              <a:t> </a:t>
+            </a:r>
+            <a:r>
+              <a:rPr lang="en-GB" dirty="0" err="1"/>
+              <a:t>Informationen</a:t>
+            </a:r>
+            <a:r>
+              <a:rPr lang="en-GB" dirty="0"/>
+              <a:t> und </a:t>
+            </a:r>
+            <a:r>
+              <a:rPr lang="en-GB" dirty="0" err="1"/>
+              <a:t>aktueller</a:t>
+            </a:r>
+            <a:endParaRPr lang="en-GB" dirty="0"/>
+          </a:p>
+          <a:p>
+            <a:pPr marL="171450" indent="-171450">
+              <a:buFontTx/>
+              <a:buChar char="-"/>
+            </a:pPr>
+            <a:endParaRPr lang="en-GB" dirty="0"/>
+          </a:p>
+        </p:txBody>
+      </p:sp>
+      <p:sp>
+        <p:nvSpPr>
+          <p:cNvPr id="4" name="Foliennummernplatzhalter 3"/>
+          <p:cNvSpPr>
+            <a:spLocks noGrp="1"/>
+          </p:cNvSpPr>
+          <p:nvPr>
+            <p:ph type="sldNum" sz="quarter" idx="10"/>
+          </p:nvPr>
+        </p:nvSpPr>
+        <p:spPr/>
+        <p:txBody>
+          <a:bodyPr/>
+          <a:lstStyle/>
+          <a:p>
+            <a:fld id="{748723F8-CD6B-45E3-B09A-75062809A4AE}" type="slidenum">
+              <a:rPr lang="en-GB" smtClean="0"/>
+              <a:t>15</a:t>
+            </a:fld>
+            <a:endParaRPr lang="en-GB"/>
+          </a:p>
+        </p:txBody>
+      </p:sp>
+    </p:spTree>
+    <p:extLst>
+      <p:ext uri="{BB962C8B-B14F-4D97-AF65-F5344CB8AC3E}">
+        <p14:creationId xmlns:p14="http://schemas.microsoft.com/office/powerpoint/2010/main" val="559276566"/>
+      </p:ext>
+    </p:extLst>
+  </p:cSld>
+  <p:clrMapOvr>
+    <a:masterClrMapping/>
+  </p:clrMapOvr>
+</p:notes>
+</file>
+
 <file path=ppt/notesSlides/notesSlide2.xml><?xml version="1.0" encoding="utf-8"?>
 <p:notes xmlns:a="http://schemas.openxmlformats.org/drawingml/2006/main" xmlns:r="http://schemas.openxmlformats.org/officeDocument/2006/relationships" xmlns:p="http://schemas.openxmlformats.org/presentationml/2006/main">
   <p:cSld>
@@ -1909,15 +2367,10 @@
           <a:bodyPr/>
           <a:lstStyle/>
           <a:p>
-            <a:pPr marL="0" indent="0">
-              <a:buFontTx/>
-              <a:buNone/>
-            </a:pPr>
-            <a:r>
-              <a:rPr lang="en-GB" dirty="0" err="1"/>
-              <a:t>SonarQube</a:t>
-            </a:r>
-            <a:endParaRPr lang="en-GB" dirty="0"/>
+            <a:r>
+              <a:rPr lang="en-GB" dirty="0"/>
+              <a:t>JUnit Test</a:t>
+            </a:r>
           </a:p>
           <a:p>
             <a:pPr marL="171450" indent="-171450">
@@ -1925,8 +2378,28 @@
               <a:buChar char="-"/>
             </a:pPr>
             <a:r>
-              <a:rPr lang="en-GB" dirty="0" err="1"/>
-              <a:t>Einige</a:t>
+              <a:rPr lang="en-GB" dirty="0"/>
+              <a:t>Test der </a:t>
+            </a:r>
+            <a:r>
+              <a:rPr lang="en-GB" dirty="0" err="1"/>
+              <a:t>Sortierungen</a:t>
+            </a:r>
+            <a:r>
+              <a:rPr lang="en-GB" dirty="0"/>
+              <a:t> -&gt; </a:t>
+            </a:r>
+            <a:r>
+              <a:rPr lang="en-GB" dirty="0" err="1"/>
+              <a:t>Distanz</a:t>
+            </a:r>
+            <a:r>
+              <a:rPr lang="en-GB" dirty="0"/>
+              <a:t>, Wetter, Status, </a:t>
+            </a:r>
+            <a:r>
+              <a:rPr lang="en-GB" dirty="0" err="1"/>
+              <a:t>Geöffneten</a:t>
             </a:r>
             <a:r>
               <a:rPr lang="en-GB" dirty="0"/>
@@ -1934,39 +2407,15 @@
             </a:r>
             <a:r>
               <a:rPr lang="en-GB" dirty="0" err="1"/>
-              <a:t>Punkte</a:t>
-            </a:r>
-            <a:r>
-              <a:rPr lang="en-GB" dirty="0"/>
-              <a:t> </a:t>
-            </a:r>
-            <a:r>
-              <a:rPr lang="en-GB" dirty="0" err="1"/>
-              <a:t>können</a:t>
-            </a:r>
-            <a:r>
-              <a:rPr lang="en-GB" dirty="0"/>
-              <a:t> </a:t>
-            </a:r>
-            <a:r>
-              <a:rPr lang="en-GB" dirty="0" err="1"/>
-              <a:t>nicht</a:t>
-            </a:r>
-            <a:r>
-              <a:rPr lang="en-GB" dirty="0"/>
-              <a:t> </a:t>
-            </a:r>
-            <a:r>
-              <a:rPr lang="en-GB" dirty="0" err="1"/>
-              <a:t>gefixt</a:t>
-            </a:r>
-            <a:r>
-              <a:rPr lang="en-GB" dirty="0"/>
-              <a:t> </a:t>
-            </a:r>
-            <a:r>
-              <a:rPr lang="en-GB"/>
-              <a:t>werden</a:t>
+              <a:t>Pisten</a:t>
+            </a:r>
+            <a:r>
+              <a:rPr lang="en-GB" dirty="0"/>
+              <a:t> und </a:t>
+            </a:r>
+            <a:r>
+              <a:rPr lang="en-GB" dirty="0" err="1"/>
+              <a:t>Lifte</a:t>
             </a:r>
             <a:endParaRPr lang="en-GB" dirty="0"/>
           </a:p>
@@ -1977,15 +2426,15 @@
             </a:pPr>
             <a:r>
               <a:rPr lang="en-GB" dirty="0" err="1"/>
-              <a:t>Bsp</a:t>
-            </a:r>
-            <a:r>
-              <a:rPr lang="en-GB" dirty="0"/>
-              <a:t>: </a:t>
-            </a:r>
-            <a:r>
-              <a:rPr lang="en-GB" dirty="0" err="1"/>
-              <a:t>Enum</a:t>
+              <a:t>Serializierung</a:t>
+            </a:r>
+            <a:r>
+              <a:rPr lang="en-GB" dirty="0"/>
+              <a:t> und </a:t>
+            </a:r>
+            <a:r>
+              <a:rPr lang="en-GB" dirty="0" err="1"/>
+              <a:t>Deserializierung</a:t>
             </a:r>
             <a:r>
               <a:rPr lang="en-GB" dirty="0"/>
@@ -1993,15 +2442,7 @@
             </a:r>
             <a:r>
               <a:rPr lang="en-GB" dirty="0" err="1"/>
-              <a:t>müssen</a:t>
-            </a:r>
-            <a:r>
-              <a:rPr lang="en-GB" dirty="0"/>
-              <a:t> Gross </a:t>
-            </a:r>
-            <a:r>
-              <a:rPr lang="en-GB" dirty="0" err="1"/>
-              <a:t>geschreiben</a:t>
+              <a:t>mittels</a:t>
             </a:r>
             <a:r>
               <a:rPr lang="en-GB" dirty="0"/>
@@ -2009,23 +2450,15 @@
             </a:r>
             <a:r>
               <a:rPr lang="en-GB" dirty="0" err="1"/>
-              <a:t>werden</a:t>
-            </a:r>
-            <a:r>
-              <a:rPr lang="en-GB" dirty="0"/>
-              <a:t>, </a:t>
-            </a:r>
-            <a:r>
-              <a:rPr lang="en-GB" dirty="0" err="1"/>
-              <a:t>jedoch</a:t>
-            </a:r>
-            <a:r>
-              <a:rPr lang="en-GB" dirty="0"/>
-              <a:t> die API </a:t>
-            </a:r>
-            <a:r>
-              <a:rPr lang="en-GB" dirty="0" err="1"/>
-              <a:t>benutzt</a:t>
+              <a:t>GSon</a:t>
+            </a:r>
+            <a:r>
+              <a:rPr lang="en-GB" dirty="0"/>
+              <a:t>. </a:t>
+            </a:r>
+            <a:r>
+              <a:rPr lang="en-GB" dirty="0" err="1"/>
+              <a:t>Benötigt</a:t>
             </a:r>
             <a:r>
               <a:rPr lang="en-GB" dirty="0"/>
@@ -2033,7 +2466,7 @@
             </a:r>
             <a:r>
               <a:rPr lang="en-GB" dirty="0" err="1"/>
-              <a:t>andere</a:t>
+              <a:t>beim</a:t>
             </a:r>
             <a:r>
               <a:rPr lang="en-GB" dirty="0"/>
@@ -2041,94 +2474,27 @@
             </a:r>
             <a:r>
               <a:rPr lang="en-GB" dirty="0" err="1"/>
-              <a:t>Schreibweise</a:t>
-            </a:r>
-            <a:r>
-              <a:rPr lang="en-GB" dirty="0"/>
-              <a:t> und </a:t>
-            </a:r>
-            <a:r>
-              <a:rPr lang="en-GB" dirty="0" err="1"/>
-              <a:t>wäre</a:t>
-            </a:r>
-            <a:r>
-              <a:rPr lang="en-GB" dirty="0"/>
-              <a:t> </a:t>
-            </a:r>
-            <a:r>
-              <a:rPr lang="en-GB" dirty="0" err="1"/>
-              <a:t>somit</a:t>
-            </a:r>
-            <a:r>
-              <a:rPr lang="en-GB" dirty="0"/>
-              <a:t> </a:t>
-            </a:r>
-            <a:r>
-              <a:rPr lang="en-GB" dirty="0" err="1"/>
-              <a:t>nicht</a:t>
-            </a:r>
-            <a:r>
-              <a:rPr lang="en-GB" dirty="0"/>
-              <a:t> </a:t>
-            </a:r>
-            <a:r>
-              <a:rPr lang="en-GB" dirty="0" err="1"/>
-              <a:t>kompatibel</a:t>
-            </a:r>
-            <a:endParaRPr lang="en-GB" dirty="0"/>
-          </a:p>
-          <a:p>
-            <a:pPr marL="171450" indent="-171450">
-              <a:buFontTx/>
-              <a:buChar char="-"/>
-            </a:pPr>
-            <a:r>
-              <a:rPr lang="en-GB" dirty="0" err="1"/>
-              <a:t>Einige</a:t>
-            </a:r>
-            <a:r>
-              <a:rPr lang="en-GB" dirty="0"/>
-              <a:t> Android Klassen </a:t>
-            </a:r>
-            <a:r>
-              <a:rPr lang="en-GB" dirty="0" err="1"/>
-              <a:t>haben</a:t>
-            </a:r>
-            <a:r>
-              <a:rPr lang="en-GB" dirty="0"/>
-              <a:t> </a:t>
-            </a:r>
-            <a:r>
-              <a:rPr lang="en-GB" dirty="0" err="1"/>
-              <a:t>schon</a:t>
-            </a:r>
-            <a:r>
-              <a:rPr lang="en-GB" dirty="0"/>
-              <a:t> </a:t>
-            </a:r>
-            <a:r>
-              <a:rPr lang="en-GB" dirty="0" err="1"/>
-              <a:t>mehr</a:t>
-            </a:r>
-            <a:r>
-              <a:rPr lang="en-GB" dirty="0"/>
-              <a:t> </a:t>
-            </a:r>
-            <a:r>
-              <a:rPr lang="en-GB" dirty="0" err="1"/>
-              <a:t>als</a:t>
-            </a:r>
-            <a:r>
-              <a:rPr lang="en-GB" dirty="0"/>
-              <a:t> 5 </a:t>
-            </a:r>
-            <a:r>
-              <a:rPr lang="en-GB" dirty="0" err="1"/>
-              <a:t>Vererbungen</a:t>
-            </a:r>
-            <a:r>
-              <a:rPr lang="en-GB" dirty="0"/>
-              <a:t>.</a:t>
+              <a:t>Empfangen</a:t>
+            </a:r>
+            <a:r>
+              <a:rPr lang="en-GB" dirty="0"/>
+              <a:t> von </a:t>
+            </a:r>
+            <a:r>
+              <a:rPr lang="en-GB" dirty="0" err="1"/>
+              <a:t>Daten</a:t>
+            </a:r>
+            <a:r>
+              <a:rPr lang="en-GB" dirty="0"/>
+              <a:t> der </a:t>
+            </a:r>
+            <a:r>
+              <a:rPr lang="en-GB" dirty="0" err="1"/>
+              <a:t>beiden</a:t>
+            </a:r>
+            <a:r>
+              <a:rPr lang="en-GB" dirty="0"/>
+              <a:t> API’s</a:t>
             </a:r>
           </a:p>
           <a:p>
@@ -2139,7 +2505,378 @@
             <a:endParaRPr lang="en-GB" dirty="0"/>
           </a:p>
           <a:p>
-            <a:endParaRPr lang="de-CH" dirty="0"/>
+            <a:pPr marL="0" indent="0">
+              <a:buFontTx/>
+              <a:buNone/>
+            </a:pPr>
+            <a:r>
+              <a:rPr lang="en-GB" dirty="0"/>
+              <a:t>Code Coverage</a:t>
+            </a:r>
+          </a:p>
+          <a:p>
+            <a:pPr marL="171450" indent="-171450">
+              <a:buFontTx/>
+              <a:buChar char="-"/>
+            </a:pPr>
+            <a:r>
+              <a:rPr lang="en-GB" dirty="0" err="1"/>
+              <a:t>Aktuell</a:t>
+            </a:r>
+            <a:r>
+              <a:rPr lang="en-GB" dirty="0"/>
+              <a:t> </a:t>
+            </a:r>
+            <a:r>
+              <a:rPr lang="en-GB" dirty="0" err="1"/>
+              <a:t>bei</a:t>
+            </a:r>
+            <a:r>
+              <a:rPr lang="en-GB" dirty="0"/>
+              <a:t> ca 30%</a:t>
+            </a:r>
+          </a:p>
+          <a:p>
+            <a:pPr marL="171450" indent="-171450">
+              <a:buFontTx/>
+              <a:buChar char="-"/>
+            </a:pPr>
+            <a:endParaRPr lang="en-GB" dirty="0"/>
+          </a:p>
+          <a:p>
+            <a:pPr marL="0" indent="0">
+              <a:buFontTx/>
+              <a:buNone/>
+            </a:pPr>
+            <a:r>
+              <a:rPr lang="en-GB" dirty="0" err="1"/>
+              <a:t>SonarQube</a:t>
+            </a:r>
+            <a:endParaRPr lang="en-GB" dirty="0"/>
+          </a:p>
+          <a:p>
+            <a:pPr marL="171450" indent="-171450">
+              <a:buFontTx/>
+              <a:buChar char="-"/>
+            </a:pPr>
+            <a:r>
+              <a:rPr lang="en-GB" dirty="0" err="1"/>
+              <a:t>Einige</a:t>
+            </a:r>
+            <a:r>
+              <a:rPr lang="en-GB" dirty="0"/>
+              <a:t> </a:t>
+            </a:r>
+            <a:r>
+              <a:rPr lang="en-GB" dirty="0" err="1"/>
+              <a:t>Punkte</a:t>
+            </a:r>
+            <a:r>
+              <a:rPr lang="en-GB" dirty="0"/>
+              <a:t> </a:t>
+            </a:r>
+            <a:r>
+              <a:rPr lang="en-GB" dirty="0" err="1"/>
+              <a:t>können</a:t>
+            </a:r>
+            <a:r>
+              <a:rPr lang="en-GB" dirty="0"/>
+              <a:t> </a:t>
+            </a:r>
+            <a:r>
+              <a:rPr lang="en-GB" dirty="0" err="1"/>
+              <a:t>nicht</a:t>
+            </a:r>
+            <a:r>
+              <a:rPr lang="en-GB" dirty="0"/>
+              <a:t> </a:t>
+            </a:r>
+            <a:r>
+              <a:rPr lang="en-GB" dirty="0" err="1"/>
+              <a:t>gefixt</a:t>
+            </a:r>
+            <a:r>
+              <a:rPr lang="en-GB" dirty="0"/>
+              <a:t> warden</a:t>
+            </a:r>
+          </a:p>
+          <a:p>
+            <a:pPr marL="171450" indent="-171450">
+              <a:buFontTx/>
+              <a:buChar char="-"/>
+            </a:pPr>
+            <a:r>
+              <a:rPr lang="en-GB" dirty="0" err="1"/>
+              <a:t>Bsp</a:t>
+            </a:r>
+            <a:r>
+              <a:rPr lang="en-GB" dirty="0"/>
+              <a:t>: </a:t>
+            </a:r>
+            <a:r>
+              <a:rPr lang="en-GB" dirty="0" err="1"/>
+              <a:t>Enum</a:t>
+            </a:r>
+            <a:r>
+              <a:rPr lang="en-GB" dirty="0"/>
+              <a:t> </a:t>
+            </a:r>
+            <a:r>
+              <a:rPr lang="en-GB" dirty="0" err="1"/>
+              <a:t>müssen</a:t>
+            </a:r>
+            <a:r>
+              <a:rPr lang="en-GB" dirty="0"/>
+              <a:t> Gross </a:t>
+            </a:r>
+            <a:r>
+              <a:rPr lang="en-GB" dirty="0" err="1"/>
+              <a:t>geschreiben</a:t>
+            </a:r>
+            <a:r>
+              <a:rPr lang="en-GB" dirty="0"/>
+              <a:t> </a:t>
+            </a:r>
+            <a:r>
+              <a:rPr lang="en-GB" dirty="0" err="1"/>
+              <a:t>werden</a:t>
+            </a:r>
+            <a:r>
+              <a:rPr lang="en-GB" dirty="0"/>
+              <a:t>, </a:t>
+            </a:r>
+            <a:r>
+              <a:rPr lang="en-GB" dirty="0" err="1"/>
+              <a:t>jedoch</a:t>
+            </a:r>
+            <a:r>
+              <a:rPr lang="en-GB" dirty="0"/>
+              <a:t> die API </a:t>
+            </a:r>
+            <a:r>
+              <a:rPr lang="en-GB" dirty="0" err="1"/>
+              <a:t>benutzt</a:t>
+            </a:r>
+            <a:r>
+              <a:rPr lang="en-GB" dirty="0"/>
+              <a:t> </a:t>
+            </a:r>
+            <a:r>
+              <a:rPr lang="en-GB" dirty="0" err="1"/>
+              <a:t>andere</a:t>
+            </a:r>
+            <a:r>
+              <a:rPr lang="en-GB" dirty="0"/>
+              <a:t> </a:t>
+            </a:r>
+            <a:r>
+              <a:rPr lang="en-GB" dirty="0" err="1"/>
+              <a:t>Schreibweise</a:t>
+            </a:r>
+            <a:r>
+              <a:rPr lang="en-GB" dirty="0"/>
+              <a:t> und </a:t>
+            </a:r>
+            <a:r>
+              <a:rPr lang="en-GB" dirty="0" err="1"/>
+              <a:t>wäre</a:t>
+            </a:r>
+            <a:r>
+              <a:rPr lang="en-GB" dirty="0"/>
+              <a:t> </a:t>
+            </a:r>
+            <a:r>
+              <a:rPr lang="en-GB" dirty="0" err="1"/>
+              <a:t>somit</a:t>
+            </a:r>
+            <a:r>
+              <a:rPr lang="en-GB" dirty="0"/>
+              <a:t> </a:t>
+            </a:r>
+            <a:r>
+              <a:rPr lang="en-GB" dirty="0" err="1"/>
+              <a:t>nicht</a:t>
+            </a:r>
+            <a:r>
+              <a:rPr lang="en-GB" dirty="0"/>
+              <a:t> </a:t>
+            </a:r>
+            <a:r>
+              <a:rPr lang="en-GB" dirty="0" err="1"/>
+              <a:t>kompatibel</a:t>
+            </a:r>
+            <a:endParaRPr lang="en-GB" dirty="0"/>
+          </a:p>
+          <a:p>
+            <a:pPr marL="171450" indent="-171450">
+              <a:buFontTx/>
+              <a:buChar char="-"/>
+            </a:pPr>
+            <a:r>
+              <a:rPr lang="en-GB" dirty="0" err="1"/>
+              <a:t>Einige</a:t>
+            </a:r>
+            <a:r>
+              <a:rPr lang="en-GB" dirty="0"/>
+              <a:t> Android Klassen </a:t>
+            </a:r>
+            <a:r>
+              <a:rPr lang="en-GB" dirty="0" err="1"/>
+              <a:t>haben</a:t>
+            </a:r>
+            <a:r>
+              <a:rPr lang="en-GB" dirty="0"/>
+              <a:t> </a:t>
+            </a:r>
+            <a:r>
+              <a:rPr lang="en-GB" dirty="0" err="1"/>
+              <a:t>schon</a:t>
+            </a:r>
+            <a:r>
+              <a:rPr lang="en-GB" dirty="0"/>
+              <a:t> </a:t>
+            </a:r>
+            <a:r>
+              <a:rPr lang="en-GB" dirty="0" err="1"/>
+              <a:t>mehr</a:t>
+            </a:r>
+            <a:r>
+              <a:rPr lang="en-GB" dirty="0"/>
+              <a:t> </a:t>
+            </a:r>
+            <a:r>
+              <a:rPr lang="en-GB" dirty="0" err="1"/>
+              <a:t>als</a:t>
+            </a:r>
+            <a:r>
+              <a:rPr lang="en-GB" dirty="0"/>
+              <a:t> 5 </a:t>
+            </a:r>
+            <a:r>
+              <a:rPr lang="en-GB" dirty="0" err="1"/>
+              <a:t>Vererbungen</a:t>
+            </a:r>
+            <a:r>
+              <a:rPr lang="en-GB" dirty="0"/>
+              <a:t>.</a:t>
+            </a:r>
+          </a:p>
+          <a:p>
+            <a:pPr marL="0" indent="0">
+              <a:buFontTx/>
+              <a:buNone/>
+            </a:pPr>
+            <a:endParaRPr lang="en-GB" dirty="0"/>
+          </a:p>
+          <a:p>
+            <a:pPr marL="0" indent="0">
+              <a:buFontTx/>
+              <a:buNone/>
+            </a:pPr>
+            <a:r>
+              <a:rPr lang="en-GB" dirty="0"/>
+              <a:t>Monkey-Test</a:t>
+            </a:r>
+          </a:p>
+          <a:p>
+            <a:pPr marL="171450" indent="-171450">
+              <a:buFontTx/>
+              <a:buChar char="-"/>
+            </a:pPr>
+            <a:r>
+              <a:rPr lang="en-GB" dirty="0" err="1"/>
+              <a:t>Zum</a:t>
+            </a:r>
+            <a:r>
+              <a:rPr lang="en-GB" dirty="0"/>
+              <a:t> </a:t>
+            </a:r>
+            <a:r>
+              <a:rPr lang="en-GB" dirty="0" err="1"/>
+              <a:t>Testen</a:t>
+            </a:r>
+            <a:r>
+              <a:rPr lang="en-GB" dirty="0"/>
+              <a:t> der </a:t>
+            </a:r>
+            <a:r>
+              <a:rPr lang="en-GB" dirty="0" err="1"/>
+              <a:t>Stabilität</a:t>
+            </a:r>
+            <a:r>
+              <a:rPr lang="en-GB" dirty="0"/>
+              <a:t>. In ADB (Android Debugging Bridge) </a:t>
+            </a:r>
+            <a:r>
+              <a:rPr lang="en-GB" dirty="0" err="1"/>
+              <a:t>integriert</a:t>
+            </a:r>
+            <a:r>
+              <a:rPr lang="en-GB" dirty="0"/>
+              <a:t>.</a:t>
+            </a:r>
+          </a:p>
+          <a:p>
+            <a:pPr marL="171450" indent="-171450">
+              <a:buFontTx/>
+              <a:buChar char="-"/>
+            </a:pPr>
+            <a:r>
+              <a:rPr lang="en-GB" dirty="0" err="1"/>
+              <a:t>Macht</a:t>
+            </a:r>
+            <a:r>
+              <a:rPr lang="en-GB" dirty="0"/>
+              <a:t> pseudo Random </a:t>
+            </a:r>
+            <a:r>
+              <a:rPr lang="en-GB" dirty="0" err="1"/>
+              <a:t>Interaktionen</a:t>
+            </a:r>
+            <a:r>
+              <a:rPr lang="en-GB" dirty="0"/>
+              <a:t> </a:t>
+            </a:r>
+            <a:r>
+              <a:rPr lang="en-GB" dirty="0" err="1"/>
+              <a:t>mit</a:t>
+            </a:r>
+            <a:r>
+              <a:rPr lang="en-GB" dirty="0"/>
+              <a:t> </a:t>
+            </a:r>
+            <a:r>
+              <a:rPr lang="en-GB" dirty="0" err="1"/>
+              <a:t>dem</a:t>
+            </a:r>
+            <a:r>
+              <a:rPr lang="en-GB" dirty="0"/>
+              <a:t> Device. </a:t>
+            </a:r>
+            <a:r>
+              <a:rPr lang="en-GB" dirty="0" err="1"/>
+              <a:t>Guten</a:t>
+            </a:r>
+            <a:r>
+              <a:rPr lang="en-GB" dirty="0"/>
+              <a:t> Test </a:t>
+            </a:r>
+            <a:r>
+              <a:rPr lang="en-GB" dirty="0" err="1"/>
+              <a:t>für</a:t>
+            </a:r>
+            <a:r>
+              <a:rPr lang="en-GB" dirty="0"/>
+              <a:t> </a:t>
+            </a:r>
+            <a:r>
+              <a:rPr lang="en-GB" dirty="0" err="1"/>
+              <a:t>Stabilität</a:t>
+            </a:r>
+            <a:r>
+              <a:rPr lang="en-GB" dirty="0"/>
+              <a:t> der App</a:t>
+            </a:r>
           </a:p>
         </p:txBody>
       </p:sp>
@@ -2169,7 +2906,7 @@
     </p:spTree>
     <p:extLst>
       <p:ext uri="{BB962C8B-B14F-4D97-AF65-F5344CB8AC3E}">
-        <p14:creationId xmlns:p14="http://schemas.microsoft.com/office/powerpoint/2010/main" val="3608739263"/>
+        <p14:creationId xmlns:p14="http://schemas.microsoft.com/office/powerpoint/2010/main" val="4250532794"/>
       </p:ext>
     </p:extLst>
   </p:cSld>
@@ -2223,9 +2960,13 @@
           <a:bodyPr/>
           <a:lstStyle/>
           <a:p>
-            <a:r>
-              <a:rPr lang="en-GB" dirty="0" err="1"/>
-              <a:t>Zusammenfassung</a:t>
+            <a:pPr marL="0" indent="0">
+              <a:buFontTx/>
+              <a:buNone/>
+            </a:pPr>
+            <a:r>
+              <a:rPr lang="en-GB" dirty="0" err="1"/>
+              <a:t>SonarQube</a:t>
             </a:r>
             <a:endParaRPr lang="en-GB" dirty="0"/>
           </a:p>
@@ -2235,12 +2976,8 @@
               <a:buChar char="-"/>
             </a:pPr>
             <a:r>
-              <a:rPr lang="en-GB" dirty="0"/>
-              <a:t>Zu </a:t>
-            </a:r>
-            <a:r>
-              <a:rPr lang="en-GB" dirty="0" err="1"/>
-              <a:t>wenig</a:t>
+              <a:rPr lang="en-GB" dirty="0" err="1"/>
+              <a:t>Einige</a:t>
             </a:r>
             <a:r>
               <a:rPr lang="en-GB" dirty="0"/>
@@ -2248,28 +2985,41 @@
             </a:r>
             <a:r>
               <a:rPr lang="en-GB" dirty="0" err="1"/>
-              <a:t>zeit</a:t>
-            </a:r>
-            <a:r>
-              <a:rPr lang="en-GB" dirty="0"/>
-              <a:t> in in </a:t>
-            </a:r>
-            <a:r>
-              <a:rPr lang="en-GB" dirty="0" err="1"/>
-              <a:t>Projekten</a:t>
-            </a:r>
-            <a:r>
-              <a:rPr lang="en-GB" dirty="0"/>
-              <a:t> so </a:t>
-            </a:r>
-            <a:r>
-              <a:rPr lang="en-GB" dirty="0" err="1"/>
-              <a:t>üblich</a:t>
-            </a:r>
-            <a:r>
-              <a:rPr lang="en-GB" dirty="0"/>
-              <a:t> ;-)</a:t>
-            </a:r>
+              <a:t>Punkte</a:t>
+            </a:r>
+            <a:r>
+              <a:rPr lang="en-GB" dirty="0"/>
+              <a:t> </a:t>
+            </a:r>
+            <a:r>
+              <a:rPr lang="en-GB" dirty="0" err="1"/>
+              <a:t>können</a:t>
+            </a:r>
+            <a:r>
+              <a:rPr lang="en-GB" dirty="0"/>
+              <a:t> </a:t>
+            </a:r>
+            <a:r>
+              <a:rPr lang="en-GB" dirty="0" err="1"/>
+              <a:t>nicht</a:t>
+            </a:r>
+            <a:r>
+              <a:rPr lang="en-GB" dirty="0"/>
+              <a:t> </a:t>
+            </a:r>
+            <a:r>
+              <a:rPr lang="en-GB" dirty="0" err="1"/>
+              <a:t>gefixt</a:t>
+            </a:r>
+            <a:r>
+              <a:rPr lang="en-GB" dirty="0"/>
+              <a:t> </a:t>
+            </a:r>
+            <a:r>
+              <a:rPr lang="en-GB"/>
+              <a:t>werden</a:t>
+            </a:r>
+            <a:endParaRPr lang="en-GB" dirty="0"/>
           </a:p>
           <a:p>
             <a:pPr marL="171450" indent="-171450">
@@ -2277,12 +3027,16 @@
               <a:buChar char="-"/>
             </a:pPr>
             <a:r>
-              <a:rPr lang="en-GB" dirty="0"/>
-              <a:t>Android </a:t>
-            </a:r>
-            <a:r>
-              <a:rPr lang="en-GB" dirty="0" err="1"/>
-              <a:t>Umgebung</a:t>
+              <a:rPr lang="en-GB" dirty="0" err="1"/>
+              <a:t>Bsp</a:t>
+            </a:r>
+            <a:r>
+              <a:rPr lang="en-GB" dirty="0"/>
+              <a:t>: </a:t>
+            </a:r>
+            <a:r>
+              <a:rPr lang="en-GB" dirty="0" err="1"/>
+              <a:t>Enum</a:t>
             </a:r>
             <a:r>
               <a:rPr lang="en-GB" dirty="0"/>
@@ -2290,7 +3044,15 @@
             </a:r>
             <a:r>
               <a:rPr lang="en-GB" dirty="0" err="1"/>
-              <a:t>besser</a:t>
+              <a:t>müssen</a:t>
+            </a:r>
+            <a:r>
+              <a:rPr lang="en-GB" dirty="0"/>
+              <a:t> Gross </a:t>
+            </a:r>
+            <a:r>
+              <a:rPr lang="en-GB" dirty="0" err="1"/>
+              <a:t>geschreiben</a:t>
             </a:r>
             <a:r>
               <a:rPr lang="en-GB" dirty="0"/>
@@ -2298,12 +3060,73 @@
             </a:r>
             <a:r>
               <a:rPr lang="en-GB" dirty="0" err="1"/>
-              <a:t>kennengelern</a:t>
-            </a:r>
-            <a:r>
-              <a:rPr lang="en-GB" dirty="0"/>
-              <a:t>.</a:t>
-            </a:r>
+              <a:t>werden</a:t>
+            </a:r>
+            <a:r>
+              <a:rPr lang="en-GB" dirty="0"/>
+              <a:t>, </a:t>
+            </a:r>
+            <a:r>
+              <a:rPr lang="en-GB" dirty="0" err="1"/>
+              <a:t>jedoch</a:t>
+            </a:r>
+            <a:r>
+              <a:rPr lang="en-GB" dirty="0"/>
+              <a:t> die API </a:t>
+            </a:r>
+            <a:r>
+              <a:rPr lang="en-GB" dirty="0" err="1"/>
+              <a:t>benutzt</a:t>
+            </a:r>
+            <a:r>
+              <a:rPr lang="en-GB" dirty="0"/>
+              <a:t> </a:t>
+            </a:r>
+            <a:r>
+              <a:rPr lang="en-GB" dirty="0" err="1"/>
+              <a:t>andere</a:t>
+            </a:r>
+            <a:r>
+              <a:rPr lang="en-GB" dirty="0"/>
+              <a:t> </a:t>
+            </a:r>
+            <a:r>
+              <a:rPr lang="en-GB" dirty="0" err="1"/>
+              <a:t>Schreibweise</a:t>
+            </a:r>
+            <a:r>
+              <a:rPr lang="en-GB" dirty="0"/>
+              <a:t> und </a:t>
+            </a:r>
+            <a:r>
+              <a:rPr lang="en-GB" dirty="0" err="1"/>
+              <a:t>wäre</a:t>
+            </a:r>
+            <a:r>
+              <a:rPr lang="en-GB" dirty="0"/>
+              <a:t> </a:t>
+            </a:r>
+            <a:r>
+              <a:rPr lang="en-GB" dirty="0" err="1"/>
+              <a:t>somit</a:t>
+            </a:r>
+            <a:r>
+              <a:rPr lang="en-GB" dirty="0"/>
+              <a:t> </a:t>
+            </a:r>
+            <a:r>
+              <a:rPr lang="en-GB" dirty="0" err="1"/>
+              <a:t>nicht</a:t>
+            </a:r>
+            <a:r>
+              <a:rPr lang="en-GB" dirty="0"/>
+              <a:t> </a:t>
+            </a:r>
+            <a:r>
+              <a:rPr lang="en-GB" dirty="0" err="1"/>
+              <a:t>kompatibel</a:t>
+            </a:r>
+            <a:endParaRPr lang="en-GB" dirty="0"/>
           </a:p>
           <a:p>
             <a:pPr marL="171450" indent="-171450">
@@ -2312,23 +3135,15 @@
             </a:pPr>
             <a:r>
               <a:rPr lang="en-GB" dirty="0" err="1"/>
-              <a:t>Unzählige</a:t>
-            </a:r>
-            <a:r>
-              <a:rPr lang="en-GB" dirty="0"/>
-              <a:t> Tools und </a:t>
-            </a:r>
-            <a:r>
-              <a:rPr lang="en-GB" dirty="0" err="1"/>
-              <a:t>Bibliotheken</a:t>
-            </a:r>
-            <a:r>
-              <a:rPr lang="en-GB" dirty="0"/>
-              <a:t>. </a:t>
-            </a:r>
-            <a:r>
-              <a:rPr lang="en-GB" dirty="0" err="1"/>
-              <a:t>Für</a:t>
+              <a:t>Einige</a:t>
+            </a:r>
+            <a:r>
+              <a:rPr lang="en-GB" dirty="0"/>
+              <a:t> Android Klassen </a:t>
+            </a:r>
+            <a:r>
+              <a:rPr lang="en-GB" dirty="0" err="1"/>
+              <a:t>haben</a:t>
             </a:r>
             <a:r>
               <a:rPr lang="en-GB" dirty="0"/>
@@ -2336,7 +3151,7 @@
             </a:r>
             <a:r>
               <a:rPr lang="en-GB" dirty="0" err="1"/>
-              <a:t>jede</a:t>
+              <a:t>schon</a:t>
             </a:r>
             <a:r>
               <a:rPr lang="en-GB" dirty="0"/>
@@ -2344,7 +3159,7 @@
             </a:r>
             <a:r>
               <a:rPr lang="en-GB" dirty="0" err="1"/>
-              <a:t>Frage</a:t>
+              <a:t>mehr</a:t>
             </a:r>
             <a:r>
               <a:rPr lang="en-GB" dirty="0"/>
@@ -2352,249 +3167,30 @@
             </a:r>
             <a:r>
               <a:rPr lang="en-GB" dirty="0" err="1"/>
-              <a:t>gibt</a:t>
-            </a:r>
-            <a:r>
-              <a:rPr lang="en-GB" dirty="0"/>
-              <a:t> </a:t>
-            </a:r>
-            <a:r>
-              <a:rPr lang="en-GB" dirty="0" err="1"/>
-              <a:t>es</a:t>
-            </a:r>
-            <a:r>
-              <a:rPr lang="en-GB" dirty="0"/>
-              <a:t> </a:t>
-            </a:r>
-            <a:r>
-              <a:rPr lang="en-GB" dirty="0" err="1"/>
-              <a:t>meist</a:t>
-            </a:r>
-            <a:r>
-              <a:rPr lang="en-GB" dirty="0"/>
-              <a:t> </a:t>
-            </a:r>
-            <a:r>
-              <a:rPr lang="en-GB" dirty="0" err="1"/>
-              <a:t>schon</a:t>
-            </a:r>
-            <a:r>
-              <a:rPr lang="en-GB" dirty="0"/>
-              <a:t> </a:t>
-            </a:r>
-            <a:r>
-              <a:rPr lang="en-GB" dirty="0" err="1"/>
-              <a:t>eine</a:t>
-            </a:r>
-            <a:r>
-              <a:rPr lang="en-GB" dirty="0"/>
-              <a:t> API</a:t>
-            </a:r>
-          </a:p>
-          <a:p>
-            <a:pPr marL="171450" indent="-171450">
-              <a:buFontTx/>
-              <a:buChar char="-"/>
-            </a:pPr>
-            <a:r>
-              <a:rPr lang="en-GB" dirty="0" err="1"/>
-              <a:t>Mächtige</a:t>
-            </a:r>
-            <a:r>
-              <a:rPr lang="en-GB" dirty="0"/>
-              <a:t> </a:t>
-            </a:r>
-            <a:r>
-              <a:rPr lang="en-GB" dirty="0" err="1"/>
-              <a:t>Umgebung</a:t>
-            </a:r>
-            <a:r>
-              <a:rPr lang="en-GB" dirty="0"/>
-              <a:t> Firebase.</a:t>
-            </a:r>
-          </a:p>
-          <a:p>
-            <a:pPr marL="171450" indent="-171450">
-              <a:buFontTx/>
-              <a:buChar char="-"/>
-            </a:pPr>
-            <a:endParaRPr lang="en-GB" dirty="0"/>
+              <a:t>als</a:t>
+            </a:r>
+            <a:r>
+              <a:rPr lang="en-GB" dirty="0"/>
+              <a:t> 5 </a:t>
+            </a:r>
+            <a:r>
+              <a:rPr lang="en-GB" dirty="0" err="1"/>
+              <a:t>Vererbungen</a:t>
+            </a:r>
+            <a:r>
+              <a:rPr lang="en-GB" dirty="0"/>
+              <a:t>.</a:t>
+            </a:r>
           </a:p>
           <a:p>
             <a:pPr marL="0" indent="0">
               <a:buFontTx/>
               <a:buNone/>
             </a:pPr>
-            <a:r>
-              <a:rPr lang="en-GB" dirty="0" err="1"/>
-              <a:t>Zukünftig</a:t>
-            </a:r>
-            <a:r>
-              <a:rPr lang="en-GB" dirty="0"/>
-              <a:t> Work</a:t>
-            </a:r>
-          </a:p>
-          <a:p>
-            <a:pPr marL="171450" indent="-171450">
-              <a:buFontTx/>
-              <a:buChar char="-"/>
-            </a:pPr>
-            <a:r>
-              <a:rPr lang="en-GB" dirty="0"/>
-              <a:t>App </a:t>
-            </a:r>
-            <a:r>
-              <a:rPr lang="en-GB" dirty="0" err="1"/>
-              <a:t>mit</a:t>
-            </a:r>
-            <a:r>
-              <a:rPr lang="en-GB" dirty="0"/>
-              <a:t> </a:t>
-            </a:r>
-            <a:r>
-              <a:rPr lang="en-GB" dirty="0" err="1"/>
-              <a:t>Werbung</a:t>
-            </a:r>
-            <a:r>
-              <a:rPr lang="en-GB" dirty="0"/>
-              <a:t> </a:t>
-            </a:r>
-            <a:r>
-              <a:rPr lang="en-GB" dirty="0" err="1"/>
-              <a:t>versehen</a:t>
-            </a:r>
-            <a:r>
-              <a:rPr lang="en-GB" dirty="0"/>
-              <a:t>.</a:t>
-            </a:r>
-          </a:p>
-          <a:p>
-            <a:pPr marL="171450" indent="-171450">
-              <a:buFontTx/>
-              <a:buChar char="-"/>
-            </a:pPr>
-            <a:r>
-              <a:rPr lang="en-GB" dirty="0" err="1"/>
-              <a:t>Bezahlende</a:t>
-            </a:r>
-            <a:r>
-              <a:rPr lang="en-GB" dirty="0"/>
-              <a:t> </a:t>
-            </a:r>
-            <a:r>
-              <a:rPr lang="en-GB" dirty="0" err="1"/>
-              <a:t>Kunden</a:t>
-            </a:r>
-            <a:r>
-              <a:rPr lang="en-GB" dirty="0"/>
-              <a:t> (</a:t>
-            </a:r>
-            <a:r>
-              <a:rPr lang="en-GB" dirty="0" err="1"/>
-              <a:t>Skigebiete</a:t>
-            </a:r>
-            <a:r>
-              <a:rPr lang="en-GB" dirty="0"/>
-              <a:t>) warden </a:t>
-            </a:r>
-            <a:r>
-              <a:rPr lang="en-GB" dirty="0" err="1"/>
-              <a:t>Priorisiert</a:t>
-            </a:r>
-            <a:r>
-              <a:rPr lang="en-GB" dirty="0"/>
-              <a:t> </a:t>
-            </a:r>
-            <a:r>
-              <a:rPr lang="en-GB" dirty="0" err="1"/>
-              <a:t>angezeigt</a:t>
-            </a:r>
             <a:endParaRPr lang="en-GB" dirty="0"/>
           </a:p>
           <a:p>
-            <a:pPr marL="171450" indent="-171450">
-              <a:buFontTx/>
-              <a:buChar char="-"/>
-            </a:pPr>
-            <a:r>
-              <a:rPr lang="en-GB" dirty="0" err="1"/>
-              <a:t>Filterfunktionen</a:t>
-            </a:r>
-            <a:r>
-              <a:rPr lang="en-GB" dirty="0"/>
-              <a:t> </a:t>
-            </a:r>
-            <a:r>
-              <a:rPr lang="en-GB" dirty="0" err="1"/>
-              <a:t>für</a:t>
-            </a:r>
-            <a:r>
-              <a:rPr lang="en-GB" dirty="0"/>
-              <a:t> </a:t>
-            </a:r>
-            <a:r>
-              <a:rPr lang="en-GB" dirty="0" err="1"/>
-              <a:t>benutzer</a:t>
-            </a:r>
-            <a:r>
-              <a:rPr lang="en-GB" dirty="0"/>
-              <a:t> </a:t>
-            </a:r>
-            <a:r>
-              <a:rPr lang="en-GB" dirty="0" err="1"/>
-              <a:t>einfügen</a:t>
-            </a:r>
-            <a:endParaRPr lang="en-GB" dirty="0"/>
-          </a:p>
-          <a:p>
-            <a:pPr marL="171450" indent="-171450">
-              <a:buFontTx/>
-              <a:buChar char="-"/>
-            </a:pPr>
-            <a:r>
-              <a:rPr lang="en-GB" dirty="0" err="1"/>
-              <a:t>Kostenpflichtige</a:t>
-            </a:r>
-            <a:r>
-              <a:rPr lang="en-GB" dirty="0"/>
-              <a:t> API </a:t>
-            </a:r>
-            <a:r>
-              <a:rPr lang="en-GB" dirty="0" err="1"/>
-              <a:t>einbinden</a:t>
-            </a:r>
-            <a:r>
-              <a:rPr lang="en-GB" dirty="0"/>
-              <a:t> -&gt; </a:t>
-            </a:r>
-            <a:r>
-              <a:rPr lang="en-GB" dirty="0" err="1"/>
-              <a:t>mehr</a:t>
-            </a:r>
-            <a:r>
-              <a:rPr lang="en-GB" dirty="0"/>
-              <a:t> </a:t>
-            </a:r>
-            <a:r>
-              <a:rPr lang="en-GB" dirty="0" err="1"/>
-              <a:t>Informationen</a:t>
-            </a:r>
-            <a:r>
-              <a:rPr lang="en-GB" dirty="0"/>
-              <a:t> und </a:t>
-            </a:r>
-            <a:r>
-              <a:rPr lang="en-GB" dirty="0" err="1"/>
-              <a:t>aktueller</a:t>
-            </a:r>
-            <a:endParaRPr lang="en-GB" dirty="0"/>
-          </a:p>
-          <a:p>
-            <a:pPr marL="171450" indent="-171450">
-              <a:buFontTx/>
-              <a:buChar char="-"/>
-            </a:pPr>
-            <a:endParaRPr lang="en-GB" dirty="0"/>
+            <a:endParaRPr lang="de-CH" dirty="0"/>
           </a:p>
         </p:txBody>
       </p:sp>
@@ -2624,7 +3220,110 @@
     </p:spTree>
     <p:extLst>
       <p:ext uri="{BB962C8B-B14F-4D97-AF65-F5344CB8AC3E}">
-        <p14:creationId xmlns:p14="http://schemas.microsoft.com/office/powerpoint/2010/main" val="559276566"/>
+        <p14:creationId xmlns:p14="http://schemas.microsoft.com/office/powerpoint/2010/main" val="3608739263"/>
+      </p:ext>
+    </p:extLst>
+  </p:cSld>
+  <p:clrMapOvr>
+    <a:masterClrMapping/>
+  </p:clrMapOvr>
+</p:notes>
+</file>
+
+<file path=ppt/notesSlides/notesSlide9.xml><?xml version="1.0" encoding="utf-8"?>
+<p:notes xmlns:a="http://schemas.openxmlformats.org/drawingml/2006/main" xmlns:r="http://schemas.openxmlformats.org/officeDocument/2006/relationships" xmlns:p="http://schemas.openxmlformats.org/presentationml/2006/main">
+  <p:cSld>
+    <p:spTree>
+      <p:nvGrpSpPr>
+        <p:cNvPr id="1" name=""/>
+        <p:cNvGrpSpPr/>
+        <p:nvPr/>
+      </p:nvGrpSpPr>
+      <p:grpSpPr>
+        <a:xfrm>
+          <a:off x="0" y="0"/>
+          <a:ext cx="0" cy="0"/>
+          <a:chOff x="0" y="0"/>
+          <a:chExt cx="0" cy="0"/>
+        </a:xfrm>
+      </p:grpSpPr>
+      <p:sp>
+        <p:nvSpPr>
+          <p:cNvPr id="2" name="Folienbildplatzhalter 1"/>
+          <p:cNvSpPr>
+            <a:spLocks noGrp="1" noRot="1" noChangeAspect="1"/>
+          </p:cNvSpPr>
+          <p:nvPr>
+            <p:ph type="sldImg"/>
+          </p:nvPr>
+        </p:nvSpPr>
+        <p:spPr/>
+      </p:sp>
+      <p:sp>
+        <p:nvSpPr>
+          <p:cNvPr id="3" name="Notizenplatzhalter 2"/>
+          <p:cNvSpPr>
+            <a:spLocks noGrp="1"/>
+          </p:cNvSpPr>
+          <p:nvPr>
+            <p:ph type="body" idx="1"/>
+          </p:nvPr>
+        </p:nvSpPr>
+        <p:spPr/>
+        <p:txBody>
+          <a:bodyPr/>
+          <a:lstStyle/>
+          <a:p>
+            <a:r>
+              <a:rPr lang="en-GB" dirty="0"/>
+              <a:t>Demo. Script </a:t>
+            </a:r>
+            <a:r>
+              <a:rPr lang="en-GB" dirty="0" err="1"/>
+              <a:t>vorbereiten</a:t>
+            </a:r>
+            <a:r>
+              <a:rPr lang="en-GB" dirty="0"/>
+              <a:t> </a:t>
+            </a:r>
+            <a:r>
+              <a:rPr lang="en-GB" dirty="0" err="1"/>
+              <a:t>für</a:t>
+            </a:r>
+            <a:r>
+              <a:rPr lang="en-GB"/>
+              <a:t> Demo!!!</a:t>
+            </a:r>
+          </a:p>
+        </p:txBody>
+      </p:sp>
+      <p:sp>
+        <p:nvSpPr>
+          <p:cNvPr id="4" name="Foliennummernplatzhalter 3"/>
+          <p:cNvSpPr>
+            <a:spLocks noGrp="1"/>
+          </p:cNvSpPr>
+          <p:nvPr>
+            <p:ph type="sldNum" sz="quarter" idx="10"/>
+          </p:nvPr>
+        </p:nvSpPr>
+        <p:spPr/>
+        <p:txBody>
+          <a:bodyPr/>
+          <a:lstStyle/>
+          <a:p>
+            <a:fld id="{748723F8-CD6B-45E3-B09A-75062809A4AE}" type="slidenum">
+              <a:rPr lang="en-GB" smtClean="0"/>
+              <a:t>14</a:t>
+            </a:fld>
+            <a:endParaRPr lang="en-GB"/>
+          </a:p>
+        </p:txBody>
+      </p:sp>
+    </p:spTree>
+    <p:extLst>
+      <p:ext uri="{BB962C8B-B14F-4D97-AF65-F5344CB8AC3E}">
+        <p14:creationId xmlns:p14="http://schemas.microsoft.com/office/powerpoint/2010/main" val="2530695747"/>
       </p:ext>
     </p:extLst>
   </p:cSld>
@@ -5795,9 +6494,10 @@
           </a:p>
           <a:p>
             <a:r>
-              <a:rPr lang="en-GB" dirty="0"/>
-              <a:t>Monkey-Test with ADB</a:t>
-            </a:r>
+              <a:rPr lang="en-GB"/>
+              <a:t>Monkey-Test</a:t>
+            </a:r>
+            <a:endParaRPr lang="en-GB" dirty="0"/>
           </a:p>
         </p:txBody>
       </p:sp>
@@ -5815,6 +6515,140 @@
 </file>
 
 <file path=ppt/slides/slide11.xml><?xml version="1.0" encoding="utf-8"?>
+<p:sld xmlns:a="http://schemas.openxmlformats.org/drawingml/2006/main" xmlns:r="http://schemas.openxmlformats.org/officeDocument/2006/relationships" xmlns:p="http://schemas.openxmlformats.org/presentationml/2006/main">
+  <p:cSld>
+    <p:spTree>
+      <p:nvGrpSpPr>
+        <p:cNvPr id="1" name=""/>
+        <p:cNvGrpSpPr/>
+        <p:nvPr/>
+      </p:nvGrpSpPr>
+      <p:grpSpPr>
+        <a:xfrm>
+          <a:off x="0" y="0"/>
+          <a:ext cx="0" cy="0"/>
+          <a:chOff x="0" y="0"/>
+          <a:chExt cx="0" cy="0"/>
+        </a:xfrm>
+      </p:grpSpPr>
+      <p:sp>
+        <p:nvSpPr>
+          <p:cNvPr id="2" name="Titel 1">
+            <a:extLst>
+              <a:ext uri="{FF2B5EF4-FFF2-40B4-BE49-F238E27FC236}">
+                <a16:creationId xmlns:a16="http://schemas.microsoft.com/office/drawing/2014/main" id="{F5CDFFE4-D353-4E85-BC81-E89F9305F6A4}"/>
+              </a:ext>
+            </a:extLst>
+          </p:cNvPr>
+          <p:cNvSpPr>
+            <a:spLocks noGrp="1"/>
+          </p:cNvSpPr>
+          <p:nvPr>
+            <p:ph type="title"/>
+          </p:nvPr>
+        </p:nvSpPr>
+        <p:spPr/>
+        <p:txBody>
+          <a:bodyPr/>
+          <a:lstStyle/>
+          <a:p>
+            <a:r>
+              <a:rPr lang="en-GB" dirty="0"/>
+              <a:t>Evaluation / Testing</a:t>
+            </a:r>
+          </a:p>
+        </p:txBody>
+      </p:sp>
+      <p:sp>
+        <p:nvSpPr>
+          <p:cNvPr id="3" name="Inhaltsplatzhalter 2">
+            <a:extLst>
+              <a:ext uri="{FF2B5EF4-FFF2-40B4-BE49-F238E27FC236}">
+                <a16:creationId xmlns:a16="http://schemas.microsoft.com/office/drawing/2014/main" id="{86043A25-7E8D-4E6F-B9D9-CE9DBDAF2DC8}"/>
+              </a:ext>
+            </a:extLst>
+          </p:cNvPr>
+          <p:cNvSpPr>
+            <a:spLocks noGrp="1"/>
+          </p:cNvSpPr>
+          <p:nvPr>
+            <p:ph idx="1"/>
+          </p:nvPr>
+        </p:nvSpPr>
+        <p:spPr>
+          <a:xfrm>
+            <a:off x="628650" y="1825625"/>
+            <a:ext cx="7886700" cy="4351338"/>
+          </a:xfrm>
+        </p:spPr>
+        <p:txBody>
+          <a:bodyPr/>
+          <a:lstStyle/>
+          <a:p>
+            <a:r>
+              <a:rPr lang="en-GB" dirty="0"/>
+              <a:t>Monkey Test</a:t>
+            </a:r>
+          </a:p>
+          <a:p>
+            <a:pPr lvl="1"/>
+            <a:r>
+              <a:rPr lang="en-GB" dirty="0"/>
+              <a:t>Command Line Tool</a:t>
+            </a:r>
+          </a:p>
+          <a:p>
+            <a:pPr lvl="1"/>
+            <a:r>
+              <a:rPr lang="en-GB" dirty="0"/>
+              <a:t>Starting with:</a:t>
+            </a:r>
+          </a:p>
+          <a:p>
+            <a:pPr lvl="2"/>
+            <a:r>
+              <a:rPr lang="en-GB" dirty="0"/>
+              <a:t>$ </a:t>
+            </a:r>
+            <a:r>
+              <a:rPr lang="en-GB" dirty="0" err="1"/>
+              <a:t>adb</a:t>
+            </a:r>
+            <a:r>
+              <a:rPr lang="en-GB" dirty="0"/>
+              <a:t> shell monkey –p your.package.name –v 500</a:t>
+            </a:r>
+          </a:p>
+          <a:p>
+            <a:pPr lvl="1"/>
+            <a:r>
+              <a:rPr lang="en-GB" dirty="0"/>
+              <a:t>Sends 500 Random Events to the Application</a:t>
+            </a:r>
+          </a:p>
+          <a:p>
+            <a:pPr lvl="1"/>
+            <a:r>
+              <a:rPr lang="en-GB" dirty="0"/>
+              <a:t>Testing App for Stability</a:t>
+            </a:r>
+          </a:p>
+        </p:txBody>
+      </p:sp>
+    </p:spTree>
+    <p:extLst>
+      <p:ext uri="{BB962C8B-B14F-4D97-AF65-F5344CB8AC3E}">
+        <p14:creationId xmlns:p14="http://schemas.microsoft.com/office/powerpoint/2010/main" val="453683398"/>
+      </p:ext>
+    </p:extLst>
+  </p:cSld>
+  <p:clrMapOvr>
+    <a:masterClrMapping/>
+  </p:clrMapOvr>
+</p:sld>
+</file>
+
+<file path=ppt/slides/slide12.xml><?xml version="1.0" encoding="utf-8"?>
 <p:sld xmlns:a="http://schemas.openxmlformats.org/drawingml/2006/main" xmlns:r="http://schemas.openxmlformats.org/officeDocument/2006/relationships" xmlns:p="http://schemas.openxmlformats.org/presentationml/2006/main">
   <p:cSld>
     <p:spTree>
@@ -5911,7 +6745,145 @@
 </p:sld>
 </file>
 
-<file path=ppt/slides/slide12.xml><?xml version="1.0" encoding="utf-8"?>
+<file path=ppt/slides/slide13.xml><?xml version="1.0" encoding="utf-8"?>
+<p:sld xmlns:a="http://schemas.openxmlformats.org/drawingml/2006/main" xmlns:r="http://schemas.openxmlformats.org/officeDocument/2006/relationships" xmlns:p="http://schemas.openxmlformats.org/presentationml/2006/main">
+  <p:cSld>
+    <p:spTree>
+      <p:nvGrpSpPr>
+        <p:cNvPr id="1" name=""/>
+        <p:cNvGrpSpPr/>
+        <p:nvPr/>
+      </p:nvGrpSpPr>
+      <p:grpSpPr>
+        <a:xfrm>
+          <a:off x="0" y="0"/>
+          <a:ext cx="0" cy="0"/>
+          <a:chOff x="0" y="0"/>
+          <a:chExt cx="0" cy="0"/>
+        </a:xfrm>
+      </p:grpSpPr>
+      <p:sp>
+        <p:nvSpPr>
+          <p:cNvPr id="6" name="Titel 5">
+            <a:extLst>
+              <a:ext uri="{FF2B5EF4-FFF2-40B4-BE49-F238E27FC236}">
+                <a16:creationId xmlns:a16="http://schemas.microsoft.com/office/drawing/2014/main" id="{8429D070-732E-444A-A66D-11C05877E742}"/>
+              </a:ext>
+            </a:extLst>
+          </p:cNvPr>
+          <p:cNvSpPr>
+            <a:spLocks noGrp="1"/>
+          </p:cNvSpPr>
+          <p:nvPr>
+            <p:ph type="ctrTitle"/>
+          </p:nvPr>
+        </p:nvSpPr>
+        <p:spPr/>
+        <p:txBody>
+          <a:bodyPr/>
+          <a:lstStyle/>
+          <a:p>
+            <a:endParaRPr lang="en-GB"/>
+          </a:p>
+        </p:txBody>
+      </p:sp>
+      <p:sp>
+        <p:nvSpPr>
+          <p:cNvPr id="7" name="Untertitel 6">
+            <a:extLst>
+              <a:ext uri="{FF2B5EF4-FFF2-40B4-BE49-F238E27FC236}">
+                <a16:creationId xmlns:a16="http://schemas.microsoft.com/office/drawing/2014/main" id="{2248748B-B5BF-4AA8-B10B-085F610312A4}"/>
+              </a:ext>
+            </a:extLst>
+          </p:cNvPr>
+          <p:cNvSpPr>
+            <a:spLocks noGrp="1"/>
+          </p:cNvSpPr>
+          <p:nvPr>
+            <p:ph type="subTitle" idx="1"/>
+          </p:nvPr>
+        </p:nvSpPr>
+        <p:spPr/>
+        <p:txBody>
+          <a:bodyPr/>
+          <a:lstStyle/>
+          <a:p>
+            <a:endParaRPr lang="en-GB"/>
+          </a:p>
+        </p:txBody>
+      </p:sp>
+    </p:spTree>
+    <p:extLst>
+      <p:ext uri="{BB962C8B-B14F-4D97-AF65-F5344CB8AC3E}">
+        <p14:creationId xmlns:p14="http://schemas.microsoft.com/office/powerpoint/2010/main" val="1356138864"/>
+      </p:ext>
+    </p:extLst>
+  </p:cSld>
+  <p:clrMapOvr>
+    <a:masterClrMapping/>
+  </p:clrMapOvr>
+</p:sld>
+</file>
+
+<file path=ppt/slides/slide14.xml><?xml version="1.0" encoding="utf-8"?>
+<p:sld xmlns:a="http://schemas.openxmlformats.org/drawingml/2006/main" xmlns:r="http://schemas.openxmlformats.org/officeDocument/2006/relationships" xmlns:p="http://schemas.openxmlformats.org/presentationml/2006/main">
+  <p:cSld>
+    <p:spTree>
+      <p:nvGrpSpPr>
+        <p:cNvPr id="1" name=""/>
+        <p:cNvGrpSpPr/>
+        <p:nvPr/>
+      </p:nvGrpSpPr>
+      <p:grpSpPr>
+        <a:xfrm>
+          <a:off x="0" y="0"/>
+          <a:ext cx="0" cy="0"/>
+          <a:chOff x="0" y="0"/>
+          <a:chExt cx="0" cy="0"/>
+        </a:xfrm>
+      </p:grpSpPr>
+      <p:sp>
+        <p:nvSpPr>
+          <p:cNvPr id="2" name="Titel 1">
+            <a:extLst>
+              <a:ext uri="{FF2B5EF4-FFF2-40B4-BE49-F238E27FC236}">
+                <a16:creationId xmlns:a16="http://schemas.microsoft.com/office/drawing/2014/main" id="{AAA81A65-6DCA-461D-A610-9F43B9E69EBF}"/>
+              </a:ext>
+            </a:extLst>
+          </p:cNvPr>
+          <p:cNvSpPr>
+            <a:spLocks noGrp="1"/>
+          </p:cNvSpPr>
+          <p:nvPr>
+            <p:ph type="ctrTitle"/>
+          </p:nvPr>
+        </p:nvSpPr>
+        <p:spPr/>
+        <p:txBody>
+          <a:bodyPr/>
+          <a:lstStyle/>
+          <a:p>
+            <a:r>
+              <a:rPr lang="en-GB" dirty="0"/>
+              <a:t>Demo</a:t>
+            </a:r>
+          </a:p>
+        </p:txBody>
+      </p:sp>
+    </p:spTree>
+    <p:extLst>
+      <p:ext uri="{BB962C8B-B14F-4D97-AF65-F5344CB8AC3E}">
+        <p14:creationId xmlns:p14="http://schemas.microsoft.com/office/powerpoint/2010/main" val="2460239731"/>
+      </p:ext>
+    </p:extLst>
+  </p:cSld>
+  <p:clrMapOvr>
+    <a:masterClrMapping/>
+  </p:clrMapOvr>
+</p:sld>
+</file>
+
+<file path=ppt/slides/slide15.xml><?xml version="1.0" encoding="utf-8"?>
 <p:sld xmlns:a="http://schemas.openxmlformats.org/drawingml/2006/main" xmlns:r="http://schemas.openxmlformats.org/officeDocument/2006/relationships" xmlns:p="http://schemas.openxmlformats.org/presentationml/2006/main">
   <p:cSld>
     <p:spTree>
@@ -6070,7 +7042,12 @@
             <p:ph idx="1"/>
           </p:nvPr>
         </p:nvSpPr>
-        <p:spPr/>
+        <p:spPr>
+          <a:xfrm>
+            <a:off x="628650" y="1825625"/>
+            <a:ext cx="3943350" cy="4351338"/>
+          </a:xfrm>
+        </p:spPr>
         <p:txBody>
           <a:bodyPr/>
           <a:lstStyle/>
@@ -6122,6 +7099,16 @@
             <a:r>
               <a:rPr lang="en-GB" dirty="0"/>
               <a:t>Evaluation / Testing</a:t>
+            </a:r>
+          </a:p>
+          <a:p>
+            <a:pPr>
+              <a:buFontTx/>
+              <a:buChar char="-"/>
+            </a:pPr>
+            <a:r>
+              <a:rPr lang="en-GB" dirty="0"/>
+              <a:t>Demo</a:t>
             </a:r>
           </a:p>
           <a:p>

</xml_diff>

<commit_message>
Added sonarqube report table.
</commit_message>
<xml_diff>
--- a/Documents/Presentation/Presentation.pptx
+++ b/Documents/Presentation/Presentation.pptx
@@ -5,7 +5,7 @@
     <p:sldMasterId id="2147483660" r:id="rId1"/>
   </p:sldMasterIdLst>
   <p:notesMasterIdLst>
-    <p:notesMasterId r:id="rId17"/>
+    <p:notesMasterId r:id="rId16"/>
   </p:notesMasterIdLst>
   <p:sldIdLst>
     <p:sldId id="256" r:id="rId2"/>
@@ -20,9 +20,8 @@
     <p:sldId id="265" r:id="rId11"/>
     <p:sldId id="270" r:id="rId12"/>
     <p:sldId id="269" r:id="rId13"/>
-    <p:sldId id="271" r:id="rId14"/>
-    <p:sldId id="272" r:id="rId15"/>
-    <p:sldId id="266" r:id="rId16"/>
+    <p:sldId id="272" r:id="rId14"/>
+    <p:sldId id="266" r:id="rId15"/>
   </p:sldIdLst>
   <p:sldSz cx="9144000" cy="6858000" type="screen4x3"/>
   <p:notesSz cx="6858000" cy="9144000"/>
@@ -1014,7 +1013,7 @@
           <a:p>
             <a:fld id="{748723F8-CD6B-45E3-B09A-75062809A4AE}" type="slidenum">
               <a:rPr lang="en-GB" smtClean="0"/>
-              <a:t>15</a:t>
+              <a:t>14</a:t>
             </a:fld>
             <a:endParaRPr lang="en-GB"/>
           </a:p>
@@ -3314,7 +3313,7 @@
           <a:p>
             <a:fld id="{748723F8-CD6B-45E3-B09A-75062809A4AE}" type="slidenum">
               <a:rPr lang="en-GB" smtClean="0"/>
-              <a:t>14</a:t>
+              <a:t>13</a:t>
             </a:fld>
             <a:endParaRPr lang="en-GB"/>
           </a:p>
@@ -6697,41 +6696,348 @@
           </a:p>
         </p:txBody>
       </p:sp>
-      <p:pic>
-        <p:nvPicPr>
-          <p:cNvPr id="5" name="Inhaltsplatzhalter 4">
+      <p:graphicFrame>
+        <p:nvGraphicFramePr>
+          <p:cNvPr id="6" name="Inhaltsplatzhalter 3">
             <a:extLst>
               <a:ext uri="{FF2B5EF4-FFF2-40B4-BE49-F238E27FC236}">
-                <a16:creationId xmlns:a16="http://schemas.microsoft.com/office/drawing/2014/main" id="{BD3FE327-9148-4C2A-9538-031810101F25}"/>
+                <a16:creationId xmlns:a16="http://schemas.microsoft.com/office/drawing/2014/main" id="{E194748C-EF1A-4AB0-9565-CB3266D7B7E5}"/>
               </a:ext>
             </a:extLst>
           </p:cNvPr>
-          <p:cNvPicPr>
-            <a:picLocks noGrp="1" noChangeAspect="1"/>
-          </p:cNvPicPr>
+          <p:cNvGraphicFramePr>
+            <a:graphicFrameLocks noGrp="1"/>
+          </p:cNvGraphicFramePr>
           <p:nvPr>
             <p:ph idx="1"/>
+            <p:extLst>
+              <p:ext uri="{D42A27DB-BD31-4B8C-83A1-F6EECF244321}">
+                <p14:modId xmlns:p14="http://schemas.microsoft.com/office/powerpoint/2010/main" val="2928934278"/>
+              </p:ext>
+            </p:extLst>
           </p:nvPr>
-        </p:nvPicPr>
-        <p:blipFill>
-          <a:blip r:embed="rId3">
-            <a:extLst>
-              <a:ext uri="{28A0092B-C50C-407E-A947-70E740481C1C}">
-                <a14:useLocalDpi xmlns:a14="http://schemas.microsoft.com/office/drawing/2010/main" val="0"/>
-              </a:ext>
-            </a:extLst>
-          </a:blip>
-          <a:stretch>
-            <a:fillRect/>
-          </a:stretch>
-        </p:blipFill>
-        <p:spPr>
-          <a:xfrm>
-            <a:off x="628650" y="1775124"/>
-            <a:ext cx="8113283" cy="4415951"/>
-          </a:xfrm>
-        </p:spPr>
-      </p:pic>
+        </p:nvGraphicFramePr>
+        <p:xfrm>
+          <a:off x="628650" y="1945640"/>
+          <a:ext cx="7886700" cy="2966720"/>
+        </p:xfrm>
+        <a:graphic>
+          <a:graphicData uri="http://schemas.openxmlformats.org/drawingml/2006/table">
+            <a:tbl>
+              <a:tblPr firstRow="1" bandRow="1">
+                <a:tableStyleId>{5C22544A-7EE6-4342-B048-85BDC9FD1C3A}</a:tableStyleId>
+              </a:tblPr>
+              <a:tblGrid>
+                <a:gridCol w="3943350">
+                  <a:extLst>
+                    <a:ext uri="{9D8B030D-6E8A-4147-A177-3AD203B41FA5}">
+                      <a16:colId xmlns:a16="http://schemas.microsoft.com/office/drawing/2014/main" val="1733320204"/>
+                    </a:ext>
+                  </a:extLst>
+                </a:gridCol>
+                <a:gridCol w="3943350">
+                  <a:extLst>
+                    <a:ext uri="{9D8B030D-6E8A-4147-A177-3AD203B41FA5}">
+                      <a16:colId xmlns:a16="http://schemas.microsoft.com/office/drawing/2014/main" val="551250855"/>
+                    </a:ext>
+                  </a:extLst>
+                </a:gridCol>
+              </a:tblGrid>
+              <a:tr h="370840">
+                <a:tc>
+                  <a:txBody>
+                    <a:bodyPr/>
+                    <a:lstStyle/>
+                    <a:p>
+                      <a:r>
+                        <a:rPr lang="de-CH" dirty="0" err="1"/>
+                        <a:t>SonarQube</a:t>
+                      </a:r>
+                      <a:r>
+                        <a:rPr lang="de-CH" dirty="0"/>
+                        <a:t> </a:t>
+                      </a:r>
+                      <a:r>
+                        <a:rPr lang="de-CH" dirty="0" err="1"/>
+                        <a:t>Measure</a:t>
+                      </a:r>
+                      <a:endParaRPr lang="de-CH" dirty="0"/>
+                    </a:p>
+                  </a:txBody>
+                  <a:tcPr/>
+                </a:tc>
+                <a:tc>
+                  <a:txBody>
+                    <a:bodyPr/>
+                    <a:lstStyle/>
+                    <a:p>
+                      <a:r>
+                        <a:rPr lang="de-CH" dirty="0" err="1"/>
+                        <a:t>rating</a:t>
+                      </a:r>
+                      <a:endParaRPr lang="de-CH" dirty="0"/>
+                    </a:p>
+                  </a:txBody>
+                  <a:tcPr/>
+                </a:tc>
+                <a:extLst>
+                  <a:ext uri="{0D108BD9-81ED-4DB2-BD59-A6C34878D82A}">
+                    <a16:rowId xmlns:a16="http://schemas.microsoft.com/office/drawing/2014/main" val="3690645732"/>
+                  </a:ext>
+                </a:extLst>
+              </a:tr>
+              <a:tr h="370840">
+                <a:tc>
+                  <a:txBody>
+                    <a:bodyPr/>
+                    <a:lstStyle/>
+                    <a:p>
+                      <a:r>
+                        <a:rPr lang="de-CH" dirty="0"/>
+                        <a:t>Bugs</a:t>
+                      </a:r>
+                    </a:p>
+                  </a:txBody>
+                  <a:tcPr/>
+                </a:tc>
+                <a:tc>
+                  <a:txBody>
+                    <a:bodyPr/>
+                    <a:lstStyle/>
+                    <a:p>
+                      <a:r>
+                        <a:rPr lang="de-CH" dirty="0"/>
+                        <a:t>0 Grade A</a:t>
+                      </a:r>
+                    </a:p>
+                  </a:txBody>
+                  <a:tcPr/>
+                </a:tc>
+                <a:extLst>
+                  <a:ext uri="{0D108BD9-81ED-4DB2-BD59-A6C34878D82A}">
+                    <a16:rowId xmlns:a16="http://schemas.microsoft.com/office/drawing/2014/main" val="2965161667"/>
+                  </a:ext>
+                </a:extLst>
+              </a:tr>
+              <a:tr h="370840">
+                <a:tc>
+                  <a:txBody>
+                    <a:bodyPr/>
+                    <a:lstStyle/>
+                    <a:p>
+                      <a:r>
+                        <a:rPr lang="de-CH" dirty="0" err="1"/>
+                        <a:t>Vulnerabilities</a:t>
+                      </a:r>
+                      <a:endParaRPr lang="de-CH" dirty="0"/>
+                    </a:p>
+                  </a:txBody>
+                  <a:tcPr/>
+                </a:tc>
+                <a:tc>
+                  <a:txBody>
+                    <a:bodyPr/>
+                    <a:lstStyle/>
+                    <a:p>
+                      <a:r>
+                        <a:rPr lang="de-CH" dirty="0"/>
+                        <a:t>0 Grade A</a:t>
+                      </a:r>
+                    </a:p>
+                  </a:txBody>
+                  <a:tcPr/>
+                </a:tc>
+                <a:extLst>
+                  <a:ext uri="{0D108BD9-81ED-4DB2-BD59-A6C34878D82A}">
+                    <a16:rowId xmlns:a16="http://schemas.microsoft.com/office/drawing/2014/main" val="1247341468"/>
+                  </a:ext>
+                </a:extLst>
+              </a:tr>
+              <a:tr h="370840">
+                <a:tc>
+                  <a:txBody>
+                    <a:bodyPr/>
+                    <a:lstStyle/>
+                    <a:p>
+                      <a:r>
+                        <a:rPr lang="de-CH" dirty="0"/>
+                        <a:t>Code </a:t>
+                      </a:r>
+                      <a:r>
+                        <a:rPr lang="de-CH" dirty="0" err="1"/>
+                        <a:t>Smells</a:t>
+                      </a:r>
+                      <a:endParaRPr lang="de-CH" dirty="0"/>
+                    </a:p>
+                  </a:txBody>
+                  <a:tcPr/>
+                </a:tc>
+                <a:tc>
+                  <a:txBody>
+                    <a:bodyPr/>
+                    <a:lstStyle/>
+                    <a:p>
+                      <a:r>
+                        <a:rPr lang="de-CH" dirty="0"/>
+                        <a:t>0 Grade A</a:t>
+                      </a:r>
+                    </a:p>
+                  </a:txBody>
+                  <a:tcPr/>
+                </a:tc>
+                <a:extLst>
+                  <a:ext uri="{0D108BD9-81ED-4DB2-BD59-A6C34878D82A}">
+                    <a16:rowId xmlns:a16="http://schemas.microsoft.com/office/drawing/2014/main" val="811599826"/>
+                  </a:ext>
+                </a:extLst>
+              </a:tr>
+              <a:tr h="370840">
+                <a:tc>
+                  <a:txBody>
+                    <a:bodyPr/>
+                    <a:lstStyle/>
+                    <a:p>
+                      <a:r>
+                        <a:rPr lang="de-CH" dirty="0" err="1"/>
+                        <a:t>Debt</a:t>
+                      </a:r>
+                      <a:endParaRPr lang="de-CH" dirty="0"/>
+                    </a:p>
+                  </a:txBody>
+                  <a:tcPr/>
+                </a:tc>
+                <a:tc>
+                  <a:txBody>
+                    <a:bodyPr/>
+                    <a:lstStyle/>
+                    <a:p>
+                      <a:r>
+                        <a:rPr lang="de-CH" dirty="0"/>
+                        <a:t>0</a:t>
+                      </a:r>
+                    </a:p>
+                  </a:txBody>
+                  <a:tcPr/>
+                </a:tc>
+                <a:extLst>
+                  <a:ext uri="{0D108BD9-81ED-4DB2-BD59-A6C34878D82A}">
+                    <a16:rowId xmlns:a16="http://schemas.microsoft.com/office/drawing/2014/main" val="314550066"/>
+                  </a:ext>
+                </a:extLst>
+              </a:tr>
+              <a:tr h="370840">
+                <a:tc>
+                  <a:txBody>
+                    <a:bodyPr/>
+                    <a:lstStyle/>
+                    <a:p>
+                      <a:r>
+                        <a:rPr lang="de-CH" dirty="0" err="1"/>
+                        <a:t>Duplications</a:t>
+                      </a:r>
+                      <a:endParaRPr lang="de-CH" dirty="0"/>
+                    </a:p>
+                  </a:txBody>
+                  <a:tcPr/>
+                </a:tc>
+                <a:tc>
+                  <a:txBody>
+                    <a:bodyPr/>
+                    <a:lstStyle/>
+                    <a:p>
+                      <a:r>
+                        <a:rPr lang="de-CH" dirty="0"/>
+                        <a:t>0.0%</a:t>
+                      </a:r>
+                    </a:p>
+                  </a:txBody>
+                  <a:tcPr/>
+                </a:tc>
+                <a:extLst>
+                  <a:ext uri="{0D108BD9-81ED-4DB2-BD59-A6C34878D82A}">
+                    <a16:rowId xmlns:a16="http://schemas.microsoft.com/office/drawing/2014/main" val="114698365"/>
+                  </a:ext>
+                </a:extLst>
+              </a:tr>
+              <a:tr h="370840">
+                <a:tc>
+                  <a:txBody>
+                    <a:bodyPr/>
+                    <a:lstStyle/>
+                    <a:p>
+                      <a:r>
+                        <a:rPr lang="de-CH" dirty="0"/>
+                        <a:t>Lines </a:t>
+                      </a:r>
+                      <a:r>
+                        <a:rPr lang="de-CH" dirty="0" err="1"/>
+                        <a:t>of</a:t>
+                      </a:r>
+                      <a:r>
+                        <a:rPr lang="de-CH" dirty="0"/>
+                        <a:t> Code</a:t>
+                      </a:r>
+                    </a:p>
+                  </a:txBody>
+                  <a:tcPr/>
+                </a:tc>
+                <a:tc>
+                  <a:txBody>
+                    <a:bodyPr/>
+                    <a:lstStyle/>
+                    <a:p>
+                      <a:r>
+                        <a:rPr lang="de-CH" dirty="0"/>
+                        <a:t>975</a:t>
+                      </a:r>
+                    </a:p>
+                  </a:txBody>
+                  <a:tcPr/>
+                </a:tc>
+                <a:extLst>
+                  <a:ext uri="{0D108BD9-81ED-4DB2-BD59-A6C34878D82A}">
+                    <a16:rowId xmlns:a16="http://schemas.microsoft.com/office/drawing/2014/main" val="741434277"/>
+                  </a:ext>
+                </a:extLst>
+              </a:tr>
+              <a:tr h="370840">
+                <a:tc>
+                  <a:txBody>
+                    <a:bodyPr/>
+                    <a:lstStyle/>
+                    <a:p>
+                      <a:r>
+                        <a:rPr lang="de-CH" dirty="0" err="1"/>
+                        <a:t>Complexity</a:t>
+                      </a:r>
+                      <a:endParaRPr lang="de-CH" dirty="0"/>
+                    </a:p>
+                  </a:txBody>
+                  <a:tcPr/>
+                </a:tc>
+                <a:tc>
+                  <a:txBody>
+                    <a:bodyPr/>
+                    <a:lstStyle/>
+                    <a:p>
+                      <a:r>
+                        <a:rPr lang="de-CH" dirty="0"/>
+                        <a:t>152</a:t>
+                      </a:r>
+                    </a:p>
+                  </a:txBody>
+                  <a:tcPr/>
+                </a:tc>
+                <a:extLst>
+                  <a:ext uri="{0D108BD9-81ED-4DB2-BD59-A6C34878D82A}">
+                    <a16:rowId xmlns:a16="http://schemas.microsoft.com/office/drawing/2014/main" val="1227319093"/>
+                  </a:ext>
+                </a:extLst>
+              </a:tr>
+            </a:tbl>
+          </a:graphicData>
+        </a:graphic>
+      </p:graphicFrame>
     </p:spTree>
     <p:extLst>
       <p:ext uri="{BB962C8B-B14F-4D97-AF65-F5344CB8AC3E}">
@@ -6746,86 +7052,6 @@
 </file>
 
 <file path=ppt/slides/slide13.xml><?xml version="1.0" encoding="utf-8"?>
-<p:sld xmlns:a="http://schemas.openxmlformats.org/drawingml/2006/main" xmlns:r="http://schemas.openxmlformats.org/officeDocument/2006/relationships" xmlns:p="http://schemas.openxmlformats.org/presentationml/2006/main">
-  <p:cSld>
-    <p:spTree>
-      <p:nvGrpSpPr>
-        <p:cNvPr id="1" name=""/>
-        <p:cNvGrpSpPr/>
-        <p:nvPr/>
-      </p:nvGrpSpPr>
-      <p:grpSpPr>
-        <a:xfrm>
-          <a:off x="0" y="0"/>
-          <a:ext cx="0" cy="0"/>
-          <a:chOff x="0" y="0"/>
-          <a:chExt cx="0" cy="0"/>
-        </a:xfrm>
-      </p:grpSpPr>
-      <p:sp>
-        <p:nvSpPr>
-          <p:cNvPr id="6" name="Titel 5">
-            <a:extLst>
-              <a:ext uri="{FF2B5EF4-FFF2-40B4-BE49-F238E27FC236}">
-                <a16:creationId xmlns:a16="http://schemas.microsoft.com/office/drawing/2014/main" id="{8429D070-732E-444A-A66D-11C05877E742}"/>
-              </a:ext>
-            </a:extLst>
-          </p:cNvPr>
-          <p:cNvSpPr>
-            <a:spLocks noGrp="1"/>
-          </p:cNvSpPr>
-          <p:nvPr>
-            <p:ph type="ctrTitle"/>
-          </p:nvPr>
-        </p:nvSpPr>
-        <p:spPr/>
-        <p:txBody>
-          <a:bodyPr/>
-          <a:lstStyle/>
-          <a:p>
-            <a:endParaRPr lang="en-GB"/>
-          </a:p>
-        </p:txBody>
-      </p:sp>
-      <p:sp>
-        <p:nvSpPr>
-          <p:cNvPr id="7" name="Untertitel 6">
-            <a:extLst>
-              <a:ext uri="{FF2B5EF4-FFF2-40B4-BE49-F238E27FC236}">
-                <a16:creationId xmlns:a16="http://schemas.microsoft.com/office/drawing/2014/main" id="{2248748B-B5BF-4AA8-B10B-085F610312A4}"/>
-              </a:ext>
-            </a:extLst>
-          </p:cNvPr>
-          <p:cNvSpPr>
-            <a:spLocks noGrp="1"/>
-          </p:cNvSpPr>
-          <p:nvPr>
-            <p:ph type="subTitle" idx="1"/>
-          </p:nvPr>
-        </p:nvSpPr>
-        <p:spPr/>
-        <p:txBody>
-          <a:bodyPr/>
-          <a:lstStyle/>
-          <a:p>
-            <a:endParaRPr lang="en-GB"/>
-          </a:p>
-        </p:txBody>
-      </p:sp>
-    </p:spTree>
-    <p:extLst>
-      <p:ext uri="{BB962C8B-B14F-4D97-AF65-F5344CB8AC3E}">
-        <p14:creationId xmlns:p14="http://schemas.microsoft.com/office/powerpoint/2010/main" val="1356138864"/>
-      </p:ext>
-    </p:extLst>
-  </p:cSld>
-  <p:clrMapOvr>
-    <a:masterClrMapping/>
-  </p:clrMapOvr>
-</p:sld>
-</file>
-
-<file path=ppt/slides/slide14.xml><?xml version="1.0" encoding="utf-8"?>
 <p:sld xmlns:a="http://schemas.openxmlformats.org/drawingml/2006/main" xmlns:r="http://schemas.openxmlformats.org/officeDocument/2006/relationships" xmlns:p="http://schemas.openxmlformats.org/presentationml/2006/main">
   <p:cSld>
     <p:spTree>
@@ -6883,7 +7109,7 @@
 </p:sld>
 </file>
 
-<file path=ppt/slides/slide15.xml><?xml version="1.0" encoding="utf-8"?>
+<file path=ppt/slides/slide14.xml><?xml version="1.0" encoding="utf-8"?>
 <p:sld xmlns:a="http://schemas.openxmlformats.org/drawingml/2006/main" xmlns:r="http://schemas.openxmlformats.org/officeDocument/2006/relationships" xmlns:p="http://schemas.openxmlformats.org/presentationml/2006/main">
   <p:cSld>
     <p:spTree>

</xml_diff>

<commit_message>
Added flow chart for architecture.
</commit_message>
<xml_diff>
--- a/Documents/Presentation/Presentation.pptx
+++ b/Documents/Presentation/Presentation.pptx
@@ -214,7 +214,7 @@
           <a:p>
             <a:fld id="{8CA86DDC-4AF9-4FB1-87A1-4AD13A0DDDE5}" type="datetimeFigureOut">
               <a:rPr lang="en-GB" smtClean="0"/>
-              <a:t>12/11/2017</a:t>
+              <a:t>13/11/2017</a:t>
             </a:fld>
             <a:endParaRPr lang="en-GB"/>
           </a:p>
@@ -642,15 +642,15 @@
             </a:r>
             <a:r>
               <a:rPr lang="en-GB" dirty="0"/>
-              <a:t> </a:t>
-            </a:r>
-            <a:r>
-              <a:rPr lang="en-GB" dirty="0" err="1"/>
-              <a:t>zeit</a:t>
-            </a:r>
-            <a:r>
-              <a:rPr lang="en-GB" dirty="0"/>
-              <a:t> in in </a:t>
+              <a:t> Zeit </a:t>
+            </a:r>
+            <a:r>
+              <a:rPr lang="en-GB" dirty="0" err="1"/>
+              <a:t>wie</a:t>
+            </a:r>
+            <a:r>
+              <a:rPr lang="en-GB" dirty="0"/>
+              <a:t> in </a:t>
             </a:r>
             <a:r>
               <a:rPr lang="en-GB" dirty="0" err="1"/>
@@ -893,7 +893,15 @@
             </a:r>
             <a:r>
               <a:rPr lang="en-GB" dirty="0"/>
-              <a:t>) warden </a:t>
+              <a:t>) </a:t>
+            </a:r>
+            <a:r>
+              <a:rPr lang="en-GB" dirty="0" err="1"/>
+              <a:t>werden</a:t>
+            </a:r>
+            <a:r>
+              <a:rPr lang="en-GB" dirty="0"/>
+              <a:t> </a:t>
             </a:r>
             <a:r>
               <a:rPr lang="en-GB" dirty="0" err="1"/>
@@ -932,7 +940,7 @@
             </a:r>
             <a:r>
               <a:rPr lang="en-GB" dirty="0" err="1"/>
-              <a:t>benutzer</a:t>
+              <a:t>Benutzer</a:t>
             </a:r>
             <a:r>
               <a:rPr lang="en-GB" dirty="0"/>
@@ -3463,7 +3471,7 @@
           <a:p>
             <a:fld id="{3A1252E9-4524-49D3-BD4A-3946534EE29A}" type="datetimeFigureOut">
               <a:rPr lang="de-CH" smtClean="0"/>
-              <a:t>12.11.2017</a:t>
+              <a:t>13.11.2017</a:t>
             </a:fld>
             <a:endParaRPr lang="de-CH"/>
           </a:p>
@@ -3633,7 +3641,7 @@
           <a:p>
             <a:fld id="{3A1252E9-4524-49D3-BD4A-3946534EE29A}" type="datetimeFigureOut">
               <a:rPr lang="de-CH" smtClean="0"/>
-              <a:t>12.11.2017</a:t>
+              <a:t>13.11.2017</a:t>
             </a:fld>
             <a:endParaRPr lang="de-CH"/>
           </a:p>
@@ -3813,7 +3821,7 @@
           <a:p>
             <a:fld id="{3A1252E9-4524-49D3-BD4A-3946534EE29A}" type="datetimeFigureOut">
               <a:rPr lang="de-CH" smtClean="0"/>
-              <a:t>12.11.2017</a:t>
+              <a:t>13.11.2017</a:t>
             </a:fld>
             <a:endParaRPr lang="de-CH"/>
           </a:p>
@@ -3983,7 +3991,7 @@
           <a:p>
             <a:fld id="{3A1252E9-4524-49D3-BD4A-3946534EE29A}" type="datetimeFigureOut">
               <a:rPr lang="de-CH" smtClean="0"/>
-              <a:t>12.11.2017</a:t>
+              <a:t>13.11.2017</a:t>
             </a:fld>
             <a:endParaRPr lang="de-CH"/>
           </a:p>
@@ -4227,7 +4235,7 @@
           <a:p>
             <a:fld id="{3A1252E9-4524-49D3-BD4A-3946534EE29A}" type="datetimeFigureOut">
               <a:rPr lang="de-CH" smtClean="0"/>
-              <a:t>12.11.2017</a:t>
+              <a:t>13.11.2017</a:t>
             </a:fld>
             <a:endParaRPr lang="de-CH"/>
           </a:p>
@@ -4459,7 +4467,7 @@
           <a:p>
             <a:fld id="{3A1252E9-4524-49D3-BD4A-3946534EE29A}" type="datetimeFigureOut">
               <a:rPr lang="de-CH" smtClean="0"/>
-              <a:t>12.11.2017</a:t>
+              <a:t>13.11.2017</a:t>
             </a:fld>
             <a:endParaRPr lang="de-CH"/>
           </a:p>
@@ -4826,7 +4834,7 @@
           <a:p>
             <a:fld id="{3A1252E9-4524-49D3-BD4A-3946534EE29A}" type="datetimeFigureOut">
               <a:rPr lang="de-CH" smtClean="0"/>
-              <a:t>12.11.2017</a:t>
+              <a:t>13.11.2017</a:t>
             </a:fld>
             <a:endParaRPr lang="de-CH"/>
           </a:p>
@@ -4944,7 +4952,7 @@
           <a:p>
             <a:fld id="{3A1252E9-4524-49D3-BD4A-3946534EE29A}" type="datetimeFigureOut">
               <a:rPr lang="de-CH" smtClean="0"/>
-              <a:t>12.11.2017</a:t>
+              <a:t>13.11.2017</a:t>
             </a:fld>
             <a:endParaRPr lang="de-CH"/>
           </a:p>
@@ -5039,7 +5047,7 @@
           <a:p>
             <a:fld id="{3A1252E9-4524-49D3-BD4A-3946534EE29A}" type="datetimeFigureOut">
               <a:rPr lang="de-CH" smtClean="0"/>
-              <a:t>12.11.2017</a:t>
+              <a:t>13.11.2017</a:t>
             </a:fld>
             <a:endParaRPr lang="de-CH"/>
           </a:p>
@@ -5316,7 +5324,7 @@
           <a:p>
             <a:fld id="{3A1252E9-4524-49D3-BD4A-3946534EE29A}" type="datetimeFigureOut">
               <a:rPr lang="de-CH" smtClean="0"/>
-              <a:t>12.11.2017</a:t>
+              <a:t>13.11.2017</a:t>
             </a:fld>
             <a:endParaRPr lang="de-CH"/>
           </a:p>
@@ -5573,7 +5581,7 @@
           <a:p>
             <a:fld id="{3A1252E9-4524-49D3-BD4A-3946534EE29A}" type="datetimeFigureOut">
               <a:rPr lang="de-CH" smtClean="0"/>
-              <a:t>12.11.2017</a:t>
+              <a:t>13.11.2017</a:t>
             </a:fld>
             <a:endParaRPr lang="de-CH"/>
           </a:p>
@@ -5786,7 +5794,7 @@
           <a:p>
             <a:fld id="{3A1252E9-4524-49D3-BD4A-3946534EE29A}" type="datetimeFigureOut">
               <a:rPr lang="de-CH" smtClean="0"/>
-              <a:t>12.11.2017</a:t>
+              <a:t>13.11.2017</a:t>
             </a:fld>
             <a:endParaRPr lang="de-CH"/>
           </a:p>
@@ -9610,6 +9618,386 @@
           </a:p>
         </p:txBody>
       </p:sp>
+      <p:sp>
+        <p:nvSpPr>
+          <p:cNvPr id="4" name="Rechteck: abgerundete Ecken 3">
+            <a:extLst>
+              <a:ext uri="{FF2B5EF4-FFF2-40B4-BE49-F238E27FC236}">
+                <a16:creationId xmlns:a16="http://schemas.microsoft.com/office/drawing/2014/main" id="{5F675E85-0A06-4D85-BAC6-2342828215F8}"/>
+              </a:ext>
+            </a:extLst>
+          </p:cNvPr>
+          <p:cNvSpPr/>
+          <p:nvPr/>
+        </p:nvSpPr>
+        <p:spPr>
+          <a:xfrm>
+            <a:off x="6380252" y="494731"/>
+            <a:ext cx="1736333" cy="974473"/>
+          </a:xfrm>
+          <a:prstGeom prst="roundRect">
+            <a:avLst/>
+          </a:prstGeom>
+        </p:spPr>
+        <p:style>
+          <a:lnRef idx="2">
+            <a:schemeClr val="accent1">
+              <a:shade val="50000"/>
+            </a:schemeClr>
+          </a:lnRef>
+          <a:fillRef idx="1">
+            <a:schemeClr val="accent1"/>
+          </a:fillRef>
+          <a:effectRef idx="0">
+            <a:schemeClr val="accent1"/>
+          </a:effectRef>
+          <a:fontRef idx="minor">
+            <a:schemeClr val="lt1"/>
+          </a:fontRef>
+        </p:style>
+        <p:txBody>
+          <a:bodyPr rtlCol="0" anchor="ctr"/>
+          <a:lstStyle/>
+          <a:p>
+            <a:pPr algn="ctr"/>
+            <a:r>
+              <a:rPr lang="de-CH" dirty="0"/>
+              <a:t>Ext APIs</a:t>
+            </a:r>
+          </a:p>
+          <a:p>
+            <a:pPr algn="ctr"/>
+            <a:r>
+              <a:rPr lang="de-CH" dirty="0" err="1"/>
+              <a:t>for</a:t>
+            </a:r>
+            <a:r>
+              <a:rPr lang="de-CH" dirty="0"/>
+              <a:t> </a:t>
+            </a:r>
+            <a:r>
+              <a:rPr lang="de-CH" dirty="0" err="1"/>
+              <a:t>weather</a:t>
+            </a:r>
+            <a:r>
+              <a:rPr lang="de-CH" dirty="0"/>
+              <a:t> and </a:t>
+            </a:r>
+            <a:r>
+              <a:rPr lang="de-CH" dirty="0" err="1"/>
+              <a:t>snow</a:t>
+            </a:r>
+            <a:endParaRPr lang="de-CH" dirty="0"/>
+          </a:p>
+        </p:txBody>
+      </p:sp>
+      <p:sp>
+        <p:nvSpPr>
+          <p:cNvPr id="5" name="Rechteck: abgerundete Ecken 4">
+            <a:extLst>
+              <a:ext uri="{FF2B5EF4-FFF2-40B4-BE49-F238E27FC236}">
+                <a16:creationId xmlns:a16="http://schemas.microsoft.com/office/drawing/2014/main" id="{95F35A2F-AC4D-45B8-8A2D-D272DC04F04D}"/>
+              </a:ext>
+            </a:extLst>
+          </p:cNvPr>
+          <p:cNvSpPr/>
+          <p:nvPr/>
+        </p:nvSpPr>
+        <p:spPr>
+          <a:xfrm>
+            <a:off x="6380250" y="1985823"/>
+            <a:ext cx="1736335" cy="973133"/>
+          </a:xfrm>
+          <a:prstGeom prst="roundRect">
+            <a:avLst/>
+          </a:prstGeom>
+        </p:spPr>
+        <p:style>
+          <a:lnRef idx="2">
+            <a:schemeClr val="accent1">
+              <a:shade val="50000"/>
+            </a:schemeClr>
+          </a:lnRef>
+          <a:fillRef idx="1">
+            <a:schemeClr val="accent1"/>
+          </a:fillRef>
+          <a:effectRef idx="0">
+            <a:schemeClr val="accent1"/>
+          </a:effectRef>
+          <a:fontRef idx="minor">
+            <a:schemeClr val="lt1"/>
+          </a:fontRef>
+        </p:style>
+        <p:txBody>
+          <a:bodyPr rtlCol="0" anchor="ctr"/>
+          <a:lstStyle/>
+          <a:p>
+            <a:pPr algn="ctr"/>
+            <a:r>
+              <a:rPr lang="de-CH" dirty="0"/>
+              <a:t>Server Java </a:t>
+            </a:r>
+            <a:r>
+              <a:rPr lang="de-CH" dirty="0" err="1"/>
+              <a:t>Application</a:t>
+            </a:r>
+            <a:endParaRPr lang="de-CH" dirty="0"/>
+          </a:p>
+        </p:txBody>
+      </p:sp>
+      <p:sp>
+        <p:nvSpPr>
+          <p:cNvPr id="6" name="Rechteck: abgerundete Ecken 5">
+            <a:extLst>
+              <a:ext uri="{FF2B5EF4-FFF2-40B4-BE49-F238E27FC236}">
+                <a16:creationId xmlns:a16="http://schemas.microsoft.com/office/drawing/2014/main" id="{0F75DC7A-5B7D-418C-9968-754E2E3587D6}"/>
+              </a:ext>
+            </a:extLst>
+          </p:cNvPr>
+          <p:cNvSpPr/>
+          <p:nvPr/>
+        </p:nvSpPr>
+        <p:spPr>
+          <a:xfrm>
+            <a:off x="6380250" y="3672740"/>
+            <a:ext cx="1736335" cy="973133"/>
+          </a:xfrm>
+          <a:prstGeom prst="roundRect">
+            <a:avLst/>
+          </a:prstGeom>
+        </p:spPr>
+        <p:style>
+          <a:lnRef idx="2">
+            <a:schemeClr val="accent1">
+              <a:shade val="50000"/>
+            </a:schemeClr>
+          </a:lnRef>
+          <a:fillRef idx="1">
+            <a:schemeClr val="accent1"/>
+          </a:fillRef>
+          <a:effectRef idx="0">
+            <a:schemeClr val="accent1"/>
+          </a:effectRef>
+          <a:fontRef idx="minor">
+            <a:schemeClr val="lt1"/>
+          </a:fontRef>
+        </p:style>
+        <p:txBody>
+          <a:bodyPr rtlCol="0" anchor="ctr"/>
+          <a:lstStyle/>
+          <a:p>
+            <a:pPr algn="ctr"/>
+            <a:r>
+              <a:rPr lang="de-CH" dirty="0" err="1"/>
+              <a:t>Firebase</a:t>
+            </a:r>
+            <a:endParaRPr lang="de-CH" dirty="0"/>
+          </a:p>
+          <a:p>
+            <a:pPr algn="ctr"/>
+            <a:r>
+              <a:rPr lang="de-CH" dirty="0" err="1"/>
+              <a:t>realtime</a:t>
+            </a:r>
+            <a:r>
+              <a:rPr lang="de-CH" dirty="0"/>
+              <a:t> DB</a:t>
+            </a:r>
+          </a:p>
+          <a:p>
+            <a:pPr algn="ctr"/>
+            <a:r>
+              <a:rPr lang="de-CH" dirty="0" err="1"/>
+              <a:t>GeoFire</a:t>
+            </a:r>
+            <a:endParaRPr lang="de-CH" dirty="0"/>
+          </a:p>
+        </p:txBody>
+      </p:sp>
+      <p:sp>
+        <p:nvSpPr>
+          <p:cNvPr id="7" name="Rechteck: abgerundete Ecken 6">
+            <a:extLst>
+              <a:ext uri="{FF2B5EF4-FFF2-40B4-BE49-F238E27FC236}">
+                <a16:creationId xmlns:a16="http://schemas.microsoft.com/office/drawing/2014/main" id="{1DC10044-7DAE-437F-93C8-4F5DCCF310A9}"/>
+              </a:ext>
+            </a:extLst>
+          </p:cNvPr>
+          <p:cNvSpPr/>
+          <p:nvPr/>
+        </p:nvSpPr>
+        <p:spPr>
+          <a:xfrm>
+            <a:off x="6380252" y="5359659"/>
+            <a:ext cx="1736333" cy="973134"/>
+          </a:xfrm>
+          <a:prstGeom prst="roundRect">
+            <a:avLst/>
+          </a:prstGeom>
+        </p:spPr>
+        <p:style>
+          <a:lnRef idx="2">
+            <a:schemeClr val="accent1">
+              <a:shade val="50000"/>
+            </a:schemeClr>
+          </a:lnRef>
+          <a:fillRef idx="1">
+            <a:schemeClr val="accent1"/>
+          </a:fillRef>
+          <a:effectRef idx="0">
+            <a:schemeClr val="accent1"/>
+          </a:effectRef>
+          <a:fontRef idx="minor">
+            <a:schemeClr val="lt1"/>
+          </a:fontRef>
+        </p:style>
+        <p:txBody>
+          <a:bodyPr rtlCol="0" anchor="ctr"/>
+          <a:lstStyle/>
+          <a:p>
+            <a:pPr algn="ctr"/>
+            <a:r>
+              <a:rPr lang="de-CH" dirty="0"/>
+              <a:t>Ski-Compass</a:t>
+            </a:r>
+          </a:p>
+          <a:p>
+            <a:pPr algn="ctr"/>
+            <a:r>
+              <a:rPr lang="de-CH" dirty="0"/>
+              <a:t>Android App</a:t>
+            </a:r>
+          </a:p>
+        </p:txBody>
+      </p:sp>
+      <p:cxnSp>
+        <p:nvCxnSpPr>
+          <p:cNvPr id="9" name="Gerade Verbindung mit Pfeil 8">
+            <a:extLst>
+              <a:ext uri="{FF2B5EF4-FFF2-40B4-BE49-F238E27FC236}">
+                <a16:creationId xmlns:a16="http://schemas.microsoft.com/office/drawing/2014/main" id="{F1C721D0-063F-4D94-88BD-3EB95B9ACFC0}"/>
+              </a:ext>
+            </a:extLst>
+          </p:cNvPr>
+          <p:cNvCxnSpPr>
+            <a:stCxn id="4" idx="2"/>
+            <a:endCxn id="5" idx="0"/>
+          </p:cNvCxnSpPr>
+          <p:nvPr/>
+        </p:nvCxnSpPr>
+        <p:spPr>
+          <a:xfrm flipH="1">
+            <a:off x="7248418" y="1469204"/>
+            <a:ext cx="1" cy="516619"/>
+          </a:xfrm>
+          <a:prstGeom prst="straightConnector1">
+            <a:avLst/>
+          </a:prstGeom>
+          <a:ln>
+            <a:tailEnd type="triangle"/>
+          </a:ln>
+        </p:spPr>
+        <p:style>
+          <a:lnRef idx="1">
+            <a:schemeClr val="accent1"/>
+          </a:lnRef>
+          <a:fillRef idx="0">
+            <a:schemeClr val="accent1"/>
+          </a:fillRef>
+          <a:effectRef idx="0">
+            <a:schemeClr val="accent1"/>
+          </a:effectRef>
+          <a:fontRef idx="minor">
+            <a:schemeClr val="tx1"/>
+          </a:fontRef>
+        </p:style>
+      </p:cxnSp>
+      <p:cxnSp>
+        <p:nvCxnSpPr>
+          <p:cNvPr id="10" name="Gerade Verbindung mit Pfeil 9">
+            <a:extLst>
+              <a:ext uri="{FF2B5EF4-FFF2-40B4-BE49-F238E27FC236}">
+                <a16:creationId xmlns:a16="http://schemas.microsoft.com/office/drawing/2014/main" id="{A2A2979F-EEAA-4FED-B403-2B1B67569FB5}"/>
+              </a:ext>
+            </a:extLst>
+          </p:cNvPr>
+          <p:cNvCxnSpPr>
+            <a:cxnSpLocks/>
+            <a:stCxn id="5" idx="2"/>
+            <a:endCxn id="6" idx="0"/>
+          </p:cNvCxnSpPr>
+          <p:nvPr/>
+        </p:nvCxnSpPr>
+        <p:spPr>
+          <a:xfrm>
+            <a:off x="7248418" y="2958956"/>
+            <a:ext cx="0" cy="713784"/>
+          </a:xfrm>
+          <a:prstGeom prst="straightConnector1">
+            <a:avLst/>
+          </a:prstGeom>
+          <a:ln>
+            <a:tailEnd type="triangle"/>
+          </a:ln>
+        </p:spPr>
+        <p:style>
+          <a:lnRef idx="1">
+            <a:schemeClr val="accent1"/>
+          </a:lnRef>
+          <a:fillRef idx="0">
+            <a:schemeClr val="accent1"/>
+          </a:fillRef>
+          <a:effectRef idx="0">
+            <a:schemeClr val="accent1"/>
+          </a:effectRef>
+          <a:fontRef idx="minor">
+            <a:schemeClr val="tx1"/>
+          </a:fontRef>
+        </p:style>
+      </p:cxnSp>
+      <p:cxnSp>
+        <p:nvCxnSpPr>
+          <p:cNvPr id="13" name="Gerade Verbindung mit Pfeil 12">
+            <a:extLst>
+              <a:ext uri="{FF2B5EF4-FFF2-40B4-BE49-F238E27FC236}">
+                <a16:creationId xmlns:a16="http://schemas.microsoft.com/office/drawing/2014/main" id="{83ECD0CF-2D72-44E3-A627-9358E035C3C8}"/>
+              </a:ext>
+            </a:extLst>
+          </p:cNvPr>
+          <p:cNvCxnSpPr>
+            <a:cxnSpLocks/>
+            <a:stCxn id="6" idx="2"/>
+            <a:endCxn id="7" idx="0"/>
+          </p:cNvCxnSpPr>
+          <p:nvPr/>
+        </p:nvCxnSpPr>
+        <p:spPr>
+          <a:xfrm>
+            <a:off x="7248418" y="4645873"/>
+            <a:ext cx="1" cy="713786"/>
+          </a:xfrm>
+          <a:prstGeom prst="straightConnector1">
+            <a:avLst/>
+          </a:prstGeom>
+          <a:ln>
+            <a:tailEnd type="triangle"/>
+          </a:ln>
+        </p:spPr>
+        <p:style>
+          <a:lnRef idx="1">
+            <a:schemeClr val="accent1"/>
+          </a:lnRef>
+          <a:fillRef idx="0">
+            <a:schemeClr val="accent1"/>
+          </a:fillRef>
+          <a:effectRef idx="0">
+            <a:schemeClr val="accent1"/>
+          </a:effectRef>
+          <a:fontRef idx="minor">
+            <a:schemeClr val="tx1"/>
+          </a:fontRef>
+        </p:style>
+      </p:cxnSp>
     </p:spTree>
     <p:extLst>
       <p:ext uri="{BB962C8B-B14F-4D97-AF65-F5344CB8AC3E}">

</xml_diff>

<commit_message>
Added slide for app-architecture. Minor changes in slide flow.
</commit_message>
<xml_diff>
--- a/Documents/Presentation/Presentation.pptx
+++ b/Documents/Presentation/Presentation.pptx
@@ -5,7 +5,7 @@
     <p:sldMasterId id="2147483660" r:id="rId1"/>
   </p:sldMasterIdLst>
   <p:notesMasterIdLst>
-    <p:notesMasterId r:id="rId16"/>
+    <p:notesMasterId r:id="rId17"/>
   </p:notesMasterIdLst>
   <p:sldIdLst>
     <p:sldId id="256" r:id="rId2"/>
@@ -15,13 +15,14 @@
     <p:sldId id="261" r:id="rId6"/>
     <p:sldId id="262" r:id="rId7"/>
     <p:sldId id="263" r:id="rId8"/>
-    <p:sldId id="268" r:id="rId9"/>
-    <p:sldId id="264" r:id="rId10"/>
-    <p:sldId id="265" r:id="rId11"/>
-    <p:sldId id="270" r:id="rId12"/>
+    <p:sldId id="273" r:id="rId9"/>
+    <p:sldId id="268" r:id="rId10"/>
+    <p:sldId id="264" r:id="rId11"/>
+    <p:sldId id="265" r:id="rId12"/>
     <p:sldId id="269" r:id="rId13"/>
-    <p:sldId id="272" r:id="rId14"/>
-    <p:sldId id="266" r:id="rId15"/>
+    <p:sldId id="270" r:id="rId14"/>
+    <p:sldId id="272" r:id="rId15"/>
+    <p:sldId id="266" r:id="rId16"/>
   </p:sldIdLst>
   <p:sldSz cx="9144000" cy="6858000" type="screen4x3"/>
   <p:notesSz cx="6858000" cy="9144000"/>
@@ -527,16 +528,40 @@
           <a:lstStyle/>
           <a:p>
             <a:r>
+              <a:rPr lang="de-CH" dirty="0"/>
+              <a:t>Motivation: 	Value </a:t>
+            </a:r>
+            <a:r>
+              <a:rPr lang="de-CH" dirty="0" err="1"/>
+              <a:t>for</a:t>
+            </a:r>
+            <a:r>
+              <a:rPr lang="de-CH" dirty="0"/>
+              <a:t> Users: Benutzern (also auch uns) die Möglichkeit geben, andere Skigebiete kennenzulernen. Die Auswahl des Zieles zu vereinfachen.</a:t>
+            </a:r>
+          </a:p>
+          <a:p>
+            <a:r>
+              <a:rPr lang="de-CH" dirty="0"/>
+              <a:t>	Value </a:t>
+            </a:r>
+            <a:r>
+              <a:rPr lang="de-CH" dirty="0" err="1"/>
+              <a:t>for</a:t>
+            </a:r>
+            <a:r>
+              <a:rPr lang="de-CH" dirty="0"/>
+              <a:t> Stakeholder: Geldverdienen mit Werbung von Skiartikeln, Skigebiete können kostenpflichtig Bilder o.ä. aufschalten.</a:t>
+            </a:r>
+          </a:p>
+          <a:p>
+            <a:r>
               <a:rPr lang="de-CH" dirty="0" err="1"/>
               <a:t>Functions</a:t>
             </a:r>
             <a:r>
               <a:rPr lang="de-CH" dirty="0"/>
-              <a:t>: Anzeigen der 10 nächstgelegenen Skigebieten, sortiert nach eigenen Wünschen, Anzeigen von Detailinfos zum Ort, Möglichkeit die Website zu besuchen und die Navigation </a:t>
-            </a:r>
-            <a:r>
-              <a:rPr lang="de-CH"/>
-              <a:t>zu starten</a:t>
+              <a:t>: Anzeigen der 10 nächstgelegenen Skigebieten, sortiert nach eigenen Wünschen, Anzeigen von Detailinfos zum Ort, Möglichkeit die Website zu besuchen und die Navigation zu starten</a:t>
             </a:r>
           </a:p>
         </p:txBody>
@@ -622,65 +647,12 @@
           <a:lstStyle/>
           <a:p>
             <a:r>
-              <a:rPr lang="en-GB" dirty="0" err="1"/>
-              <a:t>Zusammenfassung</a:t>
-            </a:r>
-            <a:endParaRPr lang="en-GB" dirty="0"/>
-          </a:p>
-          <a:p>
-            <a:pPr marL="171450" indent="-171450">
-              <a:buFontTx/>
-              <a:buChar char="-"/>
-            </a:pPr>
-            <a:r>
-              <a:rPr lang="en-GB" dirty="0"/>
-              <a:t>Zu </a:t>
-            </a:r>
-            <a:r>
-              <a:rPr lang="en-GB" dirty="0" err="1"/>
-              <a:t>wenig</a:t>
-            </a:r>
-            <a:r>
-              <a:rPr lang="en-GB" dirty="0"/>
-              <a:t> Zeit </a:t>
-            </a:r>
-            <a:r>
-              <a:rPr lang="en-GB" dirty="0" err="1"/>
-              <a:t>wie</a:t>
-            </a:r>
-            <a:r>
-              <a:rPr lang="en-GB" dirty="0"/>
-              <a:t> in </a:t>
-            </a:r>
-            <a:r>
-              <a:rPr lang="en-GB" dirty="0" err="1"/>
-              <a:t>Projekten</a:t>
-            </a:r>
-            <a:r>
-              <a:rPr lang="en-GB" dirty="0"/>
-              <a:t> so </a:t>
-            </a:r>
-            <a:r>
-              <a:rPr lang="en-GB" dirty="0" err="1"/>
-              <a:t>üblich</a:t>
-            </a:r>
-            <a:r>
-              <a:rPr lang="en-GB" dirty="0"/>
-              <a:t> ;-)</a:t>
-            </a:r>
-          </a:p>
-          <a:p>
-            <a:pPr marL="171450" indent="-171450">
-              <a:buFontTx/>
-              <a:buChar char="-"/>
-            </a:pPr>
-            <a:r>
-              <a:rPr lang="en-GB" dirty="0"/>
-              <a:t>Android </a:t>
-            </a:r>
-            <a:r>
-              <a:rPr lang="en-GB" dirty="0" err="1"/>
-              <a:t>Umgebung</a:t>
+              <a:rPr lang="en-GB" dirty="0"/>
+              <a:t>Demo. Script </a:t>
+            </a:r>
+            <a:r>
+              <a:rPr lang="en-GB" dirty="0" err="1"/>
+              <a:t>vorbereiten</a:t>
             </a:r>
             <a:r>
               <a:rPr lang="en-GB" dirty="0"/>
@@ -688,319 +660,12 @@
             </a:r>
             <a:r>
               <a:rPr lang="en-GB" dirty="0" err="1"/>
-              <a:t>besser</a:t>
-            </a:r>
-            <a:r>
-              <a:rPr lang="en-GB" dirty="0"/>
-              <a:t> </a:t>
-            </a:r>
-            <a:r>
-              <a:rPr lang="en-GB" dirty="0" err="1"/>
-              <a:t>kennengelern</a:t>
-            </a:r>
-            <a:r>
-              <a:rPr lang="en-GB" dirty="0"/>
-              <a:t>.</a:t>
-            </a:r>
-          </a:p>
-          <a:p>
-            <a:pPr marL="171450" indent="-171450">
-              <a:buFontTx/>
-              <a:buChar char="-"/>
-            </a:pPr>
-            <a:r>
-              <a:rPr lang="en-GB" dirty="0" err="1"/>
-              <a:t>Unzählige</a:t>
-            </a:r>
-            <a:r>
-              <a:rPr lang="en-GB" dirty="0"/>
-              <a:t> Tools und </a:t>
-            </a:r>
-            <a:r>
-              <a:rPr lang="en-GB" dirty="0" err="1"/>
-              <a:t>Bibliotheken</a:t>
-            </a:r>
-            <a:r>
-              <a:rPr lang="en-GB" dirty="0"/>
-              <a:t>. </a:t>
-            </a:r>
-            <a:r>
-              <a:rPr lang="en-GB" dirty="0" err="1"/>
-              <a:t>Für</a:t>
-            </a:r>
-            <a:r>
-              <a:rPr lang="en-GB" dirty="0"/>
-              <a:t> </a:t>
-            </a:r>
-            <a:r>
-              <a:rPr lang="en-GB" dirty="0" err="1"/>
-              <a:t>jede</a:t>
-            </a:r>
-            <a:r>
-              <a:rPr lang="en-GB" dirty="0"/>
-              <a:t> </a:t>
-            </a:r>
-            <a:r>
-              <a:rPr lang="en-GB" dirty="0" err="1"/>
-              <a:t>Frage</a:t>
-            </a:r>
-            <a:r>
-              <a:rPr lang="en-GB" dirty="0"/>
-              <a:t> </a:t>
-            </a:r>
-            <a:r>
-              <a:rPr lang="en-GB" dirty="0" err="1"/>
-              <a:t>gibt</a:t>
-            </a:r>
-            <a:r>
-              <a:rPr lang="en-GB" dirty="0"/>
-              <a:t> </a:t>
-            </a:r>
-            <a:r>
-              <a:rPr lang="en-GB" dirty="0" err="1"/>
-              <a:t>es</a:t>
-            </a:r>
-            <a:r>
-              <a:rPr lang="en-GB" dirty="0"/>
-              <a:t> </a:t>
-            </a:r>
-            <a:r>
-              <a:rPr lang="en-GB" dirty="0" err="1"/>
-              <a:t>meist</a:t>
-            </a:r>
-            <a:r>
-              <a:rPr lang="en-GB" dirty="0"/>
-              <a:t> </a:t>
-            </a:r>
-            <a:r>
-              <a:rPr lang="en-GB" dirty="0" err="1"/>
-              <a:t>schon</a:t>
-            </a:r>
-            <a:r>
-              <a:rPr lang="en-GB" dirty="0"/>
-              <a:t> </a:t>
-            </a:r>
-            <a:r>
-              <a:rPr lang="en-GB" dirty="0" err="1"/>
-              <a:t>eine</a:t>
-            </a:r>
-            <a:r>
-              <a:rPr lang="en-GB" dirty="0"/>
-              <a:t> API</a:t>
-            </a:r>
-          </a:p>
-          <a:p>
-            <a:pPr marL="171450" indent="-171450">
-              <a:buFontTx/>
-              <a:buChar char="-"/>
-            </a:pPr>
-            <a:r>
-              <a:rPr lang="en-GB" dirty="0" err="1"/>
-              <a:t>Mächtige</a:t>
-            </a:r>
-            <a:r>
-              <a:rPr lang="en-GB" dirty="0"/>
-              <a:t> </a:t>
-            </a:r>
-            <a:r>
-              <a:rPr lang="en-GB" dirty="0" err="1"/>
-              <a:t>Umgebung</a:t>
-            </a:r>
-            <a:r>
-              <a:rPr lang="en-GB" dirty="0"/>
-              <a:t> Firebase.</a:t>
-            </a:r>
-          </a:p>
-          <a:p>
-            <a:pPr marL="171450" indent="-171450">
-              <a:buFontTx/>
-              <a:buChar char="-"/>
-            </a:pPr>
-            <a:endParaRPr lang="en-GB" dirty="0"/>
-          </a:p>
-          <a:p>
-            <a:pPr marL="0" indent="0">
-              <a:buFontTx/>
-              <a:buNone/>
-            </a:pPr>
-            <a:r>
-              <a:rPr lang="en-GB" dirty="0" err="1"/>
-              <a:t>Zukünftig</a:t>
-            </a:r>
-            <a:r>
-              <a:rPr lang="en-GB" dirty="0"/>
-              <a:t> Work</a:t>
-            </a:r>
-          </a:p>
-          <a:p>
-            <a:pPr marL="171450" indent="-171450">
-              <a:buFontTx/>
-              <a:buChar char="-"/>
-            </a:pPr>
-            <a:r>
-              <a:rPr lang="en-GB" dirty="0"/>
-              <a:t>App </a:t>
-            </a:r>
-            <a:r>
-              <a:rPr lang="en-GB" dirty="0" err="1"/>
-              <a:t>mit</a:t>
-            </a:r>
-            <a:r>
-              <a:rPr lang="en-GB" dirty="0"/>
-              <a:t> </a:t>
-            </a:r>
-            <a:r>
-              <a:rPr lang="en-GB" dirty="0" err="1"/>
-              <a:t>Werbung</a:t>
-            </a:r>
-            <a:r>
-              <a:rPr lang="en-GB" dirty="0"/>
-              <a:t> </a:t>
-            </a:r>
-            <a:r>
-              <a:rPr lang="en-GB" dirty="0" err="1"/>
-              <a:t>versehen</a:t>
-            </a:r>
-            <a:r>
-              <a:rPr lang="en-GB" dirty="0"/>
-              <a:t>.</a:t>
-            </a:r>
-          </a:p>
-          <a:p>
-            <a:pPr marL="171450" indent="-171450">
-              <a:buFontTx/>
-              <a:buChar char="-"/>
-            </a:pPr>
-            <a:r>
-              <a:rPr lang="en-GB" dirty="0" err="1"/>
-              <a:t>Bezahlende</a:t>
-            </a:r>
-            <a:r>
-              <a:rPr lang="en-GB" dirty="0"/>
-              <a:t> </a:t>
-            </a:r>
-            <a:r>
-              <a:rPr lang="en-GB" dirty="0" err="1"/>
-              <a:t>Kunden</a:t>
-            </a:r>
-            <a:r>
-              <a:rPr lang="en-GB" dirty="0"/>
-              <a:t> (</a:t>
-            </a:r>
-            <a:r>
-              <a:rPr lang="en-GB" dirty="0" err="1"/>
-              <a:t>Skigebiete</a:t>
-            </a:r>
-            <a:r>
-              <a:rPr lang="en-GB" dirty="0"/>
-              <a:t>) </a:t>
-            </a:r>
-            <a:r>
-              <a:rPr lang="en-GB" dirty="0" err="1"/>
-              <a:t>werden</a:t>
-            </a:r>
-            <a:r>
-              <a:rPr lang="en-GB" dirty="0"/>
-              <a:t> </a:t>
-            </a:r>
-            <a:r>
-              <a:rPr lang="en-GB" dirty="0" err="1"/>
-              <a:t>Priorisiert</a:t>
-            </a:r>
-            <a:r>
-              <a:rPr lang="en-GB" dirty="0"/>
-              <a:t> </a:t>
-            </a:r>
-            <a:r>
-              <a:rPr lang="en-GB" dirty="0" err="1"/>
-              <a:t>angezeigt</a:t>
-            </a:r>
-            <a:endParaRPr lang="en-GB" dirty="0"/>
-          </a:p>
-          <a:p>
-            <a:pPr marL="171450" indent="-171450">
-              <a:buFontTx/>
-              <a:buChar char="-"/>
-            </a:pPr>
-            <a:r>
-              <a:rPr lang="en-GB" dirty="0" err="1"/>
-              <a:t>Filterfunktionen</a:t>
-            </a:r>
-            <a:r>
-              <a:rPr lang="en-GB" dirty="0"/>
-              <a:t> </a:t>
-            </a:r>
-            <a:r>
-              <a:rPr lang="en-GB" dirty="0" err="1"/>
               <a:t>für</a:t>
             </a:r>
             <a:r>
               <a:rPr lang="en-GB" dirty="0"/>
-              <a:t> </a:t>
-            </a:r>
-            <a:r>
-              <a:rPr lang="en-GB" dirty="0" err="1"/>
-              <a:t>Benutzer</a:t>
-            </a:r>
-            <a:r>
-              <a:rPr lang="en-GB" dirty="0"/>
-              <a:t> </a:t>
-            </a:r>
-            <a:r>
-              <a:rPr lang="en-GB" dirty="0" err="1"/>
-              <a:t>einfügen</a:t>
-            </a:r>
-            <a:endParaRPr lang="en-GB" dirty="0"/>
-          </a:p>
-          <a:p>
-            <a:pPr marL="171450" indent="-171450">
-              <a:buFontTx/>
-              <a:buChar char="-"/>
-            </a:pPr>
-            <a:r>
-              <a:rPr lang="en-GB" dirty="0" err="1"/>
-              <a:t>Kostenpflichtige</a:t>
-            </a:r>
-            <a:r>
-              <a:rPr lang="en-GB" dirty="0"/>
-              <a:t> API </a:t>
-            </a:r>
-            <a:r>
-              <a:rPr lang="en-GB" dirty="0" err="1"/>
-              <a:t>einbinden</a:t>
-            </a:r>
-            <a:r>
-              <a:rPr lang="en-GB" dirty="0"/>
-              <a:t> -&gt; </a:t>
-            </a:r>
-            <a:r>
-              <a:rPr lang="en-GB" dirty="0" err="1"/>
-              <a:t>mehr</a:t>
-            </a:r>
-            <a:r>
-              <a:rPr lang="en-GB" dirty="0"/>
-              <a:t> </a:t>
-            </a:r>
-            <a:r>
-              <a:rPr lang="en-GB" dirty="0" err="1"/>
-              <a:t>Informationen</a:t>
-            </a:r>
-            <a:r>
-              <a:rPr lang="en-GB" dirty="0"/>
-              <a:t> und </a:t>
-            </a:r>
-            <a:r>
-              <a:rPr lang="en-GB" dirty="0" err="1"/>
-              <a:t>aktueller</a:t>
-            </a:r>
-            <a:endParaRPr lang="en-GB" dirty="0"/>
-          </a:p>
-          <a:p>
-            <a:pPr marL="171450" indent="-171450">
-              <a:buFontTx/>
-              <a:buChar char="-"/>
-            </a:pPr>
-            <a:endParaRPr lang="en-GB" dirty="0"/>
+              <a:t> Demo!!!</a:t>
+            </a:r>
           </a:p>
         </p:txBody>
       </p:sp>
@@ -1022,6 +687,469 @@
             <a:fld id="{748723F8-CD6B-45E3-B09A-75062809A4AE}" type="slidenum">
               <a:rPr lang="en-GB" smtClean="0"/>
               <a:t>14</a:t>
+            </a:fld>
+            <a:endParaRPr lang="en-GB"/>
+          </a:p>
+        </p:txBody>
+      </p:sp>
+    </p:spTree>
+    <p:extLst>
+      <p:ext uri="{BB962C8B-B14F-4D97-AF65-F5344CB8AC3E}">
+        <p14:creationId xmlns:p14="http://schemas.microsoft.com/office/powerpoint/2010/main" val="2530695747"/>
+      </p:ext>
+    </p:extLst>
+  </p:cSld>
+  <p:clrMapOvr>
+    <a:masterClrMapping/>
+  </p:clrMapOvr>
+</p:notes>
+</file>
+
+<file path=ppt/notesSlides/notesSlide11.xml><?xml version="1.0" encoding="utf-8"?>
+<p:notes xmlns:a="http://schemas.openxmlformats.org/drawingml/2006/main" xmlns:r="http://schemas.openxmlformats.org/officeDocument/2006/relationships" xmlns:p="http://schemas.openxmlformats.org/presentationml/2006/main">
+  <p:cSld>
+    <p:spTree>
+      <p:nvGrpSpPr>
+        <p:cNvPr id="1" name=""/>
+        <p:cNvGrpSpPr/>
+        <p:nvPr/>
+      </p:nvGrpSpPr>
+      <p:grpSpPr>
+        <a:xfrm>
+          <a:off x="0" y="0"/>
+          <a:ext cx="0" cy="0"/>
+          <a:chOff x="0" y="0"/>
+          <a:chExt cx="0" cy="0"/>
+        </a:xfrm>
+      </p:grpSpPr>
+      <p:sp>
+        <p:nvSpPr>
+          <p:cNvPr id="2" name="Folienbildplatzhalter 1"/>
+          <p:cNvSpPr>
+            <a:spLocks noGrp="1" noRot="1" noChangeAspect="1"/>
+          </p:cNvSpPr>
+          <p:nvPr>
+            <p:ph type="sldImg"/>
+          </p:nvPr>
+        </p:nvSpPr>
+        <p:spPr/>
+      </p:sp>
+      <p:sp>
+        <p:nvSpPr>
+          <p:cNvPr id="3" name="Notizenplatzhalter 2"/>
+          <p:cNvSpPr>
+            <a:spLocks noGrp="1"/>
+          </p:cNvSpPr>
+          <p:nvPr>
+            <p:ph type="body" idx="1"/>
+          </p:nvPr>
+        </p:nvSpPr>
+        <p:spPr/>
+        <p:txBody>
+          <a:bodyPr/>
+          <a:lstStyle/>
+          <a:p>
+            <a:r>
+              <a:rPr lang="en-GB" dirty="0" err="1"/>
+              <a:t>Zusammenfassung</a:t>
+            </a:r>
+            <a:endParaRPr lang="en-GB" dirty="0"/>
+          </a:p>
+          <a:p>
+            <a:pPr marL="171450" indent="-171450">
+              <a:buFontTx/>
+              <a:buChar char="-"/>
+            </a:pPr>
+            <a:r>
+              <a:rPr lang="en-GB" dirty="0"/>
+              <a:t>Zu </a:t>
+            </a:r>
+            <a:r>
+              <a:rPr lang="en-GB" dirty="0" err="1"/>
+              <a:t>wenig</a:t>
+            </a:r>
+            <a:r>
+              <a:rPr lang="en-GB" dirty="0"/>
+              <a:t> Zeit </a:t>
+            </a:r>
+            <a:r>
+              <a:rPr lang="en-GB" dirty="0" err="1"/>
+              <a:t>wie</a:t>
+            </a:r>
+            <a:r>
+              <a:rPr lang="en-GB" dirty="0"/>
+              <a:t> in </a:t>
+            </a:r>
+            <a:r>
+              <a:rPr lang="en-GB" dirty="0" err="1"/>
+              <a:t>Projekten</a:t>
+            </a:r>
+            <a:r>
+              <a:rPr lang="en-GB" dirty="0"/>
+              <a:t> so </a:t>
+            </a:r>
+            <a:r>
+              <a:rPr lang="en-GB" dirty="0" err="1"/>
+              <a:t>üblich</a:t>
+            </a:r>
+            <a:r>
+              <a:rPr lang="en-GB" dirty="0"/>
+              <a:t> ;-)</a:t>
+            </a:r>
+          </a:p>
+          <a:p>
+            <a:pPr marL="171450" indent="-171450">
+              <a:buFontTx/>
+              <a:buChar char="-"/>
+            </a:pPr>
+            <a:r>
+              <a:rPr lang="en-GB" dirty="0"/>
+              <a:t>Android </a:t>
+            </a:r>
+            <a:r>
+              <a:rPr lang="en-GB" dirty="0" err="1"/>
+              <a:t>Umgebung</a:t>
+            </a:r>
+            <a:r>
+              <a:rPr lang="en-GB" dirty="0"/>
+              <a:t> </a:t>
+            </a:r>
+            <a:r>
+              <a:rPr lang="en-GB" dirty="0" err="1"/>
+              <a:t>besser</a:t>
+            </a:r>
+            <a:r>
+              <a:rPr lang="en-GB" dirty="0"/>
+              <a:t> </a:t>
+            </a:r>
+            <a:r>
+              <a:rPr lang="en-GB" dirty="0" err="1"/>
+              <a:t>kennengelern</a:t>
+            </a:r>
+            <a:r>
+              <a:rPr lang="en-GB" dirty="0"/>
+              <a:t>.</a:t>
+            </a:r>
+          </a:p>
+          <a:p>
+            <a:pPr marL="171450" indent="-171450">
+              <a:buFontTx/>
+              <a:buChar char="-"/>
+            </a:pPr>
+            <a:r>
+              <a:rPr lang="en-GB" dirty="0" err="1"/>
+              <a:t>Unzählige</a:t>
+            </a:r>
+            <a:r>
+              <a:rPr lang="en-GB" dirty="0"/>
+              <a:t> Tools und </a:t>
+            </a:r>
+            <a:r>
+              <a:rPr lang="en-GB" dirty="0" err="1"/>
+              <a:t>Bibliotheken</a:t>
+            </a:r>
+            <a:r>
+              <a:rPr lang="en-GB" dirty="0"/>
+              <a:t>. </a:t>
+            </a:r>
+            <a:r>
+              <a:rPr lang="en-GB" dirty="0" err="1"/>
+              <a:t>Für</a:t>
+            </a:r>
+            <a:r>
+              <a:rPr lang="en-GB" dirty="0"/>
+              <a:t> </a:t>
+            </a:r>
+            <a:r>
+              <a:rPr lang="en-GB" dirty="0" err="1"/>
+              <a:t>jede</a:t>
+            </a:r>
+            <a:r>
+              <a:rPr lang="en-GB" dirty="0"/>
+              <a:t> </a:t>
+            </a:r>
+            <a:r>
+              <a:rPr lang="en-GB" dirty="0" err="1"/>
+              <a:t>Frage</a:t>
+            </a:r>
+            <a:r>
+              <a:rPr lang="en-GB" dirty="0"/>
+              <a:t> </a:t>
+            </a:r>
+            <a:r>
+              <a:rPr lang="en-GB" dirty="0" err="1"/>
+              <a:t>gibt</a:t>
+            </a:r>
+            <a:r>
+              <a:rPr lang="en-GB" dirty="0"/>
+              <a:t> </a:t>
+            </a:r>
+            <a:r>
+              <a:rPr lang="en-GB" dirty="0" err="1"/>
+              <a:t>es</a:t>
+            </a:r>
+            <a:r>
+              <a:rPr lang="en-GB" dirty="0"/>
+              <a:t> </a:t>
+            </a:r>
+            <a:r>
+              <a:rPr lang="en-GB" dirty="0" err="1"/>
+              <a:t>meist</a:t>
+            </a:r>
+            <a:r>
+              <a:rPr lang="en-GB" dirty="0"/>
+              <a:t> </a:t>
+            </a:r>
+            <a:r>
+              <a:rPr lang="en-GB" dirty="0" err="1"/>
+              <a:t>schon</a:t>
+            </a:r>
+            <a:r>
+              <a:rPr lang="en-GB" dirty="0"/>
+              <a:t> </a:t>
+            </a:r>
+            <a:r>
+              <a:rPr lang="en-GB" dirty="0" err="1"/>
+              <a:t>eine</a:t>
+            </a:r>
+            <a:r>
+              <a:rPr lang="en-GB" dirty="0"/>
+              <a:t> API</a:t>
+            </a:r>
+          </a:p>
+          <a:p>
+            <a:pPr marL="171450" indent="-171450">
+              <a:buFontTx/>
+              <a:buChar char="-"/>
+            </a:pPr>
+            <a:r>
+              <a:rPr lang="en-GB" dirty="0" err="1"/>
+              <a:t>Mächtige</a:t>
+            </a:r>
+            <a:r>
+              <a:rPr lang="en-GB" dirty="0"/>
+              <a:t> </a:t>
+            </a:r>
+            <a:r>
+              <a:rPr lang="en-GB" dirty="0" err="1"/>
+              <a:t>Umgebung</a:t>
+            </a:r>
+            <a:r>
+              <a:rPr lang="en-GB" dirty="0"/>
+              <a:t> Firebase.</a:t>
+            </a:r>
+          </a:p>
+          <a:p>
+            <a:pPr marL="171450" indent="-171450">
+              <a:buFontTx/>
+              <a:buChar char="-"/>
+            </a:pPr>
+            <a:endParaRPr lang="en-GB" dirty="0"/>
+          </a:p>
+          <a:p>
+            <a:pPr marL="0" indent="0">
+              <a:buFontTx/>
+              <a:buNone/>
+            </a:pPr>
+            <a:r>
+              <a:rPr lang="en-GB" dirty="0" err="1"/>
+              <a:t>Zukünftig</a:t>
+            </a:r>
+            <a:r>
+              <a:rPr lang="en-GB" dirty="0"/>
+              <a:t> Work</a:t>
+            </a:r>
+          </a:p>
+          <a:p>
+            <a:pPr marL="171450" indent="-171450">
+              <a:buFontTx/>
+              <a:buChar char="-"/>
+            </a:pPr>
+            <a:r>
+              <a:rPr lang="en-GB" dirty="0"/>
+              <a:t>App </a:t>
+            </a:r>
+            <a:r>
+              <a:rPr lang="en-GB" dirty="0" err="1"/>
+              <a:t>mit</a:t>
+            </a:r>
+            <a:r>
+              <a:rPr lang="en-GB" dirty="0"/>
+              <a:t> </a:t>
+            </a:r>
+            <a:r>
+              <a:rPr lang="en-GB" dirty="0" err="1"/>
+              <a:t>Werbung</a:t>
+            </a:r>
+            <a:r>
+              <a:rPr lang="en-GB" dirty="0"/>
+              <a:t> </a:t>
+            </a:r>
+            <a:r>
+              <a:rPr lang="en-GB" dirty="0" err="1"/>
+              <a:t>versehen</a:t>
+            </a:r>
+            <a:r>
+              <a:rPr lang="en-GB" dirty="0"/>
+              <a:t>.</a:t>
+            </a:r>
+          </a:p>
+          <a:p>
+            <a:pPr marL="171450" indent="-171450">
+              <a:buFontTx/>
+              <a:buChar char="-"/>
+            </a:pPr>
+            <a:r>
+              <a:rPr lang="en-GB" dirty="0" err="1"/>
+              <a:t>Bezahlende</a:t>
+            </a:r>
+            <a:r>
+              <a:rPr lang="en-GB" dirty="0"/>
+              <a:t> </a:t>
+            </a:r>
+            <a:r>
+              <a:rPr lang="en-GB" dirty="0" err="1"/>
+              <a:t>Kunden</a:t>
+            </a:r>
+            <a:r>
+              <a:rPr lang="en-GB" dirty="0"/>
+              <a:t> (</a:t>
+            </a:r>
+            <a:r>
+              <a:rPr lang="en-GB" dirty="0" err="1"/>
+              <a:t>Skigebiete</a:t>
+            </a:r>
+            <a:r>
+              <a:rPr lang="en-GB" dirty="0"/>
+              <a:t>) </a:t>
+            </a:r>
+            <a:r>
+              <a:rPr lang="en-GB" dirty="0" err="1"/>
+              <a:t>werden</a:t>
+            </a:r>
+            <a:r>
+              <a:rPr lang="en-GB" dirty="0"/>
+              <a:t> </a:t>
+            </a:r>
+            <a:r>
+              <a:rPr lang="en-GB" dirty="0" err="1"/>
+              <a:t>Priorisiert</a:t>
+            </a:r>
+            <a:r>
+              <a:rPr lang="en-GB" dirty="0"/>
+              <a:t> </a:t>
+            </a:r>
+            <a:r>
+              <a:rPr lang="en-GB" dirty="0" err="1"/>
+              <a:t>angezeigt</a:t>
+            </a:r>
+            <a:endParaRPr lang="en-GB" dirty="0"/>
+          </a:p>
+          <a:p>
+            <a:pPr marL="171450" indent="-171450">
+              <a:buFontTx/>
+              <a:buChar char="-"/>
+            </a:pPr>
+            <a:r>
+              <a:rPr lang="en-GB" dirty="0" err="1"/>
+              <a:t>Filterfunktionen</a:t>
+            </a:r>
+            <a:r>
+              <a:rPr lang="en-GB" dirty="0"/>
+              <a:t> </a:t>
+            </a:r>
+            <a:r>
+              <a:rPr lang="en-GB" dirty="0" err="1"/>
+              <a:t>für</a:t>
+            </a:r>
+            <a:r>
+              <a:rPr lang="en-GB" dirty="0"/>
+              <a:t> </a:t>
+            </a:r>
+            <a:r>
+              <a:rPr lang="en-GB" dirty="0" err="1"/>
+              <a:t>Benutzer</a:t>
+            </a:r>
+            <a:r>
+              <a:rPr lang="en-GB" dirty="0"/>
+              <a:t> </a:t>
+            </a:r>
+            <a:r>
+              <a:rPr lang="en-GB" dirty="0" err="1"/>
+              <a:t>einfügen</a:t>
+            </a:r>
+            <a:endParaRPr lang="en-GB" dirty="0"/>
+          </a:p>
+          <a:p>
+            <a:pPr marL="171450" indent="-171450">
+              <a:buFontTx/>
+              <a:buChar char="-"/>
+            </a:pPr>
+            <a:r>
+              <a:rPr lang="en-GB" dirty="0" err="1"/>
+              <a:t>Kostenpflichtige</a:t>
+            </a:r>
+            <a:r>
+              <a:rPr lang="en-GB" dirty="0"/>
+              <a:t> API </a:t>
+            </a:r>
+            <a:r>
+              <a:rPr lang="en-GB" dirty="0" err="1"/>
+              <a:t>einbinden</a:t>
+            </a:r>
+            <a:r>
+              <a:rPr lang="en-GB" dirty="0"/>
+              <a:t> -&gt; </a:t>
+            </a:r>
+            <a:r>
+              <a:rPr lang="en-GB" dirty="0" err="1"/>
+              <a:t>mehr</a:t>
+            </a:r>
+            <a:r>
+              <a:rPr lang="en-GB" dirty="0"/>
+              <a:t> </a:t>
+            </a:r>
+            <a:r>
+              <a:rPr lang="en-GB" dirty="0" err="1"/>
+              <a:t>Informationen</a:t>
+            </a:r>
+            <a:r>
+              <a:rPr lang="en-GB" dirty="0"/>
+              <a:t> und </a:t>
+            </a:r>
+            <a:r>
+              <a:rPr lang="en-GB" dirty="0" err="1"/>
+              <a:t>aktueller</a:t>
+            </a:r>
+            <a:endParaRPr lang="en-GB" dirty="0"/>
+          </a:p>
+          <a:p>
+            <a:pPr marL="171450" indent="-171450">
+              <a:buFontTx/>
+              <a:buChar char="-"/>
+            </a:pPr>
+            <a:endParaRPr lang="en-GB" dirty="0"/>
+          </a:p>
+        </p:txBody>
+      </p:sp>
+      <p:sp>
+        <p:nvSpPr>
+          <p:cNvPr id="4" name="Foliennummernplatzhalter 3"/>
+          <p:cNvSpPr>
+            <a:spLocks noGrp="1"/>
+          </p:cNvSpPr>
+          <p:nvPr>
+            <p:ph type="sldNum" sz="quarter" idx="10"/>
+          </p:nvPr>
+        </p:nvSpPr>
+        <p:spPr/>
+        <p:txBody>
+          <a:bodyPr/>
+          <a:lstStyle/>
+          <a:p>
+            <a:fld id="{748723F8-CD6B-45E3-B09A-75062809A4AE}" type="slidenum">
+              <a:rPr lang="en-GB" smtClean="0"/>
+              <a:t>15</a:t>
             </a:fld>
             <a:endParaRPr lang="en-GB"/>
           </a:p>
@@ -1566,7 +1694,63 @@
           <a:bodyPr/>
           <a:lstStyle/>
           <a:p>
-            <a:endParaRPr lang="en-GB" dirty="0"/>
+            <a:endParaRPr lang="de-CH" noProof="0" dirty="0"/>
+          </a:p>
+          <a:p>
+            <a:r>
+              <a:rPr lang="de-CH" noProof="0" dirty="0"/>
+              <a:t>Erklären das wir uns Szenarien überlegt haben.</a:t>
+            </a:r>
+          </a:p>
+          <a:p>
+            <a:r>
+              <a:rPr lang="de-CH" noProof="0" dirty="0"/>
+              <a:t>First </a:t>
+            </a:r>
+            <a:r>
+              <a:rPr lang="de-CH" noProof="0" dirty="0" err="1"/>
+              <a:t>use</a:t>
+            </a:r>
+            <a:r>
+              <a:rPr lang="de-CH" noProof="0" dirty="0"/>
+              <a:t>: Design ist einfach und intuitiv, daher auch Spinner in </a:t>
+            </a:r>
+            <a:r>
+              <a:rPr lang="de-CH" noProof="0" dirty="0" err="1"/>
+              <a:t>ActionBar</a:t>
+            </a:r>
+            <a:r>
+              <a:rPr lang="de-CH" noProof="0" dirty="0"/>
+              <a:t> und nicht unten (Bottom Navigation Bar)</a:t>
+            </a:r>
+          </a:p>
+          <a:p>
+            <a:r>
+              <a:rPr lang="de-CH" noProof="0" dirty="0"/>
+              <a:t>Regular </a:t>
+            </a:r>
+            <a:r>
+              <a:rPr lang="de-CH" noProof="0" dirty="0" err="1"/>
+              <a:t>user</a:t>
+            </a:r>
+            <a:r>
+              <a:rPr lang="de-CH" noProof="0" dirty="0"/>
+              <a:t>:</a:t>
+            </a:r>
+          </a:p>
+          <a:p>
+            <a:r>
+              <a:rPr lang="de-CH" noProof="0" dirty="0"/>
+              <a:t>Emergency </a:t>
+            </a:r>
+            <a:r>
+              <a:rPr lang="de-CH" noProof="0" dirty="0" err="1"/>
+              <a:t>use</a:t>
+            </a:r>
+            <a:r>
+              <a:rPr lang="de-CH" noProof="0" dirty="0"/>
+              <a:t>: Buttons auf Startseite für schnelles Suchen und Sortieren</a:t>
+            </a:r>
           </a:p>
         </p:txBody>
       </p:sp>
@@ -1652,31 +1836,7 @@
           <a:p>
             <a:r>
               <a:rPr lang="de-CH" dirty="0"/>
-              <a:t>Datenstruktur wird von API vorgegeben -&gt; </a:t>
-            </a:r>
-            <a:r>
-              <a:rPr lang="de-CH" dirty="0" err="1"/>
-              <a:t>SkiResort</a:t>
-            </a:r>
-            <a:r>
-              <a:rPr lang="de-CH" dirty="0"/>
-              <a:t> von einer API, </a:t>
-            </a:r>
-            <a:r>
-              <a:rPr lang="de-CH" dirty="0" err="1"/>
-              <a:t>WeatherData</a:t>
-            </a:r>
-            <a:r>
-              <a:rPr lang="de-CH" dirty="0"/>
-              <a:t> von anderer API, wird dynamisch an </a:t>
-            </a:r>
-            <a:r>
-              <a:rPr lang="de-CH" dirty="0" err="1"/>
-              <a:t>SkiResort</a:t>
-            </a:r>
-            <a:r>
-              <a:rPr lang="de-CH" dirty="0"/>
-              <a:t> angehängt.</a:t>
+              <a:t>Architektur des PROJEKTS. Dazu gehören auch Wetter/Ski-APIs, Server Programm und App.</a:t>
             </a:r>
           </a:p>
         </p:txBody>
@@ -1698,7 +1858,7 @@
           <a:p>
             <a:fld id="{748723F8-CD6B-45E3-B09A-75062809A4AE}" type="slidenum">
               <a:rPr lang="en-GB" smtClean="0"/>
-              <a:t>8</a:t>
+              <a:t>7</a:t>
             </a:fld>
             <a:endParaRPr lang="en-GB"/>
           </a:p>
@@ -1707,7 +1867,7 @@
     </p:spTree>
     <p:extLst>
       <p:ext uri="{BB962C8B-B14F-4D97-AF65-F5344CB8AC3E}">
-        <p14:creationId xmlns:p14="http://schemas.microsoft.com/office/powerpoint/2010/main" val="3349451142"/>
+        <p14:creationId xmlns:p14="http://schemas.microsoft.com/office/powerpoint/2010/main" val="349296435"/>
       </p:ext>
     </p:extLst>
   </p:cSld>
@@ -1761,168 +1921,34 @@
           <a:bodyPr/>
           <a:lstStyle/>
           <a:p>
-            <a:pPr marL="0" marR="0" lvl="0" indent="0" algn="l" defTabSz="914400" rtl="0" eaLnBrk="1" fontAlgn="auto" latinLnBrk="0" hangingPunct="1">
-              <a:lnSpc>
-                <a:spcPct val="100000"/>
-              </a:lnSpc>
-              <a:spcBef>
-                <a:spcPts val="0"/>
-              </a:spcBef>
-              <a:spcAft>
-                <a:spcPts val="0"/>
-              </a:spcAft>
-              <a:buClrTx/>
-              <a:buSzTx/>
-              <a:buFontTx/>
-              <a:buNone/>
-              <a:tabLst/>
-              <a:defRPr/>
-            </a:pPr>
+            <a:r>
+              <a:rPr lang="de-CH" dirty="0"/>
+              <a:t>Datenstruktur wird von API vorgegeben -&gt; </a:t>
+            </a:r>
             <a:r>
               <a:rPr lang="de-CH" dirty="0" err="1"/>
-              <a:t>Scrum</a:t>
+              <a:t>SkiResort</a:t>
             </a:r>
             <a:r>
               <a:rPr lang="de-CH" dirty="0"/>
-              <a:t>: Leicht abgeänderte Variante, wöchentliche Sprints, </a:t>
+              <a:t> von einer API, </a:t>
             </a:r>
             <a:r>
               <a:rPr lang="de-CH" dirty="0" err="1"/>
-              <a:t>daily</a:t>
+              <a:t>WeatherData</a:t>
             </a:r>
             <a:r>
               <a:rPr lang="de-CH" dirty="0"/>
-              <a:t> </a:t>
+              <a:t> von anderer API, wird dynamisch an </a:t>
             </a:r>
             <a:r>
               <a:rPr lang="de-CH" dirty="0" err="1"/>
-              <a:t>meeting</a:t>
+              <a:t>SkiResort</a:t>
             </a:r>
             <a:r>
               <a:rPr lang="de-CH" dirty="0"/>
-              <a:t> etwa alle 2-3 Tage (WE und Mi/Do)</a:t>
-            </a:r>
-          </a:p>
-          <a:p>
-            <a:pPr marL="0" marR="0" lvl="0" indent="0" algn="l" defTabSz="914400" rtl="0" eaLnBrk="1" fontAlgn="auto" latinLnBrk="0" hangingPunct="1">
-              <a:lnSpc>
-                <a:spcPct val="100000"/>
-              </a:lnSpc>
-              <a:spcBef>
-                <a:spcPts val="0"/>
-              </a:spcBef>
-              <a:spcAft>
-                <a:spcPts val="0"/>
-              </a:spcAft>
-              <a:buClrTx/>
-              <a:buSzTx/>
-              <a:buFontTx/>
-              <a:buNone/>
-              <a:tabLst/>
-              <a:defRPr/>
-            </a:pPr>
-            <a:r>
-              <a:rPr lang="de-CH" dirty="0" err="1"/>
-              <a:t>GeoFire</a:t>
-            </a:r>
-            <a:r>
-              <a:rPr lang="de-CH" dirty="0"/>
-              <a:t>: Wie nach Distanzsortieren -&gt; Druckwellenmässig (Performance)</a:t>
-            </a:r>
-          </a:p>
-          <a:p>
-            <a:pPr marL="0" marR="0" lvl="0" indent="0" algn="l" defTabSz="914400" rtl="0" eaLnBrk="1" fontAlgn="auto" latinLnBrk="0" hangingPunct="1">
-              <a:lnSpc>
-                <a:spcPct val="100000"/>
-              </a:lnSpc>
-              <a:spcBef>
-                <a:spcPts val="0"/>
-              </a:spcBef>
-              <a:spcAft>
-                <a:spcPts val="0"/>
-              </a:spcAft>
-              <a:buClrTx/>
-              <a:buSzTx/>
-              <a:buFontTx/>
-              <a:buNone/>
-              <a:tabLst/>
-              <a:defRPr/>
-            </a:pPr>
-            <a:r>
-              <a:rPr lang="de-CH" dirty="0" err="1"/>
-              <a:t>Sorting</a:t>
-            </a:r>
-            <a:r>
-              <a:rPr lang="de-CH" dirty="0"/>
-              <a:t> </a:t>
-            </a:r>
-            <a:r>
-              <a:rPr lang="de-CH" dirty="0" err="1"/>
-              <a:t>of</a:t>
-            </a:r>
-            <a:r>
-              <a:rPr lang="de-CH" dirty="0"/>
-              <a:t> </a:t>
-            </a:r>
-            <a:r>
-              <a:rPr lang="de-CH" dirty="0" err="1"/>
-              <a:t>list</a:t>
-            </a:r>
-            <a:r>
-              <a:rPr lang="de-CH" dirty="0"/>
-              <a:t>: Mit </a:t>
-            </a:r>
-            <a:r>
-              <a:rPr lang="de-CH" dirty="0" err="1"/>
-              <a:t>Comperatoren</a:t>
-            </a:r>
-            <a:r>
-              <a:rPr lang="de-CH" dirty="0"/>
-              <a:t>, teilweise eigene Logik was wie gewichtet wird</a:t>
-            </a:r>
-          </a:p>
-          <a:p>
-            <a:pPr marL="0" marR="0" lvl="0" indent="0" algn="l" defTabSz="914400" rtl="0" eaLnBrk="1" fontAlgn="auto" latinLnBrk="0" hangingPunct="1">
-              <a:lnSpc>
-                <a:spcPct val="100000"/>
-              </a:lnSpc>
-              <a:spcBef>
-                <a:spcPts val="0"/>
-              </a:spcBef>
-              <a:spcAft>
-                <a:spcPts val="0"/>
-              </a:spcAft>
-              <a:buClrTx/>
-              <a:buSzTx/>
-              <a:buFontTx/>
-              <a:buNone/>
-              <a:tabLst/>
-              <a:defRPr/>
-            </a:pPr>
-            <a:endParaRPr lang="de-CH" dirty="0"/>
-          </a:p>
-          <a:p>
-            <a:pPr marL="0" marR="0" lvl="0" indent="0" algn="l" defTabSz="914400" rtl="0" eaLnBrk="1" fontAlgn="auto" latinLnBrk="0" hangingPunct="1">
-              <a:lnSpc>
-                <a:spcPct val="100000"/>
-              </a:lnSpc>
-              <a:spcBef>
-                <a:spcPts val="0"/>
-              </a:spcBef>
-              <a:spcAft>
-                <a:spcPts val="0"/>
-              </a:spcAft>
-              <a:buClrTx/>
-              <a:buSzTx/>
-              <a:buFontTx/>
-              <a:buNone/>
-              <a:tabLst/>
-              <a:defRPr/>
-            </a:pPr>
-            <a:endParaRPr lang="de-CH" dirty="0"/>
-          </a:p>
-          <a:p>
-            <a:endParaRPr lang="en-GB" dirty="0"/>
+              <a:t> angehängt.</a:t>
+            </a:r>
           </a:p>
         </p:txBody>
       </p:sp>
@@ -1952,7 +1978,7 @@
     </p:spTree>
     <p:extLst>
       <p:ext uri="{BB962C8B-B14F-4D97-AF65-F5344CB8AC3E}">
-        <p14:creationId xmlns:p14="http://schemas.microsoft.com/office/powerpoint/2010/main" val="187494911"/>
+        <p14:creationId xmlns:p14="http://schemas.microsoft.com/office/powerpoint/2010/main" val="3349451142"/>
       </p:ext>
     </p:extLst>
   </p:cSld>
@@ -2006,291 +2032,173 @@
           <a:bodyPr/>
           <a:lstStyle/>
           <a:p>
-            <a:r>
-              <a:rPr lang="en-GB" dirty="0"/>
-              <a:t>JUnit Test</a:t>
-            </a:r>
-          </a:p>
-          <a:p>
-            <a:pPr marL="171450" indent="-171450">
-              <a:buFontTx/>
-              <a:buChar char="-"/>
-            </a:pPr>
-            <a:r>
-              <a:rPr lang="en-GB" dirty="0"/>
-              <a:t>Test der </a:t>
-            </a:r>
-            <a:r>
-              <a:rPr lang="en-GB" dirty="0" err="1"/>
-              <a:t>Sortierungen</a:t>
-            </a:r>
-            <a:r>
-              <a:rPr lang="en-GB" dirty="0"/>
-              <a:t> -&gt; </a:t>
-            </a:r>
-            <a:r>
-              <a:rPr lang="en-GB" dirty="0" err="1"/>
-              <a:t>Distanz</a:t>
-            </a:r>
-            <a:r>
-              <a:rPr lang="en-GB" dirty="0"/>
-              <a:t>, Wetter, Status, </a:t>
-            </a:r>
-            <a:r>
-              <a:rPr lang="en-GB" dirty="0" err="1"/>
-              <a:t>Geöffneten</a:t>
-            </a:r>
-            <a:r>
-              <a:rPr lang="en-GB" dirty="0"/>
-              <a:t> </a:t>
-            </a:r>
-            <a:r>
-              <a:rPr lang="en-GB" dirty="0" err="1"/>
-              <a:t>Pisten</a:t>
-            </a:r>
-            <a:r>
-              <a:rPr lang="en-GB" dirty="0"/>
-              <a:t> und </a:t>
-            </a:r>
-            <a:r>
-              <a:rPr lang="en-GB" dirty="0" err="1"/>
-              <a:t>Lifte</a:t>
-            </a:r>
-            <a:endParaRPr lang="en-GB" dirty="0"/>
-          </a:p>
-          <a:p>
-            <a:pPr marL="171450" indent="-171450">
-              <a:buFontTx/>
-              <a:buChar char="-"/>
-            </a:pPr>
-            <a:r>
-              <a:rPr lang="en-GB" dirty="0" err="1"/>
-              <a:t>Serializierung</a:t>
-            </a:r>
-            <a:r>
-              <a:rPr lang="en-GB" dirty="0"/>
-              <a:t> und </a:t>
-            </a:r>
-            <a:r>
-              <a:rPr lang="en-GB" dirty="0" err="1"/>
-              <a:t>Deserializierung</a:t>
-            </a:r>
-            <a:r>
-              <a:rPr lang="en-GB" dirty="0"/>
-              <a:t> </a:t>
-            </a:r>
-            <a:r>
-              <a:rPr lang="en-GB" dirty="0" err="1"/>
-              <a:t>mittels</a:t>
-            </a:r>
-            <a:r>
-              <a:rPr lang="en-GB" dirty="0"/>
-              <a:t> </a:t>
-            </a:r>
-            <a:r>
-              <a:rPr lang="en-GB" dirty="0" err="1"/>
-              <a:t>GSon</a:t>
-            </a:r>
-            <a:r>
-              <a:rPr lang="en-GB" dirty="0"/>
-              <a:t>. </a:t>
-            </a:r>
-            <a:r>
-              <a:rPr lang="en-GB" dirty="0" err="1"/>
-              <a:t>Benötigt</a:t>
-            </a:r>
-            <a:r>
-              <a:rPr lang="en-GB" dirty="0"/>
-              <a:t> </a:t>
-            </a:r>
-            <a:r>
-              <a:rPr lang="en-GB" dirty="0" err="1"/>
-              <a:t>beim</a:t>
-            </a:r>
-            <a:r>
-              <a:rPr lang="en-GB" dirty="0"/>
-              <a:t> </a:t>
-            </a:r>
-            <a:r>
-              <a:rPr lang="en-GB" dirty="0" err="1"/>
-              <a:t>Empfangen</a:t>
-            </a:r>
-            <a:r>
-              <a:rPr lang="en-GB" dirty="0"/>
-              <a:t> von </a:t>
-            </a:r>
-            <a:r>
-              <a:rPr lang="en-GB" dirty="0" err="1"/>
-              <a:t>Daten</a:t>
-            </a:r>
-            <a:r>
-              <a:rPr lang="en-GB" dirty="0"/>
-              <a:t> der </a:t>
-            </a:r>
-            <a:r>
-              <a:rPr lang="en-GB" dirty="0" err="1"/>
-              <a:t>beiden</a:t>
-            </a:r>
-            <a:r>
-              <a:rPr lang="en-GB" dirty="0"/>
-              <a:t> API’s</a:t>
-            </a:r>
-          </a:p>
-          <a:p>
-            <a:pPr marL="0" indent="0">
+            <a:pPr marL="0" marR="0" lvl="0" indent="0" algn="l" defTabSz="914400" rtl="0" eaLnBrk="1" fontAlgn="auto" latinLnBrk="0" hangingPunct="1">
+              <a:lnSpc>
+                <a:spcPct val="100000"/>
+              </a:lnSpc>
+              <a:spcBef>
+                <a:spcPts val="0"/>
+              </a:spcBef>
+              <a:spcAft>
+                <a:spcPts val="0"/>
+              </a:spcAft>
+              <a:buClrTx/>
+              <a:buSzTx/>
               <a:buFontTx/>
               <a:buNone/>
+              <a:tabLst/>
+              <a:defRPr/>
             </a:pPr>
-            <a:endParaRPr lang="en-GB" dirty="0"/>
-          </a:p>
-          <a:p>
-            <a:pPr marL="0" indent="0">
+            <a:r>
+              <a:rPr lang="de-CH" dirty="0" err="1"/>
+              <a:t>Scrum</a:t>
+            </a:r>
+            <a:r>
+              <a:rPr lang="de-CH" dirty="0"/>
+              <a:t>: Leicht abgeänderte Variante, wöchentliche Sprints, </a:t>
+            </a:r>
+            <a:r>
+              <a:rPr lang="de-CH" dirty="0" err="1"/>
+              <a:t>daily</a:t>
+            </a:r>
+            <a:r>
+              <a:rPr lang="de-CH" dirty="0"/>
+              <a:t> </a:t>
+            </a:r>
+            <a:r>
+              <a:rPr lang="de-CH" dirty="0" err="1"/>
+              <a:t>meeting</a:t>
+            </a:r>
+            <a:r>
+              <a:rPr lang="de-CH" dirty="0"/>
+              <a:t> etwa alle 2-3 Tage (WE und Mi/Do)</a:t>
+            </a:r>
+          </a:p>
+          <a:p>
+            <a:pPr marL="0" marR="0" lvl="0" indent="0" algn="l" defTabSz="914400" rtl="0" eaLnBrk="1" fontAlgn="auto" latinLnBrk="0" hangingPunct="1">
+              <a:lnSpc>
+                <a:spcPct val="100000"/>
+              </a:lnSpc>
+              <a:spcBef>
+                <a:spcPts val="0"/>
+              </a:spcBef>
+              <a:spcAft>
+                <a:spcPts val="0"/>
+              </a:spcAft>
+              <a:buClrTx/>
+              <a:buSzTx/>
               <a:buFontTx/>
               <a:buNone/>
+              <a:tabLst/>
+              <a:defRPr/>
             </a:pPr>
             <a:r>
-              <a:rPr lang="en-GB" dirty="0"/>
-              <a:t>Code Coverage</a:t>
-            </a:r>
-          </a:p>
-          <a:p>
-            <a:pPr marL="171450" indent="-171450">
-              <a:buFontTx/>
-              <a:buChar char="-"/>
-            </a:pPr>
-            <a:r>
-              <a:rPr lang="en-GB" dirty="0" err="1"/>
-              <a:t>Aktuell</a:t>
-            </a:r>
-            <a:r>
-              <a:rPr lang="en-GB" dirty="0"/>
-              <a:t> </a:t>
-            </a:r>
-            <a:r>
-              <a:rPr lang="en-GB" dirty="0" err="1"/>
-              <a:t>bei</a:t>
-            </a:r>
-            <a:r>
-              <a:rPr lang="en-GB" dirty="0"/>
-              <a:t> ca 30%</a:t>
-            </a:r>
-          </a:p>
-          <a:p>
-            <a:pPr marL="0" indent="0">
+              <a:rPr lang="de-CH" dirty="0" err="1"/>
+              <a:t>GeoFire</a:t>
+            </a:r>
+            <a:r>
+              <a:rPr lang="de-CH" dirty="0"/>
+              <a:t>: Wie nach Distanzsortieren -&gt; Druckwellenmässig (Performance)</a:t>
+            </a:r>
+          </a:p>
+          <a:p>
+            <a:pPr marL="0" marR="0" lvl="0" indent="0" algn="l" defTabSz="914400" rtl="0" eaLnBrk="1" fontAlgn="auto" latinLnBrk="0" hangingPunct="1">
+              <a:lnSpc>
+                <a:spcPct val="100000"/>
+              </a:lnSpc>
+              <a:spcBef>
+                <a:spcPts val="0"/>
+              </a:spcBef>
+              <a:spcAft>
+                <a:spcPts val="0"/>
+              </a:spcAft>
+              <a:buClrTx/>
+              <a:buSzTx/>
               <a:buFontTx/>
               <a:buNone/>
+              <a:tabLst/>
+              <a:defRPr/>
             </a:pPr>
-            <a:endParaRPr lang="en-GB" dirty="0"/>
-          </a:p>
-          <a:p>
-            <a:pPr marL="0" indent="0">
+            <a:r>
+              <a:rPr lang="de-CH" dirty="0" err="1"/>
+              <a:t>Sorting</a:t>
+            </a:r>
+            <a:r>
+              <a:rPr lang="de-CH" dirty="0"/>
+              <a:t> </a:t>
+            </a:r>
+            <a:r>
+              <a:rPr lang="de-CH" dirty="0" err="1"/>
+              <a:t>of</a:t>
+            </a:r>
+            <a:r>
+              <a:rPr lang="de-CH" dirty="0"/>
+              <a:t> </a:t>
+            </a:r>
+            <a:r>
+              <a:rPr lang="de-CH" dirty="0" err="1"/>
+              <a:t>list</a:t>
+            </a:r>
+            <a:r>
+              <a:rPr lang="de-CH" dirty="0"/>
+              <a:t>: Mit </a:t>
+            </a:r>
+            <a:r>
+              <a:rPr lang="de-CH" dirty="0" err="1"/>
+              <a:t>Comperatoren</a:t>
+            </a:r>
+            <a:r>
+              <a:rPr lang="de-CH" dirty="0"/>
+              <a:t>, teilweise eigene Logik was wie gewichtet wird</a:t>
+            </a:r>
+          </a:p>
+          <a:p>
+            <a:pPr marL="0" marR="0" lvl="0" indent="0" algn="l" defTabSz="914400" rtl="0" eaLnBrk="1" fontAlgn="auto" latinLnBrk="0" hangingPunct="1">
+              <a:lnSpc>
+                <a:spcPct val="100000"/>
+              </a:lnSpc>
+              <a:spcBef>
+                <a:spcPts val="0"/>
+              </a:spcBef>
+              <a:spcAft>
+                <a:spcPts val="0"/>
+              </a:spcAft>
+              <a:buClrTx/>
+              <a:buSzTx/>
               <a:buFontTx/>
               <a:buNone/>
+              <a:tabLst/>
+              <a:defRPr/>
             </a:pPr>
             <a:r>
-              <a:rPr lang="en-GB" dirty="0"/>
-              <a:t>Monkey-Test</a:t>
-            </a:r>
-          </a:p>
-          <a:p>
-            <a:pPr marL="171450" indent="-171450">
-              <a:buFontTx/>
-              <a:buChar char="-"/>
-            </a:pPr>
-            <a:r>
-              <a:rPr lang="en-GB" dirty="0" err="1"/>
-              <a:t>Zum</a:t>
-            </a:r>
-            <a:r>
-              <a:rPr lang="en-GB" dirty="0"/>
+              <a:rPr lang="de-CH" dirty="0" err="1"/>
+              <a:t>Weather</a:t>
+            </a:r>
+            <a:r>
+              <a:rPr lang="de-CH" dirty="0"/>
               <a:t> </a:t>
             </a:r>
             <a:r>
-              <a:rPr lang="en-GB" dirty="0" err="1"/>
-              <a:t>Testen</a:t>
-            </a:r>
-            <a:r>
-              <a:rPr lang="en-GB" dirty="0"/>
-              <a:t> der </a:t>
-            </a:r>
-            <a:r>
-              <a:rPr lang="en-GB" dirty="0" err="1"/>
-              <a:t>Stabilität</a:t>
-            </a:r>
-            <a:r>
-              <a:rPr lang="en-GB" dirty="0"/>
-              <a:t>. In ADB (Android Debugging Bridge) </a:t>
-            </a:r>
-            <a:r>
-              <a:rPr lang="en-GB" dirty="0" err="1"/>
-              <a:t>integriert</a:t>
-            </a:r>
-            <a:r>
-              <a:rPr lang="en-GB" dirty="0"/>
-              <a:t>.</a:t>
-            </a:r>
-          </a:p>
-          <a:p>
-            <a:pPr marL="171450" indent="-171450">
-              <a:buFontTx/>
-              <a:buChar char="-"/>
-            </a:pPr>
-            <a:r>
-              <a:rPr lang="en-GB" dirty="0" err="1"/>
-              <a:t>Macht</a:t>
-            </a:r>
-            <a:r>
-              <a:rPr lang="en-GB" dirty="0"/>
-              <a:t> pseudo Random </a:t>
-            </a:r>
-            <a:r>
-              <a:rPr lang="en-GB" dirty="0" err="1"/>
-              <a:t>Interaktionen</a:t>
-            </a:r>
-            <a:r>
-              <a:rPr lang="en-GB" dirty="0"/>
-              <a:t> </a:t>
-            </a:r>
-            <a:r>
-              <a:rPr lang="en-GB" dirty="0" err="1"/>
-              <a:t>mit</a:t>
-            </a:r>
-            <a:r>
-              <a:rPr lang="en-GB" dirty="0"/>
-              <a:t> </a:t>
-            </a:r>
-            <a:r>
-              <a:rPr lang="en-GB" dirty="0" err="1"/>
-              <a:t>dem</a:t>
-            </a:r>
-            <a:r>
-              <a:rPr lang="en-GB" dirty="0"/>
-              <a:t> Device. </a:t>
-            </a:r>
-            <a:r>
-              <a:rPr lang="en-GB" dirty="0" err="1"/>
-              <a:t>Guten</a:t>
-            </a:r>
-            <a:r>
-              <a:rPr lang="en-GB" dirty="0"/>
-              <a:t> Test </a:t>
-            </a:r>
-            <a:r>
-              <a:rPr lang="en-GB" dirty="0" err="1"/>
-              <a:t>für</a:t>
-            </a:r>
-            <a:r>
-              <a:rPr lang="en-GB" dirty="0"/>
-              <a:t> </a:t>
-            </a:r>
-            <a:r>
-              <a:rPr lang="en-GB" dirty="0" err="1"/>
-              <a:t>Stabilität</a:t>
-            </a:r>
-            <a:r>
-              <a:rPr lang="en-GB" dirty="0"/>
-              <a:t> der App</a:t>
-            </a:r>
+              <a:rPr lang="de-CH" dirty="0" err="1"/>
+              <a:t>icons</a:t>
+            </a:r>
+            <a:r>
+              <a:rPr lang="de-CH" dirty="0"/>
+              <a:t>: Wie werden die Icons ausgewählt, </a:t>
+            </a:r>
+            <a:r>
+              <a:rPr lang="de-CH" dirty="0" err="1"/>
+              <a:t>wiso</a:t>
+            </a:r>
+            <a:r>
+              <a:rPr lang="de-CH" dirty="0"/>
+              <a:t> nicht die von web-</a:t>
+            </a:r>
+            <a:r>
+              <a:rPr lang="de-CH" dirty="0" err="1"/>
+              <a:t>api</a:t>
+            </a:r>
+            <a:endParaRPr lang="de-CH" dirty="0"/>
           </a:p>
         </p:txBody>
       </p:sp>
@@ -2320,7 +2228,7 @@
     </p:spTree>
     <p:extLst>
       <p:ext uri="{BB962C8B-B14F-4D97-AF65-F5344CB8AC3E}">
-        <p14:creationId xmlns:p14="http://schemas.microsoft.com/office/powerpoint/2010/main" val="996191540"/>
+        <p14:creationId xmlns:p14="http://schemas.microsoft.com/office/powerpoint/2010/main" val="187494911"/>
       </p:ext>
     </p:extLst>
   </p:cSld>
@@ -2556,8 +2464,38 @@
               <a:buNone/>
             </a:pPr>
             <a:r>
-              <a:rPr lang="en-GB" dirty="0" err="1"/>
-              <a:t>SonarQube</a:t>
+              <a:rPr lang="en-GB" dirty="0"/>
+              <a:t>Sonar </a:t>
+            </a:r>
+            <a:r>
+              <a:rPr lang="en-GB" dirty="0" err="1"/>
+              <a:t>Qube</a:t>
+            </a:r>
+            <a:r>
+              <a:rPr lang="en-GB" dirty="0"/>
+              <a:t>:</a:t>
+            </a:r>
+          </a:p>
+          <a:p>
+            <a:pPr marL="0" indent="0">
+              <a:buFont typeface="Arial" panose="020B0604020202020204" pitchFamily="34" charset="0"/>
+              <a:buNone/>
+            </a:pPr>
+            <a:r>
+              <a:rPr lang="en-GB" dirty="0"/>
+              <a:t>- </a:t>
+            </a:r>
+            <a:r>
+              <a:rPr lang="en-GB" dirty="0" err="1"/>
+              <a:t>Nächste</a:t>
+            </a:r>
+            <a:r>
+              <a:rPr lang="en-GB" dirty="0"/>
+              <a:t> </a:t>
+            </a:r>
+            <a:r>
+              <a:rPr lang="en-GB" dirty="0" err="1"/>
+              <a:t>Folie</a:t>
             </a:r>
             <a:endParaRPr lang="en-GB" dirty="0"/>
           </a:p>
@@ -2604,8 +2542,13 @@
             </a:r>
             <a:r>
               <a:rPr lang="en-GB" dirty="0"/>
-              <a:t> warden</a:t>
-            </a:r>
+              <a:t> </a:t>
+            </a:r>
+            <a:r>
+              <a:rPr lang="en-GB" dirty="0" err="1"/>
+              <a:t>werden</a:t>
+            </a:r>
+            <a:endParaRPr lang="en-GB" dirty="0"/>
           </a:p>
           <a:p>
             <a:pPr marL="171450" indent="-171450">
@@ -2767,6 +2710,13 @@
               <a:rPr lang="en-GB" dirty="0"/>
               <a:t>.</a:t>
             </a:r>
+          </a:p>
+          <a:p>
+            <a:pPr marL="0" indent="0">
+              <a:buFont typeface="Arial" panose="020B0604020202020204" pitchFamily="34" charset="0"/>
+              <a:buNone/>
+            </a:pPr>
+            <a:endParaRPr lang="en-GB" dirty="0"/>
           </a:p>
           <a:p>
             <a:pPr marL="0" indent="0">
@@ -2913,7 +2863,7 @@
     </p:spTree>
     <p:extLst>
       <p:ext uri="{BB962C8B-B14F-4D97-AF65-F5344CB8AC3E}">
-        <p14:creationId xmlns:p14="http://schemas.microsoft.com/office/powerpoint/2010/main" val="4250532794"/>
+        <p14:creationId xmlns:p14="http://schemas.microsoft.com/office/powerpoint/2010/main" val="996191540"/>
       </p:ext>
     </p:extLst>
   </p:cSld>
@@ -2966,229 +2916,6 @@
         <p:txBody>
           <a:bodyPr/>
           <a:lstStyle/>
-          <a:p>
-            <a:pPr marL="0" indent="0">
-              <a:buFontTx/>
-              <a:buNone/>
-            </a:pPr>
-            <a:r>
-              <a:rPr lang="en-GB" dirty="0" err="1"/>
-              <a:t>SonarQube</a:t>
-            </a:r>
-            <a:endParaRPr lang="en-GB" dirty="0"/>
-          </a:p>
-          <a:p>
-            <a:pPr marL="171450" indent="-171450">
-              <a:buFontTx/>
-              <a:buChar char="-"/>
-            </a:pPr>
-            <a:r>
-              <a:rPr lang="en-GB" dirty="0" err="1"/>
-              <a:t>Einige</a:t>
-            </a:r>
-            <a:r>
-              <a:rPr lang="en-GB" dirty="0"/>
-              <a:t> </a:t>
-            </a:r>
-            <a:r>
-              <a:rPr lang="en-GB" dirty="0" err="1"/>
-              <a:t>Punkte</a:t>
-            </a:r>
-            <a:r>
-              <a:rPr lang="en-GB" dirty="0"/>
-              <a:t> </a:t>
-            </a:r>
-            <a:r>
-              <a:rPr lang="en-GB" dirty="0" err="1"/>
-              <a:t>können</a:t>
-            </a:r>
-            <a:r>
-              <a:rPr lang="en-GB" dirty="0"/>
-              <a:t> </a:t>
-            </a:r>
-            <a:r>
-              <a:rPr lang="en-GB" dirty="0" err="1"/>
-              <a:t>nicht</a:t>
-            </a:r>
-            <a:r>
-              <a:rPr lang="en-GB" dirty="0"/>
-              <a:t> </a:t>
-            </a:r>
-            <a:r>
-              <a:rPr lang="en-GB" dirty="0" err="1"/>
-              <a:t>gefixt</a:t>
-            </a:r>
-            <a:r>
-              <a:rPr lang="en-GB" dirty="0"/>
-              <a:t> </a:t>
-            </a:r>
-            <a:r>
-              <a:rPr lang="en-GB"/>
-              <a:t>werden</a:t>
-            </a:r>
-            <a:endParaRPr lang="en-GB" dirty="0"/>
-          </a:p>
-          <a:p>
-            <a:pPr marL="171450" indent="-171450">
-              <a:buFontTx/>
-              <a:buChar char="-"/>
-            </a:pPr>
-            <a:r>
-              <a:rPr lang="en-GB" dirty="0" err="1"/>
-              <a:t>Bsp</a:t>
-            </a:r>
-            <a:r>
-              <a:rPr lang="en-GB" dirty="0"/>
-              <a:t>: </a:t>
-            </a:r>
-            <a:r>
-              <a:rPr lang="en-GB" dirty="0" err="1"/>
-              <a:t>Enum</a:t>
-            </a:r>
-            <a:r>
-              <a:rPr lang="en-GB" dirty="0"/>
-              <a:t> </a:t>
-            </a:r>
-            <a:r>
-              <a:rPr lang="en-GB" dirty="0" err="1"/>
-              <a:t>müssen</a:t>
-            </a:r>
-            <a:r>
-              <a:rPr lang="en-GB" dirty="0"/>
-              <a:t> Gross </a:t>
-            </a:r>
-            <a:r>
-              <a:rPr lang="en-GB" dirty="0" err="1"/>
-              <a:t>geschreiben</a:t>
-            </a:r>
-            <a:r>
-              <a:rPr lang="en-GB" dirty="0"/>
-              <a:t> </a:t>
-            </a:r>
-            <a:r>
-              <a:rPr lang="en-GB" dirty="0" err="1"/>
-              <a:t>werden</a:t>
-            </a:r>
-            <a:r>
-              <a:rPr lang="en-GB" dirty="0"/>
-              <a:t>, </a:t>
-            </a:r>
-            <a:r>
-              <a:rPr lang="en-GB" dirty="0" err="1"/>
-              <a:t>jedoch</a:t>
-            </a:r>
-            <a:r>
-              <a:rPr lang="en-GB" dirty="0"/>
-              <a:t> die API </a:t>
-            </a:r>
-            <a:r>
-              <a:rPr lang="en-GB" dirty="0" err="1"/>
-              <a:t>benutzt</a:t>
-            </a:r>
-            <a:r>
-              <a:rPr lang="en-GB" dirty="0"/>
-              <a:t> </a:t>
-            </a:r>
-            <a:r>
-              <a:rPr lang="en-GB" dirty="0" err="1"/>
-              <a:t>andere</a:t>
-            </a:r>
-            <a:r>
-              <a:rPr lang="en-GB" dirty="0"/>
-              <a:t> </a:t>
-            </a:r>
-            <a:r>
-              <a:rPr lang="en-GB" dirty="0" err="1"/>
-              <a:t>Schreibweise</a:t>
-            </a:r>
-            <a:r>
-              <a:rPr lang="en-GB" dirty="0"/>
-              <a:t> und </a:t>
-            </a:r>
-            <a:r>
-              <a:rPr lang="en-GB" dirty="0" err="1"/>
-              <a:t>wäre</a:t>
-            </a:r>
-            <a:r>
-              <a:rPr lang="en-GB" dirty="0"/>
-              <a:t> </a:t>
-            </a:r>
-            <a:r>
-              <a:rPr lang="en-GB" dirty="0" err="1"/>
-              <a:t>somit</a:t>
-            </a:r>
-            <a:r>
-              <a:rPr lang="en-GB" dirty="0"/>
-              <a:t> </a:t>
-            </a:r>
-            <a:r>
-              <a:rPr lang="en-GB" dirty="0" err="1"/>
-              <a:t>nicht</a:t>
-            </a:r>
-            <a:r>
-              <a:rPr lang="en-GB" dirty="0"/>
-              <a:t> </a:t>
-            </a:r>
-            <a:r>
-              <a:rPr lang="en-GB" dirty="0" err="1"/>
-              <a:t>kompatibel</a:t>
-            </a:r>
-            <a:endParaRPr lang="en-GB" dirty="0"/>
-          </a:p>
-          <a:p>
-            <a:pPr marL="171450" indent="-171450">
-              <a:buFontTx/>
-              <a:buChar char="-"/>
-            </a:pPr>
-            <a:r>
-              <a:rPr lang="en-GB" dirty="0" err="1"/>
-              <a:t>Einige</a:t>
-            </a:r>
-            <a:r>
-              <a:rPr lang="en-GB" dirty="0"/>
-              <a:t> Android Klassen </a:t>
-            </a:r>
-            <a:r>
-              <a:rPr lang="en-GB" dirty="0" err="1"/>
-              <a:t>haben</a:t>
-            </a:r>
-            <a:r>
-              <a:rPr lang="en-GB" dirty="0"/>
-              <a:t> </a:t>
-            </a:r>
-            <a:r>
-              <a:rPr lang="en-GB" dirty="0" err="1"/>
-              <a:t>schon</a:t>
-            </a:r>
-            <a:r>
-              <a:rPr lang="en-GB" dirty="0"/>
-              <a:t> </a:t>
-            </a:r>
-            <a:r>
-              <a:rPr lang="en-GB" dirty="0" err="1"/>
-              <a:t>mehr</a:t>
-            </a:r>
-            <a:r>
-              <a:rPr lang="en-GB" dirty="0"/>
-              <a:t> </a:t>
-            </a:r>
-            <a:r>
-              <a:rPr lang="en-GB" dirty="0" err="1"/>
-              <a:t>als</a:t>
-            </a:r>
-            <a:r>
-              <a:rPr lang="en-GB" dirty="0"/>
-              <a:t> 5 </a:t>
-            </a:r>
-            <a:r>
-              <a:rPr lang="en-GB" dirty="0" err="1"/>
-              <a:t>Vererbungen</a:t>
-            </a:r>
-            <a:r>
-              <a:rPr lang="en-GB" dirty="0"/>
-              <a:t>.</a:t>
-            </a:r>
-          </a:p>
           <a:p>
             <a:pPr marL="0" indent="0">
               <a:buFontTx/>
@@ -3283,11 +3010,37 @@
           <a:p>
             <a:r>
               <a:rPr lang="en-GB" dirty="0"/>
-              <a:t>Demo. Script </a:t>
-            </a:r>
-            <a:r>
-              <a:rPr lang="en-GB" dirty="0" err="1"/>
-              <a:t>vorbereiten</a:t>
+              <a:t>JUnit Test</a:t>
+            </a:r>
+          </a:p>
+          <a:p>
+            <a:pPr marL="171450" indent="-171450">
+              <a:buFontTx/>
+              <a:buChar char="-"/>
+            </a:pPr>
+            <a:r>
+              <a:rPr lang="en-GB" dirty="0"/>
+              <a:t>Test der </a:t>
+            </a:r>
+            <a:r>
+              <a:rPr lang="en-GB" dirty="0" err="1"/>
+              <a:t>Sortierungen</a:t>
+            </a:r>
+            <a:r>
+              <a:rPr lang="en-GB" dirty="0"/>
+              <a:t> -&gt; </a:t>
+            </a:r>
+            <a:r>
+              <a:rPr lang="en-GB" dirty="0" err="1"/>
+              <a:t>Distanz</a:t>
+            </a:r>
+            <a:r>
+              <a:rPr lang="en-GB" dirty="0"/>
+              <a:t>, Wetter, Status, </a:t>
+            </a:r>
+            <a:r>
+              <a:rPr lang="en-GB" dirty="0" err="1"/>
+              <a:t>Geöffneten</a:t>
             </a:r>
             <a:r>
               <a:rPr lang="en-GB" dirty="0"/>
@@ -3295,11 +3048,475 @@
             </a:r>
             <a:r>
               <a:rPr lang="en-GB" dirty="0" err="1"/>
+              <a:t>Pisten</a:t>
+            </a:r>
+            <a:r>
+              <a:rPr lang="en-GB" dirty="0"/>
+              <a:t> und </a:t>
+            </a:r>
+            <a:r>
+              <a:rPr lang="en-GB" dirty="0" err="1"/>
+              <a:t>Lifte</a:t>
+            </a:r>
+            <a:endParaRPr lang="en-GB" dirty="0"/>
+          </a:p>
+          <a:p>
+            <a:pPr marL="171450" indent="-171450">
+              <a:buFontTx/>
+              <a:buChar char="-"/>
+            </a:pPr>
+            <a:r>
+              <a:rPr lang="en-GB" dirty="0" err="1"/>
+              <a:t>Serializierung</a:t>
+            </a:r>
+            <a:r>
+              <a:rPr lang="en-GB" dirty="0"/>
+              <a:t> und </a:t>
+            </a:r>
+            <a:r>
+              <a:rPr lang="en-GB" dirty="0" err="1"/>
+              <a:t>Deserializierung</a:t>
+            </a:r>
+            <a:r>
+              <a:rPr lang="en-GB" dirty="0"/>
+              <a:t> </a:t>
+            </a:r>
+            <a:r>
+              <a:rPr lang="en-GB" dirty="0" err="1"/>
+              <a:t>mittels</a:t>
+            </a:r>
+            <a:r>
+              <a:rPr lang="en-GB" dirty="0"/>
+              <a:t> </a:t>
+            </a:r>
+            <a:r>
+              <a:rPr lang="en-GB" dirty="0" err="1"/>
+              <a:t>GSon</a:t>
+            </a:r>
+            <a:r>
+              <a:rPr lang="en-GB" dirty="0"/>
+              <a:t>. </a:t>
+            </a:r>
+            <a:r>
+              <a:rPr lang="en-GB" dirty="0" err="1"/>
+              <a:t>Benötigt</a:t>
+            </a:r>
+            <a:r>
+              <a:rPr lang="en-GB" dirty="0"/>
+              <a:t> </a:t>
+            </a:r>
+            <a:r>
+              <a:rPr lang="en-GB" dirty="0" err="1"/>
+              <a:t>beim</a:t>
+            </a:r>
+            <a:r>
+              <a:rPr lang="en-GB" dirty="0"/>
+              <a:t> </a:t>
+            </a:r>
+            <a:r>
+              <a:rPr lang="en-GB" dirty="0" err="1"/>
+              <a:t>Empfangen</a:t>
+            </a:r>
+            <a:r>
+              <a:rPr lang="en-GB" dirty="0"/>
+              <a:t> von </a:t>
+            </a:r>
+            <a:r>
+              <a:rPr lang="en-GB" dirty="0" err="1"/>
+              <a:t>Daten</a:t>
+            </a:r>
+            <a:r>
+              <a:rPr lang="en-GB" dirty="0"/>
+              <a:t> der </a:t>
+            </a:r>
+            <a:r>
+              <a:rPr lang="en-GB" dirty="0" err="1"/>
+              <a:t>beiden</a:t>
+            </a:r>
+            <a:r>
+              <a:rPr lang="en-GB" dirty="0"/>
+              <a:t> API’s</a:t>
+            </a:r>
+          </a:p>
+          <a:p>
+            <a:pPr marL="0" indent="0">
+              <a:buFontTx/>
+              <a:buNone/>
+            </a:pPr>
+            <a:endParaRPr lang="en-GB" dirty="0"/>
+          </a:p>
+          <a:p>
+            <a:pPr marL="0" indent="0">
+              <a:buFontTx/>
+              <a:buNone/>
+            </a:pPr>
+            <a:r>
+              <a:rPr lang="en-GB" dirty="0"/>
+              <a:t>Code Coverage</a:t>
+            </a:r>
+          </a:p>
+          <a:p>
+            <a:pPr marL="171450" indent="-171450">
+              <a:buFontTx/>
+              <a:buChar char="-"/>
+            </a:pPr>
+            <a:r>
+              <a:rPr lang="en-GB" dirty="0" err="1"/>
+              <a:t>Aktuell</a:t>
+            </a:r>
+            <a:r>
+              <a:rPr lang="en-GB" dirty="0"/>
+              <a:t> </a:t>
+            </a:r>
+            <a:r>
+              <a:rPr lang="en-GB" dirty="0" err="1"/>
+              <a:t>bei</a:t>
+            </a:r>
+            <a:r>
+              <a:rPr lang="en-GB" dirty="0"/>
+              <a:t> ca 30%</a:t>
+            </a:r>
+          </a:p>
+          <a:p>
+            <a:pPr marL="171450" indent="-171450">
+              <a:buFontTx/>
+              <a:buChar char="-"/>
+            </a:pPr>
+            <a:endParaRPr lang="en-GB" dirty="0"/>
+          </a:p>
+          <a:p>
+            <a:pPr marL="0" indent="0">
+              <a:buFontTx/>
+              <a:buNone/>
+            </a:pPr>
+            <a:r>
+              <a:rPr lang="en-GB" dirty="0" err="1"/>
+              <a:t>SonarQube</a:t>
+            </a:r>
+            <a:endParaRPr lang="en-GB" dirty="0"/>
+          </a:p>
+          <a:p>
+            <a:pPr marL="171450" indent="-171450">
+              <a:buFontTx/>
+              <a:buChar char="-"/>
+            </a:pPr>
+            <a:r>
+              <a:rPr lang="en-GB" dirty="0" err="1"/>
+              <a:t>Einige</a:t>
+            </a:r>
+            <a:r>
+              <a:rPr lang="en-GB" dirty="0"/>
+              <a:t> </a:t>
+            </a:r>
+            <a:r>
+              <a:rPr lang="en-GB" dirty="0" err="1"/>
+              <a:t>Punkte</a:t>
+            </a:r>
+            <a:r>
+              <a:rPr lang="en-GB" dirty="0"/>
+              <a:t> </a:t>
+            </a:r>
+            <a:r>
+              <a:rPr lang="en-GB" dirty="0" err="1"/>
+              <a:t>können</a:t>
+            </a:r>
+            <a:r>
+              <a:rPr lang="en-GB" dirty="0"/>
+              <a:t> </a:t>
+            </a:r>
+            <a:r>
+              <a:rPr lang="en-GB" dirty="0" err="1"/>
+              <a:t>nicht</a:t>
+            </a:r>
+            <a:r>
+              <a:rPr lang="en-GB" dirty="0"/>
+              <a:t> </a:t>
+            </a:r>
+            <a:r>
+              <a:rPr lang="en-GB" dirty="0" err="1"/>
+              <a:t>gefixt</a:t>
+            </a:r>
+            <a:r>
+              <a:rPr lang="en-GB" dirty="0"/>
+              <a:t> warden</a:t>
+            </a:r>
+          </a:p>
+          <a:p>
+            <a:pPr marL="171450" indent="-171450">
+              <a:buFontTx/>
+              <a:buChar char="-"/>
+            </a:pPr>
+            <a:r>
+              <a:rPr lang="en-GB" dirty="0" err="1"/>
+              <a:t>Bsp</a:t>
+            </a:r>
+            <a:r>
+              <a:rPr lang="en-GB" dirty="0"/>
+              <a:t>: </a:t>
+            </a:r>
+            <a:r>
+              <a:rPr lang="en-GB" dirty="0" err="1"/>
+              <a:t>Enum</a:t>
+            </a:r>
+            <a:r>
+              <a:rPr lang="en-GB" dirty="0"/>
+              <a:t> </a:t>
+            </a:r>
+            <a:r>
+              <a:rPr lang="en-GB" dirty="0" err="1"/>
+              <a:t>müssen</a:t>
+            </a:r>
+            <a:r>
+              <a:rPr lang="en-GB" dirty="0"/>
+              <a:t> Gross </a:t>
+            </a:r>
+            <a:r>
+              <a:rPr lang="en-GB" dirty="0" err="1"/>
+              <a:t>geschreiben</a:t>
+            </a:r>
+            <a:r>
+              <a:rPr lang="en-GB" dirty="0"/>
+              <a:t> </a:t>
+            </a:r>
+            <a:r>
+              <a:rPr lang="en-GB" dirty="0" err="1"/>
+              <a:t>werden</a:t>
+            </a:r>
+            <a:r>
+              <a:rPr lang="en-GB" dirty="0"/>
+              <a:t>, </a:t>
+            </a:r>
+            <a:r>
+              <a:rPr lang="en-GB" dirty="0" err="1"/>
+              <a:t>jedoch</a:t>
+            </a:r>
+            <a:r>
+              <a:rPr lang="en-GB" dirty="0"/>
+              <a:t> die API </a:t>
+            </a:r>
+            <a:r>
+              <a:rPr lang="en-GB" dirty="0" err="1"/>
+              <a:t>benutzt</a:t>
+            </a:r>
+            <a:r>
+              <a:rPr lang="en-GB" dirty="0"/>
+              <a:t> </a:t>
+            </a:r>
+            <a:r>
+              <a:rPr lang="en-GB" dirty="0" err="1"/>
+              <a:t>andere</a:t>
+            </a:r>
+            <a:r>
+              <a:rPr lang="en-GB" dirty="0"/>
+              <a:t> </a:t>
+            </a:r>
+            <a:r>
+              <a:rPr lang="en-GB" dirty="0" err="1"/>
+              <a:t>Schreibweise</a:t>
+            </a:r>
+            <a:r>
+              <a:rPr lang="en-GB" dirty="0"/>
+              <a:t> und </a:t>
+            </a:r>
+            <a:r>
+              <a:rPr lang="en-GB" dirty="0" err="1"/>
+              <a:t>wäre</a:t>
+            </a:r>
+            <a:r>
+              <a:rPr lang="en-GB" dirty="0"/>
+              <a:t> </a:t>
+            </a:r>
+            <a:r>
+              <a:rPr lang="en-GB" dirty="0" err="1"/>
+              <a:t>somit</a:t>
+            </a:r>
+            <a:r>
+              <a:rPr lang="en-GB" dirty="0"/>
+              <a:t> </a:t>
+            </a:r>
+            <a:r>
+              <a:rPr lang="en-GB" dirty="0" err="1"/>
+              <a:t>nicht</a:t>
+            </a:r>
+            <a:r>
+              <a:rPr lang="en-GB" dirty="0"/>
+              <a:t> </a:t>
+            </a:r>
+            <a:r>
+              <a:rPr lang="en-GB" dirty="0" err="1"/>
+              <a:t>kompatibel</a:t>
+            </a:r>
+            <a:endParaRPr lang="en-GB" dirty="0"/>
+          </a:p>
+          <a:p>
+            <a:pPr marL="171450" indent="-171450">
+              <a:buFontTx/>
+              <a:buChar char="-"/>
+            </a:pPr>
+            <a:r>
+              <a:rPr lang="en-GB" dirty="0" err="1"/>
+              <a:t>Einige</a:t>
+            </a:r>
+            <a:r>
+              <a:rPr lang="en-GB" dirty="0"/>
+              <a:t> Android Klassen </a:t>
+            </a:r>
+            <a:r>
+              <a:rPr lang="en-GB" dirty="0" err="1"/>
+              <a:t>haben</a:t>
+            </a:r>
+            <a:r>
+              <a:rPr lang="en-GB" dirty="0"/>
+              <a:t> </a:t>
+            </a:r>
+            <a:r>
+              <a:rPr lang="en-GB" dirty="0" err="1"/>
+              <a:t>schon</a:t>
+            </a:r>
+            <a:r>
+              <a:rPr lang="en-GB" dirty="0"/>
+              <a:t> </a:t>
+            </a:r>
+            <a:r>
+              <a:rPr lang="en-GB" dirty="0" err="1"/>
+              <a:t>mehr</a:t>
+            </a:r>
+            <a:r>
+              <a:rPr lang="en-GB" dirty="0"/>
+              <a:t> </a:t>
+            </a:r>
+            <a:r>
+              <a:rPr lang="en-GB" dirty="0" err="1"/>
+              <a:t>als</a:t>
+            </a:r>
+            <a:r>
+              <a:rPr lang="en-GB" dirty="0"/>
+              <a:t> 5 </a:t>
+            </a:r>
+            <a:r>
+              <a:rPr lang="en-GB" dirty="0" err="1"/>
+              <a:t>Vererbungen</a:t>
+            </a:r>
+            <a:r>
+              <a:rPr lang="en-GB" dirty="0"/>
+              <a:t>.</a:t>
+            </a:r>
+          </a:p>
+          <a:p>
+            <a:pPr marL="0" indent="0">
+              <a:buFontTx/>
+              <a:buNone/>
+            </a:pPr>
+            <a:endParaRPr lang="en-GB" dirty="0"/>
+          </a:p>
+          <a:p>
+            <a:pPr marL="0" indent="0">
+              <a:buFontTx/>
+              <a:buNone/>
+            </a:pPr>
+            <a:r>
+              <a:rPr lang="en-GB" dirty="0"/>
+              <a:t>Monkey-Test</a:t>
+            </a:r>
+          </a:p>
+          <a:p>
+            <a:pPr marL="171450" indent="-171450">
+              <a:buFontTx/>
+              <a:buChar char="-"/>
+            </a:pPr>
+            <a:r>
+              <a:rPr lang="en-GB" dirty="0" err="1"/>
+              <a:t>Zum</a:t>
+            </a:r>
+            <a:r>
+              <a:rPr lang="en-GB" dirty="0"/>
+              <a:t> </a:t>
+            </a:r>
+            <a:r>
+              <a:rPr lang="en-GB" dirty="0" err="1"/>
+              <a:t>Testen</a:t>
+            </a:r>
+            <a:r>
+              <a:rPr lang="en-GB" dirty="0"/>
+              <a:t> der </a:t>
+            </a:r>
+            <a:r>
+              <a:rPr lang="en-GB" dirty="0" err="1"/>
+              <a:t>Stabilität</a:t>
+            </a:r>
+            <a:r>
+              <a:rPr lang="en-GB" dirty="0"/>
+              <a:t>. In ADB (Android Debugging Bridge) </a:t>
+            </a:r>
+            <a:r>
+              <a:rPr lang="en-GB" dirty="0" err="1"/>
+              <a:t>integriert</a:t>
+            </a:r>
+            <a:r>
+              <a:rPr lang="en-GB" dirty="0"/>
+              <a:t>.</a:t>
+            </a:r>
+          </a:p>
+          <a:p>
+            <a:pPr marL="171450" indent="-171450">
+              <a:buFontTx/>
+              <a:buChar char="-"/>
+            </a:pPr>
+            <a:r>
+              <a:rPr lang="en-GB" dirty="0" err="1"/>
+              <a:t>Macht</a:t>
+            </a:r>
+            <a:r>
+              <a:rPr lang="en-GB" dirty="0"/>
+              <a:t> pseudo Random </a:t>
+            </a:r>
+            <a:r>
+              <a:rPr lang="en-GB" dirty="0" err="1"/>
+              <a:t>Interaktionen</a:t>
+            </a:r>
+            <a:r>
+              <a:rPr lang="en-GB" dirty="0"/>
+              <a:t> </a:t>
+            </a:r>
+            <a:r>
+              <a:rPr lang="en-GB" dirty="0" err="1"/>
+              <a:t>mit</a:t>
+            </a:r>
+            <a:r>
+              <a:rPr lang="en-GB" dirty="0"/>
+              <a:t> </a:t>
+            </a:r>
+            <a:r>
+              <a:rPr lang="en-GB" dirty="0" err="1"/>
+              <a:t>dem</a:t>
+            </a:r>
+            <a:r>
+              <a:rPr lang="en-GB" dirty="0"/>
+              <a:t> Device. </a:t>
+            </a:r>
+            <a:r>
+              <a:rPr lang="en-GB" dirty="0" err="1"/>
+              <a:t>Guten</a:t>
+            </a:r>
+            <a:r>
+              <a:rPr lang="en-GB" dirty="0"/>
+              <a:t> Test </a:t>
+            </a:r>
+            <a:r>
+              <a:rPr lang="en-GB" dirty="0" err="1"/>
               <a:t>für</a:t>
             </a:r>
             <a:r>
-              <a:rPr lang="en-GB"/>
-              <a:t> Demo!!!</a:t>
+              <a:rPr lang="en-GB" dirty="0"/>
+              <a:t> </a:t>
+            </a:r>
+            <a:r>
+              <a:rPr lang="en-GB" dirty="0" err="1"/>
+              <a:t>Stabilität</a:t>
+            </a:r>
+            <a:r>
+              <a:rPr lang="en-GB" dirty="0"/>
+              <a:t> der App</a:t>
             </a:r>
           </a:p>
         </p:txBody>
@@ -3330,7 +3547,7 @@
     </p:spTree>
     <p:extLst>
       <p:ext uri="{BB962C8B-B14F-4D97-AF65-F5344CB8AC3E}">
-        <p14:creationId xmlns:p14="http://schemas.microsoft.com/office/powerpoint/2010/main" val="2530695747"/>
+        <p14:creationId xmlns:p14="http://schemas.microsoft.com/office/powerpoint/2010/main" val="4250532794"/>
       </p:ext>
     </p:extLst>
   </p:cSld>
@@ -6422,7 +6639,7 @@
           <p:cNvPr id="2" name="Titel 1">
             <a:extLst>
               <a:ext uri="{FF2B5EF4-FFF2-40B4-BE49-F238E27FC236}">
-                <a16:creationId xmlns:a16="http://schemas.microsoft.com/office/drawing/2014/main" id="{F5CDFFE4-D353-4E85-BC81-E89F9305F6A4}"/>
+                <a16:creationId xmlns:a16="http://schemas.microsoft.com/office/drawing/2014/main" id="{A1320CD9-07C0-41F5-9031-90292C9BA40C}"/>
               </a:ext>
             </a:extLst>
           </p:cNvPr>
@@ -6440,7 +6657,7 @@
           <a:p>
             <a:r>
               <a:rPr lang="en-GB" dirty="0"/>
-              <a:t>Evaluation / Testing</a:t>
+              <a:t>Implementation</a:t>
             </a:r>
           </a:p>
         </p:txBody>
@@ -6450,7 +6667,7 @@
           <p:cNvPr id="3" name="Inhaltsplatzhalter 2">
             <a:extLst>
               <a:ext uri="{FF2B5EF4-FFF2-40B4-BE49-F238E27FC236}">
-                <a16:creationId xmlns:a16="http://schemas.microsoft.com/office/drawing/2014/main" id="{86043A25-7E8D-4E6F-B9D9-CE9DBDAF2DC8}"/>
+                <a16:creationId xmlns:a16="http://schemas.microsoft.com/office/drawing/2014/main" id="{DEEE9B27-06A7-469E-B9E8-72D4FDF1E1F1}"/>
               </a:ext>
             </a:extLst>
           </p:cNvPr>
@@ -6468,50 +6685,34 @@
           <a:p>
             <a:r>
               <a:rPr lang="en-GB" dirty="0"/>
-              <a:t>JUnit Test</a:t>
-            </a:r>
-          </a:p>
-          <a:p>
-            <a:r>
-              <a:rPr lang="en-GB" dirty="0"/>
-              <a:t>Code Coverage </a:t>
-            </a:r>
-            <a:r>
-              <a:rPr lang="en-GB" dirty="0">
-                <a:solidFill>
-                  <a:srgbClr val="FF0000"/>
-                </a:solidFill>
-              </a:rPr>
-              <a:t>about 30 %</a:t>
-            </a:r>
-          </a:p>
-          <a:p>
-            <a:r>
-              <a:rPr lang="en-GB" dirty="0" err="1"/>
-              <a:t>SonarQube</a:t>
+              <a:t>Scrum</a:t>
+            </a:r>
+          </a:p>
+          <a:p>
+            <a:r>
+              <a:rPr lang="en-GB" dirty="0" err="1"/>
+              <a:t>GeoFire</a:t>
             </a:r>
             <a:endParaRPr lang="en-GB" dirty="0"/>
           </a:p>
           <a:p>
-            <a:pPr lvl="1"/>
-            <a:r>
-              <a:rPr lang="en-GB" dirty="0"/>
-              <a:t>Some points can not be fixed</a:t>
-            </a:r>
-          </a:p>
-          <a:p>
-            <a:r>
-              <a:rPr lang="en-GB"/>
-              <a:t>Monkey-Test</a:t>
-            </a:r>
-            <a:endParaRPr lang="en-GB" dirty="0"/>
+            <a:r>
+              <a:rPr lang="en-GB" dirty="0"/>
+              <a:t>Sorting of list</a:t>
+            </a:r>
+          </a:p>
+          <a:p>
+            <a:r>
+              <a:rPr lang="en-GB" dirty="0"/>
+              <a:t>Weather icons</a:t>
+            </a:r>
           </a:p>
         </p:txBody>
       </p:sp>
     </p:spTree>
     <p:extLst>
       <p:ext uri="{BB962C8B-B14F-4D97-AF65-F5344CB8AC3E}">
-        <p14:creationId xmlns:p14="http://schemas.microsoft.com/office/powerpoint/2010/main" val="1742385124"/>
+        <p14:creationId xmlns:p14="http://schemas.microsoft.com/office/powerpoint/2010/main" val="1313387902"/>
       </p:ext>
     </p:extLst>
   </p:cSld>
@@ -6582,70 +6783,57 @@
             <p:ph idx="1"/>
           </p:nvPr>
         </p:nvSpPr>
-        <p:spPr>
-          <a:xfrm>
-            <a:off x="628650" y="1825625"/>
-            <a:ext cx="7886700" cy="4351338"/>
-          </a:xfrm>
-        </p:spPr>
+        <p:spPr/>
         <p:txBody>
           <a:bodyPr/>
           <a:lstStyle/>
           <a:p>
             <a:r>
               <a:rPr lang="en-GB" dirty="0"/>
-              <a:t>Monkey Test</a:t>
-            </a:r>
+              <a:t>JUnit Test</a:t>
+            </a:r>
+          </a:p>
+          <a:p>
+            <a:r>
+              <a:rPr lang="en-GB" dirty="0"/>
+              <a:t>Code Coverage </a:t>
+            </a:r>
+            <a:r>
+              <a:rPr lang="en-GB" dirty="0">
+                <a:solidFill>
+                  <a:srgbClr val="FF0000"/>
+                </a:solidFill>
+              </a:rPr>
+              <a:t>about 30 %</a:t>
+            </a:r>
+          </a:p>
+          <a:p>
+            <a:r>
+              <a:rPr lang="en-GB" dirty="0" err="1"/>
+              <a:t>SonarQube</a:t>
+            </a:r>
+            <a:endParaRPr lang="en-GB" dirty="0"/>
           </a:p>
           <a:p>
             <a:pPr lvl="1"/>
             <a:r>
               <a:rPr lang="en-GB" dirty="0"/>
-              <a:t>Command Line Tool</a:t>
-            </a:r>
-          </a:p>
-          <a:p>
-            <a:pPr lvl="1"/>
-            <a:r>
-              <a:rPr lang="en-GB" dirty="0"/>
-              <a:t>Starting with:</a:t>
-            </a:r>
-          </a:p>
-          <a:p>
-            <a:pPr lvl="2"/>
-            <a:r>
-              <a:rPr lang="en-GB" dirty="0"/>
-              <a:t>$ </a:t>
-            </a:r>
-            <a:r>
-              <a:rPr lang="en-GB" dirty="0" err="1"/>
-              <a:t>adb</a:t>
-            </a:r>
-            <a:r>
-              <a:rPr lang="en-GB" dirty="0"/>
-              <a:t> shell monkey –p your.package.name –v 500</a:t>
-            </a:r>
-          </a:p>
-          <a:p>
-            <a:pPr lvl="1"/>
-            <a:r>
-              <a:rPr lang="en-GB" dirty="0"/>
-              <a:t>Sends 500 Random Events to the Application</a:t>
-            </a:r>
-          </a:p>
-          <a:p>
-            <a:pPr lvl="1"/>
-            <a:r>
-              <a:rPr lang="en-GB" dirty="0"/>
-              <a:t>Testing App for Stability</a:t>
-            </a:r>
+              <a:t>Some points can not be fixed</a:t>
+            </a:r>
+          </a:p>
+          <a:p>
+            <a:r>
+              <a:rPr lang="en-GB"/>
+              <a:t>Monkey-Test</a:t>
+            </a:r>
+            <a:endParaRPr lang="en-GB" dirty="0"/>
           </a:p>
         </p:txBody>
       </p:sp>
     </p:spTree>
     <p:extLst>
       <p:ext uri="{BB962C8B-B14F-4D97-AF65-F5344CB8AC3E}">
-        <p14:creationId xmlns:p14="http://schemas.microsoft.com/office/powerpoint/2010/main" val="453683398"/>
+        <p14:creationId xmlns:p14="http://schemas.microsoft.com/office/powerpoint/2010/main" val="1742385124"/>
       </p:ext>
     </p:extLst>
   </p:cSld>
@@ -7081,6 +7269,140 @@
           <p:cNvPr id="2" name="Titel 1">
             <a:extLst>
               <a:ext uri="{FF2B5EF4-FFF2-40B4-BE49-F238E27FC236}">
+                <a16:creationId xmlns:a16="http://schemas.microsoft.com/office/drawing/2014/main" id="{F5CDFFE4-D353-4E85-BC81-E89F9305F6A4}"/>
+              </a:ext>
+            </a:extLst>
+          </p:cNvPr>
+          <p:cNvSpPr>
+            <a:spLocks noGrp="1"/>
+          </p:cNvSpPr>
+          <p:nvPr>
+            <p:ph type="title"/>
+          </p:nvPr>
+        </p:nvSpPr>
+        <p:spPr/>
+        <p:txBody>
+          <a:bodyPr/>
+          <a:lstStyle/>
+          <a:p>
+            <a:r>
+              <a:rPr lang="en-GB" dirty="0"/>
+              <a:t>Evaluation / Testing</a:t>
+            </a:r>
+          </a:p>
+        </p:txBody>
+      </p:sp>
+      <p:sp>
+        <p:nvSpPr>
+          <p:cNvPr id="3" name="Inhaltsplatzhalter 2">
+            <a:extLst>
+              <a:ext uri="{FF2B5EF4-FFF2-40B4-BE49-F238E27FC236}">
+                <a16:creationId xmlns:a16="http://schemas.microsoft.com/office/drawing/2014/main" id="{86043A25-7E8D-4E6F-B9D9-CE9DBDAF2DC8}"/>
+              </a:ext>
+            </a:extLst>
+          </p:cNvPr>
+          <p:cNvSpPr>
+            <a:spLocks noGrp="1"/>
+          </p:cNvSpPr>
+          <p:nvPr>
+            <p:ph idx="1"/>
+          </p:nvPr>
+        </p:nvSpPr>
+        <p:spPr>
+          <a:xfrm>
+            <a:off x="628650" y="1825625"/>
+            <a:ext cx="7886700" cy="4351338"/>
+          </a:xfrm>
+        </p:spPr>
+        <p:txBody>
+          <a:bodyPr/>
+          <a:lstStyle/>
+          <a:p>
+            <a:r>
+              <a:rPr lang="en-GB" dirty="0"/>
+              <a:t>Monkey Test</a:t>
+            </a:r>
+          </a:p>
+          <a:p>
+            <a:pPr lvl="1"/>
+            <a:r>
+              <a:rPr lang="en-GB" dirty="0"/>
+              <a:t>Command Line Tool</a:t>
+            </a:r>
+          </a:p>
+          <a:p>
+            <a:pPr lvl="1"/>
+            <a:r>
+              <a:rPr lang="en-GB" dirty="0"/>
+              <a:t>Starting with:</a:t>
+            </a:r>
+          </a:p>
+          <a:p>
+            <a:pPr lvl="2"/>
+            <a:r>
+              <a:rPr lang="en-GB" dirty="0"/>
+              <a:t>$ </a:t>
+            </a:r>
+            <a:r>
+              <a:rPr lang="en-GB" dirty="0" err="1"/>
+              <a:t>adb</a:t>
+            </a:r>
+            <a:r>
+              <a:rPr lang="en-GB" dirty="0"/>
+              <a:t> shell monkey –p your.package.name –v 500</a:t>
+            </a:r>
+          </a:p>
+          <a:p>
+            <a:pPr lvl="1"/>
+            <a:r>
+              <a:rPr lang="en-GB" dirty="0"/>
+              <a:t>Sends 500 Random Events to the Application</a:t>
+            </a:r>
+          </a:p>
+          <a:p>
+            <a:pPr lvl="1"/>
+            <a:r>
+              <a:rPr lang="en-GB" dirty="0"/>
+              <a:t>Testing App for Stability</a:t>
+            </a:r>
+          </a:p>
+        </p:txBody>
+      </p:sp>
+    </p:spTree>
+    <p:extLst>
+      <p:ext uri="{BB962C8B-B14F-4D97-AF65-F5344CB8AC3E}">
+        <p14:creationId xmlns:p14="http://schemas.microsoft.com/office/powerpoint/2010/main" val="453683398"/>
+      </p:ext>
+    </p:extLst>
+  </p:cSld>
+  <p:clrMapOvr>
+    <a:masterClrMapping/>
+  </p:clrMapOvr>
+</p:sld>
+</file>
+
+<file path=ppt/slides/slide14.xml><?xml version="1.0" encoding="utf-8"?>
+<p:sld xmlns:a="http://schemas.openxmlformats.org/drawingml/2006/main" xmlns:r="http://schemas.openxmlformats.org/officeDocument/2006/relationships" xmlns:p="http://schemas.openxmlformats.org/presentationml/2006/main">
+  <p:cSld>
+    <p:spTree>
+      <p:nvGrpSpPr>
+        <p:cNvPr id="1" name=""/>
+        <p:cNvGrpSpPr/>
+        <p:nvPr/>
+      </p:nvGrpSpPr>
+      <p:grpSpPr>
+        <a:xfrm>
+          <a:off x="0" y="0"/>
+          <a:ext cx="0" cy="0"/>
+          <a:chOff x="0" y="0"/>
+          <a:chExt cx="0" cy="0"/>
+        </a:xfrm>
+      </p:grpSpPr>
+      <p:sp>
+        <p:nvSpPr>
+          <p:cNvPr id="2" name="Titel 1">
+            <a:extLst>
+              <a:ext uri="{FF2B5EF4-FFF2-40B4-BE49-F238E27FC236}">
                 <a16:creationId xmlns:a16="http://schemas.microsoft.com/office/drawing/2014/main" id="{AAA81A65-6DCA-461D-A610-9F43B9E69EBF}"/>
               </a:ext>
             </a:extLst>
@@ -7117,7 +7439,7 @@
 </p:sld>
 </file>
 
-<file path=ppt/slides/slide14.xml><?xml version="1.0" encoding="utf-8"?>
+<file path=ppt/slides/slide15.xml><?xml version="1.0" encoding="utf-8"?>
 <p:sld xmlns:a="http://schemas.openxmlformats.org/drawingml/2006/main" xmlns:r="http://schemas.openxmlformats.org/officeDocument/2006/relationships" xmlns:p="http://schemas.openxmlformats.org/presentationml/2006/main">
   <p:cSld>
     <p:spTree>
@@ -7669,6 +7991,55 @@
         <p:txBody>
           <a:bodyPr/>
           <a:lstStyle/>
+          <a:p>
+            <a:r>
+              <a:rPr lang="de-CH" dirty="0"/>
+              <a:t>Use ski-resort </a:t>
+            </a:r>
+            <a:r>
+              <a:rPr lang="de-CH" dirty="0" err="1"/>
+              <a:t>information</a:t>
+            </a:r>
+            <a:endParaRPr lang="de-CH" dirty="0"/>
+          </a:p>
+          <a:p>
+            <a:r>
+              <a:rPr lang="de-CH" dirty="0"/>
+              <a:t>Use </a:t>
+            </a:r>
+            <a:r>
+              <a:rPr lang="de-CH" dirty="0" err="1"/>
+              <a:t>weather</a:t>
+            </a:r>
+            <a:r>
+              <a:rPr lang="de-CH" dirty="0"/>
+              <a:t> </a:t>
+            </a:r>
+            <a:r>
+              <a:rPr lang="de-CH" dirty="0" err="1"/>
+              <a:t>information</a:t>
+            </a:r>
+            <a:endParaRPr lang="de-CH" dirty="0"/>
+          </a:p>
+          <a:p>
+            <a:r>
+              <a:rPr lang="de-CH" dirty="0"/>
+              <a:t>Put </a:t>
+            </a:r>
+            <a:r>
+              <a:rPr lang="de-CH" dirty="0" err="1"/>
+              <a:t>them</a:t>
+            </a:r>
+            <a:r>
+              <a:rPr lang="de-CH" dirty="0"/>
+              <a:t> </a:t>
+            </a:r>
+            <a:r>
+              <a:rPr lang="de-CH" dirty="0" err="1"/>
+              <a:t>together</a:t>
+            </a:r>
+            <a:endParaRPr lang="de-CH" dirty="0"/>
+          </a:p>
           <a:p>
             <a:endParaRPr lang="de-CH" dirty="0"/>
           </a:p>
@@ -9526,7 +9897,7 @@
           <a:p>
             <a:r>
               <a:rPr lang="en-GB" dirty="0"/>
-              <a:t>Architecture</a:t>
+              <a:t>Architecture Project</a:t>
             </a:r>
           </a:p>
         </p:txBody>
@@ -9632,7 +10003,7 @@
         </p:nvSpPr>
         <p:spPr>
           <a:xfrm>
-            <a:off x="6380252" y="494731"/>
+            <a:off x="6779017" y="505005"/>
             <a:ext cx="1736333" cy="974473"/>
           </a:xfrm>
           <a:prstGeom prst="roundRect">
@@ -9705,7 +10076,7 @@
         </p:nvSpPr>
         <p:spPr>
           <a:xfrm>
-            <a:off x="6380250" y="1985823"/>
+            <a:off x="6779015" y="1996097"/>
             <a:ext cx="1736335" cy="973133"/>
           </a:xfrm>
           <a:prstGeom prst="roundRect">
@@ -9759,7 +10130,7 @@
         </p:nvSpPr>
         <p:spPr>
           <a:xfrm>
-            <a:off x="6380250" y="3672740"/>
+            <a:off x="6779015" y="3683014"/>
             <a:ext cx="1736335" cy="973133"/>
           </a:xfrm>
           <a:prstGeom prst="roundRect">
@@ -9828,7 +10199,7 @@
         </p:nvSpPr>
         <p:spPr>
           <a:xfrm>
-            <a:off x="6380252" y="5359659"/>
+            <a:off x="6779017" y="5369933"/>
             <a:ext cx="1736333" cy="973134"/>
           </a:xfrm>
           <a:prstGeom prst="roundRect">
@@ -9887,7 +10258,7 @@
         </p:nvCxnSpPr>
         <p:spPr>
           <a:xfrm flipH="1">
-            <a:off x="7248418" y="1469204"/>
+            <a:off x="7647183" y="1479478"/>
             <a:ext cx="1" cy="516619"/>
           </a:xfrm>
           <a:prstGeom prst="straightConnector1">
@@ -9930,7 +10301,7 @@
         </p:nvCxnSpPr>
         <p:spPr>
           <a:xfrm>
-            <a:off x="7248418" y="2958956"/>
+            <a:off x="7647183" y="2969230"/>
             <a:ext cx="0" cy="713784"/>
           </a:xfrm>
           <a:prstGeom prst="straightConnector1">
@@ -9973,7 +10344,7 @@
         </p:nvCxnSpPr>
         <p:spPr>
           <a:xfrm>
-            <a:off x="7248418" y="4645873"/>
+            <a:off x="7647183" y="4656147"/>
             <a:ext cx="1" cy="713786"/>
           </a:xfrm>
           <a:prstGeom prst="straightConnector1">
@@ -10012,6 +10383,148 @@
 </file>
 
 <file path=ppt/slides/slide8.xml><?xml version="1.0" encoding="utf-8"?>
+<p:sld xmlns:a="http://schemas.openxmlformats.org/drawingml/2006/main" xmlns:r="http://schemas.openxmlformats.org/officeDocument/2006/relationships" xmlns:p="http://schemas.openxmlformats.org/presentationml/2006/main">
+  <p:cSld>
+    <p:spTree>
+      <p:nvGrpSpPr>
+        <p:cNvPr id="1" name=""/>
+        <p:cNvGrpSpPr/>
+        <p:nvPr/>
+      </p:nvGrpSpPr>
+      <p:grpSpPr>
+        <a:xfrm>
+          <a:off x="0" y="0"/>
+          <a:ext cx="0" cy="0"/>
+          <a:chOff x="0" y="0"/>
+          <a:chExt cx="0" cy="0"/>
+        </a:xfrm>
+      </p:grpSpPr>
+      <p:sp>
+        <p:nvSpPr>
+          <p:cNvPr id="2" name="Titel 1">
+            <a:extLst>
+              <a:ext uri="{FF2B5EF4-FFF2-40B4-BE49-F238E27FC236}">
+                <a16:creationId xmlns:a16="http://schemas.microsoft.com/office/drawing/2014/main" id="{D42BECB1-603C-4C8D-AF46-DCB65E17E822}"/>
+              </a:ext>
+            </a:extLst>
+          </p:cNvPr>
+          <p:cNvSpPr>
+            <a:spLocks noGrp="1"/>
+          </p:cNvSpPr>
+          <p:nvPr>
+            <p:ph type="title"/>
+          </p:nvPr>
+        </p:nvSpPr>
+        <p:spPr/>
+        <p:txBody>
+          <a:bodyPr/>
+          <a:lstStyle/>
+          <a:p>
+            <a:r>
+              <a:rPr lang="de-CH" dirty="0"/>
+              <a:t>Architecture App</a:t>
+            </a:r>
+          </a:p>
+        </p:txBody>
+      </p:sp>
+      <p:sp>
+        <p:nvSpPr>
+          <p:cNvPr id="3" name="Inhaltsplatzhalter 2">
+            <a:extLst>
+              <a:ext uri="{FF2B5EF4-FFF2-40B4-BE49-F238E27FC236}">
+                <a16:creationId xmlns:a16="http://schemas.microsoft.com/office/drawing/2014/main" id="{05385E87-267D-4C56-A83F-5CCB60F560C9}"/>
+              </a:ext>
+            </a:extLst>
+          </p:cNvPr>
+          <p:cNvSpPr>
+            <a:spLocks noGrp="1"/>
+          </p:cNvSpPr>
+          <p:nvPr>
+            <p:ph idx="1"/>
+          </p:nvPr>
+        </p:nvSpPr>
+        <p:spPr/>
+        <p:txBody>
+          <a:bodyPr/>
+          <a:lstStyle/>
+          <a:p>
+            <a:r>
+              <a:rPr lang="de-CH" dirty="0">
+                <a:solidFill>
+                  <a:srgbClr val="FF0000"/>
+                </a:solidFill>
+              </a:rPr>
+              <a:t>Zeigen wie App grob aufgebaut ist</a:t>
+            </a:r>
+          </a:p>
+          <a:p>
+            <a:r>
+              <a:rPr lang="de-CH" dirty="0">
+                <a:solidFill>
+                  <a:srgbClr val="FF0000"/>
+                </a:solidFill>
+              </a:rPr>
+              <a:t>(</a:t>
+            </a:r>
+            <a:r>
+              <a:rPr lang="de-CH" dirty="0" err="1">
+                <a:solidFill>
+                  <a:srgbClr val="FF0000"/>
+                </a:solidFill>
+              </a:rPr>
+              <a:t>Activitys</a:t>
+            </a:r>
+            <a:r>
+              <a:rPr lang="de-CH" dirty="0">
+                <a:solidFill>
+                  <a:srgbClr val="FF0000"/>
+                </a:solidFill>
+              </a:rPr>
+              <a:t> -&gt; Liste mit </a:t>
+            </a:r>
+            <a:r>
+              <a:rPr lang="de-CH" dirty="0" err="1">
+                <a:solidFill>
+                  <a:srgbClr val="FF0000"/>
+                </a:solidFill>
+              </a:rPr>
+              <a:t>SkiResort</a:t>
+            </a:r>
+            <a:r>
+              <a:rPr lang="de-CH" dirty="0">
+                <a:solidFill>
+                  <a:srgbClr val="FF0000"/>
+                </a:solidFill>
+              </a:rPr>
+              <a:t> Datenstruktur -&gt; Detailansicht)</a:t>
+            </a:r>
+          </a:p>
+          <a:p>
+            <a:r>
+              <a:rPr lang="de-CH" dirty="0">
+                <a:solidFill>
+                  <a:srgbClr val="FF0000"/>
+                </a:solidFill>
+              </a:rPr>
+              <a:t>Oder ganz weglassen -&gt; keine Info über App-Architektur ?!</a:t>
+            </a:r>
+          </a:p>
+        </p:txBody>
+      </p:sp>
+    </p:spTree>
+    <p:extLst>
+      <p:ext uri="{BB962C8B-B14F-4D97-AF65-F5344CB8AC3E}">
+        <p14:creationId xmlns:p14="http://schemas.microsoft.com/office/powerpoint/2010/main" val="3271009814"/>
+      </p:ext>
+    </p:extLst>
+  </p:cSld>
+  <p:clrMapOvr>
+    <a:masterClrMapping/>
+  </p:clrMapOvr>
+</p:sld>
+</file>
+
+<file path=ppt/slides/slide9.xml><?xml version="1.0" encoding="utf-8"?>
 <p:sld xmlns:a="http://schemas.openxmlformats.org/drawingml/2006/main" xmlns:r="http://schemas.openxmlformats.org/officeDocument/2006/relationships" xmlns:p="http://schemas.openxmlformats.org/presentationml/2006/main">
   <p:cSld>
     <p:spTree>
@@ -12204,105 +12717,6 @@
 </p:sld>
 </file>
 
-<file path=ppt/slides/slide9.xml><?xml version="1.0" encoding="utf-8"?>
-<p:sld xmlns:a="http://schemas.openxmlformats.org/drawingml/2006/main" xmlns:r="http://schemas.openxmlformats.org/officeDocument/2006/relationships" xmlns:p="http://schemas.openxmlformats.org/presentationml/2006/main">
-  <p:cSld>
-    <p:spTree>
-      <p:nvGrpSpPr>
-        <p:cNvPr id="1" name=""/>
-        <p:cNvGrpSpPr/>
-        <p:nvPr/>
-      </p:nvGrpSpPr>
-      <p:grpSpPr>
-        <a:xfrm>
-          <a:off x="0" y="0"/>
-          <a:ext cx="0" cy="0"/>
-          <a:chOff x="0" y="0"/>
-          <a:chExt cx="0" cy="0"/>
-        </a:xfrm>
-      </p:grpSpPr>
-      <p:sp>
-        <p:nvSpPr>
-          <p:cNvPr id="2" name="Titel 1">
-            <a:extLst>
-              <a:ext uri="{FF2B5EF4-FFF2-40B4-BE49-F238E27FC236}">
-                <a16:creationId xmlns:a16="http://schemas.microsoft.com/office/drawing/2014/main" id="{A1320CD9-07C0-41F5-9031-90292C9BA40C}"/>
-              </a:ext>
-            </a:extLst>
-          </p:cNvPr>
-          <p:cNvSpPr>
-            <a:spLocks noGrp="1"/>
-          </p:cNvSpPr>
-          <p:nvPr>
-            <p:ph type="title"/>
-          </p:nvPr>
-        </p:nvSpPr>
-        <p:spPr/>
-        <p:txBody>
-          <a:bodyPr/>
-          <a:lstStyle/>
-          <a:p>
-            <a:r>
-              <a:rPr lang="en-GB" dirty="0"/>
-              <a:t>Implementation</a:t>
-            </a:r>
-          </a:p>
-        </p:txBody>
-      </p:sp>
-      <p:sp>
-        <p:nvSpPr>
-          <p:cNvPr id="3" name="Inhaltsplatzhalter 2">
-            <a:extLst>
-              <a:ext uri="{FF2B5EF4-FFF2-40B4-BE49-F238E27FC236}">
-                <a16:creationId xmlns:a16="http://schemas.microsoft.com/office/drawing/2014/main" id="{DEEE9B27-06A7-469E-B9E8-72D4FDF1E1F1}"/>
-              </a:ext>
-            </a:extLst>
-          </p:cNvPr>
-          <p:cNvSpPr>
-            <a:spLocks noGrp="1"/>
-          </p:cNvSpPr>
-          <p:nvPr>
-            <p:ph idx="1"/>
-          </p:nvPr>
-        </p:nvSpPr>
-        <p:spPr/>
-        <p:txBody>
-          <a:bodyPr/>
-          <a:lstStyle/>
-          <a:p>
-            <a:r>
-              <a:rPr lang="en-GB" dirty="0"/>
-              <a:t>Scrum</a:t>
-            </a:r>
-          </a:p>
-          <a:p>
-            <a:r>
-              <a:rPr lang="en-GB" dirty="0" err="1"/>
-              <a:t>GeoFire</a:t>
-            </a:r>
-            <a:endParaRPr lang="en-GB" dirty="0"/>
-          </a:p>
-          <a:p>
-            <a:r>
-              <a:rPr lang="en-GB" dirty="0"/>
-              <a:t>Sorting of list</a:t>
-            </a:r>
-          </a:p>
-        </p:txBody>
-      </p:sp>
-    </p:spTree>
-    <p:extLst>
-      <p:ext uri="{BB962C8B-B14F-4D97-AF65-F5344CB8AC3E}">
-        <p14:creationId xmlns:p14="http://schemas.microsoft.com/office/powerpoint/2010/main" val="1313387902"/>
-      </p:ext>
-    </p:extLst>
-  </p:cSld>
-  <p:clrMapOvr>
-    <a:masterClrMapping/>
-  </p:clrMapOvr>
-</p:sld>
-</file>
-
 <file path=ppt/theme/theme1.xml><?xml version="1.0" encoding="utf-8"?>
 <a:theme xmlns:a="http://schemas.openxmlformats.org/drawingml/2006/main" name="Office">
   <a:themeElements>

</xml_diff>

<commit_message>
Updated Overview page. Same title to all architecture pages
</commit_message>
<xml_diff>
--- a/Documents/Presentation/Presentation.pptx
+++ b/Documents/Presentation/Presentation.pptx
@@ -823,13 +823,10 @@
               <a:t> </a:t>
             </a:r>
             <a:r>
-              <a:rPr lang="en-GB" dirty="0" err="1"/>
-              <a:t>kennengelern</a:t>
-            </a:r>
-            <a:r>
-              <a:rPr lang="en-GB" dirty="0"/>
-              <a:t>.</a:t>
-            </a:r>
+              <a:rPr lang="en-GB"/>
+              <a:t>kennengelernt.</a:t>
+            </a:r>
+            <a:endParaRPr lang="en-GB" dirty="0"/>
           </a:p>
           <a:p>
             <a:pPr marL="171450" indent="-171450">
@@ -6594,13 +6591,8 @@
             <a:pPr algn="l"/>
             <a:r>
               <a:rPr lang="de-CH" sz="1700" dirty="0"/>
-              <a:t>Artan </a:t>
-            </a:r>
-            <a:r>
-              <a:rPr lang="de-CH" sz="1700" dirty="0" err="1"/>
-              <a:t>Papaja</a:t>
-            </a:r>
-            <a:endParaRPr lang="de-CH" sz="1700" dirty="0"/>
+              <a:t>Artan Papaj</a:t>
+            </a:r>
           </a:p>
         </p:txBody>
       </p:sp>
@@ -7605,7 +7597,9 @@
           </a:xfrm>
         </p:spPr>
         <p:txBody>
-          <a:bodyPr/>
+          <a:bodyPr>
+            <a:normAutofit lnSpcReduction="10000"/>
+          </a:bodyPr>
           <a:lstStyle/>
           <a:p>
             <a:pPr>
@@ -7634,7 +7628,27 @@
             </a:pPr>
             <a:r>
               <a:rPr lang="en-GB" dirty="0"/>
-              <a:t>Design / Architecture</a:t>
+              <a:t>Existing Apps</a:t>
+            </a:r>
+          </a:p>
+          <a:p>
+            <a:pPr>
+              <a:buFontTx/>
+              <a:buChar char="-"/>
+            </a:pPr>
+            <a:r>
+              <a:rPr lang="en-GB" dirty="0"/>
+              <a:t>Design</a:t>
+            </a:r>
+          </a:p>
+          <a:p>
+            <a:pPr>
+              <a:buFontTx/>
+              <a:buChar char="-"/>
+            </a:pPr>
+            <a:r>
+              <a:rPr lang="en-GB" dirty="0"/>
+              <a:t>Architecture</a:t>
             </a:r>
           </a:p>
           <a:p>
@@ -9897,7 +9911,7 @@
           <a:p>
             <a:r>
               <a:rPr lang="en-GB" dirty="0"/>
-              <a:t>Architecture Project</a:t>
+              <a:t>Architecture</a:t>
             </a:r>
           </a:p>
         </p:txBody>
@@ -10422,7 +10436,7 @@
           <a:p>
             <a:r>
               <a:rPr lang="de-CH" dirty="0"/>
-              <a:t>Architecture App</a:t>
+              <a:t>Architecture</a:t>
             </a:r>
           </a:p>
         </p:txBody>
@@ -10564,13 +10578,8 @@
           <a:p>
             <a:r>
               <a:rPr lang="de-CH" dirty="0"/>
-              <a:t>UML </a:t>
-            </a:r>
-            <a:r>
-              <a:rPr lang="de-CH" dirty="0" err="1"/>
-              <a:t>DataArchitecture</a:t>
-            </a:r>
-            <a:endParaRPr lang="de-CH" dirty="0"/>
+              <a:t>Architecture</a:t>
+            </a:r>
           </a:p>
         </p:txBody>
       </p:sp>

</xml_diff>

<commit_message>
Add some Notes to the Pages
</commit_message>
<xml_diff>
--- a/Documents/Presentation/Presentation.pptx
+++ b/Documents/Presentation/Presentation.pptx
@@ -528,41 +528,130 @@
           <a:lstStyle/>
           <a:p>
             <a:r>
-              <a:rPr lang="de-CH" dirty="0"/>
-              <a:t>Motivation: 	Value </a:t>
-            </a:r>
-            <a:r>
-              <a:rPr lang="de-CH" dirty="0" err="1"/>
-              <a:t>for</a:t>
-            </a:r>
-            <a:r>
-              <a:rPr lang="de-CH" dirty="0"/>
-              <a:t> Users: Benutzern (also auch uns) die Möglichkeit geben, andere Skigebiete kennenzulernen. Die Auswahl des Zieles zu vereinfachen.</a:t>
-            </a:r>
-          </a:p>
-          <a:p>
-            <a:r>
-              <a:rPr lang="de-CH" dirty="0"/>
-              <a:t>	Value </a:t>
-            </a:r>
-            <a:r>
-              <a:rPr lang="de-CH" dirty="0" err="1"/>
-              <a:t>for</a:t>
-            </a:r>
-            <a:r>
-              <a:rPr lang="de-CH" dirty="0"/>
-              <a:t> Stakeholder: Geldverdienen mit Werbung von Skiartikeln, Skigebiete können kostenpflichtig Bilder o.ä. aufschalten.</a:t>
-            </a:r>
-          </a:p>
-          <a:p>
-            <a:r>
-              <a:rPr lang="de-CH" dirty="0" err="1"/>
-              <a:t>Functions</a:t>
-            </a:r>
-            <a:r>
-              <a:rPr lang="de-CH" dirty="0"/>
-              <a:t>: Anzeigen der 10 nächstgelegenen Skigebieten, sortiert nach eigenen Wünschen, Anzeigen von Detailinfos zum Ort, Möglichkeit die Website zu besuchen und die Navigation zu starten</a:t>
-            </a:r>
+              <a:rPr lang="en-GB" dirty="0" err="1"/>
+              <a:t>Einleitung</a:t>
+            </a:r>
+            <a:endParaRPr lang="en-GB" dirty="0"/>
+          </a:p>
+          <a:p>
+            <a:r>
+              <a:rPr lang="en-GB" dirty="0"/>
+              <a:t>	- Motivation</a:t>
+            </a:r>
+          </a:p>
+          <a:p>
+            <a:r>
+              <a:rPr lang="en-GB" dirty="0"/>
+              <a:t>	- </a:t>
+            </a:r>
+            <a:r>
+              <a:rPr lang="en-GB" dirty="0" err="1"/>
+              <a:t>Ziele</a:t>
+            </a:r>
+            <a:endParaRPr lang="en-GB" dirty="0"/>
+          </a:p>
+          <a:p>
+            <a:r>
+              <a:rPr lang="en-GB" dirty="0" err="1"/>
+              <a:t>Hintergrund</a:t>
+            </a:r>
+            <a:endParaRPr lang="en-GB" dirty="0"/>
+          </a:p>
+          <a:p>
+            <a:r>
+              <a:rPr lang="en-GB" dirty="0" err="1"/>
+              <a:t>Existierene</a:t>
+            </a:r>
+            <a:r>
+              <a:rPr lang="en-GB" dirty="0"/>
+              <a:t> Apps</a:t>
+            </a:r>
+          </a:p>
+          <a:p>
+            <a:r>
+              <a:rPr lang="en-GB" dirty="0"/>
+              <a:t>Design</a:t>
+            </a:r>
+          </a:p>
+          <a:p>
+            <a:r>
+              <a:rPr lang="en-GB" dirty="0" err="1"/>
+              <a:t>Architektur</a:t>
+            </a:r>
+            <a:r>
+              <a:rPr lang="en-GB" dirty="0"/>
+              <a:t> der App</a:t>
+            </a:r>
+          </a:p>
+          <a:p>
+            <a:r>
+              <a:rPr lang="en-GB" dirty="0" err="1"/>
+              <a:t>Implementierung</a:t>
+            </a:r>
+            <a:endParaRPr lang="en-GB" dirty="0"/>
+          </a:p>
+          <a:p>
+            <a:r>
+              <a:rPr lang="en-GB" dirty="0"/>
+              <a:t>Evaluation und Testing</a:t>
+            </a:r>
+          </a:p>
+          <a:p>
+            <a:r>
+              <a:rPr lang="en-GB" dirty="0"/>
+              <a:t>Demonstration</a:t>
+            </a:r>
+          </a:p>
+          <a:p>
+            <a:r>
+              <a:rPr lang="en-GB" dirty="0" err="1"/>
+              <a:t>Diskusion</a:t>
+            </a:r>
+            <a:endParaRPr lang="en-GB" dirty="0"/>
+          </a:p>
+          <a:p>
+            <a:r>
+              <a:rPr lang="en-GB" dirty="0"/>
+              <a:t>	- </a:t>
+            </a:r>
+            <a:r>
+              <a:rPr lang="en-GB" dirty="0" err="1"/>
+              <a:t>Gelernt</a:t>
+            </a:r>
+            <a:endParaRPr lang="en-GB" dirty="0"/>
+          </a:p>
+          <a:p>
+            <a:r>
+              <a:rPr lang="en-GB" dirty="0"/>
+              <a:t>	- </a:t>
+            </a:r>
+            <a:r>
+              <a:rPr lang="en-GB" dirty="0" err="1"/>
+              <a:t>Erfahrungen</a:t>
+            </a:r>
+            <a:endParaRPr lang="en-GB" dirty="0"/>
+          </a:p>
+          <a:p>
+            <a:r>
+              <a:rPr lang="en-GB" dirty="0"/>
+              <a:t>	- </a:t>
+            </a:r>
+            <a:r>
+              <a:rPr lang="en-GB" dirty="0" err="1"/>
+              <a:t>Weiteres</a:t>
+            </a:r>
+            <a:r>
+              <a:rPr lang="en-GB" dirty="0"/>
+              <a:t> </a:t>
+            </a:r>
+            <a:r>
+              <a:rPr lang="en-GB" dirty="0" err="1"/>
+              <a:t>Vorgehen</a:t>
+            </a:r>
+            <a:endParaRPr lang="en-GB" dirty="0"/>
+          </a:p>
+          <a:p>
+            <a:endParaRPr lang="en-GB" dirty="0"/>
           </a:p>
         </p:txBody>
       </p:sp>
@@ -583,7 +672,7 @@
           <a:p>
             <a:fld id="{748723F8-CD6B-45E3-B09A-75062809A4AE}" type="slidenum">
               <a:rPr lang="en-GB" smtClean="0"/>
-              <a:t>3</a:t>
+              <a:t>2</a:t>
             </a:fld>
             <a:endParaRPr lang="en-GB"/>
           </a:p>
@@ -592,7 +681,7 @@
     </p:spTree>
     <p:extLst>
       <p:ext uri="{BB962C8B-B14F-4D97-AF65-F5344CB8AC3E}">
-        <p14:creationId xmlns:p14="http://schemas.microsoft.com/office/powerpoint/2010/main" val="413757644"/>
+        <p14:creationId xmlns:p14="http://schemas.microsoft.com/office/powerpoint/2010/main" val="1981628433"/>
       </p:ext>
     </p:extLst>
   </p:cSld>
@@ -648,6 +737,599 @@
           <a:p>
             <a:r>
               <a:rPr lang="en-GB" dirty="0"/>
+              <a:t>JUnit Test</a:t>
+            </a:r>
+          </a:p>
+          <a:p>
+            <a:pPr marL="171450" indent="-171450">
+              <a:buFontTx/>
+              <a:buChar char="-"/>
+            </a:pPr>
+            <a:r>
+              <a:rPr lang="en-GB" dirty="0"/>
+              <a:t>Test der </a:t>
+            </a:r>
+            <a:r>
+              <a:rPr lang="en-GB" dirty="0" err="1"/>
+              <a:t>Sortierungen</a:t>
+            </a:r>
+            <a:r>
+              <a:rPr lang="en-GB" dirty="0"/>
+              <a:t> -&gt; </a:t>
+            </a:r>
+            <a:r>
+              <a:rPr lang="en-GB" dirty="0" err="1"/>
+              <a:t>Distanz</a:t>
+            </a:r>
+            <a:r>
+              <a:rPr lang="en-GB" dirty="0"/>
+              <a:t>, Wetter, Status, </a:t>
+            </a:r>
+            <a:r>
+              <a:rPr lang="en-GB" dirty="0" err="1"/>
+              <a:t>Geöffneten</a:t>
+            </a:r>
+            <a:r>
+              <a:rPr lang="en-GB" dirty="0"/>
+              <a:t> </a:t>
+            </a:r>
+            <a:r>
+              <a:rPr lang="en-GB" dirty="0" err="1"/>
+              <a:t>Pisten</a:t>
+            </a:r>
+            <a:r>
+              <a:rPr lang="en-GB" dirty="0"/>
+              <a:t> und </a:t>
+            </a:r>
+            <a:r>
+              <a:rPr lang="en-GB" dirty="0" err="1"/>
+              <a:t>Lifte</a:t>
+            </a:r>
+            <a:endParaRPr lang="en-GB" dirty="0"/>
+          </a:p>
+          <a:p>
+            <a:pPr marL="171450" indent="-171450">
+              <a:buFontTx/>
+              <a:buChar char="-"/>
+            </a:pPr>
+            <a:r>
+              <a:rPr lang="en-GB" dirty="0" err="1"/>
+              <a:t>Serializierung</a:t>
+            </a:r>
+            <a:r>
+              <a:rPr lang="en-GB" dirty="0"/>
+              <a:t> und </a:t>
+            </a:r>
+            <a:r>
+              <a:rPr lang="en-GB" dirty="0" err="1"/>
+              <a:t>Deserializierung</a:t>
+            </a:r>
+            <a:r>
+              <a:rPr lang="en-GB" dirty="0"/>
+              <a:t> </a:t>
+            </a:r>
+            <a:r>
+              <a:rPr lang="en-GB" dirty="0" err="1"/>
+              <a:t>mittels</a:t>
+            </a:r>
+            <a:r>
+              <a:rPr lang="en-GB" dirty="0"/>
+              <a:t> </a:t>
+            </a:r>
+            <a:r>
+              <a:rPr lang="en-GB" dirty="0" err="1"/>
+              <a:t>GSon</a:t>
+            </a:r>
+            <a:r>
+              <a:rPr lang="en-GB" dirty="0"/>
+              <a:t>. </a:t>
+            </a:r>
+            <a:r>
+              <a:rPr lang="en-GB" dirty="0" err="1"/>
+              <a:t>Benötigt</a:t>
+            </a:r>
+            <a:r>
+              <a:rPr lang="en-GB" dirty="0"/>
+              <a:t> </a:t>
+            </a:r>
+            <a:r>
+              <a:rPr lang="en-GB" dirty="0" err="1"/>
+              <a:t>beim</a:t>
+            </a:r>
+            <a:r>
+              <a:rPr lang="en-GB" dirty="0"/>
+              <a:t> </a:t>
+            </a:r>
+            <a:r>
+              <a:rPr lang="en-GB" dirty="0" err="1"/>
+              <a:t>Empfangen</a:t>
+            </a:r>
+            <a:r>
+              <a:rPr lang="en-GB" dirty="0"/>
+              <a:t> von </a:t>
+            </a:r>
+            <a:r>
+              <a:rPr lang="en-GB" dirty="0" err="1"/>
+              <a:t>Daten</a:t>
+            </a:r>
+            <a:r>
+              <a:rPr lang="en-GB" dirty="0"/>
+              <a:t> der </a:t>
+            </a:r>
+            <a:r>
+              <a:rPr lang="en-GB" dirty="0" err="1"/>
+              <a:t>beiden</a:t>
+            </a:r>
+            <a:r>
+              <a:rPr lang="en-GB" dirty="0"/>
+              <a:t> API’s</a:t>
+            </a:r>
+          </a:p>
+          <a:p>
+            <a:pPr marL="0" indent="0">
+              <a:buFontTx/>
+              <a:buNone/>
+            </a:pPr>
+            <a:endParaRPr lang="en-GB" dirty="0"/>
+          </a:p>
+          <a:p>
+            <a:pPr marL="0" indent="0">
+              <a:buFontTx/>
+              <a:buNone/>
+            </a:pPr>
+            <a:r>
+              <a:rPr lang="en-GB" dirty="0"/>
+              <a:t>Code Coverage</a:t>
+            </a:r>
+          </a:p>
+          <a:p>
+            <a:pPr marL="171450" indent="-171450">
+              <a:buFontTx/>
+              <a:buChar char="-"/>
+            </a:pPr>
+            <a:r>
+              <a:rPr lang="en-GB" dirty="0" err="1"/>
+              <a:t>Aktuell</a:t>
+            </a:r>
+            <a:r>
+              <a:rPr lang="en-GB" dirty="0"/>
+              <a:t> </a:t>
+            </a:r>
+            <a:r>
+              <a:rPr lang="en-GB" dirty="0" err="1"/>
+              <a:t>bei</a:t>
+            </a:r>
+            <a:r>
+              <a:rPr lang="en-GB" dirty="0"/>
+              <a:t> ca 30%</a:t>
+            </a:r>
+          </a:p>
+          <a:p>
+            <a:pPr marL="171450" indent="-171450">
+              <a:buFontTx/>
+              <a:buChar char="-"/>
+            </a:pPr>
+            <a:endParaRPr lang="en-GB" dirty="0"/>
+          </a:p>
+          <a:p>
+            <a:pPr marL="0" indent="0">
+              <a:buFontTx/>
+              <a:buNone/>
+            </a:pPr>
+            <a:r>
+              <a:rPr lang="en-GB" dirty="0" err="1"/>
+              <a:t>SonarQube</a:t>
+            </a:r>
+            <a:endParaRPr lang="en-GB" dirty="0"/>
+          </a:p>
+          <a:p>
+            <a:pPr marL="171450" indent="-171450">
+              <a:buFontTx/>
+              <a:buChar char="-"/>
+            </a:pPr>
+            <a:r>
+              <a:rPr lang="en-GB" dirty="0" err="1"/>
+              <a:t>Einige</a:t>
+            </a:r>
+            <a:r>
+              <a:rPr lang="en-GB" dirty="0"/>
+              <a:t> </a:t>
+            </a:r>
+            <a:r>
+              <a:rPr lang="en-GB" dirty="0" err="1"/>
+              <a:t>Punkte</a:t>
+            </a:r>
+            <a:r>
+              <a:rPr lang="en-GB" dirty="0"/>
+              <a:t> </a:t>
+            </a:r>
+            <a:r>
+              <a:rPr lang="en-GB" dirty="0" err="1"/>
+              <a:t>können</a:t>
+            </a:r>
+            <a:r>
+              <a:rPr lang="en-GB" dirty="0"/>
+              <a:t> </a:t>
+            </a:r>
+            <a:r>
+              <a:rPr lang="en-GB" dirty="0" err="1"/>
+              <a:t>nicht</a:t>
+            </a:r>
+            <a:r>
+              <a:rPr lang="en-GB" dirty="0"/>
+              <a:t> </a:t>
+            </a:r>
+            <a:r>
+              <a:rPr lang="en-GB" dirty="0" err="1"/>
+              <a:t>gefixt</a:t>
+            </a:r>
+            <a:r>
+              <a:rPr lang="en-GB" dirty="0"/>
+              <a:t> warden</a:t>
+            </a:r>
+          </a:p>
+          <a:p>
+            <a:pPr marL="171450" indent="-171450">
+              <a:buFontTx/>
+              <a:buChar char="-"/>
+            </a:pPr>
+            <a:r>
+              <a:rPr lang="en-GB" dirty="0" err="1"/>
+              <a:t>Bsp</a:t>
+            </a:r>
+            <a:r>
+              <a:rPr lang="en-GB" dirty="0"/>
+              <a:t>: </a:t>
+            </a:r>
+            <a:r>
+              <a:rPr lang="en-GB" dirty="0" err="1"/>
+              <a:t>Enum</a:t>
+            </a:r>
+            <a:r>
+              <a:rPr lang="en-GB" dirty="0"/>
+              <a:t> </a:t>
+            </a:r>
+            <a:r>
+              <a:rPr lang="en-GB" dirty="0" err="1"/>
+              <a:t>müssen</a:t>
+            </a:r>
+            <a:r>
+              <a:rPr lang="en-GB" dirty="0"/>
+              <a:t> Gross </a:t>
+            </a:r>
+            <a:r>
+              <a:rPr lang="en-GB" dirty="0" err="1"/>
+              <a:t>geschreiben</a:t>
+            </a:r>
+            <a:r>
+              <a:rPr lang="en-GB" dirty="0"/>
+              <a:t> </a:t>
+            </a:r>
+            <a:r>
+              <a:rPr lang="en-GB" dirty="0" err="1"/>
+              <a:t>werden</a:t>
+            </a:r>
+            <a:r>
+              <a:rPr lang="en-GB" dirty="0"/>
+              <a:t>, </a:t>
+            </a:r>
+            <a:r>
+              <a:rPr lang="en-GB" dirty="0" err="1"/>
+              <a:t>jedoch</a:t>
+            </a:r>
+            <a:r>
+              <a:rPr lang="en-GB" dirty="0"/>
+              <a:t> die API </a:t>
+            </a:r>
+            <a:r>
+              <a:rPr lang="en-GB" dirty="0" err="1"/>
+              <a:t>benutzt</a:t>
+            </a:r>
+            <a:r>
+              <a:rPr lang="en-GB" dirty="0"/>
+              <a:t> </a:t>
+            </a:r>
+            <a:r>
+              <a:rPr lang="en-GB" dirty="0" err="1"/>
+              <a:t>andere</a:t>
+            </a:r>
+            <a:r>
+              <a:rPr lang="en-GB" dirty="0"/>
+              <a:t> </a:t>
+            </a:r>
+            <a:r>
+              <a:rPr lang="en-GB" dirty="0" err="1"/>
+              <a:t>Schreibweise</a:t>
+            </a:r>
+            <a:r>
+              <a:rPr lang="en-GB" dirty="0"/>
+              <a:t> und </a:t>
+            </a:r>
+            <a:r>
+              <a:rPr lang="en-GB" dirty="0" err="1"/>
+              <a:t>wäre</a:t>
+            </a:r>
+            <a:r>
+              <a:rPr lang="en-GB" dirty="0"/>
+              <a:t> </a:t>
+            </a:r>
+            <a:r>
+              <a:rPr lang="en-GB" dirty="0" err="1"/>
+              <a:t>somit</a:t>
+            </a:r>
+            <a:r>
+              <a:rPr lang="en-GB" dirty="0"/>
+              <a:t> </a:t>
+            </a:r>
+            <a:r>
+              <a:rPr lang="en-GB" dirty="0" err="1"/>
+              <a:t>nicht</a:t>
+            </a:r>
+            <a:r>
+              <a:rPr lang="en-GB" dirty="0"/>
+              <a:t> </a:t>
+            </a:r>
+            <a:r>
+              <a:rPr lang="en-GB" dirty="0" err="1"/>
+              <a:t>kompatibel</a:t>
+            </a:r>
+            <a:endParaRPr lang="en-GB" dirty="0"/>
+          </a:p>
+          <a:p>
+            <a:pPr marL="171450" indent="-171450">
+              <a:buFontTx/>
+              <a:buChar char="-"/>
+            </a:pPr>
+            <a:r>
+              <a:rPr lang="en-GB" dirty="0" err="1"/>
+              <a:t>Einige</a:t>
+            </a:r>
+            <a:r>
+              <a:rPr lang="en-GB" dirty="0"/>
+              <a:t> Android Klassen </a:t>
+            </a:r>
+            <a:r>
+              <a:rPr lang="en-GB" dirty="0" err="1"/>
+              <a:t>haben</a:t>
+            </a:r>
+            <a:r>
+              <a:rPr lang="en-GB" dirty="0"/>
+              <a:t> </a:t>
+            </a:r>
+            <a:r>
+              <a:rPr lang="en-GB" dirty="0" err="1"/>
+              <a:t>schon</a:t>
+            </a:r>
+            <a:r>
+              <a:rPr lang="en-GB" dirty="0"/>
+              <a:t> </a:t>
+            </a:r>
+            <a:r>
+              <a:rPr lang="en-GB" dirty="0" err="1"/>
+              <a:t>mehr</a:t>
+            </a:r>
+            <a:r>
+              <a:rPr lang="en-GB" dirty="0"/>
+              <a:t> </a:t>
+            </a:r>
+            <a:r>
+              <a:rPr lang="en-GB" dirty="0" err="1"/>
+              <a:t>als</a:t>
+            </a:r>
+            <a:r>
+              <a:rPr lang="en-GB" dirty="0"/>
+              <a:t> 5 </a:t>
+            </a:r>
+            <a:r>
+              <a:rPr lang="en-GB" dirty="0" err="1"/>
+              <a:t>Vererbungen</a:t>
+            </a:r>
+            <a:r>
+              <a:rPr lang="en-GB" dirty="0"/>
+              <a:t>.</a:t>
+            </a:r>
+          </a:p>
+          <a:p>
+            <a:pPr marL="0" indent="0">
+              <a:buFontTx/>
+              <a:buNone/>
+            </a:pPr>
+            <a:endParaRPr lang="en-GB" dirty="0"/>
+          </a:p>
+          <a:p>
+            <a:pPr marL="0" indent="0">
+              <a:buFontTx/>
+              <a:buNone/>
+            </a:pPr>
+            <a:r>
+              <a:rPr lang="en-GB" dirty="0"/>
+              <a:t>Monkey-Test</a:t>
+            </a:r>
+          </a:p>
+          <a:p>
+            <a:pPr marL="171450" indent="-171450">
+              <a:buFontTx/>
+              <a:buChar char="-"/>
+            </a:pPr>
+            <a:r>
+              <a:rPr lang="en-GB" dirty="0" err="1"/>
+              <a:t>Zum</a:t>
+            </a:r>
+            <a:r>
+              <a:rPr lang="en-GB" dirty="0"/>
+              <a:t> </a:t>
+            </a:r>
+            <a:r>
+              <a:rPr lang="en-GB" dirty="0" err="1"/>
+              <a:t>Testen</a:t>
+            </a:r>
+            <a:r>
+              <a:rPr lang="en-GB" dirty="0"/>
+              <a:t> der </a:t>
+            </a:r>
+            <a:r>
+              <a:rPr lang="en-GB" dirty="0" err="1"/>
+              <a:t>Stabilität</a:t>
+            </a:r>
+            <a:r>
+              <a:rPr lang="en-GB" dirty="0"/>
+              <a:t>. In ADB (Android Debugging Bridge) </a:t>
+            </a:r>
+            <a:r>
+              <a:rPr lang="en-GB" dirty="0" err="1"/>
+              <a:t>integriert</a:t>
+            </a:r>
+            <a:r>
+              <a:rPr lang="en-GB" dirty="0"/>
+              <a:t>.</a:t>
+            </a:r>
+          </a:p>
+          <a:p>
+            <a:pPr marL="171450" indent="-171450">
+              <a:buFontTx/>
+              <a:buChar char="-"/>
+            </a:pPr>
+            <a:r>
+              <a:rPr lang="en-GB" dirty="0" err="1"/>
+              <a:t>Macht</a:t>
+            </a:r>
+            <a:r>
+              <a:rPr lang="en-GB" dirty="0"/>
+              <a:t> pseudo Random </a:t>
+            </a:r>
+            <a:r>
+              <a:rPr lang="en-GB" dirty="0" err="1"/>
+              <a:t>Interaktionen</a:t>
+            </a:r>
+            <a:r>
+              <a:rPr lang="en-GB" dirty="0"/>
+              <a:t> </a:t>
+            </a:r>
+            <a:r>
+              <a:rPr lang="en-GB" dirty="0" err="1"/>
+              <a:t>mit</a:t>
+            </a:r>
+            <a:r>
+              <a:rPr lang="en-GB" dirty="0"/>
+              <a:t> </a:t>
+            </a:r>
+            <a:r>
+              <a:rPr lang="en-GB" dirty="0" err="1"/>
+              <a:t>dem</a:t>
+            </a:r>
+            <a:r>
+              <a:rPr lang="en-GB" dirty="0"/>
+              <a:t> Device. </a:t>
+            </a:r>
+            <a:r>
+              <a:rPr lang="en-GB" dirty="0" err="1"/>
+              <a:t>Guten</a:t>
+            </a:r>
+            <a:r>
+              <a:rPr lang="en-GB" dirty="0"/>
+              <a:t> Test </a:t>
+            </a:r>
+            <a:r>
+              <a:rPr lang="en-GB" dirty="0" err="1"/>
+              <a:t>für</a:t>
+            </a:r>
+            <a:r>
+              <a:rPr lang="en-GB" dirty="0"/>
+              <a:t> </a:t>
+            </a:r>
+            <a:r>
+              <a:rPr lang="en-GB" dirty="0" err="1"/>
+              <a:t>Stabilität</a:t>
+            </a:r>
+            <a:r>
+              <a:rPr lang="en-GB" dirty="0"/>
+              <a:t> der App</a:t>
+            </a:r>
+          </a:p>
+        </p:txBody>
+      </p:sp>
+      <p:sp>
+        <p:nvSpPr>
+          <p:cNvPr id="4" name="Foliennummernplatzhalter 3"/>
+          <p:cNvSpPr>
+            <a:spLocks noGrp="1"/>
+          </p:cNvSpPr>
+          <p:nvPr>
+            <p:ph type="sldNum" sz="quarter" idx="10"/>
+          </p:nvPr>
+        </p:nvSpPr>
+        <p:spPr/>
+        <p:txBody>
+          <a:bodyPr/>
+          <a:lstStyle/>
+          <a:p>
+            <a:fld id="{748723F8-CD6B-45E3-B09A-75062809A4AE}" type="slidenum">
+              <a:rPr lang="en-GB" smtClean="0"/>
+              <a:t>13</a:t>
+            </a:fld>
+            <a:endParaRPr lang="en-GB"/>
+          </a:p>
+        </p:txBody>
+      </p:sp>
+    </p:spTree>
+    <p:extLst>
+      <p:ext uri="{BB962C8B-B14F-4D97-AF65-F5344CB8AC3E}">
+        <p14:creationId xmlns:p14="http://schemas.microsoft.com/office/powerpoint/2010/main" val="4250532794"/>
+      </p:ext>
+    </p:extLst>
+  </p:cSld>
+  <p:clrMapOvr>
+    <a:masterClrMapping/>
+  </p:clrMapOvr>
+</p:notes>
+</file>
+
+<file path=ppt/notesSlides/notesSlide11.xml><?xml version="1.0" encoding="utf-8"?>
+<p:notes xmlns:a="http://schemas.openxmlformats.org/drawingml/2006/main" xmlns:r="http://schemas.openxmlformats.org/officeDocument/2006/relationships" xmlns:p="http://schemas.openxmlformats.org/presentationml/2006/main">
+  <p:cSld>
+    <p:spTree>
+      <p:nvGrpSpPr>
+        <p:cNvPr id="1" name=""/>
+        <p:cNvGrpSpPr/>
+        <p:nvPr/>
+      </p:nvGrpSpPr>
+      <p:grpSpPr>
+        <a:xfrm>
+          <a:off x="0" y="0"/>
+          <a:ext cx="0" cy="0"/>
+          <a:chOff x="0" y="0"/>
+          <a:chExt cx="0" cy="0"/>
+        </a:xfrm>
+      </p:grpSpPr>
+      <p:sp>
+        <p:nvSpPr>
+          <p:cNvPr id="2" name="Folienbildplatzhalter 1"/>
+          <p:cNvSpPr>
+            <a:spLocks noGrp="1" noRot="1" noChangeAspect="1"/>
+          </p:cNvSpPr>
+          <p:nvPr>
+            <p:ph type="sldImg"/>
+          </p:nvPr>
+        </p:nvSpPr>
+        <p:spPr/>
+      </p:sp>
+      <p:sp>
+        <p:nvSpPr>
+          <p:cNvPr id="3" name="Notizenplatzhalter 2"/>
+          <p:cNvSpPr>
+            <a:spLocks noGrp="1"/>
+          </p:cNvSpPr>
+          <p:nvPr>
+            <p:ph type="body" idx="1"/>
+          </p:nvPr>
+        </p:nvSpPr>
+        <p:spPr/>
+        <p:txBody>
+          <a:bodyPr/>
+          <a:lstStyle/>
+          <a:p>
+            <a:r>
+              <a:rPr lang="en-GB" dirty="0"/>
               <a:t>Demo. Script </a:t>
             </a:r>
             <a:r>
@@ -705,7 +1387,7 @@
 </p:notes>
 </file>
 
-<file path=ppt/notesSlides/notesSlide11.xml><?xml version="1.0" encoding="utf-8"?>
+<file path=ppt/notesSlides/notesSlide12.xml><?xml version="1.0" encoding="utf-8"?>
 <p:notes xmlns:a="http://schemas.openxmlformats.org/drawingml/2006/main" xmlns:r="http://schemas.openxmlformats.org/officeDocument/2006/relationships" xmlns:p="http://schemas.openxmlformats.org/presentationml/2006/main">
   <p:cSld>
     <p:spTree>
@@ -1210,404 +1892,41 @@
           <a:lstStyle/>
           <a:p>
             <a:r>
-              <a:rPr lang="en-GB" dirty="0"/>
-              <a:t>Grosse Ski </a:t>
-            </a:r>
-            <a:r>
-              <a:rPr lang="en-GB" dirty="0" err="1"/>
-              <a:t>Gebiete</a:t>
-            </a:r>
-            <a:r>
-              <a:rPr lang="en-GB" dirty="0"/>
-              <a:t> </a:t>
-            </a:r>
-            <a:r>
-              <a:rPr lang="en-GB" dirty="0" err="1"/>
-              <a:t>haben</a:t>
-            </a:r>
-            <a:r>
-              <a:rPr lang="en-GB" dirty="0"/>
-              <a:t> </a:t>
-            </a:r>
-            <a:r>
-              <a:rPr lang="en-GB" dirty="0" err="1"/>
-              <a:t>eigene</a:t>
-            </a:r>
-            <a:r>
-              <a:rPr lang="en-GB" dirty="0"/>
-              <a:t> Apps.</a:t>
-            </a:r>
-          </a:p>
-          <a:p>
-            <a:pPr marL="171450" indent="-171450">
-              <a:buFontTx/>
-              <a:buChar char="-"/>
-            </a:pPr>
-            <a:r>
-              <a:rPr lang="en-GB" dirty="0" err="1"/>
-              <a:t>Laax</a:t>
-            </a:r>
-            <a:r>
-              <a:rPr lang="en-GB" dirty="0"/>
-              <a:t>, Davos, </a:t>
-            </a:r>
-            <a:r>
-              <a:rPr lang="en-GB" dirty="0" err="1"/>
-              <a:t>Adelboden</a:t>
-            </a:r>
-            <a:endParaRPr lang="en-GB" dirty="0"/>
-          </a:p>
-          <a:p>
-            <a:pPr marL="171450" indent="-171450">
-              <a:buFontTx/>
-              <a:buChar char="-"/>
-            </a:pPr>
-            <a:r>
-              <a:rPr lang="en-GB" dirty="0" err="1"/>
-              <a:t>Lokal</a:t>
-            </a:r>
-            <a:r>
-              <a:rPr lang="en-GB" dirty="0"/>
-              <a:t>, </a:t>
-            </a:r>
-            <a:r>
-              <a:rPr lang="en-GB" dirty="0" err="1"/>
-              <a:t>Abgestimmt</a:t>
-            </a:r>
-            <a:r>
-              <a:rPr lang="en-GB" dirty="0"/>
-              <a:t> auf </a:t>
-            </a:r>
-            <a:r>
-              <a:rPr lang="en-GB" dirty="0" err="1"/>
-              <a:t>jeweilige</a:t>
-            </a:r>
-            <a:r>
-              <a:rPr lang="en-GB" dirty="0"/>
-              <a:t> Destination.</a:t>
-            </a:r>
-          </a:p>
-          <a:p>
-            <a:pPr marL="171450" indent="-171450">
-              <a:buFontTx/>
-              <a:buChar char="-"/>
-            </a:pPr>
-            <a:endParaRPr lang="en-GB" dirty="0"/>
-          </a:p>
-          <a:p>
-            <a:pPr marL="0" indent="0">
-              <a:buFontTx/>
-              <a:buNone/>
-            </a:pPr>
-            <a:r>
-              <a:rPr lang="en-GB" dirty="0" err="1"/>
-              <a:t>iSKI</a:t>
-            </a:r>
-            <a:endParaRPr lang="en-GB" dirty="0"/>
-          </a:p>
-          <a:p>
-            <a:pPr marL="171450" indent="-171450">
-              <a:buFontTx/>
-              <a:buChar char="-"/>
-            </a:pPr>
-            <a:r>
-              <a:rPr lang="en-GB" dirty="0" err="1"/>
-              <a:t>Je</a:t>
-            </a:r>
-            <a:r>
-              <a:rPr lang="en-GB" dirty="0"/>
-              <a:t> Land </a:t>
-            </a:r>
-            <a:r>
-              <a:rPr lang="en-GB" dirty="0" err="1"/>
-              <a:t>ein</a:t>
-            </a:r>
-            <a:r>
-              <a:rPr lang="en-GB" dirty="0"/>
-              <a:t> App.</a:t>
-            </a:r>
-          </a:p>
-          <a:p>
-            <a:pPr marL="171450" indent="-171450">
-              <a:buFontTx/>
-              <a:buChar char="-"/>
-            </a:pPr>
-            <a:r>
-              <a:rPr lang="en-GB" dirty="0"/>
-              <a:t>Community, Ski-Tracker, </a:t>
-            </a:r>
-            <a:r>
-              <a:rPr lang="en-GB" dirty="0" err="1"/>
-              <a:t>vergleichen</a:t>
-            </a:r>
-            <a:r>
-              <a:rPr lang="en-GB" dirty="0"/>
-              <a:t>, </a:t>
-            </a:r>
-          </a:p>
-          <a:p>
-            <a:pPr marL="171450" indent="-171450">
-              <a:buFontTx/>
-              <a:buChar char="-"/>
-            </a:pPr>
-            <a:r>
-              <a:rPr lang="en-GB" dirty="0" err="1"/>
-              <a:t>Aktuelle</a:t>
-            </a:r>
-            <a:r>
-              <a:rPr lang="en-GB" dirty="0"/>
-              <a:t> Status, </a:t>
-            </a:r>
-            <a:r>
-              <a:rPr lang="en-GB" dirty="0" err="1"/>
-              <a:t>Informationen</a:t>
-            </a:r>
-            <a:r>
-              <a:rPr lang="en-GB" dirty="0"/>
-              <a:t> und Wetter</a:t>
-            </a:r>
-          </a:p>
-          <a:p>
-            <a:pPr marL="171450" indent="-171450">
-              <a:buFontTx/>
-              <a:buChar char="-"/>
-            </a:pPr>
-            <a:r>
-              <a:rPr lang="en-GB" dirty="0" err="1"/>
-              <a:t>Schlägt</a:t>
-            </a:r>
-            <a:r>
-              <a:rPr lang="en-GB" dirty="0"/>
-              <a:t> </a:t>
-            </a:r>
-            <a:r>
-              <a:rPr lang="en-GB" dirty="0" err="1"/>
-              <a:t>Skigebiete</a:t>
-            </a:r>
-            <a:r>
-              <a:rPr lang="en-GB" dirty="0"/>
-              <a:t> </a:t>
-            </a:r>
-            <a:r>
-              <a:rPr lang="en-GB" dirty="0" err="1"/>
-              <a:t>vor</a:t>
-            </a:r>
-            <a:r>
-              <a:rPr lang="en-GB" dirty="0"/>
-              <a:t> </a:t>
-            </a:r>
-            <a:r>
-              <a:rPr lang="en-GB" dirty="0" err="1"/>
-              <a:t>jedoch</a:t>
-            </a:r>
-            <a:r>
-              <a:rPr lang="en-GB" dirty="0"/>
-              <a:t> </a:t>
-            </a:r>
-            <a:r>
-              <a:rPr lang="en-GB" dirty="0" err="1"/>
-              <a:t>Standort</a:t>
-            </a:r>
-            <a:r>
-              <a:rPr lang="en-GB" dirty="0"/>
-              <a:t> </a:t>
-            </a:r>
-            <a:r>
-              <a:rPr lang="en-GB" dirty="0" err="1"/>
-              <a:t>unabhängig</a:t>
-            </a:r>
-            <a:endParaRPr lang="en-GB" dirty="0"/>
-          </a:p>
-          <a:p>
-            <a:pPr marL="171450" indent="-171450">
-              <a:buFontTx/>
-              <a:buChar char="-"/>
-            </a:pPr>
-            <a:endParaRPr lang="en-GB" dirty="0"/>
-          </a:p>
-          <a:p>
-            <a:pPr marL="0" indent="0">
-              <a:buFontTx/>
-              <a:buNone/>
-            </a:pPr>
-            <a:r>
-              <a:rPr lang="en-GB" dirty="0" err="1"/>
-              <a:t>Bergfex</a:t>
-            </a:r>
-            <a:endParaRPr lang="en-GB" dirty="0"/>
-          </a:p>
-          <a:p>
-            <a:pPr marL="171450" indent="-171450">
-              <a:buFontTx/>
-              <a:buChar char="-"/>
-            </a:pPr>
-            <a:r>
-              <a:rPr lang="en-GB" dirty="0" err="1"/>
-              <a:t>Wetterberichte</a:t>
-            </a:r>
-            <a:r>
-              <a:rPr lang="en-GB" dirty="0"/>
-              <a:t>, Status, Webcams,  </a:t>
-            </a:r>
-            <a:r>
-              <a:rPr lang="en-GB" dirty="0" err="1"/>
-              <a:t>Pistenpläne</a:t>
-            </a:r>
-            <a:endParaRPr lang="en-GB" dirty="0"/>
-          </a:p>
-          <a:p>
-            <a:pPr marL="171450" indent="-171450">
-              <a:buFontTx/>
-              <a:buChar char="-"/>
-            </a:pPr>
-            <a:r>
-              <a:rPr lang="en-GB" dirty="0" err="1"/>
-              <a:t>Alle</a:t>
-            </a:r>
-            <a:r>
-              <a:rPr lang="en-GB" dirty="0"/>
-              <a:t> </a:t>
-            </a:r>
-            <a:r>
-              <a:rPr lang="en-GB" dirty="0" err="1"/>
-              <a:t>Gebiete</a:t>
-            </a:r>
-            <a:r>
-              <a:rPr lang="en-GB" dirty="0"/>
-              <a:t> </a:t>
-            </a:r>
-            <a:r>
-              <a:rPr lang="en-GB" dirty="0" err="1"/>
-              <a:t>durchsuchen</a:t>
-            </a:r>
-            <a:endParaRPr lang="en-GB" dirty="0"/>
-          </a:p>
-          <a:p>
-            <a:pPr marL="171450" indent="-171450">
-              <a:buFontTx/>
-              <a:buChar char="-"/>
-            </a:pPr>
-            <a:r>
-              <a:rPr lang="en-GB" dirty="0" err="1"/>
-              <a:t>Eigene</a:t>
-            </a:r>
-            <a:r>
-              <a:rPr lang="en-GB" dirty="0"/>
-              <a:t> </a:t>
-            </a:r>
-            <a:r>
-              <a:rPr lang="en-GB" dirty="0" err="1"/>
-              <a:t>Favoriten</a:t>
-            </a:r>
-            <a:endParaRPr lang="en-GB" dirty="0"/>
-          </a:p>
-          <a:p>
-            <a:pPr marL="171450" indent="-171450">
-              <a:buFontTx/>
-              <a:buChar char="-"/>
-            </a:pPr>
-            <a:endParaRPr lang="en-GB" dirty="0"/>
-          </a:p>
-          <a:p>
-            <a:pPr marL="0" indent="0">
-              <a:buFontTx/>
-              <a:buNone/>
-            </a:pPr>
-            <a:r>
-              <a:rPr lang="en-GB" dirty="0" err="1"/>
-              <a:t>Skiinfo</a:t>
-            </a:r>
-            <a:endParaRPr lang="en-GB" dirty="0"/>
-          </a:p>
-          <a:p>
-            <a:pPr marL="171450" indent="-171450">
-              <a:buFontTx/>
-              <a:buChar char="-"/>
-            </a:pPr>
-            <a:r>
-              <a:rPr lang="en-GB" dirty="0" err="1"/>
-              <a:t>Ähnlich</a:t>
-            </a:r>
-            <a:r>
-              <a:rPr lang="en-GB" dirty="0"/>
-              <a:t> </a:t>
-            </a:r>
-            <a:r>
-              <a:rPr lang="en-GB" dirty="0" err="1"/>
-              <a:t>wie</a:t>
-            </a:r>
-            <a:r>
-              <a:rPr lang="en-GB" dirty="0"/>
-              <a:t> </a:t>
-            </a:r>
-            <a:r>
-              <a:rPr lang="en-GB" dirty="0" err="1"/>
-              <a:t>Bergfex</a:t>
-            </a:r>
-            <a:endParaRPr lang="en-GB" dirty="0"/>
-          </a:p>
-          <a:p>
-            <a:pPr marL="0" indent="0">
-              <a:buFontTx/>
-              <a:buNone/>
-            </a:pPr>
-            <a:endParaRPr lang="en-GB" dirty="0"/>
-          </a:p>
-          <a:p>
-            <a:pPr marL="0" indent="0">
-              <a:buFontTx/>
-              <a:buNone/>
-            </a:pPr>
-            <a:r>
-              <a:rPr lang="en-GB" dirty="0"/>
-              <a:t>Skiresort.de</a:t>
-            </a:r>
-          </a:p>
-          <a:p>
-            <a:pPr marL="171450" indent="-171450">
-              <a:buFontTx/>
-              <a:buChar char="-"/>
-            </a:pPr>
-            <a:r>
-              <a:rPr lang="en-GB" dirty="0" err="1"/>
-              <a:t>Ähnlich</a:t>
-            </a:r>
-            <a:r>
-              <a:rPr lang="en-GB" dirty="0"/>
-              <a:t> </a:t>
-            </a:r>
-            <a:r>
-              <a:rPr lang="en-GB" dirty="0" err="1"/>
-              <a:t>wie</a:t>
-            </a:r>
-            <a:r>
-              <a:rPr lang="en-GB" dirty="0"/>
-              <a:t> </a:t>
-            </a:r>
-            <a:r>
-              <a:rPr lang="en-GB" dirty="0" err="1"/>
-              <a:t>Bergfext</a:t>
-            </a:r>
-            <a:endParaRPr lang="en-GB" dirty="0"/>
-          </a:p>
-          <a:p>
-            <a:pPr marL="171450" indent="-171450">
-              <a:buFontTx/>
-              <a:buChar char="-"/>
-            </a:pPr>
-            <a:r>
-              <a:rPr lang="en-GB" dirty="0" err="1"/>
-              <a:t>Suchen</a:t>
-            </a:r>
-            <a:r>
-              <a:rPr lang="en-GB" dirty="0"/>
-              <a:t> in </a:t>
-            </a:r>
-            <a:r>
-              <a:rPr lang="en-GB" dirty="0" err="1"/>
-              <a:t>Umgebung</a:t>
-            </a:r>
-            <a:endParaRPr lang="en-GB" dirty="0"/>
+              <a:rPr lang="de-CH" dirty="0"/>
+              <a:t>Motivation: 	Value </a:t>
+            </a:r>
+            <a:r>
+              <a:rPr lang="de-CH" dirty="0" err="1"/>
+              <a:t>for</a:t>
+            </a:r>
+            <a:r>
+              <a:rPr lang="de-CH" dirty="0"/>
+              <a:t> Users: Benutzern (also auch uns) die Möglichkeit geben, andere Skigebiete kennenzulernen. Die Auswahl des Zieles zu vereinfachen.</a:t>
+            </a:r>
+          </a:p>
+          <a:p>
+            <a:r>
+              <a:rPr lang="de-CH" dirty="0"/>
+              <a:t>	Value </a:t>
+            </a:r>
+            <a:r>
+              <a:rPr lang="de-CH" dirty="0" err="1"/>
+              <a:t>for</a:t>
+            </a:r>
+            <a:r>
+              <a:rPr lang="de-CH" dirty="0"/>
+              <a:t> Stakeholder: Geldverdienen mit Werbung von Skiartikeln, Skigebiete können kostenpflichtig Bilder o.ä. aufschalten.</a:t>
+            </a:r>
+          </a:p>
+          <a:p>
+            <a:r>
+              <a:rPr lang="de-CH" dirty="0" err="1"/>
+              <a:t>Functions</a:t>
+            </a:r>
+            <a:r>
+              <a:rPr lang="de-CH" dirty="0"/>
+              <a:t>: Anzeigen der 10 nächstgelegenen Skigebieten, sortiert nach eigenen Wünschen, Anzeigen von Detailinfos zum Ort, Möglichkeit die Website zu besuchen und die Navigation zu starten</a:t>
+            </a:r>
           </a:p>
         </p:txBody>
       </p:sp>
@@ -1628,7 +1947,7 @@
           <a:p>
             <a:fld id="{748723F8-CD6B-45E3-B09A-75062809A4AE}" type="slidenum">
               <a:rPr lang="en-GB" smtClean="0"/>
-              <a:t>5</a:t>
+              <a:t>3</a:t>
             </a:fld>
             <a:endParaRPr lang="en-GB"/>
           </a:p>
@@ -1637,7 +1956,7 @@
     </p:spTree>
     <p:extLst>
       <p:ext uri="{BB962C8B-B14F-4D97-AF65-F5344CB8AC3E}">
-        <p14:creationId xmlns:p14="http://schemas.microsoft.com/office/powerpoint/2010/main" val="242691541"/>
+        <p14:creationId xmlns:p14="http://schemas.microsoft.com/office/powerpoint/2010/main" val="413757644"/>
       </p:ext>
     </p:extLst>
   </p:cSld>
@@ -1691,63 +2010,401 @@
           <a:bodyPr/>
           <a:lstStyle/>
           <a:p>
-            <a:endParaRPr lang="de-CH" noProof="0" dirty="0"/>
-          </a:p>
-          <a:p>
-            <a:r>
-              <a:rPr lang="de-CH" noProof="0" dirty="0"/>
-              <a:t>Erklären das wir uns Szenarien überlegt haben.</a:t>
-            </a:r>
-          </a:p>
-          <a:p>
-            <a:r>
-              <a:rPr lang="de-CH" noProof="0" dirty="0"/>
-              <a:t>First </a:t>
-            </a:r>
-            <a:r>
-              <a:rPr lang="de-CH" noProof="0" dirty="0" err="1"/>
-              <a:t>use</a:t>
-            </a:r>
-            <a:r>
-              <a:rPr lang="de-CH" noProof="0" dirty="0"/>
-              <a:t>: Design ist einfach und intuitiv, daher auch Spinner in </a:t>
-            </a:r>
-            <a:r>
-              <a:rPr lang="de-CH" noProof="0" dirty="0" err="1"/>
-              <a:t>ActionBar</a:t>
-            </a:r>
-            <a:r>
-              <a:rPr lang="de-CH" noProof="0" dirty="0"/>
-              <a:t> und nicht unten (Bottom Navigation Bar)</a:t>
-            </a:r>
-          </a:p>
-          <a:p>
-            <a:r>
-              <a:rPr lang="de-CH" noProof="0" dirty="0"/>
-              <a:t>Regular </a:t>
-            </a:r>
-            <a:r>
-              <a:rPr lang="de-CH" noProof="0" dirty="0" err="1"/>
-              <a:t>user</a:t>
-            </a:r>
-            <a:r>
-              <a:rPr lang="de-CH" noProof="0" dirty="0"/>
-              <a:t>:</a:t>
-            </a:r>
-          </a:p>
-          <a:p>
-            <a:r>
-              <a:rPr lang="de-CH" noProof="0" dirty="0"/>
-              <a:t>Emergency </a:t>
-            </a:r>
-            <a:r>
-              <a:rPr lang="de-CH" noProof="0" dirty="0" err="1"/>
-              <a:t>use</a:t>
-            </a:r>
-            <a:r>
-              <a:rPr lang="de-CH" noProof="0" dirty="0"/>
-              <a:t>: Buttons auf Startseite für schnelles Suchen und Sortieren</a:t>
-            </a:r>
+            <a:r>
+              <a:rPr lang="en-GB" dirty="0"/>
+              <a:t>Grosse Ski </a:t>
+            </a:r>
+            <a:r>
+              <a:rPr lang="en-GB" dirty="0" err="1"/>
+              <a:t>Gebiete</a:t>
+            </a:r>
+            <a:r>
+              <a:rPr lang="en-GB" dirty="0"/>
+              <a:t> </a:t>
+            </a:r>
+            <a:r>
+              <a:rPr lang="en-GB" dirty="0" err="1"/>
+              <a:t>haben</a:t>
+            </a:r>
+            <a:r>
+              <a:rPr lang="en-GB" dirty="0"/>
+              <a:t> </a:t>
+            </a:r>
+            <a:r>
+              <a:rPr lang="en-GB" dirty="0" err="1"/>
+              <a:t>eigene</a:t>
+            </a:r>
+            <a:r>
+              <a:rPr lang="en-GB" dirty="0"/>
+              <a:t> Apps.</a:t>
+            </a:r>
+          </a:p>
+          <a:p>
+            <a:pPr marL="171450" indent="-171450">
+              <a:buFontTx/>
+              <a:buChar char="-"/>
+            </a:pPr>
+            <a:r>
+              <a:rPr lang="en-GB" dirty="0" err="1"/>
+              <a:t>Laax</a:t>
+            </a:r>
+            <a:r>
+              <a:rPr lang="en-GB" dirty="0"/>
+              <a:t>, Davos, </a:t>
+            </a:r>
+            <a:r>
+              <a:rPr lang="en-GB" dirty="0" err="1"/>
+              <a:t>Adelboden</a:t>
+            </a:r>
+            <a:endParaRPr lang="en-GB" dirty="0"/>
+          </a:p>
+          <a:p>
+            <a:pPr marL="171450" indent="-171450">
+              <a:buFontTx/>
+              <a:buChar char="-"/>
+            </a:pPr>
+            <a:r>
+              <a:rPr lang="en-GB" dirty="0" err="1"/>
+              <a:t>Lokal</a:t>
+            </a:r>
+            <a:r>
+              <a:rPr lang="en-GB" dirty="0"/>
+              <a:t>, </a:t>
+            </a:r>
+            <a:r>
+              <a:rPr lang="en-GB" dirty="0" err="1"/>
+              <a:t>Abgestimmt</a:t>
+            </a:r>
+            <a:r>
+              <a:rPr lang="en-GB" dirty="0"/>
+              <a:t> auf </a:t>
+            </a:r>
+            <a:r>
+              <a:rPr lang="en-GB" dirty="0" err="1"/>
+              <a:t>jeweilige</a:t>
+            </a:r>
+            <a:r>
+              <a:rPr lang="en-GB" dirty="0"/>
+              <a:t> Destination.</a:t>
+            </a:r>
+          </a:p>
+          <a:p>
+            <a:pPr marL="171450" indent="-171450">
+              <a:buFontTx/>
+              <a:buChar char="-"/>
+            </a:pPr>
+            <a:endParaRPr lang="en-GB" dirty="0"/>
+          </a:p>
+          <a:p>
+            <a:pPr marL="0" indent="0">
+              <a:buFontTx/>
+              <a:buNone/>
+            </a:pPr>
+            <a:r>
+              <a:rPr lang="en-GB" dirty="0" err="1"/>
+              <a:t>iSKI</a:t>
+            </a:r>
+            <a:endParaRPr lang="en-GB" dirty="0"/>
+          </a:p>
+          <a:p>
+            <a:pPr marL="171450" indent="-171450">
+              <a:buFontTx/>
+              <a:buChar char="-"/>
+            </a:pPr>
+            <a:r>
+              <a:rPr lang="en-GB" dirty="0" err="1"/>
+              <a:t>Je</a:t>
+            </a:r>
+            <a:r>
+              <a:rPr lang="en-GB" dirty="0"/>
+              <a:t> Land </a:t>
+            </a:r>
+            <a:r>
+              <a:rPr lang="en-GB" dirty="0" err="1"/>
+              <a:t>ein</a:t>
+            </a:r>
+            <a:r>
+              <a:rPr lang="en-GB" dirty="0"/>
+              <a:t> App.</a:t>
+            </a:r>
+          </a:p>
+          <a:p>
+            <a:pPr marL="171450" indent="-171450">
+              <a:buFontTx/>
+              <a:buChar char="-"/>
+            </a:pPr>
+            <a:r>
+              <a:rPr lang="en-GB" dirty="0"/>
+              <a:t>Community, Ski-Tracker, </a:t>
+            </a:r>
+            <a:r>
+              <a:rPr lang="en-GB" dirty="0" err="1"/>
+              <a:t>vergleichen</a:t>
+            </a:r>
+            <a:r>
+              <a:rPr lang="en-GB" dirty="0"/>
+              <a:t>, </a:t>
+            </a:r>
+          </a:p>
+          <a:p>
+            <a:pPr marL="171450" indent="-171450">
+              <a:buFontTx/>
+              <a:buChar char="-"/>
+            </a:pPr>
+            <a:r>
+              <a:rPr lang="en-GB" dirty="0" err="1"/>
+              <a:t>Aktuelle</a:t>
+            </a:r>
+            <a:r>
+              <a:rPr lang="en-GB" dirty="0"/>
+              <a:t> Status, </a:t>
+            </a:r>
+            <a:r>
+              <a:rPr lang="en-GB" dirty="0" err="1"/>
+              <a:t>Informationen</a:t>
+            </a:r>
+            <a:r>
+              <a:rPr lang="en-GB" dirty="0"/>
+              <a:t> und Wetter</a:t>
+            </a:r>
+          </a:p>
+          <a:p>
+            <a:pPr marL="171450" indent="-171450">
+              <a:buFontTx/>
+              <a:buChar char="-"/>
+            </a:pPr>
+            <a:r>
+              <a:rPr lang="en-GB" dirty="0" err="1"/>
+              <a:t>Schlägt</a:t>
+            </a:r>
+            <a:r>
+              <a:rPr lang="en-GB" dirty="0"/>
+              <a:t> </a:t>
+            </a:r>
+            <a:r>
+              <a:rPr lang="en-GB" dirty="0" err="1"/>
+              <a:t>Skigebiete</a:t>
+            </a:r>
+            <a:r>
+              <a:rPr lang="en-GB" dirty="0"/>
+              <a:t> </a:t>
+            </a:r>
+            <a:r>
+              <a:rPr lang="en-GB" dirty="0" err="1"/>
+              <a:t>vor</a:t>
+            </a:r>
+            <a:r>
+              <a:rPr lang="en-GB" dirty="0"/>
+              <a:t> </a:t>
+            </a:r>
+            <a:r>
+              <a:rPr lang="en-GB" dirty="0" err="1"/>
+              <a:t>nach</a:t>
+            </a:r>
+            <a:r>
+              <a:rPr lang="en-GB" dirty="0"/>
+              <a:t> </a:t>
+            </a:r>
+            <a:r>
+              <a:rPr lang="en-GB" dirty="0" err="1"/>
+              <a:t>Distanz</a:t>
+            </a:r>
+            <a:r>
+              <a:rPr lang="en-GB" dirty="0"/>
+              <a:t>, Wetter, </a:t>
+            </a:r>
+            <a:r>
+              <a:rPr lang="en-GB" dirty="0" err="1"/>
+              <a:t>Neuschnee</a:t>
+            </a:r>
+            <a:r>
+              <a:rPr lang="en-GB" dirty="0"/>
+              <a:t>, etc</a:t>
+            </a:r>
+          </a:p>
+          <a:p>
+            <a:pPr marL="0" indent="0">
+              <a:buFontTx/>
+              <a:buNone/>
+            </a:pPr>
+            <a:r>
+              <a:rPr lang="en-GB" dirty="0" err="1"/>
+              <a:t>Bergfex</a:t>
+            </a:r>
+            <a:endParaRPr lang="en-GB" dirty="0"/>
+          </a:p>
+          <a:p>
+            <a:pPr marL="171450" indent="-171450">
+              <a:buFontTx/>
+              <a:buChar char="-"/>
+            </a:pPr>
+            <a:r>
+              <a:rPr lang="en-GB" dirty="0" err="1"/>
+              <a:t>Wetterberichte</a:t>
+            </a:r>
+            <a:r>
+              <a:rPr lang="en-GB" dirty="0"/>
+              <a:t>, Status, Webcams,  </a:t>
+            </a:r>
+            <a:r>
+              <a:rPr lang="en-GB" dirty="0" err="1"/>
+              <a:t>Pistenpläne</a:t>
+            </a:r>
+            <a:endParaRPr lang="en-GB" dirty="0"/>
+          </a:p>
+          <a:p>
+            <a:pPr marL="171450" indent="-171450">
+              <a:buFontTx/>
+              <a:buChar char="-"/>
+            </a:pPr>
+            <a:r>
+              <a:rPr lang="en-GB" dirty="0" err="1"/>
+              <a:t>Alle</a:t>
+            </a:r>
+            <a:r>
+              <a:rPr lang="en-GB" dirty="0"/>
+              <a:t> </a:t>
+            </a:r>
+            <a:r>
+              <a:rPr lang="en-GB" dirty="0" err="1"/>
+              <a:t>Gebiete</a:t>
+            </a:r>
+            <a:r>
+              <a:rPr lang="en-GB" dirty="0"/>
+              <a:t> </a:t>
+            </a:r>
+            <a:r>
+              <a:rPr lang="en-GB" dirty="0" err="1"/>
+              <a:t>durchsuchen</a:t>
+            </a:r>
+            <a:endParaRPr lang="en-GB" dirty="0"/>
+          </a:p>
+          <a:p>
+            <a:pPr marL="171450" indent="-171450">
+              <a:buFontTx/>
+              <a:buChar char="-"/>
+            </a:pPr>
+            <a:r>
+              <a:rPr lang="en-GB" dirty="0" err="1"/>
+              <a:t>Eigene</a:t>
+            </a:r>
+            <a:r>
+              <a:rPr lang="en-GB" dirty="0"/>
+              <a:t> </a:t>
+            </a:r>
+            <a:r>
+              <a:rPr lang="en-GB" dirty="0" err="1"/>
+              <a:t>Favoriten</a:t>
+            </a:r>
+            <a:endParaRPr lang="en-GB" dirty="0"/>
+          </a:p>
+          <a:p>
+            <a:pPr marL="171450" indent="-171450">
+              <a:buFontTx/>
+              <a:buChar char="-"/>
+            </a:pPr>
+            <a:endParaRPr lang="en-GB" dirty="0"/>
+          </a:p>
+          <a:p>
+            <a:pPr marL="0" indent="0">
+              <a:buFontTx/>
+              <a:buNone/>
+            </a:pPr>
+            <a:r>
+              <a:rPr lang="en-GB" dirty="0" err="1"/>
+              <a:t>Skiinfo</a:t>
+            </a:r>
+            <a:endParaRPr lang="en-GB" dirty="0"/>
+          </a:p>
+          <a:p>
+            <a:pPr marL="171450" indent="-171450">
+              <a:buFontTx/>
+              <a:buChar char="-"/>
+            </a:pPr>
+            <a:r>
+              <a:rPr lang="en-GB" dirty="0" err="1"/>
+              <a:t>Ähnlich</a:t>
+            </a:r>
+            <a:r>
+              <a:rPr lang="en-GB" dirty="0"/>
+              <a:t> </a:t>
+            </a:r>
+            <a:r>
+              <a:rPr lang="en-GB" dirty="0" err="1"/>
+              <a:t>wie</a:t>
+            </a:r>
+            <a:r>
+              <a:rPr lang="en-GB" dirty="0"/>
+              <a:t> </a:t>
+            </a:r>
+            <a:r>
+              <a:rPr lang="en-GB" dirty="0" err="1"/>
+              <a:t>Bergfex</a:t>
+            </a:r>
+            <a:endParaRPr lang="en-GB" dirty="0"/>
+          </a:p>
+          <a:p>
+            <a:pPr marL="0" indent="0">
+              <a:buFontTx/>
+              <a:buNone/>
+            </a:pPr>
+            <a:endParaRPr lang="en-GB" dirty="0"/>
+          </a:p>
+          <a:p>
+            <a:pPr marL="0" indent="0">
+              <a:buFontTx/>
+              <a:buNone/>
+            </a:pPr>
+            <a:r>
+              <a:rPr lang="en-GB" dirty="0"/>
+              <a:t>Skiresort.de</a:t>
+            </a:r>
+          </a:p>
+          <a:p>
+            <a:pPr marL="171450" indent="-171450">
+              <a:buFontTx/>
+              <a:buChar char="-"/>
+            </a:pPr>
+            <a:r>
+              <a:rPr lang="en-GB" dirty="0" err="1"/>
+              <a:t>Ähnlich</a:t>
+            </a:r>
+            <a:r>
+              <a:rPr lang="en-GB" dirty="0"/>
+              <a:t> </a:t>
+            </a:r>
+            <a:r>
+              <a:rPr lang="en-GB" dirty="0" err="1"/>
+              <a:t>wie</a:t>
+            </a:r>
+            <a:r>
+              <a:rPr lang="en-GB" dirty="0"/>
+              <a:t> </a:t>
+            </a:r>
+            <a:r>
+              <a:rPr lang="en-GB" dirty="0" err="1"/>
+              <a:t>Bergfext</a:t>
+            </a:r>
+            <a:endParaRPr lang="en-GB" dirty="0"/>
+          </a:p>
+          <a:p>
+            <a:pPr marL="171450" indent="-171450">
+              <a:buFontTx/>
+              <a:buChar char="-"/>
+            </a:pPr>
+            <a:r>
+              <a:rPr lang="en-GB" dirty="0" err="1"/>
+              <a:t>Suchen</a:t>
+            </a:r>
+            <a:r>
+              <a:rPr lang="en-GB" dirty="0"/>
+              <a:t> in </a:t>
+            </a:r>
+            <a:r>
+              <a:rPr lang="en-GB" dirty="0" err="1"/>
+              <a:t>Umgebung</a:t>
+            </a:r>
+            <a:endParaRPr lang="en-GB" dirty="0"/>
           </a:p>
         </p:txBody>
       </p:sp>
@@ -1768,7 +2425,7 @@
           <a:p>
             <a:fld id="{748723F8-CD6B-45E3-B09A-75062809A4AE}" type="slidenum">
               <a:rPr lang="en-GB" smtClean="0"/>
-              <a:t>6</a:t>
+              <a:t>5</a:t>
             </a:fld>
             <a:endParaRPr lang="en-GB"/>
           </a:p>
@@ -1777,7 +2434,7 @@
     </p:spTree>
     <p:extLst>
       <p:ext uri="{BB962C8B-B14F-4D97-AF65-F5344CB8AC3E}">
-        <p14:creationId xmlns:p14="http://schemas.microsoft.com/office/powerpoint/2010/main" val="1800144089"/>
+        <p14:creationId xmlns:p14="http://schemas.microsoft.com/office/powerpoint/2010/main" val="242691541"/>
       </p:ext>
     </p:extLst>
   </p:cSld>
@@ -1831,9 +2488,62 @@
           <a:bodyPr/>
           <a:lstStyle/>
           <a:p>
-            <a:r>
-              <a:rPr lang="de-CH" dirty="0"/>
-              <a:t>Architektur des PROJEKTS. Dazu gehören auch Wetter/Ski-APIs, Server Programm und App.</a:t>
+            <a:endParaRPr lang="de-CH" noProof="0" dirty="0"/>
+          </a:p>
+          <a:p>
+            <a:r>
+              <a:rPr lang="de-CH" noProof="0" dirty="0"/>
+              <a:t>Erklären das wir uns Szenarien überlegt haben.</a:t>
+            </a:r>
+          </a:p>
+          <a:p>
+            <a:r>
+              <a:rPr lang="de-CH" noProof="0" dirty="0"/>
+              <a:t>First </a:t>
+            </a:r>
+            <a:r>
+              <a:rPr lang="de-CH" noProof="0" dirty="0" err="1"/>
+              <a:t>use</a:t>
+            </a:r>
+            <a:r>
+              <a:rPr lang="de-CH" noProof="0" dirty="0"/>
+              <a:t>: Design ist einfach und intuitiv, daher auch Spinner in </a:t>
+            </a:r>
+            <a:r>
+              <a:rPr lang="de-CH" noProof="0" dirty="0" err="1"/>
+              <a:t>ActionBar</a:t>
+            </a:r>
+            <a:r>
+              <a:rPr lang="de-CH" noProof="0" dirty="0"/>
+              <a:t> und nicht unten (Bottom Navigation Bar)</a:t>
+            </a:r>
+          </a:p>
+          <a:p>
+            <a:r>
+              <a:rPr lang="de-CH" noProof="0" dirty="0"/>
+              <a:t>Regular </a:t>
+            </a:r>
+            <a:r>
+              <a:rPr lang="de-CH" noProof="0" dirty="0" err="1"/>
+              <a:t>user</a:t>
+            </a:r>
+            <a:r>
+              <a:rPr lang="de-CH" noProof="0" dirty="0"/>
+              <a:t>:</a:t>
+            </a:r>
+          </a:p>
+          <a:p>
+            <a:r>
+              <a:rPr lang="de-CH" noProof="0" dirty="0"/>
+              <a:t>Emergency </a:t>
+            </a:r>
+            <a:r>
+              <a:rPr lang="de-CH" noProof="0" dirty="0" err="1"/>
+              <a:t>use</a:t>
+            </a:r>
+            <a:r>
+              <a:rPr lang="de-CH" noProof="0" dirty="0"/>
+              <a:t>: Buttons auf Startseite für schnelles Suchen und Sortieren</a:t>
             </a:r>
           </a:p>
         </p:txBody>
@@ -1855,7 +2565,7 @@
           <a:p>
             <a:fld id="{748723F8-CD6B-45E3-B09A-75062809A4AE}" type="slidenum">
               <a:rPr lang="en-GB" smtClean="0"/>
-              <a:t>7</a:t>
+              <a:t>6</a:t>
             </a:fld>
             <a:endParaRPr lang="en-GB"/>
           </a:p>
@@ -1864,7 +2574,7 @@
     </p:spTree>
     <p:extLst>
       <p:ext uri="{BB962C8B-B14F-4D97-AF65-F5344CB8AC3E}">
-        <p14:creationId xmlns:p14="http://schemas.microsoft.com/office/powerpoint/2010/main" val="349296435"/>
+        <p14:creationId xmlns:p14="http://schemas.microsoft.com/office/powerpoint/2010/main" val="1800144089"/>
       </p:ext>
     </p:extLst>
   </p:cSld>
@@ -1920,31 +2630,7 @@
           <a:p>
             <a:r>
               <a:rPr lang="de-CH" dirty="0"/>
-              <a:t>Datenstruktur wird von API vorgegeben -&gt; </a:t>
-            </a:r>
-            <a:r>
-              <a:rPr lang="de-CH" dirty="0" err="1"/>
-              <a:t>SkiResort</a:t>
-            </a:r>
-            <a:r>
-              <a:rPr lang="de-CH" dirty="0"/>
-              <a:t> von einer API, </a:t>
-            </a:r>
-            <a:r>
-              <a:rPr lang="de-CH" dirty="0" err="1"/>
-              <a:t>WeatherData</a:t>
-            </a:r>
-            <a:r>
-              <a:rPr lang="de-CH" dirty="0"/>
-              <a:t> von anderer API, wird dynamisch an </a:t>
-            </a:r>
-            <a:r>
-              <a:rPr lang="de-CH" dirty="0" err="1"/>
-              <a:t>SkiResort</a:t>
-            </a:r>
-            <a:r>
-              <a:rPr lang="de-CH" dirty="0"/>
-              <a:t> angehängt.</a:t>
+              <a:t>Architektur des PROJEKTS. Dazu gehören auch Wetter/Ski-APIs, Server Programm und App.</a:t>
             </a:r>
           </a:p>
         </p:txBody>
@@ -1966,7 +2652,7 @@
           <a:p>
             <a:fld id="{748723F8-CD6B-45E3-B09A-75062809A4AE}" type="slidenum">
               <a:rPr lang="en-GB" smtClean="0"/>
-              <a:t>9</a:t>
+              <a:t>7</a:t>
             </a:fld>
             <a:endParaRPr lang="en-GB"/>
           </a:p>
@@ -1975,7 +2661,7 @@
     </p:spTree>
     <p:extLst>
       <p:ext uri="{BB962C8B-B14F-4D97-AF65-F5344CB8AC3E}">
-        <p14:creationId xmlns:p14="http://schemas.microsoft.com/office/powerpoint/2010/main" val="3349451142"/>
+        <p14:creationId xmlns:p14="http://schemas.microsoft.com/office/powerpoint/2010/main" val="349296435"/>
       </p:ext>
     </p:extLst>
   </p:cSld>
@@ -2029,173 +2715,34 @@
           <a:bodyPr/>
           <a:lstStyle/>
           <a:p>
-            <a:pPr marL="0" marR="0" lvl="0" indent="0" algn="l" defTabSz="914400" rtl="0" eaLnBrk="1" fontAlgn="auto" latinLnBrk="0" hangingPunct="1">
-              <a:lnSpc>
-                <a:spcPct val="100000"/>
-              </a:lnSpc>
-              <a:spcBef>
-                <a:spcPts val="0"/>
-              </a:spcBef>
-              <a:spcAft>
-                <a:spcPts val="0"/>
-              </a:spcAft>
-              <a:buClrTx/>
-              <a:buSzTx/>
-              <a:buFontTx/>
-              <a:buNone/>
-              <a:tabLst/>
-              <a:defRPr/>
-            </a:pPr>
+            <a:r>
+              <a:rPr lang="de-CH" dirty="0"/>
+              <a:t>Datenstruktur wird von API vorgegeben -&gt; </a:t>
+            </a:r>
             <a:r>
               <a:rPr lang="de-CH" dirty="0" err="1"/>
-              <a:t>Scrum</a:t>
+              <a:t>SkiResort</a:t>
             </a:r>
             <a:r>
               <a:rPr lang="de-CH" dirty="0"/>
-              <a:t>: Leicht abgeänderte Variante, wöchentliche Sprints, </a:t>
+              <a:t> von einer API, </a:t>
             </a:r>
             <a:r>
               <a:rPr lang="de-CH" dirty="0" err="1"/>
-              <a:t>daily</a:t>
+              <a:t>WeatherData</a:t>
             </a:r>
             <a:r>
               <a:rPr lang="de-CH" dirty="0"/>
-              <a:t> </a:t>
+              <a:t> von anderer API, wird dynamisch an </a:t>
             </a:r>
             <a:r>
               <a:rPr lang="de-CH" dirty="0" err="1"/>
-              <a:t>meeting</a:t>
+              <a:t>SkiResort</a:t>
             </a:r>
             <a:r>
               <a:rPr lang="de-CH" dirty="0"/>
-              <a:t> etwa alle 2-3 Tage (WE und Mi/Do)</a:t>
-            </a:r>
-          </a:p>
-          <a:p>
-            <a:pPr marL="0" marR="0" lvl="0" indent="0" algn="l" defTabSz="914400" rtl="0" eaLnBrk="1" fontAlgn="auto" latinLnBrk="0" hangingPunct="1">
-              <a:lnSpc>
-                <a:spcPct val="100000"/>
-              </a:lnSpc>
-              <a:spcBef>
-                <a:spcPts val="0"/>
-              </a:spcBef>
-              <a:spcAft>
-                <a:spcPts val="0"/>
-              </a:spcAft>
-              <a:buClrTx/>
-              <a:buSzTx/>
-              <a:buFontTx/>
-              <a:buNone/>
-              <a:tabLst/>
-              <a:defRPr/>
-            </a:pPr>
-            <a:r>
-              <a:rPr lang="de-CH" dirty="0" err="1"/>
-              <a:t>GeoFire</a:t>
-            </a:r>
-            <a:r>
-              <a:rPr lang="de-CH" dirty="0"/>
-              <a:t>: Wie nach Distanzsortieren -&gt; Druckwellenmässig (Performance)</a:t>
-            </a:r>
-          </a:p>
-          <a:p>
-            <a:pPr marL="0" marR="0" lvl="0" indent="0" algn="l" defTabSz="914400" rtl="0" eaLnBrk="1" fontAlgn="auto" latinLnBrk="0" hangingPunct="1">
-              <a:lnSpc>
-                <a:spcPct val="100000"/>
-              </a:lnSpc>
-              <a:spcBef>
-                <a:spcPts val="0"/>
-              </a:spcBef>
-              <a:spcAft>
-                <a:spcPts val="0"/>
-              </a:spcAft>
-              <a:buClrTx/>
-              <a:buSzTx/>
-              <a:buFontTx/>
-              <a:buNone/>
-              <a:tabLst/>
-              <a:defRPr/>
-            </a:pPr>
-            <a:r>
-              <a:rPr lang="de-CH" dirty="0" err="1"/>
-              <a:t>Sorting</a:t>
-            </a:r>
-            <a:r>
-              <a:rPr lang="de-CH" dirty="0"/>
-              <a:t> </a:t>
-            </a:r>
-            <a:r>
-              <a:rPr lang="de-CH" dirty="0" err="1"/>
-              <a:t>of</a:t>
-            </a:r>
-            <a:r>
-              <a:rPr lang="de-CH" dirty="0"/>
-              <a:t> </a:t>
-            </a:r>
-            <a:r>
-              <a:rPr lang="de-CH" dirty="0" err="1"/>
-              <a:t>list</a:t>
-            </a:r>
-            <a:r>
-              <a:rPr lang="de-CH" dirty="0"/>
-              <a:t>: Mit </a:t>
-            </a:r>
-            <a:r>
-              <a:rPr lang="de-CH" dirty="0" err="1"/>
-              <a:t>Comperatoren</a:t>
-            </a:r>
-            <a:r>
-              <a:rPr lang="de-CH" dirty="0"/>
-              <a:t>, teilweise eigene Logik was wie gewichtet wird</a:t>
-            </a:r>
-          </a:p>
-          <a:p>
-            <a:pPr marL="0" marR="0" lvl="0" indent="0" algn="l" defTabSz="914400" rtl="0" eaLnBrk="1" fontAlgn="auto" latinLnBrk="0" hangingPunct="1">
-              <a:lnSpc>
-                <a:spcPct val="100000"/>
-              </a:lnSpc>
-              <a:spcBef>
-                <a:spcPts val="0"/>
-              </a:spcBef>
-              <a:spcAft>
-                <a:spcPts val="0"/>
-              </a:spcAft>
-              <a:buClrTx/>
-              <a:buSzTx/>
-              <a:buFontTx/>
-              <a:buNone/>
-              <a:tabLst/>
-              <a:defRPr/>
-            </a:pPr>
-            <a:r>
-              <a:rPr lang="de-CH" dirty="0" err="1"/>
-              <a:t>Weather</a:t>
-            </a:r>
-            <a:r>
-              <a:rPr lang="de-CH" dirty="0"/>
-              <a:t> </a:t>
-            </a:r>
-            <a:r>
-              <a:rPr lang="de-CH" dirty="0" err="1"/>
-              <a:t>icons</a:t>
-            </a:r>
-            <a:r>
-              <a:rPr lang="de-CH" dirty="0"/>
-              <a:t>: Wie werden die Icons ausgewählt, </a:t>
-            </a:r>
-            <a:r>
-              <a:rPr lang="de-CH" dirty="0" err="1"/>
-              <a:t>wiso</a:t>
-            </a:r>
-            <a:r>
-              <a:rPr lang="de-CH" dirty="0"/>
-              <a:t> nicht die von web-</a:t>
-            </a:r>
-            <a:r>
-              <a:rPr lang="de-CH" dirty="0" err="1"/>
-              <a:t>api</a:t>
-            </a:r>
-            <a:endParaRPr lang="de-CH" dirty="0"/>
+              <a:t> angehängt.</a:t>
+            </a:r>
           </a:p>
         </p:txBody>
       </p:sp>
@@ -2216,7 +2763,7 @@
           <a:p>
             <a:fld id="{748723F8-CD6B-45E3-B09A-75062809A4AE}" type="slidenum">
               <a:rPr lang="en-GB" smtClean="0"/>
-              <a:t>10</a:t>
+              <a:t>9</a:t>
             </a:fld>
             <a:endParaRPr lang="en-GB"/>
           </a:p>
@@ -2225,7 +2772,7 @@
     </p:spTree>
     <p:extLst>
       <p:ext uri="{BB962C8B-B14F-4D97-AF65-F5344CB8AC3E}">
-        <p14:creationId xmlns:p14="http://schemas.microsoft.com/office/powerpoint/2010/main" val="187494911"/>
+        <p14:creationId xmlns:p14="http://schemas.microsoft.com/office/powerpoint/2010/main" val="3349451142"/>
       </p:ext>
     </p:extLst>
   </p:cSld>
@@ -2279,558 +2826,173 @@
           <a:bodyPr/>
           <a:lstStyle/>
           <a:p>
-            <a:r>
-              <a:rPr lang="en-GB" dirty="0"/>
-              <a:t>JUnit Test</a:t>
-            </a:r>
-          </a:p>
-          <a:p>
-            <a:pPr marL="171450" indent="-171450">
-              <a:buFontTx/>
-              <a:buChar char="-"/>
-            </a:pPr>
-            <a:r>
-              <a:rPr lang="en-GB" dirty="0"/>
-              <a:t>Test der </a:t>
-            </a:r>
-            <a:r>
-              <a:rPr lang="en-GB" dirty="0" err="1"/>
-              <a:t>Sortierungen</a:t>
-            </a:r>
-            <a:r>
-              <a:rPr lang="en-GB" dirty="0"/>
-              <a:t> -&gt; </a:t>
-            </a:r>
-            <a:r>
-              <a:rPr lang="en-GB" dirty="0" err="1"/>
-              <a:t>Distanz</a:t>
-            </a:r>
-            <a:r>
-              <a:rPr lang="en-GB" dirty="0"/>
-              <a:t>, Wetter, Status, </a:t>
-            </a:r>
-            <a:r>
-              <a:rPr lang="en-GB" dirty="0" err="1"/>
-              <a:t>Geöffneten</a:t>
-            </a:r>
-            <a:r>
-              <a:rPr lang="en-GB" dirty="0"/>
-              <a:t> </a:t>
-            </a:r>
-            <a:r>
-              <a:rPr lang="en-GB" dirty="0" err="1"/>
-              <a:t>Pisten</a:t>
-            </a:r>
-            <a:r>
-              <a:rPr lang="en-GB" dirty="0"/>
-              <a:t> und </a:t>
-            </a:r>
-            <a:r>
-              <a:rPr lang="en-GB" dirty="0" err="1"/>
-              <a:t>Lifte</a:t>
-            </a:r>
-            <a:endParaRPr lang="en-GB" dirty="0"/>
-          </a:p>
-          <a:p>
-            <a:pPr marL="171450" indent="-171450">
-              <a:buFontTx/>
-              <a:buChar char="-"/>
-            </a:pPr>
-            <a:r>
-              <a:rPr lang="en-GB" dirty="0" err="1"/>
-              <a:t>Serializierung</a:t>
-            </a:r>
-            <a:r>
-              <a:rPr lang="en-GB" dirty="0"/>
-              <a:t> und </a:t>
-            </a:r>
-            <a:r>
-              <a:rPr lang="en-GB" dirty="0" err="1"/>
-              <a:t>Deserializierung</a:t>
-            </a:r>
-            <a:r>
-              <a:rPr lang="en-GB" dirty="0"/>
-              <a:t> </a:t>
-            </a:r>
-            <a:r>
-              <a:rPr lang="en-GB" dirty="0" err="1"/>
-              <a:t>mittels</a:t>
-            </a:r>
-            <a:r>
-              <a:rPr lang="en-GB" dirty="0"/>
-              <a:t> </a:t>
-            </a:r>
-            <a:r>
-              <a:rPr lang="en-GB" dirty="0" err="1"/>
-              <a:t>GSon</a:t>
-            </a:r>
-            <a:r>
-              <a:rPr lang="en-GB" dirty="0"/>
-              <a:t>. </a:t>
-            </a:r>
-            <a:r>
-              <a:rPr lang="en-GB" dirty="0" err="1"/>
-              <a:t>Benötigt</a:t>
-            </a:r>
-            <a:r>
-              <a:rPr lang="en-GB" dirty="0"/>
-              <a:t> </a:t>
-            </a:r>
-            <a:r>
-              <a:rPr lang="en-GB" dirty="0" err="1"/>
-              <a:t>beim</a:t>
-            </a:r>
-            <a:r>
-              <a:rPr lang="en-GB" dirty="0"/>
-              <a:t> </a:t>
-            </a:r>
-            <a:r>
-              <a:rPr lang="en-GB" dirty="0" err="1"/>
-              <a:t>Empfangen</a:t>
-            </a:r>
-            <a:r>
-              <a:rPr lang="en-GB" dirty="0"/>
-              <a:t> von </a:t>
-            </a:r>
-            <a:r>
-              <a:rPr lang="en-GB" dirty="0" err="1"/>
-              <a:t>Daten</a:t>
-            </a:r>
-            <a:r>
-              <a:rPr lang="en-GB" dirty="0"/>
-              <a:t> der </a:t>
-            </a:r>
-            <a:r>
-              <a:rPr lang="en-GB" dirty="0" err="1"/>
-              <a:t>beiden</a:t>
-            </a:r>
-            <a:r>
-              <a:rPr lang="en-GB" dirty="0"/>
-              <a:t> API’s</a:t>
-            </a:r>
-          </a:p>
-          <a:p>
-            <a:pPr marL="0" indent="0">
+            <a:pPr marL="0" marR="0" lvl="0" indent="0" algn="l" defTabSz="914400" rtl="0" eaLnBrk="1" fontAlgn="auto" latinLnBrk="0" hangingPunct="1">
+              <a:lnSpc>
+                <a:spcPct val="100000"/>
+              </a:lnSpc>
+              <a:spcBef>
+                <a:spcPts val="0"/>
+              </a:spcBef>
+              <a:spcAft>
+                <a:spcPts val="0"/>
+              </a:spcAft>
+              <a:buClrTx/>
+              <a:buSzTx/>
               <a:buFontTx/>
               <a:buNone/>
+              <a:tabLst/>
+              <a:defRPr/>
             </a:pPr>
-            <a:endParaRPr lang="en-GB" dirty="0"/>
-          </a:p>
-          <a:p>
-            <a:pPr marL="0" indent="0">
+            <a:r>
+              <a:rPr lang="de-CH" dirty="0" err="1"/>
+              <a:t>Scrum</a:t>
+            </a:r>
+            <a:r>
+              <a:rPr lang="de-CH" dirty="0"/>
+              <a:t>: Leicht abgeänderte Variante, wöchentliche Sprints, </a:t>
+            </a:r>
+            <a:r>
+              <a:rPr lang="de-CH" dirty="0" err="1"/>
+              <a:t>daily</a:t>
+            </a:r>
+            <a:r>
+              <a:rPr lang="de-CH" dirty="0"/>
+              <a:t> </a:t>
+            </a:r>
+            <a:r>
+              <a:rPr lang="de-CH" dirty="0" err="1"/>
+              <a:t>meeting</a:t>
+            </a:r>
+            <a:r>
+              <a:rPr lang="de-CH" dirty="0"/>
+              <a:t> etwa alle 2-3 Tage (WE und Mi/Do)</a:t>
+            </a:r>
+          </a:p>
+          <a:p>
+            <a:pPr marL="0" marR="0" lvl="0" indent="0" algn="l" defTabSz="914400" rtl="0" eaLnBrk="1" fontAlgn="auto" latinLnBrk="0" hangingPunct="1">
+              <a:lnSpc>
+                <a:spcPct val="100000"/>
+              </a:lnSpc>
+              <a:spcBef>
+                <a:spcPts val="0"/>
+              </a:spcBef>
+              <a:spcAft>
+                <a:spcPts val="0"/>
+              </a:spcAft>
+              <a:buClrTx/>
+              <a:buSzTx/>
               <a:buFontTx/>
               <a:buNone/>
+              <a:tabLst/>
+              <a:defRPr/>
             </a:pPr>
             <a:r>
-              <a:rPr lang="en-GB" dirty="0"/>
-              <a:t>Code Coverage</a:t>
-            </a:r>
-          </a:p>
-          <a:p>
-            <a:pPr marL="171450" indent="-171450">
-              <a:buFontTx/>
-              <a:buChar char="-"/>
-            </a:pPr>
-            <a:r>
-              <a:rPr lang="en-GB" dirty="0" err="1"/>
-              <a:t>Aktuell</a:t>
-            </a:r>
-            <a:r>
-              <a:rPr lang="en-GB" dirty="0"/>
-              <a:t> </a:t>
-            </a:r>
-            <a:r>
-              <a:rPr lang="en-GB" dirty="0" err="1"/>
-              <a:t>bei</a:t>
-            </a:r>
-            <a:r>
-              <a:rPr lang="en-GB" dirty="0"/>
-              <a:t> ca 30%</a:t>
-            </a:r>
-          </a:p>
-          <a:p>
-            <a:pPr marL="171450" indent="-171450">
-              <a:buFontTx/>
-              <a:buChar char="-"/>
-            </a:pPr>
-            <a:endParaRPr lang="en-GB" dirty="0"/>
-          </a:p>
-          <a:p>
-            <a:pPr marL="0" indent="0">
+              <a:rPr lang="de-CH" dirty="0" err="1"/>
+              <a:t>GeoFire</a:t>
+            </a:r>
+            <a:r>
+              <a:rPr lang="de-CH" dirty="0"/>
+              <a:t>: Wie nach Distanzsortieren -&gt; Druckwellenmässig (Performance)</a:t>
+            </a:r>
+          </a:p>
+          <a:p>
+            <a:pPr marL="0" marR="0" lvl="0" indent="0" algn="l" defTabSz="914400" rtl="0" eaLnBrk="1" fontAlgn="auto" latinLnBrk="0" hangingPunct="1">
+              <a:lnSpc>
+                <a:spcPct val="100000"/>
+              </a:lnSpc>
+              <a:spcBef>
+                <a:spcPts val="0"/>
+              </a:spcBef>
+              <a:spcAft>
+                <a:spcPts val="0"/>
+              </a:spcAft>
+              <a:buClrTx/>
+              <a:buSzTx/>
               <a:buFontTx/>
               <a:buNone/>
+              <a:tabLst/>
+              <a:defRPr/>
             </a:pPr>
             <a:r>
-              <a:rPr lang="en-GB" dirty="0"/>
-              <a:t>Sonar </a:t>
-            </a:r>
-            <a:r>
-              <a:rPr lang="en-GB" dirty="0" err="1"/>
-              <a:t>Qube</a:t>
-            </a:r>
-            <a:r>
-              <a:rPr lang="en-GB" dirty="0"/>
-              <a:t>:</a:t>
-            </a:r>
-          </a:p>
-          <a:p>
-            <a:pPr marL="0" indent="0">
-              <a:buFont typeface="Arial" panose="020B0604020202020204" pitchFamily="34" charset="0"/>
-              <a:buNone/>
-            </a:pPr>
-            <a:r>
-              <a:rPr lang="en-GB" dirty="0"/>
-              <a:t>- </a:t>
-            </a:r>
-            <a:r>
-              <a:rPr lang="en-GB" dirty="0" err="1"/>
-              <a:t>Nächste</a:t>
-            </a:r>
-            <a:r>
-              <a:rPr lang="en-GB" dirty="0"/>
+              <a:rPr lang="de-CH" dirty="0" err="1"/>
+              <a:t>Sorting</a:t>
+            </a:r>
+            <a:r>
+              <a:rPr lang="de-CH" dirty="0"/>
               <a:t> </a:t>
             </a:r>
             <a:r>
-              <a:rPr lang="en-GB" dirty="0" err="1"/>
-              <a:t>Folie</a:t>
-            </a:r>
-            <a:endParaRPr lang="en-GB" dirty="0"/>
-          </a:p>
-          <a:p>
-            <a:pPr marL="171450" indent="-171450">
-              <a:buFontTx/>
-              <a:buChar char="-"/>
-            </a:pPr>
-            <a:r>
-              <a:rPr lang="en-GB" dirty="0" err="1"/>
-              <a:t>Einige</a:t>
-            </a:r>
-            <a:r>
-              <a:rPr lang="en-GB" dirty="0"/>
+              <a:rPr lang="de-CH" dirty="0" err="1"/>
+              <a:t>of</a:t>
+            </a:r>
+            <a:r>
+              <a:rPr lang="de-CH" dirty="0"/>
               <a:t> </a:t>
             </a:r>
             <a:r>
-              <a:rPr lang="en-GB" dirty="0" err="1"/>
-              <a:t>Punkte</a:t>
-            </a:r>
-            <a:r>
-              <a:rPr lang="en-GB" dirty="0"/>
-              <a:t> </a:t>
-            </a:r>
-            <a:r>
-              <a:rPr lang="en-GB" dirty="0" err="1"/>
-              <a:t>können</a:t>
-            </a:r>
-            <a:r>
-              <a:rPr lang="en-GB" dirty="0"/>
-              <a:t> </a:t>
-            </a:r>
-            <a:r>
-              <a:rPr lang="en-GB" dirty="0" err="1"/>
-              <a:t>nicht</a:t>
-            </a:r>
-            <a:r>
-              <a:rPr lang="en-GB" dirty="0"/>
-              <a:t> </a:t>
-            </a:r>
-            <a:r>
-              <a:rPr lang="en-GB" dirty="0" err="1"/>
-              <a:t>gefixt</a:t>
-            </a:r>
-            <a:r>
-              <a:rPr lang="en-GB" dirty="0"/>
-              <a:t> </a:t>
-            </a:r>
-            <a:r>
-              <a:rPr lang="en-GB" dirty="0" err="1"/>
-              <a:t>werden</a:t>
-            </a:r>
-            <a:endParaRPr lang="en-GB" dirty="0"/>
-          </a:p>
-          <a:p>
-            <a:pPr marL="171450" indent="-171450">
-              <a:buFontTx/>
-              <a:buChar char="-"/>
-            </a:pPr>
-            <a:r>
-              <a:rPr lang="en-GB" dirty="0" err="1"/>
-              <a:t>Bsp</a:t>
-            </a:r>
-            <a:r>
-              <a:rPr lang="en-GB" dirty="0"/>
-              <a:t>: </a:t>
-            </a:r>
-            <a:r>
-              <a:rPr lang="en-GB" dirty="0" err="1"/>
-              <a:t>Enum</a:t>
-            </a:r>
-            <a:r>
-              <a:rPr lang="en-GB" dirty="0"/>
-              <a:t> </a:t>
-            </a:r>
-            <a:r>
-              <a:rPr lang="en-GB" dirty="0" err="1"/>
-              <a:t>müssen</a:t>
-            </a:r>
-            <a:r>
-              <a:rPr lang="en-GB" dirty="0"/>
-              <a:t> Gross </a:t>
-            </a:r>
-            <a:r>
-              <a:rPr lang="en-GB" dirty="0" err="1"/>
-              <a:t>geschreiben</a:t>
-            </a:r>
-            <a:r>
-              <a:rPr lang="en-GB" dirty="0"/>
-              <a:t> </a:t>
-            </a:r>
-            <a:r>
-              <a:rPr lang="en-GB" dirty="0" err="1"/>
-              <a:t>werden</a:t>
-            </a:r>
-            <a:r>
-              <a:rPr lang="en-GB" dirty="0"/>
-              <a:t>, </a:t>
-            </a:r>
-            <a:r>
-              <a:rPr lang="en-GB" dirty="0" err="1"/>
-              <a:t>jedoch</a:t>
-            </a:r>
-            <a:r>
-              <a:rPr lang="en-GB" dirty="0"/>
-              <a:t> die API </a:t>
-            </a:r>
-            <a:r>
-              <a:rPr lang="en-GB" dirty="0" err="1"/>
-              <a:t>benutzt</a:t>
-            </a:r>
-            <a:r>
-              <a:rPr lang="en-GB" dirty="0"/>
-              <a:t> </a:t>
-            </a:r>
-            <a:r>
-              <a:rPr lang="en-GB" dirty="0" err="1"/>
-              <a:t>andere</a:t>
-            </a:r>
-            <a:r>
-              <a:rPr lang="en-GB" dirty="0"/>
-              <a:t> </a:t>
-            </a:r>
-            <a:r>
-              <a:rPr lang="en-GB" dirty="0" err="1"/>
-              <a:t>Schreibweise</a:t>
-            </a:r>
-            <a:r>
-              <a:rPr lang="en-GB" dirty="0"/>
-              <a:t> und </a:t>
-            </a:r>
-            <a:r>
-              <a:rPr lang="en-GB" dirty="0" err="1"/>
-              <a:t>wäre</a:t>
-            </a:r>
-            <a:r>
-              <a:rPr lang="en-GB" dirty="0"/>
-              <a:t> </a:t>
-            </a:r>
-            <a:r>
-              <a:rPr lang="en-GB" dirty="0" err="1"/>
-              <a:t>somit</a:t>
-            </a:r>
-            <a:r>
-              <a:rPr lang="en-GB" dirty="0"/>
-              <a:t> </a:t>
-            </a:r>
-            <a:r>
-              <a:rPr lang="en-GB" dirty="0" err="1"/>
-              <a:t>nicht</a:t>
-            </a:r>
-            <a:r>
-              <a:rPr lang="en-GB" dirty="0"/>
-              <a:t> </a:t>
-            </a:r>
-            <a:r>
-              <a:rPr lang="en-GB" dirty="0" err="1"/>
-              <a:t>kompatibel</a:t>
-            </a:r>
-            <a:endParaRPr lang="en-GB" dirty="0"/>
-          </a:p>
-          <a:p>
-            <a:pPr marL="171450" indent="-171450">
-              <a:buFontTx/>
-              <a:buChar char="-"/>
-            </a:pPr>
-            <a:r>
-              <a:rPr lang="en-GB" dirty="0" err="1"/>
-              <a:t>Einige</a:t>
-            </a:r>
-            <a:r>
-              <a:rPr lang="en-GB" dirty="0"/>
-              <a:t> Android Klassen </a:t>
-            </a:r>
-            <a:r>
-              <a:rPr lang="en-GB" dirty="0" err="1"/>
-              <a:t>haben</a:t>
-            </a:r>
-            <a:r>
-              <a:rPr lang="en-GB" dirty="0"/>
-              <a:t> </a:t>
-            </a:r>
-            <a:r>
-              <a:rPr lang="en-GB" dirty="0" err="1"/>
-              <a:t>schon</a:t>
-            </a:r>
-            <a:r>
-              <a:rPr lang="en-GB" dirty="0"/>
-              <a:t> </a:t>
-            </a:r>
-            <a:r>
-              <a:rPr lang="en-GB" dirty="0" err="1"/>
-              <a:t>mehr</a:t>
-            </a:r>
-            <a:r>
-              <a:rPr lang="en-GB" dirty="0"/>
-              <a:t> </a:t>
-            </a:r>
-            <a:r>
-              <a:rPr lang="en-GB" dirty="0" err="1"/>
-              <a:t>als</a:t>
-            </a:r>
-            <a:r>
-              <a:rPr lang="en-GB" dirty="0"/>
-              <a:t> 5 </a:t>
-            </a:r>
-            <a:r>
-              <a:rPr lang="en-GB" dirty="0" err="1"/>
-              <a:t>Vererbungen</a:t>
-            </a:r>
-            <a:r>
-              <a:rPr lang="en-GB" dirty="0"/>
-              <a:t>.</a:t>
-            </a:r>
-          </a:p>
-          <a:p>
-            <a:pPr marL="0" indent="0">
-              <a:buFont typeface="Arial" panose="020B0604020202020204" pitchFamily="34" charset="0"/>
-              <a:buNone/>
-            </a:pPr>
-            <a:endParaRPr lang="en-GB" dirty="0"/>
-          </a:p>
-          <a:p>
-            <a:pPr marL="0" indent="0">
+              <a:rPr lang="de-CH" dirty="0" err="1"/>
+              <a:t>list</a:t>
+            </a:r>
+            <a:r>
+              <a:rPr lang="de-CH" dirty="0"/>
+              <a:t>: Mit </a:t>
+            </a:r>
+            <a:r>
+              <a:rPr lang="de-CH" dirty="0" err="1"/>
+              <a:t>Comperatoren</a:t>
+            </a:r>
+            <a:r>
+              <a:rPr lang="de-CH" dirty="0"/>
+              <a:t>, teilweise eigene Logik was wie gewichtet wird</a:t>
+            </a:r>
+          </a:p>
+          <a:p>
+            <a:pPr marL="0" marR="0" lvl="0" indent="0" algn="l" defTabSz="914400" rtl="0" eaLnBrk="1" fontAlgn="auto" latinLnBrk="0" hangingPunct="1">
+              <a:lnSpc>
+                <a:spcPct val="100000"/>
+              </a:lnSpc>
+              <a:spcBef>
+                <a:spcPts val="0"/>
+              </a:spcBef>
+              <a:spcAft>
+                <a:spcPts val="0"/>
+              </a:spcAft>
+              <a:buClrTx/>
+              <a:buSzTx/>
               <a:buFontTx/>
               <a:buNone/>
+              <a:tabLst/>
+              <a:defRPr/>
             </a:pPr>
-            <a:endParaRPr lang="en-GB" dirty="0"/>
-          </a:p>
-          <a:p>
-            <a:pPr marL="0" indent="0">
-              <a:buFontTx/>
-              <a:buNone/>
-            </a:pPr>
-            <a:r>
-              <a:rPr lang="en-GB" dirty="0"/>
-              <a:t>Monkey-Test</a:t>
-            </a:r>
-          </a:p>
-          <a:p>
-            <a:pPr marL="171450" indent="-171450">
-              <a:buFontTx/>
-              <a:buChar char="-"/>
-            </a:pPr>
-            <a:r>
-              <a:rPr lang="en-GB" dirty="0" err="1"/>
-              <a:t>Zum</a:t>
-            </a:r>
-            <a:r>
-              <a:rPr lang="en-GB" dirty="0"/>
+            <a:r>
+              <a:rPr lang="de-CH" dirty="0" err="1"/>
+              <a:t>Weather</a:t>
+            </a:r>
+            <a:r>
+              <a:rPr lang="de-CH" dirty="0"/>
               <a:t> </a:t>
             </a:r>
             <a:r>
-              <a:rPr lang="en-GB" dirty="0" err="1"/>
-              <a:t>Testen</a:t>
-            </a:r>
-            <a:r>
-              <a:rPr lang="en-GB" dirty="0"/>
-              <a:t> der </a:t>
-            </a:r>
-            <a:r>
-              <a:rPr lang="en-GB" dirty="0" err="1"/>
-              <a:t>Stabilität</a:t>
-            </a:r>
-            <a:r>
-              <a:rPr lang="en-GB" dirty="0"/>
-              <a:t>. In ADB (Android Debugging Bridge) </a:t>
-            </a:r>
-            <a:r>
-              <a:rPr lang="en-GB" dirty="0" err="1"/>
-              <a:t>integriert</a:t>
-            </a:r>
-            <a:r>
-              <a:rPr lang="en-GB" dirty="0"/>
-              <a:t>.</a:t>
-            </a:r>
-          </a:p>
-          <a:p>
-            <a:pPr marL="171450" indent="-171450">
-              <a:buFontTx/>
-              <a:buChar char="-"/>
-            </a:pPr>
-            <a:r>
-              <a:rPr lang="en-GB" dirty="0" err="1"/>
-              <a:t>Macht</a:t>
-            </a:r>
-            <a:r>
-              <a:rPr lang="en-GB" dirty="0"/>
-              <a:t> pseudo Random </a:t>
-            </a:r>
-            <a:r>
-              <a:rPr lang="en-GB" dirty="0" err="1"/>
-              <a:t>Interaktionen</a:t>
-            </a:r>
-            <a:r>
-              <a:rPr lang="en-GB" dirty="0"/>
-              <a:t> </a:t>
-            </a:r>
-            <a:r>
-              <a:rPr lang="en-GB" dirty="0" err="1"/>
-              <a:t>mit</a:t>
-            </a:r>
-            <a:r>
-              <a:rPr lang="en-GB" dirty="0"/>
-              <a:t> </a:t>
-            </a:r>
-            <a:r>
-              <a:rPr lang="en-GB" dirty="0" err="1"/>
-              <a:t>dem</a:t>
-            </a:r>
-            <a:r>
-              <a:rPr lang="en-GB" dirty="0"/>
-              <a:t> Device. </a:t>
-            </a:r>
-            <a:r>
-              <a:rPr lang="en-GB" dirty="0" err="1"/>
-              <a:t>Guten</a:t>
-            </a:r>
-            <a:r>
-              <a:rPr lang="en-GB" dirty="0"/>
-              <a:t> Test </a:t>
-            </a:r>
-            <a:r>
-              <a:rPr lang="en-GB" dirty="0" err="1"/>
-              <a:t>für</a:t>
-            </a:r>
-            <a:r>
-              <a:rPr lang="en-GB" dirty="0"/>
-              <a:t> </a:t>
-            </a:r>
-            <a:r>
-              <a:rPr lang="en-GB" dirty="0" err="1"/>
-              <a:t>Stabilität</a:t>
-            </a:r>
-            <a:r>
-              <a:rPr lang="en-GB" dirty="0"/>
-              <a:t> der App</a:t>
-            </a:r>
+              <a:rPr lang="de-CH" dirty="0" err="1"/>
+              <a:t>icons</a:t>
+            </a:r>
+            <a:r>
+              <a:rPr lang="de-CH" dirty="0"/>
+              <a:t>: Wie werden die Icons ausgewählt, </a:t>
+            </a:r>
+            <a:r>
+              <a:rPr lang="de-CH" dirty="0" err="1"/>
+              <a:t>wiso</a:t>
+            </a:r>
+            <a:r>
+              <a:rPr lang="de-CH" dirty="0"/>
+              <a:t> nicht die von web-</a:t>
+            </a:r>
+            <a:r>
+              <a:rPr lang="de-CH" dirty="0" err="1"/>
+              <a:t>api</a:t>
+            </a:r>
+            <a:endParaRPr lang="de-CH" dirty="0"/>
           </a:p>
         </p:txBody>
       </p:sp>
@@ -2851,7 +3013,7 @@
           <a:p>
             <a:fld id="{748723F8-CD6B-45E3-B09A-75062809A4AE}" type="slidenum">
               <a:rPr lang="en-GB" smtClean="0"/>
-              <a:t>11</a:t>
+              <a:t>10</a:t>
             </a:fld>
             <a:endParaRPr lang="en-GB"/>
           </a:p>
@@ -2860,7 +3022,7 @@
     </p:spTree>
     <p:extLst>
       <p:ext uri="{BB962C8B-B14F-4D97-AF65-F5344CB8AC3E}">
-        <p14:creationId xmlns:p14="http://schemas.microsoft.com/office/powerpoint/2010/main" val="996191540"/>
+        <p14:creationId xmlns:p14="http://schemas.microsoft.com/office/powerpoint/2010/main" val="187494911"/>
       </p:ext>
     </p:extLst>
   </p:cSld>
@@ -2914,6 +3076,137 @@
           <a:bodyPr/>
           <a:lstStyle/>
           <a:p>
+            <a:r>
+              <a:rPr lang="en-GB" dirty="0"/>
+              <a:t>JUnit Test</a:t>
+            </a:r>
+          </a:p>
+          <a:p>
+            <a:pPr marL="171450" indent="-171450">
+              <a:buFontTx/>
+              <a:buChar char="-"/>
+            </a:pPr>
+            <a:r>
+              <a:rPr lang="en-GB" dirty="0"/>
+              <a:t>Test der </a:t>
+            </a:r>
+            <a:r>
+              <a:rPr lang="en-GB" dirty="0" err="1"/>
+              <a:t>Sortierungen</a:t>
+            </a:r>
+            <a:r>
+              <a:rPr lang="en-GB" dirty="0"/>
+              <a:t> -&gt; </a:t>
+            </a:r>
+            <a:r>
+              <a:rPr lang="en-GB" dirty="0" err="1"/>
+              <a:t>Distanz</a:t>
+            </a:r>
+            <a:r>
+              <a:rPr lang="en-GB" dirty="0"/>
+              <a:t>, Wetter, Status, </a:t>
+            </a:r>
+            <a:r>
+              <a:rPr lang="en-GB" dirty="0" err="1"/>
+              <a:t>Geöffneten</a:t>
+            </a:r>
+            <a:r>
+              <a:rPr lang="en-GB" dirty="0"/>
+              <a:t> </a:t>
+            </a:r>
+            <a:r>
+              <a:rPr lang="en-GB" dirty="0" err="1"/>
+              <a:t>Pisten</a:t>
+            </a:r>
+            <a:r>
+              <a:rPr lang="en-GB" dirty="0"/>
+              <a:t> und </a:t>
+            </a:r>
+            <a:r>
+              <a:rPr lang="en-GB" dirty="0" err="1"/>
+              <a:t>Lifte</a:t>
+            </a:r>
+            <a:endParaRPr lang="en-GB" dirty="0"/>
+          </a:p>
+          <a:p>
+            <a:pPr marL="171450" indent="-171450">
+              <a:buFontTx/>
+              <a:buChar char="-"/>
+            </a:pPr>
+            <a:r>
+              <a:rPr lang="en-GB" dirty="0" err="1"/>
+              <a:t>Serializierung</a:t>
+            </a:r>
+            <a:r>
+              <a:rPr lang="en-GB" dirty="0"/>
+              <a:t> und </a:t>
+            </a:r>
+            <a:r>
+              <a:rPr lang="en-GB" dirty="0" err="1"/>
+              <a:t>Deserializierung</a:t>
+            </a:r>
+            <a:r>
+              <a:rPr lang="en-GB" dirty="0"/>
+              <a:t> </a:t>
+            </a:r>
+            <a:r>
+              <a:rPr lang="en-GB" dirty="0" err="1"/>
+              <a:t>mittels</a:t>
+            </a:r>
+            <a:r>
+              <a:rPr lang="en-GB" dirty="0"/>
+              <a:t> </a:t>
+            </a:r>
+            <a:r>
+              <a:rPr lang="en-GB" dirty="0" err="1"/>
+              <a:t>GSon</a:t>
+            </a:r>
+            <a:r>
+              <a:rPr lang="en-GB" dirty="0"/>
+              <a:t>. </a:t>
+            </a:r>
+            <a:r>
+              <a:rPr lang="en-GB" dirty="0" err="1"/>
+              <a:t>Benötigt</a:t>
+            </a:r>
+            <a:r>
+              <a:rPr lang="en-GB" dirty="0"/>
+              <a:t> </a:t>
+            </a:r>
+            <a:r>
+              <a:rPr lang="en-GB" dirty="0" err="1"/>
+              <a:t>beim</a:t>
+            </a:r>
+            <a:r>
+              <a:rPr lang="en-GB" dirty="0"/>
+              <a:t> </a:t>
+            </a:r>
+            <a:r>
+              <a:rPr lang="en-GB" dirty="0" err="1"/>
+              <a:t>Empfangen</a:t>
+            </a:r>
+            <a:r>
+              <a:rPr lang="en-GB" dirty="0"/>
+              <a:t> von </a:t>
+            </a:r>
+            <a:r>
+              <a:rPr lang="en-GB" dirty="0" err="1"/>
+              <a:t>Daten</a:t>
+            </a:r>
+            <a:r>
+              <a:rPr lang="en-GB" dirty="0"/>
+              <a:t> der </a:t>
+            </a:r>
+            <a:r>
+              <a:rPr lang="en-GB" dirty="0" err="1"/>
+              <a:t>beiden</a:t>
+            </a:r>
+            <a:r>
+              <a:rPr lang="en-GB" dirty="0"/>
+              <a:t> API’s</a:t>
+            </a:r>
+          </a:p>
+          <a:p>
             <a:pPr marL="0" indent="0">
               <a:buFontTx/>
               <a:buNone/>
@@ -2921,7 +3214,420 @@
             <a:endParaRPr lang="en-GB" dirty="0"/>
           </a:p>
           <a:p>
-            <a:endParaRPr lang="de-CH" dirty="0"/>
+            <a:pPr marL="0" indent="0">
+              <a:buFontTx/>
+              <a:buNone/>
+            </a:pPr>
+            <a:r>
+              <a:rPr lang="en-GB" dirty="0"/>
+              <a:t>Code Coverage</a:t>
+            </a:r>
+          </a:p>
+          <a:p>
+            <a:pPr marL="171450" indent="-171450">
+              <a:buFontTx/>
+              <a:buChar char="-"/>
+            </a:pPr>
+            <a:r>
+              <a:rPr lang="en-GB" dirty="0" err="1"/>
+              <a:t>Aktuell</a:t>
+            </a:r>
+            <a:r>
+              <a:rPr lang="en-GB" dirty="0"/>
+              <a:t> </a:t>
+            </a:r>
+            <a:r>
+              <a:rPr lang="en-GB" dirty="0" err="1"/>
+              <a:t>bei</a:t>
+            </a:r>
+            <a:r>
+              <a:rPr lang="en-GB" dirty="0"/>
+              <a:t> ca 30%</a:t>
+            </a:r>
+          </a:p>
+          <a:p>
+            <a:pPr marL="171450" indent="-171450">
+              <a:buFontTx/>
+              <a:buChar char="-"/>
+            </a:pPr>
+            <a:endParaRPr lang="en-GB" dirty="0"/>
+          </a:p>
+          <a:p>
+            <a:pPr marL="0" indent="0">
+              <a:buFontTx/>
+              <a:buNone/>
+            </a:pPr>
+            <a:r>
+              <a:rPr lang="en-GB" dirty="0"/>
+              <a:t>Sonar </a:t>
+            </a:r>
+            <a:r>
+              <a:rPr lang="en-GB" dirty="0" err="1"/>
+              <a:t>Qube</a:t>
+            </a:r>
+            <a:r>
+              <a:rPr lang="en-GB" dirty="0"/>
+              <a:t>:</a:t>
+            </a:r>
+          </a:p>
+          <a:p>
+            <a:pPr marL="0" indent="0">
+              <a:buFont typeface="Arial" panose="020B0604020202020204" pitchFamily="34" charset="0"/>
+              <a:buNone/>
+            </a:pPr>
+            <a:r>
+              <a:rPr lang="en-GB" dirty="0"/>
+              <a:t>- </a:t>
+            </a:r>
+            <a:r>
+              <a:rPr lang="en-GB" dirty="0" err="1"/>
+              <a:t>Nächste</a:t>
+            </a:r>
+            <a:r>
+              <a:rPr lang="en-GB" dirty="0"/>
+              <a:t> </a:t>
+            </a:r>
+            <a:r>
+              <a:rPr lang="en-GB" dirty="0" err="1"/>
+              <a:t>Folie</a:t>
+            </a:r>
+            <a:endParaRPr lang="en-GB" dirty="0"/>
+          </a:p>
+          <a:p>
+            <a:pPr marL="171450" indent="-171450">
+              <a:buFontTx/>
+              <a:buChar char="-"/>
+            </a:pPr>
+            <a:r>
+              <a:rPr lang="en-GB" dirty="0" err="1"/>
+              <a:t>Einige</a:t>
+            </a:r>
+            <a:r>
+              <a:rPr lang="en-GB" dirty="0"/>
+              <a:t> </a:t>
+            </a:r>
+            <a:r>
+              <a:rPr lang="en-GB" dirty="0" err="1"/>
+              <a:t>Punkte</a:t>
+            </a:r>
+            <a:r>
+              <a:rPr lang="en-GB" dirty="0"/>
+              <a:t> </a:t>
+            </a:r>
+            <a:r>
+              <a:rPr lang="en-GB" dirty="0" err="1"/>
+              <a:t>können</a:t>
+            </a:r>
+            <a:r>
+              <a:rPr lang="en-GB" dirty="0"/>
+              <a:t> </a:t>
+            </a:r>
+            <a:r>
+              <a:rPr lang="en-GB" dirty="0" err="1"/>
+              <a:t>nicht</a:t>
+            </a:r>
+            <a:r>
+              <a:rPr lang="en-GB" dirty="0"/>
+              <a:t> </a:t>
+            </a:r>
+            <a:r>
+              <a:rPr lang="en-GB" dirty="0" err="1"/>
+              <a:t>gefixt</a:t>
+            </a:r>
+            <a:r>
+              <a:rPr lang="en-GB" dirty="0"/>
+              <a:t> </a:t>
+            </a:r>
+            <a:r>
+              <a:rPr lang="en-GB" dirty="0" err="1"/>
+              <a:t>werden</a:t>
+            </a:r>
+            <a:endParaRPr lang="en-GB" dirty="0"/>
+          </a:p>
+          <a:p>
+            <a:pPr marL="171450" indent="-171450">
+              <a:buFontTx/>
+              <a:buChar char="-"/>
+            </a:pPr>
+            <a:r>
+              <a:rPr lang="en-GB" dirty="0" err="1"/>
+              <a:t>Bsp</a:t>
+            </a:r>
+            <a:r>
+              <a:rPr lang="en-GB" dirty="0"/>
+              <a:t>: </a:t>
+            </a:r>
+            <a:r>
+              <a:rPr lang="en-GB" dirty="0" err="1"/>
+              <a:t>Enum</a:t>
+            </a:r>
+            <a:r>
+              <a:rPr lang="en-GB" dirty="0"/>
+              <a:t> </a:t>
+            </a:r>
+            <a:r>
+              <a:rPr lang="en-GB" dirty="0" err="1"/>
+              <a:t>müssen</a:t>
+            </a:r>
+            <a:r>
+              <a:rPr lang="en-GB" dirty="0"/>
+              <a:t> Gross </a:t>
+            </a:r>
+            <a:r>
+              <a:rPr lang="en-GB" dirty="0" err="1"/>
+              <a:t>geschreiben</a:t>
+            </a:r>
+            <a:r>
+              <a:rPr lang="en-GB" dirty="0"/>
+              <a:t> </a:t>
+            </a:r>
+            <a:r>
+              <a:rPr lang="en-GB" dirty="0" err="1"/>
+              <a:t>werden</a:t>
+            </a:r>
+            <a:r>
+              <a:rPr lang="en-GB" dirty="0"/>
+              <a:t>, </a:t>
+            </a:r>
+            <a:r>
+              <a:rPr lang="en-GB" dirty="0" err="1"/>
+              <a:t>jedoch</a:t>
+            </a:r>
+            <a:r>
+              <a:rPr lang="en-GB" dirty="0"/>
+              <a:t> die API </a:t>
+            </a:r>
+            <a:r>
+              <a:rPr lang="en-GB" dirty="0" err="1"/>
+              <a:t>benutzt</a:t>
+            </a:r>
+            <a:r>
+              <a:rPr lang="en-GB" dirty="0"/>
+              <a:t> </a:t>
+            </a:r>
+            <a:r>
+              <a:rPr lang="en-GB" dirty="0" err="1"/>
+              <a:t>andere</a:t>
+            </a:r>
+            <a:r>
+              <a:rPr lang="en-GB" dirty="0"/>
+              <a:t> </a:t>
+            </a:r>
+            <a:r>
+              <a:rPr lang="en-GB" dirty="0" err="1"/>
+              <a:t>Schreibweise</a:t>
+            </a:r>
+            <a:r>
+              <a:rPr lang="en-GB" dirty="0"/>
+              <a:t> und </a:t>
+            </a:r>
+            <a:r>
+              <a:rPr lang="en-GB" dirty="0" err="1"/>
+              <a:t>wäre</a:t>
+            </a:r>
+            <a:r>
+              <a:rPr lang="en-GB" dirty="0"/>
+              <a:t> </a:t>
+            </a:r>
+            <a:r>
+              <a:rPr lang="en-GB" dirty="0" err="1"/>
+              <a:t>somit</a:t>
+            </a:r>
+            <a:r>
+              <a:rPr lang="en-GB" dirty="0"/>
+              <a:t> </a:t>
+            </a:r>
+            <a:r>
+              <a:rPr lang="en-GB" dirty="0" err="1"/>
+              <a:t>nicht</a:t>
+            </a:r>
+            <a:r>
+              <a:rPr lang="en-GB" dirty="0"/>
+              <a:t> </a:t>
+            </a:r>
+            <a:r>
+              <a:rPr lang="en-GB" dirty="0" err="1"/>
+              <a:t>kompatibel</a:t>
+            </a:r>
+            <a:endParaRPr lang="en-GB" dirty="0"/>
+          </a:p>
+          <a:p>
+            <a:pPr marL="171450" indent="-171450">
+              <a:buFontTx/>
+              <a:buChar char="-"/>
+            </a:pPr>
+            <a:r>
+              <a:rPr lang="en-GB" dirty="0" err="1"/>
+              <a:t>Einige</a:t>
+            </a:r>
+            <a:r>
+              <a:rPr lang="en-GB" dirty="0"/>
+              <a:t> Android Klassen </a:t>
+            </a:r>
+            <a:r>
+              <a:rPr lang="en-GB" dirty="0" err="1"/>
+              <a:t>haben</a:t>
+            </a:r>
+            <a:r>
+              <a:rPr lang="en-GB" dirty="0"/>
+              <a:t> </a:t>
+            </a:r>
+            <a:r>
+              <a:rPr lang="en-GB" dirty="0" err="1"/>
+              <a:t>schon</a:t>
+            </a:r>
+            <a:r>
+              <a:rPr lang="en-GB" dirty="0"/>
+              <a:t> </a:t>
+            </a:r>
+            <a:r>
+              <a:rPr lang="en-GB" dirty="0" err="1"/>
+              <a:t>mehr</a:t>
+            </a:r>
+            <a:r>
+              <a:rPr lang="en-GB" dirty="0"/>
+              <a:t> </a:t>
+            </a:r>
+            <a:r>
+              <a:rPr lang="en-GB" dirty="0" err="1"/>
+              <a:t>als</a:t>
+            </a:r>
+            <a:r>
+              <a:rPr lang="en-GB" dirty="0"/>
+              <a:t> 5 </a:t>
+            </a:r>
+            <a:r>
+              <a:rPr lang="en-GB" dirty="0" err="1"/>
+              <a:t>Vererbungen</a:t>
+            </a:r>
+            <a:r>
+              <a:rPr lang="en-GB" dirty="0"/>
+              <a:t>.</a:t>
+            </a:r>
+          </a:p>
+          <a:p>
+            <a:pPr marL="0" indent="0">
+              <a:buFont typeface="Arial" panose="020B0604020202020204" pitchFamily="34" charset="0"/>
+              <a:buNone/>
+            </a:pPr>
+            <a:endParaRPr lang="en-GB" dirty="0"/>
+          </a:p>
+          <a:p>
+            <a:pPr marL="0" indent="0">
+              <a:buFontTx/>
+              <a:buNone/>
+            </a:pPr>
+            <a:endParaRPr lang="en-GB" dirty="0"/>
+          </a:p>
+          <a:p>
+            <a:pPr marL="0" indent="0">
+              <a:buFontTx/>
+              <a:buNone/>
+            </a:pPr>
+            <a:r>
+              <a:rPr lang="en-GB" dirty="0"/>
+              <a:t>Monkey-Test</a:t>
+            </a:r>
+          </a:p>
+          <a:p>
+            <a:pPr marL="171450" indent="-171450">
+              <a:buFontTx/>
+              <a:buChar char="-"/>
+            </a:pPr>
+            <a:r>
+              <a:rPr lang="en-GB" dirty="0" err="1"/>
+              <a:t>Zum</a:t>
+            </a:r>
+            <a:r>
+              <a:rPr lang="en-GB" dirty="0"/>
+              <a:t> </a:t>
+            </a:r>
+            <a:r>
+              <a:rPr lang="en-GB" dirty="0" err="1"/>
+              <a:t>Testen</a:t>
+            </a:r>
+            <a:r>
+              <a:rPr lang="en-GB" dirty="0"/>
+              <a:t> der </a:t>
+            </a:r>
+            <a:r>
+              <a:rPr lang="en-GB" dirty="0" err="1"/>
+              <a:t>Stabilität</a:t>
+            </a:r>
+            <a:r>
+              <a:rPr lang="en-GB" dirty="0"/>
+              <a:t>. In ADB (Android Debugging Bridge) </a:t>
+            </a:r>
+            <a:r>
+              <a:rPr lang="en-GB" dirty="0" err="1"/>
+              <a:t>integriert</a:t>
+            </a:r>
+            <a:r>
+              <a:rPr lang="en-GB" dirty="0"/>
+              <a:t>.</a:t>
+            </a:r>
+          </a:p>
+          <a:p>
+            <a:pPr marL="171450" indent="-171450">
+              <a:buFontTx/>
+              <a:buChar char="-"/>
+            </a:pPr>
+            <a:r>
+              <a:rPr lang="en-GB" dirty="0" err="1"/>
+              <a:t>Macht</a:t>
+            </a:r>
+            <a:r>
+              <a:rPr lang="en-GB" dirty="0"/>
+              <a:t> pseudo Random </a:t>
+            </a:r>
+            <a:r>
+              <a:rPr lang="en-GB" dirty="0" err="1"/>
+              <a:t>Interaktionen</a:t>
+            </a:r>
+            <a:r>
+              <a:rPr lang="en-GB" dirty="0"/>
+              <a:t> </a:t>
+            </a:r>
+            <a:r>
+              <a:rPr lang="en-GB" dirty="0" err="1"/>
+              <a:t>mit</a:t>
+            </a:r>
+            <a:r>
+              <a:rPr lang="en-GB" dirty="0"/>
+              <a:t> </a:t>
+            </a:r>
+            <a:r>
+              <a:rPr lang="en-GB" dirty="0" err="1"/>
+              <a:t>dem</a:t>
+            </a:r>
+            <a:r>
+              <a:rPr lang="en-GB" dirty="0"/>
+              <a:t> Device. </a:t>
+            </a:r>
+            <a:r>
+              <a:rPr lang="en-GB" dirty="0" err="1"/>
+              <a:t>Guten</a:t>
+            </a:r>
+            <a:r>
+              <a:rPr lang="en-GB" dirty="0"/>
+              <a:t> Test </a:t>
+            </a:r>
+            <a:r>
+              <a:rPr lang="en-GB" dirty="0" err="1"/>
+              <a:t>für</a:t>
+            </a:r>
+            <a:r>
+              <a:rPr lang="en-GB" dirty="0"/>
+              <a:t> </a:t>
+            </a:r>
+            <a:r>
+              <a:rPr lang="en-GB" dirty="0" err="1"/>
+              <a:t>Stabilität</a:t>
+            </a:r>
+            <a:r>
+              <a:rPr lang="en-GB" dirty="0"/>
+              <a:t> der App</a:t>
+            </a:r>
           </a:p>
         </p:txBody>
       </p:sp>
@@ -2942,7 +3648,7 @@
           <a:p>
             <a:fld id="{748723F8-CD6B-45E3-B09A-75062809A4AE}" type="slidenum">
               <a:rPr lang="en-GB" smtClean="0"/>
-              <a:t>12</a:t>
+              <a:t>11</a:t>
             </a:fld>
             <a:endParaRPr lang="en-GB"/>
           </a:p>
@@ -2951,7 +3657,7 @@
     </p:spTree>
     <p:extLst>
       <p:ext uri="{BB962C8B-B14F-4D97-AF65-F5344CB8AC3E}">
-        <p14:creationId xmlns:p14="http://schemas.microsoft.com/office/powerpoint/2010/main" val="3608739263"/>
+        <p14:creationId xmlns:p14="http://schemas.microsoft.com/office/powerpoint/2010/main" val="996191540"/>
       </p:ext>
     </p:extLst>
   </p:cSld>
@@ -3005,137 +3711,6 @@
           <a:bodyPr/>
           <a:lstStyle/>
           <a:p>
-            <a:r>
-              <a:rPr lang="en-GB" dirty="0"/>
-              <a:t>JUnit Test</a:t>
-            </a:r>
-          </a:p>
-          <a:p>
-            <a:pPr marL="171450" indent="-171450">
-              <a:buFontTx/>
-              <a:buChar char="-"/>
-            </a:pPr>
-            <a:r>
-              <a:rPr lang="en-GB" dirty="0"/>
-              <a:t>Test der </a:t>
-            </a:r>
-            <a:r>
-              <a:rPr lang="en-GB" dirty="0" err="1"/>
-              <a:t>Sortierungen</a:t>
-            </a:r>
-            <a:r>
-              <a:rPr lang="en-GB" dirty="0"/>
-              <a:t> -&gt; </a:t>
-            </a:r>
-            <a:r>
-              <a:rPr lang="en-GB" dirty="0" err="1"/>
-              <a:t>Distanz</a:t>
-            </a:r>
-            <a:r>
-              <a:rPr lang="en-GB" dirty="0"/>
-              <a:t>, Wetter, Status, </a:t>
-            </a:r>
-            <a:r>
-              <a:rPr lang="en-GB" dirty="0" err="1"/>
-              <a:t>Geöffneten</a:t>
-            </a:r>
-            <a:r>
-              <a:rPr lang="en-GB" dirty="0"/>
-              <a:t> </a:t>
-            </a:r>
-            <a:r>
-              <a:rPr lang="en-GB" dirty="0" err="1"/>
-              <a:t>Pisten</a:t>
-            </a:r>
-            <a:r>
-              <a:rPr lang="en-GB" dirty="0"/>
-              <a:t> und </a:t>
-            </a:r>
-            <a:r>
-              <a:rPr lang="en-GB" dirty="0" err="1"/>
-              <a:t>Lifte</a:t>
-            </a:r>
-            <a:endParaRPr lang="en-GB" dirty="0"/>
-          </a:p>
-          <a:p>
-            <a:pPr marL="171450" indent="-171450">
-              <a:buFontTx/>
-              <a:buChar char="-"/>
-            </a:pPr>
-            <a:r>
-              <a:rPr lang="en-GB" dirty="0" err="1"/>
-              <a:t>Serializierung</a:t>
-            </a:r>
-            <a:r>
-              <a:rPr lang="en-GB" dirty="0"/>
-              <a:t> und </a:t>
-            </a:r>
-            <a:r>
-              <a:rPr lang="en-GB" dirty="0" err="1"/>
-              <a:t>Deserializierung</a:t>
-            </a:r>
-            <a:r>
-              <a:rPr lang="en-GB" dirty="0"/>
-              <a:t> </a:t>
-            </a:r>
-            <a:r>
-              <a:rPr lang="en-GB" dirty="0" err="1"/>
-              <a:t>mittels</a:t>
-            </a:r>
-            <a:r>
-              <a:rPr lang="en-GB" dirty="0"/>
-              <a:t> </a:t>
-            </a:r>
-            <a:r>
-              <a:rPr lang="en-GB" dirty="0" err="1"/>
-              <a:t>GSon</a:t>
-            </a:r>
-            <a:r>
-              <a:rPr lang="en-GB" dirty="0"/>
-              <a:t>. </a:t>
-            </a:r>
-            <a:r>
-              <a:rPr lang="en-GB" dirty="0" err="1"/>
-              <a:t>Benötigt</a:t>
-            </a:r>
-            <a:r>
-              <a:rPr lang="en-GB" dirty="0"/>
-              <a:t> </a:t>
-            </a:r>
-            <a:r>
-              <a:rPr lang="en-GB" dirty="0" err="1"/>
-              <a:t>beim</a:t>
-            </a:r>
-            <a:r>
-              <a:rPr lang="en-GB" dirty="0"/>
-              <a:t> </a:t>
-            </a:r>
-            <a:r>
-              <a:rPr lang="en-GB" dirty="0" err="1"/>
-              <a:t>Empfangen</a:t>
-            </a:r>
-            <a:r>
-              <a:rPr lang="en-GB" dirty="0"/>
-              <a:t> von </a:t>
-            </a:r>
-            <a:r>
-              <a:rPr lang="en-GB" dirty="0" err="1"/>
-              <a:t>Daten</a:t>
-            </a:r>
-            <a:r>
-              <a:rPr lang="en-GB" dirty="0"/>
-              <a:t> der </a:t>
-            </a:r>
-            <a:r>
-              <a:rPr lang="en-GB" dirty="0" err="1"/>
-              <a:t>beiden</a:t>
-            </a:r>
-            <a:r>
-              <a:rPr lang="en-GB" dirty="0"/>
-              <a:t> API’s</a:t>
-            </a:r>
-          </a:p>
-          <a:p>
             <a:pPr marL="0" indent="0">
               <a:buFontTx/>
               <a:buNone/>
@@ -3143,378 +3718,7 @@
             <a:endParaRPr lang="en-GB" dirty="0"/>
           </a:p>
           <a:p>
-            <a:pPr marL="0" indent="0">
-              <a:buFontTx/>
-              <a:buNone/>
-            </a:pPr>
-            <a:r>
-              <a:rPr lang="en-GB" dirty="0"/>
-              <a:t>Code Coverage</a:t>
-            </a:r>
-          </a:p>
-          <a:p>
-            <a:pPr marL="171450" indent="-171450">
-              <a:buFontTx/>
-              <a:buChar char="-"/>
-            </a:pPr>
-            <a:r>
-              <a:rPr lang="en-GB" dirty="0" err="1"/>
-              <a:t>Aktuell</a:t>
-            </a:r>
-            <a:r>
-              <a:rPr lang="en-GB" dirty="0"/>
-              <a:t> </a:t>
-            </a:r>
-            <a:r>
-              <a:rPr lang="en-GB" dirty="0" err="1"/>
-              <a:t>bei</a:t>
-            </a:r>
-            <a:r>
-              <a:rPr lang="en-GB" dirty="0"/>
-              <a:t> ca 30%</a:t>
-            </a:r>
-          </a:p>
-          <a:p>
-            <a:pPr marL="171450" indent="-171450">
-              <a:buFontTx/>
-              <a:buChar char="-"/>
-            </a:pPr>
-            <a:endParaRPr lang="en-GB" dirty="0"/>
-          </a:p>
-          <a:p>
-            <a:pPr marL="0" indent="0">
-              <a:buFontTx/>
-              <a:buNone/>
-            </a:pPr>
-            <a:r>
-              <a:rPr lang="en-GB" dirty="0" err="1"/>
-              <a:t>SonarQube</a:t>
-            </a:r>
-            <a:endParaRPr lang="en-GB" dirty="0"/>
-          </a:p>
-          <a:p>
-            <a:pPr marL="171450" indent="-171450">
-              <a:buFontTx/>
-              <a:buChar char="-"/>
-            </a:pPr>
-            <a:r>
-              <a:rPr lang="en-GB" dirty="0" err="1"/>
-              <a:t>Einige</a:t>
-            </a:r>
-            <a:r>
-              <a:rPr lang="en-GB" dirty="0"/>
-              <a:t> </a:t>
-            </a:r>
-            <a:r>
-              <a:rPr lang="en-GB" dirty="0" err="1"/>
-              <a:t>Punkte</a:t>
-            </a:r>
-            <a:r>
-              <a:rPr lang="en-GB" dirty="0"/>
-              <a:t> </a:t>
-            </a:r>
-            <a:r>
-              <a:rPr lang="en-GB" dirty="0" err="1"/>
-              <a:t>können</a:t>
-            </a:r>
-            <a:r>
-              <a:rPr lang="en-GB" dirty="0"/>
-              <a:t> </a:t>
-            </a:r>
-            <a:r>
-              <a:rPr lang="en-GB" dirty="0" err="1"/>
-              <a:t>nicht</a:t>
-            </a:r>
-            <a:r>
-              <a:rPr lang="en-GB" dirty="0"/>
-              <a:t> </a:t>
-            </a:r>
-            <a:r>
-              <a:rPr lang="en-GB" dirty="0" err="1"/>
-              <a:t>gefixt</a:t>
-            </a:r>
-            <a:r>
-              <a:rPr lang="en-GB" dirty="0"/>
-              <a:t> warden</a:t>
-            </a:r>
-          </a:p>
-          <a:p>
-            <a:pPr marL="171450" indent="-171450">
-              <a:buFontTx/>
-              <a:buChar char="-"/>
-            </a:pPr>
-            <a:r>
-              <a:rPr lang="en-GB" dirty="0" err="1"/>
-              <a:t>Bsp</a:t>
-            </a:r>
-            <a:r>
-              <a:rPr lang="en-GB" dirty="0"/>
-              <a:t>: </a:t>
-            </a:r>
-            <a:r>
-              <a:rPr lang="en-GB" dirty="0" err="1"/>
-              <a:t>Enum</a:t>
-            </a:r>
-            <a:r>
-              <a:rPr lang="en-GB" dirty="0"/>
-              <a:t> </a:t>
-            </a:r>
-            <a:r>
-              <a:rPr lang="en-GB" dirty="0" err="1"/>
-              <a:t>müssen</a:t>
-            </a:r>
-            <a:r>
-              <a:rPr lang="en-GB" dirty="0"/>
-              <a:t> Gross </a:t>
-            </a:r>
-            <a:r>
-              <a:rPr lang="en-GB" dirty="0" err="1"/>
-              <a:t>geschreiben</a:t>
-            </a:r>
-            <a:r>
-              <a:rPr lang="en-GB" dirty="0"/>
-              <a:t> </a:t>
-            </a:r>
-            <a:r>
-              <a:rPr lang="en-GB" dirty="0" err="1"/>
-              <a:t>werden</a:t>
-            </a:r>
-            <a:r>
-              <a:rPr lang="en-GB" dirty="0"/>
-              <a:t>, </a:t>
-            </a:r>
-            <a:r>
-              <a:rPr lang="en-GB" dirty="0" err="1"/>
-              <a:t>jedoch</a:t>
-            </a:r>
-            <a:r>
-              <a:rPr lang="en-GB" dirty="0"/>
-              <a:t> die API </a:t>
-            </a:r>
-            <a:r>
-              <a:rPr lang="en-GB" dirty="0" err="1"/>
-              <a:t>benutzt</a:t>
-            </a:r>
-            <a:r>
-              <a:rPr lang="en-GB" dirty="0"/>
-              <a:t> </a:t>
-            </a:r>
-            <a:r>
-              <a:rPr lang="en-GB" dirty="0" err="1"/>
-              <a:t>andere</a:t>
-            </a:r>
-            <a:r>
-              <a:rPr lang="en-GB" dirty="0"/>
-              <a:t> </a:t>
-            </a:r>
-            <a:r>
-              <a:rPr lang="en-GB" dirty="0" err="1"/>
-              <a:t>Schreibweise</a:t>
-            </a:r>
-            <a:r>
-              <a:rPr lang="en-GB" dirty="0"/>
-              <a:t> und </a:t>
-            </a:r>
-            <a:r>
-              <a:rPr lang="en-GB" dirty="0" err="1"/>
-              <a:t>wäre</a:t>
-            </a:r>
-            <a:r>
-              <a:rPr lang="en-GB" dirty="0"/>
-              <a:t> </a:t>
-            </a:r>
-            <a:r>
-              <a:rPr lang="en-GB" dirty="0" err="1"/>
-              <a:t>somit</a:t>
-            </a:r>
-            <a:r>
-              <a:rPr lang="en-GB" dirty="0"/>
-              <a:t> </a:t>
-            </a:r>
-            <a:r>
-              <a:rPr lang="en-GB" dirty="0" err="1"/>
-              <a:t>nicht</a:t>
-            </a:r>
-            <a:r>
-              <a:rPr lang="en-GB" dirty="0"/>
-              <a:t> </a:t>
-            </a:r>
-            <a:r>
-              <a:rPr lang="en-GB" dirty="0" err="1"/>
-              <a:t>kompatibel</a:t>
-            </a:r>
-            <a:endParaRPr lang="en-GB" dirty="0"/>
-          </a:p>
-          <a:p>
-            <a:pPr marL="171450" indent="-171450">
-              <a:buFontTx/>
-              <a:buChar char="-"/>
-            </a:pPr>
-            <a:r>
-              <a:rPr lang="en-GB" dirty="0" err="1"/>
-              <a:t>Einige</a:t>
-            </a:r>
-            <a:r>
-              <a:rPr lang="en-GB" dirty="0"/>
-              <a:t> Android Klassen </a:t>
-            </a:r>
-            <a:r>
-              <a:rPr lang="en-GB" dirty="0" err="1"/>
-              <a:t>haben</a:t>
-            </a:r>
-            <a:r>
-              <a:rPr lang="en-GB" dirty="0"/>
-              <a:t> </a:t>
-            </a:r>
-            <a:r>
-              <a:rPr lang="en-GB" dirty="0" err="1"/>
-              <a:t>schon</a:t>
-            </a:r>
-            <a:r>
-              <a:rPr lang="en-GB" dirty="0"/>
-              <a:t> </a:t>
-            </a:r>
-            <a:r>
-              <a:rPr lang="en-GB" dirty="0" err="1"/>
-              <a:t>mehr</a:t>
-            </a:r>
-            <a:r>
-              <a:rPr lang="en-GB" dirty="0"/>
-              <a:t> </a:t>
-            </a:r>
-            <a:r>
-              <a:rPr lang="en-GB" dirty="0" err="1"/>
-              <a:t>als</a:t>
-            </a:r>
-            <a:r>
-              <a:rPr lang="en-GB" dirty="0"/>
-              <a:t> 5 </a:t>
-            </a:r>
-            <a:r>
-              <a:rPr lang="en-GB" dirty="0" err="1"/>
-              <a:t>Vererbungen</a:t>
-            </a:r>
-            <a:r>
-              <a:rPr lang="en-GB" dirty="0"/>
-              <a:t>.</a:t>
-            </a:r>
-          </a:p>
-          <a:p>
-            <a:pPr marL="0" indent="0">
-              <a:buFontTx/>
-              <a:buNone/>
-            </a:pPr>
-            <a:endParaRPr lang="en-GB" dirty="0"/>
-          </a:p>
-          <a:p>
-            <a:pPr marL="0" indent="0">
-              <a:buFontTx/>
-              <a:buNone/>
-            </a:pPr>
-            <a:r>
-              <a:rPr lang="en-GB" dirty="0"/>
-              <a:t>Monkey-Test</a:t>
-            </a:r>
-          </a:p>
-          <a:p>
-            <a:pPr marL="171450" indent="-171450">
-              <a:buFontTx/>
-              <a:buChar char="-"/>
-            </a:pPr>
-            <a:r>
-              <a:rPr lang="en-GB" dirty="0" err="1"/>
-              <a:t>Zum</a:t>
-            </a:r>
-            <a:r>
-              <a:rPr lang="en-GB" dirty="0"/>
-              <a:t> </a:t>
-            </a:r>
-            <a:r>
-              <a:rPr lang="en-GB" dirty="0" err="1"/>
-              <a:t>Testen</a:t>
-            </a:r>
-            <a:r>
-              <a:rPr lang="en-GB" dirty="0"/>
-              <a:t> der </a:t>
-            </a:r>
-            <a:r>
-              <a:rPr lang="en-GB" dirty="0" err="1"/>
-              <a:t>Stabilität</a:t>
-            </a:r>
-            <a:r>
-              <a:rPr lang="en-GB" dirty="0"/>
-              <a:t>. In ADB (Android Debugging Bridge) </a:t>
-            </a:r>
-            <a:r>
-              <a:rPr lang="en-GB" dirty="0" err="1"/>
-              <a:t>integriert</a:t>
-            </a:r>
-            <a:r>
-              <a:rPr lang="en-GB" dirty="0"/>
-              <a:t>.</a:t>
-            </a:r>
-          </a:p>
-          <a:p>
-            <a:pPr marL="171450" indent="-171450">
-              <a:buFontTx/>
-              <a:buChar char="-"/>
-            </a:pPr>
-            <a:r>
-              <a:rPr lang="en-GB" dirty="0" err="1"/>
-              <a:t>Macht</a:t>
-            </a:r>
-            <a:r>
-              <a:rPr lang="en-GB" dirty="0"/>
-              <a:t> pseudo Random </a:t>
-            </a:r>
-            <a:r>
-              <a:rPr lang="en-GB" dirty="0" err="1"/>
-              <a:t>Interaktionen</a:t>
-            </a:r>
-            <a:r>
-              <a:rPr lang="en-GB" dirty="0"/>
-              <a:t> </a:t>
-            </a:r>
-            <a:r>
-              <a:rPr lang="en-GB" dirty="0" err="1"/>
-              <a:t>mit</a:t>
-            </a:r>
-            <a:r>
-              <a:rPr lang="en-GB" dirty="0"/>
-              <a:t> </a:t>
-            </a:r>
-            <a:r>
-              <a:rPr lang="en-GB" dirty="0" err="1"/>
-              <a:t>dem</a:t>
-            </a:r>
-            <a:r>
-              <a:rPr lang="en-GB" dirty="0"/>
-              <a:t> Device. </a:t>
-            </a:r>
-            <a:r>
-              <a:rPr lang="en-GB" dirty="0" err="1"/>
-              <a:t>Guten</a:t>
-            </a:r>
-            <a:r>
-              <a:rPr lang="en-GB" dirty="0"/>
-              <a:t> Test </a:t>
-            </a:r>
-            <a:r>
-              <a:rPr lang="en-GB" dirty="0" err="1"/>
-              <a:t>für</a:t>
-            </a:r>
-            <a:r>
-              <a:rPr lang="en-GB" dirty="0"/>
-              <a:t> </a:t>
-            </a:r>
-            <a:r>
-              <a:rPr lang="en-GB" dirty="0" err="1"/>
-              <a:t>Stabilität</a:t>
-            </a:r>
-            <a:r>
-              <a:rPr lang="en-GB" dirty="0"/>
-              <a:t> der App</a:t>
-            </a:r>
+            <a:endParaRPr lang="de-CH" dirty="0"/>
           </a:p>
         </p:txBody>
       </p:sp>
@@ -3535,7 +3739,7 @@
           <a:p>
             <a:fld id="{748723F8-CD6B-45E3-B09A-75062809A4AE}" type="slidenum">
               <a:rPr lang="en-GB" smtClean="0"/>
-              <a:t>13</a:t>
+              <a:t>12</a:t>
             </a:fld>
             <a:endParaRPr lang="en-GB"/>
           </a:p>
@@ -3544,7 +3748,7 @@
     </p:spTree>
     <p:extLst>
       <p:ext uri="{BB962C8B-B14F-4D97-AF65-F5344CB8AC3E}">
-        <p14:creationId xmlns:p14="http://schemas.microsoft.com/office/powerpoint/2010/main" val="4250532794"/>
+        <p14:creationId xmlns:p14="http://schemas.microsoft.com/office/powerpoint/2010/main" val="3608739263"/>
       </p:ext>
     </p:extLst>
   </p:cSld>
@@ -6788,16 +6992,13 @@
           <a:p>
             <a:r>
               <a:rPr lang="en-GB" dirty="0"/>
-              <a:t>Code Coverage </a:t>
-            </a:r>
-            <a:r>
-              <a:rPr lang="en-GB" dirty="0">
-                <a:solidFill>
-                  <a:srgbClr val="FF0000"/>
-                </a:solidFill>
-              </a:rPr>
-              <a:t>about 30 %</a:t>
-            </a:r>
+              <a:t>Code Coverage (30% Line, 57% Class covered)</a:t>
+            </a:r>
+            <a:endParaRPr lang="en-GB" dirty="0">
+              <a:solidFill>
+                <a:srgbClr val="FF0000"/>
+              </a:solidFill>
+            </a:endParaRPr>
           </a:p>
           <a:p>
             <a:r>
@@ -6815,10 +7016,9 @@
           </a:p>
           <a:p>
             <a:r>
-              <a:rPr lang="en-GB"/>
+              <a:rPr lang="en-GB" dirty="0"/>
               <a:t>Monkey-Test</a:t>
             </a:r>
-            <a:endParaRPr lang="en-GB" dirty="0"/>
           </a:p>
         </p:txBody>
       </p:sp>
@@ -7708,7 +7908,7 @@
           <p:nvPr/>
         </p:nvPicPr>
         <p:blipFill rotWithShape="1">
-          <a:blip r:embed="rId2"/>
+          <a:blip r:embed="rId3"/>
           <a:srcRect l="7592" t="3888" r="6417" b="1945"/>
           <a:stretch/>
         </p:blipFill>

</xml_diff>

<commit_message>
Add Notes and assignment the pages to the presenters.
</commit_message>
<xml_diff>
--- a/Documents/Presentation/Presentation.pptx
+++ b/Documents/Presentation/Presentation.pptx
@@ -5,24 +5,22 @@
     <p:sldMasterId id="2147483660" r:id="rId1"/>
   </p:sldMasterIdLst>
   <p:notesMasterIdLst>
-    <p:notesMasterId r:id="rId17"/>
+    <p:notesMasterId r:id="rId15"/>
   </p:notesMasterIdLst>
   <p:sldIdLst>
     <p:sldId id="256" r:id="rId2"/>
     <p:sldId id="257" r:id="rId3"/>
     <p:sldId id="258" r:id="rId4"/>
-    <p:sldId id="260" r:id="rId5"/>
-    <p:sldId id="261" r:id="rId6"/>
-    <p:sldId id="262" r:id="rId7"/>
-    <p:sldId id="263" r:id="rId8"/>
-    <p:sldId id="273" r:id="rId9"/>
-    <p:sldId id="268" r:id="rId10"/>
-    <p:sldId id="264" r:id="rId11"/>
-    <p:sldId id="265" r:id="rId12"/>
-    <p:sldId id="269" r:id="rId13"/>
-    <p:sldId id="270" r:id="rId14"/>
-    <p:sldId id="272" r:id="rId15"/>
-    <p:sldId id="266" r:id="rId16"/>
+    <p:sldId id="261" r:id="rId5"/>
+    <p:sldId id="262" r:id="rId6"/>
+    <p:sldId id="263" r:id="rId7"/>
+    <p:sldId id="268" r:id="rId8"/>
+    <p:sldId id="264" r:id="rId9"/>
+    <p:sldId id="265" r:id="rId10"/>
+    <p:sldId id="269" r:id="rId11"/>
+    <p:sldId id="270" r:id="rId12"/>
+    <p:sldId id="272" r:id="rId13"/>
+    <p:sldId id="266" r:id="rId14"/>
   </p:sldIdLst>
   <p:sldSz cx="9144000" cy="6858000" type="screen4x3"/>
   <p:notesSz cx="6858000" cy="9144000"/>
@@ -528,6 +526,15 @@
           <a:lstStyle/>
           <a:p>
             <a:r>
+              <a:rPr lang="en-GB" dirty="0"/>
+              <a:t>Artan:</a:t>
+            </a:r>
+          </a:p>
+          <a:p>
+            <a:endParaRPr lang="en-GB" dirty="0"/>
+          </a:p>
+          <a:p>
+            <a:r>
               <a:rPr lang="en-GB" dirty="0" err="1"/>
               <a:t>Einleitung</a:t>
             </a:r>
@@ -737,6 +744,15 @@
           <a:p>
             <a:r>
               <a:rPr lang="en-GB" dirty="0"/>
+              <a:t>Christian:</a:t>
+            </a:r>
+          </a:p>
+          <a:p>
+            <a:endParaRPr lang="en-GB" dirty="0"/>
+          </a:p>
+          <a:p>
+            <a:r>
+              <a:rPr lang="en-GB" dirty="0"/>
               <a:t>JUnit Test</a:t>
             </a:r>
           </a:p>
@@ -1265,7 +1281,7 @@
           <a:p>
             <a:fld id="{748723F8-CD6B-45E3-B09A-75062809A4AE}" type="slidenum">
               <a:rPr lang="en-GB" smtClean="0"/>
-              <a:t>13</a:t>
+              <a:t>11</a:t>
             </a:fld>
             <a:endParaRPr lang="en-GB"/>
           </a:p>
@@ -1330,6 +1346,15 @@
           <a:p>
             <a:r>
               <a:rPr lang="en-GB" dirty="0"/>
+              <a:t>Artan:</a:t>
+            </a:r>
+          </a:p>
+          <a:p>
+            <a:endParaRPr lang="en-GB" dirty="0"/>
+          </a:p>
+          <a:p>
+            <a:r>
+              <a:rPr lang="en-GB" dirty="0"/>
               <a:t>Demo. Script </a:t>
             </a:r>
             <a:r>
@@ -1368,7 +1393,7 @@
           <a:p>
             <a:fld id="{748723F8-CD6B-45E3-B09A-75062809A4AE}" type="slidenum">
               <a:rPr lang="en-GB" smtClean="0"/>
-              <a:t>14</a:t>
+              <a:t>12</a:t>
             </a:fld>
             <a:endParaRPr lang="en-GB"/>
           </a:p>
@@ -1432,6 +1457,15 @@
           <a:lstStyle/>
           <a:p>
             <a:r>
+              <a:rPr lang="en-GB" dirty="0"/>
+              <a:t>Artan:</a:t>
+            </a:r>
+          </a:p>
+          <a:p>
+            <a:endParaRPr lang="en-GB" dirty="0"/>
+          </a:p>
+          <a:p>
+            <a:r>
               <a:rPr lang="en-GB" dirty="0" err="1"/>
               <a:t>Zusammenfassung</a:t>
             </a:r>
@@ -1505,10 +1539,13 @@
               <a:t> </a:t>
             </a:r>
             <a:r>
-              <a:rPr lang="en-GB"/>
-              <a:t>kennengelernt.</a:t>
-            </a:r>
-            <a:endParaRPr lang="en-GB" dirty="0"/>
+              <a:rPr lang="en-GB" dirty="0" err="1"/>
+              <a:t>kennengelernt</a:t>
+            </a:r>
+            <a:r>
+              <a:rPr lang="en-GB" dirty="0"/>
+              <a:t>.</a:t>
+            </a:r>
           </a:p>
           <a:p>
             <a:pPr marL="171450" indent="-171450">
@@ -1756,6 +1793,14 @@
             <a:r>
               <a:rPr lang="en-GB" dirty="0" err="1"/>
               <a:t>einfügen</a:t>
+            </a:r>
+            <a:r>
+              <a:rPr lang="en-GB" dirty="0"/>
+              <a:t> /</a:t>
+            </a:r>
+            <a:r>
+              <a:rPr lang="en-GB" dirty="0" err="1"/>
+              <a:t>Kombinationen</a:t>
             </a:r>
             <a:endParaRPr lang="en-GB" dirty="0"/>
           </a:p>
@@ -1828,7 +1873,7 @@
           <a:p>
             <a:fld id="{748723F8-CD6B-45E3-B09A-75062809A4AE}" type="slidenum">
               <a:rPr lang="en-GB" smtClean="0"/>
-              <a:t>15</a:t>
+              <a:t>13</a:t>
             </a:fld>
             <a:endParaRPr lang="en-GB"/>
           </a:p>
@@ -1893,6 +1938,15 @@
           <a:p>
             <a:r>
               <a:rPr lang="de-CH" dirty="0"/>
+              <a:t>Artan:</a:t>
+            </a:r>
+          </a:p>
+          <a:p>
+            <a:endParaRPr lang="de-CH" dirty="0"/>
+          </a:p>
+          <a:p>
+            <a:r>
+              <a:rPr lang="de-CH" dirty="0"/>
               <a:t>Motivation: 	Value </a:t>
             </a:r>
             <a:r>
@@ -2012,6 +2066,15 @@
           <a:p>
             <a:r>
               <a:rPr lang="en-GB" dirty="0"/>
+              <a:t>Martin:</a:t>
+            </a:r>
+          </a:p>
+          <a:p>
+            <a:endParaRPr lang="en-GB" dirty="0"/>
+          </a:p>
+          <a:p>
+            <a:r>
+              <a:rPr lang="en-GB" dirty="0"/>
               <a:t>Grosse Ski </a:t>
             </a:r>
             <a:r>
@@ -2425,7 +2488,7 @@
           <a:p>
             <a:fld id="{748723F8-CD6B-45E3-B09A-75062809A4AE}" type="slidenum">
               <a:rPr lang="en-GB" smtClean="0"/>
-              <a:t>5</a:t>
+              <a:t>4</a:t>
             </a:fld>
             <a:endParaRPr lang="en-GB"/>
           </a:p>
@@ -2488,6 +2551,12 @@
           <a:bodyPr/>
           <a:lstStyle/>
           <a:p>
+            <a:r>
+              <a:rPr lang="de-CH" noProof="0" dirty="0"/>
+              <a:t>Artan:</a:t>
+            </a:r>
+          </a:p>
+          <a:p>
             <a:endParaRPr lang="de-CH" noProof="0" dirty="0"/>
           </a:p>
           <a:p>
@@ -2565,7 +2634,7 @@
           <a:p>
             <a:fld id="{748723F8-CD6B-45E3-B09A-75062809A4AE}" type="slidenum">
               <a:rPr lang="en-GB" smtClean="0"/>
-              <a:t>6</a:t>
+              <a:t>5</a:t>
             </a:fld>
             <a:endParaRPr lang="en-GB"/>
           </a:p>
@@ -2630,8 +2699,72 @@
           <a:p>
             <a:r>
               <a:rPr lang="de-CH" dirty="0"/>
+              <a:t>Martin:</a:t>
+            </a:r>
+          </a:p>
+          <a:p>
+            <a:endParaRPr lang="de-CH" dirty="0"/>
+          </a:p>
+          <a:p>
+            <a:r>
+              <a:rPr lang="de-CH" dirty="0"/>
               <a:t>Architektur des PROJEKTS. Dazu gehören auch Wetter/Ski-APIs, Server Programm und App.</a:t>
             </a:r>
+          </a:p>
+          <a:p>
+            <a:endParaRPr lang="de-CH" dirty="0"/>
+          </a:p>
+          <a:p>
+            <a:r>
+              <a:rPr lang="de-CH" dirty="0"/>
+              <a:t>Use ski-resort </a:t>
+            </a:r>
+            <a:r>
+              <a:rPr lang="de-CH" dirty="0" err="1"/>
+              <a:t>information</a:t>
+            </a:r>
+            <a:endParaRPr lang="de-CH" dirty="0"/>
+          </a:p>
+          <a:p>
+            <a:r>
+              <a:rPr lang="de-CH" dirty="0"/>
+              <a:t>Use </a:t>
+            </a:r>
+            <a:r>
+              <a:rPr lang="de-CH" dirty="0" err="1"/>
+              <a:t>weather</a:t>
+            </a:r>
+            <a:r>
+              <a:rPr lang="de-CH" dirty="0"/>
+              <a:t> </a:t>
+            </a:r>
+            <a:r>
+              <a:rPr lang="de-CH" dirty="0" err="1"/>
+              <a:t>information</a:t>
+            </a:r>
+            <a:endParaRPr lang="de-CH" dirty="0"/>
+          </a:p>
+          <a:p>
+            <a:r>
+              <a:rPr lang="de-CH" dirty="0"/>
+              <a:t>Put </a:t>
+            </a:r>
+            <a:r>
+              <a:rPr lang="de-CH" dirty="0" err="1"/>
+              <a:t>them</a:t>
+            </a:r>
+            <a:r>
+              <a:rPr lang="de-CH" dirty="0"/>
+              <a:t> </a:t>
+            </a:r>
+            <a:r>
+              <a:rPr lang="de-CH" dirty="0" err="1"/>
+              <a:t>together</a:t>
+            </a:r>
+            <a:endParaRPr lang="de-CH" dirty="0"/>
+          </a:p>
+          <a:p>
+            <a:endParaRPr lang="de-CH" dirty="0"/>
           </a:p>
         </p:txBody>
       </p:sp>
@@ -2652,7 +2785,7 @@
           <a:p>
             <a:fld id="{748723F8-CD6B-45E3-B09A-75062809A4AE}" type="slidenum">
               <a:rPr lang="en-GB" smtClean="0"/>
-              <a:t>7</a:t>
+              <a:t>6</a:t>
             </a:fld>
             <a:endParaRPr lang="en-GB"/>
           </a:p>
@@ -2717,6 +2850,15 @@
           <a:p>
             <a:r>
               <a:rPr lang="de-CH" dirty="0"/>
+              <a:t>Martin: </a:t>
+            </a:r>
+          </a:p>
+          <a:p>
+            <a:endParaRPr lang="de-CH" dirty="0"/>
+          </a:p>
+          <a:p>
+            <a:r>
+              <a:rPr lang="de-CH" dirty="0"/>
               <a:t>Datenstruktur wird von API vorgegeben -&gt; </a:t>
             </a:r>
             <a:r>
@@ -2763,7 +2905,7 @@
           <a:p>
             <a:fld id="{748723F8-CD6B-45E3-B09A-75062809A4AE}" type="slidenum">
               <a:rPr lang="en-GB" smtClean="0"/>
-              <a:t>9</a:t>
+              <a:t>7</a:t>
             </a:fld>
             <a:endParaRPr lang="en-GB"/>
           </a:p>
@@ -2844,28 +2986,8 @@
               <a:defRPr/>
             </a:pPr>
             <a:r>
-              <a:rPr lang="de-CH" dirty="0" err="1"/>
-              <a:t>Scrum</a:t>
-            </a:r>
-            <a:r>
               <a:rPr lang="de-CH" dirty="0"/>
-              <a:t>: Leicht abgeänderte Variante, wöchentliche Sprints, </a:t>
-            </a:r>
-            <a:r>
-              <a:rPr lang="de-CH" dirty="0" err="1"/>
-              <a:t>daily</a:t>
-            </a:r>
-            <a:r>
-              <a:rPr lang="de-CH" dirty="0"/>
-              <a:t> </a:t>
-            </a:r>
-            <a:r>
-              <a:rPr lang="de-CH" dirty="0" err="1"/>
-              <a:t>meeting</a:t>
-            </a:r>
-            <a:r>
-              <a:rPr lang="de-CH" dirty="0"/>
-              <a:t> etwa alle 2-3 Tage (WE und Mi/Do)</a:t>
+              <a:t>Martin:</a:t>
             </a:r>
           </a:p>
           <a:p>
@@ -2886,14 +3008,7 @@
               <a:tabLst/>
               <a:defRPr/>
             </a:pPr>
-            <a:r>
-              <a:rPr lang="de-CH" dirty="0" err="1"/>
-              <a:t>GeoFire</a:t>
-            </a:r>
-            <a:r>
-              <a:rPr lang="de-CH" dirty="0"/>
-              <a:t>: Wie nach Distanzsortieren -&gt; Druckwellenmässig (Performance)</a:t>
-            </a:r>
+            <a:endParaRPr lang="de-CH" dirty="0"/>
           </a:p>
           <a:p>
             <a:pPr marL="0" marR="0" lvl="0" indent="0" algn="l" defTabSz="914400" rtl="0" eaLnBrk="1" fontAlgn="auto" latinLnBrk="0" hangingPunct="1">
@@ -2915,7 +3030,15 @@
             </a:pPr>
             <a:r>
               <a:rPr lang="de-CH" dirty="0" err="1"/>
-              <a:t>Sorting</a:t>
+              <a:t>Scrum</a:t>
+            </a:r>
+            <a:r>
+              <a:rPr lang="de-CH" dirty="0"/>
+              <a:t>: Leicht abgeänderte Variante, wöchentliche Sprints, </a:t>
+            </a:r>
+            <a:r>
+              <a:rPr lang="de-CH" dirty="0" err="1"/>
+              <a:t>daily</a:t>
             </a:r>
             <a:r>
               <a:rPr lang="de-CH" dirty="0"/>
@@ -2923,27 +3046,11 @@
             </a:r>
             <a:r>
               <a:rPr lang="de-CH" dirty="0" err="1"/>
-              <a:t>of</a:t>
+              <a:t>meeting</a:t>
             </a:r>
             <a:r>
               <a:rPr lang="de-CH" dirty="0"/>
-              <a:t> </a:t>
-            </a:r>
-            <a:r>
-              <a:rPr lang="de-CH" dirty="0" err="1"/>
-              <a:t>list</a:t>
-            </a:r>
-            <a:r>
-              <a:rPr lang="de-CH" dirty="0"/>
-              <a:t>: Mit </a:t>
-            </a:r>
-            <a:r>
-              <a:rPr lang="de-CH" dirty="0" err="1"/>
-              <a:t>Comperatoren</a:t>
-            </a:r>
-            <a:r>
-              <a:rPr lang="de-CH" dirty="0"/>
-              <a:t>, teilweise eigene Logik was wie gewichtet wird</a:t>
+              <a:t> etwa alle 2-3 Tage (WE und Mi/Do)</a:t>
             </a:r>
           </a:p>
           <a:p>
@@ -2966,6 +3073,84 @@
             </a:pPr>
             <a:r>
               <a:rPr lang="de-CH" dirty="0" err="1"/>
+              <a:t>GeoFire</a:t>
+            </a:r>
+            <a:r>
+              <a:rPr lang="de-CH" dirty="0"/>
+              <a:t>: Wie nach Distanzsortieren -&gt; Druckwellenmässig (Performance)</a:t>
+            </a:r>
+          </a:p>
+          <a:p>
+            <a:pPr marL="0" marR="0" lvl="0" indent="0" algn="l" defTabSz="914400" rtl="0" eaLnBrk="1" fontAlgn="auto" latinLnBrk="0" hangingPunct="1">
+              <a:lnSpc>
+                <a:spcPct val="100000"/>
+              </a:lnSpc>
+              <a:spcBef>
+                <a:spcPts val="0"/>
+              </a:spcBef>
+              <a:spcAft>
+                <a:spcPts val="0"/>
+              </a:spcAft>
+              <a:buClrTx/>
+              <a:buSzTx/>
+              <a:buFontTx/>
+              <a:buNone/>
+              <a:tabLst/>
+              <a:defRPr/>
+            </a:pPr>
+            <a:r>
+              <a:rPr lang="de-CH" dirty="0" err="1"/>
+              <a:t>Sorting</a:t>
+            </a:r>
+            <a:r>
+              <a:rPr lang="de-CH" dirty="0"/>
+              <a:t> </a:t>
+            </a:r>
+            <a:r>
+              <a:rPr lang="de-CH" dirty="0" err="1"/>
+              <a:t>of</a:t>
+            </a:r>
+            <a:r>
+              <a:rPr lang="de-CH" dirty="0"/>
+              <a:t> </a:t>
+            </a:r>
+            <a:r>
+              <a:rPr lang="de-CH" dirty="0" err="1"/>
+              <a:t>list</a:t>
+            </a:r>
+            <a:r>
+              <a:rPr lang="de-CH" dirty="0"/>
+              <a:t>: Mit </a:t>
+            </a:r>
+            <a:r>
+              <a:rPr lang="de-CH" dirty="0" err="1"/>
+              <a:t>Comperatoren</a:t>
+            </a:r>
+            <a:r>
+              <a:rPr lang="de-CH" dirty="0"/>
+              <a:t>, teilweise eigene Logik was wie gewichtet wird</a:t>
+            </a:r>
+          </a:p>
+          <a:p>
+            <a:pPr marL="0" marR="0" lvl="0" indent="0" algn="l" defTabSz="914400" rtl="0" eaLnBrk="1" fontAlgn="auto" latinLnBrk="0" hangingPunct="1">
+              <a:lnSpc>
+                <a:spcPct val="100000"/>
+              </a:lnSpc>
+              <a:spcBef>
+                <a:spcPts val="0"/>
+              </a:spcBef>
+              <a:spcAft>
+                <a:spcPts val="0"/>
+              </a:spcAft>
+              <a:buClrTx/>
+              <a:buSzTx/>
+              <a:buFontTx/>
+              <a:buNone/>
+              <a:tabLst/>
+              <a:defRPr/>
+            </a:pPr>
+            <a:r>
+              <a:rPr lang="de-CH" dirty="0" err="1"/>
               <a:t>Weather</a:t>
             </a:r>
             <a:r>
@@ -3013,7 +3198,7 @@
           <a:p>
             <a:fld id="{748723F8-CD6B-45E3-B09A-75062809A4AE}" type="slidenum">
               <a:rPr lang="en-GB" smtClean="0"/>
-              <a:t>10</a:t>
+              <a:t>8</a:t>
             </a:fld>
             <a:endParaRPr lang="en-GB"/>
           </a:p>
@@ -3078,6 +3263,15 @@
           <a:p>
             <a:r>
               <a:rPr lang="en-GB" dirty="0"/>
+              <a:t>Christian: </a:t>
+            </a:r>
+          </a:p>
+          <a:p>
+            <a:endParaRPr lang="en-GB" dirty="0"/>
+          </a:p>
+          <a:p>
+            <a:r>
+              <a:rPr lang="en-GB" dirty="0"/>
               <a:t>JUnit Test</a:t>
             </a:r>
           </a:p>
@@ -3246,6 +3440,123 @@
             </a:r>
           </a:p>
           <a:p>
+            <a:pPr marL="0" indent="0">
+              <a:buFontTx/>
+              <a:buNone/>
+            </a:pPr>
+            <a:endParaRPr lang="en-GB" dirty="0"/>
+          </a:p>
+          <a:p>
+            <a:pPr marL="0" indent="0">
+              <a:buFontTx/>
+              <a:buNone/>
+            </a:pPr>
+            <a:r>
+              <a:rPr lang="en-GB" dirty="0"/>
+              <a:t>Monkey-Test</a:t>
+            </a:r>
+          </a:p>
+          <a:p>
+            <a:pPr marL="171450" indent="-171450">
+              <a:buFontTx/>
+              <a:buChar char="-"/>
+            </a:pPr>
+            <a:r>
+              <a:rPr lang="en-GB" dirty="0" err="1"/>
+              <a:t>Zum</a:t>
+            </a:r>
+            <a:r>
+              <a:rPr lang="en-GB" dirty="0"/>
+              <a:t> </a:t>
+            </a:r>
+            <a:r>
+              <a:rPr lang="en-GB" dirty="0" err="1"/>
+              <a:t>Testen</a:t>
+            </a:r>
+            <a:r>
+              <a:rPr lang="en-GB" dirty="0"/>
+              <a:t> der </a:t>
+            </a:r>
+            <a:r>
+              <a:rPr lang="en-GB" dirty="0" err="1"/>
+              <a:t>Stabilität</a:t>
+            </a:r>
+            <a:r>
+              <a:rPr lang="en-GB" dirty="0"/>
+              <a:t>. In ADB (Android Debugging Bridge) </a:t>
+            </a:r>
+            <a:r>
+              <a:rPr lang="en-GB" dirty="0" err="1"/>
+              <a:t>integriert</a:t>
+            </a:r>
+            <a:r>
+              <a:rPr lang="en-GB" dirty="0"/>
+              <a:t>.</a:t>
+            </a:r>
+          </a:p>
+          <a:p>
+            <a:pPr marL="171450" indent="-171450">
+              <a:buFontTx/>
+              <a:buChar char="-"/>
+            </a:pPr>
+            <a:r>
+              <a:rPr lang="en-GB" dirty="0" err="1"/>
+              <a:t>Macht</a:t>
+            </a:r>
+            <a:r>
+              <a:rPr lang="en-GB" dirty="0"/>
+              <a:t> pseudo Random </a:t>
+            </a:r>
+            <a:r>
+              <a:rPr lang="en-GB" dirty="0" err="1"/>
+              <a:t>Interaktionen</a:t>
+            </a:r>
+            <a:r>
+              <a:rPr lang="en-GB" dirty="0"/>
+              <a:t> </a:t>
+            </a:r>
+            <a:r>
+              <a:rPr lang="en-GB" dirty="0" err="1"/>
+              <a:t>mit</a:t>
+            </a:r>
+            <a:r>
+              <a:rPr lang="en-GB" dirty="0"/>
+              <a:t> </a:t>
+            </a:r>
+            <a:r>
+              <a:rPr lang="en-GB" dirty="0" err="1"/>
+              <a:t>dem</a:t>
+            </a:r>
+            <a:r>
+              <a:rPr lang="en-GB" dirty="0"/>
+              <a:t> Device. </a:t>
+            </a:r>
+            <a:r>
+              <a:rPr lang="en-GB" dirty="0" err="1"/>
+              <a:t>Guten</a:t>
+            </a:r>
+            <a:r>
+              <a:rPr lang="en-GB" dirty="0"/>
+              <a:t> Test </a:t>
+            </a:r>
+            <a:r>
+              <a:rPr lang="en-GB" dirty="0" err="1"/>
+              <a:t>für</a:t>
+            </a:r>
+            <a:r>
+              <a:rPr lang="en-GB" dirty="0"/>
+              <a:t> </a:t>
+            </a:r>
+            <a:r>
+              <a:rPr lang="en-GB" dirty="0" err="1"/>
+              <a:t>Stabilität</a:t>
+            </a:r>
+            <a:r>
+              <a:rPr lang="en-GB" dirty="0"/>
+              <a:t> der App</a:t>
+            </a:r>
+          </a:p>
+          <a:p>
             <a:pPr marL="171450" indent="-171450">
               <a:buFontTx/>
               <a:buChar char="-"/>
@@ -3259,374 +3570,7 @@
             </a:pPr>
             <a:r>
               <a:rPr lang="en-GB" dirty="0"/>
-              <a:t>Sonar </a:t>
-            </a:r>
-            <a:r>
-              <a:rPr lang="en-GB" dirty="0" err="1"/>
-              <a:t>Qube</a:t>
-            </a:r>
-            <a:r>
-              <a:rPr lang="en-GB" dirty="0"/>
-              <a:t>:</a:t>
-            </a:r>
-          </a:p>
-          <a:p>
-            <a:pPr marL="0" indent="0">
-              <a:buFont typeface="Arial" panose="020B0604020202020204" pitchFamily="34" charset="0"/>
-              <a:buNone/>
-            </a:pPr>
-            <a:r>
-              <a:rPr lang="en-GB" dirty="0"/>
-              <a:t>- </a:t>
-            </a:r>
-            <a:r>
-              <a:rPr lang="en-GB" dirty="0" err="1"/>
-              <a:t>Nächste</a:t>
-            </a:r>
-            <a:r>
-              <a:rPr lang="en-GB" dirty="0"/>
-              <a:t> </a:t>
-            </a:r>
-            <a:r>
-              <a:rPr lang="en-GB" dirty="0" err="1"/>
-              <a:t>Folie</a:t>
-            </a:r>
-            <a:endParaRPr lang="en-GB" dirty="0"/>
-          </a:p>
-          <a:p>
-            <a:pPr marL="171450" indent="-171450">
-              <a:buFontTx/>
-              <a:buChar char="-"/>
-            </a:pPr>
-            <a:r>
-              <a:rPr lang="en-GB" dirty="0" err="1"/>
-              <a:t>Einige</a:t>
-            </a:r>
-            <a:r>
-              <a:rPr lang="en-GB" dirty="0"/>
-              <a:t> </a:t>
-            </a:r>
-            <a:r>
-              <a:rPr lang="en-GB" dirty="0" err="1"/>
-              <a:t>Punkte</a:t>
-            </a:r>
-            <a:r>
-              <a:rPr lang="en-GB" dirty="0"/>
-              <a:t> </a:t>
-            </a:r>
-            <a:r>
-              <a:rPr lang="en-GB" dirty="0" err="1"/>
-              <a:t>können</a:t>
-            </a:r>
-            <a:r>
-              <a:rPr lang="en-GB" dirty="0"/>
-              <a:t> </a:t>
-            </a:r>
-            <a:r>
-              <a:rPr lang="en-GB" dirty="0" err="1"/>
-              <a:t>nicht</a:t>
-            </a:r>
-            <a:r>
-              <a:rPr lang="en-GB" dirty="0"/>
-              <a:t> </a:t>
-            </a:r>
-            <a:r>
-              <a:rPr lang="en-GB" dirty="0" err="1"/>
-              <a:t>gefixt</a:t>
-            </a:r>
-            <a:r>
-              <a:rPr lang="en-GB" dirty="0"/>
-              <a:t> </a:t>
-            </a:r>
-            <a:r>
-              <a:rPr lang="en-GB" dirty="0" err="1"/>
-              <a:t>werden</a:t>
-            </a:r>
-            <a:endParaRPr lang="en-GB" dirty="0"/>
-          </a:p>
-          <a:p>
-            <a:pPr marL="171450" indent="-171450">
-              <a:buFontTx/>
-              <a:buChar char="-"/>
-            </a:pPr>
-            <a:r>
-              <a:rPr lang="en-GB" dirty="0" err="1"/>
-              <a:t>Bsp</a:t>
-            </a:r>
-            <a:r>
-              <a:rPr lang="en-GB" dirty="0"/>
-              <a:t>: </a:t>
-            </a:r>
-            <a:r>
-              <a:rPr lang="en-GB" dirty="0" err="1"/>
-              <a:t>Enum</a:t>
-            </a:r>
-            <a:r>
-              <a:rPr lang="en-GB" dirty="0"/>
-              <a:t> </a:t>
-            </a:r>
-            <a:r>
-              <a:rPr lang="en-GB" dirty="0" err="1"/>
-              <a:t>müssen</a:t>
-            </a:r>
-            <a:r>
-              <a:rPr lang="en-GB" dirty="0"/>
-              <a:t> Gross </a:t>
-            </a:r>
-            <a:r>
-              <a:rPr lang="en-GB" dirty="0" err="1"/>
-              <a:t>geschreiben</a:t>
-            </a:r>
-            <a:r>
-              <a:rPr lang="en-GB" dirty="0"/>
-              <a:t> </a:t>
-            </a:r>
-            <a:r>
-              <a:rPr lang="en-GB" dirty="0" err="1"/>
-              <a:t>werden</a:t>
-            </a:r>
-            <a:r>
-              <a:rPr lang="en-GB" dirty="0"/>
-              <a:t>, </a:t>
-            </a:r>
-            <a:r>
-              <a:rPr lang="en-GB" dirty="0" err="1"/>
-              <a:t>jedoch</a:t>
-            </a:r>
-            <a:r>
-              <a:rPr lang="en-GB" dirty="0"/>
-              <a:t> die API </a:t>
-            </a:r>
-            <a:r>
-              <a:rPr lang="en-GB" dirty="0" err="1"/>
-              <a:t>benutzt</a:t>
-            </a:r>
-            <a:r>
-              <a:rPr lang="en-GB" dirty="0"/>
-              <a:t> </a:t>
-            </a:r>
-            <a:r>
-              <a:rPr lang="en-GB" dirty="0" err="1"/>
-              <a:t>andere</a:t>
-            </a:r>
-            <a:r>
-              <a:rPr lang="en-GB" dirty="0"/>
-              <a:t> </a:t>
-            </a:r>
-            <a:r>
-              <a:rPr lang="en-GB" dirty="0" err="1"/>
-              <a:t>Schreibweise</a:t>
-            </a:r>
-            <a:r>
-              <a:rPr lang="en-GB" dirty="0"/>
-              <a:t> und </a:t>
-            </a:r>
-            <a:r>
-              <a:rPr lang="en-GB" dirty="0" err="1"/>
-              <a:t>wäre</a:t>
-            </a:r>
-            <a:r>
-              <a:rPr lang="en-GB" dirty="0"/>
-              <a:t> </a:t>
-            </a:r>
-            <a:r>
-              <a:rPr lang="en-GB" dirty="0" err="1"/>
-              <a:t>somit</a:t>
-            </a:r>
-            <a:r>
-              <a:rPr lang="en-GB" dirty="0"/>
-              <a:t> </a:t>
-            </a:r>
-            <a:r>
-              <a:rPr lang="en-GB" dirty="0" err="1"/>
-              <a:t>nicht</a:t>
-            </a:r>
-            <a:r>
-              <a:rPr lang="en-GB" dirty="0"/>
-              <a:t> </a:t>
-            </a:r>
-            <a:r>
-              <a:rPr lang="en-GB" dirty="0" err="1"/>
-              <a:t>kompatibel</a:t>
-            </a:r>
-            <a:endParaRPr lang="en-GB" dirty="0"/>
-          </a:p>
-          <a:p>
-            <a:pPr marL="171450" indent="-171450">
-              <a:buFontTx/>
-              <a:buChar char="-"/>
-            </a:pPr>
-            <a:r>
-              <a:rPr lang="en-GB" dirty="0" err="1"/>
-              <a:t>Einige</a:t>
-            </a:r>
-            <a:r>
-              <a:rPr lang="en-GB" dirty="0"/>
-              <a:t> Android Klassen </a:t>
-            </a:r>
-            <a:r>
-              <a:rPr lang="en-GB" dirty="0" err="1"/>
-              <a:t>haben</a:t>
-            </a:r>
-            <a:r>
-              <a:rPr lang="en-GB" dirty="0"/>
-              <a:t> </a:t>
-            </a:r>
-            <a:r>
-              <a:rPr lang="en-GB" dirty="0" err="1"/>
-              <a:t>schon</a:t>
-            </a:r>
-            <a:r>
-              <a:rPr lang="en-GB" dirty="0"/>
-              <a:t> </a:t>
-            </a:r>
-            <a:r>
-              <a:rPr lang="en-GB" dirty="0" err="1"/>
-              <a:t>mehr</a:t>
-            </a:r>
-            <a:r>
-              <a:rPr lang="en-GB" dirty="0"/>
-              <a:t> </a:t>
-            </a:r>
-            <a:r>
-              <a:rPr lang="en-GB" dirty="0" err="1"/>
-              <a:t>als</a:t>
-            </a:r>
-            <a:r>
-              <a:rPr lang="en-GB" dirty="0"/>
-              <a:t> 5 </a:t>
-            </a:r>
-            <a:r>
-              <a:rPr lang="en-GB" dirty="0" err="1"/>
-              <a:t>Vererbungen</a:t>
-            </a:r>
-            <a:r>
-              <a:rPr lang="en-GB" dirty="0"/>
-              <a:t>.</a:t>
-            </a:r>
-          </a:p>
-          <a:p>
-            <a:pPr marL="0" indent="0">
-              <a:buFont typeface="Arial" panose="020B0604020202020204" pitchFamily="34" charset="0"/>
-              <a:buNone/>
-            </a:pPr>
-            <a:endParaRPr lang="en-GB" dirty="0"/>
-          </a:p>
-          <a:p>
-            <a:pPr marL="0" indent="0">
-              <a:buFontTx/>
-              <a:buNone/>
-            </a:pPr>
-            <a:endParaRPr lang="en-GB" dirty="0"/>
-          </a:p>
-          <a:p>
-            <a:pPr marL="0" indent="0">
-              <a:buFontTx/>
-              <a:buNone/>
-            </a:pPr>
-            <a:r>
-              <a:rPr lang="en-GB" dirty="0"/>
-              <a:t>Monkey-Test</a:t>
-            </a:r>
-          </a:p>
-          <a:p>
-            <a:pPr marL="171450" indent="-171450">
-              <a:buFontTx/>
-              <a:buChar char="-"/>
-            </a:pPr>
-            <a:r>
-              <a:rPr lang="en-GB" dirty="0" err="1"/>
-              <a:t>Zum</a:t>
-            </a:r>
-            <a:r>
-              <a:rPr lang="en-GB" dirty="0"/>
-              <a:t> </a:t>
-            </a:r>
-            <a:r>
-              <a:rPr lang="en-GB" dirty="0" err="1"/>
-              <a:t>Testen</a:t>
-            </a:r>
-            <a:r>
-              <a:rPr lang="en-GB" dirty="0"/>
-              <a:t> der </a:t>
-            </a:r>
-            <a:r>
-              <a:rPr lang="en-GB" dirty="0" err="1"/>
-              <a:t>Stabilität</a:t>
-            </a:r>
-            <a:r>
-              <a:rPr lang="en-GB" dirty="0"/>
-              <a:t>. In ADB (Android Debugging Bridge) </a:t>
-            </a:r>
-            <a:r>
-              <a:rPr lang="en-GB" dirty="0" err="1"/>
-              <a:t>integriert</a:t>
-            </a:r>
-            <a:r>
-              <a:rPr lang="en-GB" dirty="0"/>
-              <a:t>.</a:t>
-            </a:r>
-          </a:p>
-          <a:p>
-            <a:pPr marL="171450" indent="-171450">
-              <a:buFontTx/>
-              <a:buChar char="-"/>
-            </a:pPr>
-            <a:r>
-              <a:rPr lang="en-GB" dirty="0" err="1"/>
-              <a:t>Macht</a:t>
-            </a:r>
-            <a:r>
-              <a:rPr lang="en-GB" dirty="0"/>
-              <a:t> pseudo Random </a:t>
-            </a:r>
-            <a:r>
-              <a:rPr lang="en-GB" dirty="0" err="1"/>
-              <a:t>Interaktionen</a:t>
-            </a:r>
-            <a:r>
-              <a:rPr lang="en-GB" dirty="0"/>
-              <a:t> </a:t>
-            </a:r>
-            <a:r>
-              <a:rPr lang="en-GB" dirty="0" err="1"/>
-              <a:t>mit</a:t>
-            </a:r>
-            <a:r>
-              <a:rPr lang="en-GB" dirty="0"/>
-              <a:t> </a:t>
-            </a:r>
-            <a:r>
-              <a:rPr lang="en-GB" dirty="0" err="1"/>
-              <a:t>dem</a:t>
-            </a:r>
-            <a:r>
-              <a:rPr lang="en-GB" dirty="0"/>
-              <a:t> Device. </a:t>
-            </a:r>
-            <a:r>
-              <a:rPr lang="en-GB" dirty="0" err="1"/>
-              <a:t>Guten</a:t>
-            </a:r>
-            <a:r>
-              <a:rPr lang="en-GB" dirty="0"/>
-              <a:t> Test </a:t>
-            </a:r>
-            <a:r>
-              <a:rPr lang="en-GB" dirty="0" err="1"/>
-              <a:t>für</a:t>
-            </a:r>
-            <a:r>
-              <a:rPr lang="en-GB" dirty="0"/>
-              <a:t> </a:t>
-            </a:r>
-            <a:r>
-              <a:rPr lang="en-GB" dirty="0" err="1"/>
-              <a:t>Stabilität</a:t>
-            </a:r>
-            <a:r>
-              <a:rPr lang="en-GB" dirty="0"/>
-              <a:t> der App</a:t>
+              <a:t>Usability</a:t>
             </a:r>
           </a:p>
         </p:txBody>
@@ -3648,7 +3592,7 @@
           <a:p>
             <a:fld id="{748723F8-CD6B-45E3-B09A-75062809A4AE}" type="slidenum">
               <a:rPr lang="en-GB" smtClean="0"/>
-              <a:t>11</a:t>
+              <a:t>9</a:t>
             </a:fld>
             <a:endParaRPr lang="en-GB"/>
           </a:p>
@@ -3715,7 +3659,247 @@
               <a:buFontTx/>
               <a:buNone/>
             </a:pPr>
+            <a:r>
+              <a:rPr lang="en-GB" dirty="0"/>
+              <a:t>Christian:</a:t>
+            </a:r>
+          </a:p>
+          <a:p>
+            <a:pPr marL="0" indent="0">
+              <a:buFontTx/>
+              <a:buNone/>
+            </a:pPr>
             <a:endParaRPr lang="en-GB" dirty="0"/>
+          </a:p>
+          <a:p>
+            <a:pPr marL="0" indent="0">
+              <a:buFontTx/>
+              <a:buNone/>
+            </a:pPr>
+            <a:r>
+              <a:rPr lang="en-GB" dirty="0"/>
+              <a:t>Sonar </a:t>
+            </a:r>
+            <a:r>
+              <a:rPr lang="en-GB" dirty="0" err="1"/>
+              <a:t>Qube</a:t>
+            </a:r>
+            <a:r>
+              <a:rPr lang="en-GB" dirty="0"/>
+              <a:t>:</a:t>
+            </a:r>
+          </a:p>
+          <a:p>
+            <a:pPr marL="171450" indent="-171450">
+              <a:buFontTx/>
+              <a:buChar char="-"/>
+            </a:pPr>
+            <a:r>
+              <a:rPr lang="en-GB" dirty="0" err="1"/>
+              <a:t>Einige</a:t>
+            </a:r>
+            <a:r>
+              <a:rPr lang="en-GB" dirty="0"/>
+              <a:t> </a:t>
+            </a:r>
+            <a:r>
+              <a:rPr lang="en-GB" dirty="0" err="1"/>
+              <a:t>Punkte</a:t>
+            </a:r>
+            <a:r>
+              <a:rPr lang="en-GB" dirty="0"/>
+              <a:t> </a:t>
+            </a:r>
+            <a:r>
+              <a:rPr lang="en-GB" dirty="0" err="1"/>
+              <a:t>können</a:t>
+            </a:r>
+            <a:r>
+              <a:rPr lang="en-GB" dirty="0"/>
+              <a:t> </a:t>
+            </a:r>
+            <a:r>
+              <a:rPr lang="en-GB" dirty="0" err="1"/>
+              <a:t>nicht</a:t>
+            </a:r>
+            <a:r>
+              <a:rPr lang="en-GB" dirty="0"/>
+              <a:t> </a:t>
+            </a:r>
+            <a:r>
+              <a:rPr lang="en-GB" dirty="0" err="1"/>
+              <a:t>gefixt</a:t>
+            </a:r>
+            <a:r>
+              <a:rPr lang="en-GB" dirty="0"/>
+              <a:t> </a:t>
+            </a:r>
+            <a:r>
+              <a:rPr lang="en-GB" dirty="0" err="1"/>
+              <a:t>werden</a:t>
+            </a:r>
+            <a:endParaRPr lang="en-GB" dirty="0"/>
+          </a:p>
+          <a:p>
+            <a:pPr marL="171450" indent="-171450">
+              <a:buFontTx/>
+              <a:buChar char="-"/>
+            </a:pPr>
+            <a:r>
+              <a:rPr lang="en-GB" dirty="0" err="1"/>
+              <a:t>Bsp</a:t>
+            </a:r>
+            <a:r>
+              <a:rPr lang="en-GB" dirty="0"/>
+              <a:t>: </a:t>
+            </a:r>
+            <a:r>
+              <a:rPr lang="en-GB" dirty="0" err="1"/>
+              <a:t>Enum</a:t>
+            </a:r>
+            <a:r>
+              <a:rPr lang="en-GB" dirty="0"/>
+              <a:t> </a:t>
+            </a:r>
+            <a:r>
+              <a:rPr lang="en-GB" dirty="0" err="1"/>
+              <a:t>müssen</a:t>
+            </a:r>
+            <a:r>
+              <a:rPr lang="en-GB" dirty="0"/>
+              <a:t> Gross </a:t>
+            </a:r>
+            <a:r>
+              <a:rPr lang="en-GB" dirty="0" err="1"/>
+              <a:t>geschreiben</a:t>
+            </a:r>
+            <a:r>
+              <a:rPr lang="en-GB" dirty="0"/>
+              <a:t> </a:t>
+            </a:r>
+            <a:r>
+              <a:rPr lang="en-GB" dirty="0" err="1"/>
+              <a:t>werden</a:t>
+            </a:r>
+            <a:r>
+              <a:rPr lang="en-GB" dirty="0"/>
+              <a:t>, </a:t>
+            </a:r>
+            <a:r>
+              <a:rPr lang="en-GB" dirty="0" err="1"/>
+              <a:t>jedoch</a:t>
+            </a:r>
+            <a:r>
+              <a:rPr lang="en-GB" dirty="0"/>
+              <a:t> die API </a:t>
+            </a:r>
+            <a:r>
+              <a:rPr lang="en-GB" dirty="0" err="1"/>
+              <a:t>benutzt</a:t>
+            </a:r>
+            <a:r>
+              <a:rPr lang="en-GB" dirty="0"/>
+              <a:t> </a:t>
+            </a:r>
+            <a:r>
+              <a:rPr lang="en-GB" dirty="0" err="1"/>
+              <a:t>andere</a:t>
+            </a:r>
+            <a:r>
+              <a:rPr lang="en-GB" dirty="0"/>
+              <a:t> </a:t>
+            </a:r>
+            <a:r>
+              <a:rPr lang="en-GB" dirty="0" err="1"/>
+              <a:t>Schreibweise</a:t>
+            </a:r>
+            <a:r>
+              <a:rPr lang="en-GB" dirty="0"/>
+              <a:t> und </a:t>
+            </a:r>
+            <a:r>
+              <a:rPr lang="en-GB" dirty="0" err="1"/>
+              <a:t>wäre</a:t>
+            </a:r>
+            <a:r>
+              <a:rPr lang="en-GB" dirty="0"/>
+              <a:t> </a:t>
+            </a:r>
+            <a:r>
+              <a:rPr lang="en-GB" dirty="0" err="1"/>
+              <a:t>somit</a:t>
+            </a:r>
+            <a:r>
+              <a:rPr lang="en-GB" dirty="0"/>
+              <a:t> </a:t>
+            </a:r>
+            <a:r>
+              <a:rPr lang="en-GB" dirty="0" err="1"/>
+              <a:t>nicht</a:t>
+            </a:r>
+            <a:r>
+              <a:rPr lang="en-GB" dirty="0"/>
+              <a:t> </a:t>
+            </a:r>
+            <a:r>
+              <a:rPr lang="en-GB" dirty="0" err="1"/>
+              <a:t>kompatibel</a:t>
+            </a:r>
+            <a:endParaRPr lang="en-GB" dirty="0"/>
+          </a:p>
+          <a:p>
+            <a:pPr marL="171450" indent="-171450">
+              <a:buFontTx/>
+              <a:buChar char="-"/>
+            </a:pPr>
+            <a:r>
+              <a:rPr lang="en-GB" dirty="0" err="1"/>
+              <a:t>Einige</a:t>
+            </a:r>
+            <a:r>
+              <a:rPr lang="en-GB" dirty="0"/>
+              <a:t> Android Klassen </a:t>
+            </a:r>
+            <a:r>
+              <a:rPr lang="en-GB" dirty="0" err="1"/>
+              <a:t>haben</a:t>
+            </a:r>
+            <a:r>
+              <a:rPr lang="en-GB" dirty="0"/>
+              <a:t> </a:t>
+            </a:r>
+            <a:r>
+              <a:rPr lang="en-GB" dirty="0" err="1"/>
+              <a:t>schon</a:t>
+            </a:r>
+            <a:r>
+              <a:rPr lang="en-GB" dirty="0"/>
+              <a:t> </a:t>
+            </a:r>
+            <a:r>
+              <a:rPr lang="en-GB" dirty="0" err="1"/>
+              <a:t>mehr</a:t>
+            </a:r>
+            <a:r>
+              <a:rPr lang="en-GB" dirty="0"/>
+              <a:t> </a:t>
+            </a:r>
+            <a:r>
+              <a:rPr lang="en-GB" dirty="0" err="1"/>
+              <a:t>als</a:t>
+            </a:r>
+            <a:r>
+              <a:rPr lang="en-GB" dirty="0"/>
+              <a:t> 5 </a:t>
+            </a:r>
+            <a:r>
+              <a:rPr lang="en-GB" dirty="0" err="1"/>
+              <a:t>Vererbungen</a:t>
+            </a:r>
+            <a:r>
+              <a:rPr lang="en-GB" dirty="0"/>
+              <a:t>.</a:t>
+            </a:r>
           </a:p>
           <a:p>
             <a:endParaRPr lang="de-CH" dirty="0"/>
@@ -3739,7 +3923,7 @@
           <a:p>
             <a:fld id="{748723F8-CD6B-45E3-B09A-75062809A4AE}" type="slidenum">
               <a:rPr lang="en-GB" smtClean="0"/>
-              <a:t>12</a:t>
+              <a:t>10</a:t>
             </a:fld>
             <a:endParaRPr lang="en-GB"/>
           </a:p>
@@ -6835,228 +7019,6 @@
           <p:cNvPr id="2" name="Titel 1">
             <a:extLst>
               <a:ext uri="{FF2B5EF4-FFF2-40B4-BE49-F238E27FC236}">
-                <a16:creationId xmlns:a16="http://schemas.microsoft.com/office/drawing/2014/main" id="{A1320CD9-07C0-41F5-9031-90292C9BA40C}"/>
-              </a:ext>
-            </a:extLst>
-          </p:cNvPr>
-          <p:cNvSpPr>
-            <a:spLocks noGrp="1"/>
-          </p:cNvSpPr>
-          <p:nvPr>
-            <p:ph type="title"/>
-          </p:nvPr>
-        </p:nvSpPr>
-        <p:spPr/>
-        <p:txBody>
-          <a:bodyPr/>
-          <a:lstStyle/>
-          <a:p>
-            <a:r>
-              <a:rPr lang="en-GB" dirty="0"/>
-              <a:t>Implementation</a:t>
-            </a:r>
-          </a:p>
-        </p:txBody>
-      </p:sp>
-      <p:sp>
-        <p:nvSpPr>
-          <p:cNvPr id="3" name="Inhaltsplatzhalter 2">
-            <a:extLst>
-              <a:ext uri="{FF2B5EF4-FFF2-40B4-BE49-F238E27FC236}">
-                <a16:creationId xmlns:a16="http://schemas.microsoft.com/office/drawing/2014/main" id="{DEEE9B27-06A7-469E-B9E8-72D4FDF1E1F1}"/>
-              </a:ext>
-            </a:extLst>
-          </p:cNvPr>
-          <p:cNvSpPr>
-            <a:spLocks noGrp="1"/>
-          </p:cNvSpPr>
-          <p:nvPr>
-            <p:ph idx="1"/>
-          </p:nvPr>
-        </p:nvSpPr>
-        <p:spPr/>
-        <p:txBody>
-          <a:bodyPr/>
-          <a:lstStyle/>
-          <a:p>
-            <a:r>
-              <a:rPr lang="en-GB" dirty="0"/>
-              <a:t>Scrum</a:t>
-            </a:r>
-          </a:p>
-          <a:p>
-            <a:r>
-              <a:rPr lang="en-GB" dirty="0" err="1"/>
-              <a:t>GeoFire</a:t>
-            </a:r>
-            <a:endParaRPr lang="en-GB" dirty="0"/>
-          </a:p>
-          <a:p>
-            <a:r>
-              <a:rPr lang="en-GB" dirty="0"/>
-              <a:t>Sorting of list</a:t>
-            </a:r>
-          </a:p>
-          <a:p>
-            <a:r>
-              <a:rPr lang="en-GB" dirty="0"/>
-              <a:t>Weather icons</a:t>
-            </a:r>
-          </a:p>
-        </p:txBody>
-      </p:sp>
-    </p:spTree>
-    <p:extLst>
-      <p:ext uri="{BB962C8B-B14F-4D97-AF65-F5344CB8AC3E}">
-        <p14:creationId xmlns:p14="http://schemas.microsoft.com/office/powerpoint/2010/main" val="1313387902"/>
-      </p:ext>
-    </p:extLst>
-  </p:cSld>
-  <p:clrMapOvr>
-    <a:masterClrMapping/>
-  </p:clrMapOvr>
-</p:sld>
-</file>
-
-<file path=ppt/slides/slide11.xml><?xml version="1.0" encoding="utf-8"?>
-<p:sld xmlns:a="http://schemas.openxmlformats.org/drawingml/2006/main" xmlns:r="http://schemas.openxmlformats.org/officeDocument/2006/relationships" xmlns:p="http://schemas.openxmlformats.org/presentationml/2006/main">
-  <p:cSld>
-    <p:spTree>
-      <p:nvGrpSpPr>
-        <p:cNvPr id="1" name=""/>
-        <p:cNvGrpSpPr/>
-        <p:nvPr/>
-      </p:nvGrpSpPr>
-      <p:grpSpPr>
-        <a:xfrm>
-          <a:off x="0" y="0"/>
-          <a:ext cx="0" cy="0"/>
-          <a:chOff x="0" y="0"/>
-          <a:chExt cx="0" cy="0"/>
-        </a:xfrm>
-      </p:grpSpPr>
-      <p:sp>
-        <p:nvSpPr>
-          <p:cNvPr id="2" name="Titel 1">
-            <a:extLst>
-              <a:ext uri="{FF2B5EF4-FFF2-40B4-BE49-F238E27FC236}">
-                <a16:creationId xmlns:a16="http://schemas.microsoft.com/office/drawing/2014/main" id="{F5CDFFE4-D353-4E85-BC81-E89F9305F6A4}"/>
-              </a:ext>
-            </a:extLst>
-          </p:cNvPr>
-          <p:cNvSpPr>
-            <a:spLocks noGrp="1"/>
-          </p:cNvSpPr>
-          <p:nvPr>
-            <p:ph type="title"/>
-          </p:nvPr>
-        </p:nvSpPr>
-        <p:spPr/>
-        <p:txBody>
-          <a:bodyPr/>
-          <a:lstStyle/>
-          <a:p>
-            <a:r>
-              <a:rPr lang="en-GB" dirty="0"/>
-              <a:t>Evaluation / Testing</a:t>
-            </a:r>
-          </a:p>
-        </p:txBody>
-      </p:sp>
-      <p:sp>
-        <p:nvSpPr>
-          <p:cNvPr id="3" name="Inhaltsplatzhalter 2">
-            <a:extLst>
-              <a:ext uri="{FF2B5EF4-FFF2-40B4-BE49-F238E27FC236}">
-                <a16:creationId xmlns:a16="http://schemas.microsoft.com/office/drawing/2014/main" id="{86043A25-7E8D-4E6F-B9D9-CE9DBDAF2DC8}"/>
-              </a:ext>
-            </a:extLst>
-          </p:cNvPr>
-          <p:cNvSpPr>
-            <a:spLocks noGrp="1"/>
-          </p:cNvSpPr>
-          <p:nvPr>
-            <p:ph idx="1"/>
-          </p:nvPr>
-        </p:nvSpPr>
-        <p:spPr/>
-        <p:txBody>
-          <a:bodyPr/>
-          <a:lstStyle/>
-          <a:p>
-            <a:r>
-              <a:rPr lang="en-GB" dirty="0"/>
-              <a:t>JUnit Test</a:t>
-            </a:r>
-          </a:p>
-          <a:p>
-            <a:r>
-              <a:rPr lang="en-GB" dirty="0"/>
-              <a:t>Code Coverage (30% Line, 57% Class covered)</a:t>
-            </a:r>
-            <a:endParaRPr lang="en-GB" dirty="0">
-              <a:solidFill>
-                <a:srgbClr val="FF0000"/>
-              </a:solidFill>
-            </a:endParaRPr>
-          </a:p>
-          <a:p>
-            <a:r>
-              <a:rPr lang="en-GB" dirty="0" err="1"/>
-              <a:t>SonarQube</a:t>
-            </a:r>
-            <a:endParaRPr lang="en-GB" dirty="0"/>
-          </a:p>
-          <a:p>
-            <a:pPr lvl="1"/>
-            <a:r>
-              <a:rPr lang="en-GB" dirty="0"/>
-              <a:t>Some points can not be fixed</a:t>
-            </a:r>
-          </a:p>
-          <a:p>
-            <a:r>
-              <a:rPr lang="en-GB" dirty="0"/>
-              <a:t>Monkey-Test</a:t>
-            </a:r>
-          </a:p>
-        </p:txBody>
-      </p:sp>
-    </p:spTree>
-    <p:extLst>
-      <p:ext uri="{BB962C8B-B14F-4D97-AF65-F5344CB8AC3E}">
-        <p14:creationId xmlns:p14="http://schemas.microsoft.com/office/powerpoint/2010/main" val="1742385124"/>
-      </p:ext>
-    </p:extLst>
-  </p:cSld>
-  <p:clrMapOvr>
-    <a:masterClrMapping/>
-  </p:clrMapOvr>
-</p:sld>
-</file>
-
-<file path=ppt/slides/slide12.xml><?xml version="1.0" encoding="utf-8"?>
-<p:sld xmlns:a="http://schemas.openxmlformats.org/drawingml/2006/main" xmlns:r="http://schemas.openxmlformats.org/officeDocument/2006/relationships" xmlns:p="http://schemas.openxmlformats.org/presentationml/2006/main">
-  <p:cSld>
-    <p:spTree>
-      <p:nvGrpSpPr>
-        <p:cNvPr id="1" name=""/>
-        <p:cNvGrpSpPr/>
-        <p:nvPr/>
-      </p:nvGrpSpPr>
-      <p:grpSpPr>
-        <a:xfrm>
-          <a:off x="0" y="0"/>
-          <a:ext cx="0" cy="0"/>
-          <a:chOff x="0" y="0"/>
-          <a:chExt cx="0" cy="0"/>
-        </a:xfrm>
-      </p:grpSpPr>
-      <p:sp>
-        <p:nvSpPr>
-          <p:cNvPr id="2" name="Titel 1">
-            <a:extLst>
-              <a:ext uri="{FF2B5EF4-FFF2-40B4-BE49-F238E27FC236}">
                 <a16:creationId xmlns:a16="http://schemas.microsoft.com/office/drawing/2014/main" id="{F8AB2688-54C4-48E2-BFE5-B1741F4CF621}"/>
               </a:ext>
             </a:extLst>
@@ -7439,7 +7401,7 @@
 </p:sld>
 </file>
 
-<file path=ppt/slides/slide13.xml><?xml version="1.0" encoding="utf-8"?>
+<file path=ppt/slides/slide11.xml><?xml version="1.0" encoding="utf-8"?>
 <p:sld xmlns:a="http://schemas.openxmlformats.org/drawingml/2006/main" xmlns:r="http://schemas.openxmlformats.org/officeDocument/2006/relationships" xmlns:p="http://schemas.openxmlformats.org/presentationml/2006/main">
   <p:cSld>
     <p:spTree>
@@ -7573,7 +7535,7 @@
 </p:sld>
 </file>
 
-<file path=ppt/slides/slide14.xml><?xml version="1.0" encoding="utf-8"?>
+<file path=ppt/slides/slide12.xml><?xml version="1.0" encoding="utf-8"?>
 <p:sld xmlns:a="http://schemas.openxmlformats.org/drawingml/2006/main" xmlns:r="http://schemas.openxmlformats.org/officeDocument/2006/relationships" xmlns:p="http://schemas.openxmlformats.org/presentationml/2006/main">
   <p:cSld>
     <p:spTree>
@@ -7631,7 +7593,7 @@
 </p:sld>
 </file>
 
-<file path=ppt/slides/slide15.xml><?xml version="1.0" encoding="utf-8"?>
+<file path=ppt/slides/slide13.xml><?xml version="1.0" encoding="utf-8"?>
 <p:sld xmlns:a="http://schemas.openxmlformats.org/drawingml/2006/main" xmlns:r="http://schemas.openxmlformats.org/officeDocument/2006/relationships" xmlns:p="http://schemas.openxmlformats.org/presentationml/2006/main">
   <p:cSld>
     <p:spTree>
@@ -7798,7 +7760,7 @@
         </p:spPr>
         <p:txBody>
           <a:bodyPr>
-            <a:normAutofit lnSpcReduction="10000"/>
+            <a:normAutofit/>
           </a:bodyPr>
           <a:lstStyle/>
           <a:p>
@@ -7809,16 +7771,6 @@
             <a:r>
               <a:rPr lang="en-GB" dirty="0"/>
               <a:t>Introduction</a:t>
-            </a:r>
-          </a:p>
-          <a:p>
-            <a:pPr>
-              <a:buFontTx/>
-              <a:buChar char="-"/>
-            </a:pPr>
-            <a:r>
-              <a:rPr lang="en-GB" dirty="0"/>
-              <a:t>Background</a:t>
             </a:r>
           </a:p>
           <a:p>
@@ -8141,138 +8093,6 @@
 </file>
 
 <file path=ppt/slides/slide4.xml><?xml version="1.0" encoding="utf-8"?>
-<p:sld xmlns:a="http://schemas.openxmlformats.org/drawingml/2006/main" xmlns:r="http://schemas.openxmlformats.org/officeDocument/2006/relationships" xmlns:p="http://schemas.openxmlformats.org/presentationml/2006/main">
-  <p:cSld>
-    <p:spTree>
-      <p:nvGrpSpPr>
-        <p:cNvPr id="1" name=""/>
-        <p:cNvGrpSpPr/>
-        <p:nvPr/>
-      </p:nvGrpSpPr>
-      <p:grpSpPr>
-        <a:xfrm>
-          <a:off x="0" y="0"/>
-          <a:ext cx="0" cy="0"/>
-          <a:chOff x="0" y="0"/>
-          <a:chExt cx="0" cy="0"/>
-        </a:xfrm>
-      </p:grpSpPr>
-      <p:sp>
-        <p:nvSpPr>
-          <p:cNvPr id="2" name="Titel 1">
-            <a:extLst>
-              <a:ext uri="{FF2B5EF4-FFF2-40B4-BE49-F238E27FC236}">
-                <a16:creationId xmlns:a16="http://schemas.microsoft.com/office/drawing/2014/main" id="{C904DA1B-0C42-4228-9F13-CDA815BD8764}"/>
-              </a:ext>
-            </a:extLst>
-          </p:cNvPr>
-          <p:cNvSpPr>
-            <a:spLocks noGrp="1"/>
-          </p:cNvSpPr>
-          <p:nvPr>
-            <p:ph type="title"/>
-          </p:nvPr>
-        </p:nvSpPr>
-        <p:spPr/>
-        <p:txBody>
-          <a:bodyPr/>
-          <a:lstStyle/>
-          <a:p>
-            <a:r>
-              <a:rPr lang="de-CH" dirty="0"/>
-              <a:t>Background</a:t>
-            </a:r>
-          </a:p>
-        </p:txBody>
-      </p:sp>
-      <p:sp>
-        <p:nvSpPr>
-          <p:cNvPr id="3" name="Inhaltsplatzhalter 2">
-            <a:extLst>
-              <a:ext uri="{FF2B5EF4-FFF2-40B4-BE49-F238E27FC236}">
-                <a16:creationId xmlns:a16="http://schemas.microsoft.com/office/drawing/2014/main" id="{4B7A4F98-D95B-4E5A-9326-E99269241A12}"/>
-              </a:ext>
-            </a:extLst>
-          </p:cNvPr>
-          <p:cNvSpPr>
-            <a:spLocks noGrp="1"/>
-          </p:cNvSpPr>
-          <p:nvPr>
-            <p:ph idx="1"/>
-          </p:nvPr>
-        </p:nvSpPr>
-        <p:spPr/>
-        <p:txBody>
-          <a:bodyPr/>
-          <a:lstStyle/>
-          <a:p>
-            <a:r>
-              <a:rPr lang="de-CH" dirty="0"/>
-              <a:t>Use ski-resort </a:t>
-            </a:r>
-            <a:r>
-              <a:rPr lang="de-CH" dirty="0" err="1"/>
-              <a:t>information</a:t>
-            </a:r>
-            <a:endParaRPr lang="de-CH" dirty="0"/>
-          </a:p>
-          <a:p>
-            <a:r>
-              <a:rPr lang="de-CH" dirty="0"/>
-              <a:t>Use </a:t>
-            </a:r>
-            <a:r>
-              <a:rPr lang="de-CH" dirty="0" err="1"/>
-              <a:t>weather</a:t>
-            </a:r>
-            <a:r>
-              <a:rPr lang="de-CH" dirty="0"/>
-              <a:t> </a:t>
-            </a:r>
-            <a:r>
-              <a:rPr lang="de-CH" dirty="0" err="1"/>
-              <a:t>information</a:t>
-            </a:r>
-            <a:endParaRPr lang="de-CH" dirty="0"/>
-          </a:p>
-          <a:p>
-            <a:r>
-              <a:rPr lang="de-CH" dirty="0"/>
-              <a:t>Put </a:t>
-            </a:r>
-            <a:r>
-              <a:rPr lang="de-CH" dirty="0" err="1"/>
-              <a:t>them</a:t>
-            </a:r>
-            <a:r>
-              <a:rPr lang="de-CH" dirty="0"/>
-              <a:t> </a:t>
-            </a:r>
-            <a:r>
-              <a:rPr lang="de-CH" dirty="0" err="1"/>
-              <a:t>together</a:t>
-            </a:r>
-            <a:endParaRPr lang="de-CH" dirty="0"/>
-          </a:p>
-          <a:p>
-            <a:endParaRPr lang="de-CH" dirty="0"/>
-          </a:p>
-        </p:txBody>
-      </p:sp>
-    </p:spTree>
-    <p:extLst>
-      <p:ext uri="{BB962C8B-B14F-4D97-AF65-F5344CB8AC3E}">
-        <p14:creationId xmlns:p14="http://schemas.microsoft.com/office/powerpoint/2010/main" val="2854133854"/>
-      </p:ext>
-    </p:extLst>
-  </p:cSld>
-  <p:clrMapOvr>
-    <a:masterClrMapping/>
-  </p:clrMapOvr>
-</p:sld>
-</file>
-
-<file path=ppt/slides/slide5.xml><?xml version="1.0" encoding="utf-8"?>
 <p:sld xmlns:a="http://schemas.openxmlformats.org/drawingml/2006/main" xmlns:r="http://schemas.openxmlformats.org/officeDocument/2006/relationships" xmlns:p="http://schemas.openxmlformats.org/presentationml/2006/main">
   <p:cSld>
     <p:spTree>
@@ -8970,7 +8790,7 @@
 </p:sld>
 </file>
 
-<file path=ppt/slides/slide6.xml><?xml version="1.0" encoding="utf-8"?>
+<file path=ppt/slides/slide5.xml><?xml version="1.0" encoding="utf-8"?>
 <p:sld xmlns:a="http://schemas.openxmlformats.org/drawingml/2006/main" xmlns:r="http://schemas.openxmlformats.org/officeDocument/2006/relationships" xmlns:p="http://schemas.openxmlformats.org/presentationml/2006/main">
   <p:cSld>
     <p:spTree>
@@ -10071,7 +9891,7 @@
 </p:sld>
 </file>
 
-<file path=ppt/slides/slide7.xml><?xml version="1.0" encoding="utf-8"?>
+<file path=ppt/slides/slide6.xml><?xml version="1.0" encoding="utf-8"?>
 <p:sld xmlns:a="http://schemas.openxmlformats.org/drawingml/2006/main" xmlns:r="http://schemas.openxmlformats.org/officeDocument/2006/relationships" xmlns:p="http://schemas.openxmlformats.org/presentationml/2006/main">
   <p:cSld>
     <p:spTree>
@@ -10596,149 +10416,7 @@
 </p:sld>
 </file>
 
-<file path=ppt/slides/slide8.xml><?xml version="1.0" encoding="utf-8"?>
-<p:sld xmlns:a="http://schemas.openxmlformats.org/drawingml/2006/main" xmlns:r="http://schemas.openxmlformats.org/officeDocument/2006/relationships" xmlns:p="http://schemas.openxmlformats.org/presentationml/2006/main">
-  <p:cSld>
-    <p:spTree>
-      <p:nvGrpSpPr>
-        <p:cNvPr id="1" name=""/>
-        <p:cNvGrpSpPr/>
-        <p:nvPr/>
-      </p:nvGrpSpPr>
-      <p:grpSpPr>
-        <a:xfrm>
-          <a:off x="0" y="0"/>
-          <a:ext cx="0" cy="0"/>
-          <a:chOff x="0" y="0"/>
-          <a:chExt cx="0" cy="0"/>
-        </a:xfrm>
-      </p:grpSpPr>
-      <p:sp>
-        <p:nvSpPr>
-          <p:cNvPr id="2" name="Titel 1">
-            <a:extLst>
-              <a:ext uri="{FF2B5EF4-FFF2-40B4-BE49-F238E27FC236}">
-                <a16:creationId xmlns:a16="http://schemas.microsoft.com/office/drawing/2014/main" id="{D42BECB1-603C-4C8D-AF46-DCB65E17E822}"/>
-              </a:ext>
-            </a:extLst>
-          </p:cNvPr>
-          <p:cNvSpPr>
-            <a:spLocks noGrp="1"/>
-          </p:cNvSpPr>
-          <p:nvPr>
-            <p:ph type="title"/>
-          </p:nvPr>
-        </p:nvSpPr>
-        <p:spPr/>
-        <p:txBody>
-          <a:bodyPr/>
-          <a:lstStyle/>
-          <a:p>
-            <a:r>
-              <a:rPr lang="de-CH" dirty="0"/>
-              <a:t>Architecture</a:t>
-            </a:r>
-          </a:p>
-        </p:txBody>
-      </p:sp>
-      <p:sp>
-        <p:nvSpPr>
-          <p:cNvPr id="3" name="Inhaltsplatzhalter 2">
-            <a:extLst>
-              <a:ext uri="{FF2B5EF4-FFF2-40B4-BE49-F238E27FC236}">
-                <a16:creationId xmlns:a16="http://schemas.microsoft.com/office/drawing/2014/main" id="{05385E87-267D-4C56-A83F-5CCB60F560C9}"/>
-              </a:ext>
-            </a:extLst>
-          </p:cNvPr>
-          <p:cNvSpPr>
-            <a:spLocks noGrp="1"/>
-          </p:cNvSpPr>
-          <p:nvPr>
-            <p:ph idx="1"/>
-          </p:nvPr>
-        </p:nvSpPr>
-        <p:spPr/>
-        <p:txBody>
-          <a:bodyPr/>
-          <a:lstStyle/>
-          <a:p>
-            <a:r>
-              <a:rPr lang="de-CH" dirty="0">
-                <a:solidFill>
-                  <a:srgbClr val="FF0000"/>
-                </a:solidFill>
-              </a:rPr>
-              <a:t>Zeigen wie App grob aufgebaut ist</a:t>
-            </a:r>
-          </a:p>
-          <a:p>
-            <a:r>
-              <a:rPr lang="de-CH" dirty="0">
-                <a:solidFill>
-                  <a:srgbClr val="FF0000"/>
-                </a:solidFill>
-              </a:rPr>
-              <a:t>(</a:t>
-            </a:r>
-            <a:r>
-              <a:rPr lang="de-CH" dirty="0" err="1">
-                <a:solidFill>
-                  <a:srgbClr val="FF0000"/>
-                </a:solidFill>
-              </a:rPr>
-              <a:t>Activitys</a:t>
-            </a:r>
-            <a:r>
-              <a:rPr lang="de-CH" dirty="0">
-                <a:solidFill>
-                  <a:srgbClr val="FF0000"/>
-                </a:solidFill>
-              </a:rPr>
-              <a:t> -&gt; Liste mit </a:t>
-            </a:r>
-            <a:r>
-              <a:rPr lang="de-CH" dirty="0" err="1">
-                <a:solidFill>
-                  <a:srgbClr val="FF0000"/>
-                </a:solidFill>
-              </a:rPr>
-              <a:t>SkiResort</a:t>
-            </a:r>
-            <a:r>
-              <a:rPr lang="de-CH" dirty="0">
-                <a:solidFill>
-                  <a:srgbClr val="FF0000"/>
-                </a:solidFill>
-              </a:rPr>
-              <a:t> Datenstruktur -&gt; Detailansicht)</a:t>
-            </a:r>
-          </a:p>
-          <a:p>
-            <a:r>
-              <a:rPr lang="de-CH" dirty="0">
-                <a:solidFill>
-                  <a:srgbClr val="FF0000"/>
-                </a:solidFill>
-              </a:rPr>
-              <a:t>Oder ganz weglassen -&gt; keine Info über App-Architektur ?!</a:t>
-            </a:r>
-          </a:p>
-        </p:txBody>
-      </p:sp>
-    </p:spTree>
-    <p:extLst>
-      <p:ext uri="{BB962C8B-B14F-4D97-AF65-F5344CB8AC3E}">
-        <p14:creationId xmlns:p14="http://schemas.microsoft.com/office/powerpoint/2010/main" val="3271009814"/>
-      </p:ext>
-    </p:extLst>
-  </p:cSld>
-  <p:clrMapOvr>
-    <a:masterClrMapping/>
-  </p:clrMapOvr>
-</p:sld>
-</file>
-
-<file path=ppt/slides/slide9.xml><?xml version="1.0" encoding="utf-8"?>
+<file path=ppt/slides/slide7.xml><?xml version="1.0" encoding="utf-8"?>
 <p:sld xmlns:a="http://schemas.openxmlformats.org/drawingml/2006/main" xmlns:r="http://schemas.openxmlformats.org/officeDocument/2006/relationships" xmlns:p="http://schemas.openxmlformats.org/presentationml/2006/main">
   <p:cSld>
     <p:spTree>
@@ -12926,6 +12604,262 @@
 </p:sld>
 </file>
 
+<file path=ppt/slides/slide8.xml><?xml version="1.0" encoding="utf-8"?>
+<p:sld xmlns:a="http://schemas.openxmlformats.org/drawingml/2006/main" xmlns:r="http://schemas.openxmlformats.org/officeDocument/2006/relationships" xmlns:p="http://schemas.openxmlformats.org/presentationml/2006/main">
+  <p:cSld>
+    <p:spTree>
+      <p:nvGrpSpPr>
+        <p:cNvPr id="1" name=""/>
+        <p:cNvGrpSpPr/>
+        <p:nvPr/>
+      </p:nvGrpSpPr>
+      <p:grpSpPr>
+        <a:xfrm>
+          <a:off x="0" y="0"/>
+          <a:ext cx="0" cy="0"/>
+          <a:chOff x="0" y="0"/>
+          <a:chExt cx="0" cy="0"/>
+        </a:xfrm>
+      </p:grpSpPr>
+      <p:sp>
+        <p:nvSpPr>
+          <p:cNvPr id="2" name="Titel 1">
+            <a:extLst>
+              <a:ext uri="{FF2B5EF4-FFF2-40B4-BE49-F238E27FC236}">
+                <a16:creationId xmlns:a16="http://schemas.microsoft.com/office/drawing/2014/main" id="{A1320CD9-07C0-41F5-9031-90292C9BA40C}"/>
+              </a:ext>
+            </a:extLst>
+          </p:cNvPr>
+          <p:cNvSpPr>
+            <a:spLocks noGrp="1"/>
+          </p:cNvSpPr>
+          <p:nvPr>
+            <p:ph type="title"/>
+          </p:nvPr>
+        </p:nvSpPr>
+        <p:spPr/>
+        <p:txBody>
+          <a:bodyPr/>
+          <a:lstStyle/>
+          <a:p>
+            <a:r>
+              <a:rPr lang="en-GB" dirty="0"/>
+              <a:t>Implementation</a:t>
+            </a:r>
+          </a:p>
+        </p:txBody>
+      </p:sp>
+      <p:sp>
+        <p:nvSpPr>
+          <p:cNvPr id="3" name="Inhaltsplatzhalter 2">
+            <a:extLst>
+              <a:ext uri="{FF2B5EF4-FFF2-40B4-BE49-F238E27FC236}">
+                <a16:creationId xmlns:a16="http://schemas.microsoft.com/office/drawing/2014/main" id="{DEEE9B27-06A7-469E-B9E8-72D4FDF1E1F1}"/>
+              </a:ext>
+            </a:extLst>
+          </p:cNvPr>
+          <p:cNvSpPr>
+            <a:spLocks noGrp="1"/>
+          </p:cNvSpPr>
+          <p:nvPr>
+            <p:ph idx="1"/>
+          </p:nvPr>
+        </p:nvSpPr>
+        <p:spPr/>
+        <p:txBody>
+          <a:bodyPr/>
+          <a:lstStyle/>
+          <a:p>
+            <a:r>
+              <a:rPr lang="en-GB" dirty="0"/>
+              <a:t>Scrum</a:t>
+            </a:r>
+          </a:p>
+          <a:p>
+            <a:pPr lvl="1"/>
+            <a:r>
+              <a:rPr lang="en-GB" dirty="0"/>
+              <a:t>(daily meeting -&gt; every 2 - 3 Days)</a:t>
+            </a:r>
+          </a:p>
+          <a:p>
+            <a:r>
+              <a:rPr lang="en-GB" dirty="0" err="1"/>
+              <a:t>GeoFire</a:t>
+            </a:r>
+            <a:endParaRPr lang="en-GB" dirty="0"/>
+          </a:p>
+          <a:p>
+            <a:pPr lvl="1"/>
+            <a:r>
+              <a:rPr lang="en-GB" dirty="0"/>
+              <a:t>Distance Sorting with Atom bomb</a:t>
+            </a:r>
+          </a:p>
+          <a:p>
+            <a:r>
+              <a:rPr lang="en-GB" dirty="0"/>
+              <a:t>Sorting of list</a:t>
+            </a:r>
+          </a:p>
+          <a:p>
+            <a:r>
+              <a:rPr lang="en-GB" dirty="0"/>
+              <a:t>Weather icons</a:t>
+            </a:r>
+          </a:p>
+        </p:txBody>
+      </p:sp>
+    </p:spTree>
+    <p:extLst>
+      <p:ext uri="{BB962C8B-B14F-4D97-AF65-F5344CB8AC3E}">
+        <p14:creationId xmlns:p14="http://schemas.microsoft.com/office/powerpoint/2010/main" val="1313387902"/>
+      </p:ext>
+    </p:extLst>
+  </p:cSld>
+  <p:clrMapOvr>
+    <a:masterClrMapping/>
+  </p:clrMapOvr>
+</p:sld>
+</file>
+
+<file path=ppt/slides/slide9.xml><?xml version="1.0" encoding="utf-8"?>
+<p:sld xmlns:a="http://schemas.openxmlformats.org/drawingml/2006/main" xmlns:r="http://schemas.openxmlformats.org/officeDocument/2006/relationships" xmlns:p="http://schemas.openxmlformats.org/presentationml/2006/main">
+  <p:cSld>
+    <p:spTree>
+      <p:nvGrpSpPr>
+        <p:cNvPr id="1" name=""/>
+        <p:cNvGrpSpPr/>
+        <p:nvPr/>
+      </p:nvGrpSpPr>
+      <p:grpSpPr>
+        <a:xfrm>
+          <a:off x="0" y="0"/>
+          <a:ext cx="0" cy="0"/>
+          <a:chOff x="0" y="0"/>
+          <a:chExt cx="0" cy="0"/>
+        </a:xfrm>
+      </p:grpSpPr>
+      <p:sp>
+        <p:nvSpPr>
+          <p:cNvPr id="2" name="Titel 1">
+            <a:extLst>
+              <a:ext uri="{FF2B5EF4-FFF2-40B4-BE49-F238E27FC236}">
+                <a16:creationId xmlns:a16="http://schemas.microsoft.com/office/drawing/2014/main" id="{F5CDFFE4-D353-4E85-BC81-E89F9305F6A4}"/>
+              </a:ext>
+            </a:extLst>
+          </p:cNvPr>
+          <p:cNvSpPr>
+            <a:spLocks noGrp="1"/>
+          </p:cNvSpPr>
+          <p:nvPr>
+            <p:ph type="title"/>
+          </p:nvPr>
+        </p:nvSpPr>
+        <p:spPr/>
+        <p:txBody>
+          <a:bodyPr/>
+          <a:lstStyle/>
+          <a:p>
+            <a:r>
+              <a:rPr lang="en-GB" dirty="0"/>
+              <a:t>Evaluation / Testing</a:t>
+            </a:r>
+          </a:p>
+        </p:txBody>
+      </p:sp>
+      <p:sp>
+        <p:nvSpPr>
+          <p:cNvPr id="3" name="Inhaltsplatzhalter 2">
+            <a:extLst>
+              <a:ext uri="{FF2B5EF4-FFF2-40B4-BE49-F238E27FC236}">
+                <a16:creationId xmlns:a16="http://schemas.microsoft.com/office/drawing/2014/main" id="{86043A25-7E8D-4E6F-B9D9-CE9DBDAF2DC8}"/>
+              </a:ext>
+            </a:extLst>
+          </p:cNvPr>
+          <p:cNvSpPr>
+            <a:spLocks noGrp="1"/>
+          </p:cNvSpPr>
+          <p:nvPr>
+            <p:ph idx="1"/>
+          </p:nvPr>
+        </p:nvSpPr>
+        <p:spPr/>
+        <p:txBody>
+          <a:bodyPr/>
+          <a:lstStyle/>
+          <a:p>
+            <a:r>
+              <a:rPr lang="en-GB" dirty="0"/>
+              <a:t>JUnit Test</a:t>
+            </a:r>
+          </a:p>
+          <a:p>
+            <a:pPr lvl="1"/>
+            <a:r>
+              <a:rPr lang="en-GB" dirty="0"/>
+              <a:t>Sorting, Serialization</a:t>
+            </a:r>
+          </a:p>
+          <a:p>
+            <a:r>
+              <a:rPr lang="en-GB" dirty="0"/>
+              <a:t>Code Coverage</a:t>
+            </a:r>
+          </a:p>
+          <a:p>
+            <a:pPr lvl="1"/>
+            <a:r>
+              <a:rPr lang="en-GB" dirty="0"/>
+              <a:t>(30% Line, 57% Class covered)</a:t>
+            </a:r>
+            <a:endParaRPr lang="en-GB" dirty="0">
+              <a:solidFill>
+                <a:srgbClr val="FF0000"/>
+              </a:solidFill>
+            </a:endParaRPr>
+          </a:p>
+          <a:p>
+            <a:r>
+              <a:rPr lang="en-GB" dirty="0" err="1"/>
+              <a:t>SonarQube</a:t>
+            </a:r>
+            <a:endParaRPr lang="en-GB" dirty="0"/>
+          </a:p>
+          <a:p>
+            <a:pPr lvl="1"/>
+            <a:r>
+              <a:rPr lang="en-GB" dirty="0"/>
+              <a:t>Some points can not be fixed</a:t>
+            </a:r>
+          </a:p>
+          <a:p>
+            <a:r>
+              <a:rPr lang="en-GB" dirty="0"/>
+              <a:t>Monkey-Test</a:t>
+            </a:r>
+          </a:p>
+          <a:p>
+            <a:r>
+              <a:rPr lang="en-GB" dirty="0"/>
+              <a:t>Usability</a:t>
+            </a:r>
+          </a:p>
+        </p:txBody>
+      </p:sp>
+    </p:spTree>
+    <p:extLst>
+      <p:ext uri="{BB962C8B-B14F-4D97-AF65-F5344CB8AC3E}">
+        <p14:creationId xmlns:p14="http://schemas.microsoft.com/office/powerpoint/2010/main" val="1742385124"/>
+      </p:ext>
+    </p:extLst>
+  </p:cSld>
+  <p:clrMapOvr>
+    <a:masterClrMapping/>
+  </p:clrMapOvr>
+</p:sld>
+</file>
+
 <file path=ppt/theme/theme1.xml><?xml version="1.0" encoding="utf-8"?>
 <a:theme xmlns:a="http://schemas.openxmlformats.org/drawingml/2006/main" name="Office">
   <a:themeElements>

</xml_diff>

<commit_message>
Last Changes of Assignment and add some Detailed Information
</commit_message>
<xml_diff>
--- a/Documents/Presentation/Presentation.pptx
+++ b/Documents/Presentation/Presentation.pptx
@@ -1458,7 +1458,7 @@
           <a:p>
             <a:r>
               <a:rPr lang="en-GB" dirty="0"/>
-              <a:t>Artan:</a:t>
+              <a:t>Christian:</a:t>
             </a:r>
           </a:p>
           <a:p>
@@ -7661,19 +7661,46 @@
           <a:p>
             <a:r>
               <a:rPr lang="en-GB" dirty="0"/>
-              <a:t>Summary</a:t>
-            </a:r>
-          </a:p>
-          <a:p>
-            <a:r>
-              <a:rPr lang="en-GB" dirty="0"/>
-              <a:t>Lessons learnt</a:t>
+              <a:t>Time budget</a:t>
+            </a:r>
+          </a:p>
+          <a:p>
+            <a:r>
+              <a:rPr lang="en-GB" dirty="0"/>
+              <a:t>Android API’s</a:t>
+            </a:r>
+          </a:p>
+          <a:p>
+            <a:r>
+              <a:rPr lang="en-GB" dirty="0"/>
+              <a:t>Firebase</a:t>
             </a:r>
           </a:p>
           <a:p>
             <a:r>
               <a:rPr lang="en-GB" dirty="0"/>
               <a:t>Future work</a:t>
+            </a:r>
+          </a:p>
+          <a:p>
+            <a:pPr lvl="1"/>
+            <a:r>
+              <a:rPr lang="en-GB" dirty="0"/>
+              <a:t>Ads.</a:t>
+            </a:r>
+          </a:p>
+          <a:p>
+            <a:pPr lvl="1"/>
+            <a:r>
+              <a:rPr lang="en-GB" dirty="0"/>
+              <a:t>Filter / Combination</a:t>
+            </a:r>
+          </a:p>
+          <a:p>
+            <a:pPr lvl="1"/>
+            <a:r>
+              <a:rPr lang="en-GB" dirty="0"/>
+              <a:t>More Data (Changing API)</a:t>
             </a:r>
           </a:p>
         </p:txBody>
@@ -7954,128 +7981,50 @@
           <a:lstStyle/>
           <a:p>
             <a:r>
-              <a:rPr lang="de-CH" dirty="0"/>
+              <a:rPr lang="en-GB" dirty="0"/>
               <a:t>Motivation</a:t>
             </a:r>
           </a:p>
           <a:p>
             <a:pPr lvl="1"/>
             <a:r>
-              <a:rPr lang="de-CH" dirty="0" err="1"/>
-              <a:t>Learn</a:t>
-            </a:r>
-            <a:r>
-              <a:rPr lang="de-CH" dirty="0"/>
-              <a:t> </a:t>
-            </a:r>
-            <a:r>
-              <a:rPr lang="de-CH" dirty="0" err="1"/>
-              <a:t>to</a:t>
-            </a:r>
-            <a:r>
-              <a:rPr lang="de-CH" dirty="0"/>
-              <a:t> </a:t>
-            </a:r>
-            <a:r>
-              <a:rPr lang="de-CH" dirty="0" err="1"/>
-              <a:t>program</a:t>
-            </a:r>
-            <a:r>
-              <a:rPr lang="de-CH" dirty="0"/>
-              <a:t> an </a:t>
-            </a:r>
-            <a:r>
-              <a:rPr lang="de-CH" dirty="0" err="1"/>
-              <a:t>android</a:t>
-            </a:r>
-            <a:r>
-              <a:rPr lang="de-CH" dirty="0"/>
-              <a:t> </a:t>
-            </a:r>
-            <a:r>
-              <a:rPr lang="de-CH" dirty="0" err="1"/>
-              <a:t>app</a:t>
-            </a:r>
-            <a:endParaRPr lang="de-CH" dirty="0"/>
+              <a:rPr lang="en-GB" dirty="0"/>
+              <a:t>Learn to program an android app</a:t>
+            </a:r>
           </a:p>
           <a:p>
             <a:pPr lvl="1"/>
             <a:r>
-              <a:rPr lang="de-CH" dirty="0"/>
-              <a:t>Value </a:t>
-            </a:r>
-            <a:r>
-              <a:rPr lang="de-CH" dirty="0" err="1"/>
-              <a:t>for</a:t>
-            </a:r>
-            <a:r>
-              <a:rPr lang="de-CH" dirty="0"/>
-              <a:t> </a:t>
-            </a:r>
-            <a:r>
-              <a:rPr lang="de-CH" dirty="0" err="1"/>
-              <a:t>stakeholder</a:t>
-            </a:r>
-            <a:endParaRPr lang="de-CH" dirty="0"/>
+              <a:rPr lang="en-GB" dirty="0"/>
+              <a:t>Value for stakeholder</a:t>
+            </a:r>
           </a:p>
           <a:p>
             <a:pPr lvl="1"/>
             <a:r>
-              <a:rPr lang="de-CH" dirty="0"/>
-              <a:t>Value </a:t>
-            </a:r>
-            <a:r>
-              <a:rPr lang="de-CH" dirty="0" err="1"/>
-              <a:t>for</a:t>
-            </a:r>
-            <a:r>
-              <a:rPr lang="de-CH" dirty="0"/>
-              <a:t> </a:t>
-            </a:r>
-            <a:r>
-              <a:rPr lang="de-CH" dirty="0" err="1"/>
-              <a:t>users</a:t>
-            </a:r>
-            <a:endParaRPr lang="de-CH" dirty="0"/>
-          </a:p>
-          <a:p>
-            <a:r>
-              <a:rPr lang="de-CH" dirty="0"/>
-              <a:t>Goal </a:t>
-            </a:r>
-            <a:r>
-              <a:rPr lang="de-CH" dirty="0" err="1"/>
-              <a:t>statement</a:t>
-            </a:r>
-            <a:endParaRPr lang="de-CH" dirty="0"/>
+              <a:rPr lang="en-GB" dirty="0"/>
+              <a:t>Value for users</a:t>
+            </a:r>
+          </a:p>
+          <a:p>
+            <a:r>
+              <a:rPr lang="en-GB" dirty="0"/>
+              <a:t>Goal statement</a:t>
+            </a:r>
           </a:p>
           <a:p>
             <a:pPr lvl="1"/>
             <a:r>
-              <a:rPr lang="de-CH" dirty="0"/>
-              <a:t>Ability </a:t>
-            </a:r>
-            <a:r>
-              <a:rPr lang="de-CH" dirty="0" err="1"/>
-              <a:t>to</a:t>
-            </a:r>
-            <a:r>
-              <a:rPr lang="de-CH" dirty="0"/>
-              <a:t> find </a:t>
-            </a:r>
-            <a:r>
-              <a:rPr lang="de-CH" dirty="0" err="1"/>
-              <a:t>skiresorts</a:t>
-            </a:r>
-            <a:endParaRPr lang="de-CH" dirty="0"/>
+              <a:rPr lang="en-GB" dirty="0"/>
+              <a:t>Ability to find ski resorts</a:t>
+            </a:r>
           </a:p>
           <a:p>
             <a:pPr lvl="1"/>
             <a:r>
-              <a:rPr lang="de-CH" dirty="0" err="1"/>
+              <a:rPr lang="en-GB" dirty="0"/>
               <a:t>Functions</a:t>
             </a:r>
-            <a:endParaRPr lang="de-CH" dirty="0"/>
           </a:p>
         </p:txBody>
       </p:sp>
@@ -8131,12 +8080,8 @@
           <a:lstStyle/>
           <a:p>
             <a:r>
-              <a:rPr lang="de-CH" dirty="0" err="1"/>
-              <a:t>Existing</a:t>
-            </a:r>
-            <a:r>
-              <a:rPr lang="de-CH" dirty="0"/>
-              <a:t> Apps</a:t>
+              <a:rPr lang="en-GB" dirty="0"/>
+              <a:t>Existing Apps</a:t>
             </a:r>
           </a:p>
         </p:txBody>
@@ -8168,44 +8113,37 @@
           <a:lstStyle/>
           <a:p>
             <a:r>
-              <a:rPr lang="de-CH" dirty="0"/>
-              <a:t>Official App </a:t>
-            </a:r>
-            <a:r>
-              <a:rPr lang="de-CH" dirty="0" err="1"/>
-              <a:t>from</a:t>
-            </a:r>
-            <a:r>
-              <a:rPr lang="de-CH" dirty="0"/>
-              <a:t> Ski-Resorts</a:t>
-            </a:r>
-          </a:p>
-          <a:p>
-            <a:r>
-              <a:rPr lang="de-CH" dirty="0" err="1"/>
+              <a:rPr lang="en-GB" dirty="0"/>
+              <a:t>Official App from Ski-Resorts</a:t>
+            </a:r>
+          </a:p>
+          <a:p>
+            <a:r>
+              <a:rPr lang="en-GB" dirty="0" err="1"/>
               <a:t>iSKI</a:t>
             </a:r>
             <a:r>
-              <a:rPr lang="de-CH" dirty="0"/>
+              <a:rPr lang="en-GB" dirty="0"/>
               <a:t> (Swiss, France, Italia, …)</a:t>
             </a:r>
           </a:p>
           <a:p>
             <a:r>
-              <a:rPr lang="de-CH" dirty="0"/>
+              <a:rPr lang="en-GB" dirty="0" err="1"/>
               <a:t>Bergfex</a:t>
             </a:r>
-          </a:p>
-          <a:p>
-            <a:r>
-              <a:rPr lang="de-CH" dirty="0" err="1"/>
+            <a:endParaRPr lang="en-GB" dirty="0"/>
+          </a:p>
+          <a:p>
+            <a:r>
+              <a:rPr lang="en-GB" dirty="0" err="1"/>
               <a:t>Skiinfo</a:t>
             </a:r>
-            <a:endParaRPr lang="de-CH" dirty="0"/>
-          </a:p>
-          <a:p>
-            <a:r>
-              <a:rPr lang="de-CH" dirty="0"/>
+            <a:endParaRPr lang="en-GB" dirty="0"/>
+          </a:p>
+          <a:p>
+            <a:r>
+              <a:rPr lang="en-GB" dirty="0"/>
               <a:t>Skiresort.de</a:t>
             </a:r>
           </a:p>
@@ -9952,7 +9890,12 @@
             <p:ph idx="1"/>
           </p:nvPr>
         </p:nvSpPr>
-        <p:spPr/>
+        <p:spPr>
+          <a:xfrm>
+            <a:off x="628650" y="1825625"/>
+            <a:ext cx="4686298" cy="4351338"/>
+          </a:xfrm>
+        </p:spPr>
         <p:txBody>
           <a:bodyPr/>
           <a:lstStyle/>

</xml_diff>